<commit_message>
add Community and HelperInstitution is design
</commit_message>
<xml_diff>
--- a/Pepito/Final Project Design.pptx
+++ b/Pepito/Final Project Design.pptx
@@ -261,7 +261,7 @@
           <a:p>
             <a:fld id="{9ECEDF27-B25B-0343-A39C-1905A44EF111}" type="datetimeFigureOut">
               <a:rPr lang="en-LU" smtClean="0"/>
-              <a:t>02/12/2020</a:t>
+              <a:t>04/12/2020</a:t>
             </a:fld>
             <a:endParaRPr lang="en-LU"/>
           </a:p>
@@ -461,7 +461,7 @@
           <a:p>
             <a:fld id="{9ECEDF27-B25B-0343-A39C-1905A44EF111}" type="datetimeFigureOut">
               <a:rPr lang="en-LU" smtClean="0"/>
-              <a:t>02/12/2020</a:t>
+              <a:t>04/12/2020</a:t>
             </a:fld>
             <a:endParaRPr lang="en-LU"/>
           </a:p>
@@ -671,7 +671,7 @@
           <a:p>
             <a:fld id="{9ECEDF27-B25B-0343-A39C-1905A44EF111}" type="datetimeFigureOut">
               <a:rPr lang="en-LU" smtClean="0"/>
-              <a:t>02/12/2020</a:t>
+              <a:t>04/12/2020</a:t>
             </a:fld>
             <a:endParaRPr lang="en-LU"/>
           </a:p>
@@ -871,7 +871,7 @@
           <a:p>
             <a:fld id="{9ECEDF27-B25B-0343-A39C-1905A44EF111}" type="datetimeFigureOut">
               <a:rPr lang="en-LU" smtClean="0"/>
-              <a:t>02/12/2020</a:t>
+              <a:t>04/12/2020</a:t>
             </a:fld>
             <a:endParaRPr lang="en-LU"/>
           </a:p>
@@ -1147,7 +1147,7 @@
           <a:p>
             <a:fld id="{9ECEDF27-B25B-0343-A39C-1905A44EF111}" type="datetimeFigureOut">
               <a:rPr lang="en-LU" smtClean="0"/>
-              <a:t>02/12/2020</a:t>
+              <a:t>04/12/2020</a:t>
             </a:fld>
             <a:endParaRPr lang="en-LU"/>
           </a:p>
@@ -1415,7 +1415,7 @@
           <a:p>
             <a:fld id="{9ECEDF27-B25B-0343-A39C-1905A44EF111}" type="datetimeFigureOut">
               <a:rPr lang="en-LU" smtClean="0"/>
-              <a:t>02/12/2020</a:t>
+              <a:t>04/12/2020</a:t>
             </a:fld>
             <a:endParaRPr lang="en-LU"/>
           </a:p>
@@ -1830,7 +1830,7 @@
           <a:p>
             <a:fld id="{9ECEDF27-B25B-0343-A39C-1905A44EF111}" type="datetimeFigureOut">
               <a:rPr lang="en-LU" smtClean="0"/>
-              <a:t>02/12/2020</a:t>
+              <a:t>04/12/2020</a:t>
             </a:fld>
             <a:endParaRPr lang="en-LU"/>
           </a:p>
@@ -1972,7 +1972,7 @@
           <a:p>
             <a:fld id="{9ECEDF27-B25B-0343-A39C-1905A44EF111}" type="datetimeFigureOut">
               <a:rPr lang="en-LU" smtClean="0"/>
-              <a:t>02/12/2020</a:t>
+              <a:t>04/12/2020</a:t>
             </a:fld>
             <a:endParaRPr lang="en-LU"/>
           </a:p>
@@ -2085,7 +2085,7 @@
           <a:p>
             <a:fld id="{9ECEDF27-B25B-0343-A39C-1905A44EF111}" type="datetimeFigureOut">
               <a:rPr lang="en-LU" smtClean="0"/>
-              <a:t>02/12/2020</a:t>
+              <a:t>04/12/2020</a:t>
             </a:fld>
             <a:endParaRPr lang="en-LU"/>
           </a:p>
@@ -2398,7 +2398,7 @@
           <a:p>
             <a:fld id="{9ECEDF27-B25B-0343-A39C-1905A44EF111}" type="datetimeFigureOut">
               <a:rPr lang="en-LU" smtClean="0"/>
-              <a:t>02/12/2020</a:t>
+              <a:t>04/12/2020</a:t>
             </a:fld>
             <a:endParaRPr lang="en-LU"/>
           </a:p>
@@ -2687,7 +2687,7 @@
           <a:p>
             <a:fld id="{9ECEDF27-B25B-0343-A39C-1905A44EF111}" type="datetimeFigureOut">
               <a:rPr lang="en-LU" smtClean="0"/>
-              <a:t>02/12/2020</a:t>
+              <a:t>04/12/2020</a:t>
             </a:fld>
             <a:endParaRPr lang="en-LU"/>
           </a:p>
@@ -2930,7 +2930,7 @@
           <a:p>
             <a:fld id="{9ECEDF27-B25B-0343-A39C-1905A44EF111}" type="datetimeFigureOut">
               <a:rPr lang="en-LU" smtClean="0"/>
-              <a:t>02/12/2020</a:t>
+              <a:t>04/12/2020</a:t>
             </a:fld>
             <a:endParaRPr lang="en-LU"/>
           </a:p>
@@ -4322,8 +4322,8 @@
         </p:nvSpPr>
         <p:spPr>
           <a:xfrm>
-            <a:off x="1163041" y="5241556"/>
-            <a:ext cx="1112036" cy="307777"/>
+            <a:off x="4206385" y="5241556"/>
+            <a:ext cx="1034259" cy="307777"/>
           </a:xfrm>
           <a:prstGeom prst="rect">
             <a:avLst/>
@@ -4341,9 +4341,10 @@
           </a:bodyPr>
           <a:lstStyle/>
           <a:p>
+            <a:pPr algn="ctr"/>
             <a:r>
               <a:rPr lang="en-LU" sz="1400" dirty="0"/>
-              <a:t>Organization</a:t>
+              <a:t>Community</a:t>
             </a:r>
           </a:p>
         </p:txBody>
@@ -4362,7 +4363,7 @@
         </p:nvSpPr>
         <p:spPr>
           <a:xfrm>
-            <a:off x="6597200" y="5239037"/>
+            <a:off x="9601655" y="5239037"/>
             <a:ext cx="745076" cy="307777"/>
           </a:xfrm>
           <a:prstGeom prst="rect">
@@ -4402,7 +4403,7 @@
         </p:nvSpPr>
         <p:spPr>
           <a:xfrm>
-            <a:off x="6597200" y="4781759"/>
+            <a:off x="9601655" y="4781759"/>
             <a:ext cx="679673" cy="307777"/>
           </a:xfrm>
           <a:prstGeom prst="rect">
@@ -4442,7 +4443,7 @@
         </p:nvSpPr>
         <p:spPr>
           <a:xfrm>
-            <a:off x="6597200" y="5675953"/>
+            <a:off x="9601655" y="5675953"/>
             <a:ext cx="878767" cy="307777"/>
           </a:xfrm>
           <a:prstGeom prst="rect">
@@ -4482,7 +4483,7 @@
         </p:nvSpPr>
         <p:spPr>
           <a:xfrm>
-            <a:off x="3063191" y="5241555"/>
+            <a:off x="6067646" y="5241555"/>
             <a:ext cx="1341201" cy="307777"/>
           </a:xfrm>
           <a:prstGeom prst="rect">
@@ -4525,8 +4526,8 @@
         </p:nvCxnSpPr>
         <p:spPr>
           <a:xfrm flipV="1">
-            <a:off x="2275077" y="5395444"/>
-            <a:ext cx="788114" cy="1"/>
+            <a:off x="5240644" y="5395444"/>
+            <a:ext cx="827002" cy="1"/>
           </a:xfrm>
           <a:prstGeom prst="bentConnector3">
             <a:avLst/>
@@ -4568,7 +4569,7 @@
         </p:nvCxnSpPr>
         <p:spPr>
           <a:xfrm flipV="1">
-            <a:off x="4404392" y="4935648"/>
+            <a:off x="7408847" y="4935648"/>
             <a:ext cx="2192808" cy="459796"/>
           </a:xfrm>
           <a:prstGeom prst="bentConnector3">
@@ -4611,7 +4612,7 @@
         </p:nvCxnSpPr>
         <p:spPr>
           <a:xfrm flipV="1">
-            <a:off x="4404392" y="5392926"/>
+            <a:off x="7408847" y="5392926"/>
             <a:ext cx="2192808" cy="2518"/>
           </a:xfrm>
           <a:prstGeom prst="bentConnector3">
@@ -4654,7 +4655,7 @@
         </p:nvCxnSpPr>
         <p:spPr>
           <a:xfrm>
-            <a:off x="4404392" y="5395444"/>
+            <a:off x="7408847" y="5395444"/>
             <a:ext cx="2192808" cy="434398"/>
           </a:xfrm>
           <a:prstGeom prst="bentConnector3">
@@ -4861,7 +4862,7 @@
         </p:nvSpPr>
         <p:spPr>
           <a:xfrm>
-            <a:off x="7294081" y="4724875"/>
+            <a:off x="10298536" y="4724875"/>
             <a:ext cx="864339" cy="261610"/>
           </a:xfrm>
           <a:prstGeom prst="rect">
@@ -4897,7 +4898,7 @@
         </p:nvSpPr>
         <p:spPr>
           <a:xfrm>
-            <a:off x="3062734" y="6222504"/>
+            <a:off x="4369018" y="6222504"/>
             <a:ext cx="1149545" cy="307777"/>
           </a:xfrm>
           <a:prstGeom prst="rect">
@@ -4934,18 +4935,20 @@
           </p:cNvPr>
           <p:cNvCxnSpPr>
             <a:cxnSpLocks/>
-            <a:stCxn id="49" idx="3"/>
+            <a:stCxn id="68" idx="3"/>
             <a:endCxn id="63" idx="1"/>
           </p:cNvCxnSpPr>
           <p:nvPr/>
         </p:nvCxnSpPr>
         <p:spPr>
           <a:xfrm>
-            <a:off x="2275077" y="5395445"/>
-            <a:ext cx="787657" cy="980948"/>
+            <a:off x="3379382" y="5392926"/>
+            <a:ext cx="989636" cy="983467"/>
           </a:xfrm>
           <a:prstGeom prst="bentConnector3">
-            <a:avLst/>
+            <a:avLst>
+              <a:gd name="adj1" fmla="val 50000"/>
+            </a:avLst>
           </a:prstGeom>
           <a:ln>
             <a:tailEnd type="triangle"/>
@@ -4980,7 +4983,7 @@
         </p:nvSpPr>
         <p:spPr>
           <a:xfrm>
-            <a:off x="5500796" y="6222503"/>
+            <a:off x="8505251" y="6222503"/>
             <a:ext cx="1050993" cy="307777"/>
           </a:xfrm>
           <a:prstGeom prst="rect">
@@ -5024,8 +5027,8 @@
         </p:nvCxnSpPr>
         <p:spPr>
           <a:xfrm flipV="1">
-            <a:off x="4212279" y="6376392"/>
-            <a:ext cx="1288517" cy="1"/>
+            <a:off x="5518563" y="6376392"/>
+            <a:ext cx="2986688" cy="1"/>
           </a:xfrm>
           <a:prstGeom prst="bentConnector3">
             <a:avLst/>
@@ -5097,7 +5100,7 @@
         </p:nvSpPr>
         <p:spPr>
           <a:xfrm>
-            <a:off x="6611628" y="6245586"/>
+            <a:off x="9616083" y="6245586"/>
             <a:ext cx="2146742" cy="261610"/>
           </a:xfrm>
           <a:prstGeom prst="rect">
@@ -5260,6 +5263,90 @@
           </a:p>
         </p:txBody>
       </p:sp>
+      <p:sp>
+        <p:nvSpPr>
+          <p:cNvPr id="68" name="TextBox 67">
+            <a:extLst>
+              <a:ext uri="{FF2B5EF4-FFF2-40B4-BE49-F238E27FC236}">
+                <a16:creationId xmlns:a16="http://schemas.microsoft.com/office/drawing/2014/main" id="{EE8EBBFF-2CA6-F14F-B427-B8B38A25C863}"/>
+              </a:ext>
+            </a:extLst>
+          </p:cNvPr>
+          <p:cNvSpPr txBox="1"/>
+          <p:nvPr/>
+        </p:nvSpPr>
+        <p:spPr>
+          <a:xfrm>
+            <a:off x="1946361" y="5239037"/>
+            <a:ext cx="1433021" cy="307777"/>
+          </a:xfrm>
+          <a:prstGeom prst="rect">
+            <a:avLst/>
+          </a:prstGeom>
+          <a:noFill/>
+          <a:ln>
+            <a:solidFill>
+              <a:schemeClr val="accent1"/>
+            </a:solidFill>
+          </a:ln>
+        </p:spPr>
+        <p:txBody>
+          <a:bodyPr wrap="none" rtlCol="0">
+            <a:spAutoFit/>
+          </a:bodyPr>
+          <a:lstStyle/>
+          <a:p>
+            <a:pPr algn="r"/>
+            <a:r>
+              <a:rPr lang="en-LU" sz="1400" dirty="0"/>
+              <a:t>HelperInstitution</a:t>
+            </a:r>
+          </a:p>
+        </p:txBody>
+      </p:sp>
+      <p:cxnSp>
+        <p:nvCxnSpPr>
+          <p:cNvPr id="70" name="Elbow Connector 69">
+            <a:extLst>
+              <a:ext uri="{FF2B5EF4-FFF2-40B4-BE49-F238E27FC236}">
+                <a16:creationId xmlns:a16="http://schemas.microsoft.com/office/drawing/2014/main" id="{A91CEB05-131E-F44C-99F2-A6213E6BAD6A}"/>
+              </a:ext>
+            </a:extLst>
+          </p:cNvPr>
+          <p:cNvCxnSpPr>
+            <a:cxnSpLocks/>
+            <a:stCxn id="68" idx="3"/>
+            <a:endCxn id="49" idx="1"/>
+          </p:cNvCxnSpPr>
+          <p:nvPr/>
+        </p:nvCxnSpPr>
+        <p:spPr>
+          <a:xfrm>
+            <a:off x="3379382" y="5392926"/>
+            <a:ext cx="827003" cy="2519"/>
+          </a:xfrm>
+          <a:prstGeom prst="bentConnector3">
+            <a:avLst/>
+          </a:prstGeom>
+          <a:ln>
+            <a:tailEnd type="triangle"/>
+          </a:ln>
+        </p:spPr>
+        <p:style>
+          <a:lnRef idx="1">
+            <a:schemeClr val="accent1"/>
+          </a:lnRef>
+          <a:fillRef idx="0">
+            <a:schemeClr val="accent1"/>
+          </a:fillRef>
+          <a:effectRef idx="0">
+            <a:schemeClr val="accent1"/>
+          </a:effectRef>
+          <a:fontRef idx="minor">
+            <a:schemeClr val="tx1"/>
+          </a:fontRef>
+        </p:style>
+      </p:cxnSp>
     </p:spTree>
     <p:extLst>
       <p:ext uri="{BB962C8B-B14F-4D97-AF65-F5344CB8AC3E}">

</xml_diff>

<commit_message>
refine process flow web3
</commit_message>
<xml_diff>
--- a/Pepito/Final Project Design.pptx
+++ b/Pepito/Final Project Design.pptx
@@ -6,6 +6,7 @@
   </p:sldMasterIdLst>
   <p:sldIdLst>
     <p:sldId id="256" r:id="rId2"/>
+    <p:sldId id="257" r:id="rId3"/>
   </p:sldIdLst>
   <p:sldSz cx="12192000" cy="6858000"/>
   <p:notesSz cx="6858000" cy="9144000"/>
@@ -261,7 +262,7 @@
           <a:p>
             <a:fld id="{9ECEDF27-B25B-0343-A39C-1905A44EF111}" type="datetimeFigureOut">
               <a:rPr lang="en-LU" smtClean="0"/>
-              <a:t>04/12/2020</a:t>
+              <a:t>23/12/2020</a:t>
             </a:fld>
             <a:endParaRPr lang="en-LU"/>
           </a:p>
@@ -461,7 +462,7 @@
           <a:p>
             <a:fld id="{9ECEDF27-B25B-0343-A39C-1905A44EF111}" type="datetimeFigureOut">
               <a:rPr lang="en-LU" smtClean="0"/>
-              <a:t>04/12/2020</a:t>
+              <a:t>23/12/2020</a:t>
             </a:fld>
             <a:endParaRPr lang="en-LU"/>
           </a:p>
@@ -671,7 +672,7 @@
           <a:p>
             <a:fld id="{9ECEDF27-B25B-0343-A39C-1905A44EF111}" type="datetimeFigureOut">
               <a:rPr lang="en-LU" smtClean="0"/>
-              <a:t>04/12/2020</a:t>
+              <a:t>23/12/2020</a:t>
             </a:fld>
             <a:endParaRPr lang="en-LU"/>
           </a:p>
@@ -871,7 +872,7 @@
           <a:p>
             <a:fld id="{9ECEDF27-B25B-0343-A39C-1905A44EF111}" type="datetimeFigureOut">
               <a:rPr lang="en-LU" smtClean="0"/>
-              <a:t>04/12/2020</a:t>
+              <a:t>23/12/2020</a:t>
             </a:fld>
             <a:endParaRPr lang="en-LU"/>
           </a:p>
@@ -1147,7 +1148,7 @@
           <a:p>
             <a:fld id="{9ECEDF27-B25B-0343-A39C-1905A44EF111}" type="datetimeFigureOut">
               <a:rPr lang="en-LU" smtClean="0"/>
-              <a:t>04/12/2020</a:t>
+              <a:t>23/12/2020</a:t>
             </a:fld>
             <a:endParaRPr lang="en-LU"/>
           </a:p>
@@ -1415,7 +1416,7 @@
           <a:p>
             <a:fld id="{9ECEDF27-B25B-0343-A39C-1905A44EF111}" type="datetimeFigureOut">
               <a:rPr lang="en-LU" smtClean="0"/>
-              <a:t>04/12/2020</a:t>
+              <a:t>23/12/2020</a:t>
             </a:fld>
             <a:endParaRPr lang="en-LU"/>
           </a:p>
@@ -1830,7 +1831,7 @@
           <a:p>
             <a:fld id="{9ECEDF27-B25B-0343-A39C-1905A44EF111}" type="datetimeFigureOut">
               <a:rPr lang="en-LU" smtClean="0"/>
-              <a:t>04/12/2020</a:t>
+              <a:t>23/12/2020</a:t>
             </a:fld>
             <a:endParaRPr lang="en-LU"/>
           </a:p>
@@ -1972,7 +1973,7 @@
           <a:p>
             <a:fld id="{9ECEDF27-B25B-0343-A39C-1905A44EF111}" type="datetimeFigureOut">
               <a:rPr lang="en-LU" smtClean="0"/>
-              <a:t>04/12/2020</a:t>
+              <a:t>23/12/2020</a:t>
             </a:fld>
             <a:endParaRPr lang="en-LU"/>
           </a:p>
@@ -2085,7 +2086,7 @@
           <a:p>
             <a:fld id="{9ECEDF27-B25B-0343-A39C-1905A44EF111}" type="datetimeFigureOut">
               <a:rPr lang="en-LU" smtClean="0"/>
-              <a:t>04/12/2020</a:t>
+              <a:t>23/12/2020</a:t>
             </a:fld>
             <a:endParaRPr lang="en-LU"/>
           </a:p>
@@ -2398,7 +2399,7 @@
           <a:p>
             <a:fld id="{9ECEDF27-B25B-0343-A39C-1905A44EF111}" type="datetimeFigureOut">
               <a:rPr lang="en-LU" smtClean="0"/>
-              <a:t>04/12/2020</a:t>
+              <a:t>23/12/2020</a:t>
             </a:fld>
             <a:endParaRPr lang="en-LU"/>
           </a:p>
@@ -2687,7 +2688,7 @@
           <a:p>
             <a:fld id="{9ECEDF27-B25B-0343-A39C-1905A44EF111}" type="datetimeFigureOut">
               <a:rPr lang="en-LU" smtClean="0"/>
-              <a:t>04/12/2020</a:t>
+              <a:t>23/12/2020</a:t>
             </a:fld>
             <a:endParaRPr lang="en-LU"/>
           </a:p>
@@ -2930,7 +2931,7 @@
           <a:p>
             <a:fld id="{9ECEDF27-B25B-0343-A39C-1905A44EF111}" type="datetimeFigureOut">
               <a:rPr lang="en-LU" smtClean="0"/>
-              <a:t>04/12/2020</a:t>
+              <a:t>23/12/2020</a:t>
             </a:fld>
             <a:endParaRPr lang="en-LU"/>
           </a:p>
@@ -5360,6 +5361,1133 @@
 </p:sld>
 </file>
 
+<file path=ppt/slides/slide2.xml><?xml version="1.0" encoding="utf-8"?>
+<p:sld xmlns:a="http://schemas.openxmlformats.org/drawingml/2006/main" xmlns:r="http://schemas.openxmlformats.org/officeDocument/2006/relationships" xmlns:p="http://schemas.openxmlformats.org/presentationml/2006/main">
+  <p:cSld>
+    <p:spTree>
+      <p:nvGrpSpPr>
+        <p:cNvPr id="1" name=""/>
+        <p:cNvGrpSpPr/>
+        <p:nvPr/>
+      </p:nvGrpSpPr>
+      <p:grpSpPr>
+        <a:xfrm>
+          <a:off x="0" y="0"/>
+          <a:ext cx="0" cy="0"/>
+          <a:chOff x="0" y="0"/>
+          <a:chExt cx="0" cy="0"/>
+        </a:xfrm>
+      </p:grpSpPr>
+      <p:sp>
+        <p:nvSpPr>
+          <p:cNvPr id="4" name="TextBox 3">
+            <a:extLst>
+              <a:ext uri="{FF2B5EF4-FFF2-40B4-BE49-F238E27FC236}">
+                <a16:creationId xmlns:a16="http://schemas.microsoft.com/office/drawing/2014/main" id="{7B91D8D0-F88B-784E-8FF8-D5F07BC08546}"/>
+              </a:ext>
+            </a:extLst>
+          </p:cNvPr>
+          <p:cNvSpPr txBox="1"/>
+          <p:nvPr/>
+        </p:nvSpPr>
+        <p:spPr>
+          <a:xfrm>
+            <a:off x="620486" y="413657"/>
+            <a:ext cx="3129383" cy="369332"/>
+          </a:xfrm>
+          <a:prstGeom prst="rect">
+            <a:avLst/>
+          </a:prstGeom>
+          <a:noFill/>
+        </p:spPr>
+        <p:txBody>
+          <a:bodyPr wrap="none" rtlCol="0">
+            <a:spAutoFit/>
+          </a:bodyPr>
+          <a:lstStyle/>
+          <a:p>
+            <a:r>
+              <a:rPr lang="en-US" dirty="0"/>
+              <a:t>Pepito – React calling sequence</a:t>
+            </a:r>
+          </a:p>
+        </p:txBody>
+      </p:sp>
+      <p:sp>
+        <p:nvSpPr>
+          <p:cNvPr id="5" name="TextBox 4">
+            <a:extLst>
+              <a:ext uri="{FF2B5EF4-FFF2-40B4-BE49-F238E27FC236}">
+                <a16:creationId xmlns:a16="http://schemas.microsoft.com/office/drawing/2014/main" id="{4E7891D5-3171-C544-94BF-3D2CB24C6664}"/>
+              </a:ext>
+            </a:extLst>
+          </p:cNvPr>
+          <p:cNvSpPr txBox="1"/>
+          <p:nvPr/>
+        </p:nvSpPr>
+        <p:spPr>
+          <a:xfrm>
+            <a:off x="620486" y="1469572"/>
+            <a:ext cx="1270944" cy="369332"/>
+          </a:xfrm>
+          <a:prstGeom prst="rect">
+            <a:avLst/>
+          </a:prstGeom>
+          <a:noFill/>
+          <a:ln>
+            <a:solidFill>
+              <a:schemeClr val="accent1"/>
+            </a:solidFill>
+          </a:ln>
+        </p:spPr>
+        <p:txBody>
+          <a:bodyPr wrap="none" rtlCol="0">
+            <a:noAutofit/>
+          </a:bodyPr>
+          <a:lstStyle/>
+          <a:p>
+            <a:r>
+              <a:rPr lang="en-US" sz="1600"/>
+              <a:t>App</a:t>
+            </a:r>
+          </a:p>
+        </p:txBody>
+      </p:sp>
+      <p:sp>
+        <p:nvSpPr>
+          <p:cNvPr id="6" name="TextBox 5">
+            <a:extLst>
+              <a:ext uri="{FF2B5EF4-FFF2-40B4-BE49-F238E27FC236}">
+                <a16:creationId xmlns:a16="http://schemas.microsoft.com/office/drawing/2014/main" id="{A5D02A08-6485-3747-9743-8A8FF3F1AFD8}"/>
+              </a:ext>
+            </a:extLst>
+          </p:cNvPr>
+          <p:cNvSpPr txBox="1"/>
+          <p:nvPr/>
+        </p:nvSpPr>
+        <p:spPr>
+          <a:xfrm>
+            <a:off x="611375" y="1838904"/>
+            <a:ext cx="1386213" cy="461665"/>
+          </a:xfrm>
+          <a:prstGeom prst="rect">
+            <a:avLst/>
+          </a:prstGeom>
+          <a:noFill/>
+        </p:spPr>
+        <p:txBody>
+          <a:bodyPr wrap="none" rtlCol="0">
+            <a:spAutoFit/>
+          </a:bodyPr>
+          <a:lstStyle/>
+          <a:p>
+            <a:pPr marL="171450" indent="-171450">
+              <a:buFont typeface="Arial" panose="020B0604020202020204" pitchFamily="34" charset="0"/>
+              <a:buChar char="•"/>
+            </a:pPr>
+            <a:r>
+              <a:rPr lang="en-US" sz="1200"/>
+              <a:t>Initialise options</a:t>
+            </a:r>
+          </a:p>
+          <a:p>
+            <a:pPr marL="171450" indent="-171450">
+              <a:buFont typeface="Arial" panose="020B0604020202020204" pitchFamily="34" charset="0"/>
+              <a:buChar char="•"/>
+            </a:pPr>
+            <a:r>
+              <a:rPr lang="en-US" sz="1200"/>
+              <a:t>Loading = false</a:t>
+            </a:r>
+          </a:p>
+        </p:txBody>
+      </p:sp>
+      <p:sp>
+        <p:nvSpPr>
+          <p:cNvPr id="7" name="TextBox 6">
+            <a:extLst>
+              <a:ext uri="{FF2B5EF4-FFF2-40B4-BE49-F238E27FC236}">
+                <a16:creationId xmlns:a16="http://schemas.microsoft.com/office/drawing/2014/main" id="{71B0BC68-98F1-374B-B0A6-7F80DAAB776D}"/>
+              </a:ext>
+            </a:extLst>
+          </p:cNvPr>
+          <p:cNvSpPr txBox="1"/>
+          <p:nvPr/>
+        </p:nvSpPr>
+        <p:spPr>
+          <a:xfrm>
+            <a:off x="2897557" y="1469572"/>
+            <a:ext cx="1988878" cy="338554"/>
+          </a:xfrm>
+          <a:prstGeom prst="rect">
+            <a:avLst/>
+          </a:prstGeom>
+          <a:noFill/>
+          <a:ln>
+            <a:solidFill>
+              <a:schemeClr val="accent1"/>
+            </a:solidFill>
+          </a:ln>
+        </p:spPr>
+        <p:txBody>
+          <a:bodyPr wrap="none" rtlCol="0">
+            <a:spAutoFit/>
+          </a:bodyPr>
+          <a:lstStyle/>
+          <a:p>
+            <a:r>
+              <a:rPr lang="en-US" sz="1600"/>
+              <a:t>componentDidMount</a:t>
+            </a:r>
+          </a:p>
+        </p:txBody>
+      </p:sp>
+      <p:sp>
+        <p:nvSpPr>
+          <p:cNvPr id="8" name="TextBox 7">
+            <a:extLst>
+              <a:ext uri="{FF2B5EF4-FFF2-40B4-BE49-F238E27FC236}">
+                <a16:creationId xmlns:a16="http://schemas.microsoft.com/office/drawing/2014/main" id="{BFDA071E-ACD1-CC46-AC6B-D3109A9288AC}"/>
+              </a:ext>
+            </a:extLst>
+          </p:cNvPr>
+          <p:cNvSpPr txBox="1"/>
+          <p:nvPr/>
+        </p:nvSpPr>
+        <p:spPr>
+          <a:xfrm>
+            <a:off x="2888446" y="1838904"/>
+            <a:ext cx="2574872" cy="1200329"/>
+          </a:xfrm>
+          <a:prstGeom prst="rect">
+            <a:avLst/>
+          </a:prstGeom>
+          <a:noFill/>
+        </p:spPr>
+        <p:txBody>
+          <a:bodyPr wrap="none" rtlCol="0">
+            <a:spAutoFit/>
+          </a:bodyPr>
+          <a:lstStyle/>
+          <a:p>
+            <a:pPr marL="171450" indent="-171450">
+              <a:buFont typeface="Arial" panose="020B0604020202020204" pitchFamily="34" charset="0"/>
+              <a:buChar char="•"/>
+            </a:pPr>
+            <a:r>
+              <a:rPr lang="en-US" sz="1200" dirty="0" err="1"/>
+              <a:t>requestRandomNumber</a:t>
+            </a:r>
+            <a:r>
+              <a:rPr lang="en-US" sz="1200" dirty="0"/>
+              <a:t>()</a:t>
+            </a:r>
+          </a:p>
+          <a:p>
+            <a:pPr marL="171450" indent="-171450">
+              <a:buFont typeface="Arial" panose="020B0604020202020204" pitchFamily="34" charset="0"/>
+              <a:buChar char="•"/>
+            </a:pPr>
+            <a:r>
+              <a:rPr lang="en-US" sz="1200" dirty="0"/>
+              <a:t>getWeb3()</a:t>
+            </a:r>
+          </a:p>
+          <a:p>
+            <a:pPr marL="171450" indent="-171450">
+              <a:buFont typeface="Arial" panose="020B0604020202020204" pitchFamily="34" charset="0"/>
+              <a:buChar char="•"/>
+            </a:pPr>
+            <a:r>
+              <a:rPr lang="en-US" sz="1200" dirty="0"/>
+              <a:t>Query list of ETH user accounts</a:t>
+            </a:r>
+          </a:p>
+          <a:p>
+            <a:pPr marL="171450" indent="-171450">
+              <a:buFont typeface="Arial" panose="020B0604020202020204" pitchFamily="34" charset="0"/>
+              <a:buChar char="•"/>
+            </a:pPr>
+            <a:r>
+              <a:rPr lang="en-US" sz="1200" dirty="0"/>
+              <a:t>Query ETH blockchain network</a:t>
+            </a:r>
+          </a:p>
+          <a:p>
+            <a:pPr marL="171450" indent="-171450">
+              <a:buFont typeface="Arial" panose="020B0604020202020204" pitchFamily="34" charset="0"/>
+              <a:buChar char="•"/>
+            </a:pPr>
+            <a:r>
+              <a:rPr lang="en-US" sz="1200" dirty="0"/>
+              <a:t>Deploy Pepito on this network</a:t>
+            </a:r>
+          </a:p>
+          <a:p>
+            <a:pPr marL="171450" indent="-171450">
+              <a:buFont typeface="Arial" panose="020B0604020202020204" pitchFamily="34" charset="0"/>
+              <a:buChar char="•"/>
+            </a:pPr>
+            <a:r>
+              <a:rPr lang="en-US" sz="1200" dirty="0" err="1"/>
+              <a:t>setState</a:t>
+            </a:r>
+            <a:r>
+              <a:rPr lang="en-US" sz="1200" dirty="0"/>
+              <a:t>() without running anything</a:t>
+            </a:r>
+          </a:p>
+        </p:txBody>
+      </p:sp>
+      <p:sp>
+        <p:nvSpPr>
+          <p:cNvPr id="9" name="TextBox 8">
+            <a:extLst>
+              <a:ext uri="{FF2B5EF4-FFF2-40B4-BE49-F238E27FC236}">
+                <a16:creationId xmlns:a16="http://schemas.microsoft.com/office/drawing/2014/main" id="{A648BA86-9C0C-0846-A8F7-877203CF605C}"/>
+              </a:ext>
+            </a:extLst>
+          </p:cNvPr>
+          <p:cNvSpPr txBox="1"/>
+          <p:nvPr/>
+        </p:nvSpPr>
+        <p:spPr>
+          <a:xfrm>
+            <a:off x="2897557" y="4279814"/>
+            <a:ext cx="1270944" cy="369332"/>
+          </a:xfrm>
+          <a:prstGeom prst="rect">
+            <a:avLst/>
+          </a:prstGeom>
+          <a:noFill/>
+          <a:ln>
+            <a:solidFill>
+              <a:schemeClr val="accent1"/>
+            </a:solidFill>
+          </a:ln>
+        </p:spPr>
+        <p:txBody>
+          <a:bodyPr wrap="none" rtlCol="0">
+            <a:noAutofit/>
+          </a:bodyPr>
+          <a:lstStyle/>
+          <a:p>
+            <a:r>
+              <a:rPr lang="en-US" sz="1600" dirty="0"/>
+              <a:t>render</a:t>
+            </a:r>
+          </a:p>
+        </p:txBody>
+      </p:sp>
+      <p:sp>
+        <p:nvSpPr>
+          <p:cNvPr id="10" name="TextBox 9">
+            <a:extLst>
+              <a:ext uri="{FF2B5EF4-FFF2-40B4-BE49-F238E27FC236}">
+                <a16:creationId xmlns:a16="http://schemas.microsoft.com/office/drawing/2014/main" id="{9975F9DA-160B-2D4B-9A04-56DEA224E101}"/>
+              </a:ext>
+            </a:extLst>
+          </p:cNvPr>
+          <p:cNvSpPr txBox="1"/>
+          <p:nvPr/>
+        </p:nvSpPr>
+        <p:spPr>
+          <a:xfrm>
+            <a:off x="2888446" y="4649146"/>
+            <a:ext cx="2030043" cy="1200329"/>
+          </a:xfrm>
+          <a:prstGeom prst="rect">
+            <a:avLst/>
+          </a:prstGeom>
+          <a:noFill/>
+        </p:spPr>
+        <p:txBody>
+          <a:bodyPr wrap="none" rtlCol="0">
+            <a:spAutoFit/>
+          </a:bodyPr>
+          <a:lstStyle/>
+          <a:p>
+            <a:pPr marL="171450" indent="-171450">
+              <a:buFont typeface="Arial" panose="020B0604020202020204" pitchFamily="34" charset="0"/>
+              <a:buChar char="•"/>
+            </a:pPr>
+            <a:r>
+              <a:rPr lang="en-US" sz="1200" dirty="0"/>
+              <a:t>Header</a:t>
+            </a:r>
+          </a:p>
+          <a:p>
+            <a:pPr marL="171450" indent="-171450">
+              <a:buFont typeface="Arial" panose="020B0604020202020204" pitchFamily="34" charset="0"/>
+              <a:buChar char="•"/>
+            </a:pPr>
+            <a:r>
+              <a:rPr lang="en-US" sz="1200" dirty="0"/>
+              <a:t>Button “generate disguise”</a:t>
+            </a:r>
+          </a:p>
+          <a:p>
+            <a:pPr marL="171450" indent="-171450">
+              <a:buFont typeface="Arial" panose="020B0604020202020204" pitchFamily="34" charset="0"/>
+              <a:buChar char="•"/>
+            </a:pPr>
+            <a:r>
+              <a:rPr lang="en-US" sz="1200" dirty="0"/>
+              <a:t>Logo Machu Picchu</a:t>
+            </a:r>
+          </a:p>
+          <a:p>
+            <a:pPr marL="171450" indent="-171450">
+              <a:buFont typeface="Arial" panose="020B0604020202020204" pitchFamily="34" charset="0"/>
+              <a:buChar char="•"/>
+            </a:pPr>
+            <a:r>
+              <a:rPr lang="en-US" sz="1200" dirty="0"/>
+              <a:t>Button “store disguise”</a:t>
+            </a:r>
+          </a:p>
+          <a:p>
+            <a:pPr marL="171450" indent="-171450">
+              <a:buFont typeface="Arial" panose="020B0604020202020204" pitchFamily="34" charset="0"/>
+              <a:buChar char="•"/>
+            </a:pPr>
+            <a:r>
+              <a:rPr lang="en-US" sz="1200" dirty="0"/>
+              <a:t>Avatar</a:t>
+            </a:r>
+          </a:p>
+          <a:p>
+            <a:pPr marL="171450" indent="-171450">
+              <a:buFont typeface="Arial" panose="020B0604020202020204" pitchFamily="34" charset="0"/>
+              <a:buChar char="•"/>
+            </a:pPr>
+            <a:r>
+              <a:rPr lang="en-US" sz="1200" dirty="0"/>
+              <a:t>Table of options</a:t>
+            </a:r>
+          </a:p>
+        </p:txBody>
+      </p:sp>
+      <p:sp>
+        <p:nvSpPr>
+          <p:cNvPr id="11" name="TextBox 10">
+            <a:extLst>
+              <a:ext uri="{FF2B5EF4-FFF2-40B4-BE49-F238E27FC236}">
+                <a16:creationId xmlns:a16="http://schemas.microsoft.com/office/drawing/2014/main" id="{85914CB4-F35A-1345-8DBC-C29A95AB459E}"/>
+              </a:ext>
+            </a:extLst>
+          </p:cNvPr>
+          <p:cNvSpPr txBox="1"/>
+          <p:nvPr/>
+        </p:nvSpPr>
+        <p:spPr>
+          <a:xfrm>
+            <a:off x="6344301" y="1962015"/>
+            <a:ext cx="2204258" cy="338554"/>
+          </a:xfrm>
+          <a:prstGeom prst="rect">
+            <a:avLst/>
+          </a:prstGeom>
+          <a:noFill/>
+          <a:ln>
+            <a:solidFill>
+              <a:schemeClr val="accent1"/>
+            </a:solidFill>
+          </a:ln>
+        </p:spPr>
+        <p:txBody>
+          <a:bodyPr wrap="none" rtlCol="0">
+            <a:spAutoFit/>
+          </a:bodyPr>
+          <a:lstStyle/>
+          <a:p>
+            <a:r>
+              <a:rPr lang="en-US" sz="1600" dirty="0" err="1"/>
+              <a:t>requestRandomNumber</a:t>
+            </a:r>
+            <a:endParaRPr lang="en-US" sz="1600" dirty="0"/>
+          </a:p>
+        </p:txBody>
+      </p:sp>
+      <p:sp>
+        <p:nvSpPr>
+          <p:cNvPr id="12" name="TextBox 11">
+            <a:extLst>
+              <a:ext uri="{FF2B5EF4-FFF2-40B4-BE49-F238E27FC236}">
+                <a16:creationId xmlns:a16="http://schemas.microsoft.com/office/drawing/2014/main" id="{5A37F1E2-B7F8-5944-B7F6-55EF2F9A2648}"/>
+              </a:ext>
+            </a:extLst>
+          </p:cNvPr>
+          <p:cNvSpPr txBox="1"/>
+          <p:nvPr/>
+        </p:nvSpPr>
+        <p:spPr>
+          <a:xfrm>
+            <a:off x="6335190" y="2331347"/>
+            <a:ext cx="1843838" cy="646331"/>
+          </a:xfrm>
+          <a:prstGeom prst="rect">
+            <a:avLst/>
+          </a:prstGeom>
+          <a:noFill/>
+        </p:spPr>
+        <p:txBody>
+          <a:bodyPr wrap="none" rtlCol="0">
+            <a:spAutoFit/>
+          </a:bodyPr>
+          <a:lstStyle/>
+          <a:p>
+            <a:pPr marL="171450" indent="-171450">
+              <a:buFont typeface="Arial" panose="020B0604020202020204" pitchFamily="34" charset="0"/>
+              <a:buChar char="•"/>
+            </a:pPr>
+            <a:r>
+              <a:rPr lang="en-US" sz="1200" dirty="0"/>
+              <a:t>Generate random</a:t>
+            </a:r>
+          </a:p>
+          <a:p>
+            <a:pPr marL="171450" indent="-171450">
+              <a:buFont typeface="Arial" panose="020B0604020202020204" pitchFamily="34" charset="0"/>
+              <a:buChar char="•"/>
+            </a:pPr>
+            <a:r>
+              <a:rPr lang="en-US" sz="1200" dirty="0"/>
+              <a:t>Loading = true</a:t>
+            </a:r>
+          </a:p>
+          <a:p>
+            <a:pPr marL="171450" indent="-171450">
+              <a:buFont typeface="Arial" panose="020B0604020202020204" pitchFamily="34" charset="0"/>
+              <a:buChar char="•"/>
+            </a:pPr>
+            <a:r>
+              <a:rPr lang="en-US" sz="1200" dirty="0" err="1"/>
+              <a:t>setState</a:t>
+            </a:r>
+            <a:r>
+              <a:rPr lang="en-US" sz="1200" dirty="0"/>
+              <a:t>() and </a:t>
+            </a:r>
+            <a:r>
+              <a:rPr lang="en-US" sz="1200" dirty="0" err="1"/>
+              <a:t>getData</a:t>
+            </a:r>
+            <a:r>
+              <a:rPr lang="en-US" sz="1200" dirty="0"/>
+              <a:t>()</a:t>
+            </a:r>
+          </a:p>
+        </p:txBody>
+      </p:sp>
+      <p:sp>
+        <p:nvSpPr>
+          <p:cNvPr id="13" name="TextBox 12">
+            <a:extLst>
+              <a:ext uri="{FF2B5EF4-FFF2-40B4-BE49-F238E27FC236}">
+                <a16:creationId xmlns:a16="http://schemas.microsoft.com/office/drawing/2014/main" id="{C6D28712-5209-6B43-9B89-581B6BB0C326}"/>
+              </a:ext>
+            </a:extLst>
+          </p:cNvPr>
+          <p:cNvSpPr txBox="1"/>
+          <p:nvPr/>
+        </p:nvSpPr>
+        <p:spPr>
+          <a:xfrm>
+            <a:off x="6344301" y="3630064"/>
+            <a:ext cx="1296573" cy="338554"/>
+          </a:xfrm>
+          <a:prstGeom prst="rect">
+            <a:avLst/>
+          </a:prstGeom>
+          <a:noFill/>
+          <a:ln>
+            <a:solidFill>
+              <a:schemeClr val="accent1"/>
+            </a:solidFill>
+          </a:ln>
+        </p:spPr>
+        <p:txBody>
+          <a:bodyPr wrap="none" rtlCol="0">
+            <a:spAutoFit/>
+          </a:bodyPr>
+          <a:lstStyle/>
+          <a:p>
+            <a:r>
+              <a:rPr lang="en-US" sz="1600" dirty="0" err="1"/>
+              <a:t>storeDisguise</a:t>
+            </a:r>
+            <a:endParaRPr lang="en-US" sz="1600" dirty="0"/>
+          </a:p>
+        </p:txBody>
+      </p:sp>
+      <p:sp>
+        <p:nvSpPr>
+          <p:cNvPr id="14" name="TextBox 13">
+            <a:extLst>
+              <a:ext uri="{FF2B5EF4-FFF2-40B4-BE49-F238E27FC236}">
+                <a16:creationId xmlns:a16="http://schemas.microsoft.com/office/drawing/2014/main" id="{91109AA9-7D62-7149-8655-7B0B93B4BA18}"/>
+              </a:ext>
+            </a:extLst>
+          </p:cNvPr>
+          <p:cNvSpPr txBox="1"/>
+          <p:nvPr/>
+        </p:nvSpPr>
+        <p:spPr>
+          <a:xfrm>
+            <a:off x="6335190" y="3999396"/>
+            <a:ext cx="2157450" cy="461665"/>
+          </a:xfrm>
+          <a:prstGeom prst="rect">
+            <a:avLst/>
+          </a:prstGeom>
+          <a:noFill/>
+        </p:spPr>
+        <p:txBody>
+          <a:bodyPr wrap="none" rtlCol="0">
+            <a:spAutoFit/>
+          </a:bodyPr>
+          <a:lstStyle/>
+          <a:p>
+            <a:pPr marL="171450" indent="-171450">
+              <a:buFont typeface="Arial" panose="020B0604020202020204" pitchFamily="34" charset="0"/>
+              <a:buChar char="•"/>
+            </a:pPr>
+            <a:r>
+              <a:rPr lang="en-US" sz="1200" dirty="0"/>
+              <a:t>Create new disguise contract</a:t>
+            </a:r>
+          </a:p>
+          <a:p>
+            <a:pPr marL="171450" indent="-171450">
+              <a:buFont typeface="Arial" panose="020B0604020202020204" pitchFamily="34" charset="0"/>
+              <a:buChar char="•"/>
+            </a:pPr>
+            <a:r>
+              <a:rPr lang="en-US" sz="1200" dirty="0"/>
+              <a:t>Store disguise’s options</a:t>
+            </a:r>
+          </a:p>
+        </p:txBody>
+      </p:sp>
+      <p:cxnSp>
+        <p:nvCxnSpPr>
+          <p:cNvPr id="16" name="Elbow Connector 15">
+            <a:extLst>
+              <a:ext uri="{FF2B5EF4-FFF2-40B4-BE49-F238E27FC236}">
+                <a16:creationId xmlns:a16="http://schemas.microsoft.com/office/drawing/2014/main" id="{D68CB609-5862-264E-9A09-B63C0381FC84}"/>
+              </a:ext>
+            </a:extLst>
+          </p:cNvPr>
+          <p:cNvCxnSpPr>
+            <a:cxnSpLocks/>
+            <a:stCxn id="37" idx="3"/>
+            <a:endCxn id="13" idx="1"/>
+          </p:cNvCxnSpPr>
+          <p:nvPr/>
+        </p:nvCxnSpPr>
+        <p:spPr>
+          <a:xfrm flipV="1">
+            <a:off x="5054381" y="3799341"/>
+            <a:ext cx="1289920" cy="1546410"/>
+          </a:xfrm>
+          <a:prstGeom prst="bentConnector3">
+            <a:avLst>
+              <a:gd name="adj1" fmla="val 50000"/>
+            </a:avLst>
+          </a:prstGeom>
+          <a:ln>
+            <a:tailEnd type="triangle"/>
+          </a:ln>
+        </p:spPr>
+        <p:style>
+          <a:lnRef idx="1">
+            <a:schemeClr val="accent1"/>
+          </a:lnRef>
+          <a:fillRef idx="0">
+            <a:schemeClr val="accent1"/>
+          </a:fillRef>
+          <a:effectRef idx="0">
+            <a:schemeClr val="accent1"/>
+          </a:effectRef>
+          <a:fontRef idx="minor">
+            <a:schemeClr val="tx1"/>
+          </a:fontRef>
+        </p:style>
+      </p:cxnSp>
+      <p:cxnSp>
+        <p:nvCxnSpPr>
+          <p:cNvPr id="18" name="Elbow Connector 17">
+            <a:extLst>
+              <a:ext uri="{FF2B5EF4-FFF2-40B4-BE49-F238E27FC236}">
+                <a16:creationId xmlns:a16="http://schemas.microsoft.com/office/drawing/2014/main" id="{C3C79A64-9320-F247-9FB9-A688EBFACC06}"/>
+              </a:ext>
+            </a:extLst>
+          </p:cNvPr>
+          <p:cNvCxnSpPr>
+            <a:cxnSpLocks/>
+            <a:stCxn id="35" idx="3"/>
+            <a:endCxn id="11" idx="1"/>
+          </p:cNvCxnSpPr>
+          <p:nvPr/>
+        </p:nvCxnSpPr>
+        <p:spPr>
+          <a:xfrm flipV="1">
+            <a:off x="4886435" y="2131292"/>
+            <a:ext cx="1457866" cy="2850843"/>
+          </a:xfrm>
+          <a:prstGeom prst="bentConnector3">
+            <a:avLst>
+              <a:gd name="adj1" fmla="val 50000"/>
+            </a:avLst>
+          </a:prstGeom>
+          <a:ln>
+            <a:tailEnd type="triangle"/>
+          </a:ln>
+        </p:spPr>
+        <p:style>
+          <a:lnRef idx="1">
+            <a:schemeClr val="accent1"/>
+          </a:lnRef>
+          <a:fillRef idx="0">
+            <a:schemeClr val="accent1"/>
+          </a:fillRef>
+          <a:effectRef idx="0">
+            <a:schemeClr val="accent1"/>
+          </a:effectRef>
+          <a:fontRef idx="minor">
+            <a:schemeClr val="tx1"/>
+          </a:fontRef>
+        </p:style>
+      </p:cxnSp>
+      <p:cxnSp>
+        <p:nvCxnSpPr>
+          <p:cNvPr id="21" name="Elbow Connector 20">
+            <a:extLst>
+              <a:ext uri="{FF2B5EF4-FFF2-40B4-BE49-F238E27FC236}">
+                <a16:creationId xmlns:a16="http://schemas.microsoft.com/office/drawing/2014/main" id="{9C1BDCA4-DD5D-5248-8A2E-AAE22C810104}"/>
+              </a:ext>
+            </a:extLst>
+          </p:cNvPr>
+          <p:cNvCxnSpPr>
+            <a:cxnSpLocks/>
+            <a:endCxn id="11" idx="1"/>
+          </p:cNvCxnSpPr>
+          <p:nvPr/>
+        </p:nvCxnSpPr>
+        <p:spPr>
+          <a:xfrm>
+            <a:off x="4886435" y="1977403"/>
+            <a:ext cx="1457866" cy="153889"/>
+          </a:xfrm>
+          <a:prstGeom prst="bentConnector3">
+            <a:avLst/>
+          </a:prstGeom>
+          <a:ln>
+            <a:tailEnd type="triangle"/>
+          </a:ln>
+        </p:spPr>
+        <p:style>
+          <a:lnRef idx="1">
+            <a:schemeClr val="accent1"/>
+          </a:lnRef>
+          <a:fillRef idx="0">
+            <a:schemeClr val="accent1"/>
+          </a:fillRef>
+          <a:effectRef idx="0">
+            <a:schemeClr val="accent1"/>
+          </a:effectRef>
+          <a:fontRef idx="minor">
+            <a:schemeClr val="tx1"/>
+          </a:fontRef>
+        </p:style>
+      </p:cxnSp>
+      <p:sp>
+        <p:nvSpPr>
+          <p:cNvPr id="26" name="TextBox 25">
+            <a:extLst>
+              <a:ext uri="{FF2B5EF4-FFF2-40B4-BE49-F238E27FC236}">
+                <a16:creationId xmlns:a16="http://schemas.microsoft.com/office/drawing/2014/main" id="{FCC570FD-95DA-2D43-8DCC-2B12482D37CD}"/>
+              </a:ext>
+            </a:extLst>
+          </p:cNvPr>
+          <p:cNvSpPr txBox="1"/>
+          <p:nvPr/>
+        </p:nvSpPr>
+        <p:spPr>
+          <a:xfrm>
+            <a:off x="9590630" y="3294878"/>
+            <a:ext cx="836255" cy="338554"/>
+          </a:xfrm>
+          <a:prstGeom prst="rect">
+            <a:avLst/>
+          </a:prstGeom>
+          <a:noFill/>
+          <a:ln>
+            <a:solidFill>
+              <a:schemeClr val="accent1"/>
+            </a:solidFill>
+          </a:ln>
+        </p:spPr>
+        <p:txBody>
+          <a:bodyPr wrap="none" rtlCol="0">
+            <a:spAutoFit/>
+          </a:bodyPr>
+          <a:lstStyle/>
+          <a:p>
+            <a:r>
+              <a:rPr lang="en-US" sz="1600" dirty="0" err="1"/>
+              <a:t>getData</a:t>
+            </a:r>
+            <a:endParaRPr lang="en-US" sz="1600" dirty="0"/>
+          </a:p>
+        </p:txBody>
+      </p:sp>
+      <p:sp>
+        <p:nvSpPr>
+          <p:cNvPr id="27" name="TextBox 26">
+            <a:extLst>
+              <a:ext uri="{FF2B5EF4-FFF2-40B4-BE49-F238E27FC236}">
+                <a16:creationId xmlns:a16="http://schemas.microsoft.com/office/drawing/2014/main" id="{4B17662E-32B5-104D-9481-5749CDA01B43}"/>
+              </a:ext>
+            </a:extLst>
+          </p:cNvPr>
+          <p:cNvSpPr txBox="1"/>
+          <p:nvPr/>
+        </p:nvSpPr>
+        <p:spPr>
+          <a:xfrm>
+            <a:off x="9581519" y="3664210"/>
+            <a:ext cx="2483372" cy="646331"/>
+          </a:xfrm>
+          <a:prstGeom prst="rect">
+            <a:avLst/>
+          </a:prstGeom>
+          <a:noFill/>
+        </p:spPr>
+        <p:txBody>
+          <a:bodyPr wrap="none" rtlCol="0">
+            <a:spAutoFit/>
+          </a:bodyPr>
+          <a:lstStyle/>
+          <a:p>
+            <a:pPr marL="171450" indent="-171450">
+              <a:buFont typeface="Arial" panose="020B0604020202020204" pitchFamily="34" charset="0"/>
+              <a:buChar char="•"/>
+            </a:pPr>
+            <a:r>
+              <a:rPr lang="en-US" sz="1200" dirty="0"/>
+              <a:t>Retrieve state’s random number</a:t>
+            </a:r>
+          </a:p>
+          <a:p>
+            <a:pPr marL="171450" indent="-171450">
+              <a:buFont typeface="Arial" panose="020B0604020202020204" pitchFamily="34" charset="0"/>
+              <a:buChar char="•"/>
+            </a:pPr>
+            <a:r>
+              <a:rPr lang="en-US" sz="1200" dirty="0"/>
+              <a:t>Calculate modulo of each option</a:t>
+            </a:r>
+          </a:p>
+          <a:p>
+            <a:pPr marL="171450" indent="-171450">
+              <a:buFont typeface="Arial" panose="020B0604020202020204" pitchFamily="34" charset="0"/>
+              <a:buChar char="•"/>
+            </a:pPr>
+            <a:r>
+              <a:rPr lang="en-US" sz="1200" dirty="0" err="1"/>
+              <a:t>setState</a:t>
+            </a:r>
+            <a:r>
+              <a:rPr lang="en-US" sz="1200" dirty="0"/>
+              <a:t>() with the random option</a:t>
+            </a:r>
+          </a:p>
+        </p:txBody>
+      </p:sp>
+      <p:cxnSp>
+        <p:nvCxnSpPr>
+          <p:cNvPr id="28" name="Elbow Connector 27">
+            <a:extLst>
+              <a:ext uri="{FF2B5EF4-FFF2-40B4-BE49-F238E27FC236}">
+                <a16:creationId xmlns:a16="http://schemas.microsoft.com/office/drawing/2014/main" id="{0F0E6DDD-8047-A143-948F-788E0BE325E9}"/>
+              </a:ext>
+            </a:extLst>
+          </p:cNvPr>
+          <p:cNvCxnSpPr>
+            <a:cxnSpLocks/>
+            <a:stCxn id="44" idx="3"/>
+            <a:endCxn id="26" idx="1"/>
+          </p:cNvCxnSpPr>
+          <p:nvPr/>
+        </p:nvCxnSpPr>
+        <p:spPr>
+          <a:xfrm>
+            <a:off x="8179028" y="2854576"/>
+            <a:ext cx="1411602" cy="609579"/>
+          </a:xfrm>
+          <a:prstGeom prst="bentConnector3">
+            <a:avLst/>
+          </a:prstGeom>
+          <a:ln>
+            <a:tailEnd type="triangle"/>
+          </a:ln>
+        </p:spPr>
+        <p:style>
+          <a:lnRef idx="1">
+            <a:schemeClr val="accent1"/>
+          </a:lnRef>
+          <a:fillRef idx="0">
+            <a:schemeClr val="accent1"/>
+          </a:fillRef>
+          <a:effectRef idx="0">
+            <a:schemeClr val="accent1"/>
+          </a:effectRef>
+          <a:fontRef idx="minor">
+            <a:schemeClr val="tx1"/>
+          </a:fontRef>
+        </p:style>
+      </p:cxnSp>
+      <p:cxnSp>
+        <p:nvCxnSpPr>
+          <p:cNvPr id="30" name="Elbow Connector 29">
+            <a:extLst>
+              <a:ext uri="{FF2B5EF4-FFF2-40B4-BE49-F238E27FC236}">
+                <a16:creationId xmlns:a16="http://schemas.microsoft.com/office/drawing/2014/main" id="{47570092-79B6-754F-BCFD-1A5EB892AF91}"/>
+              </a:ext>
+            </a:extLst>
+          </p:cNvPr>
+          <p:cNvCxnSpPr>
+            <a:cxnSpLocks/>
+            <a:stCxn id="26" idx="2"/>
+            <a:endCxn id="49" idx="3"/>
+          </p:cNvCxnSpPr>
+          <p:nvPr/>
+        </p:nvCxnSpPr>
+        <p:spPr>
+          <a:xfrm rot="5400000">
+            <a:off x="5929844" y="1461398"/>
+            <a:ext cx="1906881" cy="6250949"/>
+          </a:xfrm>
+          <a:prstGeom prst="bentConnector2">
+            <a:avLst/>
+          </a:prstGeom>
+          <a:ln>
+            <a:tailEnd type="triangle"/>
+          </a:ln>
+        </p:spPr>
+        <p:style>
+          <a:lnRef idx="1">
+            <a:schemeClr val="accent1"/>
+          </a:lnRef>
+          <a:fillRef idx="0">
+            <a:schemeClr val="accent1"/>
+          </a:fillRef>
+          <a:effectRef idx="0">
+            <a:schemeClr val="accent1"/>
+          </a:effectRef>
+          <a:fontRef idx="minor">
+            <a:schemeClr val="tx1"/>
+          </a:fontRef>
+        </p:style>
+      </p:cxnSp>
+      <p:sp>
+        <p:nvSpPr>
+          <p:cNvPr id="35" name="TextBox 34">
+            <a:extLst>
+              <a:ext uri="{FF2B5EF4-FFF2-40B4-BE49-F238E27FC236}">
+                <a16:creationId xmlns:a16="http://schemas.microsoft.com/office/drawing/2014/main" id="{DDCEA38D-6CC4-BB48-9AB5-487325E48A94}"/>
+              </a:ext>
+            </a:extLst>
+          </p:cNvPr>
+          <p:cNvSpPr txBox="1"/>
+          <p:nvPr/>
+        </p:nvSpPr>
+        <p:spPr>
+          <a:xfrm>
+            <a:off x="3621916" y="4797469"/>
+            <a:ext cx="1264519" cy="369332"/>
+          </a:xfrm>
+          <a:prstGeom prst="rect">
+            <a:avLst/>
+          </a:prstGeom>
+          <a:noFill/>
+        </p:spPr>
+        <p:txBody>
+          <a:bodyPr wrap="square" rtlCol="0">
+            <a:spAutoFit/>
+          </a:bodyPr>
+          <a:lstStyle/>
+          <a:p>
+            <a:r>
+              <a:rPr lang="en-LU" dirty="0"/>
+              <a:t> </a:t>
+            </a:r>
+          </a:p>
+        </p:txBody>
+      </p:sp>
+      <p:sp>
+        <p:nvSpPr>
+          <p:cNvPr id="37" name="TextBox 36">
+            <a:extLst>
+              <a:ext uri="{FF2B5EF4-FFF2-40B4-BE49-F238E27FC236}">
+                <a16:creationId xmlns:a16="http://schemas.microsoft.com/office/drawing/2014/main" id="{2FB68C6E-78D5-C744-AB64-6FFF14839D2C}"/>
+              </a:ext>
+            </a:extLst>
+          </p:cNvPr>
+          <p:cNvSpPr txBox="1"/>
+          <p:nvPr/>
+        </p:nvSpPr>
+        <p:spPr>
+          <a:xfrm>
+            <a:off x="3619131" y="5186146"/>
+            <a:ext cx="1435250" cy="369332"/>
+          </a:xfrm>
+          <a:prstGeom prst="rect">
+            <a:avLst/>
+          </a:prstGeom>
+          <a:noFill/>
+        </p:spPr>
+        <p:txBody>
+          <a:bodyPr wrap="square" rtlCol="0">
+            <a:spAutoFit/>
+          </a:bodyPr>
+          <a:lstStyle/>
+          <a:p>
+            <a:r>
+              <a:rPr lang="en-LU" dirty="0"/>
+              <a:t> </a:t>
+            </a:r>
+          </a:p>
+        </p:txBody>
+      </p:sp>
+      <p:sp>
+        <p:nvSpPr>
+          <p:cNvPr id="44" name="TextBox 43">
+            <a:extLst>
+              <a:ext uri="{FF2B5EF4-FFF2-40B4-BE49-F238E27FC236}">
+                <a16:creationId xmlns:a16="http://schemas.microsoft.com/office/drawing/2014/main" id="{F92F1B3C-C3D2-314D-B3B8-E17A9ED964BF}"/>
+              </a:ext>
+            </a:extLst>
+          </p:cNvPr>
+          <p:cNvSpPr txBox="1"/>
+          <p:nvPr/>
+        </p:nvSpPr>
+        <p:spPr>
+          <a:xfrm>
+            <a:off x="6583913" y="2669910"/>
+            <a:ext cx="1595115" cy="369332"/>
+          </a:xfrm>
+          <a:prstGeom prst="rect">
+            <a:avLst/>
+          </a:prstGeom>
+          <a:noFill/>
+        </p:spPr>
+        <p:txBody>
+          <a:bodyPr wrap="square" rtlCol="0">
+            <a:spAutoFit/>
+          </a:bodyPr>
+          <a:lstStyle/>
+          <a:p>
+            <a:r>
+              <a:rPr lang="en-LU" dirty="0"/>
+              <a:t> </a:t>
+            </a:r>
+          </a:p>
+        </p:txBody>
+      </p:sp>
+      <p:sp>
+        <p:nvSpPr>
+          <p:cNvPr id="49" name="TextBox 48">
+            <a:extLst>
+              <a:ext uri="{FF2B5EF4-FFF2-40B4-BE49-F238E27FC236}">
+                <a16:creationId xmlns:a16="http://schemas.microsoft.com/office/drawing/2014/main" id="{B4E1ECCD-E0C9-7A42-974F-50F8E3DB0E11}"/>
+              </a:ext>
+            </a:extLst>
+          </p:cNvPr>
+          <p:cNvSpPr txBox="1"/>
+          <p:nvPr/>
+        </p:nvSpPr>
+        <p:spPr>
+          <a:xfrm>
+            <a:off x="3081403" y="5355647"/>
+            <a:ext cx="676406" cy="369332"/>
+          </a:xfrm>
+          <a:prstGeom prst="rect">
+            <a:avLst/>
+          </a:prstGeom>
+          <a:noFill/>
+        </p:spPr>
+        <p:txBody>
+          <a:bodyPr wrap="square" rtlCol="0">
+            <a:spAutoFit/>
+          </a:bodyPr>
+          <a:lstStyle/>
+          <a:p>
+            <a:r>
+              <a:rPr lang="en-LU" dirty="0"/>
+              <a:t> </a:t>
+            </a:r>
+          </a:p>
+        </p:txBody>
+      </p:sp>
+      <p:cxnSp>
+        <p:nvCxnSpPr>
+          <p:cNvPr id="51" name="Elbow Connector 50">
+            <a:extLst>
+              <a:ext uri="{FF2B5EF4-FFF2-40B4-BE49-F238E27FC236}">
+                <a16:creationId xmlns:a16="http://schemas.microsoft.com/office/drawing/2014/main" id="{C1EAAFEB-89C2-4548-A6C1-9069A7BEBA9F}"/>
+              </a:ext>
+            </a:extLst>
+          </p:cNvPr>
+          <p:cNvCxnSpPr>
+            <a:cxnSpLocks/>
+            <a:stCxn id="5" idx="3"/>
+            <a:endCxn id="7" idx="1"/>
+          </p:cNvCxnSpPr>
+          <p:nvPr/>
+        </p:nvCxnSpPr>
+        <p:spPr>
+          <a:xfrm flipV="1">
+            <a:off x="1891430" y="1638849"/>
+            <a:ext cx="1006127" cy="15389"/>
+          </a:xfrm>
+          <a:prstGeom prst="bentConnector3">
+            <a:avLst/>
+          </a:prstGeom>
+          <a:ln>
+            <a:tailEnd type="triangle"/>
+          </a:ln>
+        </p:spPr>
+        <p:style>
+          <a:lnRef idx="1">
+            <a:schemeClr val="accent1"/>
+          </a:lnRef>
+          <a:fillRef idx="0">
+            <a:schemeClr val="accent1"/>
+          </a:fillRef>
+          <a:effectRef idx="0">
+            <a:schemeClr val="accent1"/>
+          </a:effectRef>
+          <a:fontRef idx="minor">
+            <a:schemeClr val="tx1"/>
+          </a:fontRef>
+        </p:style>
+      </p:cxnSp>
+    </p:spTree>
+    <p:extLst>
+      <p:ext uri="{BB962C8B-B14F-4D97-AF65-F5344CB8AC3E}">
+        <p14:creationId xmlns:p14="http://schemas.microsoft.com/office/powerpoint/2010/main" val="3914192996"/>
+      </p:ext>
+    </p:extLst>
+  </p:cSld>
+  <p:clrMapOvr>
+    <a:masterClrMapping/>
+  </p:clrMapOvr>
+</p:sld>
+</file>
+
 <file path=ppt/theme/theme1.xml><?xml version="1.0" encoding="utf-8"?>
 <a:theme xmlns:a="http://schemas.openxmlformats.org/drawingml/2006/main" name="Office Theme">
   <a:themeElements>

</xml_diff>

<commit_message>
add demo install instructions to README
</commit_message>
<xml_diff>
--- a/Pepito/Final Project Design.pptx
+++ b/Pepito/Final Project Design.pptx
@@ -3377,7 +3377,13 @@
           <a:lstStyle/>
           <a:p>
             <a:r>
-              <a:rPr lang="en-LU" dirty="0"/>
+              <a:rPr lang="en-LU" dirty="0">
+                <a:solidFill>
+                  <a:schemeClr val="bg1">
+                    <a:lumMod val="65000"/>
+                  </a:schemeClr>
+                </a:solidFill>
+              </a:rPr>
               <a:t>MetaCoin</a:t>
             </a:r>
           </a:p>
@@ -3417,7 +3423,13 @@
           <a:lstStyle/>
           <a:p>
             <a:r>
-              <a:rPr lang="en-LU" sz="1400" dirty="0"/>
+              <a:rPr lang="en-LU" sz="1400" dirty="0">
+                <a:solidFill>
+                  <a:schemeClr val="bg1">
+                    <a:lumMod val="65000"/>
+                  </a:schemeClr>
+                </a:solidFill>
+              </a:rPr>
               <a:t>owner</a:t>
             </a:r>
           </a:p>
@@ -3457,7 +3469,13 @@
           <a:lstStyle/>
           <a:p>
             <a:r>
-              <a:rPr lang="en-LU" sz="1400" dirty="0"/>
+              <a:rPr lang="en-LU" sz="1400" dirty="0">
+                <a:solidFill>
+                  <a:schemeClr val="bg1">
+                    <a:lumMod val="65000"/>
+                  </a:schemeClr>
+                </a:solidFill>
+              </a:rPr>
               <a:t>metaCoin2</a:t>
             </a:r>
           </a:p>
@@ -3497,7 +3515,13 @@
           <a:lstStyle/>
           <a:p>
             <a:r>
-              <a:rPr lang="en-LU" sz="1400" dirty="0"/>
+              <a:rPr lang="en-LU" sz="1400" dirty="0">
+                <a:solidFill>
+                  <a:schemeClr val="bg1">
+                    <a:lumMod val="65000"/>
+                  </a:schemeClr>
+                </a:solidFill>
+              </a:rPr>
               <a:t>metaCoin1</a:t>
             </a:r>
           </a:p>
@@ -3537,7 +3561,13 @@
           <a:lstStyle/>
           <a:p>
             <a:r>
-              <a:rPr lang="en-LU" sz="1400" dirty="0"/>
+              <a:rPr lang="en-LU" sz="1400" dirty="0">
+                <a:solidFill>
+                  <a:schemeClr val="bg1">
+                    <a:lumMod val="65000"/>
+                  </a:schemeClr>
+                </a:solidFill>
+              </a:rPr>
               <a:t>metaCoin3</a:t>
             </a:r>
           </a:p>
@@ -3577,7 +3607,13 @@
           <a:lstStyle/>
           <a:p>
             <a:r>
-              <a:rPr lang="en-LU" sz="1400" dirty="0"/>
+              <a:rPr lang="en-LU" sz="1400" dirty="0">
+                <a:solidFill>
+                  <a:schemeClr val="bg1">
+                    <a:lumMod val="65000"/>
+                  </a:schemeClr>
+                </a:solidFill>
+              </a:rPr>
               <a:t>MetaCoinFactory</a:t>
             </a:r>
           </a:p>
@@ -3769,7 +3805,7 @@
         <p:spPr>
           <a:xfrm>
             <a:off x="465033" y="270329"/>
-            <a:ext cx="6406306" cy="369332"/>
+            <a:ext cx="7792133" cy="369332"/>
           </a:xfrm>
           <a:prstGeom prst="rect">
             <a:avLst/>
@@ -3784,7 +3820,15 @@
           <a:p>
             <a:r>
               <a:rPr lang="en-LU" dirty="0"/>
-              <a:t>PepitoDisguise is inspired from MetaCoin but not exactly the same</a:t>
+              <a:t>Samrt contract </a:t>
+            </a:r>
+            <a:r>
+              <a:rPr lang="en-LU" i="1" dirty="0"/>
+              <a:t>PepitoDisguise</a:t>
+            </a:r>
+            <a:r>
+              <a:rPr lang="en-LU" dirty="0"/>
+              <a:t> is inspired from MetaCoin but not exactly the same</a:t>
             </a:r>
           </a:p>
         </p:txBody>
@@ -4224,11 +4268,23 @@
           <a:lstStyle/>
           <a:p>
             <a:r>
-              <a:rPr lang="en-GB" sz="1100" i="1" dirty="0"/>
+              <a:rPr lang="en-GB" sz="1100" i="1" dirty="0">
+                <a:solidFill>
+                  <a:schemeClr val="bg1">
+                    <a:lumMod val="65000"/>
+                  </a:schemeClr>
+                </a:solidFill>
+              </a:rPr>
               <a:t>m</a:t>
             </a:r>
             <a:r>
-              <a:rPr lang="en-LU" sz="1100" i="1" dirty="0"/>
+              <a:rPr lang="en-LU" sz="1100" i="1" dirty="0">
+                <a:solidFill>
+                  <a:schemeClr val="bg1">
+                    <a:lumMod val="65000"/>
+                  </a:schemeClr>
+                </a:solidFill>
+              </a:rPr>
               <a:t>sg.sender</a:t>
             </a:r>
           </a:p>
@@ -4263,14 +4319,32 @@
           <a:lstStyle/>
           <a:p>
             <a:r>
-              <a:rPr lang="fr-FR" sz="1100" i="1" dirty="0"/>
+              <a:rPr lang="fr-FR" sz="1100" i="1" dirty="0">
+                <a:solidFill>
+                  <a:schemeClr val="bg1">
+                    <a:lumMod val="65000"/>
+                  </a:schemeClr>
+                </a:solidFill>
+              </a:rPr>
               <a:t>_</a:t>
             </a:r>
             <a:r>
-              <a:rPr lang="fr-FR" sz="1100" i="1" dirty="0" err="1"/>
+              <a:rPr lang="fr-FR" sz="1100" i="1" dirty="0" err="1">
+                <a:solidFill>
+                  <a:schemeClr val="bg1">
+                    <a:lumMod val="65000"/>
+                  </a:schemeClr>
+                </a:solidFill>
+              </a:rPr>
               <a:t>owner</a:t>
             </a:r>
-            <a:endParaRPr lang="en-LU" sz="1100" i="1" dirty="0"/>
+            <a:endParaRPr lang="en-LU" sz="1100" i="1" dirty="0">
+              <a:solidFill>
+                <a:schemeClr val="bg1">
+                  <a:lumMod val="65000"/>
+                </a:schemeClr>
+              </a:solidFill>
+            </a:endParaRPr>
           </a:p>
         </p:txBody>
       </p:sp>
@@ -4303,7 +4377,13 @@
           <a:lstStyle/>
           <a:p>
             <a:r>
-              <a:rPr lang="en-LU" dirty="0"/>
+              <a:rPr lang="en-LU" dirty="0">
+                <a:solidFill>
+                  <a:schemeClr val="bg1">
+                    <a:lumMod val="65000"/>
+                  </a:schemeClr>
+                </a:solidFill>
+              </a:rPr>
               <a:t>Person-in-Need</a:t>
             </a:r>
           </a:p>
@@ -4344,7 +4424,13 @@
           <a:p>
             <a:pPr algn="ctr"/>
             <a:r>
-              <a:rPr lang="en-LU" sz="1400" dirty="0"/>
+              <a:rPr lang="en-LU" sz="1400" dirty="0">
+                <a:solidFill>
+                  <a:schemeClr val="bg1">
+                    <a:lumMod val="65000"/>
+                  </a:schemeClr>
+                </a:solidFill>
+              </a:rPr>
               <a:t>Community</a:t>
             </a:r>
           </a:p>
@@ -4384,7 +4470,13 @@
           <a:lstStyle/>
           <a:p>
             <a:r>
-              <a:rPr lang="en-LU" sz="1400" dirty="0"/>
+              <a:rPr lang="en-LU" sz="1400" dirty="0">
+                <a:solidFill>
+                  <a:schemeClr val="bg1">
+                    <a:lumMod val="65000"/>
+                  </a:schemeClr>
+                </a:solidFill>
+              </a:rPr>
               <a:t>refugee</a:t>
             </a:r>
           </a:p>
@@ -4424,7 +4516,13 @@
           <a:lstStyle/>
           <a:p>
             <a:r>
-              <a:rPr lang="en-LU" sz="1400" dirty="0"/>
+              <a:rPr lang="en-LU" sz="1400" dirty="0">
+                <a:solidFill>
+                  <a:schemeClr val="bg1">
+                    <a:lumMod val="65000"/>
+                  </a:schemeClr>
+                </a:solidFill>
+              </a:rPr>
               <a:t>farmer</a:t>
             </a:r>
           </a:p>
@@ -4464,7 +4562,13 @@
           <a:lstStyle/>
           <a:p>
             <a:r>
-              <a:rPr lang="en-LU" sz="1400" dirty="0"/>
+              <a:rPr lang="en-LU" sz="1400" dirty="0">
+                <a:solidFill>
+                  <a:schemeClr val="bg1">
+                    <a:lumMod val="65000"/>
+                  </a:schemeClr>
+                </a:solidFill>
+              </a:rPr>
               <a:t>homeless</a:t>
             </a:r>
           </a:p>
@@ -4504,7 +4608,13 @@
           <a:lstStyle/>
           <a:p>
             <a:r>
-              <a:rPr lang="en-LU" sz="1400" dirty="0"/>
+              <a:rPr lang="en-LU" sz="1400" dirty="0">
+                <a:solidFill>
+                  <a:schemeClr val="bg1">
+                    <a:lumMod val="65000"/>
+                  </a:schemeClr>
+                </a:solidFill>
+              </a:rPr>
               <a:t>PinNeedFactory</a:t>
             </a:r>
           </a:p>
@@ -4710,18 +4820,42 @@
           <a:lstStyle/>
           <a:p>
             <a:r>
-              <a:rPr lang="fr-FR" sz="1100" i="1" dirty="0" err="1"/>
+              <a:rPr lang="fr-FR" sz="1100" i="1" dirty="0" err="1">
+                <a:solidFill>
+                  <a:schemeClr val="bg1">
+                    <a:lumMod val="65000"/>
+                  </a:schemeClr>
+                </a:solidFill>
+              </a:rPr>
               <a:t>sendCoin</a:t>
             </a:r>
             <a:r>
-              <a:rPr lang="fr-FR" sz="1100" i="1" dirty="0"/>
+              <a:rPr lang="fr-FR" sz="1100" i="1" dirty="0">
+                <a:solidFill>
+                  <a:schemeClr val="bg1">
+                    <a:lumMod val="65000"/>
+                  </a:schemeClr>
+                </a:solidFill>
+              </a:rPr>
               <a:t>, </a:t>
             </a:r>
             <a:r>
-              <a:rPr lang="fr-FR" sz="1100" i="1" dirty="0" err="1"/>
+              <a:rPr lang="fr-FR" sz="1100" i="1" dirty="0" err="1">
+                <a:solidFill>
+                  <a:schemeClr val="bg1">
+                    <a:lumMod val="65000"/>
+                  </a:schemeClr>
+                </a:solidFill>
+              </a:rPr>
               <a:t>getBalance</a:t>
             </a:r>
-            <a:endParaRPr lang="en-LU" sz="1100" i="1" dirty="0"/>
+            <a:endParaRPr lang="en-LU" sz="1100" i="1" dirty="0">
+              <a:solidFill>
+                <a:schemeClr val="bg1">
+                  <a:lumMod val="65000"/>
+                </a:schemeClr>
+              </a:solidFill>
+            </a:endParaRPr>
           </a:p>
         </p:txBody>
       </p:sp>
@@ -4754,18 +4888,42 @@
           <a:lstStyle/>
           <a:p>
             <a:r>
-              <a:rPr lang="fr-FR" sz="1100" i="1" dirty="0" err="1"/>
+              <a:rPr lang="fr-FR" sz="1100" i="1" dirty="0" err="1">
+                <a:solidFill>
+                  <a:schemeClr val="bg1">
+                    <a:lumMod val="65000"/>
+                  </a:schemeClr>
+                </a:solidFill>
+              </a:rPr>
               <a:t>sendCoin</a:t>
             </a:r>
             <a:r>
-              <a:rPr lang="fr-FR" sz="1100" i="1" dirty="0"/>
+              <a:rPr lang="fr-FR" sz="1100" i="1" dirty="0">
+                <a:solidFill>
+                  <a:schemeClr val="bg1">
+                    <a:lumMod val="65000"/>
+                  </a:schemeClr>
+                </a:solidFill>
+              </a:rPr>
               <a:t>, </a:t>
             </a:r>
             <a:r>
-              <a:rPr lang="fr-FR" sz="1100" i="1" dirty="0" err="1"/>
+              <a:rPr lang="fr-FR" sz="1100" i="1" dirty="0" err="1">
+                <a:solidFill>
+                  <a:schemeClr val="bg1">
+                    <a:lumMod val="65000"/>
+                  </a:schemeClr>
+                </a:solidFill>
+              </a:rPr>
               <a:t>getBalance</a:t>
             </a:r>
-            <a:endParaRPr lang="en-LU" sz="1100" i="1" dirty="0"/>
+            <a:endParaRPr lang="en-LU" sz="1100" i="1" dirty="0">
+              <a:solidFill>
+                <a:schemeClr val="bg1">
+                  <a:lumMod val="65000"/>
+                </a:schemeClr>
+              </a:solidFill>
+            </a:endParaRPr>
           </a:p>
         </p:txBody>
       </p:sp>
@@ -4798,18 +4956,42 @@
           <a:lstStyle/>
           <a:p>
             <a:r>
-              <a:rPr lang="fr-FR" sz="1100" i="1" dirty="0" err="1"/>
+              <a:rPr lang="fr-FR" sz="1100" i="1" dirty="0" err="1">
+                <a:solidFill>
+                  <a:schemeClr val="bg1">
+                    <a:lumMod val="65000"/>
+                  </a:schemeClr>
+                </a:solidFill>
+              </a:rPr>
               <a:t>sendCoin</a:t>
             </a:r>
             <a:r>
-              <a:rPr lang="fr-FR" sz="1100" i="1" dirty="0"/>
+              <a:rPr lang="fr-FR" sz="1100" i="1" dirty="0">
+                <a:solidFill>
+                  <a:schemeClr val="bg1">
+                    <a:lumMod val="65000"/>
+                  </a:schemeClr>
+                </a:solidFill>
+              </a:rPr>
               <a:t>, </a:t>
             </a:r>
             <a:r>
-              <a:rPr lang="fr-FR" sz="1100" i="1" dirty="0" err="1"/>
+              <a:rPr lang="fr-FR" sz="1100" i="1" dirty="0" err="1">
+                <a:solidFill>
+                  <a:schemeClr val="bg1">
+                    <a:lumMod val="65000"/>
+                  </a:schemeClr>
+                </a:solidFill>
+              </a:rPr>
               <a:t>getBalance</a:t>
             </a:r>
-            <a:endParaRPr lang="en-LU" sz="1100" i="1" dirty="0"/>
+            <a:endParaRPr lang="en-LU" sz="1100" i="1" dirty="0">
+              <a:solidFill>
+                <a:schemeClr val="bg1">
+                  <a:lumMod val="65000"/>
+                </a:schemeClr>
+              </a:solidFill>
+            </a:endParaRPr>
           </a:p>
         </p:txBody>
       </p:sp>
@@ -4878,10 +5060,22 @@
           <a:lstStyle/>
           <a:p>
             <a:r>
-              <a:rPr lang="fr-FR" sz="1100" i="1" dirty="0" err="1"/>
+              <a:rPr lang="fr-FR" sz="1100" i="1" dirty="0" err="1">
+                <a:solidFill>
+                  <a:schemeClr val="bg1">
+                    <a:lumMod val="65000"/>
+                  </a:schemeClr>
+                </a:solidFill>
+              </a:rPr>
               <a:t>updateData</a:t>
             </a:r>
-            <a:endParaRPr lang="en-LU" sz="1100" i="1" dirty="0"/>
+            <a:endParaRPr lang="en-LU" sz="1100" i="1" dirty="0">
+              <a:solidFill>
+                <a:schemeClr val="bg1">
+                  <a:lumMod val="65000"/>
+                </a:schemeClr>
+              </a:solidFill>
+            </a:endParaRPr>
           </a:p>
         </p:txBody>
       </p:sp>
@@ -4919,7 +5113,13 @@
           <a:lstStyle/>
           <a:p>
             <a:r>
-              <a:rPr lang="en-LU" sz="1400" dirty="0"/>
+              <a:rPr lang="en-LU" sz="1400" dirty="0">
+                <a:solidFill>
+                  <a:schemeClr val="bg1">
+                    <a:lumMod val="65000"/>
+                  </a:schemeClr>
+                </a:solidFill>
+              </a:rPr>
               <a:t>TokenFactory</a:t>
             </a:r>
           </a:p>
@@ -5004,7 +5204,13 @@
           <a:lstStyle/>
           <a:p>
             <a:r>
-              <a:rPr lang="en-LU" sz="1400" dirty="0"/>
+              <a:rPr lang="en-LU" sz="1400" dirty="0">
+                <a:solidFill>
+                  <a:schemeClr val="bg1">
+                    <a:lumMod val="65000"/>
+                  </a:schemeClr>
+                </a:solidFill>
+              </a:rPr>
               <a:t>TokenNGO1</a:t>
             </a:r>
           </a:p>
@@ -5116,26 +5322,62 @@
           <a:lstStyle/>
           <a:p>
             <a:r>
-              <a:rPr lang="fr-FR" sz="1100" i="1" dirty="0" err="1"/>
+              <a:rPr lang="fr-FR" sz="1100" i="1" dirty="0" err="1">
+                <a:solidFill>
+                  <a:schemeClr val="bg1">
+                    <a:lumMod val="65000"/>
+                  </a:schemeClr>
+                </a:solidFill>
+              </a:rPr>
               <a:t>sendToken</a:t>
             </a:r>
             <a:r>
-              <a:rPr lang="fr-FR" sz="1100" i="1" dirty="0"/>
+              <a:rPr lang="fr-FR" sz="1100" i="1" dirty="0">
+                <a:solidFill>
+                  <a:schemeClr val="bg1">
+                    <a:lumMod val="65000"/>
+                  </a:schemeClr>
+                </a:solidFill>
+              </a:rPr>
               <a:t>, </a:t>
             </a:r>
             <a:r>
-              <a:rPr lang="fr-FR" sz="1100" i="1" dirty="0" err="1"/>
+              <a:rPr lang="fr-FR" sz="1100" i="1" dirty="0" err="1">
+                <a:solidFill>
+                  <a:schemeClr val="bg1">
+                    <a:lumMod val="65000"/>
+                  </a:schemeClr>
+                </a:solidFill>
+              </a:rPr>
               <a:t>mintToken</a:t>
             </a:r>
             <a:r>
-              <a:rPr lang="fr-FR" sz="1100" i="1" dirty="0"/>
+              <a:rPr lang="fr-FR" sz="1100" i="1" dirty="0">
+                <a:solidFill>
+                  <a:schemeClr val="bg1">
+                    <a:lumMod val="65000"/>
+                  </a:schemeClr>
+                </a:solidFill>
+              </a:rPr>
               <a:t>, </a:t>
             </a:r>
             <a:r>
-              <a:rPr lang="fr-FR" sz="1100" i="1" dirty="0" err="1"/>
+              <a:rPr lang="fr-FR" sz="1100" i="1" dirty="0" err="1">
+                <a:solidFill>
+                  <a:schemeClr val="bg1">
+                    <a:lumMod val="65000"/>
+                  </a:schemeClr>
+                </a:solidFill>
+              </a:rPr>
               <a:t>burnToken</a:t>
             </a:r>
-            <a:endParaRPr lang="en-LU" sz="1100" i="1" dirty="0"/>
+            <a:endParaRPr lang="en-LU" sz="1100" i="1" dirty="0">
+              <a:solidFill>
+                <a:schemeClr val="bg1">
+                  <a:lumMod val="65000"/>
+                </a:schemeClr>
+              </a:solidFill>
+            </a:endParaRPr>
           </a:p>
         </p:txBody>
       </p:sp>
@@ -5299,7 +5541,13 @@
           <a:p>
             <a:pPr algn="r"/>
             <a:r>
-              <a:rPr lang="en-LU" sz="1400" dirty="0"/>
+              <a:rPr lang="en-LU" sz="1400" dirty="0">
+                <a:solidFill>
+                  <a:schemeClr val="bg1">
+                    <a:lumMod val="65000"/>
+                  </a:schemeClr>
+                </a:solidFill>
+              </a:rPr>
               <a:t>HelperInstitution</a:t>
             </a:r>
           </a:p>

</xml_diff>

<commit_message>
change title color of drawings
</commit_message>
<xml_diff>
--- a/Pepito/Final Project Design.pptx
+++ b/Pepito/Final Project Design.pptx
@@ -262,7 +262,7 @@
           <a:p>
             <a:fld id="{9ECEDF27-B25B-0343-A39C-1905A44EF111}" type="datetimeFigureOut">
               <a:rPr lang="en-LU" smtClean="0"/>
-              <a:t>23/12/2020</a:t>
+              <a:t>24/12/2020</a:t>
             </a:fld>
             <a:endParaRPr lang="en-LU"/>
           </a:p>
@@ -462,7 +462,7 @@
           <a:p>
             <a:fld id="{9ECEDF27-B25B-0343-A39C-1905A44EF111}" type="datetimeFigureOut">
               <a:rPr lang="en-LU" smtClean="0"/>
-              <a:t>23/12/2020</a:t>
+              <a:t>24/12/2020</a:t>
             </a:fld>
             <a:endParaRPr lang="en-LU"/>
           </a:p>
@@ -672,7 +672,7 @@
           <a:p>
             <a:fld id="{9ECEDF27-B25B-0343-A39C-1905A44EF111}" type="datetimeFigureOut">
               <a:rPr lang="en-LU" smtClean="0"/>
-              <a:t>23/12/2020</a:t>
+              <a:t>24/12/2020</a:t>
             </a:fld>
             <a:endParaRPr lang="en-LU"/>
           </a:p>
@@ -872,7 +872,7 @@
           <a:p>
             <a:fld id="{9ECEDF27-B25B-0343-A39C-1905A44EF111}" type="datetimeFigureOut">
               <a:rPr lang="en-LU" smtClean="0"/>
-              <a:t>23/12/2020</a:t>
+              <a:t>24/12/2020</a:t>
             </a:fld>
             <a:endParaRPr lang="en-LU"/>
           </a:p>
@@ -1148,7 +1148,7 @@
           <a:p>
             <a:fld id="{9ECEDF27-B25B-0343-A39C-1905A44EF111}" type="datetimeFigureOut">
               <a:rPr lang="en-LU" smtClean="0"/>
-              <a:t>23/12/2020</a:t>
+              <a:t>24/12/2020</a:t>
             </a:fld>
             <a:endParaRPr lang="en-LU"/>
           </a:p>
@@ -1416,7 +1416,7 @@
           <a:p>
             <a:fld id="{9ECEDF27-B25B-0343-A39C-1905A44EF111}" type="datetimeFigureOut">
               <a:rPr lang="en-LU" smtClean="0"/>
-              <a:t>23/12/2020</a:t>
+              <a:t>24/12/2020</a:t>
             </a:fld>
             <a:endParaRPr lang="en-LU"/>
           </a:p>
@@ -1831,7 +1831,7 @@
           <a:p>
             <a:fld id="{9ECEDF27-B25B-0343-A39C-1905A44EF111}" type="datetimeFigureOut">
               <a:rPr lang="en-LU" smtClean="0"/>
-              <a:t>23/12/2020</a:t>
+              <a:t>24/12/2020</a:t>
             </a:fld>
             <a:endParaRPr lang="en-LU"/>
           </a:p>
@@ -1973,7 +1973,7 @@
           <a:p>
             <a:fld id="{9ECEDF27-B25B-0343-A39C-1905A44EF111}" type="datetimeFigureOut">
               <a:rPr lang="en-LU" smtClean="0"/>
-              <a:t>23/12/2020</a:t>
+              <a:t>24/12/2020</a:t>
             </a:fld>
             <a:endParaRPr lang="en-LU"/>
           </a:p>
@@ -2086,7 +2086,7 @@
           <a:p>
             <a:fld id="{9ECEDF27-B25B-0343-A39C-1905A44EF111}" type="datetimeFigureOut">
               <a:rPr lang="en-LU" smtClean="0"/>
-              <a:t>23/12/2020</a:t>
+              <a:t>24/12/2020</a:t>
             </a:fld>
             <a:endParaRPr lang="en-LU"/>
           </a:p>
@@ -2399,7 +2399,7 @@
           <a:p>
             <a:fld id="{9ECEDF27-B25B-0343-A39C-1905A44EF111}" type="datetimeFigureOut">
               <a:rPr lang="en-LU" smtClean="0"/>
-              <a:t>23/12/2020</a:t>
+              <a:t>24/12/2020</a:t>
             </a:fld>
             <a:endParaRPr lang="en-LU"/>
           </a:p>
@@ -2688,7 +2688,7 @@
           <a:p>
             <a:fld id="{9ECEDF27-B25B-0343-A39C-1905A44EF111}" type="datetimeFigureOut">
               <a:rPr lang="en-LU" smtClean="0"/>
-              <a:t>23/12/2020</a:t>
+              <a:t>24/12/2020</a:t>
             </a:fld>
             <a:endParaRPr lang="en-LU"/>
           </a:p>
@@ -2931,7 +2931,7 @@
           <a:p>
             <a:fld id="{9ECEDF27-B25B-0343-A39C-1905A44EF111}" type="datetimeFigureOut">
               <a:rPr lang="en-LU" smtClean="0"/>
-              <a:t>23/12/2020</a:t>
+              <a:t>24/12/2020</a:t>
             </a:fld>
             <a:endParaRPr lang="en-LU"/>
           </a:p>
@@ -3804,30 +3804,44 @@
         </p:nvSpPr>
         <p:spPr>
           <a:xfrm>
-            <a:off x="465033" y="270329"/>
-            <a:ext cx="7792133" cy="369332"/>
+            <a:off x="465033" y="270328"/>
+            <a:ext cx="8667372" cy="505731"/>
           </a:xfrm>
           <a:prstGeom prst="rect">
             <a:avLst/>
           </a:prstGeom>
-          <a:noFill/>
-        </p:spPr>
-        <p:txBody>
-          <a:bodyPr wrap="none" rtlCol="0">
-            <a:spAutoFit/>
+          <a:solidFill>
+            <a:srgbClr val="E1EFD8"/>
+          </a:solidFill>
+        </p:spPr>
+        <p:txBody>
+          <a:bodyPr wrap="none" rtlCol="0" anchor="ctr" anchorCtr="0">
+            <a:noAutofit/>
           </a:bodyPr>
           <a:lstStyle/>
           <a:p>
             <a:r>
-              <a:rPr lang="en-LU" dirty="0"/>
-              <a:t>Samrt contract </a:t>
-            </a:r>
-            <a:r>
-              <a:rPr lang="en-LU" i="1" dirty="0"/>
+              <a:rPr lang="en-LU" b="1" dirty="0">
+                <a:solidFill>
+                  <a:srgbClr val="980000"/>
+                </a:solidFill>
+              </a:rPr>
+              <a:t>Smart contract </a:t>
+            </a:r>
+            <a:r>
+              <a:rPr lang="en-LU" b="1" i="1" dirty="0">
+                <a:solidFill>
+                  <a:srgbClr val="980000"/>
+                </a:solidFill>
+              </a:rPr>
               <a:t>PepitoDisguise</a:t>
             </a:r>
             <a:r>
-              <a:rPr lang="en-LU" dirty="0"/>
+              <a:rPr lang="en-LU" b="1" dirty="0">
+                <a:solidFill>
+                  <a:srgbClr val="980000"/>
+                </a:solidFill>
+              </a:rPr>
               <a:t> is inspired from MetaCoin but not exactly the same</a:t>
             </a:r>
           </a:p>
@@ -5641,21 +5655,27 @@
         <p:spPr>
           <a:xfrm>
             <a:off x="620486" y="413657"/>
-            <a:ext cx="3129383" cy="369332"/>
+            <a:ext cx="3362791" cy="594250"/>
           </a:xfrm>
           <a:prstGeom prst="rect">
             <a:avLst/>
           </a:prstGeom>
-          <a:noFill/>
-        </p:spPr>
-        <p:txBody>
-          <a:bodyPr wrap="none" rtlCol="0">
-            <a:spAutoFit/>
+          <a:solidFill>
+            <a:srgbClr val="E1EFD8"/>
+          </a:solidFill>
+        </p:spPr>
+        <p:txBody>
+          <a:bodyPr wrap="none" rtlCol="0" anchor="ctr" anchorCtr="0">
+            <a:noAutofit/>
           </a:bodyPr>
           <a:lstStyle/>
           <a:p>
             <a:r>
-              <a:rPr lang="en-US" dirty="0"/>
+              <a:rPr lang="en-US" b="1" dirty="0">
+                <a:solidFill>
+                  <a:srgbClr val="980000"/>
+                </a:solidFill>
+              </a:rPr>
               <a:t>Pepito – React calling sequence</a:t>
             </a:r>
           </a:p>
@@ -6723,6 +6743,40 @@
           </a:fontRef>
         </p:style>
       </p:cxnSp>
+      <p:pic>
+        <p:nvPicPr>
+          <p:cNvPr id="25" name="Google Shape;117;p28">
+            <a:extLst>
+              <a:ext uri="{FF2B5EF4-FFF2-40B4-BE49-F238E27FC236}">
+                <a16:creationId xmlns:a16="http://schemas.microsoft.com/office/drawing/2014/main" id="{D559997F-2FAD-644C-BBAD-FBAB7FCCE89D}"/>
+              </a:ext>
+            </a:extLst>
+          </p:cNvPr>
+          <p:cNvPicPr preferRelativeResize="0"/>
+          <p:nvPr/>
+        </p:nvPicPr>
+        <p:blipFill>
+          <a:blip r:embed="rId2">
+            <a:alphaModFix/>
+          </a:blip>
+          <a:stretch>
+            <a:fillRect/>
+          </a:stretch>
+        </p:blipFill>
+        <p:spPr>
+          <a:xfrm>
+            <a:off x="10424687" y="146484"/>
+            <a:ext cx="1357940" cy="1357940"/>
+          </a:xfrm>
+          <a:prstGeom prst="rect">
+            <a:avLst/>
+          </a:prstGeom>
+          <a:noFill/>
+          <a:ln>
+            <a:noFill/>
+          </a:ln>
+        </p:spPr>
+      </p:pic>
     </p:spTree>
     <p:extLst>
       <p:ext uri="{BB962C8B-B14F-4D97-AF65-F5344CB8AC3E}">

</xml_diff>

<commit_message>
update design drawing & solidity code
</commit_message>
<xml_diff>
--- a/Pepito/Final Project Design.pptx
+++ b/Pepito/Final Project Design.pptx
@@ -262,7 +262,7 @@
           <a:p>
             <a:fld id="{9ECEDF27-B25B-0343-A39C-1905A44EF111}" type="datetimeFigureOut">
               <a:rPr lang="en-LU" smtClean="0"/>
-              <a:t>24/12/2020</a:t>
+              <a:t>25/12/2020</a:t>
             </a:fld>
             <a:endParaRPr lang="en-LU"/>
           </a:p>
@@ -462,7 +462,7 @@
           <a:p>
             <a:fld id="{9ECEDF27-B25B-0343-A39C-1905A44EF111}" type="datetimeFigureOut">
               <a:rPr lang="en-LU" smtClean="0"/>
-              <a:t>24/12/2020</a:t>
+              <a:t>25/12/2020</a:t>
             </a:fld>
             <a:endParaRPr lang="en-LU"/>
           </a:p>
@@ -672,7 +672,7 @@
           <a:p>
             <a:fld id="{9ECEDF27-B25B-0343-A39C-1905A44EF111}" type="datetimeFigureOut">
               <a:rPr lang="en-LU" smtClean="0"/>
-              <a:t>24/12/2020</a:t>
+              <a:t>25/12/2020</a:t>
             </a:fld>
             <a:endParaRPr lang="en-LU"/>
           </a:p>
@@ -872,7 +872,7 @@
           <a:p>
             <a:fld id="{9ECEDF27-B25B-0343-A39C-1905A44EF111}" type="datetimeFigureOut">
               <a:rPr lang="en-LU" smtClean="0"/>
-              <a:t>24/12/2020</a:t>
+              <a:t>25/12/2020</a:t>
             </a:fld>
             <a:endParaRPr lang="en-LU"/>
           </a:p>
@@ -1148,7 +1148,7 @@
           <a:p>
             <a:fld id="{9ECEDF27-B25B-0343-A39C-1905A44EF111}" type="datetimeFigureOut">
               <a:rPr lang="en-LU" smtClean="0"/>
-              <a:t>24/12/2020</a:t>
+              <a:t>25/12/2020</a:t>
             </a:fld>
             <a:endParaRPr lang="en-LU"/>
           </a:p>
@@ -1416,7 +1416,7 @@
           <a:p>
             <a:fld id="{9ECEDF27-B25B-0343-A39C-1905A44EF111}" type="datetimeFigureOut">
               <a:rPr lang="en-LU" smtClean="0"/>
-              <a:t>24/12/2020</a:t>
+              <a:t>25/12/2020</a:t>
             </a:fld>
             <a:endParaRPr lang="en-LU"/>
           </a:p>
@@ -1831,7 +1831,7 @@
           <a:p>
             <a:fld id="{9ECEDF27-B25B-0343-A39C-1905A44EF111}" type="datetimeFigureOut">
               <a:rPr lang="en-LU" smtClean="0"/>
-              <a:t>24/12/2020</a:t>
+              <a:t>25/12/2020</a:t>
             </a:fld>
             <a:endParaRPr lang="en-LU"/>
           </a:p>
@@ -1973,7 +1973,7 @@
           <a:p>
             <a:fld id="{9ECEDF27-B25B-0343-A39C-1905A44EF111}" type="datetimeFigureOut">
               <a:rPr lang="en-LU" smtClean="0"/>
-              <a:t>24/12/2020</a:t>
+              <a:t>25/12/2020</a:t>
             </a:fld>
             <a:endParaRPr lang="en-LU"/>
           </a:p>
@@ -2086,7 +2086,7 @@
           <a:p>
             <a:fld id="{9ECEDF27-B25B-0343-A39C-1905A44EF111}" type="datetimeFigureOut">
               <a:rPr lang="en-LU" smtClean="0"/>
-              <a:t>24/12/2020</a:t>
+              <a:t>25/12/2020</a:t>
             </a:fld>
             <a:endParaRPr lang="en-LU"/>
           </a:p>
@@ -2399,7 +2399,7 @@
           <a:p>
             <a:fld id="{9ECEDF27-B25B-0343-A39C-1905A44EF111}" type="datetimeFigureOut">
               <a:rPr lang="en-LU" smtClean="0"/>
-              <a:t>24/12/2020</a:t>
+              <a:t>25/12/2020</a:t>
             </a:fld>
             <a:endParaRPr lang="en-LU"/>
           </a:p>
@@ -2688,7 +2688,7 @@
           <a:p>
             <a:fld id="{9ECEDF27-B25B-0343-A39C-1905A44EF111}" type="datetimeFigureOut">
               <a:rPr lang="en-LU" smtClean="0"/>
-              <a:t>24/12/2020</a:t>
+              <a:t>25/12/2020</a:t>
             </a:fld>
             <a:endParaRPr lang="en-LU"/>
           </a:p>
@@ -2931,7 +2931,7 @@
           <a:p>
             <a:fld id="{9ECEDF27-B25B-0343-A39C-1905A44EF111}" type="datetimeFigureOut">
               <a:rPr lang="en-LU" smtClean="0"/>
-              <a:t>24/12/2020</a:t>
+              <a:t>25/12/2020</a:t>
             </a:fld>
             <a:endParaRPr lang="en-LU"/>
           </a:p>
@@ -3867,7 +3867,9 @@
           <a:prstGeom prst="rect">
             <a:avLst/>
           </a:prstGeom>
-          <a:noFill/>
+          <a:solidFill>
+            <a:srgbClr val="E1EFD8"/>
+          </a:solidFill>
         </p:spPr>
         <p:txBody>
           <a:bodyPr wrap="none" rtlCol="0">
@@ -3876,7 +3878,11 @@
           <a:lstStyle/>
           <a:p>
             <a:r>
-              <a:rPr lang="en-LU" dirty="0"/>
+              <a:rPr lang="en-LU" dirty="0">
+                <a:solidFill>
+                  <a:srgbClr val="980000"/>
+                </a:solidFill>
+              </a:rPr>
               <a:t>PepitoDisguise</a:t>
             </a:r>
           </a:p>
@@ -3884,10 +3890,10 @@
       </p:sp>
       <p:sp>
         <p:nvSpPr>
-          <p:cNvPr id="29" name="TextBox 28">
-            <a:extLst>
-              <a:ext uri="{FF2B5EF4-FFF2-40B4-BE49-F238E27FC236}">
-                <a16:creationId xmlns:a16="http://schemas.microsoft.com/office/drawing/2014/main" id="{54455D32-021E-0445-A80B-05F10CE295E1}"/>
+          <p:cNvPr id="30" name="TextBox 29">
+            <a:extLst>
+              <a:ext uri="{FF2B5EF4-FFF2-40B4-BE49-F238E27FC236}">
+                <a16:creationId xmlns:a16="http://schemas.microsoft.com/office/drawing/2014/main" id="{632834C3-6333-EA41-9FBB-C37CA15A51D7}"/>
               </a:ext>
             </a:extLst>
           </p:cNvPr>
@@ -3896,8 +3902,8 @@
         </p:nvSpPr>
         <p:spPr>
           <a:xfrm>
-            <a:off x="1162584" y="3248874"/>
-            <a:ext cx="653833" cy="307777"/>
+            <a:off x="6596743" y="3246355"/>
+            <a:ext cx="1354730" cy="307777"/>
           </a:xfrm>
           <a:prstGeom prst="rect">
             <a:avLst/>
@@ -3917,17 +3923,17 @@
           <a:p>
             <a:r>
               <a:rPr lang="en-LU" sz="1400" dirty="0"/>
-              <a:t>Pepito</a:t>
-            </a:r>
-          </a:p>
-        </p:txBody>
-      </p:sp>
-      <p:sp>
-        <p:nvSpPr>
-          <p:cNvPr id="30" name="TextBox 29">
-            <a:extLst>
-              <a:ext uri="{FF2B5EF4-FFF2-40B4-BE49-F238E27FC236}">
-                <a16:creationId xmlns:a16="http://schemas.microsoft.com/office/drawing/2014/main" id="{632834C3-6333-EA41-9FBB-C37CA15A51D7}"/>
+              <a:t>pepitoDisguise2</a:t>
+            </a:r>
+          </a:p>
+        </p:txBody>
+      </p:sp>
+      <p:sp>
+        <p:nvSpPr>
+          <p:cNvPr id="31" name="TextBox 30">
+            <a:extLst>
+              <a:ext uri="{FF2B5EF4-FFF2-40B4-BE49-F238E27FC236}">
+                <a16:creationId xmlns:a16="http://schemas.microsoft.com/office/drawing/2014/main" id="{6D63F4D0-64A8-534F-8878-942FE92D6F7D}"/>
               </a:ext>
             </a:extLst>
           </p:cNvPr>
@@ -3936,7 +3942,7 @@
         </p:nvSpPr>
         <p:spPr>
           <a:xfrm>
-            <a:off x="6596743" y="3246355"/>
+            <a:off x="6596743" y="2789077"/>
             <a:ext cx="1354730" cy="307777"/>
           </a:xfrm>
           <a:prstGeom prst="rect">
@@ -3957,17 +3963,17 @@
           <a:p>
             <a:r>
               <a:rPr lang="en-LU" sz="1400" dirty="0"/>
-              <a:t>pepitoDisguise2</a:t>
-            </a:r>
-          </a:p>
-        </p:txBody>
-      </p:sp>
-      <p:sp>
-        <p:nvSpPr>
-          <p:cNvPr id="31" name="TextBox 30">
-            <a:extLst>
-              <a:ext uri="{FF2B5EF4-FFF2-40B4-BE49-F238E27FC236}">
-                <a16:creationId xmlns:a16="http://schemas.microsoft.com/office/drawing/2014/main" id="{6D63F4D0-64A8-534F-8878-942FE92D6F7D}"/>
+              <a:t>pepitoDisguise1</a:t>
+            </a:r>
+          </a:p>
+        </p:txBody>
+      </p:sp>
+      <p:sp>
+        <p:nvSpPr>
+          <p:cNvPr id="32" name="TextBox 31">
+            <a:extLst>
+              <a:ext uri="{FF2B5EF4-FFF2-40B4-BE49-F238E27FC236}">
+                <a16:creationId xmlns:a16="http://schemas.microsoft.com/office/drawing/2014/main" id="{90D079DA-A320-D646-8876-FA79DC271E4D}"/>
               </a:ext>
             </a:extLst>
           </p:cNvPr>
@@ -3976,7 +3982,7 @@
         </p:nvSpPr>
         <p:spPr>
           <a:xfrm>
-            <a:off x="6596743" y="2789077"/>
+            <a:off x="6596743" y="3683271"/>
             <a:ext cx="1354730" cy="307777"/>
           </a:xfrm>
           <a:prstGeom prst="rect">
@@ -3997,17 +4003,17 @@
           <a:p>
             <a:r>
               <a:rPr lang="en-LU" sz="1400" dirty="0"/>
-              <a:t>pepitoDisguise1</a:t>
-            </a:r>
-          </a:p>
-        </p:txBody>
-      </p:sp>
-      <p:sp>
-        <p:nvSpPr>
-          <p:cNvPr id="32" name="TextBox 31">
-            <a:extLst>
-              <a:ext uri="{FF2B5EF4-FFF2-40B4-BE49-F238E27FC236}">
-                <a16:creationId xmlns:a16="http://schemas.microsoft.com/office/drawing/2014/main" id="{90D079DA-A320-D646-8876-FA79DC271E4D}"/>
+              <a:t>pepitoDisguise3</a:t>
+            </a:r>
+          </a:p>
+        </p:txBody>
+      </p:sp>
+      <p:sp>
+        <p:nvSpPr>
+          <p:cNvPr id="33" name="TextBox 32">
+            <a:extLst>
+              <a:ext uri="{FF2B5EF4-FFF2-40B4-BE49-F238E27FC236}">
+                <a16:creationId xmlns:a16="http://schemas.microsoft.com/office/drawing/2014/main" id="{DD7A79A5-16F8-264F-AA17-8FC8D44FF7F2}"/>
               </a:ext>
             </a:extLst>
           </p:cNvPr>
@@ -4016,8 +4022,8 @@
         </p:nvSpPr>
         <p:spPr>
           <a:xfrm>
-            <a:off x="6596743" y="3683271"/>
-            <a:ext cx="1354730" cy="307777"/>
+            <a:off x="3062734" y="3248873"/>
+            <a:ext cx="653833" cy="307777"/>
           </a:xfrm>
           <a:prstGeom prst="rect">
             <a:avLst/>
@@ -4037,93 +4043,11 @@
           <a:p>
             <a:r>
               <a:rPr lang="en-LU" sz="1400" dirty="0"/>
-              <a:t>pepitoDisguise3</a:t>
-            </a:r>
-          </a:p>
-        </p:txBody>
-      </p:sp>
-      <p:sp>
-        <p:nvSpPr>
-          <p:cNvPr id="33" name="TextBox 32">
-            <a:extLst>
-              <a:ext uri="{FF2B5EF4-FFF2-40B4-BE49-F238E27FC236}">
-                <a16:creationId xmlns:a16="http://schemas.microsoft.com/office/drawing/2014/main" id="{DD7A79A5-16F8-264F-AA17-8FC8D44FF7F2}"/>
-              </a:ext>
-            </a:extLst>
-          </p:cNvPr>
-          <p:cNvSpPr txBox="1"/>
-          <p:nvPr/>
-        </p:nvSpPr>
-        <p:spPr>
-          <a:xfrm>
-            <a:off x="3062734" y="3248873"/>
-            <a:ext cx="1795941" cy="307777"/>
-          </a:xfrm>
-          <a:prstGeom prst="rect">
-            <a:avLst/>
-          </a:prstGeom>
-          <a:noFill/>
-          <a:ln>
-            <a:solidFill>
-              <a:schemeClr val="accent1"/>
-            </a:solidFill>
-          </a:ln>
-        </p:spPr>
-        <p:txBody>
-          <a:bodyPr wrap="none" rtlCol="0">
-            <a:spAutoFit/>
-          </a:bodyPr>
-          <a:lstStyle/>
-          <a:p>
-            <a:r>
-              <a:rPr lang="en-LU" sz="1400" dirty="0"/>
-              <a:t>PepitoDisguiseFactory</a:t>
-            </a:r>
-          </a:p>
-        </p:txBody>
-      </p:sp>
-      <p:cxnSp>
-        <p:nvCxnSpPr>
-          <p:cNvPr id="34" name="Elbow Connector 33">
-            <a:extLst>
-              <a:ext uri="{FF2B5EF4-FFF2-40B4-BE49-F238E27FC236}">
-                <a16:creationId xmlns:a16="http://schemas.microsoft.com/office/drawing/2014/main" id="{4C4201E6-3E0E-D442-BB1D-013BECA4E68B}"/>
-              </a:ext>
-            </a:extLst>
-          </p:cNvPr>
-          <p:cNvCxnSpPr>
-            <a:stCxn id="29" idx="3"/>
-            <a:endCxn id="33" idx="1"/>
-          </p:cNvCxnSpPr>
-          <p:nvPr/>
-        </p:nvCxnSpPr>
-        <p:spPr>
-          <a:xfrm flipV="1">
-            <a:off x="1816417" y="3402762"/>
-            <a:ext cx="1246317" cy="1"/>
-          </a:xfrm>
-          <a:prstGeom prst="bentConnector3">
-            <a:avLst/>
-          </a:prstGeom>
-          <a:ln>
-            <a:tailEnd type="triangle"/>
-          </a:ln>
-        </p:spPr>
-        <p:style>
-          <a:lnRef idx="1">
-            <a:schemeClr val="accent1"/>
-          </a:lnRef>
-          <a:fillRef idx="0">
-            <a:schemeClr val="accent1"/>
-          </a:fillRef>
-          <a:effectRef idx="0">
-            <a:schemeClr val="accent1"/>
-          </a:effectRef>
-          <a:fontRef idx="minor">
-            <a:schemeClr val="tx1"/>
-          </a:fontRef>
-        </p:style>
-      </p:cxnSp>
+              <a:t>Pepito</a:t>
+            </a:r>
+          </a:p>
+        </p:txBody>
+      </p:sp>
       <p:cxnSp>
         <p:nvCxnSpPr>
           <p:cNvPr id="35" name="Elbow Connector 34">
@@ -4142,8 +4066,8 @@
         </p:nvCxnSpPr>
         <p:spPr>
           <a:xfrm flipV="1">
-            <a:off x="4858675" y="2942966"/>
-            <a:ext cx="1738068" cy="459796"/>
+            <a:off x="3716567" y="2942966"/>
+            <a:ext cx="2880176" cy="459796"/>
           </a:xfrm>
           <a:prstGeom prst="bentConnector3">
             <a:avLst/>
@@ -4185,8 +4109,8 @@
         </p:nvCxnSpPr>
         <p:spPr>
           <a:xfrm flipV="1">
-            <a:off x="4858675" y="3400244"/>
-            <a:ext cx="1738068" cy="2518"/>
+            <a:off x="3716567" y="3400244"/>
+            <a:ext cx="2880176" cy="2518"/>
           </a:xfrm>
           <a:prstGeom prst="bentConnector3">
             <a:avLst/>
@@ -4228,8 +4152,8 @@
         </p:nvCxnSpPr>
         <p:spPr>
           <a:xfrm>
-            <a:off x="4858675" y="3402762"/>
-            <a:ext cx="1738068" cy="434398"/>
+            <a:off x="3716567" y="3402762"/>
+            <a:ext cx="2880176" cy="434398"/>
           </a:xfrm>
           <a:prstGeom prst="bentConnector3">
             <a:avLst/>

</xml_diff>

<commit_message>
debugging attempt in the process flow
</commit_message>
<xml_diff>
--- a/Pepito/Final Project Design.pptx
+++ b/Pepito/Final Project Design.pptx
@@ -7,6 +7,8 @@
   <p:sldIdLst>
     <p:sldId id="256" r:id="rId2"/>
     <p:sldId id="257" r:id="rId3"/>
+    <p:sldId id="258" r:id="rId4"/>
+    <p:sldId id="259" r:id="rId5"/>
   </p:sldIdLst>
   <p:sldSz cx="12192000" cy="6858000"/>
   <p:notesSz cx="6858000" cy="9144000"/>
@@ -6714,6 +6716,2655 @@
 </p:sld>
 </file>
 
+<file path=ppt/slides/slide3.xml><?xml version="1.0" encoding="utf-8"?>
+<p:sld xmlns:a="http://schemas.openxmlformats.org/drawingml/2006/main" xmlns:r="http://schemas.openxmlformats.org/officeDocument/2006/relationships" xmlns:p="http://schemas.openxmlformats.org/presentationml/2006/main">
+  <p:cSld>
+    <p:spTree>
+      <p:nvGrpSpPr>
+        <p:cNvPr id="1" name=""/>
+        <p:cNvGrpSpPr/>
+        <p:nvPr/>
+      </p:nvGrpSpPr>
+      <p:grpSpPr>
+        <a:xfrm>
+          <a:off x="0" y="0"/>
+          <a:ext cx="0" cy="0"/>
+          <a:chOff x="0" y="0"/>
+          <a:chExt cx="0" cy="0"/>
+        </a:xfrm>
+      </p:grpSpPr>
+      <p:sp>
+        <p:nvSpPr>
+          <p:cNvPr id="4" name="TextBox 3">
+            <a:extLst>
+              <a:ext uri="{FF2B5EF4-FFF2-40B4-BE49-F238E27FC236}">
+                <a16:creationId xmlns:a16="http://schemas.microsoft.com/office/drawing/2014/main" id="{7B91D8D0-F88B-784E-8FF8-D5F07BC08546}"/>
+              </a:ext>
+            </a:extLst>
+          </p:cNvPr>
+          <p:cNvSpPr txBox="1"/>
+          <p:nvPr/>
+        </p:nvSpPr>
+        <p:spPr>
+          <a:xfrm>
+            <a:off x="620486" y="413657"/>
+            <a:ext cx="4240665" cy="594250"/>
+          </a:xfrm>
+          <a:prstGeom prst="rect">
+            <a:avLst/>
+          </a:prstGeom>
+          <a:solidFill>
+            <a:srgbClr val="E1EFD8"/>
+          </a:solidFill>
+        </p:spPr>
+        <p:txBody>
+          <a:bodyPr wrap="none" rtlCol="0" anchor="ctr" anchorCtr="0">
+            <a:noAutofit/>
+          </a:bodyPr>
+          <a:lstStyle/>
+          <a:p>
+            <a:r>
+              <a:rPr lang="en-US" b="1" dirty="0">
+                <a:solidFill>
+                  <a:srgbClr val="980000"/>
+                </a:solidFill>
+              </a:rPr>
+              <a:t>Pepito – </a:t>
+            </a:r>
+            <a:r>
+              <a:rPr lang="en-US" b="1" dirty="0" err="1">
+                <a:solidFill>
+                  <a:srgbClr val="980000"/>
+                </a:solidFill>
+              </a:rPr>
+              <a:t>App.js</a:t>
+            </a:r>
+            <a:r>
+              <a:rPr lang="en-US" b="1" dirty="0">
+                <a:solidFill>
+                  <a:srgbClr val="980000"/>
+                </a:solidFill>
+              </a:rPr>
+              <a:t> process flow (25 Dec 2020)</a:t>
+            </a:r>
+          </a:p>
+        </p:txBody>
+      </p:sp>
+      <p:sp>
+        <p:nvSpPr>
+          <p:cNvPr id="5" name="TextBox 4">
+            <a:extLst>
+              <a:ext uri="{FF2B5EF4-FFF2-40B4-BE49-F238E27FC236}">
+                <a16:creationId xmlns:a16="http://schemas.microsoft.com/office/drawing/2014/main" id="{4E7891D5-3171-C544-94BF-3D2CB24C6664}"/>
+              </a:ext>
+            </a:extLst>
+          </p:cNvPr>
+          <p:cNvSpPr txBox="1"/>
+          <p:nvPr/>
+        </p:nvSpPr>
+        <p:spPr>
+          <a:xfrm>
+            <a:off x="620486" y="1469572"/>
+            <a:ext cx="1270944" cy="369332"/>
+          </a:xfrm>
+          <a:prstGeom prst="rect">
+            <a:avLst/>
+          </a:prstGeom>
+          <a:noFill/>
+          <a:ln>
+            <a:solidFill>
+              <a:schemeClr val="accent1"/>
+            </a:solidFill>
+          </a:ln>
+        </p:spPr>
+        <p:txBody>
+          <a:bodyPr wrap="none" rtlCol="0">
+            <a:noAutofit/>
+          </a:bodyPr>
+          <a:lstStyle/>
+          <a:p>
+            <a:r>
+              <a:rPr lang="en-US" sz="1600" dirty="0"/>
+              <a:t>Mount</a:t>
+            </a:r>
+          </a:p>
+        </p:txBody>
+      </p:sp>
+      <p:sp>
+        <p:nvSpPr>
+          <p:cNvPr id="6" name="TextBox 5">
+            <a:extLst>
+              <a:ext uri="{FF2B5EF4-FFF2-40B4-BE49-F238E27FC236}">
+                <a16:creationId xmlns:a16="http://schemas.microsoft.com/office/drawing/2014/main" id="{A5D02A08-6485-3747-9743-8A8FF3F1AFD8}"/>
+              </a:ext>
+            </a:extLst>
+          </p:cNvPr>
+          <p:cNvSpPr txBox="1"/>
+          <p:nvPr/>
+        </p:nvSpPr>
+        <p:spPr>
+          <a:xfrm>
+            <a:off x="611375" y="1838904"/>
+            <a:ext cx="744114" cy="276999"/>
+          </a:xfrm>
+          <a:prstGeom prst="rect">
+            <a:avLst/>
+          </a:prstGeom>
+          <a:noFill/>
+        </p:spPr>
+        <p:txBody>
+          <a:bodyPr wrap="none" rtlCol="0">
+            <a:spAutoFit/>
+          </a:bodyPr>
+          <a:lstStyle/>
+          <a:p>
+            <a:pPr marL="171450" indent="-171450">
+              <a:buFont typeface="Arial" panose="020B0604020202020204" pitchFamily="34" charset="0"/>
+              <a:buChar char="•"/>
+            </a:pPr>
+            <a:r>
+              <a:rPr lang="en-US" sz="1200" dirty="0" err="1"/>
+              <a:t>App.js</a:t>
+            </a:r>
+            <a:endParaRPr lang="en-US" sz="1200" dirty="0"/>
+          </a:p>
+        </p:txBody>
+      </p:sp>
+      <p:sp>
+        <p:nvSpPr>
+          <p:cNvPr id="7" name="TextBox 6">
+            <a:extLst>
+              <a:ext uri="{FF2B5EF4-FFF2-40B4-BE49-F238E27FC236}">
+                <a16:creationId xmlns:a16="http://schemas.microsoft.com/office/drawing/2014/main" id="{71B0BC68-98F1-374B-B0A6-7F80DAAB776D}"/>
+              </a:ext>
+            </a:extLst>
+          </p:cNvPr>
+          <p:cNvSpPr txBox="1"/>
+          <p:nvPr/>
+        </p:nvSpPr>
+        <p:spPr>
+          <a:xfrm>
+            <a:off x="2897557" y="2111830"/>
+            <a:ext cx="1988878" cy="338554"/>
+          </a:xfrm>
+          <a:prstGeom prst="rect">
+            <a:avLst/>
+          </a:prstGeom>
+          <a:noFill/>
+          <a:ln>
+            <a:solidFill>
+              <a:schemeClr val="accent1"/>
+            </a:solidFill>
+          </a:ln>
+        </p:spPr>
+        <p:txBody>
+          <a:bodyPr wrap="none" rtlCol="0">
+            <a:spAutoFit/>
+          </a:bodyPr>
+          <a:lstStyle/>
+          <a:p>
+            <a:r>
+              <a:rPr lang="en-US" sz="1600" dirty="0" err="1"/>
+              <a:t>componentDidMount</a:t>
+            </a:r>
+            <a:endParaRPr lang="en-US" sz="1600" dirty="0"/>
+          </a:p>
+        </p:txBody>
+      </p:sp>
+      <p:sp>
+        <p:nvSpPr>
+          <p:cNvPr id="8" name="TextBox 7">
+            <a:extLst>
+              <a:ext uri="{FF2B5EF4-FFF2-40B4-BE49-F238E27FC236}">
+                <a16:creationId xmlns:a16="http://schemas.microsoft.com/office/drawing/2014/main" id="{BFDA071E-ACD1-CC46-AC6B-D3109A9288AC}"/>
+              </a:ext>
+            </a:extLst>
+          </p:cNvPr>
+          <p:cNvSpPr txBox="1"/>
+          <p:nvPr/>
+        </p:nvSpPr>
+        <p:spPr>
+          <a:xfrm>
+            <a:off x="2899332" y="2456110"/>
+            <a:ext cx="1961819" cy="461665"/>
+          </a:xfrm>
+          <a:prstGeom prst="rect">
+            <a:avLst/>
+          </a:prstGeom>
+          <a:noFill/>
+        </p:spPr>
+        <p:txBody>
+          <a:bodyPr wrap="none" rtlCol="0">
+            <a:spAutoFit/>
+          </a:bodyPr>
+          <a:lstStyle/>
+          <a:p>
+            <a:pPr marL="171450" indent="-171450">
+              <a:buFont typeface="Arial" panose="020B0604020202020204" pitchFamily="34" charset="0"/>
+              <a:buChar char="•"/>
+            </a:pPr>
+            <a:r>
+              <a:rPr lang="en-US" sz="1200" dirty="0" err="1"/>
+              <a:t>requestRandomNumber</a:t>
+            </a:r>
+            <a:r>
+              <a:rPr lang="en-US" sz="1200" dirty="0"/>
+              <a:t>()</a:t>
+            </a:r>
+          </a:p>
+          <a:p>
+            <a:pPr marL="171450" indent="-171450">
+              <a:buFont typeface="Arial" panose="020B0604020202020204" pitchFamily="34" charset="0"/>
+              <a:buChar char="•"/>
+            </a:pPr>
+            <a:r>
+              <a:rPr lang="en-US" sz="1200" dirty="0"/>
+              <a:t>getWeb3()</a:t>
+            </a:r>
+          </a:p>
+        </p:txBody>
+      </p:sp>
+      <p:sp>
+        <p:nvSpPr>
+          <p:cNvPr id="9" name="TextBox 8">
+            <a:extLst>
+              <a:ext uri="{FF2B5EF4-FFF2-40B4-BE49-F238E27FC236}">
+                <a16:creationId xmlns:a16="http://schemas.microsoft.com/office/drawing/2014/main" id="{A648BA86-9C0C-0846-A8F7-877203CF605C}"/>
+              </a:ext>
+            </a:extLst>
+          </p:cNvPr>
+          <p:cNvSpPr txBox="1"/>
+          <p:nvPr/>
+        </p:nvSpPr>
+        <p:spPr>
+          <a:xfrm>
+            <a:off x="2897557" y="3441613"/>
+            <a:ext cx="1270944" cy="369332"/>
+          </a:xfrm>
+          <a:prstGeom prst="rect">
+            <a:avLst/>
+          </a:prstGeom>
+          <a:noFill/>
+          <a:ln>
+            <a:solidFill>
+              <a:schemeClr val="accent1"/>
+            </a:solidFill>
+          </a:ln>
+        </p:spPr>
+        <p:txBody>
+          <a:bodyPr wrap="none" rtlCol="0">
+            <a:noAutofit/>
+          </a:bodyPr>
+          <a:lstStyle/>
+          <a:p>
+            <a:r>
+              <a:rPr lang="en-US" sz="1600" dirty="0"/>
+              <a:t>render</a:t>
+            </a:r>
+          </a:p>
+        </p:txBody>
+      </p:sp>
+      <p:sp>
+        <p:nvSpPr>
+          <p:cNvPr id="10" name="TextBox 9">
+            <a:extLst>
+              <a:ext uri="{FF2B5EF4-FFF2-40B4-BE49-F238E27FC236}">
+                <a16:creationId xmlns:a16="http://schemas.microsoft.com/office/drawing/2014/main" id="{9975F9DA-160B-2D4B-9A04-56DEA224E101}"/>
+              </a:ext>
+            </a:extLst>
+          </p:cNvPr>
+          <p:cNvSpPr txBox="1"/>
+          <p:nvPr/>
+        </p:nvSpPr>
+        <p:spPr>
+          <a:xfrm>
+            <a:off x="2888446" y="3810945"/>
+            <a:ext cx="2074863" cy="1384995"/>
+          </a:xfrm>
+          <a:prstGeom prst="rect">
+            <a:avLst/>
+          </a:prstGeom>
+          <a:noFill/>
+        </p:spPr>
+        <p:txBody>
+          <a:bodyPr wrap="none" rtlCol="0">
+            <a:spAutoFit/>
+          </a:bodyPr>
+          <a:lstStyle/>
+          <a:p>
+            <a:pPr marL="171450" indent="-171450">
+              <a:buFont typeface="Arial" panose="020B0604020202020204" pitchFamily="34" charset="0"/>
+              <a:buChar char="•"/>
+            </a:pPr>
+            <a:r>
+              <a:rPr lang="en-US" sz="1200" dirty="0"/>
+              <a:t>Don’t wait for web3 to load</a:t>
+            </a:r>
+          </a:p>
+          <a:p>
+            <a:pPr marL="171450" indent="-171450">
+              <a:buFont typeface="Arial" panose="020B0604020202020204" pitchFamily="34" charset="0"/>
+              <a:buChar char="•"/>
+            </a:pPr>
+            <a:r>
+              <a:rPr lang="en-US" sz="1200" dirty="0"/>
+              <a:t>Display Header</a:t>
+            </a:r>
+          </a:p>
+          <a:p>
+            <a:pPr marL="171450" indent="-171450">
+              <a:buFont typeface="Arial" panose="020B0604020202020204" pitchFamily="34" charset="0"/>
+              <a:buChar char="•"/>
+            </a:pPr>
+            <a:r>
+              <a:rPr lang="en-US" sz="1200" dirty="0"/>
+              <a:t>Button “generate disguise”</a:t>
+            </a:r>
+          </a:p>
+          <a:p>
+            <a:pPr marL="171450" indent="-171450">
+              <a:buFont typeface="Arial" panose="020B0604020202020204" pitchFamily="34" charset="0"/>
+              <a:buChar char="•"/>
+            </a:pPr>
+            <a:r>
+              <a:rPr lang="en-US" sz="1200" dirty="0"/>
+              <a:t>Logo Machu Picchu</a:t>
+            </a:r>
+          </a:p>
+          <a:p>
+            <a:pPr marL="171450" indent="-171450">
+              <a:buFont typeface="Arial" panose="020B0604020202020204" pitchFamily="34" charset="0"/>
+              <a:buChar char="•"/>
+            </a:pPr>
+            <a:r>
+              <a:rPr lang="en-US" sz="1200" dirty="0"/>
+              <a:t>Button “store disguise”</a:t>
+            </a:r>
+          </a:p>
+          <a:p>
+            <a:pPr marL="171450" indent="-171450">
+              <a:buFont typeface="Arial" panose="020B0604020202020204" pitchFamily="34" charset="0"/>
+              <a:buChar char="•"/>
+            </a:pPr>
+            <a:r>
+              <a:rPr lang="en-US" sz="1200" dirty="0"/>
+              <a:t>Display avatar</a:t>
+            </a:r>
+          </a:p>
+          <a:p>
+            <a:pPr marL="171450" indent="-171450">
+              <a:buFont typeface="Arial" panose="020B0604020202020204" pitchFamily="34" charset="0"/>
+              <a:buChar char="•"/>
+            </a:pPr>
+            <a:r>
+              <a:rPr lang="en-US" sz="1200" dirty="0"/>
+              <a:t>Display table of options</a:t>
+            </a:r>
+          </a:p>
+        </p:txBody>
+      </p:sp>
+      <p:cxnSp>
+        <p:nvCxnSpPr>
+          <p:cNvPr id="16" name="Elbow Connector 15">
+            <a:extLst>
+              <a:ext uri="{FF2B5EF4-FFF2-40B4-BE49-F238E27FC236}">
+                <a16:creationId xmlns:a16="http://schemas.microsoft.com/office/drawing/2014/main" id="{D68CB609-5862-264E-9A09-B63C0381FC84}"/>
+              </a:ext>
+            </a:extLst>
+          </p:cNvPr>
+          <p:cNvCxnSpPr>
+            <a:cxnSpLocks/>
+            <a:stCxn id="37" idx="3"/>
+            <a:endCxn id="52" idx="1"/>
+          </p:cNvCxnSpPr>
+          <p:nvPr/>
+        </p:nvCxnSpPr>
+        <p:spPr>
+          <a:xfrm>
+            <a:off x="4571995" y="4665444"/>
+            <a:ext cx="1438832" cy="466605"/>
+          </a:xfrm>
+          <a:prstGeom prst="bentConnector3">
+            <a:avLst>
+              <a:gd name="adj1" fmla="val 50000"/>
+            </a:avLst>
+          </a:prstGeom>
+          <a:ln>
+            <a:tailEnd type="triangle"/>
+          </a:ln>
+        </p:spPr>
+        <p:style>
+          <a:lnRef idx="1">
+            <a:schemeClr val="accent1"/>
+          </a:lnRef>
+          <a:fillRef idx="0">
+            <a:schemeClr val="accent1"/>
+          </a:fillRef>
+          <a:effectRef idx="0">
+            <a:schemeClr val="accent1"/>
+          </a:effectRef>
+          <a:fontRef idx="minor">
+            <a:schemeClr val="tx1"/>
+          </a:fontRef>
+        </p:style>
+      </p:cxnSp>
+      <p:cxnSp>
+        <p:nvCxnSpPr>
+          <p:cNvPr id="18" name="Elbow Connector 17">
+            <a:extLst>
+              <a:ext uri="{FF2B5EF4-FFF2-40B4-BE49-F238E27FC236}">
+                <a16:creationId xmlns:a16="http://schemas.microsoft.com/office/drawing/2014/main" id="{C3C79A64-9320-F247-9FB9-A688EBFACC06}"/>
+              </a:ext>
+            </a:extLst>
+          </p:cNvPr>
+          <p:cNvCxnSpPr>
+            <a:cxnSpLocks/>
+            <a:stCxn id="35" idx="3"/>
+            <a:endCxn id="40" idx="1"/>
+          </p:cNvCxnSpPr>
+          <p:nvPr/>
+        </p:nvCxnSpPr>
+        <p:spPr>
+          <a:xfrm flipV="1">
+            <a:off x="4886435" y="3144229"/>
+            <a:ext cx="1124393" cy="1170566"/>
+          </a:xfrm>
+          <a:prstGeom prst="bentConnector3">
+            <a:avLst>
+              <a:gd name="adj1" fmla="val 50000"/>
+            </a:avLst>
+          </a:prstGeom>
+          <a:ln>
+            <a:tailEnd type="triangle"/>
+          </a:ln>
+        </p:spPr>
+        <p:style>
+          <a:lnRef idx="1">
+            <a:schemeClr val="accent1"/>
+          </a:lnRef>
+          <a:fillRef idx="0">
+            <a:schemeClr val="accent1"/>
+          </a:fillRef>
+          <a:effectRef idx="0">
+            <a:schemeClr val="accent1"/>
+          </a:effectRef>
+          <a:fontRef idx="minor">
+            <a:schemeClr val="tx1"/>
+          </a:fontRef>
+        </p:style>
+      </p:cxnSp>
+      <p:cxnSp>
+        <p:nvCxnSpPr>
+          <p:cNvPr id="21" name="Elbow Connector 20">
+            <a:extLst>
+              <a:ext uri="{FF2B5EF4-FFF2-40B4-BE49-F238E27FC236}">
+                <a16:creationId xmlns:a16="http://schemas.microsoft.com/office/drawing/2014/main" id="{9C1BDCA4-DD5D-5248-8A2E-AAE22C810104}"/>
+              </a:ext>
+            </a:extLst>
+          </p:cNvPr>
+          <p:cNvCxnSpPr>
+            <a:cxnSpLocks/>
+            <a:stCxn id="32" idx="3"/>
+            <a:endCxn id="33" idx="1"/>
+          </p:cNvCxnSpPr>
+          <p:nvPr/>
+        </p:nvCxnSpPr>
+        <p:spPr>
+          <a:xfrm flipV="1">
+            <a:off x="4082142" y="2280017"/>
+            <a:ext cx="1928685" cy="515284"/>
+          </a:xfrm>
+          <a:prstGeom prst="bentConnector3">
+            <a:avLst/>
+          </a:prstGeom>
+          <a:ln>
+            <a:tailEnd type="triangle"/>
+          </a:ln>
+        </p:spPr>
+        <p:style>
+          <a:lnRef idx="1">
+            <a:schemeClr val="accent1"/>
+          </a:lnRef>
+          <a:fillRef idx="0">
+            <a:schemeClr val="accent1"/>
+          </a:fillRef>
+          <a:effectRef idx="0">
+            <a:schemeClr val="accent1"/>
+          </a:effectRef>
+          <a:fontRef idx="minor">
+            <a:schemeClr val="tx1"/>
+          </a:fontRef>
+        </p:style>
+      </p:cxnSp>
+      <p:cxnSp>
+        <p:nvCxnSpPr>
+          <p:cNvPr id="30" name="Elbow Connector 29">
+            <a:extLst>
+              <a:ext uri="{FF2B5EF4-FFF2-40B4-BE49-F238E27FC236}">
+                <a16:creationId xmlns:a16="http://schemas.microsoft.com/office/drawing/2014/main" id="{47570092-79B6-754F-BCFD-1A5EB892AF91}"/>
+              </a:ext>
+            </a:extLst>
+          </p:cNvPr>
+          <p:cNvCxnSpPr>
+            <a:cxnSpLocks/>
+            <a:stCxn id="40" idx="2"/>
+            <a:endCxn id="49" idx="3"/>
+          </p:cNvCxnSpPr>
+          <p:nvPr/>
+        </p:nvCxnSpPr>
+        <p:spPr>
+          <a:xfrm rot="5400000">
+            <a:off x="4847059" y="2539943"/>
+            <a:ext cx="1548579" cy="3095705"/>
+          </a:xfrm>
+          <a:prstGeom prst="bentConnector2">
+            <a:avLst/>
+          </a:prstGeom>
+          <a:ln>
+            <a:tailEnd type="triangle"/>
+          </a:ln>
+        </p:spPr>
+        <p:style>
+          <a:lnRef idx="1">
+            <a:schemeClr val="accent1"/>
+          </a:lnRef>
+          <a:fillRef idx="0">
+            <a:schemeClr val="accent1"/>
+          </a:fillRef>
+          <a:effectRef idx="0">
+            <a:schemeClr val="accent1"/>
+          </a:effectRef>
+          <a:fontRef idx="minor">
+            <a:schemeClr val="tx1"/>
+          </a:fontRef>
+        </p:style>
+      </p:cxnSp>
+      <p:sp>
+        <p:nvSpPr>
+          <p:cNvPr id="35" name="TextBox 34">
+            <a:extLst>
+              <a:ext uri="{FF2B5EF4-FFF2-40B4-BE49-F238E27FC236}">
+                <a16:creationId xmlns:a16="http://schemas.microsoft.com/office/drawing/2014/main" id="{DDCEA38D-6CC4-BB48-9AB5-487325E48A94}"/>
+              </a:ext>
+            </a:extLst>
+          </p:cNvPr>
+          <p:cNvSpPr txBox="1"/>
+          <p:nvPr/>
+        </p:nvSpPr>
+        <p:spPr>
+          <a:xfrm>
+            <a:off x="3621916" y="4172660"/>
+            <a:ext cx="1264519" cy="284269"/>
+          </a:xfrm>
+          <a:prstGeom prst="rect">
+            <a:avLst/>
+          </a:prstGeom>
+          <a:noFill/>
+        </p:spPr>
+        <p:txBody>
+          <a:bodyPr wrap="square" tIns="3600" bIns="3600" rtlCol="0">
+            <a:spAutoFit/>
+          </a:bodyPr>
+          <a:lstStyle/>
+          <a:p>
+            <a:r>
+              <a:rPr lang="en-LU" dirty="0"/>
+              <a:t> </a:t>
+            </a:r>
+          </a:p>
+        </p:txBody>
+      </p:sp>
+      <p:sp>
+        <p:nvSpPr>
+          <p:cNvPr id="37" name="TextBox 36">
+            <a:extLst>
+              <a:ext uri="{FF2B5EF4-FFF2-40B4-BE49-F238E27FC236}">
+                <a16:creationId xmlns:a16="http://schemas.microsoft.com/office/drawing/2014/main" id="{2FB68C6E-78D5-C744-AB64-6FFF14839D2C}"/>
+              </a:ext>
+            </a:extLst>
+          </p:cNvPr>
+          <p:cNvSpPr txBox="1"/>
+          <p:nvPr/>
+        </p:nvSpPr>
+        <p:spPr>
+          <a:xfrm>
+            <a:off x="3434069" y="4523309"/>
+            <a:ext cx="1137926" cy="284269"/>
+          </a:xfrm>
+          <a:prstGeom prst="rect">
+            <a:avLst/>
+          </a:prstGeom>
+          <a:noFill/>
+        </p:spPr>
+        <p:txBody>
+          <a:bodyPr wrap="square" tIns="3600" bIns="3600" rtlCol="0">
+            <a:spAutoFit/>
+          </a:bodyPr>
+          <a:lstStyle/>
+          <a:p>
+            <a:r>
+              <a:rPr lang="en-LU" dirty="0"/>
+              <a:t> </a:t>
+            </a:r>
+          </a:p>
+        </p:txBody>
+      </p:sp>
+      <p:sp>
+        <p:nvSpPr>
+          <p:cNvPr id="49" name="TextBox 48">
+            <a:extLst>
+              <a:ext uri="{FF2B5EF4-FFF2-40B4-BE49-F238E27FC236}">
+                <a16:creationId xmlns:a16="http://schemas.microsoft.com/office/drawing/2014/main" id="{B4E1ECCD-E0C9-7A42-974F-50F8E3DB0E11}"/>
+              </a:ext>
+            </a:extLst>
+          </p:cNvPr>
+          <p:cNvSpPr txBox="1"/>
+          <p:nvPr/>
+        </p:nvSpPr>
+        <p:spPr>
+          <a:xfrm>
+            <a:off x="3397089" y="4719950"/>
+            <a:ext cx="676406" cy="284269"/>
+          </a:xfrm>
+          <a:prstGeom prst="rect">
+            <a:avLst/>
+          </a:prstGeom>
+          <a:noFill/>
+        </p:spPr>
+        <p:txBody>
+          <a:bodyPr wrap="square" tIns="3600" bIns="3600" rtlCol="0">
+            <a:spAutoFit/>
+          </a:bodyPr>
+          <a:lstStyle/>
+          <a:p>
+            <a:r>
+              <a:rPr lang="en-LU" dirty="0"/>
+              <a:t> </a:t>
+            </a:r>
+          </a:p>
+        </p:txBody>
+      </p:sp>
+      <p:cxnSp>
+        <p:nvCxnSpPr>
+          <p:cNvPr id="51" name="Elbow Connector 50">
+            <a:extLst>
+              <a:ext uri="{FF2B5EF4-FFF2-40B4-BE49-F238E27FC236}">
+                <a16:creationId xmlns:a16="http://schemas.microsoft.com/office/drawing/2014/main" id="{C1EAAFEB-89C2-4548-A6C1-9069A7BEBA9F}"/>
+              </a:ext>
+            </a:extLst>
+          </p:cNvPr>
+          <p:cNvCxnSpPr>
+            <a:cxnSpLocks/>
+            <a:stCxn id="5" idx="3"/>
+            <a:endCxn id="7" idx="1"/>
+          </p:cNvCxnSpPr>
+          <p:nvPr/>
+        </p:nvCxnSpPr>
+        <p:spPr>
+          <a:xfrm>
+            <a:off x="1891430" y="1654238"/>
+            <a:ext cx="1006127" cy="626869"/>
+          </a:xfrm>
+          <a:prstGeom prst="bentConnector3">
+            <a:avLst/>
+          </a:prstGeom>
+          <a:ln>
+            <a:tailEnd type="triangle"/>
+          </a:ln>
+        </p:spPr>
+        <p:style>
+          <a:lnRef idx="1">
+            <a:schemeClr val="accent1"/>
+          </a:lnRef>
+          <a:fillRef idx="0">
+            <a:schemeClr val="accent1"/>
+          </a:fillRef>
+          <a:effectRef idx="0">
+            <a:schemeClr val="accent1"/>
+          </a:effectRef>
+          <a:fontRef idx="minor">
+            <a:schemeClr val="tx1"/>
+          </a:fontRef>
+        </p:style>
+      </p:cxnSp>
+      <p:pic>
+        <p:nvPicPr>
+          <p:cNvPr id="25" name="Google Shape;117;p28">
+            <a:extLst>
+              <a:ext uri="{FF2B5EF4-FFF2-40B4-BE49-F238E27FC236}">
+                <a16:creationId xmlns:a16="http://schemas.microsoft.com/office/drawing/2014/main" id="{D559997F-2FAD-644C-BBAD-FBAB7FCCE89D}"/>
+              </a:ext>
+            </a:extLst>
+          </p:cNvPr>
+          <p:cNvPicPr preferRelativeResize="0"/>
+          <p:nvPr/>
+        </p:nvPicPr>
+        <p:blipFill>
+          <a:blip r:embed="rId2">
+            <a:alphaModFix/>
+          </a:blip>
+          <a:stretch>
+            <a:fillRect/>
+          </a:stretch>
+        </p:blipFill>
+        <p:spPr>
+          <a:xfrm>
+            <a:off x="10424687" y="146484"/>
+            <a:ext cx="1357940" cy="1357940"/>
+          </a:xfrm>
+          <a:prstGeom prst="rect">
+            <a:avLst/>
+          </a:prstGeom>
+          <a:noFill/>
+          <a:ln>
+            <a:noFill/>
+          </a:ln>
+        </p:spPr>
+      </p:pic>
+      <p:sp>
+        <p:nvSpPr>
+          <p:cNvPr id="29" name="TextBox 28">
+            <a:extLst>
+              <a:ext uri="{FF2B5EF4-FFF2-40B4-BE49-F238E27FC236}">
+                <a16:creationId xmlns:a16="http://schemas.microsoft.com/office/drawing/2014/main" id="{74F9D4BB-9216-DA47-8F83-EEE989CF08E6}"/>
+              </a:ext>
+            </a:extLst>
+          </p:cNvPr>
+          <p:cNvSpPr txBox="1"/>
+          <p:nvPr/>
+        </p:nvSpPr>
+        <p:spPr>
+          <a:xfrm>
+            <a:off x="2904938" y="1483186"/>
+            <a:ext cx="1270944" cy="369332"/>
+          </a:xfrm>
+          <a:prstGeom prst="rect">
+            <a:avLst/>
+          </a:prstGeom>
+          <a:noFill/>
+          <a:ln>
+            <a:solidFill>
+              <a:schemeClr val="accent1"/>
+            </a:solidFill>
+          </a:ln>
+        </p:spPr>
+        <p:txBody>
+          <a:bodyPr wrap="none" rtlCol="0">
+            <a:noAutofit/>
+          </a:bodyPr>
+          <a:lstStyle/>
+          <a:p>
+            <a:r>
+              <a:rPr lang="en-US" sz="1600" dirty="0"/>
+              <a:t>constructor</a:t>
+            </a:r>
+          </a:p>
+        </p:txBody>
+      </p:sp>
+      <p:cxnSp>
+        <p:nvCxnSpPr>
+          <p:cNvPr id="31" name="Elbow Connector 30">
+            <a:extLst>
+              <a:ext uri="{FF2B5EF4-FFF2-40B4-BE49-F238E27FC236}">
+                <a16:creationId xmlns:a16="http://schemas.microsoft.com/office/drawing/2014/main" id="{FD649514-9874-5C4E-A6EF-4C4C4D5DA46B}"/>
+              </a:ext>
+            </a:extLst>
+          </p:cNvPr>
+          <p:cNvCxnSpPr>
+            <a:cxnSpLocks/>
+            <a:stCxn id="5" idx="3"/>
+            <a:endCxn id="29" idx="1"/>
+          </p:cNvCxnSpPr>
+          <p:nvPr/>
+        </p:nvCxnSpPr>
+        <p:spPr>
+          <a:xfrm>
+            <a:off x="1891430" y="1654238"/>
+            <a:ext cx="1013508" cy="13614"/>
+          </a:xfrm>
+          <a:prstGeom prst="bentConnector3">
+            <a:avLst/>
+          </a:prstGeom>
+          <a:ln>
+            <a:tailEnd type="triangle"/>
+          </a:ln>
+        </p:spPr>
+        <p:style>
+          <a:lnRef idx="1">
+            <a:schemeClr val="accent1"/>
+          </a:lnRef>
+          <a:fillRef idx="0">
+            <a:schemeClr val="accent1"/>
+          </a:fillRef>
+          <a:effectRef idx="0">
+            <a:schemeClr val="accent1"/>
+          </a:effectRef>
+          <a:fontRef idx="minor">
+            <a:schemeClr val="tx1"/>
+          </a:fontRef>
+        </p:style>
+      </p:cxnSp>
+      <p:sp>
+        <p:nvSpPr>
+          <p:cNvPr id="32" name="TextBox 31">
+            <a:extLst>
+              <a:ext uri="{FF2B5EF4-FFF2-40B4-BE49-F238E27FC236}">
+                <a16:creationId xmlns:a16="http://schemas.microsoft.com/office/drawing/2014/main" id="{62EAC1FC-8303-C54A-B316-9BDA6F13CB13}"/>
+              </a:ext>
+            </a:extLst>
+          </p:cNvPr>
+          <p:cNvSpPr txBox="1"/>
+          <p:nvPr/>
+        </p:nvSpPr>
+        <p:spPr>
+          <a:xfrm>
+            <a:off x="3526971" y="2653166"/>
+            <a:ext cx="555171" cy="284269"/>
+          </a:xfrm>
+          <a:prstGeom prst="rect">
+            <a:avLst/>
+          </a:prstGeom>
+          <a:noFill/>
+        </p:spPr>
+        <p:txBody>
+          <a:bodyPr wrap="square" tIns="3600" bIns="3600" rtlCol="0">
+            <a:spAutoFit/>
+          </a:bodyPr>
+          <a:lstStyle/>
+          <a:p>
+            <a:r>
+              <a:rPr lang="en-LU" dirty="0"/>
+              <a:t> </a:t>
+            </a:r>
+          </a:p>
+        </p:txBody>
+      </p:sp>
+      <p:sp>
+        <p:nvSpPr>
+          <p:cNvPr id="33" name="TextBox 32">
+            <a:extLst>
+              <a:ext uri="{FF2B5EF4-FFF2-40B4-BE49-F238E27FC236}">
+                <a16:creationId xmlns:a16="http://schemas.microsoft.com/office/drawing/2014/main" id="{42C5EC1E-E0B3-0E46-ADBF-93AA2485BCFA}"/>
+              </a:ext>
+            </a:extLst>
+          </p:cNvPr>
+          <p:cNvSpPr txBox="1"/>
+          <p:nvPr/>
+        </p:nvSpPr>
+        <p:spPr>
+          <a:xfrm>
+            <a:off x="6010827" y="2110740"/>
+            <a:ext cx="2806601" cy="338554"/>
+          </a:xfrm>
+          <a:prstGeom prst="rect">
+            <a:avLst/>
+          </a:prstGeom>
+          <a:noFill/>
+          <a:ln>
+            <a:solidFill>
+              <a:schemeClr val="accent1"/>
+            </a:solidFill>
+          </a:ln>
+        </p:spPr>
+        <p:txBody>
+          <a:bodyPr wrap="none" rtlCol="0">
+            <a:noAutofit/>
+          </a:bodyPr>
+          <a:lstStyle/>
+          <a:p>
+            <a:r>
+              <a:rPr lang="en-US" sz="1400" dirty="0" err="1"/>
+              <a:t>EventListener</a:t>
+            </a:r>
+            <a:r>
+              <a:rPr lang="en-US" sz="1400" dirty="0"/>
+              <a:t> “load” from Metamask</a:t>
+            </a:r>
+          </a:p>
+        </p:txBody>
+      </p:sp>
+      <p:sp>
+        <p:nvSpPr>
+          <p:cNvPr id="40" name="TextBox 39">
+            <a:extLst>
+              <a:ext uri="{FF2B5EF4-FFF2-40B4-BE49-F238E27FC236}">
+                <a16:creationId xmlns:a16="http://schemas.microsoft.com/office/drawing/2014/main" id="{C33ED113-D713-4043-8DDA-50D5D976B307}"/>
+              </a:ext>
+            </a:extLst>
+          </p:cNvPr>
+          <p:cNvSpPr txBox="1"/>
+          <p:nvPr/>
+        </p:nvSpPr>
+        <p:spPr>
+          <a:xfrm>
+            <a:off x="6010828" y="2974952"/>
+            <a:ext cx="2316744" cy="338554"/>
+          </a:xfrm>
+          <a:prstGeom prst="rect">
+            <a:avLst/>
+          </a:prstGeom>
+          <a:noFill/>
+          <a:ln>
+            <a:solidFill>
+              <a:schemeClr val="accent1"/>
+            </a:solidFill>
+          </a:ln>
+        </p:spPr>
+        <p:txBody>
+          <a:bodyPr wrap="none" rtlCol="0">
+            <a:noAutofit/>
+          </a:bodyPr>
+          <a:lstStyle/>
+          <a:p>
+            <a:r>
+              <a:rPr lang="en-US" sz="1400" dirty="0"/>
+              <a:t>Generate random disguise</a:t>
+            </a:r>
+          </a:p>
+        </p:txBody>
+      </p:sp>
+      <p:sp>
+        <p:nvSpPr>
+          <p:cNvPr id="41" name="TextBox 40">
+            <a:extLst>
+              <a:ext uri="{FF2B5EF4-FFF2-40B4-BE49-F238E27FC236}">
+                <a16:creationId xmlns:a16="http://schemas.microsoft.com/office/drawing/2014/main" id="{4691C9EE-678D-9848-9449-641CFBC808DF}"/>
+              </a:ext>
+            </a:extLst>
+          </p:cNvPr>
+          <p:cNvSpPr txBox="1"/>
+          <p:nvPr/>
+        </p:nvSpPr>
+        <p:spPr>
+          <a:xfrm>
+            <a:off x="4310743" y="2419645"/>
+            <a:ext cx="555171" cy="369332"/>
+          </a:xfrm>
+          <a:prstGeom prst="rect">
+            <a:avLst/>
+          </a:prstGeom>
+          <a:noFill/>
+        </p:spPr>
+        <p:txBody>
+          <a:bodyPr wrap="square" rtlCol="0">
+            <a:spAutoFit/>
+          </a:bodyPr>
+          <a:lstStyle/>
+          <a:p>
+            <a:r>
+              <a:rPr lang="en-LU" dirty="0"/>
+              <a:t> </a:t>
+            </a:r>
+          </a:p>
+        </p:txBody>
+      </p:sp>
+      <p:cxnSp>
+        <p:nvCxnSpPr>
+          <p:cNvPr id="42" name="Elbow Connector 41">
+            <a:extLst>
+              <a:ext uri="{FF2B5EF4-FFF2-40B4-BE49-F238E27FC236}">
+                <a16:creationId xmlns:a16="http://schemas.microsoft.com/office/drawing/2014/main" id="{78DE0365-6BBA-4F46-A337-02674D3E8C46}"/>
+              </a:ext>
+            </a:extLst>
+          </p:cNvPr>
+          <p:cNvCxnSpPr>
+            <a:cxnSpLocks/>
+            <a:stCxn id="41" idx="3"/>
+            <a:endCxn id="40" idx="1"/>
+          </p:cNvCxnSpPr>
+          <p:nvPr/>
+        </p:nvCxnSpPr>
+        <p:spPr>
+          <a:xfrm>
+            <a:off x="4865914" y="2604311"/>
+            <a:ext cx="1144914" cy="539918"/>
+          </a:xfrm>
+          <a:prstGeom prst="bentConnector3">
+            <a:avLst/>
+          </a:prstGeom>
+          <a:ln>
+            <a:tailEnd type="triangle"/>
+          </a:ln>
+        </p:spPr>
+        <p:style>
+          <a:lnRef idx="1">
+            <a:schemeClr val="accent1"/>
+          </a:lnRef>
+          <a:fillRef idx="0">
+            <a:schemeClr val="accent1"/>
+          </a:fillRef>
+          <a:effectRef idx="0">
+            <a:schemeClr val="accent1"/>
+          </a:effectRef>
+          <a:fontRef idx="minor">
+            <a:schemeClr val="tx1"/>
+          </a:fontRef>
+        </p:style>
+      </p:cxnSp>
+      <p:sp>
+        <p:nvSpPr>
+          <p:cNvPr id="46" name="TextBox 45">
+            <a:extLst>
+              <a:ext uri="{FF2B5EF4-FFF2-40B4-BE49-F238E27FC236}">
+                <a16:creationId xmlns:a16="http://schemas.microsoft.com/office/drawing/2014/main" id="{B6D0CCCA-93F8-4447-A797-265F4BC9AA65}"/>
+              </a:ext>
+            </a:extLst>
+          </p:cNvPr>
+          <p:cNvSpPr txBox="1"/>
+          <p:nvPr/>
+        </p:nvSpPr>
+        <p:spPr>
+          <a:xfrm>
+            <a:off x="8821160" y="2107756"/>
+            <a:ext cx="2574872" cy="646331"/>
+          </a:xfrm>
+          <a:prstGeom prst="rect">
+            <a:avLst/>
+          </a:prstGeom>
+          <a:noFill/>
+        </p:spPr>
+        <p:txBody>
+          <a:bodyPr wrap="none" rtlCol="0">
+            <a:spAutoFit/>
+          </a:bodyPr>
+          <a:lstStyle/>
+          <a:p>
+            <a:pPr marL="171450" indent="-171450">
+              <a:buFont typeface="Arial" panose="020B0604020202020204" pitchFamily="34" charset="0"/>
+              <a:buChar char="•"/>
+            </a:pPr>
+            <a:r>
+              <a:rPr lang="en-US" sz="1200" dirty="0"/>
+              <a:t>Query web3 list of user accounts</a:t>
+            </a:r>
+          </a:p>
+          <a:p>
+            <a:pPr marL="171450" indent="-171450">
+              <a:buFont typeface="Arial" panose="020B0604020202020204" pitchFamily="34" charset="0"/>
+              <a:buChar char="•"/>
+            </a:pPr>
+            <a:r>
+              <a:rPr lang="en-US" sz="1200" dirty="0"/>
+              <a:t>Deploy Pepito</a:t>
+            </a:r>
+          </a:p>
+          <a:p>
+            <a:pPr marL="171450" indent="-171450">
+              <a:buFont typeface="Arial" panose="020B0604020202020204" pitchFamily="34" charset="0"/>
+              <a:buChar char="•"/>
+            </a:pPr>
+            <a:r>
+              <a:rPr lang="en-US" sz="1200" dirty="0" err="1"/>
+              <a:t>setState</a:t>
+            </a:r>
+            <a:r>
+              <a:rPr lang="en-US" sz="1200" dirty="0"/>
+              <a:t>() without running anything</a:t>
+            </a:r>
+          </a:p>
+        </p:txBody>
+      </p:sp>
+      <p:cxnSp>
+        <p:nvCxnSpPr>
+          <p:cNvPr id="48" name="Elbow Connector 47">
+            <a:extLst>
+              <a:ext uri="{FF2B5EF4-FFF2-40B4-BE49-F238E27FC236}">
+                <a16:creationId xmlns:a16="http://schemas.microsoft.com/office/drawing/2014/main" id="{E0DD562C-239D-804B-8DDD-532731A4DC40}"/>
+              </a:ext>
+            </a:extLst>
+          </p:cNvPr>
+          <p:cNvCxnSpPr>
+            <a:cxnSpLocks/>
+            <a:stCxn id="5" idx="3"/>
+            <a:endCxn id="9" idx="1"/>
+          </p:cNvCxnSpPr>
+          <p:nvPr/>
+        </p:nvCxnSpPr>
+        <p:spPr>
+          <a:xfrm>
+            <a:off x="1891430" y="1654238"/>
+            <a:ext cx="1006127" cy="1972041"/>
+          </a:xfrm>
+          <a:prstGeom prst="bentConnector3">
+            <a:avLst>
+              <a:gd name="adj1" fmla="val 50000"/>
+            </a:avLst>
+          </a:prstGeom>
+          <a:ln>
+            <a:tailEnd type="triangle"/>
+          </a:ln>
+        </p:spPr>
+        <p:style>
+          <a:lnRef idx="1">
+            <a:schemeClr val="accent1"/>
+          </a:lnRef>
+          <a:fillRef idx="0">
+            <a:schemeClr val="accent1"/>
+          </a:fillRef>
+          <a:effectRef idx="0">
+            <a:schemeClr val="accent1"/>
+          </a:effectRef>
+          <a:fontRef idx="minor">
+            <a:schemeClr val="tx1"/>
+          </a:fontRef>
+        </p:style>
+      </p:cxnSp>
+      <p:sp>
+        <p:nvSpPr>
+          <p:cNvPr id="52" name="TextBox 51">
+            <a:extLst>
+              <a:ext uri="{FF2B5EF4-FFF2-40B4-BE49-F238E27FC236}">
+                <a16:creationId xmlns:a16="http://schemas.microsoft.com/office/drawing/2014/main" id="{5DA72290-B5BE-3A4E-8F41-B3EECCC92F4D}"/>
+              </a:ext>
+            </a:extLst>
+          </p:cNvPr>
+          <p:cNvSpPr txBox="1"/>
+          <p:nvPr/>
+        </p:nvSpPr>
+        <p:spPr>
+          <a:xfrm>
+            <a:off x="6010827" y="4962772"/>
+            <a:ext cx="2316744" cy="338554"/>
+          </a:xfrm>
+          <a:prstGeom prst="rect">
+            <a:avLst/>
+          </a:prstGeom>
+          <a:noFill/>
+          <a:ln>
+            <a:solidFill>
+              <a:schemeClr val="accent1"/>
+            </a:solidFill>
+          </a:ln>
+        </p:spPr>
+        <p:txBody>
+          <a:bodyPr wrap="none" rtlCol="0">
+            <a:noAutofit/>
+          </a:bodyPr>
+          <a:lstStyle/>
+          <a:p>
+            <a:r>
+              <a:rPr lang="en-US" sz="1400" dirty="0"/>
+              <a:t>Store disguise on blockchain</a:t>
+            </a:r>
+          </a:p>
+        </p:txBody>
+      </p:sp>
+      <p:sp>
+        <p:nvSpPr>
+          <p:cNvPr id="54" name="TextBox 53">
+            <a:extLst>
+              <a:ext uri="{FF2B5EF4-FFF2-40B4-BE49-F238E27FC236}">
+                <a16:creationId xmlns:a16="http://schemas.microsoft.com/office/drawing/2014/main" id="{8727D4B7-7E92-4A40-9510-B968BF9F2E3C}"/>
+              </a:ext>
+            </a:extLst>
+          </p:cNvPr>
+          <p:cNvSpPr txBox="1"/>
+          <p:nvPr/>
+        </p:nvSpPr>
+        <p:spPr>
+          <a:xfrm>
+            <a:off x="8327571" y="5037630"/>
+            <a:ext cx="3708964" cy="646331"/>
+          </a:xfrm>
+          <a:prstGeom prst="rect">
+            <a:avLst/>
+          </a:prstGeom>
+          <a:noFill/>
+        </p:spPr>
+        <p:txBody>
+          <a:bodyPr wrap="none" rtlCol="0">
+            <a:spAutoFit/>
+          </a:bodyPr>
+          <a:lstStyle/>
+          <a:p>
+            <a:pPr marL="171450" indent="-171450">
+              <a:buFont typeface="Arial" panose="020B0604020202020204" pitchFamily="34" charset="0"/>
+              <a:buChar char="•"/>
+            </a:pPr>
+            <a:r>
+              <a:rPr lang="en-US" sz="1200" dirty="0"/>
+              <a:t>Retrieve web3 from state </a:t>
+            </a:r>
+            <a:r>
+              <a:rPr lang="en-US" sz="1200" dirty="0">
+                <a:solidFill>
+                  <a:srgbClr val="FF0000"/>
+                </a:solidFill>
+              </a:rPr>
+              <a:t>(1.crash if web3 not set)</a:t>
+            </a:r>
+          </a:p>
+          <a:p>
+            <a:pPr marL="171450" indent="-171450">
+              <a:buFont typeface="Arial" panose="020B0604020202020204" pitchFamily="34" charset="0"/>
+              <a:buChar char="•"/>
+            </a:pPr>
+            <a:r>
+              <a:rPr lang="en-US" sz="1200" dirty="0"/>
+              <a:t>Call </a:t>
+            </a:r>
+            <a:r>
+              <a:rPr lang="en-US" sz="1200" dirty="0" err="1"/>
+              <a:t>createPepitoDisguise</a:t>
+            </a:r>
+            <a:endParaRPr lang="en-US" sz="1200" dirty="0"/>
+          </a:p>
+          <a:p>
+            <a:pPr marL="171450" indent="-171450">
+              <a:buFont typeface="Arial" panose="020B0604020202020204" pitchFamily="34" charset="0"/>
+              <a:buChar char="•"/>
+            </a:pPr>
+            <a:r>
+              <a:rPr lang="en-US" sz="1200" dirty="0"/>
+              <a:t>Store options in blockchain </a:t>
+            </a:r>
+            <a:r>
+              <a:rPr lang="en-US" sz="1200" dirty="0">
+                <a:solidFill>
+                  <a:srgbClr val="FF0000"/>
+                </a:solidFill>
+              </a:rPr>
+              <a:t>(3. crash function </a:t>
+            </a:r>
+            <a:r>
+              <a:rPr lang="en-US" sz="1200" dirty="0" err="1">
+                <a:solidFill>
+                  <a:srgbClr val="FF0000"/>
+                </a:solidFill>
+              </a:rPr>
+              <a:t>unkown</a:t>
+            </a:r>
+            <a:r>
+              <a:rPr lang="en-US" sz="1200" dirty="0">
+                <a:solidFill>
+                  <a:srgbClr val="FF0000"/>
+                </a:solidFill>
+              </a:rPr>
+              <a:t>)</a:t>
+            </a:r>
+            <a:endParaRPr lang="en-US" sz="1200" dirty="0"/>
+          </a:p>
+        </p:txBody>
+      </p:sp>
+      <p:sp>
+        <p:nvSpPr>
+          <p:cNvPr id="56" name="TextBox 55">
+            <a:extLst>
+              <a:ext uri="{FF2B5EF4-FFF2-40B4-BE49-F238E27FC236}">
+                <a16:creationId xmlns:a16="http://schemas.microsoft.com/office/drawing/2014/main" id="{B5CB411E-9384-F44D-A28C-854BCE0E8D08}"/>
+              </a:ext>
+            </a:extLst>
+          </p:cNvPr>
+          <p:cNvSpPr txBox="1"/>
+          <p:nvPr/>
+        </p:nvSpPr>
+        <p:spPr>
+          <a:xfrm>
+            <a:off x="4376058" y="2584783"/>
+            <a:ext cx="2515689" cy="276999"/>
+          </a:xfrm>
+          <a:prstGeom prst="rect">
+            <a:avLst/>
+          </a:prstGeom>
+          <a:noFill/>
+        </p:spPr>
+        <p:txBody>
+          <a:bodyPr wrap="none" rtlCol="0">
+            <a:spAutoFit/>
+          </a:bodyPr>
+          <a:lstStyle/>
+          <a:p>
+            <a:r>
+              <a:rPr lang="en-US" sz="1200" dirty="0">
+                <a:solidFill>
+                  <a:srgbClr val="FF0000"/>
+                </a:solidFill>
+              </a:rPr>
+              <a:t>2. generate a disguise at each reload</a:t>
+            </a:r>
+            <a:endParaRPr lang="en-US" sz="1200" dirty="0"/>
+          </a:p>
+        </p:txBody>
+      </p:sp>
+    </p:spTree>
+    <p:extLst>
+      <p:ext uri="{BB962C8B-B14F-4D97-AF65-F5344CB8AC3E}">
+        <p14:creationId xmlns:p14="http://schemas.microsoft.com/office/powerpoint/2010/main" val="2616972242"/>
+      </p:ext>
+    </p:extLst>
+  </p:cSld>
+  <p:clrMapOvr>
+    <a:masterClrMapping/>
+  </p:clrMapOvr>
+</p:sld>
+</file>
+
+<file path=ppt/slides/slide4.xml><?xml version="1.0" encoding="utf-8"?>
+<p:sld xmlns:a="http://schemas.openxmlformats.org/drawingml/2006/main" xmlns:r="http://schemas.openxmlformats.org/officeDocument/2006/relationships" xmlns:p="http://schemas.openxmlformats.org/presentationml/2006/main">
+  <p:cSld>
+    <p:spTree>
+      <p:nvGrpSpPr>
+        <p:cNvPr id="1" name=""/>
+        <p:cNvGrpSpPr/>
+        <p:nvPr/>
+      </p:nvGrpSpPr>
+      <p:grpSpPr>
+        <a:xfrm>
+          <a:off x="0" y="0"/>
+          <a:ext cx="0" cy="0"/>
+          <a:chOff x="0" y="0"/>
+          <a:chExt cx="0" cy="0"/>
+        </a:xfrm>
+      </p:grpSpPr>
+      <p:sp>
+        <p:nvSpPr>
+          <p:cNvPr id="4" name="TextBox 3">
+            <a:extLst>
+              <a:ext uri="{FF2B5EF4-FFF2-40B4-BE49-F238E27FC236}">
+                <a16:creationId xmlns:a16="http://schemas.microsoft.com/office/drawing/2014/main" id="{7B91D8D0-F88B-784E-8FF8-D5F07BC08546}"/>
+              </a:ext>
+            </a:extLst>
+          </p:cNvPr>
+          <p:cNvSpPr txBox="1"/>
+          <p:nvPr/>
+        </p:nvSpPr>
+        <p:spPr>
+          <a:xfrm>
+            <a:off x="620486" y="413657"/>
+            <a:ext cx="4240665" cy="594250"/>
+          </a:xfrm>
+          <a:prstGeom prst="rect">
+            <a:avLst/>
+          </a:prstGeom>
+          <a:solidFill>
+            <a:srgbClr val="E1EFD8"/>
+          </a:solidFill>
+        </p:spPr>
+        <p:txBody>
+          <a:bodyPr wrap="none" rtlCol="0" anchor="ctr" anchorCtr="0">
+            <a:noAutofit/>
+          </a:bodyPr>
+          <a:lstStyle/>
+          <a:p>
+            <a:r>
+              <a:rPr lang="en-US" b="1" dirty="0">
+                <a:solidFill>
+                  <a:srgbClr val="980000"/>
+                </a:solidFill>
+              </a:rPr>
+              <a:t>Pepito – </a:t>
+            </a:r>
+            <a:r>
+              <a:rPr lang="en-US" b="1" dirty="0" err="1">
+                <a:solidFill>
+                  <a:srgbClr val="980000"/>
+                </a:solidFill>
+              </a:rPr>
+              <a:t>App.js</a:t>
+            </a:r>
+            <a:r>
+              <a:rPr lang="en-US" b="1" dirty="0">
+                <a:solidFill>
+                  <a:srgbClr val="980000"/>
+                </a:solidFill>
+              </a:rPr>
+              <a:t> process flow (re-design 1)</a:t>
+            </a:r>
+          </a:p>
+        </p:txBody>
+      </p:sp>
+      <p:sp>
+        <p:nvSpPr>
+          <p:cNvPr id="5" name="TextBox 4">
+            <a:extLst>
+              <a:ext uri="{FF2B5EF4-FFF2-40B4-BE49-F238E27FC236}">
+                <a16:creationId xmlns:a16="http://schemas.microsoft.com/office/drawing/2014/main" id="{4E7891D5-3171-C544-94BF-3D2CB24C6664}"/>
+              </a:ext>
+            </a:extLst>
+          </p:cNvPr>
+          <p:cNvSpPr txBox="1"/>
+          <p:nvPr/>
+        </p:nvSpPr>
+        <p:spPr>
+          <a:xfrm>
+            <a:off x="620486" y="1469572"/>
+            <a:ext cx="1270944" cy="369332"/>
+          </a:xfrm>
+          <a:prstGeom prst="rect">
+            <a:avLst/>
+          </a:prstGeom>
+          <a:noFill/>
+          <a:ln>
+            <a:solidFill>
+              <a:schemeClr val="accent1"/>
+            </a:solidFill>
+          </a:ln>
+        </p:spPr>
+        <p:txBody>
+          <a:bodyPr wrap="none" rtlCol="0">
+            <a:noAutofit/>
+          </a:bodyPr>
+          <a:lstStyle/>
+          <a:p>
+            <a:r>
+              <a:rPr lang="en-US" sz="1600" dirty="0"/>
+              <a:t>Mount</a:t>
+            </a:r>
+          </a:p>
+        </p:txBody>
+      </p:sp>
+      <p:sp>
+        <p:nvSpPr>
+          <p:cNvPr id="6" name="TextBox 5">
+            <a:extLst>
+              <a:ext uri="{FF2B5EF4-FFF2-40B4-BE49-F238E27FC236}">
+                <a16:creationId xmlns:a16="http://schemas.microsoft.com/office/drawing/2014/main" id="{A5D02A08-6485-3747-9743-8A8FF3F1AFD8}"/>
+              </a:ext>
+            </a:extLst>
+          </p:cNvPr>
+          <p:cNvSpPr txBox="1"/>
+          <p:nvPr/>
+        </p:nvSpPr>
+        <p:spPr>
+          <a:xfrm>
+            <a:off x="611375" y="1838904"/>
+            <a:ext cx="744114" cy="276999"/>
+          </a:xfrm>
+          <a:prstGeom prst="rect">
+            <a:avLst/>
+          </a:prstGeom>
+          <a:noFill/>
+        </p:spPr>
+        <p:txBody>
+          <a:bodyPr wrap="none" rtlCol="0">
+            <a:spAutoFit/>
+          </a:bodyPr>
+          <a:lstStyle/>
+          <a:p>
+            <a:pPr marL="171450" indent="-171450">
+              <a:buFont typeface="Arial" panose="020B0604020202020204" pitchFamily="34" charset="0"/>
+              <a:buChar char="•"/>
+            </a:pPr>
+            <a:r>
+              <a:rPr lang="en-US" sz="1200" dirty="0" err="1"/>
+              <a:t>App.js</a:t>
+            </a:r>
+            <a:endParaRPr lang="en-US" sz="1200" dirty="0"/>
+          </a:p>
+        </p:txBody>
+      </p:sp>
+      <p:sp>
+        <p:nvSpPr>
+          <p:cNvPr id="7" name="TextBox 6">
+            <a:extLst>
+              <a:ext uri="{FF2B5EF4-FFF2-40B4-BE49-F238E27FC236}">
+                <a16:creationId xmlns:a16="http://schemas.microsoft.com/office/drawing/2014/main" id="{71B0BC68-98F1-374B-B0A6-7F80DAAB776D}"/>
+              </a:ext>
+            </a:extLst>
+          </p:cNvPr>
+          <p:cNvSpPr txBox="1"/>
+          <p:nvPr/>
+        </p:nvSpPr>
+        <p:spPr>
+          <a:xfrm>
+            <a:off x="2897557" y="2699660"/>
+            <a:ext cx="1988878" cy="338554"/>
+          </a:xfrm>
+          <a:prstGeom prst="rect">
+            <a:avLst/>
+          </a:prstGeom>
+          <a:noFill/>
+          <a:ln>
+            <a:solidFill>
+              <a:schemeClr val="accent1"/>
+            </a:solidFill>
+          </a:ln>
+        </p:spPr>
+        <p:txBody>
+          <a:bodyPr wrap="none" rtlCol="0">
+            <a:spAutoFit/>
+          </a:bodyPr>
+          <a:lstStyle/>
+          <a:p>
+            <a:r>
+              <a:rPr lang="en-US" sz="1600" dirty="0" err="1"/>
+              <a:t>componentDidMount</a:t>
+            </a:r>
+            <a:endParaRPr lang="en-US" sz="1600" dirty="0"/>
+          </a:p>
+        </p:txBody>
+      </p:sp>
+      <p:sp>
+        <p:nvSpPr>
+          <p:cNvPr id="8" name="TextBox 7">
+            <a:extLst>
+              <a:ext uri="{FF2B5EF4-FFF2-40B4-BE49-F238E27FC236}">
+                <a16:creationId xmlns:a16="http://schemas.microsoft.com/office/drawing/2014/main" id="{BFDA071E-ACD1-CC46-AC6B-D3109A9288AC}"/>
+              </a:ext>
+            </a:extLst>
+          </p:cNvPr>
+          <p:cNvSpPr txBox="1"/>
+          <p:nvPr/>
+        </p:nvSpPr>
+        <p:spPr>
+          <a:xfrm>
+            <a:off x="2899332" y="3043940"/>
+            <a:ext cx="1015278" cy="276999"/>
+          </a:xfrm>
+          <a:prstGeom prst="rect">
+            <a:avLst/>
+          </a:prstGeom>
+          <a:noFill/>
+        </p:spPr>
+        <p:txBody>
+          <a:bodyPr wrap="none" rtlCol="0">
+            <a:spAutoFit/>
+          </a:bodyPr>
+          <a:lstStyle/>
+          <a:p>
+            <a:pPr marL="171450" indent="-171450">
+              <a:buFont typeface="Arial" panose="020B0604020202020204" pitchFamily="34" charset="0"/>
+              <a:buChar char="•"/>
+            </a:pPr>
+            <a:r>
+              <a:rPr lang="en-US" sz="1200" dirty="0"/>
+              <a:t>getWeb3()</a:t>
+            </a:r>
+          </a:p>
+        </p:txBody>
+      </p:sp>
+      <p:sp>
+        <p:nvSpPr>
+          <p:cNvPr id="9" name="TextBox 8">
+            <a:extLst>
+              <a:ext uri="{FF2B5EF4-FFF2-40B4-BE49-F238E27FC236}">
+                <a16:creationId xmlns:a16="http://schemas.microsoft.com/office/drawing/2014/main" id="{A648BA86-9C0C-0846-A8F7-877203CF605C}"/>
+              </a:ext>
+            </a:extLst>
+          </p:cNvPr>
+          <p:cNvSpPr txBox="1"/>
+          <p:nvPr/>
+        </p:nvSpPr>
+        <p:spPr>
+          <a:xfrm>
+            <a:off x="2897557" y="4029443"/>
+            <a:ext cx="1270944" cy="369332"/>
+          </a:xfrm>
+          <a:prstGeom prst="rect">
+            <a:avLst/>
+          </a:prstGeom>
+          <a:noFill/>
+          <a:ln>
+            <a:solidFill>
+              <a:schemeClr val="accent1"/>
+            </a:solidFill>
+          </a:ln>
+        </p:spPr>
+        <p:txBody>
+          <a:bodyPr wrap="none" rtlCol="0">
+            <a:noAutofit/>
+          </a:bodyPr>
+          <a:lstStyle/>
+          <a:p>
+            <a:r>
+              <a:rPr lang="en-US" sz="1600" dirty="0"/>
+              <a:t>render</a:t>
+            </a:r>
+          </a:p>
+        </p:txBody>
+      </p:sp>
+      <p:sp>
+        <p:nvSpPr>
+          <p:cNvPr id="10" name="TextBox 9">
+            <a:extLst>
+              <a:ext uri="{FF2B5EF4-FFF2-40B4-BE49-F238E27FC236}">
+                <a16:creationId xmlns:a16="http://schemas.microsoft.com/office/drawing/2014/main" id="{9975F9DA-160B-2D4B-9A04-56DEA224E101}"/>
+              </a:ext>
+            </a:extLst>
+          </p:cNvPr>
+          <p:cNvSpPr txBox="1"/>
+          <p:nvPr/>
+        </p:nvSpPr>
+        <p:spPr>
+          <a:xfrm>
+            <a:off x="2888446" y="4398775"/>
+            <a:ext cx="2074863" cy="1384995"/>
+          </a:xfrm>
+          <a:prstGeom prst="rect">
+            <a:avLst/>
+          </a:prstGeom>
+          <a:noFill/>
+        </p:spPr>
+        <p:txBody>
+          <a:bodyPr wrap="none" rtlCol="0">
+            <a:spAutoFit/>
+          </a:bodyPr>
+          <a:lstStyle/>
+          <a:p>
+            <a:pPr marL="171450" indent="-171450">
+              <a:buFont typeface="Arial" panose="020B0604020202020204" pitchFamily="34" charset="0"/>
+              <a:buChar char="•"/>
+            </a:pPr>
+            <a:r>
+              <a:rPr lang="en-US" sz="1200" dirty="0"/>
+              <a:t>Don’t wait for web3 to load</a:t>
+            </a:r>
+          </a:p>
+          <a:p>
+            <a:pPr marL="171450" indent="-171450">
+              <a:buFont typeface="Arial" panose="020B0604020202020204" pitchFamily="34" charset="0"/>
+              <a:buChar char="•"/>
+            </a:pPr>
+            <a:r>
+              <a:rPr lang="en-US" sz="1200" dirty="0"/>
+              <a:t>Display Header</a:t>
+            </a:r>
+          </a:p>
+          <a:p>
+            <a:pPr marL="171450" indent="-171450">
+              <a:buFont typeface="Arial" panose="020B0604020202020204" pitchFamily="34" charset="0"/>
+              <a:buChar char="•"/>
+            </a:pPr>
+            <a:r>
+              <a:rPr lang="en-US" sz="1200" dirty="0"/>
+              <a:t>Button “generate disguise”</a:t>
+            </a:r>
+          </a:p>
+          <a:p>
+            <a:pPr marL="171450" indent="-171450">
+              <a:buFont typeface="Arial" panose="020B0604020202020204" pitchFamily="34" charset="0"/>
+              <a:buChar char="•"/>
+            </a:pPr>
+            <a:r>
+              <a:rPr lang="en-US" sz="1200" dirty="0"/>
+              <a:t>Logo Machu Picchu</a:t>
+            </a:r>
+          </a:p>
+          <a:p>
+            <a:pPr marL="171450" indent="-171450">
+              <a:buFont typeface="Arial" panose="020B0604020202020204" pitchFamily="34" charset="0"/>
+              <a:buChar char="•"/>
+            </a:pPr>
+            <a:r>
+              <a:rPr lang="en-US" sz="1200" dirty="0"/>
+              <a:t>Button “store disguise”</a:t>
+            </a:r>
+          </a:p>
+          <a:p>
+            <a:pPr marL="171450" indent="-171450">
+              <a:buFont typeface="Arial" panose="020B0604020202020204" pitchFamily="34" charset="0"/>
+              <a:buChar char="•"/>
+            </a:pPr>
+            <a:r>
+              <a:rPr lang="en-US" sz="1200" dirty="0"/>
+              <a:t>Display avatar</a:t>
+            </a:r>
+          </a:p>
+          <a:p>
+            <a:pPr marL="171450" indent="-171450">
+              <a:buFont typeface="Arial" panose="020B0604020202020204" pitchFamily="34" charset="0"/>
+              <a:buChar char="•"/>
+            </a:pPr>
+            <a:r>
+              <a:rPr lang="en-US" sz="1200" dirty="0"/>
+              <a:t>Display table of options</a:t>
+            </a:r>
+          </a:p>
+        </p:txBody>
+      </p:sp>
+      <p:cxnSp>
+        <p:nvCxnSpPr>
+          <p:cNvPr id="16" name="Elbow Connector 15">
+            <a:extLst>
+              <a:ext uri="{FF2B5EF4-FFF2-40B4-BE49-F238E27FC236}">
+                <a16:creationId xmlns:a16="http://schemas.microsoft.com/office/drawing/2014/main" id="{D68CB609-5862-264E-9A09-B63C0381FC84}"/>
+              </a:ext>
+            </a:extLst>
+          </p:cNvPr>
+          <p:cNvCxnSpPr>
+            <a:cxnSpLocks/>
+            <a:stCxn id="37" idx="3"/>
+            <a:endCxn id="52" idx="1"/>
+          </p:cNvCxnSpPr>
+          <p:nvPr/>
+        </p:nvCxnSpPr>
+        <p:spPr>
+          <a:xfrm>
+            <a:off x="4571995" y="5253274"/>
+            <a:ext cx="1438832" cy="466605"/>
+          </a:xfrm>
+          <a:prstGeom prst="bentConnector3">
+            <a:avLst>
+              <a:gd name="adj1" fmla="val 50000"/>
+            </a:avLst>
+          </a:prstGeom>
+          <a:ln>
+            <a:tailEnd type="triangle"/>
+          </a:ln>
+        </p:spPr>
+        <p:style>
+          <a:lnRef idx="1">
+            <a:schemeClr val="accent1"/>
+          </a:lnRef>
+          <a:fillRef idx="0">
+            <a:schemeClr val="accent1"/>
+          </a:fillRef>
+          <a:effectRef idx="0">
+            <a:schemeClr val="accent1"/>
+          </a:effectRef>
+          <a:fontRef idx="minor">
+            <a:schemeClr val="tx1"/>
+          </a:fontRef>
+        </p:style>
+      </p:cxnSp>
+      <p:cxnSp>
+        <p:nvCxnSpPr>
+          <p:cNvPr id="18" name="Elbow Connector 17">
+            <a:extLst>
+              <a:ext uri="{FF2B5EF4-FFF2-40B4-BE49-F238E27FC236}">
+                <a16:creationId xmlns:a16="http://schemas.microsoft.com/office/drawing/2014/main" id="{C3C79A64-9320-F247-9FB9-A688EBFACC06}"/>
+              </a:ext>
+            </a:extLst>
+          </p:cNvPr>
+          <p:cNvCxnSpPr>
+            <a:cxnSpLocks/>
+            <a:stCxn id="35" idx="3"/>
+            <a:endCxn id="40" idx="1"/>
+          </p:cNvCxnSpPr>
+          <p:nvPr/>
+        </p:nvCxnSpPr>
+        <p:spPr>
+          <a:xfrm flipV="1">
+            <a:off x="4886435" y="3732059"/>
+            <a:ext cx="1124393" cy="1170566"/>
+          </a:xfrm>
+          <a:prstGeom prst="bentConnector3">
+            <a:avLst>
+              <a:gd name="adj1" fmla="val 50000"/>
+            </a:avLst>
+          </a:prstGeom>
+          <a:ln>
+            <a:tailEnd type="triangle"/>
+          </a:ln>
+        </p:spPr>
+        <p:style>
+          <a:lnRef idx="1">
+            <a:schemeClr val="accent1"/>
+          </a:lnRef>
+          <a:fillRef idx="0">
+            <a:schemeClr val="accent1"/>
+          </a:fillRef>
+          <a:effectRef idx="0">
+            <a:schemeClr val="accent1"/>
+          </a:effectRef>
+          <a:fontRef idx="minor">
+            <a:schemeClr val="tx1"/>
+          </a:fontRef>
+        </p:style>
+      </p:cxnSp>
+      <p:cxnSp>
+        <p:nvCxnSpPr>
+          <p:cNvPr id="21" name="Elbow Connector 20">
+            <a:extLst>
+              <a:ext uri="{FF2B5EF4-FFF2-40B4-BE49-F238E27FC236}">
+                <a16:creationId xmlns:a16="http://schemas.microsoft.com/office/drawing/2014/main" id="{9C1BDCA4-DD5D-5248-8A2E-AAE22C810104}"/>
+              </a:ext>
+            </a:extLst>
+          </p:cNvPr>
+          <p:cNvCxnSpPr>
+            <a:cxnSpLocks/>
+            <a:stCxn id="32" idx="3"/>
+            <a:endCxn id="33" idx="1"/>
+          </p:cNvCxnSpPr>
+          <p:nvPr/>
+        </p:nvCxnSpPr>
+        <p:spPr>
+          <a:xfrm flipV="1">
+            <a:off x="3962398" y="2867847"/>
+            <a:ext cx="2048429" cy="319341"/>
+          </a:xfrm>
+          <a:prstGeom prst="bentConnector3">
+            <a:avLst/>
+          </a:prstGeom>
+          <a:ln>
+            <a:tailEnd type="triangle"/>
+          </a:ln>
+        </p:spPr>
+        <p:style>
+          <a:lnRef idx="1">
+            <a:schemeClr val="accent1"/>
+          </a:lnRef>
+          <a:fillRef idx="0">
+            <a:schemeClr val="accent1"/>
+          </a:fillRef>
+          <a:effectRef idx="0">
+            <a:schemeClr val="accent1"/>
+          </a:effectRef>
+          <a:fontRef idx="minor">
+            <a:schemeClr val="tx1"/>
+          </a:fontRef>
+        </p:style>
+      </p:cxnSp>
+      <p:cxnSp>
+        <p:nvCxnSpPr>
+          <p:cNvPr id="30" name="Elbow Connector 29">
+            <a:extLst>
+              <a:ext uri="{FF2B5EF4-FFF2-40B4-BE49-F238E27FC236}">
+                <a16:creationId xmlns:a16="http://schemas.microsoft.com/office/drawing/2014/main" id="{47570092-79B6-754F-BCFD-1A5EB892AF91}"/>
+              </a:ext>
+            </a:extLst>
+          </p:cNvPr>
+          <p:cNvCxnSpPr>
+            <a:cxnSpLocks/>
+            <a:stCxn id="40" idx="2"/>
+            <a:endCxn id="49" idx="3"/>
+          </p:cNvCxnSpPr>
+          <p:nvPr/>
+        </p:nvCxnSpPr>
+        <p:spPr>
+          <a:xfrm rot="5400000">
+            <a:off x="4847059" y="3127773"/>
+            <a:ext cx="1548579" cy="3095705"/>
+          </a:xfrm>
+          <a:prstGeom prst="bentConnector2">
+            <a:avLst/>
+          </a:prstGeom>
+          <a:ln>
+            <a:tailEnd type="triangle"/>
+          </a:ln>
+        </p:spPr>
+        <p:style>
+          <a:lnRef idx="1">
+            <a:schemeClr val="accent1"/>
+          </a:lnRef>
+          <a:fillRef idx="0">
+            <a:schemeClr val="accent1"/>
+          </a:fillRef>
+          <a:effectRef idx="0">
+            <a:schemeClr val="accent1"/>
+          </a:effectRef>
+          <a:fontRef idx="minor">
+            <a:schemeClr val="tx1"/>
+          </a:fontRef>
+        </p:style>
+      </p:cxnSp>
+      <p:sp>
+        <p:nvSpPr>
+          <p:cNvPr id="35" name="TextBox 34">
+            <a:extLst>
+              <a:ext uri="{FF2B5EF4-FFF2-40B4-BE49-F238E27FC236}">
+                <a16:creationId xmlns:a16="http://schemas.microsoft.com/office/drawing/2014/main" id="{DDCEA38D-6CC4-BB48-9AB5-487325E48A94}"/>
+              </a:ext>
+            </a:extLst>
+          </p:cNvPr>
+          <p:cNvSpPr txBox="1"/>
+          <p:nvPr/>
+        </p:nvSpPr>
+        <p:spPr>
+          <a:xfrm>
+            <a:off x="3621916" y="4760490"/>
+            <a:ext cx="1264519" cy="284269"/>
+          </a:xfrm>
+          <a:prstGeom prst="rect">
+            <a:avLst/>
+          </a:prstGeom>
+          <a:noFill/>
+        </p:spPr>
+        <p:txBody>
+          <a:bodyPr wrap="square" tIns="3600" bIns="3600" rtlCol="0">
+            <a:spAutoFit/>
+          </a:bodyPr>
+          <a:lstStyle/>
+          <a:p>
+            <a:r>
+              <a:rPr lang="en-LU" dirty="0"/>
+              <a:t> </a:t>
+            </a:r>
+          </a:p>
+        </p:txBody>
+      </p:sp>
+      <p:sp>
+        <p:nvSpPr>
+          <p:cNvPr id="37" name="TextBox 36">
+            <a:extLst>
+              <a:ext uri="{FF2B5EF4-FFF2-40B4-BE49-F238E27FC236}">
+                <a16:creationId xmlns:a16="http://schemas.microsoft.com/office/drawing/2014/main" id="{2FB68C6E-78D5-C744-AB64-6FFF14839D2C}"/>
+              </a:ext>
+            </a:extLst>
+          </p:cNvPr>
+          <p:cNvSpPr txBox="1"/>
+          <p:nvPr/>
+        </p:nvSpPr>
+        <p:spPr>
+          <a:xfrm>
+            <a:off x="3434069" y="5111139"/>
+            <a:ext cx="1137926" cy="284269"/>
+          </a:xfrm>
+          <a:prstGeom prst="rect">
+            <a:avLst/>
+          </a:prstGeom>
+          <a:noFill/>
+        </p:spPr>
+        <p:txBody>
+          <a:bodyPr wrap="square" tIns="3600" bIns="3600" rtlCol="0">
+            <a:spAutoFit/>
+          </a:bodyPr>
+          <a:lstStyle/>
+          <a:p>
+            <a:r>
+              <a:rPr lang="en-LU" dirty="0"/>
+              <a:t> </a:t>
+            </a:r>
+          </a:p>
+        </p:txBody>
+      </p:sp>
+      <p:sp>
+        <p:nvSpPr>
+          <p:cNvPr id="49" name="TextBox 48">
+            <a:extLst>
+              <a:ext uri="{FF2B5EF4-FFF2-40B4-BE49-F238E27FC236}">
+                <a16:creationId xmlns:a16="http://schemas.microsoft.com/office/drawing/2014/main" id="{B4E1ECCD-E0C9-7A42-974F-50F8E3DB0E11}"/>
+              </a:ext>
+            </a:extLst>
+          </p:cNvPr>
+          <p:cNvSpPr txBox="1"/>
+          <p:nvPr/>
+        </p:nvSpPr>
+        <p:spPr>
+          <a:xfrm>
+            <a:off x="3397089" y="5307780"/>
+            <a:ext cx="676406" cy="284269"/>
+          </a:xfrm>
+          <a:prstGeom prst="rect">
+            <a:avLst/>
+          </a:prstGeom>
+          <a:noFill/>
+        </p:spPr>
+        <p:txBody>
+          <a:bodyPr wrap="square" tIns="3600" bIns="3600" rtlCol="0">
+            <a:spAutoFit/>
+          </a:bodyPr>
+          <a:lstStyle/>
+          <a:p>
+            <a:r>
+              <a:rPr lang="en-LU" dirty="0"/>
+              <a:t> </a:t>
+            </a:r>
+          </a:p>
+        </p:txBody>
+      </p:sp>
+      <p:cxnSp>
+        <p:nvCxnSpPr>
+          <p:cNvPr id="51" name="Elbow Connector 50">
+            <a:extLst>
+              <a:ext uri="{FF2B5EF4-FFF2-40B4-BE49-F238E27FC236}">
+                <a16:creationId xmlns:a16="http://schemas.microsoft.com/office/drawing/2014/main" id="{C1EAAFEB-89C2-4548-A6C1-9069A7BEBA9F}"/>
+              </a:ext>
+            </a:extLst>
+          </p:cNvPr>
+          <p:cNvCxnSpPr>
+            <a:cxnSpLocks/>
+            <a:stCxn id="5" idx="3"/>
+            <a:endCxn id="7" idx="1"/>
+          </p:cNvCxnSpPr>
+          <p:nvPr/>
+        </p:nvCxnSpPr>
+        <p:spPr>
+          <a:xfrm>
+            <a:off x="1891430" y="1654238"/>
+            <a:ext cx="1006127" cy="1214699"/>
+          </a:xfrm>
+          <a:prstGeom prst="bentConnector3">
+            <a:avLst/>
+          </a:prstGeom>
+          <a:ln>
+            <a:tailEnd type="triangle"/>
+          </a:ln>
+        </p:spPr>
+        <p:style>
+          <a:lnRef idx="1">
+            <a:schemeClr val="accent1"/>
+          </a:lnRef>
+          <a:fillRef idx="0">
+            <a:schemeClr val="accent1"/>
+          </a:fillRef>
+          <a:effectRef idx="0">
+            <a:schemeClr val="accent1"/>
+          </a:effectRef>
+          <a:fontRef idx="minor">
+            <a:schemeClr val="tx1"/>
+          </a:fontRef>
+        </p:style>
+      </p:cxnSp>
+      <p:pic>
+        <p:nvPicPr>
+          <p:cNvPr id="25" name="Google Shape;117;p28">
+            <a:extLst>
+              <a:ext uri="{FF2B5EF4-FFF2-40B4-BE49-F238E27FC236}">
+                <a16:creationId xmlns:a16="http://schemas.microsoft.com/office/drawing/2014/main" id="{D559997F-2FAD-644C-BBAD-FBAB7FCCE89D}"/>
+              </a:ext>
+            </a:extLst>
+          </p:cNvPr>
+          <p:cNvPicPr preferRelativeResize="0"/>
+          <p:nvPr/>
+        </p:nvPicPr>
+        <p:blipFill>
+          <a:blip r:embed="rId2">
+            <a:alphaModFix/>
+          </a:blip>
+          <a:stretch>
+            <a:fillRect/>
+          </a:stretch>
+        </p:blipFill>
+        <p:spPr>
+          <a:xfrm>
+            <a:off x="10424687" y="146484"/>
+            <a:ext cx="1357940" cy="1357940"/>
+          </a:xfrm>
+          <a:prstGeom prst="rect">
+            <a:avLst/>
+          </a:prstGeom>
+          <a:noFill/>
+          <a:ln>
+            <a:noFill/>
+          </a:ln>
+        </p:spPr>
+      </p:pic>
+      <p:sp>
+        <p:nvSpPr>
+          <p:cNvPr id="29" name="TextBox 28">
+            <a:extLst>
+              <a:ext uri="{FF2B5EF4-FFF2-40B4-BE49-F238E27FC236}">
+                <a16:creationId xmlns:a16="http://schemas.microsoft.com/office/drawing/2014/main" id="{74F9D4BB-9216-DA47-8F83-EEE989CF08E6}"/>
+              </a:ext>
+            </a:extLst>
+          </p:cNvPr>
+          <p:cNvSpPr txBox="1"/>
+          <p:nvPr/>
+        </p:nvSpPr>
+        <p:spPr>
+          <a:xfrm>
+            <a:off x="2904938" y="1483186"/>
+            <a:ext cx="1270944" cy="369332"/>
+          </a:xfrm>
+          <a:prstGeom prst="rect">
+            <a:avLst/>
+          </a:prstGeom>
+          <a:noFill/>
+          <a:ln>
+            <a:solidFill>
+              <a:schemeClr val="accent1"/>
+            </a:solidFill>
+          </a:ln>
+        </p:spPr>
+        <p:txBody>
+          <a:bodyPr wrap="none" rtlCol="0">
+            <a:noAutofit/>
+          </a:bodyPr>
+          <a:lstStyle/>
+          <a:p>
+            <a:r>
+              <a:rPr lang="en-US" sz="1600" dirty="0"/>
+              <a:t>constructor</a:t>
+            </a:r>
+          </a:p>
+        </p:txBody>
+      </p:sp>
+      <p:cxnSp>
+        <p:nvCxnSpPr>
+          <p:cNvPr id="31" name="Elbow Connector 30">
+            <a:extLst>
+              <a:ext uri="{FF2B5EF4-FFF2-40B4-BE49-F238E27FC236}">
+                <a16:creationId xmlns:a16="http://schemas.microsoft.com/office/drawing/2014/main" id="{FD649514-9874-5C4E-A6EF-4C4C4D5DA46B}"/>
+              </a:ext>
+            </a:extLst>
+          </p:cNvPr>
+          <p:cNvCxnSpPr>
+            <a:cxnSpLocks/>
+            <a:stCxn id="5" idx="3"/>
+            <a:endCxn id="29" idx="1"/>
+          </p:cNvCxnSpPr>
+          <p:nvPr/>
+        </p:nvCxnSpPr>
+        <p:spPr>
+          <a:xfrm>
+            <a:off x="1891430" y="1654238"/>
+            <a:ext cx="1013508" cy="13614"/>
+          </a:xfrm>
+          <a:prstGeom prst="bentConnector3">
+            <a:avLst/>
+          </a:prstGeom>
+          <a:ln>
+            <a:tailEnd type="triangle"/>
+          </a:ln>
+        </p:spPr>
+        <p:style>
+          <a:lnRef idx="1">
+            <a:schemeClr val="accent1"/>
+          </a:lnRef>
+          <a:fillRef idx="0">
+            <a:schemeClr val="accent1"/>
+          </a:fillRef>
+          <a:effectRef idx="0">
+            <a:schemeClr val="accent1"/>
+          </a:effectRef>
+          <a:fontRef idx="minor">
+            <a:schemeClr val="tx1"/>
+          </a:fontRef>
+        </p:style>
+      </p:cxnSp>
+      <p:sp>
+        <p:nvSpPr>
+          <p:cNvPr id="32" name="TextBox 31">
+            <a:extLst>
+              <a:ext uri="{FF2B5EF4-FFF2-40B4-BE49-F238E27FC236}">
+                <a16:creationId xmlns:a16="http://schemas.microsoft.com/office/drawing/2014/main" id="{62EAC1FC-8303-C54A-B316-9BDA6F13CB13}"/>
+              </a:ext>
+            </a:extLst>
+          </p:cNvPr>
+          <p:cNvSpPr txBox="1"/>
+          <p:nvPr/>
+        </p:nvSpPr>
+        <p:spPr>
+          <a:xfrm>
+            <a:off x="3407227" y="3045053"/>
+            <a:ext cx="555171" cy="284269"/>
+          </a:xfrm>
+          <a:prstGeom prst="rect">
+            <a:avLst/>
+          </a:prstGeom>
+          <a:noFill/>
+        </p:spPr>
+        <p:txBody>
+          <a:bodyPr wrap="square" tIns="3600" bIns="3600" rtlCol="0">
+            <a:spAutoFit/>
+          </a:bodyPr>
+          <a:lstStyle/>
+          <a:p>
+            <a:r>
+              <a:rPr lang="en-LU" dirty="0"/>
+              <a:t> </a:t>
+            </a:r>
+          </a:p>
+        </p:txBody>
+      </p:sp>
+      <p:sp>
+        <p:nvSpPr>
+          <p:cNvPr id="33" name="TextBox 32">
+            <a:extLst>
+              <a:ext uri="{FF2B5EF4-FFF2-40B4-BE49-F238E27FC236}">
+                <a16:creationId xmlns:a16="http://schemas.microsoft.com/office/drawing/2014/main" id="{42C5EC1E-E0B3-0E46-ADBF-93AA2485BCFA}"/>
+              </a:ext>
+            </a:extLst>
+          </p:cNvPr>
+          <p:cNvSpPr txBox="1"/>
+          <p:nvPr/>
+        </p:nvSpPr>
+        <p:spPr>
+          <a:xfrm>
+            <a:off x="6010827" y="2698570"/>
+            <a:ext cx="2806601" cy="338554"/>
+          </a:xfrm>
+          <a:prstGeom prst="rect">
+            <a:avLst/>
+          </a:prstGeom>
+          <a:noFill/>
+          <a:ln>
+            <a:solidFill>
+              <a:schemeClr val="accent1"/>
+            </a:solidFill>
+          </a:ln>
+        </p:spPr>
+        <p:txBody>
+          <a:bodyPr wrap="none" rtlCol="0">
+            <a:noAutofit/>
+          </a:bodyPr>
+          <a:lstStyle/>
+          <a:p>
+            <a:r>
+              <a:rPr lang="en-US" sz="1400" dirty="0" err="1"/>
+              <a:t>EventListener</a:t>
+            </a:r>
+            <a:r>
+              <a:rPr lang="en-US" sz="1400" dirty="0"/>
+              <a:t> “load” from Metamask</a:t>
+            </a:r>
+          </a:p>
+        </p:txBody>
+      </p:sp>
+      <p:sp>
+        <p:nvSpPr>
+          <p:cNvPr id="40" name="TextBox 39">
+            <a:extLst>
+              <a:ext uri="{FF2B5EF4-FFF2-40B4-BE49-F238E27FC236}">
+                <a16:creationId xmlns:a16="http://schemas.microsoft.com/office/drawing/2014/main" id="{C33ED113-D713-4043-8DDA-50D5D976B307}"/>
+              </a:ext>
+            </a:extLst>
+          </p:cNvPr>
+          <p:cNvSpPr txBox="1"/>
+          <p:nvPr/>
+        </p:nvSpPr>
+        <p:spPr>
+          <a:xfrm>
+            <a:off x="6010828" y="3562782"/>
+            <a:ext cx="2316744" cy="338554"/>
+          </a:xfrm>
+          <a:prstGeom prst="rect">
+            <a:avLst/>
+          </a:prstGeom>
+          <a:noFill/>
+          <a:ln>
+            <a:solidFill>
+              <a:schemeClr val="accent1"/>
+            </a:solidFill>
+          </a:ln>
+        </p:spPr>
+        <p:txBody>
+          <a:bodyPr wrap="none" rtlCol="0">
+            <a:noAutofit/>
+          </a:bodyPr>
+          <a:lstStyle/>
+          <a:p>
+            <a:r>
+              <a:rPr lang="en-US" sz="1400" dirty="0"/>
+              <a:t>Generate random disguise</a:t>
+            </a:r>
+          </a:p>
+        </p:txBody>
+      </p:sp>
+      <p:cxnSp>
+        <p:nvCxnSpPr>
+          <p:cNvPr id="42" name="Elbow Connector 41">
+            <a:extLst>
+              <a:ext uri="{FF2B5EF4-FFF2-40B4-BE49-F238E27FC236}">
+                <a16:creationId xmlns:a16="http://schemas.microsoft.com/office/drawing/2014/main" id="{78DE0365-6BBA-4F46-A337-02674D3E8C46}"/>
+              </a:ext>
+            </a:extLst>
+          </p:cNvPr>
+          <p:cNvCxnSpPr>
+            <a:cxnSpLocks/>
+            <a:stCxn id="36" idx="3"/>
+            <a:endCxn id="40" idx="1"/>
+          </p:cNvCxnSpPr>
+          <p:nvPr/>
+        </p:nvCxnSpPr>
+        <p:spPr>
+          <a:xfrm>
+            <a:off x="4865914" y="1994870"/>
+            <a:ext cx="1144914" cy="1737189"/>
+          </a:xfrm>
+          <a:prstGeom prst="bentConnector3">
+            <a:avLst>
+              <a:gd name="adj1" fmla="val 50000"/>
+            </a:avLst>
+          </a:prstGeom>
+          <a:ln>
+            <a:tailEnd type="triangle"/>
+          </a:ln>
+        </p:spPr>
+        <p:style>
+          <a:lnRef idx="1">
+            <a:schemeClr val="accent1"/>
+          </a:lnRef>
+          <a:fillRef idx="0">
+            <a:schemeClr val="accent1"/>
+          </a:fillRef>
+          <a:effectRef idx="0">
+            <a:schemeClr val="accent1"/>
+          </a:effectRef>
+          <a:fontRef idx="minor">
+            <a:schemeClr val="tx1"/>
+          </a:fontRef>
+        </p:style>
+      </p:cxnSp>
+      <p:sp>
+        <p:nvSpPr>
+          <p:cNvPr id="46" name="TextBox 45">
+            <a:extLst>
+              <a:ext uri="{FF2B5EF4-FFF2-40B4-BE49-F238E27FC236}">
+                <a16:creationId xmlns:a16="http://schemas.microsoft.com/office/drawing/2014/main" id="{B6D0CCCA-93F8-4447-A797-265F4BC9AA65}"/>
+              </a:ext>
+            </a:extLst>
+          </p:cNvPr>
+          <p:cNvSpPr txBox="1"/>
+          <p:nvPr/>
+        </p:nvSpPr>
+        <p:spPr>
+          <a:xfrm>
+            <a:off x="8821160" y="2695586"/>
+            <a:ext cx="2574872" cy="646331"/>
+          </a:xfrm>
+          <a:prstGeom prst="rect">
+            <a:avLst/>
+          </a:prstGeom>
+          <a:noFill/>
+        </p:spPr>
+        <p:txBody>
+          <a:bodyPr wrap="none" rtlCol="0">
+            <a:spAutoFit/>
+          </a:bodyPr>
+          <a:lstStyle/>
+          <a:p>
+            <a:pPr marL="171450" indent="-171450">
+              <a:buFont typeface="Arial" panose="020B0604020202020204" pitchFamily="34" charset="0"/>
+              <a:buChar char="•"/>
+            </a:pPr>
+            <a:r>
+              <a:rPr lang="en-US" sz="1200" dirty="0"/>
+              <a:t>Query web3 list of user accounts</a:t>
+            </a:r>
+          </a:p>
+          <a:p>
+            <a:pPr marL="171450" indent="-171450">
+              <a:buFont typeface="Arial" panose="020B0604020202020204" pitchFamily="34" charset="0"/>
+              <a:buChar char="•"/>
+            </a:pPr>
+            <a:r>
+              <a:rPr lang="en-US" sz="1200" dirty="0"/>
+              <a:t>Deploy Pepito</a:t>
+            </a:r>
+          </a:p>
+          <a:p>
+            <a:pPr marL="171450" indent="-171450">
+              <a:buFont typeface="Arial" panose="020B0604020202020204" pitchFamily="34" charset="0"/>
+              <a:buChar char="•"/>
+            </a:pPr>
+            <a:r>
+              <a:rPr lang="en-US" sz="1200" dirty="0" err="1"/>
+              <a:t>setState</a:t>
+            </a:r>
+            <a:r>
+              <a:rPr lang="en-US" sz="1200" dirty="0"/>
+              <a:t>() without running anything</a:t>
+            </a:r>
+          </a:p>
+        </p:txBody>
+      </p:sp>
+      <p:cxnSp>
+        <p:nvCxnSpPr>
+          <p:cNvPr id="48" name="Elbow Connector 47">
+            <a:extLst>
+              <a:ext uri="{FF2B5EF4-FFF2-40B4-BE49-F238E27FC236}">
+                <a16:creationId xmlns:a16="http://schemas.microsoft.com/office/drawing/2014/main" id="{E0DD562C-239D-804B-8DDD-532731A4DC40}"/>
+              </a:ext>
+            </a:extLst>
+          </p:cNvPr>
+          <p:cNvCxnSpPr>
+            <a:cxnSpLocks/>
+            <a:stCxn id="5" idx="3"/>
+            <a:endCxn id="9" idx="1"/>
+          </p:cNvCxnSpPr>
+          <p:nvPr/>
+        </p:nvCxnSpPr>
+        <p:spPr>
+          <a:xfrm>
+            <a:off x="1891430" y="1654238"/>
+            <a:ext cx="1006127" cy="2559871"/>
+          </a:xfrm>
+          <a:prstGeom prst="bentConnector3">
+            <a:avLst>
+              <a:gd name="adj1" fmla="val 50000"/>
+            </a:avLst>
+          </a:prstGeom>
+          <a:ln>
+            <a:tailEnd type="triangle"/>
+          </a:ln>
+        </p:spPr>
+        <p:style>
+          <a:lnRef idx="1">
+            <a:schemeClr val="accent1"/>
+          </a:lnRef>
+          <a:fillRef idx="0">
+            <a:schemeClr val="accent1"/>
+          </a:fillRef>
+          <a:effectRef idx="0">
+            <a:schemeClr val="accent1"/>
+          </a:effectRef>
+          <a:fontRef idx="minor">
+            <a:schemeClr val="tx1"/>
+          </a:fontRef>
+        </p:style>
+      </p:cxnSp>
+      <p:sp>
+        <p:nvSpPr>
+          <p:cNvPr id="52" name="TextBox 51">
+            <a:extLst>
+              <a:ext uri="{FF2B5EF4-FFF2-40B4-BE49-F238E27FC236}">
+                <a16:creationId xmlns:a16="http://schemas.microsoft.com/office/drawing/2014/main" id="{5DA72290-B5BE-3A4E-8F41-B3EECCC92F4D}"/>
+              </a:ext>
+            </a:extLst>
+          </p:cNvPr>
+          <p:cNvSpPr txBox="1"/>
+          <p:nvPr/>
+        </p:nvSpPr>
+        <p:spPr>
+          <a:xfrm>
+            <a:off x="6010827" y="5550602"/>
+            <a:ext cx="2316744" cy="338554"/>
+          </a:xfrm>
+          <a:prstGeom prst="rect">
+            <a:avLst/>
+          </a:prstGeom>
+          <a:noFill/>
+          <a:ln>
+            <a:solidFill>
+              <a:schemeClr val="accent1"/>
+            </a:solidFill>
+          </a:ln>
+        </p:spPr>
+        <p:txBody>
+          <a:bodyPr wrap="none" rtlCol="0">
+            <a:noAutofit/>
+          </a:bodyPr>
+          <a:lstStyle/>
+          <a:p>
+            <a:r>
+              <a:rPr lang="en-US" sz="1400" dirty="0"/>
+              <a:t>Store disguise on blockchain</a:t>
+            </a:r>
+          </a:p>
+        </p:txBody>
+      </p:sp>
+      <p:sp>
+        <p:nvSpPr>
+          <p:cNvPr id="54" name="TextBox 53">
+            <a:extLst>
+              <a:ext uri="{FF2B5EF4-FFF2-40B4-BE49-F238E27FC236}">
+                <a16:creationId xmlns:a16="http://schemas.microsoft.com/office/drawing/2014/main" id="{8727D4B7-7E92-4A40-9510-B968BF9F2E3C}"/>
+              </a:ext>
+            </a:extLst>
+          </p:cNvPr>
+          <p:cNvSpPr txBox="1"/>
+          <p:nvPr/>
+        </p:nvSpPr>
+        <p:spPr>
+          <a:xfrm>
+            <a:off x="8327571" y="5625460"/>
+            <a:ext cx="3708964" cy="646331"/>
+          </a:xfrm>
+          <a:prstGeom prst="rect">
+            <a:avLst/>
+          </a:prstGeom>
+          <a:noFill/>
+        </p:spPr>
+        <p:txBody>
+          <a:bodyPr wrap="none" rtlCol="0">
+            <a:spAutoFit/>
+          </a:bodyPr>
+          <a:lstStyle/>
+          <a:p>
+            <a:pPr marL="171450" indent="-171450">
+              <a:buFont typeface="Arial" panose="020B0604020202020204" pitchFamily="34" charset="0"/>
+              <a:buChar char="•"/>
+            </a:pPr>
+            <a:r>
+              <a:rPr lang="en-US" sz="1200" dirty="0"/>
+              <a:t>Retrieve web3 from state </a:t>
+            </a:r>
+            <a:r>
+              <a:rPr lang="en-US" sz="1200" dirty="0">
+                <a:solidFill>
+                  <a:srgbClr val="FF0000"/>
+                </a:solidFill>
+              </a:rPr>
+              <a:t>(1.crash if web3 not set)</a:t>
+            </a:r>
+          </a:p>
+          <a:p>
+            <a:pPr marL="171450" indent="-171450">
+              <a:buFont typeface="Arial" panose="020B0604020202020204" pitchFamily="34" charset="0"/>
+              <a:buChar char="•"/>
+            </a:pPr>
+            <a:r>
+              <a:rPr lang="en-US" sz="1200" dirty="0"/>
+              <a:t>Call </a:t>
+            </a:r>
+            <a:r>
+              <a:rPr lang="en-US" sz="1200" dirty="0" err="1"/>
+              <a:t>createPepitoDisguise</a:t>
+            </a:r>
+            <a:endParaRPr lang="en-US" sz="1200" dirty="0"/>
+          </a:p>
+          <a:p>
+            <a:pPr marL="171450" indent="-171450">
+              <a:buFont typeface="Arial" panose="020B0604020202020204" pitchFamily="34" charset="0"/>
+              <a:buChar char="•"/>
+            </a:pPr>
+            <a:r>
+              <a:rPr lang="en-US" sz="1200" dirty="0"/>
+              <a:t>Store options in </a:t>
+            </a:r>
+            <a:r>
+              <a:rPr lang="en-US" sz="1200"/>
+              <a:t>blockchain </a:t>
+            </a:r>
+            <a:r>
+              <a:rPr lang="en-US" sz="1200">
+                <a:solidFill>
+                  <a:srgbClr val="FF0000"/>
+                </a:solidFill>
+              </a:rPr>
+              <a:t>(3.crash </a:t>
+            </a:r>
+            <a:r>
+              <a:rPr lang="en-US" sz="1200" dirty="0">
+                <a:solidFill>
+                  <a:srgbClr val="FF0000"/>
+                </a:solidFill>
+              </a:rPr>
+              <a:t>function </a:t>
+            </a:r>
+            <a:r>
+              <a:rPr lang="en-US" sz="1200" dirty="0" err="1">
+                <a:solidFill>
+                  <a:srgbClr val="FF0000"/>
+                </a:solidFill>
+              </a:rPr>
+              <a:t>unkown</a:t>
+            </a:r>
+            <a:r>
+              <a:rPr lang="en-US" sz="1200" dirty="0">
+                <a:solidFill>
+                  <a:srgbClr val="FF0000"/>
+                </a:solidFill>
+              </a:rPr>
+              <a:t>)</a:t>
+            </a:r>
+            <a:endParaRPr lang="en-US" sz="1200" dirty="0"/>
+          </a:p>
+        </p:txBody>
+      </p:sp>
+      <p:sp>
+        <p:nvSpPr>
+          <p:cNvPr id="34" name="TextBox 33">
+            <a:extLst>
+              <a:ext uri="{FF2B5EF4-FFF2-40B4-BE49-F238E27FC236}">
+                <a16:creationId xmlns:a16="http://schemas.microsoft.com/office/drawing/2014/main" id="{9C234992-4A29-8245-A060-9EB80FD9C801}"/>
+              </a:ext>
+            </a:extLst>
+          </p:cNvPr>
+          <p:cNvSpPr txBox="1"/>
+          <p:nvPr/>
+        </p:nvSpPr>
+        <p:spPr>
+          <a:xfrm>
+            <a:off x="2899332" y="1857556"/>
+            <a:ext cx="1961819" cy="276999"/>
+          </a:xfrm>
+          <a:prstGeom prst="rect">
+            <a:avLst/>
+          </a:prstGeom>
+          <a:noFill/>
+        </p:spPr>
+        <p:txBody>
+          <a:bodyPr wrap="none" rtlCol="0">
+            <a:spAutoFit/>
+          </a:bodyPr>
+          <a:lstStyle/>
+          <a:p>
+            <a:pPr marL="171450" indent="-171450">
+              <a:buFont typeface="Arial" panose="020B0604020202020204" pitchFamily="34" charset="0"/>
+              <a:buChar char="•"/>
+            </a:pPr>
+            <a:r>
+              <a:rPr lang="en-US" sz="1200" dirty="0" err="1"/>
+              <a:t>requestRandomNumber</a:t>
+            </a:r>
+            <a:r>
+              <a:rPr lang="en-US" sz="1200" dirty="0"/>
+              <a:t>()</a:t>
+            </a:r>
+          </a:p>
+        </p:txBody>
+      </p:sp>
+      <p:sp>
+        <p:nvSpPr>
+          <p:cNvPr id="36" name="TextBox 35">
+            <a:extLst>
+              <a:ext uri="{FF2B5EF4-FFF2-40B4-BE49-F238E27FC236}">
+                <a16:creationId xmlns:a16="http://schemas.microsoft.com/office/drawing/2014/main" id="{0ACDAF79-1CD3-5440-A93A-6F9322935EDE}"/>
+              </a:ext>
+            </a:extLst>
+          </p:cNvPr>
+          <p:cNvSpPr txBox="1"/>
+          <p:nvPr/>
+        </p:nvSpPr>
+        <p:spPr>
+          <a:xfrm>
+            <a:off x="4310743" y="1810204"/>
+            <a:ext cx="555171" cy="369332"/>
+          </a:xfrm>
+          <a:prstGeom prst="rect">
+            <a:avLst/>
+          </a:prstGeom>
+          <a:noFill/>
+        </p:spPr>
+        <p:txBody>
+          <a:bodyPr wrap="square" rtlCol="0">
+            <a:spAutoFit/>
+          </a:bodyPr>
+          <a:lstStyle/>
+          <a:p>
+            <a:r>
+              <a:rPr lang="en-LU" dirty="0"/>
+              <a:t> </a:t>
+            </a:r>
+          </a:p>
+        </p:txBody>
+      </p:sp>
+    </p:spTree>
+    <p:extLst>
+      <p:ext uri="{BB962C8B-B14F-4D97-AF65-F5344CB8AC3E}">
+        <p14:creationId xmlns:p14="http://schemas.microsoft.com/office/powerpoint/2010/main" val="2336297491"/>
+      </p:ext>
+    </p:extLst>
+  </p:cSld>
+  <p:clrMapOvr>
+    <a:masterClrMapping/>
+  </p:clrMapOvr>
+</p:sld>
+</file>
+
 <file path=ppt/theme/theme1.xml><?xml version="1.0" encoding="utf-8"?>
 <a:theme xmlns:a="http://schemas.openxmlformats.org/drawingml/2006/main" name="Office Theme">
   <a:themeElements>

</xml_diff>

<commit_message>
remove random disguise from componentDidMount
</commit_message>
<xml_diff>
--- a/Pepito/Final Project Design.pptx
+++ b/Pepito/Final Project Design.pptx
@@ -9232,19 +9232,7 @@
             </a:pPr>
             <a:r>
               <a:rPr lang="en-US" sz="1200" dirty="0"/>
-              <a:t>Store options in </a:t>
-            </a:r>
-            <a:r>
-              <a:rPr lang="en-US" sz="1200"/>
-              <a:t>blockchain </a:t>
-            </a:r>
-            <a:r>
-              <a:rPr lang="en-US" sz="1200">
-                <a:solidFill>
-                  <a:srgbClr val="FF0000"/>
-                </a:solidFill>
-              </a:rPr>
-              <a:t>(3.crash </a:t>
+              <a:t>Store options in blockchain </a:t>
             </a:r>
             <a:r>
               <a:rPr lang="en-US" sz="1200" dirty="0">
@@ -9252,7 +9240,7 @@
                   <a:srgbClr val="FF0000"/>
                 </a:solidFill>
               </a:rPr>
-              <a:t>function </a:t>
+              <a:t>(3.crash function </a:t>
             </a:r>
             <a:r>
               <a:rPr lang="en-US" sz="1200" dirty="0" err="1">
@@ -9289,7 +9277,7 @@
         <p:spPr>
           <a:xfrm>
             <a:off x="2899332" y="1857556"/>
-            <a:ext cx="1961819" cy="276999"/>
+            <a:ext cx="1677832" cy="276999"/>
           </a:xfrm>
           <a:prstGeom prst="rect">
             <a:avLst/>
@@ -9307,13 +9295,10 @@
               <a:buChar char="•"/>
             </a:pPr>
             <a:r>
-              <a:rPr lang="en-US" sz="1200" dirty="0" err="1"/>
-              <a:t>requestRandomNumber</a:t>
-            </a:r>
-            <a:r>
-              <a:rPr lang="en-US" sz="1200" dirty="0"/>
-              <a:t>()</a:t>
-            </a:r>
+              <a:rPr lang="en-US" sz="1200"/>
+              <a:t>setRandomDisguise()</a:t>
+            </a:r>
+            <a:endParaRPr lang="en-US" sz="1200" dirty="0"/>
           </a:p>
         </p:txBody>
       </p:sp>

</xml_diff>

<commit_message>
move web3Connect to constructor
</commit_message>
<xml_diff>
--- a/Pepito/Final Project Design.pptx
+++ b/Pepito/Final Project Design.pptx
@@ -9,6 +9,7 @@
     <p:sldId id="257" r:id="rId3"/>
     <p:sldId id="258" r:id="rId4"/>
     <p:sldId id="259" r:id="rId5"/>
+    <p:sldId id="260" r:id="rId6"/>
   </p:sldIdLst>
   <p:sldSz cx="12192000" cy="6858000"/>
   <p:notesSz cx="6858000" cy="9144000"/>
@@ -9295,10 +9296,13 @@
               <a:buChar char="•"/>
             </a:pPr>
             <a:r>
-              <a:rPr lang="en-US" sz="1200"/>
-              <a:t>setRandomDisguise()</a:t>
-            </a:r>
-            <a:endParaRPr lang="en-US" sz="1200" dirty="0"/>
+              <a:rPr lang="en-US" sz="1200" dirty="0" err="1"/>
+              <a:t>setRandomDisguise</a:t>
+            </a:r>
+            <a:r>
+              <a:rPr lang="en-US" sz="1200" dirty="0"/>
+              <a:t>()</a:t>
+            </a:r>
           </a:p>
         </p:txBody>
       </p:sp>
@@ -9341,6 +9345,1530 @@
     <p:extLst>
       <p:ext uri="{BB962C8B-B14F-4D97-AF65-F5344CB8AC3E}">
         <p14:creationId xmlns:p14="http://schemas.microsoft.com/office/powerpoint/2010/main" val="2336297491"/>
+      </p:ext>
+    </p:extLst>
+  </p:cSld>
+  <p:clrMapOvr>
+    <a:masterClrMapping/>
+  </p:clrMapOvr>
+</p:sld>
+</file>
+
+<file path=ppt/slides/slide5.xml><?xml version="1.0" encoding="utf-8"?>
+<p:sld xmlns:a="http://schemas.openxmlformats.org/drawingml/2006/main" xmlns:r="http://schemas.openxmlformats.org/officeDocument/2006/relationships" xmlns:p="http://schemas.openxmlformats.org/presentationml/2006/main">
+  <p:cSld>
+    <p:spTree>
+      <p:nvGrpSpPr>
+        <p:cNvPr id="1" name=""/>
+        <p:cNvGrpSpPr/>
+        <p:nvPr/>
+      </p:nvGrpSpPr>
+      <p:grpSpPr>
+        <a:xfrm>
+          <a:off x="0" y="0"/>
+          <a:ext cx="0" cy="0"/>
+          <a:chOff x="0" y="0"/>
+          <a:chExt cx="0" cy="0"/>
+        </a:xfrm>
+      </p:grpSpPr>
+      <p:sp>
+        <p:nvSpPr>
+          <p:cNvPr id="4" name="TextBox 3">
+            <a:extLst>
+              <a:ext uri="{FF2B5EF4-FFF2-40B4-BE49-F238E27FC236}">
+                <a16:creationId xmlns:a16="http://schemas.microsoft.com/office/drawing/2014/main" id="{7B91D8D0-F88B-784E-8FF8-D5F07BC08546}"/>
+              </a:ext>
+            </a:extLst>
+          </p:cNvPr>
+          <p:cNvSpPr txBox="1"/>
+          <p:nvPr/>
+        </p:nvSpPr>
+        <p:spPr>
+          <a:xfrm>
+            <a:off x="620486" y="413657"/>
+            <a:ext cx="4240665" cy="594250"/>
+          </a:xfrm>
+          <a:prstGeom prst="rect">
+            <a:avLst/>
+          </a:prstGeom>
+          <a:solidFill>
+            <a:srgbClr val="E1EFD8"/>
+          </a:solidFill>
+        </p:spPr>
+        <p:txBody>
+          <a:bodyPr wrap="none" rtlCol="0" anchor="ctr" anchorCtr="0">
+            <a:noAutofit/>
+          </a:bodyPr>
+          <a:lstStyle/>
+          <a:p>
+            <a:r>
+              <a:rPr lang="en-US" b="1" dirty="0">
+                <a:solidFill>
+                  <a:srgbClr val="980000"/>
+                </a:solidFill>
+              </a:rPr>
+              <a:t>Pepito – </a:t>
+            </a:r>
+            <a:r>
+              <a:rPr lang="en-US" b="1" dirty="0" err="1">
+                <a:solidFill>
+                  <a:srgbClr val="980000"/>
+                </a:solidFill>
+              </a:rPr>
+              <a:t>App.js</a:t>
+            </a:r>
+            <a:r>
+              <a:rPr lang="en-US" b="1" dirty="0">
+                <a:solidFill>
+                  <a:srgbClr val="980000"/>
+                </a:solidFill>
+              </a:rPr>
+              <a:t> process flow (re-design 2)</a:t>
+            </a:r>
+          </a:p>
+        </p:txBody>
+      </p:sp>
+      <p:sp>
+        <p:nvSpPr>
+          <p:cNvPr id="5" name="TextBox 4">
+            <a:extLst>
+              <a:ext uri="{FF2B5EF4-FFF2-40B4-BE49-F238E27FC236}">
+                <a16:creationId xmlns:a16="http://schemas.microsoft.com/office/drawing/2014/main" id="{4E7891D5-3171-C544-94BF-3D2CB24C6664}"/>
+              </a:ext>
+            </a:extLst>
+          </p:cNvPr>
+          <p:cNvSpPr txBox="1"/>
+          <p:nvPr/>
+        </p:nvSpPr>
+        <p:spPr>
+          <a:xfrm>
+            <a:off x="620486" y="1469572"/>
+            <a:ext cx="1270944" cy="369332"/>
+          </a:xfrm>
+          <a:prstGeom prst="rect">
+            <a:avLst/>
+          </a:prstGeom>
+          <a:noFill/>
+          <a:ln>
+            <a:solidFill>
+              <a:schemeClr val="accent1"/>
+            </a:solidFill>
+          </a:ln>
+        </p:spPr>
+        <p:txBody>
+          <a:bodyPr wrap="none" rtlCol="0">
+            <a:noAutofit/>
+          </a:bodyPr>
+          <a:lstStyle/>
+          <a:p>
+            <a:r>
+              <a:rPr lang="en-US" sz="1600" dirty="0"/>
+              <a:t>Mount</a:t>
+            </a:r>
+          </a:p>
+        </p:txBody>
+      </p:sp>
+      <p:sp>
+        <p:nvSpPr>
+          <p:cNvPr id="6" name="TextBox 5">
+            <a:extLst>
+              <a:ext uri="{FF2B5EF4-FFF2-40B4-BE49-F238E27FC236}">
+                <a16:creationId xmlns:a16="http://schemas.microsoft.com/office/drawing/2014/main" id="{A5D02A08-6485-3747-9743-8A8FF3F1AFD8}"/>
+              </a:ext>
+            </a:extLst>
+          </p:cNvPr>
+          <p:cNvSpPr txBox="1"/>
+          <p:nvPr/>
+        </p:nvSpPr>
+        <p:spPr>
+          <a:xfrm>
+            <a:off x="611375" y="1838904"/>
+            <a:ext cx="744114" cy="276999"/>
+          </a:xfrm>
+          <a:prstGeom prst="rect">
+            <a:avLst/>
+          </a:prstGeom>
+          <a:noFill/>
+        </p:spPr>
+        <p:txBody>
+          <a:bodyPr wrap="none" rtlCol="0">
+            <a:spAutoFit/>
+          </a:bodyPr>
+          <a:lstStyle/>
+          <a:p>
+            <a:pPr marL="171450" indent="-171450">
+              <a:buFont typeface="Arial" panose="020B0604020202020204" pitchFamily="34" charset="0"/>
+              <a:buChar char="•"/>
+            </a:pPr>
+            <a:r>
+              <a:rPr lang="en-US" sz="1200" dirty="0" err="1"/>
+              <a:t>App.js</a:t>
+            </a:r>
+            <a:endParaRPr lang="en-US" sz="1200" dirty="0"/>
+          </a:p>
+        </p:txBody>
+      </p:sp>
+      <p:sp>
+        <p:nvSpPr>
+          <p:cNvPr id="7" name="TextBox 6">
+            <a:extLst>
+              <a:ext uri="{FF2B5EF4-FFF2-40B4-BE49-F238E27FC236}">
+                <a16:creationId xmlns:a16="http://schemas.microsoft.com/office/drawing/2014/main" id="{71B0BC68-98F1-374B-B0A6-7F80DAAB776D}"/>
+              </a:ext>
+            </a:extLst>
+          </p:cNvPr>
+          <p:cNvSpPr txBox="1"/>
+          <p:nvPr/>
+        </p:nvSpPr>
+        <p:spPr>
+          <a:xfrm>
+            <a:off x="2592757" y="3483433"/>
+            <a:ext cx="1988878" cy="338554"/>
+          </a:xfrm>
+          <a:prstGeom prst="rect">
+            <a:avLst/>
+          </a:prstGeom>
+          <a:noFill/>
+          <a:ln>
+            <a:solidFill>
+              <a:schemeClr val="accent1"/>
+            </a:solidFill>
+          </a:ln>
+        </p:spPr>
+        <p:txBody>
+          <a:bodyPr wrap="none" rtlCol="0">
+            <a:spAutoFit/>
+          </a:bodyPr>
+          <a:lstStyle/>
+          <a:p>
+            <a:r>
+              <a:rPr lang="en-US" sz="1600" dirty="0" err="1"/>
+              <a:t>componentDidMount</a:t>
+            </a:r>
+            <a:endParaRPr lang="en-US" sz="1600" dirty="0"/>
+          </a:p>
+        </p:txBody>
+      </p:sp>
+      <p:sp>
+        <p:nvSpPr>
+          <p:cNvPr id="8" name="TextBox 7">
+            <a:extLst>
+              <a:ext uri="{FF2B5EF4-FFF2-40B4-BE49-F238E27FC236}">
+                <a16:creationId xmlns:a16="http://schemas.microsoft.com/office/drawing/2014/main" id="{BFDA071E-ACD1-CC46-AC6B-D3109A9288AC}"/>
+              </a:ext>
+            </a:extLst>
+          </p:cNvPr>
+          <p:cNvSpPr txBox="1"/>
+          <p:nvPr/>
+        </p:nvSpPr>
+        <p:spPr>
+          <a:xfrm>
+            <a:off x="2594532" y="3827713"/>
+            <a:ext cx="1015278" cy="276999"/>
+          </a:xfrm>
+          <a:prstGeom prst="rect">
+            <a:avLst/>
+          </a:prstGeom>
+          <a:noFill/>
+        </p:spPr>
+        <p:txBody>
+          <a:bodyPr wrap="none" rtlCol="0">
+            <a:spAutoFit/>
+          </a:bodyPr>
+          <a:lstStyle/>
+          <a:p>
+            <a:pPr marL="171450" indent="-171450">
+              <a:buFont typeface="Arial" panose="020B0604020202020204" pitchFamily="34" charset="0"/>
+              <a:buChar char="•"/>
+            </a:pPr>
+            <a:r>
+              <a:rPr lang="en-US" sz="1200" dirty="0"/>
+              <a:t>getWeb3()</a:t>
+            </a:r>
+          </a:p>
+        </p:txBody>
+      </p:sp>
+      <p:sp>
+        <p:nvSpPr>
+          <p:cNvPr id="9" name="TextBox 8">
+            <a:extLst>
+              <a:ext uri="{FF2B5EF4-FFF2-40B4-BE49-F238E27FC236}">
+                <a16:creationId xmlns:a16="http://schemas.microsoft.com/office/drawing/2014/main" id="{A648BA86-9C0C-0846-A8F7-877203CF605C}"/>
+              </a:ext>
+            </a:extLst>
+          </p:cNvPr>
+          <p:cNvSpPr txBox="1"/>
+          <p:nvPr/>
+        </p:nvSpPr>
+        <p:spPr>
+          <a:xfrm>
+            <a:off x="2592757" y="4323358"/>
+            <a:ext cx="1270944" cy="369332"/>
+          </a:xfrm>
+          <a:prstGeom prst="rect">
+            <a:avLst/>
+          </a:prstGeom>
+          <a:noFill/>
+          <a:ln>
+            <a:solidFill>
+              <a:schemeClr val="accent1"/>
+            </a:solidFill>
+          </a:ln>
+        </p:spPr>
+        <p:txBody>
+          <a:bodyPr wrap="none" rtlCol="0">
+            <a:noAutofit/>
+          </a:bodyPr>
+          <a:lstStyle/>
+          <a:p>
+            <a:r>
+              <a:rPr lang="en-US" sz="1600" dirty="0"/>
+              <a:t>render</a:t>
+            </a:r>
+          </a:p>
+        </p:txBody>
+      </p:sp>
+      <p:sp>
+        <p:nvSpPr>
+          <p:cNvPr id="10" name="TextBox 9">
+            <a:extLst>
+              <a:ext uri="{FF2B5EF4-FFF2-40B4-BE49-F238E27FC236}">
+                <a16:creationId xmlns:a16="http://schemas.microsoft.com/office/drawing/2014/main" id="{9975F9DA-160B-2D4B-9A04-56DEA224E101}"/>
+              </a:ext>
+            </a:extLst>
+          </p:cNvPr>
+          <p:cNvSpPr txBox="1"/>
+          <p:nvPr/>
+        </p:nvSpPr>
+        <p:spPr>
+          <a:xfrm>
+            <a:off x="2583646" y="4692690"/>
+            <a:ext cx="2074863" cy="1384995"/>
+          </a:xfrm>
+          <a:prstGeom prst="rect">
+            <a:avLst/>
+          </a:prstGeom>
+          <a:noFill/>
+        </p:spPr>
+        <p:txBody>
+          <a:bodyPr wrap="none" rtlCol="0">
+            <a:spAutoFit/>
+          </a:bodyPr>
+          <a:lstStyle/>
+          <a:p>
+            <a:pPr marL="171450" indent="-171450">
+              <a:buFont typeface="Arial" panose="020B0604020202020204" pitchFamily="34" charset="0"/>
+              <a:buChar char="•"/>
+            </a:pPr>
+            <a:r>
+              <a:rPr lang="en-US" sz="1200" dirty="0"/>
+              <a:t>Don’t wait for web3 to load</a:t>
+            </a:r>
+          </a:p>
+          <a:p>
+            <a:pPr marL="171450" indent="-171450">
+              <a:buFont typeface="Arial" panose="020B0604020202020204" pitchFamily="34" charset="0"/>
+              <a:buChar char="•"/>
+            </a:pPr>
+            <a:r>
+              <a:rPr lang="en-US" sz="1200" dirty="0"/>
+              <a:t>Display Header</a:t>
+            </a:r>
+          </a:p>
+          <a:p>
+            <a:pPr marL="171450" indent="-171450">
+              <a:buFont typeface="Arial" panose="020B0604020202020204" pitchFamily="34" charset="0"/>
+              <a:buChar char="•"/>
+            </a:pPr>
+            <a:r>
+              <a:rPr lang="en-US" sz="1200" dirty="0"/>
+              <a:t>Button “generate disguise”</a:t>
+            </a:r>
+          </a:p>
+          <a:p>
+            <a:pPr marL="171450" indent="-171450">
+              <a:buFont typeface="Arial" panose="020B0604020202020204" pitchFamily="34" charset="0"/>
+              <a:buChar char="•"/>
+            </a:pPr>
+            <a:r>
+              <a:rPr lang="en-US" sz="1200" dirty="0"/>
+              <a:t>Logo Machu Picchu</a:t>
+            </a:r>
+          </a:p>
+          <a:p>
+            <a:pPr marL="171450" indent="-171450">
+              <a:buFont typeface="Arial" panose="020B0604020202020204" pitchFamily="34" charset="0"/>
+              <a:buChar char="•"/>
+            </a:pPr>
+            <a:r>
+              <a:rPr lang="en-US" sz="1200" dirty="0"/>
+              <a:t>Button “store disguise”</a:t>
+            </a:r>
+          </a:p>
+          <a:p>
+            <a:pPr marL="171450" indent="-171450">
+              <a:buFont typeface="Arial" panose="020B0604020202020204" pitchFamily="34" charset="0"/>
+              <a:buChar char="•"/>
+            </a:pPr>
+            <a:r>
+              <a:rPr lang="en-US" sz="1200" dirty="0"/>
+              <a:t>Display avatar</a:t>
+            </a:r>
+          </a:p>
+          <a:p>
+            <a:pPr marL="171450" indent="-171450">
+              <a:buFont typeface="Arial" panose="020B0604020202020204" pitchFamily="34" charset="0"/>
+              <a:buChar char="•"/>
+            </a:pPr>
+            <a:r>
+              <a:rPr lang="en-US" sz="1200" dirty="0"/>
+              <a:t>Display table of options</a:t>
+            </a:r>
+          </a:p>
+        </p:txBody>
+      </p:sp>
+      <p:cxnSp>
+        <p:nvCxnSpPr>
+          <p:cNvPr id="16" name="Elbow Connector 15">
+            <a:extLst>
+              <a:ext uri="{FF2B5EF4-FFF2-40B4-BE49-F238E27FC236}">
+                <a16:creationId xmlns:a16="http://schemas.microsoft.com/office/drawing/2014/main" id="{D68CB609-5862-264E-9A09-B63C0381FC84}"/>
+              </a:ext>
+            </a:extLst>
+          </p:cNvPr>
+          <p:cNvCxnSpPr>
+            <a:cxnSpLocks/>
+            <a:stCxn id="37" idx="3"/>
+            <a:endCxn id="52" idx="1"/>
+          </p:cNvCxnSpPr>
+          <p:nvPr/>
+        </p:nvCxnSpPr>
+        <p:spPr>
+          <a:xfrm>
+            <a:off x="4267195" y="5544566"/>
+            <a:ext cx="1700089" cy="469228"/>
+          </a:xfrm>
+          <a:prstGeom prst="bentConnector3">
+            <a:avLst>
+              <a:gd name="adj1" fmla="val 50000"/>
+            </a:avLst>
+          </a:prstGeom>
+          <a:ln>
+            <a:tailEnd type="triangle"/>
+          </a:ln>
+        </p:spPr>
+        <p:style>
+          <a:lnRef idx="1">
+            <a:schemeClr val="accent1"/>
+          </a:lnRef>
+          <a:fillRef idx="0">
+            <a:schemeClr val="accent1"/>
+          </a:fillRef>
+          <a:effectRef idx="0">
+            <a:schemeClr val="accent1"/>
+          </a:effectRef>
+          <a:fontRef idx="minor">
+            <a:schemeClr val="tx1"/>
+          </a:fontRef>
+        </p:style>
+      </p:cxnSp>
+      <p:cxnSp>
+        <p:nvCxnSpPr>
+          <p:cNvPr id="18" name="Elbow Connector 17">
+            <a:extLst>
+              <a:ext uri="{FF2B5EF4-FFF2-40B4-BE49-F238E27FC236}">
+                <a16:creationId xmlns:a16="http://schemas.microsoft.com/office/drawing/2014/main" id="{C3C79A64-9320-F247-9FB9-A688EBFACC06}"/>
+              </a:ext>
+            </a:extLst>
+          </p:cNvPr>
+          <p:cNvCxnSpPr>
+            <a:cxnSpLocks/>
+            <a:stCxn id="35" idx="3"/>
+            <a:endCxn id="40" idx="1"/>
+          </p:cNvCxnSpPr>
+          <p:nvPr/>
+        </p:nvCxnSpPr>
+        <p:spPr>
+          <a:xfrm flipV="1">
+            <a:off x="4581635" y="4025974"/>
+            <a:ext cx="1385650" cy="1167943"/>
+          </a:xfrm>
+          <a:prstGeom prst="bentConnector3">
+            <a:avLst>
+              <a:gd name="adj1" fmla="val 50000"/>
+            </a:avLst>
+          </a:prstGeom>
+          <a:ln>
+            <a:tailEnd type="triangle"/>
+          </a:ln>
+        </p:spPr>
+        <p:style>
+          <a:lnRef idx="1">
+            <a:schemeClr val="accent1"/>
+          </a:lnRef>
+          <a:fillRef idx="0">
+            <a:schemeClr val="accent1"/>
+          </a:fillRef>
+          <a:effectRef idx="0">
+            <a:schemeClr val="accent1"/>
+          </a:effectRef>
+          <a:fontRef idx="minor">
+            <a:schemeClr val="tx1"/>
+          </a:fontRef>
+        </p:style>
+      </p:cxnSp>
+      <p:cxnSp>
+        <p:nvCxnSpPr>
+          <p:cNvPr id="21" name="Elbow Connector 20">
+            <a:extLst>
+              <a:ext uri="{FF2B5EF4-FFF2-40B4-BE49-F238E27FC236}">
+                <a16:creationId xmlns:a16="http://schemas.microsoft.com/office/drawing/2014/main" id="{9C1BDCA4-DD5D-5248-8A2E-AAE22C810104}"/>
+              </a:ext>
+            </a:extLst>
+          </p:cNvPr>
+          <p:cNvCxnSpPr>
+            <a:cxnSpLocks/>
+            <a:stCxn id="32" idx="3"/>
+            <a:endCxn id="33" idx="1"/>
+          </p:cNvCxnSpPr>
+          <p:nvPr/>
+        </p:nvCxnSpPr>
+        <p:spPr>
+          <a:xfrm flipV="1">
+            <a:off x="3603168" y="2475961"/>
+            <a:ext cx="2364116" cy="773921"/>
+          </a:xfrm>
+          <a:prstGeom prst="bentConnector3">
+            <a:avLst/>
+          </a:prstGeom>
+          <a:ln>
+            <a:tailEnd type="triangle"/>
+          </a:ln>
+        </p:spPr>
+        <p:style>
+          <a:lnRef idx="1">
+            <a:schemeClr val="accent1"/>
+          </a:lnRef>
+          <a:fillRef idx="0">
+            <a:schemeClr val="accent1"/>
+          </a:fillRef>
+          <a:effectRef idx="0">
+            <a:schemeClr val="accent1"/>
+          </a:effectRef>
+          <a:fontRef idx="minor">
+            <a:schemeClr val="tx1"/>
+          </a:fontRef>
+        </p:style>
+      </p:cxnSp>
+      <p:cxnSp>
+        <p:nvCxnSpPr>
+          <p:cNvPr id="30" name="Elbow Connector 29">
+            <a:extLst>
+              <a:ext uri="{FF2B5EF4-FFF2-40B4-BE49-F238E27FC236}">
+                <a16:creationId xmlns:a16="http://schemas.microsoft.com/office/drawing/2014/main" id="{47570092-79B6-754F-BCFD-1A5EB892AF91}"/>
+              </a:ext>
+            </a:extLst>
+          </p:cNvPr>
+          <p:cNvCxnSpPr>
+            <a:cxnSpLocks/>
+            <a:stCxn id="40" idx="2"/>
+            <a:endCxn id="49" idx="3"/>
+          </p:cNvCxnSpPr>
+          <p:nvPr/>
+        </p:nvCxnSpPr>
+        <p:spPr>
+          <a:xfrm rot="5400000">
+            <a:off x="4674198" y="3289748"/>
+            <a:ext cx="1545956" cy="3356962"/>
+          </a:xfrm>
+          <a:prstGeom prst="bentConnector2">
+            <a:avLst/>
+          </a:prstGeom>
+          <a:ln>
+            <a:prstDash val="lgDash"/>
+            <a:tailEnd type="triangle"/>
+          </a:ln>
+        </p:spPr>
+        <p:style>
+          <a:lnRef idx="1">
+            <a:schemeClr val="accent1"/>
+          </a:lnRef>
+          <a:fillRef idx="0">
+            <a:schemeClr val="accent1"/>
+          </a:fillRef>
+          <a:effectRef idx="0">
+            <a:schemeClr val="accent1"/>
+          </a:effectRef>
+          <a:fontRef idx="minor">
+            <a:schemeClr val="tx1"/>
+          </a:fontRef>
+        </p:style>
+      </p:cxnSp>
+      <p:sp>
+        <p:nvSpPr>
+          <p:cNvPr id="35" name="TextBox 34">
+            <a:extLst>
+              <a:ext uri="{FF2B5EF4-FFF2-40B4-BE49-F238E27FC236}">
+                <a16:creationId xmlns:a16="http://schemas.microsoft.com/office/drawing/2014/main" id="{DDCEA38D-6CC4-BB48-9AB5-487325E48A94}"/>
+              </a:ext>
+            </a:extLst>
+          </p:cNvPr>
+          <p:cNvSpPr txBox="1"/>
+          <p:nvPr/>
+        </p:nvSpPr>
+        <p:spPr>
+          <a:xfrm>
+            <a:off x="3317116" y="5097949"/>
+            <a:ext cx="1264519" cy="191936"/>
+          </a:xfrm>
+          <a:prstGeom prst="rect">
+            <a:avLst/>
+          </a:prstGeom>
+          <a:noFill/>
+        </p:spPr>
+        <p:txBody>
+          <a:bodyPr wrap="square" tIns="3600" bIns="3600" rtlCol="0">
+            <a:spAutoFit/>
+          </a:bodyPr>
+          <a:lstStyle/>
+          <a:p>
+            <a:r>
+              <a:rPr lang="en-LU" sz="1200" dirty="0"/>
+              <a:t> </a:t>
+            </a:r>
+          </a:p>
+        </p:txBody>
+      </p:sp>
+      <p:sp>
+        <p:nvSpPr>
+          <p:cNvPr id="37" name="TextBox 36">
+            <a:extLst>
+              <a:ext uri="{FF2B5EF4-FFF2-40B4-BE49-F238E27FC236}">
+                <a16:creationId xmlns:a16="http://schemas.microsoft.com/office/drawing/2014/main" id="{2FB68C6E-78D5-C744-AB64-6FFF14839D2C}"/>
+              </a:ext>
+            </a:extLst>
+          </p:cNvPr>
+          <p:cNvSpPr txBox="1"/>
+          <p:nvPr/>
+        </p:nvSpPr>
+        <p:spPr>
+          <a:xfrm>
+            <a:off x="3129269" y="5448598"/>
+            <a:ext cx="1137926" cy="191936"/>
+          </a:xfrm>
+          <a:prstGeom prst="rect">
+            <a:avLst/>
+          </a:prstGeom>
+          <a:noFill/>
+        </p:spPr>
+        <p:txBody>
+          <a:bodyPr wrap="square" tIns="3600" bIns="3600" rtlCol="0">
+            <a:spAutoFit/>
+          </a:bodyPr>
+          <a:lstStyle/>
+          <a:p>
+            <a:r>
+              <a:rPr lang="en-LU" sz="1200" dirty="0"/>
+              <a:t> </a:t>
+            </a:r>
+          </a:p>
+        </p:txBody>
+      </p:sp>
+      <p:sp>
+        <p:nvSpPr>
+          <p:cNvPr id="49" name="TextBox 48">
+            <a:extLst>
+              <a:ext uri="{FF2B5EF4-FFF2-40B4-BE49-F238E27FC236}">
+                <a16:creationId xmlns:a16="http://schemas.microsoft.com/office/drawing/2014/main" id="{B4E1ECCD-E0C9-7A42-974F-50F8E3DB0E11}"/>
+              </a:ext>
+            </a:extLst>
+          </p:cNvPr>
+          <p:cNvSpPr txBox="1"/>
+          <p:nvPr/>
+        </p:nvSpPr>
+        <p:spPr>
+          <a:xfrm>
+            <a:off x="3092289" y="5645239"/>
+            <a:ext cx="676406" cy="191936"/>
+          </a:xfrm>
+          <a:prstGeom prst="rect">
+            <a:avLst/>
+          </a:prstGeom>
+          <a:noFill/>
+        </p:spPr>
+        <p:txBody>
+          <a:bodyPr wrap="square" tIns="3600" bIns="3600" rtlCol="0">
+            <a:spAutoFit/>
+          </a:bodyPr>
+          <a:lstStyle/>
+          <a:p>
+            <a:r>
+              <a:rPr lang="en-LU" sz="1200" dirty="0"/>
+              <a:t> </a:t>
+            </a:r>
+          </a:p>
+        </p:txBody>
+      </p:sp>
+      <p:cxnSp>
+        <p:nvCxnSpPr>
+          <p:cNvPr id="51" name="Elbow Connector 50">
+            <a:extLst>
+              <a:ext uri="{FF2B5EF4-FFF2-40B4-BE49-F238E27FC236}">
+                <a16:creationId xmlns:a16="http://schemas.microsoft.com/office/drawing/2014/main" id="{C1EAAFEB-89C2-4548-A6C1-9069A7BEBA9F}"/>
+              </a:ext>
+            </a:extLst>
+          </p:cNvPr>
+          <p:cNvCxnSpPr>
+            <a:cxnSpLocks/>
+            <a:stCxn id="5" idx="3"/>
+            <a:endCxn id="7" idx="1"/>
+          </p:cNvCxnSpPr>
+          <p:nvPr/>
+        </p:nvCxnSpPr>
+        <p:spPr>
+          <a:xfrm>
+            <a:off x="1891430" y="1654238"/>
+            <a:ext cx="701327" cy="1998472"/>
+          </a:xfrm>
+          <a:prstGeom prst="bentConnector3">
+            <a:avLst/>
+          </a:prstGeom>
+          <a:ln>
+            <a:tailEnd type="triangle"/>
+          </a:ln>
+        </p:spPr>
+        <p:style>
+          <a:lnRef idx="1">
+            <a:schemeClr val="accent1"/>
+          </a:lnRef>
+          <a:fillRef idx="0">
+            <a:schemeClr val="accent1"/>
+          </a:fillRef>
+          <a:effectRef idx="0">
+            <a:schemeClr val="accent1"/>
+          </a:effectRef>
+          <a:fontRef idx="minor">
+            <a:schemeClr val="tx1"/>
+          </a:fontRef>
+        </p:style>
+      </p:cxnSp>
+      <p:pic>
+        <p:nvPicPr>
+          <p:cNvPr id="25" name="Google Shape;117;p28">
+            <a:extLst>
+              <a:ext uri="{FF2B5EF4-FFF2-40B4-BE49-F238E27FC236}">
+                <a16:creationId xmlns:a16="http://schemas.microsoft.com/office/drawing/2014/main" id="{D559997F-2FAD-644C-BBAD-FBAB7FCCE89D}"/>
+              </a:ext>
+            </a:extLst>
+          </p:cNvPr>
+          <p:cNvPicPr preferRelativeResize="0"/>
+          <p:nvPr/>
+        </p:nvPicPr>
+        <p:blipFill>
+          <a:blip r:embed="rId2">
+            <a:alphaModFix/>
+          </a:blip>
+          <a:stretch>
+            <a:fillRect/>
+          </a:stretch>
+        </p:blipFill>
+        <p:spPr>
+          <a:xfrm>
+            <a:off x="10424687" y="146484"/>
+            <a:ext cx="1357940" cy="1357940"/>
+          </a:xfrm>
+          <a:prstGeom prst="rect">
+            <a:avLst/>
+          </a:prstGeom>
+          <a:noFill/>
+          <a:ln>
+            <a:noFill/>
+          </a:ln>
+        </p:spPr>
+      </p:pic>
+      <p:sp>
+        <p:nvSpPr>
+          <p:cNvPr id="29" name="TextBox 28">
+            <a:extLst>
+              <a:ext uri="{FF2B5EF4-FFF2-40B4-BE49-F238E27FC236}">
+                <a16:creationId xmlns:a16="http://schemas.microsoft.com/office/drawing/2014/main" id="{74F9D4BB-9216-DA47-8F83-EEE989CF08E6}"/>
+              </a:ext>
+            </a:extLst>
+          </p:cNvPr>
+          <p:cNvSpPr txBox="1"/>
+          <p:nvPr/>
+        </p:nvSpPr>
+        <p:spPr>
+          <a:xfrm>
+            <a:off x="2600138" y="1483186"/>
+            <a:ext cx="1270944" cy="369332"/>
+          </a:xfrm>
+          <a:prstGeom prst="rect">
+            <a:avLst/>
+          </a:prstGeom>
+          <a:noFill/>
+          <a:ln>
+            <a:solidFill>
+              <a:schemeClr val="accent1"/>
+            </a:solidFill>
+          </a:ln>
+        </p:spPr>
+        <p:txBody>
+          <a:bodyPr wrap="none" rtlCol="0">
+            <a:noAutofit/>
+          </a:bodyPr>
+          <a:lstStyle/>
+          <a:p>
+            <a:r>
+              <a:rPr lang="en-US" sz="1600" dirty="0"/>
+              <a:t>constructor</a:t>
+            </a:r>
+          </a:p>
+        </p:txBody>
+      </p:sp>
+      <p:cxnSp>
+        <p:nvCxnSpPr>
+          <p:cNvPr id="31" name="Elbow Connector 30">
+            <a:extLst>
+              <a:ext uri="{FF2B5EF4-FFF2-40B4-BE49-F238E27FC236}">
+                <a16:creationId xmlns:a16="http://schemas.microsoft.com/office/drawing/2014/main" id="{FD649514-9874-5C4E-A6EF-4C4C4D5DA46B}"/>
+              </a:ext>
+            </a:extLst>
+          </p:cNvPr>
+          <p:cNvCxnSpPr>
+            <a:cxnSpLocks/>
+            <a:stCxn id="5" idx="3"/>
+            <a:endCxn id="29" idx="1"/>
+          </p:cNvCxnSpPr>
+          <p:nvPr/>
+        </p:nvCxnSpPr>
+        <p:spPr>
+          <a:xfrm>
+            <a:off x="1891430" y="1654238"/>
+            <a:ext cx="708708" cy="13614"/>
+          </a:xfrm>
+          <a:prstGeom prst="bentConnector3">
+            <a:avLst/>
+          </a:prstGeom>
+          <a:ln>
+            <a:tailEnd type="triangle"/>
+          </a:ln>
+        </p:spPr>
+        <p:style>
+          <a:lnRef idx="1">
+            <a:schemeClr val="accent1"/>
+          </a:lnRef>
+          <a:fillRef idx="0">
+            <a:schemeClr val="accent1"/>
+          </a:fillRef>
+          <a:effectRef idx="0">
+            <a:schemeClr val="accent1"/>
+          </a:effectRef>
+          <a:fontRef idx="minor">
+            <a:schemeClr val="tx1"/>
+          </a:fontRef>
+        </p:style>
+      </p:cxnSp>
+      <p:sp>
+        <p:nvSpPr>
+          <p:cNvPr id="32" name="TextBox 31">
+            <a:extLst>
+              <a:ext uri="{FF2B5EF4-FFF2-40B4-BE49-F238E27FC236}">
+                <a16:creationId xmlns:a16="http://schemas.microsoft.com/office/drawing/2014/main" id="{62EAC1FC-8303-C54A-B316-9BDA6F13CB13}"/>
+              </a:ext>
+            </a:extLst>
+          </p:cNvPr>
+          <p:cNvSpPr txBox="1"/>
+          <p:nvPr/>
+        </p:nvSpPr>
+        <p:spPr>
+          <a:xfrm>
+            <a:off x="3047997" y="3153914"/>
+            <a:ext cx="555171" cy="191936"/>
+          </a:xfrm>
+          <a:prstGeom prst="rect">
+            <a:avLst/>
+          </a:prstGeom>
+          <a:noFill/>
+        </p:spPr>
+        <p:txBody>
+          <a:bodyPr wrap="square" lIns="90000" tIns="3600" bIns="3600" rtlCol="0">
+            <a:spAutoFit/>
+          </a:bodyPr>
+          <a:lstStyle/>
+          <a:p>
+            <a:r>
+              <a:rPr lang="en-LU" sz="1200" dirty="0"/>
+              <a:t> </a:t>
+            </a:r>
+          </a:p>
+        </p:txBody>
+      </p:sp>
+      <p:sp>
+        <p:nvSpPr>
+          <p:cNvPr id="33" name="TextBox 32">
+            <a:extLst>
+              <a:ext uri="{FF2B5EF4-FFF2-40B4-BE49-F238E27FC236}">
+                <a16:creationId xmlns:a16="http://schemas.microsoft.com/office/drawing/2014/main" id="{42C5EC1E-E0B3-0E46-ADBF-93AA2485BCFA}"/>
+              </a:ext>
+            </a:extLst>
+          </p:cNvPr>
+          <p:cNvSpPr txBox="1"/>
+          <p:nvPr/>
+        </p:nvSpPr>
+        <p:spPr>
+          <a:xfrm>
+            <a:off x="5967284" y="2306684"/>
+            <a:ext cx="2806601" cy="338554"/>
+          </a:xfrm>
+          <a:prstGeom prst="rect">
+            <a:avLst/>
+          </a:prstGeom>
+          <a:noFill/>
+          <a:ln>
+            <a:solidFill>
+              <a:schemeClr val="accent1"/>
+            </a:solidFill>
+          </a:ln>
+        </p:spPr>
+        <p:txBody>
+          <a:bodyPr wrap="none" rtlCol="0">
+            <a:noAutofit/>
+          </a:bodyPr>
+          <a:lstStyle/>
+          <a:p>
+            <a:r>
+              <a:rPr lang="en-US" sz="1400" dirty="0" err="1"/>
+              <a:t>EventListener</a:t>
+            </a:r>
+            <a:r>
+              <a:rPr lang="en-US" sz="1400" dirty="0"/>
+              <a:t> “load” from Metamask</a:t>
+            </a:r>
+          </a:p>
+        </p:txBody>
+      </p:sp>
+      <p:sp>
+        <p:nvSpPr>
+          <p:cNvPr id="40" name="TextBox 39">
+            <a:extLst>
+              <a:ext uri="{FF2B5EF4-FFF2-40B4-BE49-F238E27FC236}">
+                <a16:creationId xmlns:a16="http://schemas.microsoft.com/office/drawing/2014/main" id="{C33ED113-D713-4043-8DDA-50D5D976B307}"/>
+              </a:ext>
+            </a:extLst>
+          </p:cNvPr>
+          <p:cNvSpPr txBox="1"/>
+          <p:nvPr/>
+        </p:nvSpPr>
+        <p:spPr>
+          <a:xfrm>
+            <a:off x="5967285" y="3856697"/>
+            <a:ext cx="2316744" cy="338554"/>
+          </a:xfrm>
+          <a:prstGeom prst="rect">
+            <a:avLst/>
+          </a:prstGeom>
+          <a:noFill/>
+          <a:ln>
+            <a:solidFill>
+              <a:schemeClr val="accent1"/>
+            </a:solidFill>
+          </a:ln>
+        </p:spPr>
+        <p:txBody>
+          <a:bodyPr wrap="none" rtlCol="0">
+            <a:noAutofit/>
+          </a:bodyPr>
+          <a:lstStyle/>
+          <a:p>
+            <a:r>
+              <a:rPr lang="en-US" sz="1400" dirty="0"/>
+              <a:t>Generate random disguise</a:t>
+            </a:r>
+          </a:p>
+        </p:txBody>
+      </p:sp>
+      <p:cxnSp>
+        <p:nvCxnSpPr>
+          <p:cNvPr id="42" name="Elbow Connector 41">
+            <a:extLst>
+              <a:ext uri="{FF2B5EF4-FFF2-40B4-BE49-F238E27FC236}">
+                <a16:creationId xmlns:a16="http://schemas.microsoft.com/office/drawing/2014/main" id="{78DE0365-6BBA-4F46-A337-02674D3E8C46}"/>
+              </a:ext>
+            </a:extLst>
+          </p:cNvPr>
+          <p:cNvCxnSpPr>
+            <a:cxnSpLocks/>
+            <a:stCxn id="36" idx="3"/>
+            <a:endCxn id="40" idx="1"/>
+          </p:cNvCxnSpPr>
+          <p:nvPr/>
+        </p:nvCxnSpPr>
+        <p:spPr>
+          <a:xfrm>
+            <a:off x="4234540" y="2166422"/>
+            <a:ext cx="1732745" cy="1859552"/>
+          </a:xfrm>
+          <a:prstGeom prst="bentConnector3">
+            <a:avLst>
+              <a:gd name="adj1" fmla="val 50000"/>
+            </a:avLst>
+          </a:prstGeom>
+          <a:ln>
+            <a:tailEnd type="triangle"/>
+          </a:ln>
+        </p:spPr>
+        <p:style>
+          <a:lnRef idx="1">
+            <a:schemeClr val="accent1"/>
+          </a:lnRef>
+          <a:fillRef idx="0">
+            <a:schemeClr val="accent1"/>
+          </a:fillRef>
+          <a:effectRef idx="0">
+            <a:schemeClr val="accent1"/>
+          </a:effectRef>
+          <a:fontRef idx="minor">
+            <a:schemeClr val="tx1"/>
+          </a:fontRef>
+        </p:style>
+      </p:cxnSp>
+      <p:sp>
+        <p:nvSpPr>
+          <p:cNvPr id="46" name="TextBox 45">
+            <a:extLst>
+              <a:ext uri="{FF2B5EF4-FFF2-40B4-BE49-F238E27FC236}">
+                <a16:creationId xmlns:a16="http://schemas.microsoft.com/office/drawing/2014/main" id="{B6D0CCCA-93F8-4447-A797-265F4BC9AA65}"/>
+              </a:ext>
+            </a:extLst>
+          </p:cNvPr>
+          <p:cNvSpPr txBox="1"/>
+          <p:nvPr/>
+        </p:nvSpPr>
+        <p:spPr>
+          <a:xfrm>
+            <a:off x="8777617" y="2303700"/>
+            <a:ext cx="2869312" cy="1015663"/>
+          </a:xfrm>
+          <a:prstGeom prst="rect">
+            <a:avLst/>
+          </a:prstGeom>
+          <a:noFill/>
+        </p:spPr>
+        <p:txBody>
+          <a:bodyPr wrap="none" rtlCol="0">
+            <a:spAutoFit/>
+          </a:bodyPr>
+          <a:lstStyle/>
+          <a:p>
+            <a:pPr marL="171450" indent="-171450">
+              <a:buFont typeface="Arial" panose="020B0604020202020204" pitchFamily="34" charset="0"/>
+              <a:buChar char="•"/>
+            </a:pPr>
+            <a:r>
+              <a:rPr lang="en-US" sz="1200" dirty="0"/>
+              <a:t>Query web3 list of user accounts</a:t>
+            </a:r>
+          </a:p>
+          <a:p>
+            <a:pPr marL="171450" indent="-171450">
+              <a:buFont typeface="Arial" panose="020B0604020202020204" pitchFamily="34" charset="0"/>
+              <a:buChar char="•"/>
+            </a:pPr>
+            <a:r>
+              <a:rPr lang="en-US" sz="1200" dirty="0"/>
+              <a:t>Deploy Pepito</a:t>
+            </a:r>
+          </a:p>
+          <a:p>
+            <a:pPr marL="171450" indent="-171450">
+              <a:buFont typeface="Arial" panose="020B0604020202020204" pitchFamily="34" charset="0"/>
+              <a:buChar char="•"/>
+            </a:pPr>
+            <a:r>
+              <a:rPr lang="en-US" sz="1200" dirty="0" err="1"/>
+              <a:t>setState</a:t>
+            </a:r>
+            <a:r>
+              <a:rPr lang="en-US" sz="1200" dirty="0"/>
+              <a:t>() without running anything</a:t>
+            </a:r>
+          </a:p>
+          <a:p>
+            <a:pPr marL="171450" indent="-171450">
+              <a:buFont typeface="Arial" panose="020B0604020202020204" pitchFamily="34" charset="0"/>
+              <a:buChar char="•"/>
+            </a:pPr>
+            <a:r>
+              <a:rPr lang="en-US" sz="1200" dirty="0"/>
+              <a:t>web3Connect = true</a:t>
+            </a:r>
+          </a:p>
+          <a:p>
+            <a:pPr marL="171450" indent="-171450">
+              <a:buFont typeface="Arial" panose="020B0604020202020204" pitchFamily="34" charset="0"/>
+              <a:buChar char="•"/>
+            </a:pPr>
+            <a:r>
+              <a:rPr lang="en-US" sz="1200" dirty="0" err="1"/>
+              <a:t>this.setState</a:t>
+            </a:r>
+            <a:r>
+              <a:rPr lang="en-US" sz="1200" dirty="0"/>
+              <a:t>(web3Connect, </a:t>
+            </a:r>
+            <a:r>
+              <a:rPr lang="en-US" sz="1200" dirty="0" err="1"/>
+              <a:t>console.log</a:t>
+            </a:r>
+            <a:r>
+              <a:rPr lang="en-US" sz="1200" dirty="0"/>
+              <a:t>)</a:t>
+            </a:r>
+          </a:p>
+        </p:txBody>
+      </p:sp>
+      <p:cxnSp>
+        <p:nvCxnSpPr>
+          <p:cNvPr id="48" name="Elbow Connector 47">
+            <a:extLst>
+              <a:ext uri="{FF2B5EF4-FFF2-40B4-BE49-F238E27FC236}">
+                <a16:creationId xmlns:a16="http://schemas.microsoft.com/office/drawing/2014/main" id="{E0DD562C-239D-804B-8DDD-532731A4DC40}"/>
+              </a:ext>
+            </a:extLst>
+          </p:cNvPr>
+          <p:cNvCxnSpPr>
+            <a:cxnSpLocks/>
+            <a:stCxn id="5" idx="3"/>
+            <a:endCxn id="9" idx="1"/>
+          </p:cNvCxnSpPr>
+          <p:nvPr/>
+        </p:nvCxnSpPr>
+        <p:spPr>
+          <a:xfrm>
+            <a:off x="1891430" y="1654238"/>
+            <a:ext cx="701327" cy="2853786"/>
+          </a:xfrm>
+          <a:prstGeom prst="bentConnector3">
+            <a:avLst>
+              <a:gd name="adj1" fmla="val 50000"/>
+            </a:avLst>
+          </a:prstGeom>
+          <a:ln>
+            <a:tailEnd type="triangle"/>
+          </a:ln>
+        </p:spPr>
+        <p:style>
+          <a:lnRef idx="1">
+            <a:schemeClr val="accent1"/>
+          </a:lnRef>
+          <a:fillRef idx="0">
+            <a:schemeClr val="accent1"/>
+          </a:fillRef>
+          <a:effectRef idx="0">
+            <a:schemeClr val="accent1"/>
+          </a:effectRef>
+          <a:fontRef idx="minor">
+            <a:schemeClr val="tx1"/>
+          </a:fontRef>
+        </p:style>
+      </p:cxnSp>
+      <p:sp>
+        <p:nvSpPr>
+          <p:cNvPr id="52" name="TextBox 51">
+            <a:extLst>
+              <a:ext uri="{FF2B5EF4-FFF2-40B4-BE49-F238E27FC236}">
+                <a16:creationId xmlns:a16="http://schemas.microsoft.com/office/drawing/2014/main" id="{5DA72290-B5BE-3A4E-8F41-B3EECCC92F4D}"/>
+              </a:ext>
+            </a:extLst>
+          </p:cNvPr>
+          <p:cNvSpPr txBox="1"/>
+          <p:nvPr/>
+        </p:nvSpPr>
+        <p:spPr>
+          <a:xfrm>
+            <a:off x="5967284" y="5844517"/>
+            <a:ext cx="2316744" cy="338554"/>
+          </a:xfrm>
+          <a:prstGeom prst="rect">
+            <a:avLst/>
+          </a:prstGeom>
+          <a:noFill/>
+          <a:ln>
+            <a:solidFill>
+              <a:schemeClr val="accent1"/>
+            </a:solidFill>
+          </a:ln>
+        </p:spPr>
+        <p:txBody>
+          <a:bodyPr wrap="none" rtlCol="0">
+            <a:noAutofit/>
+          </a:bodyPr>
+          <a:lstStyle/>
+          <a:p>
+            <a:r>
+              <a:rPr lang="en-US" sz="1400" dirty="0"/>
+              <a:t>Store disguise on blockchain</a:t>
+            </a:r>
+          </a:p>
+        </p:txBody>
+      </p:sp>
+      <p:sp>
+        <p:nvSpPr>
+          <p:cNvPr id="54" name="TextBox 53">
+            <a:extLst>
+              <a:ext uri="{FF2B5EF4-FFF2-40B4-BE49-F238E27FC236}">
+                <a16:creationId xmlns:a16="http://schemas.microsoft.com/office/drawing/2014/main" id="{8727D4B7-7E92-4A40-9510-B968BF9F2E3C}"/>
+              </a:ext>
+            </a:extLst>
+          </p:cNvPr>
+          <p:cNvSpPr txBox="1"/>
+          <p:nvPr/>
+        </p:nvSpPr>
+        <p:spPr>
+          <a:xfrm>
+            <a:off x="8284028" y="5919375"/>
+            <a:ext cx="3708964" cy="830997"/>
+          </a:xfrm>
+          <a:prstGeom prst="rect">
+            <a:avLst/>
+          </a:prstGeom>
+          <a:noFill/>
+        </p:spPr>
+        <p:txBody>
+          <a:bodyPr wrap="none" rtlCol="0">
+            <a:spAutoFit/>
+          </a:bodyPr>
+          <a:lstStyle/>
+          <a:p>
+            <a:pPr marL="171450" indent="-171450">
+              <a:buFont typeface="Arial" panose="020B0604020202020204" pitchFamily="34" charset="0"/>
+              <a:buChar char="•"/>
+            </a:pPr>
+            <a:r>
+              <a:rPr lang="en-US" sz="1200" dirty="0"/>
+              <a:t>if (this.state.web3Connect)…</a:t>
+            </a:r>
+          </a:p>
+          <a:p>
+            <a:pPr marL="171450" indent="-171450">
+              <a:buFont typeface="Arial" panose="020B0604020202020204" pitchFamily="34" charset="0"/>
+              <a:buChar char="•"/>
+            </a:pPr>
+            <a:r>
+              <a:rPr lang="en-US" sz="1200" dirty="0"/>
+              <a:t>Retrieve web3 from state</a:t>
+            </a:r>
+            <a:endParaRPr lang="en-US" sz="1200" dirty="0">
+              <a:solidFill>
+                <a:srgbClr val="FF0000"/>
+              </a:solidFill>
+            </a:endParaRPr>
+          </a:p>
+          <a:p>
+            <a:pPr marL="171450" indent="-171450">
+              <a:buFont typeface="Arial" panose="020B0604020202020204" pitchFamily="34" charset="0"/>
+              <a:buChar char="•"/>
+            </a:pPr>
+            <a:r>
+              <a:rPr lang="en-US" sz="1200" dirty="0"/>
+              <a:t>Call </a:t>
+            </a:r>
+            <a:r>
+              <a:rPr lang="en-US" sz="1200" dirty="0" err="1"/>
+              <a:t>createPepitoDisguise</a:t>
+            </a:r>
+            <a:endParaRPr lang="en-US" sz="1200" dirty="0"/>
+          </a:p>
+          <a:p>
+            <a:pPr marL="171450" indent="-171450">
+              <a:buFont typeface="Arial" panose="020B0604020202020204" pitchFamily="34" charset="0"/>
+              <a:buChar char="•"/>
+            </a:pPr>
+            <a:r>
+              <a:rPr lang="en-US" sz="1200" dirty="0"/>
+              <a:t>Store options in blockchain </a:t>
+            </a:r>
+            <a:r>
+              <a:rPr lang="en-US" sz="1200" dirty="0">
+                <a:solidFill>
+                  <a:srgbClr val="FF0000"/>
+                </a:solidFill>
+              </a:rPr>
+              <a:t>(3.crash function </a:t>
+            </a:r>
+            <a:r>
+              <a:rPr lang="en-US" sz="1200" dirty="0" err="1">
+                <a:solidFill>
+                  <a:srgbClr val="FF0000"/>
+                </a:solidFill>
+              </a:rPr>
+              <a:t>unkown</a:t>
+            </a:r>
+            <a:r>
+              <a:rPr lang="en-US" sz="1200" dirty="0">
+                <a:solidFill>
+                  <a:srgbClr val="FF0000"/>
+                </a:solidFill>
+              </a:rPr>
+              <a:t>)</a:t>
+            </a:r>
+            <a:endParaRPr lang="en-US" sz="1200" dirty="0"/>
+          </a:p>
+        </p:txBody>
+      </p:sp>
+      <p:sp>
+        <p:nvSpPr>
+          <p:cNvPr id="34" name="TextBox 33">
+            <a:extLst>
+              <a:ext uri="{FF2B5EF4-FFF2-40B4-BE49-F238E27FC236}">
+                <a16:creationId xmlns:a16="http://schemas.microsoft.com/office/drawing/2014/main" id="{9C234992-4A29-8245-A060-9EB80FD9C801}"/>
+              </a:ext>
+            </a:extLst>
+          </p:cNvPr>
+          <p:cNvSpPr txBox="1"/>
+          <p:nvPr/>
+        </p:nvSpPr>
+        <p:spPr>
+          <a:xfrm>
+            <a:off x="2594532" y="1857556"/>
+            <a:ext cx="3445751" cy="830997"/>
+          </a:xfrm>
+          <a:prstGeom prst="rect">
+            <a:avLst/>
+          </a:prstGeom>
+          <a:noFill/>
+        </p:spPr>
+        <p:txBody>
+          <a:bodyPr wrap="none" rtlCol="0">
+            <a:spAutoFit/>
+          </a:bodyPr>
+          <a:lstStyle/>
+          <a:p>
+            <a:pPr marL="171450" indent="-171450">
+              <a:buFont typeface="Arial" panose="020B0604020202020204" pitchFamily="34" charset="0"/>
+              <a:buChar char="•"/>
+            </a:pPr>
+            <a:r>
+              <a:rPr lang="en-US" sz="1200" dirty="0"/>
+              <a:t>Bind </a:t>
+            </a:r>
+            <a:r>
+              <a:rPr lang="en-US" sz="1200" dirty="0" err="1"/>
+              <a:t>setRandomDisguise</a:t>
+            </a:r>
+            <a:r>
+              <a:rPr lang="en-US" sz="1200" dirty="0"/>
+              <a:t>, getWeb3, </a:t>
+            </a:r>
+            <a:r>
+              <a:rPr lang="en-US" sz="1200" dirty="0" err="1"/>
+              <a:t>storeDisguise</a:t>
+            </a:r>
+            <a:endParaRPr lang="en-US" sz="1200" dirty="0"/>
+          </a:p>
+          <a:p>
+            <a:pPr marL="171450" indent="-171450">
+              <a:buFont typeface="Arial" panose="020B0604020202020204" pitchFamily="34" charset="0"/>
+              <a:buChar char="•"/>
+            </a:pPr>
+            <a:r>
+              <a:rPr lang="en-US" sz="1200" dirty="0" err="1"/>
+              <a:t>setRandomDisguise</a:t>
+            </a:r>
+            <a:r>
+              <a:rPr lang="en-US" sz="1200" dirty="0"/>
+              <a:t>()</a:t>
+            </a:r>
+          </a:p>
+          <a:p>
+            <a:pPr marL="171450" indent="-171450">
+              <a:buFont typeface="Arial" panose="020B0604020202020204" pitchFamily="34" charset="0"/>
+              <a:buChar char="•"/>
+            </a:pPr>
+            <a:r>
+              <a:rPr lang="en-US" sz="1200" dirty="0"/>
+              <a:t>this.state.web3Connect = false</a:t>
+            </a:r>
+          </a:p>
+          <a:p>
+            <a:pPr marL="171450" indent="-171450">
+              <a:buFont typeface="Arial" panose="020B0604020202020204" pitchFamily="34" charset="0"/>
+              <a:buChar char="•"/>
+            </a:pPr>
+            <a:r>
+              <a:rPr lang="en-US" sz="1200" dirty="0" err="1"/>
+              <a:t>makePepito</a:t>
+            </a:r>
+            <a:r>
+              <a:rPr lang="en-US" sz="1200" dirty="0"/>
+              <a:t>()</a:t>
+            </a:r>
+          </a:p>
+        </p:txBody>
+      </p:sp>
+      <p:sp>
+        <p:nvSpPr>
+          <p:cNvPr id="36" name="TextBox 35">
+            <a:extLst>
+              <a:ext uri="{FF2B5EF4-FFF2-40B4-BE49-F238E27FC236}">
+                <a16:creationId xmlns:a16="http://schemas.microsoft.com/office/drawing/2014/main" id="{0ACDAF79-1CD3-5440-A93A-6F9322935EDE}"/>
+              </a:ext>
+            </a:extLst>
+          </p:cNvPr>
+          <p:cNvSpPr txBox="1"/>
+          <p:nvPr/>
+        </p:nvSpPr>
+        <p:spPr>
+          <a:xfrm>
+            <a:off x="3679369" y="2027922"/>
+            <a:ext cx="555171" cy="276999"/>
+          </a:xfrm>
+          <a:prstGeom prst="rect">
+            <a:avLst/>
+          </a:prstGeom>
+          <a:noFill/>
+        </p:spPr>
+        <p:txBody>
+          <a:bodyPr wrap="square" rtlCol="0">
+            <a:spAutoFit/>
+          </a:bodyPr>
+          <a:lstStyle/>
+          <a:p>
+            <a:r>
+              <a:rPr lang="en-LU" sz="1200" dirty="0"/>
+              <a:t> </a:t>
+            </a:r>
+          </a:p>
+        </p:txBody>
+      </p:sp>
+      <p:cxnSp>
+        <p:nvCxnSpPr>
+          <p:cNvPr id="11" name="Straight Connector 10">
+            <a:extLst>
+              <a:ext uri="{FF2B5EF4-FFF2-40B4-BE49-F238E27FC236}">
+                <a16:creationId xmlns:a16="http://schemas.microsoft.com/office/drawing/2014/main" id="{395D922B-A798-674A-93E5-E4479EC5A3FC}"/>
+              </a:ext>
+            </a:extLst>
+          </p:cNvPr>
+          <p:cNvCxnSpPr>
+            <a:cxnSpLocks/>
+          </p:cNvCxnSpPr>
+          <p:nvPr/>
+        </p:nvCxnSpPr>
+        <p:spPr>
+          <a:xfrm flipH="1" flipV="1">
+            <a:off x="2675343" y="3860470"/>
+            <a:ext cx="919070" cy="231472"/>
+          </a:xfrm>
+          <a:prstGeom prst="line">
+            <a:avLst/>
+          </a:prstGeom>
+          <a:ln w="19050">
+            <a:solidFill>
+              <a:srgbClr val="FF0000"/>
+            </a:solidFill>
+          </a:ln>
+        </p:spPr>
+        <p:style>
+          <a:lnRef idx="1">
+            <a:schemeClr val="accent1"/>
+          </a:lnRef>
+          <a:fillRef idx="0">
+            <a:schemeClr val="accent1"/>
+          </a:fillRef>
+          <a:effectRef idx="0">
+            <a:schemeClr val="accent1"/>
+          </a:effectRef>
+          <a:fontRef idx="minor">
+            <a:schemeClr val="tx1"/>
+          </a:fontRef>
+        </p:style>
+      </p:cxnSp>
+      <p:sp>
+        <p:nvSpPr>
+          <p:cNvPr id="38" name="TextBox 37">
+            <a:extLst>
+              <a:ext uri="{FF2B5EF4-FFF2-40B4-BE49-F238E27FC236}">
+                <a16:creationId xmlns:a16="http://schemas.microsoft.com/office/drawing/2014/main" id="{DFC032EB-6B69-F542-A1E8-D9F9A33EB281}"/>
+              </a:ext>
+            </a:extLst>
+          </p:cNvPr>
+          <p:cNvSpPr txBox="1"/>
+          <p:nvPr/>
+        </p:nvSpPr>
+        <p:spPr>
+          <a:xfrm>
+            <a:off x="2600138" y="2786863"/>
+            <a:ext cx="1174745" cy="338554"/>
+          </a:xfrm>
+          <a:prstGeom prst="rect">
+            <a:avLst/>
+          </a:prstGeom>
+          <a:noFill/>
+          <a:ln>
+            <a:solidFill>
+              <a:schemeClr val="accent1"/>
+            </a:solidFill>
+          </a:ln>
+        </p:spPr>
+        <p:txBody>
+          <a:bodyPr wrap="none" rtlCol="0">
+            <a:spAutoFit/>
+          </a:bodyPr>
+          <a:lstStyle/>
+          <a:p>
+            <a:r>
+              <a:rPr lang="en-US" sz="1600" dirty="0" err="1"/>
+              <a:t>makePepito</a:t>
+            </a:r>
+            <a:endParaRPr lang="en-US" sz="1600" dirty="0"/>
+          </a:p>
+        </p:txBody>
+      </p:sp>
+      <p:sp>
+        <p:nvSpPr>
+          <p:cNvPr id="39" name="TextBox 38">
+            <a:extLst>
+              <a:ext uri="{FF2B5EF4-FFF2-40B4-BE49-F238E27FC236}">
+                <a16:creationId xmlns:a16="http://schemas.microsoft.com/office/drawing/2014/main" id="{0B12EC32-AFDD-EE43-81D9-6017FCDBE213}"/>
+              </a:ext>
+            </a:extLst>
+          </p:cNvPr>
+          <p:cNvSpPr txBox="1"/>
+          <p:nvPr/>
+        </p:nvSpPr>
+        <p:spPr>
+          <a:xfrm>
+            <a:off x="2601913" y="3131143"/>
+            <a:ext cx="1015278" cy="276999"/>
+          </a:xfrm>
+          <a:prstGeom prst="rect">
+            <a:avLst/>
+          </a:prstGeom>
+          <a:noFill/>
+        </p:spPr>
+        <p:txBody>
+          <a:bodyPr wrap="none" rtlCol="0">
+            <a:spAutoFit/>
+          </a:bodyPr>
+          <a:lstStyle/>
+          <a:p>
+            <a:pPr marL="171450" indent="-171450">
+              <a:buFont typeface="Arial" panose="020B0604020202020204" pitchFamily="34" charset="0"/>
+              <a:buChar char="•"/>
+            </a:pPr>
+            <a:r>
+              <a:rPr lang="en-US" sz="1200" dirty="0"/>
+              <a:t>getWeb3()</a:t>
+            </a:r>
+          </a:p>
+        </p:txBody>
+      </p:sp>
+    </p:spTree>
+    <p:extLst>
+      <p:ext uri="{BB962C8B-B14F-4D97-AF65-F5344CB8AC3E}">
+        <p14:creationId xmlns:p14="http://schemas.microsoft.com/office/powerpoint/2010/main" val="1247511756"/>
       </p:ext>
     </p:extLst>
   </p:cSld>

</xml_diff>

<commit_message>
move calls from constructor to componentDidMount, try helper
</commit_message>
<xml_diff>
--- a/Pepito/Final Project Design.pptx
+++ b/Pepito/Final Project Design.pptx
@@ -5,7 +5,7 @@
     <p:sldMasterId id="2147483648" r:id="rId1"/>
   </p:sldMasterIdLst>
   <p:notesMasterIdLst>
-    <p:notesMasterId r:id="rId8"/>
+    <p:notesMasterId r:id="rId9"/>
   </p:notesMasterIdLst>
   <p:sldIdLst>
     <p:sldId id="256" r:id="rId2"/>
@@ -14,6 +14,7 @@
     <p:sldId id="259" r:id="rId5"/>
     <p:sldId id="260" r:id="rId6"/>
     <p:sldId id="261" r:id="rId7"/>
+    <p:sldId id="262" r:id="rId8"/>
   </p:sldIdLst>
   <p:sldSz cx="12192000" cy="6858000"/>
   <p:notesSz cx="6858000" cy="9144000"/>
@@ -202,7 +203,7 @@
           <a:p>
             <a:fld id="{E3DEDAA8-261D-1A48-9864-3FC231515C43}" type="datetimeFigureOut">
               <a:rPr lang="en-LU" smtClean="0"/>
-              <a:t>27/12/2020</a:t>
+              <a:t>29/12/2020</a:t>
             </a:fld>
             <a:endParaRPr lang="en-LU"/>
           </a:p>
@@ -554,6 +555,90 @@
 </p:notes>
 </file>
 
+<file path=ppt/notesSlides/notesSlide2.xml><?xml version="1.0" encoding="utf-8"?>
+<p:notes xmlns:a="http://schemas.openxmlformats.org/drawingml/2006/main" xmlns:r="http://schemas.openxmlformats.org/officeDocument/2006/relationships" xmlns:p="http://schemas.openxmlformats.org/presentationml/2006/main">
+  <p:cSld>
+    <p:spTree>
+      <p:nvGrpSpPr>
+        <p:cNvPr id="1" name=""/>
+        <p:cNvGrpSpPr/>
+        <p:nvPr/>
+      </p:nvGrpSpPr>
+      <p:grpSpPr>
+        <a:xfrm>
+          <a:off x="0" y="0"/>
+          <a:ext cx="0" cy="0"/>
+          <a:chOff x="0" y="0"/>
+          <a:chExt cx="0" cy="0"/>
+        </a:xfrm>
+      </p:grpSpPr>
+      <p:sp>
+        <p:nvSpPr>
+          <p:cNvPr id="2" name="Slide Image Placeholder 1"/>
+          <p:cNvSpPr>
+            <a:spLocks noGrp="1" noRot="1" noChangeAspect="1"/>
+          </p:cNvSpPr>
+          <p:nvPr>
+            <p:ph type="sldImg"/>
+          </p:nvPr>
+        </p:nvSpPr>
+        <p:spPr/>
+      </p:sp>
+      <p:sp>
+        <p:nvSpPr>
+          <p:cNvPr id="3" name="Notes Placeholder 2"/>
+          <p:cNvSpPr>
+            <a:spLocks noGrp="1"/>
+          </p:cNvSpPr>
+          <p:nvPr>
+            <p:ph type="body" idx="1"/>
+          </p:nvPr>
+        </p:nvSpPr>
+        <p:spPr/>
+        <p:txBody>
+          <a:bodyPr/>
+          <a:lstStyle/>
+          <a:p>
+            <a:endParaRPr lang="en-LU" dirty="0"/>
+          </a:p>
+        </p:txBody>
+      </p:sp>
+      <p:sp>
+        <p:nvSpPr>
+          <p:cNvPr id="4" name="Slide Number Placeholder 3"/>
+          <p:cNvSpPr>
+            <a:spLocks noGrp="1"/>
+          </p:cNvSpPr>
+          <p:nvPr>
+            <p:ph type="sldNum" sz="quarter" idx="5"/>
+          </p:nvPr>
+        </p:nvSpPr>
+        <p:spPr/>
+        <p:txBody>
+          <a:bodyPr/>
+          <a:lstStyle/>
+          <a:p>
+            <a:fld id="{F4E383B0-44CE-084D-AB54-AAB397A3DF4F}" type="slidenum">
+              <a:rPr lang="en-LU" smtClean="0"/>
+              <a:t>7</a:t>
+            </a:fld>
+            <a:endParaRPr lang="en-LU"/>
+          </a:p>
+        </p:txBody>
+      </p:sp>
+    </p:spTree>
+    <p:extLst>
+      <p:ext uri="{BB962C8B-B14F-4D97-AF65-F5344CB8AC3E}">
+        <p14:creationId xmlns:p14="http://schemas.microsoft.com/office/powerpoint/2010/main" val="16169780"/>
+      </p:ext>
+    </p:extLst>
+  </p:cSld>
+  <p:clrMapOvr>
+    <a:masterClrMapping/>
+  </p:clrMapOvr>
+</p:notes>
+</file>
+
 <file path=ppt/slideLayouts/slideLayout1.xml><?xml version="1.0" encoding="utf-8"?>
 <p:sldLayout xmlns:a="http://schemas.openxmlformats.org/drawingml/2006/main" xmlns:r="http://schemas.openxmlformats.org/officeDocument/2006/relationships" xmlns:p="http://schemas.openxmlformats.org/presentationml/2006/main" type="title" preserve="1">
   <p:cSld name="Title Slide">
@@ -703,7 +788,7 @@
           <a:p>
             <a:fld id="{9ECEDF27-B25B-0343-A39C-1905A44EF111}" type="datetimeFigureOut">
               <a:rPr lang="en-LU" smtClean="0"/>
-              <a:t>27/12/2020</a:t>
+              <a:t>29/12/2020</a:t>
             </a:fld>
             <a:endParaRPr lang="en-LU"/>
           </a:p>
@@ -903,7 +988,7 @@
           <a:p>
             <a:fld id="{9ECEDF27-B25B-0343-A39C-1905A44EF111}" type="datetimeFigureOut">
               <a:rPr lang="en-LU" smtClean="0"/>
-              <a:t>27/12/2020</a:t>
+              <a:t>29/12/2020</a:t>
             </a:fld>
             <a:endParaRPr lang="en-LU"/>
           </a:p>
@@ -1113,7 +1198,7 @@
           <a:p>
             <a:fld id="{9ECEDF27-B25B-0343-A39C-1905A44EF111}" type="datetimeFigureOut">
               <a:rPr lang="en-LU" smtClean="0"/>
-              <a:t>27/12/2020</a:t>
+              <a:t>29/12/2020</a:t>
             </a:fld>
             <a:endParaRPr lang="en-LU"/>
           </a:p>
@@ -1313,7 +1398,7 @@
           <a:p>
             <a:fld id="{9ECEDF27-B25B-0343-A39C-1905A44EF111}" type="datetimeFigureOut">
               <a:rPr lang="en-LU" smtClean="0"/>
-              <a:t>27/12/2020</a:t>
+              <a:t>29/12/2020</a:t>
             </a:fld>
             <a:endParaRPr lang="en-LU"/>
           </a:p>
@@ -1589,7 +1674,7 @@
           <a:p>
             <a:fld id="{9ECEDF27-B25B-0343-A39C-1905A44EF111}" type="datetimeFigureOut">
               <a:rPr lang="en-LU" smtClean="0"/>
-              <a:t>27/12/2020</a:t>
+              <a:t>29/12/2020</a:t>
             </a:fld>
             <a:endParaRPr lang="en-LU"/>
           </a:p>
@@ -1857,7 +1942,7 @@
           <a:p>
             <a:fld id="{9ECEDF27-B25B-0343-A39C-1905A44EF111}" type="datetimeFigureOut">
               <a:rPr lang="en-LU" smtClean="0"/>
-              <a:t>27/12/2020</a:t>
+              <a:t>29/12/2020</a:t>
             </a:fld>
             <a:endParaRPr lang="en-LU"/>
           </a:p>
@@ -2272,7 +2357,7 @@
           <a:p>
             <a:fld id="{9ECEDF27-B25B-0343-A39C-1905A44EF111}" type="datetimeFigureOut">
               <a:rPr lang="en-LU" smtClean="0"/>
-              <a:t>27/12/2020</a:t>
+              <a:t>29/12/2020</a:t>
             </a:fld>
             <a:endParaRPr lang="en-LU"/>
           </a:p>
@@ -2414,7 +2499,7 @@
           <a:p>
             <a:fld id="{9ECEDF27-B25B-0343-A39C-1905A44EF111}" type="datetimeFigureOut">
               <a:rPr lang="en-LU" smtClean="0"/>
-              <a:t>27/12/2020</a:t>
+              <a:t>29/12/2020</a:t>
             </a:fld>
             <a:endParaRPr lang="en-LU"/>
           </a:p>
@@ -2527,7 +2612,7 @@
           <a:p>
             <a:fld id="{9ECEDF27-B25B-0343-A39C-1905A44EF111}" type="datetimeFigureOut">
               <a:rPr lang="en-LU" smtClean="0"/>
-              <a:t>27/12/2020</a:t>
+              <a:t>29/12/2020</a:t>
             </a:fld>
             <a:endParaRPr lang="en-LU"/>
           </a:p>
@@ -2840,7 +2925,7 @@
           <a:p>
             <a:fld id="{9ECEDF27-B25B-0343-A39C-1905A44EF111}" type="datetimeFigureOut">
               <a:rPr lang="en-LU" smtClean="0"/>
-              <a:t>27/12/2020</a:t>
+              <a:t>29/12/2020</a:t>
             </a:fld>
             <a:endParaRPr lang="en-LU"/>
           </a:p>
@@ -3129,7 +3214,7 @@
           <a:p>
             <a:fld id="{9ECEDF27-B25B-0343-A39C-1905A44EF111}" type="datetimeFigureOut">
               <a:rPr lang="en-LU" smtClean="0"/>
-              <a:t>27/12/2020</a:t>
+              <a:t>29/12/2020</a:t>
             </a:fld>
             <a:endParaRPr lang="en-LU"/>
           </a:p>
@@ -3372,7 +3457,7 @@
           <a:p>
             <a:fld id="{9ECEDF27-B25B-0343-A39C-1905A44EF111}" type="datetimeFigureOut">
               <a:rPr lang="en-LU" smtClean="0"/>
-              <a:t>27/12/2020</a:t>
+              <a:t>29/12/2020</a:t>
             </a:fld>
             <a:endParaRPr lang="en-LU"/>
           </a:p>
@@ -12867,6 +12952,1428 @@
     <p:extLst>
       <p:ext uri="{BB962C8B-B14F-4D97-AF65-F5344CB8AC3E}">
         <p14:creationId xmlns:p14="http://schemas.microsoft.com/office/powerpoint/2010/main" val="4108239115"/>
+      </p:ext>
+    </p:extLst>
+  </p:cSld>
+  <p:clrMapOvr>
+    <a:masterClrMapping/>
+  </p:clrMapOvr>
+</p:sld>
+</file>
+
+<file path=ppt/slides/slide7.xml><?xml version="1.0" encoding="utf-8"?>
+<p:sld xmlns:a="http://schemas.openxmlformats.org/drawingml/2006/main" xmlns:r="http://schemas.openxmlformats.org/officeDocument/2006/relationships" xmlns:p="http://schemas.openxmlformats.org/presentationml/2006/main">
+  <p:cSld>
+    <p:spTree>
+      <p:nvGrpSpPr>
+        <p:cNvPr id="1" name=""/>
+        <p:cNvGrpSpPr/>
+        <p:nvPr/>
+      </p:nvGrpSpPr>
+      <p:grpSpPr>
+        <a:xfrm>
+          <a:off x="0" y="0"/>
+          <a:ext cx="0" cy="0"/>
+          <a:chOff x="0" y="0"/>
+          <a:chExt cx="0" cy="0"/>
+        </a:xfrm>
+      </p:grpSpPr>
+      <p:sp>
+        <p:nvSpPr>
+          <p:cNvPr id="4" name="TextBox 3">
+            <a:extLst>
+              <a:ext uri="{FF2B5EF4-FFF2-40B4-BE49-F238E27FC236}">
+                <a16:creationId xmlns:a16="http://schemas.microsoft.com/office/drawing/2014/main" id="{7B91D8D0-F88B-784E-8FF8-D5F07BC08546}"/>
+              </a:ext>
+            </a:extLst>
+          </p:cNvPr>
+          <p:cNvSpPr txBox="1"/>
+          <p:nvPr/>
+        </p:nvSpPr>
+        <p:spPr>
+          <a:xfrm>
+            <a:off x="620486" y="413657"/>
+            <a:ext cx="4593771" cy="594250"/>
+          </a:xfrm>
+          <a:prstGeom prst="rect">
+            <a:avLst/>
+          </a:prstGeom>
+          <a:solidFill>
+            <a:srgbClr val="E1EFD8"/>
+          </a:solidFill>
+        </p:spPr>
+        <p:txBody>
+          <a:bodyPr wrap="none" rtlCol="0" anchor="ctr" anchorCtr="0">
+            <a:noAutofit/>
+          </a:bodyPr>
+          <a:lstStyle/>
+          <a:p>
+            <a:r>
+              <a:rPr lang="en-US" b="1" dirty="0">
+                <a:solidFill>
+                  <a:srgbClr val="980000"/>
+                </a:solidFill>
+              </a:rPr>
+              <a:t>Pepito – React calling sequence (Dec 29, 2020)</a:t>
+            </a:r>
+          </a:p>
+        </p:txBody>
+      </p:sp>
+      <p:sp>
+        <p:nvSpPr>
+          <p:cNvPr id="5" name="TextBox 4">
+            <a:extLst>
+              <a:ext uri="{FF2B5EF4-FFF2-40B4-BE49-F238E27FC236}">
+                <a16:creationId xmlns:a16="http://schemas.microsoft.com/office/drawing/2014/main" id="{4E7891D5-3171-C544-94BF-3D2CB24C6664}"/>
+              </a:ext>
+            </a:extLst>
+          </p:cNvPr>
+          <p:cNvSpPr txBox="1"/>
+          <p:nvPr/>
+        </p:nvSpPr>
+        <p:spPr>
+          <a:xfrm>
+            <a:off x="174171" y="1469572"/>
+            <a:ext cx="1270944" cy="369332"/>
+          </a:xfrm>
+          <a:prstGeom prst="rect">
+            <a:avLst/>
+          </a:prstGeom>
+          <a:noFill/>
+          <a:ln>
+            <a:solidFill>
+              <a:schemeClr val="accent1"/>
+            </a:solidFill>
+          </a:ln>
+        </p:spPr>
+        <p:txBody>
+          <a:bodyPr wrap="none" rtlCol="0">
+            <a:noAutofit/>
+          </a:bodyPr>
+          <a:lstStyle/>
+          <a:p>
+            <a:r>
+              <a:rPr lang="en-US" sz="1600" dirty="0"/>
+              <a:t>constructor</a:t>
+            </a:r>
+          </a:p>
+        </p:txBody>
+      </p:sp>
+      <p:sp>
+        <p:nvSpPr>
+          <p:cNvPr id="6" name="TextBox 5">
+            <a:extLst>
+              <a:ext uri="{FF2B5EF4-FFF2-40B4-BE49-F238E27FC236}">
+                <a16:creationId xmlns:a16="http://schemas.microsoft.com/office/drawing/2014/main" id="{A5D02A08-6485-3747-9743-8A8FF3F1AFD8}"/>
+              </a:ext>
+            </a:extLst>
+          </p:cNvPr>
+          <p:cNvSpPr txBox="1"/>
+          <p:nvPr/>
+        </p:nvSpPr>
+        <p:spPr>
+          <a:xfrm>
+            <a:off x="165060" y="1838904"/>
+            <a:ext cx="1658274" cy="276999"/>
+          </a:xfrm>
+          <a:prstGeom prst="rect">
+            <a:avLst/>
+          </a:prstGeom>
+          <a:noFill/>
+        </p:spPr>
+        <p:txBody>
+          <a:bodyPr wrap="none" rtlCol="0">
+            <a:spAutoFit/>
+          </a:bodyPr>
+          <a:lstStyle/>
+          <a:p>
+            <a:pPr marL="171450" indent="-171450">
+              <a:buFont typeface="Arial" panose="020B0604020202020204" pitchFamily="34" charset="0"/>
+              <a:buChar char="•"/>
+            </a:pPr>
+            <a:r>
+              <a:rPr lang="en-US" sz="1200" dirty="0"/>
+              <a:t>web3Connect = false</a:t>
+            </a:r>
+          </a:p>
+        </p:txBody>
+      </p:sp>
+      <p:sp>
+        <p:nvSpPr>
+          <p:cNvPr id="7" name="TextBox 6">
+            <a:extLst>
+              <a:ext uri="{FF2B5EF4-FFF2-40B4-BE49-F238E27FC236}">
+                <a16:creationId xmlns:a16="http://schemas.microsoft.com/office/drawing/2014/main" id="{71B0BC68-98F1-374B-B0A6-7F80DAAB776D}"/>
+              </a:ext>
+            </a:extLst>
+          </p:cNvPr>
+          <p:cNvSpPr txBox="1"/>
+          <p:nvPr/>
+        </p:nvSpPr>
+        <p:spPr>
+          <a:xfrm>
+            <a:off x="2146442" y="2059238"/>
+            <a:ext cx="1988878" cy="338554"/>
+          </a:xfrm>
+          <a:prstGeom prst="rect">
+            <a:avLst/>
+          </a:prstGeom>
+          <a:noFill/>
+          <a:ln>
+            <a:solidFill>
+              <a:schemeClr val="accent1"/>
+            </a:solidFill>
+          </a:ln>
+        </p:spPr>
+        <p:txBody>
+          <a:bodyPr wrap="none" rtlCol="0">
+            <a:spAutoFit/>
+          </a:bodyPr>
+          <a:lstStyle/>
+          <a:p>
+            <a:r>
+              <a:rPr lang="en-US" sz="1600" dirty="0" err="1"/>
+              <a:t>componentDidMount</a:t>
+            </a:r>
+            <a:endParaRPr lang="en-US" sz="1600" dirty="0"/>
+          </a:p>
+        </p:txBody>
+      </p:sp>
+      <p:sp>
+        <p:nvSpPr>
+          <p:cNvPr id="9" name="TextBox 8">
+            <a:extLst>
+              <a:ext uri="{FF2B5EF4-FFF2-40B4-BE49-F238E27FC236}">
+                <a16:creationId xmlns:a16="http://schemas.microsoft.com/office/drawing/2014/main" id="{A648BA86-9C0C-0846-A8F7-877203CF605C}"/>
+              </a:ext>
+            </a:extLst>
+          </p:cNvPr>
+          <p:cNvSpPr txBox="1"/>
+          <p:nvPr/>
+        </p:nvSpPr>
+        <p:spPr>
+          <a:xfrm>
+            <a:off x="2146442" y="3234785"/>
+            <a:ext cx="1270944" cy="369332"/>
+          </a:xfrm>
+          <a:prstGeom prst="rect">
+            <a:avLst/>
+          </a:prstGeom>
+          <a:noFill/>
+          <a:ln>
+            <a:solidFill>
+              <a:schemeClr val="accent1"/>
+            </a:solidFill>
+          </a:ln>
+        </p:spPr>
+        <p:txBody>
+          <a:bodyPr wrap="none" rtlCol="0">
+            <a:noAutofit/>
+          </a:bodyPr>
+          <a:lstStyle/>
+          <a:p>
+            <a:r>
+              <a:rPr lang="en-US" sz="1600" dirty="0"/>
+              <a:t>render</a:t>
+            </a:r>
+          </a:p>
+        </p:txBody>
+      </p:sp>
+      <p:sp>
+        <p:nvSpPr>
+          <p:cNvPr id="10" name="TextBox 9">
+            <a:extLst>
+              <a:ext uri="{FF2B5EF4-FFF2-40B4-BE49-F238E27FC236}">
+                <a16:creationId xmlns:a16="http://schemas.microsoft.com/office/drawing/2014/main" id="{9975F9DA-160B-2D4B-9A04-56DEA224E101}"/>
+              </a:ext>
+            </a:extLst>
+          </p:cNvPr>
+          <p:cNvSpPr txBox="1"/>
+          <p:nvPr/>
+        </p:nvSpPr>
+        <p:spPr>
+          <a:xfrm>
+            <a:off x="2137331" y="3604117"/>
+            <a:ext cx="2074863" cy="1384995"/>
+          </a:xfrm>
+          <a:prstGeom prst="rect">
+            <a:avLst/>
+          </a:prstGeom>
+          <a:noFill/>
+        </p:spPr>
+        <p:txBody>
+          <a:bodyPr wrap="none" rtlCol="0">
+            <a:spAutoFit/>
+          </a:bodyPr>
+          <a:lstStyle/>
+          <a:p>
+            <a:pPr marL="171450" indent="-171450">
+              <a:buFont typeface="Arial" panose="020B0604020202020204" pitchFamily="34" charset="0"/>
+              <a:buChar char="•"/>
+            </a:pPr>
+            <a:r>
+              <a:rPr lang="en-US" sz="1200" dirty="0"/>
+              <a:t>Don’t wait for web3 to load</a:t>
+            </a:r>
+          </a:p>
+          <a:p>
+            <a:pPr marL="171450" indent="-171450">
+              <a:buFont typeface="Arial" panose="020B0604020202020204" pitchFamily="34" charset="0"/>
+              <a:buChar char="•"/>
+            </a:pPr>
+            <a:r>
+              <a:rPr lang="en-US" sz="1200" dirty="0"/>
+              <a:t>Display Header</a:t>
+            </a:r>
+          </a:p>
+          <a:p>
+            <a:pPr marL="171450" indent="-171450">
+              <a:buFont typeface="Arial" panose="020B0604020202020204" pitchFamily="34" charset="0"/>
+              <a:buChar char="•"/>
+            </a:pPr>
+            <a:r>
+              <a:rPr lang="en-US" sz="1200" dirty="0"/>
+              <a:t>Button “generate disguise”</a:t>
+            </a:r>
+          </a:p>
+          <a:p>
+            <a:pPr marL="171450" indent="-171450">
+              <a:buFont typeface="Arial" panose="020B0604020202020204" pitchFamily="34" charset="0"/>
+              <a:buChar char="•"/>
+            </a:pPr>
+            <a:r>
+              <a:rPr lang="en-US" sz="1200" dirty="0"/>
+              <a:t>Logo Machu Picchu</a:t>
+            </a:r>
+          </a:p>
+          <a:p>
+            <a:pPr marL="171450" indent="-171450">
+              <a:buFont typeface="Arial" panose="020B0604020202020204" pitchFamily="34" charset="0"/>
+              <a:buChar char="•"/>
+            </a:pPr>
+            <a:r>
+              <a:rPr lang="en-US" sz="1200" dirty="0"/>
+              <a:t>Button “store disguise”</a:t>
+            </a:r>
+          </a:p>
+          <a:p>
+            <a:pPr marL="171450" indent="-171450">
+              <a:buFont typeface="Arial" panose="020B0604020202020204" pitchFamily="34" charset="0"/>
+              <a:buChar char="•"/>
+            </a:pPr>
+            <a:r>
+              <a:rPr lang="en-US" sz="1200" dirty="0"/>
+              <a:t>Display avatar</a:t>
+            </a:r>
+          </a:p>
+          <a:p>
+            <a:pPr marL="171450" indent="-171450">
+              <a:buFont typeface="Arial" panose="020B0604020202020204" pitchFamily="34" charset="0"/>
+              <a:buChar char="•"/>
+            </a:pPr>
+            <a:r>
+              <a:rPr lang="en-US" sz="1200" dirty="0"/>
+              <a:t>Display table of options</a:t>
+            </a:r>
+          </a:p>
+        </p:txBody>
+      </p:sp>
+      <p:cxnSp>
+        <p:nvCxnSpPr>
+          <p:cNvPr id="16" name="Elbow Connector 15">
+            <a:extLst>
+              <a:ext uri="{FF2B5EF4-FFF2-40B4-BE49-F238E27FC236}">
+                <a16:creationId xmlns:a16="http://schemas.microsoft.com/office/drawing/2014/main" id="{D68CB609-5862-264E-9A09-B63C0381FC84}"/>
+              </a:ext>
+            </a:extLst>
+          </p:cNvPr>
+          <p:cNvCxnSpPr>
+            <a:cxnSpLocks/>
+            <a:stCxn id="37" idx="3"/>
+            <a:endCxn id="52" idx="1"/>
+          </p:cNvCxnSpPr>
+          <p:nvPr/>
+        </p:nvCxnSpPr>
+        <p:spPr>
+          <a:xfrm>
+            <a:off x="3820880" y="4455993"/>
+            <a:ext cx="1700089" cy="1165914"/>
+          </a:xfrm>
+          <a:prstGeom prst="bentConnector3">
+            <a:avLst>
+              <a:gd name="adj1" fmla="val 50000"/>
+            </a:avLst>
+          </a:prstGeom>
+          <a:ln>
+            <a:tailEnd type="triangle"/>
+          </a:ln>
+        </p:spPr>
+        <p:style>
+          <a:lnRef idx="1">
+            <a:schemeClr val="accent1"/>
+          </a:lnRef>
+          <a:fillRef idx="0">
+            <a:schemeClr val="accent1"/>
+          </a:fillRef>
+          <a:effectRef idx="0">
+            <a:schemeClr val="accent1"/>
+          </a:effectRef>
+          <a:fontRef idx="minor">
+            <a:schemeClr val="tx1"/>
+          </a:fontRef>
+        </p:style>
+      </p:cxnSp>
+      <p:cxnSp>
+        <p:nvCxnSpPr>
+          <p:cNvPr id="18" name="Elbow Connector 17">
+            <a:extLst>
+              <a:ext uri="{FF2B5EF4-FFF2-40B4-BE49-F238E27FC236}">
+                <a16:creationId xmlns:a16="http://schemas.microsoft.com/office/drawing/2014/main" id="{C3C79A64-9320-F247-9FB9-A688EBFACC06}"/>
+              </a:ext>
+            </a:extLst>
+          </p:cNvPr>
+          <p:cNvCxnSpPr>
+            <a:cxnSpLocks/>
+            <a:stCxn id="35" idx="3"/>
+            <a:endCxn id="40" idx="1"/>
+          </p:cNvCxnSpPr>
+          <p:nvPr/>
+        </p:nvCxnSpPr>
+        <p:spPr>
+          <a:xfrm>
+            <a:off x="4135320" y="4105344"/>
+            <a:ext cx="1385650" cy="181887"/>
+          </a:xfrm>
+          <a:prstGeom prst="bentConnector3">
+            <a:avLst>
+              <a:gd name="adj1" fmla="val 50000"/>
+            </a:avLst>
+          </a:prstGeom>
+          <a:ln>
+            <a:tailEnd type="triangle"/>
+          </a:ln>
+        </p:spPr>
+        <p:style>
+          <a:lnRef idx="1">
+            <a:schemeClr val="accent1"/>
+          </a:lnRef>
+          <a:fillRef idx="0">
+            <a:schemeClr val="accent1"/>
+          </a:fillRef>
+          <a:effectRef idx="0">
+            <a:schemeClr val="accent1"/>
+          </a:effectRef>
+          <a:fontRef idx="minor">
+            <a:schemeClr val="tx1"/>
+          </a:fontRef>
+        </p:style>
+      </p:cxnSp>
+      <p:cxnSp>
+        <p:nvCxnSpPr>
+          <p:cNvPr id="21" name="Elbow Connector 20">
+            <a:extLst>
+              <a:ext uri="{FF2B5EF4-FFF2-40B4-BE49-F238E27FC236}">
+                <a16:creationId xmlns:a16="http://schemas.microsoft.com/office/drawing/2014/main" id="{9C1BDCA4-DD5D-5248-8A2E-AAE22C810104}"/>
+              </a:ext>
+            </a:extLst>
+          </p:cNvPr>
+          <p:cNvCxnSpPr>
+            <a:cxnSpLocks/>
+            <a:stCxn id="38" idx="3"/>
+            <a:endCxn id="33" idx="1"/>
+          </p:cNvCxnSpPr>
+          <p:nvPr/>
+        </p:nvCxnSpPr>
+        <p:spPr>
+          <a:xfrm>
+            <a:off x="6695714" y="2620401"/>
+            <a:ext cx="1481369" cy="12700"/>
+          </a:xfrm>
+          <a:prstGeom prst="bentConnector3">
+            <a:avLst/>
+          </a:prstGeom>
+          <a:ln>
+            <a:tailEnd type="triangle"/>
+          </a:ln>
+        </p:spPr>
+        <p:style>
+          <a:lnRef idx="1">
+            <a:schemeClr val="accent1"/>
+          </a:lnRef>
+          <a:fillRef idx="0">
+            <a:schemeClr val="accent1"/>
+          </a:fillRef>
+          <a:effectRef idx="0">
+            <a:schemeClr val="accent1"/>
+          </a:effectRef>
+          <a:fontRef idx="minor">
+            <a:schemeClr val="tx1"/>
+          </a:fontRef>
+        </p:style>
+      </p:cxnSp>
+      <p:cxnSp>
+        <p:nvCxnSpPr>
+          <p:cNvPr id="30" name="Elbow Connector 29">
+            <a:extLst>
+              <a:ext uri="{FF2B5EF4-FFF2-40B4-BE49-F238E27FC236}">
+                <a16:creationId xmlns:a16="http://schemas.microsoft.com/office/drawing/2014/main" id="{47570092-79B6-754F-BCFD-1A5EB892AF91}"/>
+              </a:ext>
+            </a:extLst>
+          </p:cNvPr>
+          <p:cNvCxnSpPr>
+            <a:cxnSpLocks/>
+            <a:stCxn id="40" idx="2"/>
+            <a:endCxn id="49" idx="3"/>
+          </p:cNvCxnSpPr>
+          <p:nvPr/>
+        </p:nvCxnSpPr>
+        <p:spPr>
+          <a:xfrm rot="5400000">
+            <a:off x="4902798" y="2876090"/>
+            <a:ext cx="196126" cy="3356962"/>
+          </a:xfrm>
+          <a:prstGeom prst="bentConnector2">
+            <a:avLst/>
+          </a:prstGeom>
+          <a:ln>
+            <a:prstDash val="lgDash"/>
+            <a:tailEnd type="triangle"/>
+          </a:ln>
+        </p:spPr>
+        <p:style>
+          <a:lnRef idx="1">
+            <a:schemeClr val="accent1"/>
+          </a:lnRef>
+          <a:fillRef idx="0">
+            <a:schemeClr val="accent1"/>
+          </a:fillRef>
+          <a:effectRef idx="0">
+            <a:schemeClr val="accent1"/>
+          </a:effectRef>
+          <a:fontRef idx="minor">
+            <a:schemeClr val="tx1"/>
+          </a:fontRef>
+        </p:style>
+      </p:cxnSp>
+      <p:sp>
+        <p:nvSpPr>
+          <p:cNvPr id="35" name="TextBox 34">
+            <a:extLst>
+              <a:ext uri="{FF2B5EF4-FFF2-40B4-BE49-F238E27FC236}">
+                <a16:creationId xmlns:a16="http://schemas.microsoft.com/office/drawing/2014/main" id="{DDCEA38D-6CC4-BB48-9AB5-487325E48A94}"/>
+              </a:ext>
+            </a:extLst>
+          </p:cNvPr>
+          <p:cNvSpPr txBox="1"/>
+          <p:nvPr/>
+        </p:nvSpPr>
+        <p:spPr>
+          <a:xfrm>
+            <a:off x="2870801" y="4009376"/>
+            <a:ext cx="1264519" cy="191936"/>
+          </a:xfrm>
+          <a:prstGeom prst="rect">
+            <a:avLst/>
+          </a:prstGeom>
+          <a:noFill/>
+        </p:spPr>
+        <p:txBody>
+          <a:bodyPr wrap="square" tIns="3600" bIns="3600" rtlCol="0">
+            <a:spAutoFit/>
+          </a:bodyPr>
+          <a:lstStyle/>
+          <a:p>
+            <a:r>
+              <a:rPr lang="en-LU" sz="1200" dirty="0"/>
+              <a:t> </a:t>
+            </a:r>
+          </a:p>
+        </p:txBody>
+      </p:sp>
+      <p:sp>
+        <p:nvSpPr>
+          <p:cNvPr id="37" name="TextBox 36">
+            <a:extLst>
+              <a:ext uri="{FF2B5EF4-FFF2-40B4-BE49-F238E27FC236}">
+                <a16:creationId xmlns:a16="http://schemas.microsoft.com/office/drawing/2014/main" id="{2FB68C6E-78D5-C744-AB64-6FFF14839D2C}"/>
+              </a:ext>
+            </a:extLst>
+          </p:cNvPr>
+          <p:cNvSpPr txBox="1"/>
+          <p:nvPr/>
+        </p:nvSpPr>
+        <p:spPr>
+          <a:xfrm>
+            <a:off x="2682954" y="4360025"/>
+            <a:ext cx="1137926" cy="191936"/>
+          </a:xfrm>
+          <a:prstGeom prst="rect">
+            <a:avLst/>
+          </a:prstGeom>
+          <a:noFill/>
+        </p:spPr>
+        <p:txBody>
+          <a:bodyPr wrap="square" tIns="3600" bIns="3600" rtlCol="0">
+            <a:spAutoFit/>
+          </a:bodyPr>
+          <a:lstStyle/>
+          <a:p>
+            <a:r>
+              <a:rPr lang="en-LU" sz="1200" dirty="0"/>
+              <a:t> </a:t>
+            </a:r>
+          </a:p>
+        </p:txBody>
+      </p:sp>
+      <p:sp>
+        <p:nvSpPr>
+          <p:cNvPr id="49" name="TextBox 48">
+            <a:extLst>
+              <a:ext uri="{FF2B5EF4-FFF2-40B4-BE49-F238E27FC236}">
+                <a16:creationId xmlns:a16="http://schemas.microsoft.com/office/drawing/2014/main" id="{B4E1ECCD-E0C9-7A42-974F-50F8E3DB0E11}"/>
+              </a:ext>
+            </a:extLst>
+          </p:cNvPr>
+          <p:cNvSpPr txBox="1"/>
+          <p:nvPr/>
+        </p:nvSpPr>
+        <p:spPr>
+          <a:xfrm>
+            <a:off x="2645974" y="4556666"/>
+            <a:ext cx="676406" cy="191936"/>
+          </a:xfrm>
+          <a:prstGeom prst="rect">
+            <a:avLst/>
+          </a:prstGeom>
+          <a:noFill/>
+        </p:spPr>
+        <p:txBody>
+          <a:bodyPr wrap="square" tIns="3600" bIns="3600" rtlCol="0">
+            <a:spAutoFit/>
+          </a:bodyPr>
+          <a:lstStyle/>
+          <a:p>
+            <a:r>
+              <a:rPr lang="en-LU" sz="1200" dirty="0"/>
+              <a:t> </a:t>
+            </a:r>
+          </a:p>
+        </p:txBody>
+      </p:sp>
+      <p:cxnSp>
+        <p:nvCxnSpPr>
+          <p:cNvPr id="51" name="Elbow Connector 50">
+            <a:extLst>
+              <a:ext uri="{FF2B5EF4-FFF2-40B4-BE49-F238E27FC236}">
+                <a16:creationId xmlns:a16="http://schemas.microsoft.com/office/drawing/2014/main" id="{C1EAAFEB-89C2-4548-A6C1-9069A7BEBA9F}"/>
+              </a:ext>
+            </a:extLst>
+          </p:cNvPr>
+          <p:cNvCxnSpPr>
+            <a:cxnSpLocks/>
+            <a:stCxn id="5" idx="3"/>
+            <a:endCxn id="7" idx="1"/>
+          </p:cNvCxnSpPr>
+          <p:nvPr/>
+        </p:nvCxnSpPr>
+        <p:spPr>
+          <a:xfrm>
+            <a:off x="1445115" y="1654238"/>
+            <a:ext cx="701327" cy="574277"/>
+          </a:xfrm>
+          <a:prstGeom prst="bentConnector3">
+            <a:avLst/>
+          </a:prstGeom>
+          <a:ln>
+            <a:tailEnd type="triangle"/>
+          </a:ln>
+        </p:spPr>
+        <p:style>
+          <a:lnRef idx="1">
+            <a:schemeClr val="accent1"/>
+          </a:lnRef>
+          <a:fillRef idx="0">
+            <a:schemeClr val="accent1"/>
+          </a:fillRef>
+          <a:effectRef idx="0">
+            <a:schemeClr val="accent1"/>
+          </a:effectRef>
+          <a:fontRef idx="minor">
+            <a:schemeClr val="tx1"/>
+          </a:fontRef>
+        </p:style>
+      </p:cxnSp>
+      <p:pic>
+        <p:nvPicPr>
+          <p:cNvPr id="25" name="Google Shape;117;p28">
+            <a:extLst>
+              <a:ext uri="{FF2B5EF4-FFF2-40B4-BE49-F238E27FC236}">
+                <a16:creationId xmlns:a16="http://schemas.microsoft.com/office/drawing/2014/main" id="{D559997F-2FAD-644C-BBAD-FBAB7FCCE89D}"/>
+              </a:ext>
+            </a:extLst>
+          </p:cNvPr>
+          <p:cNvPicPr preferRelativeResize="0"/>
+          <p:nvPr/>
+        </p:nvPicPr>
+        <p:blipFill>
+          <a:blip r:embed="rId3">
+            <a:alphaModFix/>
+          </a:blip>
+          <a:stretch>
+            <a:fillRect/>
+          </a:stretch>
+        </p:blipFill>
+        <p:spPr>
+          <a:xfrm>
+            <a:off x="10424687" y="146484"/>
+            <a:ext cx="1357940" cy="1357940"/>
+          </a:xfrm>
+          <a:prstGeom prst="rect">
+            <a:avLst/>
+          </a:prstGeom>
+          <a:noFill/>
+          <a:ln>
+            <a:noFill/>
+          </a:ln>
+        </p:spPr>
+      </p:pic>
+      <p:sp>
+        <p:nvSpPr>
+          <p:cNvPr id="29" name="TextBox 28">
+            <a:extLst>
+              <a:ext uri="{FF2B5EF4-FFF2-40B4-BE49-F238E27FC236}">
+                <a16:creationId xmlns:a16="http://schemas.microsoft.com/office/drawing/2014/main" id="{74F9D4BB-9216-DA47-8F83-EEE989CF08E6}"/>
+              </a:ext>
+            </a:extLst>
+          </p:cNvPr>
+          <p:cNvSpPr txBox="1"/>
+          <p:nvPr/>
+        </p:nvSpPr>
+        <p:spPr>
+          <a:xfrm>
+            <a:off x="2153823" y="1483186"/>
+            <a:ext cx="1270944" cy="369332"/>
+          </a:xfrm>
+          <a:prstGeom prst="rect">
+            <a:avLst/>
+          </a:prstGeom>
+          <a:noFill/>
+          <a:ln>
+            <a:solidFill>
+              <a:schemeClr val="accent1"/>
+            </a:solidFill>
+          </a:ln>
+        </p:spPr>
+        <p:txBody>
+          <a:bodyPr wrap="none" rtlCol="0">
+            <a:noAutofit/>
+          </a:bodyPr>
+          <a:lstStyle/>
+          <a:p>
+            <a:r>
+              <a:rPr lang="en-US" sz="1600" dirty="0"/>
+              <a:t>mount App</a:t>
+            </a:r>
+          </a:p>
+        </p:txBody>
+      </p:sp>
+      <p:cxnSp>
+        <p:nvCxnSpPr>
+          <p:cNvPr id="31" name="Elbow Connector 30">
+            <a:extLst>
+              <a:ext uri="{FF2B5EF4-FFF2-40B4-BE49-F238E27FC236}">
+                <a16:creationId xmlns:a16="http://schemas.microsoft.com/office/drawing/2014/main" id="{FD649514-9874-5C4E-A6EF-4C4C4D5DA46B}"/>
+              </a:ext>
+            </a:extLst>
+          </p:cNvPr>
+          <p:cNvCxnSpPr>
+            <a:cxnSpLocks/>
+            <a:stCxn id="5" idx="3"/>
+            <a:endCxn id="29" idx="1"/>
+          </p:cNvCxnSpPr>
+          <p:nvPr/>
+        </p:nvCxnSpPr>
+        <p:spPr>
+          <a:xfrm>
+            <a:off x="1445115" y="1654238"/>
+            <a:ext cx="708708" cy="13614"/>
+          </a:xfrm>
+          <a:prstGeom prst="bentConnector3">
+            <a:avLst/>
+          </a:prstGeom>
+          <a:ln>
+            <a:tailEnd type="triangle"/>
+          </a:ln>
+        </p:spPr>
+        <p:style>
+          <a:lnRef idx="1">
+            <a:schemeClr val="accent1"/>
+          </a:lnRef>
+          <a:fillRef idx="0">
+            <a:schemeClr val="accent1"/>
+          </a:fillRef>
+          <a:effectRef idx="0">
+            <a:schemeClr val="accent1"/>
+          </a:effectRef>
+          <a:fontRef idx="minor">
+            <a:schemeClr val="tx1"/>
+          </a:fontRef>
+        </p:style>
+      </p:cxnSp>
+      <p:sp>
+        <p:nvSpPr>
+          <p:cNvPr id="32" name="TextBox 31">
+            <a:extLst>
+              <a:ext uri="{FF2B5EF4-FFF2-40B4-BE49-F238E27FC236}">
+                <a16:creationId xmlns:a16="http://schemas.microsoft.com/office/drawing/2014/main" id="{62EAC1FC-8303-C54A-B316-9BDA6F13CB13}"/>
+              </a:ext>
+            </a:extLst>
+          </p:cNvPr>
+          <p:cNvSpPr txBox="1"/>
+          <p:nvPr/>
+        </p:nvSpPr>
+        <p:spPr>
+          <a:xfrm>
+            <a:off x="3450769" y="2762028"/>
+            <a:ext cx="555171" cy="191936"/>
+          </a:xfrm>
+          <a:prstGeom prst="rect">
+            <a:avLst/>
+          </a:prstGeom>
+          <a:noFill/>
+        </p:spPr>
+        <p:txBody>
+          <a:bodyPr wrap="square" lIns="90000" tIns="3600" bIns="3600" rtlCol="0">
+            <a:spAutoFit/>
+          </a:bodyPr>
+          <a:lstStyle/>
+          <a:p>
+            <a:r>
+              <a:rPr lang="en-LU" sz="1200" dirty="0"/>
+              <a:t> </a:t>
+            </a:r>
+          </a:p>
+        </p:txBody>
+      </p:sp>
+      <p:sp>
+        <p:nvSpPr>
+          <p:cNvPr id="33" name="TextBox 32">
+            <a:extLst>
+              <a:ext uri="{FF2B5EF4-FFF2-40B4-BE49-F238E27FC236}">
+                <a16:creationId xmlns:a16="http://schemas.microsoft.com/office/drawing/2014/main" id="{42C5EC1E-E0B3-0E46-ADBF-93AA2485BCFA}"/>
+              </a:ext>
+            </a:extLst>
+          </p:cNvPr>
+          <p:cNvSpPr txBox="1"/>
+          <p:nvPr/>
+        </p:nvSpPr>
+        <p:spPr>
+          <a:xfrm>
+            <a:off x="8177083" y="2451124"/>
+            <a:ext cx="2806601" cy="338554"/>
+          </a:xfrm>
+          <a:prstGeom prst="rect">
+            <a:avLst/>
+          </a:prstGeom>
+          <a:noFill/>
+          <a:ln>
+            <a:solidFill>
+              <a:schemeClr val="accent1"/>
+            </a:solidFill>
+          </a:ln>
+        </p:spPr>
+        <p:txBody>
+          <a:bodyPr wrap="none" rtlCol="0">
+            <a:noAutofit/>
+          </a:bodyPr>
+          <a:lstStyle/>
+          <a:p>
+            <a:r>
+              <a:rPr lang="en-US" sz="1400" dirty="0" err="1"/>
+              <a:t>EventListener</a:t>
+            </a:r>
+            <a:r>
+              <a:rPr lang="en-US" sz="1400" dirty="0"/>
+              <a:t> “load” from Metamask</a:t>
+            </a:r>
+          </a:p>
+        </p:txBody>
+      </p:sp>
+      <p:sp>
+        <p:nvSpPr>
+          <p:cNvPr id="40" name="TextBox 39">
+            <a:extLst>
+              <a:ext uri="{FF2B5EF4-FFF2-40B4-BE49-F238E27FC236}">
+                <a16:creationId xmlns:a16="http://schemas.microsoft.com/office/drawing/2014/main" id="{C33ED113-D713-4043-8DDA-50D5D976B307}"/>
+              </a:ext>
+            </a:extLst>
+          </p:cNvPr>
+          <p:cNvSpPr txBox="1"/>
+          <p:nvPr/>
+        </p:nvSpPr>
+        <p:spPr>
+          <a:xfrm>
+            <a:off x="5520970" y="4117954"/>
+            <a:ext cx="2316744" cy="338554"/>
+          </a:xfrm>
+          <a:prstGeom prst="rect">
+            <a:avLst/>
+          </a:prstGeom>
+          <a:noFill/>
+          <a:ln>
+            <a:solidFill>
+              <a:schemeClr val="accent1"/>
+            </a:solidFill>
+          </a:ln>
+        </p:spPr>
+        <p:txBody>
+          <a:bodyPr wrap="none" rtlCol="0">
+            <a:noAutofit/>
+          </a:bodyPr>
+          <a:lstStyle/>
+          <a:p>
+            <a:r>
+              <a:rPr lang="en-US" sz="1400" dirty="0"/>
+              <a:t>Generate random disguise</a:t>
+            </a:r>
+          </a:p>
+        </p:txBody>
+      </p:sp>
+      <p:cxnSp>
+        <p:nvCxnSpPr>
+          <p:cNvPr id="42" name="Elbow Connector 41">
+            <a:extLst>
+              <a:ext uri="{FF2B5EF4-FFF2-40B4-BE49-F238E27FC236}">
+                <a16:creationId xmlns:a16="http://schemas.microsoft.com/office/drawing/2014/main" id="{78DE0365-6BBA-4F46-A337-02674D3E8C46}"/>
+              </a:ext>
+            </a:extLst>
+          </p:cNvPr>
+          <p:cNvCxnSpPr>
+            <a:cxnSpLocks/>
+            <a:stCxn id="36" idx="3"/>
+            <a:endCxn id="40" idx="1"/>
+          </p:cNvCxnSpPr>
+          <p:nvPr/>
+        </p:nvCxnSpPr>
+        <p:spPr>
+          <a:xfrm>
+            <a:off x="3791897" y="2539729"/>
+            <a:ext cx="1729073" cy="1747502"/>
+          </a:xfrm>
+          <a:prstGeom prst="bentConnector3">
+            <a:avLst>
+              <a:gd name="adj1" fmla="val 50000"/>
+            </a:avLst>
+          </a:prstGeom>
+          <a:ln>
+            <a:tailEnd type="triangle"/>
+          </a:ln>
+        </p:spPr>
+        <p:style>
+          <a:lnRef idx="1">
+            <a:schemeClr val="accent1"/>
+          </a:lnRef>
+          <a:fillRef idx="0">
+            <a:schemeClr val="accent1"/>
+          </a:fillRef>
+          <a:effectRef idx="0">
+            <a:schemeClr val="accent1"/>
+          </a:effectRef>
+          <a:fontRef idx="minor">
+            <a:schemeClr val="tx1"/>
+          </a:fontRef>
+        </p:style>
+      </p:cxnSp>
+      <p:cxnSp>
+        <p:nvCxnSpPr>
+          <p:cNvPr id="48" name="Elbow Connector 47">
+            <a:extLst>
+              <a:ext uri="{FF2B5EF4-FFF2-40B4-BE49-F238E27FC236}">
+                <a16:creationId xmlns:a16="http://schemas.microsoft.com/office/drawing/2014/main" id="{E0DD562C-239D-804B-8DDD-532731A4DC40}"/>
+              </a:ext>
+            </a:extLst>
+          </p:cNvPr>
+          <p:cNvCxnSpPr>
+            <a:cxnSpLocks/>
+            <a:stCxn id="5" idx="3"/>
+            <a:endCxn id="9" idx="1"/>
+          </p:cNvCxnSpPr>
+          <p:nvPr/>
+        </p:nvCxnSpPr>
+        <p:spPr>
+          <a:xfrm>
+            <a:off x="1445115" y="1654238"/>
+            <a:ext cx="701327" cy="1765213"/>
+          </a:xfrm>
+          <a:prstGeom prst="bentConnector3">
+            <a:avLst>
+              <a:gd name="adj1" fmla="val 50000"/>
+            </a:avLst>
+          </a:prstGeom>
+          <a:ln>
+            <a:tailEnd type="triangle"/>
+          </a:ln>
+        </p:spPr>
+        <p:style>
+          <a:lnRef idx="1">
+            <a:schemeClr val="accent1"/>
+          </a:lnRef>
+          <a:fillRef idx="0">
+            <a:schemeClr val="accent1"/>
+          </a:fillRef>
+          <a:effectRef idx="0">
+            <a:schemeClr val="accent1"/>
+          </a:effectRef>
+          <a:fontRef idx="minor">
+            <a:schemeClr val="tx1"/>
+          </a:fontRef>
+        </p:style>
+      </p:cxnSp>
+      <p:sp>
+        <p:nvSpPr>
+          <p:cNvPr id="52" name="TextBox 51">
+            <a:extLst>
+              <a:ext uri="{FF2B5EF4-FFF2-40B4-BE49-F238E27FC236}">
+                <a16:creationId xmlns:a16="http://schemas.microsoft.com/office/drawing/2014/main" id="{5DA72290-B5BE-3A4E-8F41-B3EECCC92F4D}"/>
+              </a:ext>
+            </a:extLst>
+          </p:cNvPr>
+          <p:cNvSpPr txBox="1"/>
+          <p:nvPr/>
+        </p:nvSpPr>
+        <p:spPr>
+          <a:xfrm>
+            <a:off x="5520969" y="5452630"/>
+            <a:ext cx="2316744" cy="338554"/>
+          </a:xfrm>
+          <a:prstGeom prst="rect">
+            <a:avLst/>
+          </a:prstGeom>
+          <a:noFill/>
+          <a:ln>
+            <a:solidFill>
+              <a:schemeClr val="accent1"/>
+            </a:solidFill>
+          </a:ln>
+        </p:spPr>
+        <p:txBody>
+          <a:bodyPr wrap="none" rtlCol="0">
+            <a:noAutofit/>
+          </a:bodyPr>
+          <a:lstStyle/>
+          <a:p>
+            <a:r>
+              <a:rPr lang="en-US" sz="1400" dirty="0"/>
+              <a:t>Store disguise on blockchain</a:t>
+            </a:r>
+          </a:p>
+        </p:txBody>
+      </p:sp>
+      <p:sp>
+        <p:nvSpPr>
+          <p:cNvPr id="54" name="TextBox 53">
+            <a:extLst>
+              <a:ext uri="{FF2B5EF4-FFF2-40B4-BE49-F238E27FC236}">
+                <a16:creationId xmlns:a16="http://schemas.microsoft.com/office/drawing/2014/main" id="{8727D4B7-7E92-4A40-9510-B968BF9F2E3C}"/>
+              </a:ext>
+            </a:extLst>
+          </p:cNvPr>
+          <p:cNvSpPr txBox="1"/>
+          <p:nvPr/>
+        </p:nvSpPr>
+        <p:spPr>
+          <a:xfrm>
+            <a:off x="7837713" y="5527488"/>
+            <a:ext cx="4312912" cy="830997"/>
+          </a:xfrm>
+          <a:prstGeom prst="rect">
+            <a:avLst/>
+          </a:prstGeom>
+          <a:noFill/>
+        </p:spPr>
+        <p:txBody>
+          <a:bodyPr wrap="none" rtlCol="0">
+            <a:spAutoFit/>
+          </a:bodyPr>
+          <a:lstStyle/>
+          <a:p>
+            <a:pPr marL="171450" indent="-171450">
+              <a:buFont typeface="Arial" panose="020B0604020202020204" pitchFamily="34" charset="0"/>
+              <a:buChar char="•"/>
+            </a:pPr>
+            <a:r>
+              <a:rPr lang="en-US" sz="1200" dirty="0"/>
+              <a:t>Retrieve web3Connect from state</a:t>
+            </a:r>
+            <a:endParaRPr lang="en-US" sz="1200" dirty="0">
+              <a:solidFill>
+                <a:srgbClr val="FF0000"/>
+              </a:solidFill>
+            </a:endParaRPr>
+          </a:p>
+          <a:p>
+            <a:pPr marL="171450" indent="-171450">
+              <a:buFont typeface="Arial" panose="020B0604020202020204" pitchFamily="34" charset="0"/>
+              <a:buChar char="•"/>
+            </a:pPr>
+            <a:r>
+              <a:rPr lang="en-US" sz="1200" dirty="0"/>
+              <a:t>if (this.state.web3Connect)…</a:t>
+            </a:r>
+          </a:p>
+          <a:p>
+            <a:pPr marL="171450" indent="-171450">
+              <a:buFont typeface="Arial" panose="020B0604020202020204" pitchFamily="34" charset="0"/>
+              <a:buChar char="•"/>
+            </a:pPr>
+            <a:r>
+              <a:rPr lang="en-US" sz="1200" dirty="0"/>
+              <a:t>Call </a:t>
+            </a:r>
+            <a:r>
+              <a:rPr lang="en-US" sz="1200" dirty="0" err="1"/>
+              <a:t>createPepitoDisguise</a:t>
+            </a:r>
+            <a:endParaRPr lang="en-US" sz="1200" dirty="0"/>
+          </a:p>
+          <a:p>
+            <a:pPr marL="171450" indent="-171450">
+              <a:buFont typeface="Arial" panose="020B0604020202020204" pitchFamily="34" charset="0"/>
+              <a:buChar char="•"/>
+            </a:pPr>
+            <a:r>
+              <a:rPr lang="en-US" sz="1200" dirty="0"/>
+              <a:t>Store options in blockchain </a:t>
+            </a:r>
+            <a:r>
+              <a:rPr lang="en-US" sz="1200" dirty="0">
+                <a:solidFill>
+                  <a:srgbClr val="FF0000"/>
+                </a:solidFill>
+              </a:rPr>
+              <a:t>(crash in function of </a:t>
+            </a:r>
+            <a:r>
+              <a:rPr lang="en-US" sz="1200" dirty="0" err="1">
+                <a:solidFill>
+                  <a:srgbClr val="FF0000"/>
+                </a:solidFill>
+              </a:rPr>
+              <a:t>PepitoDisguise</a:t>
+            </a:r>
+            <a:r>
+              <a:rPr lang="en-US" sz="1200" dirty="0">
+                <a:solidFill>
+                  <a:srgbClr val="FF0000"/>
+                </a:solidFill>
+              </a:rPr>
+              <a:t>)</a:t>
+            </a:r>
+            <a:endParaRPr lang="en-US" sz="1200" dirty="0"/>
+          </a:p>
+        </p:txBody>
+      </p:sp>
+      <p:sp>
+        <p:nvSpPr>
+          <p:cNvPr id="34" name="TextBox 33">
+            <a:extLst>
+              <a:ext uri="{FF2B5EF4-FFF2-40B4-BE49-F238E27FC236}">
+                <a16:creationId xmlns:a16="http://schemas.microsoft.com/office/drawing/2014/main" id="{9C234992-4A29-8245-A060-9EB80FD9C801}"/>
+              </a:ext>
+            </a:extLst>
+          </p:cNvPr>
+          <p:cNvSpPr txBox="1"/>
+          <p:nvPr/>
+        </p:nvSpPr>
+        <p:spPr>
+          <a:xfrm>
+            <a:off x="2151889" y="2405033"/>
+            <a:ext cx="1677832" cy="461665"/>
+          </a:xfrm>
+          <a:prstGeom prst="rect">
+            <a:avLst/>
+          </a:prstGeom>
+          <a:noFill/>
+        </p:spPr>
+        <p:txBody>
+          <a:bodyPr wrap="none" rtlCol="0">
+            <a:spAutoFit/>
+          </a:bodyPr>
+          <a:lstStyle/>
+          <a:p>
+            <a:pPr marL="171450" indent="-171450">
+              <a:buFont typeface="Arial" panose="020B0604020202020204" pitchFamily="34" charset="0"/>
+              <a:buChar char="•"/>
+            </a:pPr>
+            <a:r>
+              <a:rPr lang="en-US" sz="1200" dirty="0" err="1"/>
+              <a:t>setRandomDisguise</a:t>
+            </a:r>
+            <a:r>
+              <a:rPr lang="en-US" sz="1200" dirty="0"/>
+              <a:t>()</a:t>
+            </a:r>
+          </a:p>
+          <a:p>
+            <a:pPr marL="171450" indent="-171450">
+              <a:buFont typeface="Arial" panose="020B0604020202020204" pitchFamily="34" charset="0"/>
+              <a:buChar char="•"/>
+            </a:pPr>
+            <a:r>
+              <a:rPr lang="en-US" sz="1200" dirty="0" err="1"/>
+              <a:t>makePepito</a:t>
+            </a:r>
+            <a:r>
+              <a:rPr lang="en-US" sz="1200" dirty="0"/>
+              <a:t>()</a:t>
+            </a:r>
+          </a:p>
+        </p:txBody>
+      </p:sp>
+      <p:sp>
+        <p:nvSpPr>
+          <p:cNvPr id="36" name="TextBox 35">
+            <a:extLst>
+              <a:ext uri="{FF2B5EF4-FFF2-40B4-BE49-F238E27FC236}">
+                <a16:creationId xmlns:a16="http://schemas.microsoft.com/office/drawing/2014/main" id="{0ACDAF79-1CD3-5440-A93A-6F9322935EDE}"/>
+              </a:ext>
+            </a:extLst>
+          </p:cNvPr>
+          <p:cNvSpPr txBox="1"/>
+          <p:nvPr/>
+        </p:nvSpPr>
+        <p:spPr>
+          <a:xfrm>
+            <a:off x="3236726" y="2401229"/>
+            <a:ext cx="555171" cy="276999"/>
+          </a:xfrm>
+          <a:prstGeom prst="rect">
+            <a:avLst/>
+          </a:prstGeom>
+          <a:noFill/>
+        </p:spPr>
+        <p:txBody>
+          <a:bodyPr wrap="square" rtlCol="0">
+            <a:spAutoFit/>
+          </a:bodyPr>
+          <a:lstStyle/>
+          <a:p>
+            <a:r>
+              <a:rPr lang="en-LU" sz="1200" dirty="0"/>
+              <a:t> </a:t>
+            </a:r>
+          </a:p>
+        </p:txBody>
+      </p:sp>
+      <p:sp>
+        <p:nvSpPr>
+          <p:cNvPr id="38" name="TextBox 37">
+            <a:extLst>
+              <a:ext uri="{FF2B5EF4-FFF2-40B4-BE49-F238E27FC236}">
+                <a16:creationId xmlns:a16="http://schemas.microsoft.com/office/drawing/2014/main" id="{DFC032EB-6B69-F542-A1E8-D9F9A33EB281}"/>
+              </a:ext>
+            </a:extLst>
+          </p:cNvPr>
+          <p:cNvSpPr txBox="1"/>
+          <p:nvPr/>
+        </p:nvSpPr>
+        <p:spPr>
+          <a:xfrm>
+            <a:off x="5520969" y="2451124"/>
+            <a:ext cx="1174745" cy="338554"/>
+          </a:xfrm>
+          <a:prstGeom prst="rect">
+            <a:avLst/>
+          </a:prstGeom>
+          <a:noFill/>
+          <a:ln>
+            <a:solidFill>
+              <a:schemeClr val="accent1"/>
+            </a:solidFill>
+          </a:ln>
+        </p:spPr>
+        <p:txBody>
+          <a:bodyPr wrap="none" rtlCol="0">
+            <a:spAutoFit/>
+          </a:bodyPr>
+          <a:lstStyle/>
+          <a:p>
+            <a:r>
+              <a:rPr lang="en-US" sz="1600" dirty="0" err="1"/>
+              <a:t>makePepito</a:t>
+            </a:r>
+            <a:endParaRPr lang="en-US" sz="1600" dirty="0"/>
+          </a:p>
+        </p:txBody>
+      </p:sp>
+      <p:sp>
+        <p:nvSpPr>
+          <p:cNvPr id="39" name="TextBox 38">
+            <a:extLst>
+              <a:ext uri="{FF2B5EF4-FFF2-40B4-BE49-F238E27FC236}">
+                <a16:creationId xmlns:a16="http://schemas.microsoft.com/office/drawing/2014/main" id="{0B12EC32-AFDD-EE43-81D9-6017FCDBE213}"/>
+              </a:ext>
+            </a:extLst>
+          </p:cNvPr>
+          <p:cNvSpPr txBox="1"/>
+          <p:nvPr/>
+        </p:nvSpPr>
+        <p:spPr>
+          <a:xfrm>
+            <a:off x="5522744" y="2795404"/>
+            <a:ext cx="2574872" cy="1015663"/>
+          </a:xfrm>
+          <a:prstGeom prst="rect">
+            <a:avLst/>
+          </a:prstGeom>
+          <a:noFill/>
+        </p:spPr>
+        <p:txBody>
+          <a:bodyPr wrap="none" rtlCol="0">
+            <a:spAutoFit/>
+          </a:bodyPr>
+          <a:lstStyle/>
+          <a:p>
+            <a:pPr marL="171450" indent="-171450">
+              <a:buFont typeface="Arial" panose="020B0604020202020204" pitchFamily="34" charset="0"/>
+              <a:buChar char="•"/>
+            </a:pPr>
+            <a:r>
+              <a:rPr lang="en-US" sz="1200" dirty="0"/>
+              <a:t>getWeb3()</a:t>
+            </a:r>
+          </a:p>
+          <a:p>
+            <a:pPr marL="171450" indent="-171450">
+              <a:buFont typeface="Arial" panose="020B0604020202020204" pitchFamily="34" charset="0"/>
+              <a:buChar char="•"/>
+            </a:pPr>
+            <a:r>
+              <a:rPr lang="en-US" sz="1200" dirty="0"/>
+              <a:t>Query web3 list of user accounts</a:t>
+            </a:r>
+          </a:p>
+          <a:p>
+            <a:pPr marL="171450" indent="-171450">
+              <a:buFont typeface="Arial" panose="020B0604020202020204" pitchFamily="34" charset="0"/>
+              <a:buChar char="•"/>
+            </a:pPr>
+            <a:r>
+              <a:rPr lang="en-US" sz="1200" dirty="0"/>
+              <a:t>Deploy Pepito</a:t>
+            </a:r>
+          </a:p>
+          <a:p>
+            <a:pPr marL="171450" indent="-171450">
+              <a:buFont typeface="Arial" panose="020B0604020202020204" pitchFamily="34" charset="0"/>
+              <a:buChar char="•"/>
+            </a:pPr>
+            <a:r>
+              <a:rPr lang="en-US" sz="1200" dirty="0"/>
+              <a:t>web3Connect = true</a:t>
+            </a:r>
+          </a:p>
+          <a:p>
+            <a:pPr marL="171450" indent="-171450">
+              <a:buFont typeface="Arial" panose="020B0604020202020204" pitchFamily="34" charset="0"/>
+              <a:buChar char="•"/>
+            </a:pPr>
+            <a:r>
+              <a:rPr lang="en-US" sz="1200" dirty="0" err="1"/>
+              <a:t>setState</a:t>
+            </a:r>
+            <a:r>
+              <a:rPr lang="en-US" sz="1200" dirty="0"/>
+              <a:t>() without running anything</a:t>
+            </a:r>
+          </a:p>
+        </p:txBody>
+      </p:sp>
+      <p:sp>
+        <p:nvSpPr>
+          <p:cNvPr id="43" name="TextBox 42">
+            <a:extLst>
+              <a:ext uri="{FF2B5EF4-FFF2-40B4-BE49-F238E27FC236}">
+                <a16:creationId xmlns:a16="http://schemas.microsoft.com/office/drawing/2014/main" id="{08EE9C92-A5BC-9947-9ADF-1BCDDA78419C}"/>
+              </a:ext>
+            </a:extLst>
+          </p:cNvPr>
+          <p:cNvSpPr txBox="1"/>
+          <p:nvPr/>
+        </p:nvSpPr>
+        <p:spPr>
+          <a:xfrm>
+            <a:off x="2735983" y="2608055"/>
+            <a:ext cx="555171" cy="276999"/>
+          </a:xfrm>
+          <a:prstGeom prst="rect">
+            <a:avLst/>
+          </a:prstGeom>
+          <a:noFill/>
+        </p:spPr>
+        <p:txBody>
+          <a:bodyPr wrap="square" rtlCol="0">
+            <a:spAutoFit/>
+          </a:bodyPr>
+          <a:lstStyle/>
+          <a:p>
+            <a:r>
+              <a:rPr lang="en-LU" sz="1200" dirty="0"/>
+              <a:t> </a:t>
+            </a:r>
+          </a:p>
+        </p:txBody>
+      </p:sp>
+      <p:cxnSp>
+        <p:nvCxnSpPr>
+          <p:cNvPr id="44" name="Elbow Connector 43">
+            <a:extLst>
+              <a:ext uri="{FF2B5EF4-FFF2-40B4-BE49-F238E27FC236}">
+                <a16:creationId xmlns:a16="http://schemas.microsoft.com/office/drawing/2014/main" id="{45F36770-C319-CD48-831F-CB17505D1FCC}"/>
+              </a:ext>
+            </a:extLst>
+          </p:cNvPr>
+          <p:cNvCxnSpPr>
+            <a:cxnSpLocks/>
+            <a:stCxn id="43" idx="3"/>
+            <a:endCxn id="38" idx="0"/>
+          </p:cNvCxnSpPr>
+          <p:nvPr/>
+        </p:nvCxnSpPr>
+        <p:spPr>
+          <a:xfrm flipV="1">
+            <a:off x="3291154" y="2451124"/>
+            <a:ext cx="2817188" cy="295431"/>
+          </a:xfrm>
+          <a:prstGeom prst="bentConnector4">
+            <a:avLst>
+              <a:gd name="adj1" fmla="val 39575"/>
+              <a:gd name="adj2" fmla="val 177378"/>
+            </a:avLst>
+          </a:prstGeom>
+          <a:ln>
+            <a:tailEnd type="triangle"/>
+          </a:ln>
+        </p:spPr>
+        <p:style>
+          <a:lnRef idx="1">
+            <a:schemeClr val="accent1"/>
+          </a:lnRef>
+          <a:fillRef idx="0">
+            <a:schemeClr val="accent1"/>
+          </a:fillRef>
+          <a:effectRef idx="0">
+            <a:schemeClr val="accent1"/>
+          </a:effectRef>
+          <a:fontRef idx="minor">
+            <a:schemeClr val="tx1"/>
+          </a:fontRef>
+        </p:style>
+      </p:cxnSp>
+    </p:spTree>
+    <p:extLst>
+      <p:ext uri="{BB962C8B-B14F-4D97-AF65-F5344CB8AC3E}">
+        <p14:creationId xmlns:p14="http://schemas.microsoft.com/office/powerpoint/2010/main" val="1526758373"/>
       </p:ext>
     </p:extLst>
   </p:cSld>

</xml_diff>

<commit_message>
start building up createPepitoDisguise
</commit_message>
<xml_diff>
--- a/Pepito/Final Project Design.pptx
+++ b/Pepito/Final Project Design.pptx
@@ -5,7 +5,7 @@
     <p:sldMasterId id="2147483648" r:id="rId1"/>
   </p:sldMasterIdLst>
   <p:notesMasterIdLst>
-    <p:notesMasterId r:id="rId9"/>
+    <p:notesMasterId r:id="rId10"/>
   </p:notesMasterIdLst>
   <p:sldIdLst>
     <p:sldId id="256" r:id="rId2"/>
@@ -15,6 +15,7 @@
     <p:sldId id="260" r:id="rId6"/>
     <p:sldId id="261" r:id="rId7"/>
     <p:sldId id="262" r:id="rId8"/>
+    <p:sldId id="263" r:id="rId9"/>
   </p:sldIdLst>
   <p:sldSz cx="12192000" cy="6858000"/>
   <p:notesSz cx="6858000" cy="9144000"/>
@@ -203,7 +204,7 @@
           <a:p>
             <a:fld id="{E3DEDAA8-261D-1A48-9864-3FC231515C43}" type="datetimeFigureOut">
               <a:rPr lang="en-LU" smtClean="0"/>
-              <a:t>29/12/2020</a:t>
+              <a:t>30/12/2020</a:t>
             </a:fld>
             <a:endParaRPr lang="en-LU"/>
           </a:p>
@@ -639,6 +640,90 @@
 </p:notes>
 </file>
 
+<file path=ppt/notesSlides/notesSlide3.xml><?xml version="1.0" encoding="utf-8"?>
+<p:notes xmlns:a="http://schemas.openxmlformats.org/drawingml/2006/main" xmlns:r="http://schemas.openxmlformats.org/officeDocument/2006/relationships" xmlns:p="http://schemas.openxmlformats.org/presentationml/2006/main">
+  <p:cSld>
+    <p:spTree>
+      <p:nvGrpSpPr>
+        <p:cNvPr id="1" name=""/>
+        <p:cNvGrpSpPr/>
+        <p:nvPr/>
+      </p:nvGrpSpPr>
+      <p:grpSpPr>
+        <a:xfrm>
+          <a:off x="0" y="0"/>
+          <a:ext cx="0" cy="0"/>
+          <a:chOff x="0" y="0"/>
+          <a:chExt cx="0" cy="0"/>
+        </a:xfrm>
+      </p:grpSpPr>
+      <p:sp>
+        <p:nvSpPr>
+          <p:cNvPr id="2" name="Slide Image Placeholder 1"/>
+          <p:cNvSpPr>
+            <a:spLocks noGrp="1" noRot="1" noChangeAspect="1"/>
+          </p:cNvSpPr>
+          <p:nvPr>
+            <p:ph type="sldImg"/>
+          </p:nvPr>
+        </p:nvSpPr>
+        <p:spPr/>
+      </p:sp>
+      <p:sp>
+        <p:nvSpPr>
+          <p:cNvPr id="3" name="Notes Placeholder 2"/>
+          <p:cNvSpPr>
+            <a:spLocks noGrp="1"/>
+          </p:cNvSpPr>
+          <p:nvPr>
+            <p:ph type="body" idx="1"/>
+          </p:nvPr>
+        </p:nvSpPr>
+        <p:spPr/>
+        <p:txBody>
+          <a:bodyPr/>
+          <a:lstStyle/>
+          <a:p>
+            <a:endParaRPr lang="en-LU" dirty="0"/>
+          </a:p>
+        </p:txBody>
+      </p:sp>
+      <p:sp>
+        <p:nvSpPr>
+          <p:cNvPr id="4" name="Slide Number Placeholder 3"/>
+          <p:cNvSpPr>
+            <a:spLocks noGrp="1"/>
+          </p:cNvSpPr>
+          <p:nvPr>
+            <p:ph type="sldNum" sz="quarter" idx="5"/>
+          </p:nvPr>
+        </p:nvSpPr>
+        <p:spPr/>
+        <p:txBody>
+          <a:bodyPr/>
+          <a:lstStyle/>
+          <a:p>
+            <a:fld id="{F4E383B0-44CE-084D-AB54-AAB397A3DF4F}" type="slidenum">
+              <a:rPr lang="en-LU" smtClean="0"/>
+              <a:t>8</a:t>
+            </a:fld>
+            <a:endParaRPr lang="en-LU"/>
+          </a:p>
+        </p:txBody>
+      </p:sp>
+    </p:spTree>
+    <p:extLst>
+      <p:ext uri="{BB962C8B-B14F-4D97-AF65-F5344CB8AC3E}">
+        <p14:creationId xmlns:p14="http://schemas.microsoft.com/office/powerpoint/2010/main" val="693484355"/>
+      </p:ext>
+    </p:extLst>
+  </p:cSld>
+  <p:clrMapOvr>
+    <a:masterClrMapping/>
+  </p:clrMapOvr>
+</p:notes>
+</file>
+
 <file path=ppt/slideLayouts/slideLayout1.xml><?xml version="1.0" encoding="utf-8"?>
 <p:sldLayout xmlns:a="http://schemas.openxmlformats.org/drawingml/2006/main" xmlns:r="http://schemas.openxmlformats.org/officeDocument/2006/relationships" xmlns:p="http://schemas.openxmlformats.org/presentationml/2006/main" type="title" preserve="1">
   <p:cSld name="Title Slide">
@@ -788,7 +873,7 @@
           <a:p>
             <a:fld id="{9ECEDF27-B25B-0343-A39C-1905A44EF111}" type="datetimeFigureOut">
               <a:rPr lang="en-LU" smtClean="0"/>
-              <a:t>29/12/2020</a:t>
+              <a:t>30/12/2020</a:t>
             </a:fld>
             <a:endParaRPr lang="en-LU"/>
           </a:p>
@@ -988,7 +1073,7 @@
           <a:p>
             <a:fld id="{9ECEDF27-B25B-0343-A39C-1905A44EF111}" type="datetimeFigureOut">
               <a:rPr lang="en-LU" smtClean="0"/>
-              <a:t>29/12/2020</a:t>
+              <a:t>30/12/2020</a:t>
             </a:fld>
             <a:endParaRPr lang="en-LU"/>
           </a:p>
@@ -1198,7 +1283,7 @@
           <a:p>
             <a:fld id="{9ECEDF27-B25B-0343-A39C-1905A44EF111}" type="datetimeFigureOut">
               <a:rPr lang="en-LU" smtClean="0"/>
-              <a:t>29/12/2020</a:t>
+              <a:t>30/12/2020</a:t>
             </a:fld>
             <a:endParaRPr lang="en-LU"/>
           </a:p>
@@ -1398,7 +1483,7 @@
           <a:p>
             <a:fld id="{9ECEDF27-B25B-0343-A39C-1905A44EF111}" type="datetimeFigureOut">
               <a:rPr lang="en-LU" smtClean="0"/>
-              <a:t>29/12/2020</a:t>
+              <a:t>30/12/2020</a:t>
             </a:fld>
             <a:endParaRPr lang="en-LU"/>
           </a:p>
@@ -1674,7 +1759,7 @@
           <a:p>
             <a:fld id="{9ECEDF27-B25B-0343-A39C-1905A44EF111}" type="datetimeFigureOut">
               <a:rPr lang="en-LU" smtClean="0"/>
-              <a:t>29/12/2020</a:t>
+              <a:t>30/12/2020</a:t>
             </a:fld>
             <a:endParaRPr lang="en-LU"/>
           </a:p>
@@ -1942,7 +2027,7 @@
           <a:p>
             <a:fld id="{9ECEDF27-B25B-0343-A39C-1905A44EF111}" type="datetimeFigureOut">
               <a:rPr lang="en-LU" smtClean="0"/>
-              <a:t>29/12/2020</a:t>
+              <a:t>30/12/2020</a:t>
             </a:fld>
             <a:endParaRPr lang="en-LU"/>
           </a:p>
@@ -2357,7 +2442,7 @@
           <a:p>
             <a:fld id="{9ECEDF27-B25B-0343-A39C-1905A44EF111}" type="datetimeFigureOut">
               <a:rPr lang="en-LU" smtClean="0"/>
-              <a:t>29/12/2020</a:t>
+              <a:t>30/12/2020</a:t>
             </a:fld>
             <a:endParaRPr lang="en-LU"/>
           </a:p>
@@ -2499,7 +2584,7 @@
           <a:p>
             <a:fld id="{9ECEDF27-B25B-0343-A39C-1905A44EF111}" type="datetimeFigureOut">
               <a:rPr lang="en-LU" smtClean="0"/>
-              <a:t>29/12/2020</a:t>
+              <a:t>30/12/2020</a:t>
             </a:fld>
             <a:endParaRPr lang="en-LU"/>
           </a:p>
@@ -2612,7 +2697,7 @@
           <a:p>
             <a:fld id="{9ECEDF27-B25B-0343-A39C-1905A44EF111}" type="datetimeFigureOut">
               <a:rPr lang="en-LU" smtClean="0"/>
-              <a:t>29/12/2020</a:t>
+              <a:t>30/12/2020</a:t>
             </a:fld>
             <a:endParaRPr lang="en-LU"/>
           </a:p>
@@ -2925,7 +3010,7 @@
           <a:p>
             <a:fld id="{9ECEDF27-B25B-0343-A39C-1905A44EF111}" type="datetimeFigureOut">
               <a:rPr lang="en-LU" smtClean="0"/>
-              <a:t>29/12/2020</a:t>
+              <a:t>30/12/2020</a:t>
             </a:fld>
             <a:endParaRPr lang="en-LU"/>
           </a:p>
@@ -3214,7 +3299,7 @@
           <a:p>
             <a:fld id="{9ECEDF27-B25B-0343-A39C-1905A44EF111}" type="datetimeFigureOut">
               <a:rPr lang="en-LU" smtClean="0"/>
-              <a:t>29/12/2020</a:t>
+              <a:t>30/12/2020</a:t>
             </a:fld>
             <a:endParaRPr lang="en-LU"/>
           </a:p>
@@ -3457,7 +3542,7 @@
           <a:p>
             <a:fld id="{9ECEDF27-B25B-0343-A39C-1905A44EF111}" type="datetimeFigureOut">
               <a:rPr lang="en-LU" smtClean="0"/>
-              <a:t>29/12/2020</a:t>
+              <a:t>30/12/2020</a:t>
             </a:fld>
             <a:endParaRPr lang="en-LU"/>
           </a:p>
@@ -14374,6 +14459,539 @@
     <p:extLst>
       <p:ext uri="{BB962C8B-B14F-4D97-AF65-F5344CB8AC3E}">
         <p14:creationId xmlns:p14="http://schemas.microsoft.com/office/powerpoint/2010/main" val="1526758373"/>
+      </p:ext>
+    </p:extLst>
+  </p:cSld>
+  <p:clrMapOvr>
+    <a:masterClrMapping/>
+  </p:clrMapOvr>
+</p:sld>
+</file>
+
+<file path=ppt/slides/slide8.xml><?xml version="1.0" encoding="utf-8"?>
+<p:sld xmlns:a="http://schemas.openxmlformats.org/drawingml/2006/main" xmlns:r="http://schemas.openxmlformats.org/officeDocument/2006/relationships" xmlns:p="http://schemas.openxmlformats.org/presentationml/2006/main">
+  <p:cSld>
+    <p:spTree>
+      <p:nvGrpSpPr>
+        <p:cNvPr id="1" name=""/>
+        <p:cNvGrpSpPr/>
+        <p:nvPr/>
+      </p:nvGrpSpPr>
+      <p:grpSpPr>
+        <a:xfrm>
+          <a:off x="0" y="0"/>
+          <a:ext cx="0" cy="0"/>
+          <a:chOff x="0" y="0"/>
+          <a:chExt cx="0" cy="0"/>
+        </a:xfrm>
+      </p:grpSpPr>
+      <p:sp>
+        <p:nvSpPr>
+          <p:cNvPr id="4" name="TextBox 3">
+            <a:extLst>
+              <a:ext uri="{FF2B5EF4-FFF2-40B4-BE49-F238E27FC236}">
+                <a16:creationId xmlns:a16="http://schemas.microsoft.com/office/drawing/2014/main" id="{7B91D8D0-F88B-784E-8FF8-D5F07BC08546}"/>
+              </a:ext>
+            </a:extLst>
+          </p:cNvPr>
+          <p:cNvSpPr txBox="1"/>
+          <p:nvPr/>
+        </p:nvSpPr>
+        <p:spPr>
+          <a:xfrm>
+            <a:off x="620486" y="413657"/>
+            <a:ext cx="4593771" cy="594250"/>
+          </a:xfrm>
+          <a:prstGeom prst="rect">
+            <a:avLst/>
+          </a:prstGeom>
+          <a:solidFill>
+            <a:srgbClr val="E1EFD8"/>
+          </a:solidFill>
+        </p:spPr>
+        <p:txBody>
+          <a:bodyPr wrap="none" rtlCol="0" anchor="ctr" anchorCtr="0">
+            <a:noAutofit/>
+          </a:bodyPr>
+          <a:lstStyle/>
+          <a:p>
+            <a:r>
+              <a:rPr lang="en-US" b="1" dirty="0">
+                <a:solidFill>
+                  <a:srgbClr val="980000"/>
+                </a:solidFill>
+              </a:rPr>
+              <a:t>Pepito – Solidity calling sequence</a:t>
+            </a:r>
+          </a:p>
+        </p:txBody>
+      </p:sp>
+      <p:sp>
+        <p:nvSpPr>
+          <p:cNvPr id="9" name="TextBox 8">
+            <a:extLst>
+              <a:ext uri="{FF2B5EF4-FFF2-40B4-BE49-F238E27FC236}">
+                <a16:creationId xmlns:a16="http://schemas.microsoft.com/office/drawing/2014/main" id="{A648BA86-9C0C-0846-A8F7-877203CF605C}"/>
+              </a:ext>
+            </a:extLst>
+          </p:cNvPr>
+          <p:cNvSpPr txBox="1"/>
+          <p:nvPr/>
+        </p:nvSpPr>
+        <p:spPr>
+          <a:xfrm>
+            <a:off x="816901" y="1878618"/>
+            <a:ext cx="2576360" cy="1550382"/>
+          </a:xfrm>
+          <a:prstGeom prst="rect">
+            <a:avLst/>
+          </a:prstGeom>
+          <a:noFill/>
+          <a:ln>
+            <a:solidFill>
+              <a:schemeClr val="accent1"/>
+            </a:solidFill>
+          </a:ln>
+        </p:spPr>
+        <p:txBody>
+          <a:bodyPr wrap="none" rtlCol="0">
+            <a:noAutofit/>
+          </a:bodyPr>
+          <a:lstStyle/>
+          <a:p>
+            <a:r>
+              <a:rPr lang="en-US" sz="1600" dirty="0"/>
+              <a:t>Pepito</a:t>
+            </a:r>
+          </a:p>
+          <a:p>
+            <a:pPr marL="171450" indent="-171450">
+              <a:buFont typeface="Arial" panose="020B0604020202020204" pitchFamily="34" charset="0"/>
+              <a:buChar char="•"/>
+            </a:pPr>
+            <a:r>
+              <a:rPr lang="en-US" sz="1200" dirty="0" err="1"/>
+              <a:t>registerDisguise</a:t>
+            </a:r>
+            <a:endParaRPr lang="en-US" sz="1200" dirty="0"/>
+          </a:p>
+          <a:p>
+            <a:pPr marL="171450" indent="-171450">
+              <a:buFont typeface="Arial" panose="020B0604020202020204" pitchFamily="34" charset="0"/>
+              <a:buChar char="•"/>
+            </a:pPr>
+            <a:r>
+              <a:rPr lang="en-US" sz="1200" dirty="0" err="1"/>
+              <a:t>createPepitoDisguise</a:t>
+            </a:r>
+            <a:endParaRPr lang="en-US" sz="1200" dirty="0"/>
+          </a:p>
+          <a:p>
+            <a:pPr marL="628650" lvl="1" indent="-171450">
+              <a:buFont typeface="Arial" panose="020B0604020202020204" pitchFamily="34" charset="0"/>
+              <a:buChar char="•"/>
+            </a:pPr>
+            <a:r>
+              <a:rPr lang="en-US" sz="1200" dirty="0"/>
+              <a:t>emit </a:t>
+            </a:r>
+            <a:r>
+              <a:rPr lang="en-US" sz="1200" dirty="0" err="1"/>
+              <a:t>PepitoDisguiseCreated</a:t>
+            </a:r>
+            <a:endParaRPr lang="en-US" sz="1200" dirty="0"/>
+          </a:p>
+          <a:p>
+            <a:pPr marL="171450" indent="-171450">
+              <a:buFont typeface="Arial" panose="020B0604020202020204" pitchFamily="34" charset="0"/>
+              <a:buChar char="•"/>
+            </a:pPr>
+            <a:r>
+              <a:rPr lang="en-US" sz="1200" dirty="0" err="1"/>
+              <a:t>getPepitoDisguise</a:t>
+            </a:r>
+            <a:endParaRPr lang="en-US" sz="1200" dirty="0"/>
+          </a:p>
+          <a:p>
+            <a:pPr marL="171450" indent="-171450">
+              <a:buFont typeface="Arial" panose="020B0604020202020204" pitchFamily="34" charset="0"/>
+              <a:buChar char="•"/>
+            </a:pPr>
+            <a:r>
+              <a:rPr lang="en-US" sz="1200" dirty="0" err="1"/>
+              <a:t>toggleContractActive</a:t>
+            </a:r>
+            <a:endParaRPr lang="en-US" sz="1200" dirty="0"/>
+          </a:p>
+          <a:p>
+            <a:pPr marL="171450" indent="-171450">
+              <a:buFont typeface="Arial" panose="020B0604020202020204" pitchFamily="34" charset="0"/>
+              <a:buChar char="•"/>
+            </a:pPr>
+            <a:r>
+              <a:rPr lang="en-US" sz="1200" dirty="0"/>
+              <a:t>withdraw</a:t>
+            </a:r>
+          </a:p>
+        </p:txBody>
+      </p:sp>
+      <p:pic>
+        <p:nvPicPr>
+          <p:cNvPr id="25" name="Google Shape;117;p28">
+            <a:extLst>
+              <a:ext uri="{FF2B5EF4-FFF2-40B4-BE49-F238E27FC236}">
+                <a16:creationId xmlns:a16="http://schemas.microsoft.com/office/drawing/2014/main" id="{D559997F-2FAD-644C-BBAD-FBAB7FCCE89D}"/>
+              </a:ext>
+            </a:extLst>
+          </p:cNvPr>
+          <p:cNvPicPr preferRelativeResize="0"/>
+          <p:nvPr/>
+        </p:nvPicPr>
+        <p:blipFill>
+          <a:blip r:embed="rId3">
+            <a:alphaModFix/>
+          </a:blip>
+          <a:stretch>
+            <a:fillRect/>
+          </a:stretch>
+        </p:blipFill>
+        <p:spPr>
+          <a:xfrm>
+            <a:off x="10424687" y="146484"/>
+            <a:ext cx="1357940" cy="1357940"/>
+          </a:xfrm>
+          <a:prstGeom prst="rect">
+            <a:avLst/>
+          </a:prstGeom>
+          <a:noFill/>
+          <a:ln>
+            <a:noFill/>
+          </a:ln>
+        </p:spPr>
+      </p:pic>
+      <p:sp>
+        <p:nvSpPr>
+          <p:cNvPr id="32" name="TextBox 31">
+            <a:extLst>
+              <a:ext uri="{FF2B5EF4-FFF2-40B4-BE49-F238E27FC236}">
+                <a16:creationId xmlns:a16="http://schemas.microsoft.com/office/drawing/2014/main" id="{62EAC1FC-8303-C54A-B316-9BDA6F13CB13}"/>
+              </a:ext>
+            </a:extLst>
+          </p:cNvPr>
+          <p:cNvSpPr txBox="1"/>
+          <p:nvPr/>
+        </p:nvSpPr>
+        <p:spPr>
+          <a:xfrm>
+            <a:off x="3450769" y="2762028"/>
+            <a:ext cx="555171" cy="191936"/>
+          </a:xfrm>
+          <a:prstGeom prst="rect">
+            <a:avLst/>
+          </a:prstGeom>
+          <a:noFill/>
+        </p:spPr>
+        <p:txBody>
+          <a:bodyPr wrap="square" lIns="90000" tIns="3600" bIns="3600" rtlCol="0">
+            <a:spAutoFit/>
+          </a:bodyPr>
+          <a:lstStyle/>
+          <a:p>
+            <a:r>
+              <a:rPr lang="en-LU" sz="1200" dirty="0"/>
+              <a:t> </a:t>
+            </a:r>
+          </a:p>
+        </p:txBody>
+      </p:sp>
+      <p:cxnSp>
+        <p:nvCxnSpPr>
+          <p:cNvPr id="42" name="Elbow Connector 41">
+            <a:extLst>
+              <a:ext uri="{FF2B5EF4-FFF2-40B4-BE49-F238E27FC236}">
+                <a16:creationId xmlns:a16="http://schemas.microsoft.com/office/drawing/2014/main" id="{78DE0365-6BBA-4F46-A337-02674D3E8C46}"/>
+              </a:ext>
+            </a:extLst>
+          </p:cNvPr>
+          <p:cNvCxnSpPr>
+            <a:cxnSpLocks/>
+            <a:stCxn id="36" idx="3"/>
+          </p:cNvCxnSpPr>
+          <p:nvPr/>
+        </p:nvCxnSpPr>
+        <p:spPr>
+          <a:xfrm flipV="1">
+            <a:off x="2473070" y="2079321"/>
+            <a:ext cx="2164301" cy="388610"/>
+          </a:xfrm>
+          <a:prstGeom prst="bentConnector3">
+            <a:avLst>
+              <a:gd name="adj1" fmla="val 50000"/>
+            </a:avLst>
+          </a:prstGeom>
+          <a:ln>
+            <a:tailEnd type="triangle"/>
+          </a:ln>
+        </p:spPr>
+        <p:style>
+          <a:lnRef idx="1">
+            <a:schemeClr val="accent1"/>
+          </a:lnRef>
+          <a:fillRef idx="0">
+            <a:schemeClr val="accent1"/>
+          </a:fillRef>
+          <a:effectRef idx="0">
+            <a:schemeClr val="accent1"/>
+          </a:effectRef>
+          <a:fontRef idx="minor">
+            <a:schemeClr val="tx1"/>
+          </a:fontRef>
+        </p:style>
+      </p:cxnSp>
+      <p:sp>
+        <p:nvSpPr>
+          <p:cNvPr id="36" name="TextBox 35">
+            <a:extLst>
+              <a:ext uri="{FF2B5EF4-FFF2-40B4-BE49-F238E27FC236}">
+                <a16:creationId xmlns:a16="http://schemas.microsoft.com/office/drawing/2014/main" id="{0ACDAF79-1CD3-5440-A93A-6F9322935EDE}"/>
+              </a:ext>
+            </a:extLst>
+          </p:cNvPr>
+          <p:cNvSpPr txBox="1"/>
+          <p:nvPr/>
+        </p:nvSpPr>
+        <p:spPr>
+          <a:xfrm>
+            <a:off x="1917899" y="2372531"/>
+            <a:ext cx="555171" cy="190800"/>
+          </a:xfrm>
+          <a:prstGeom prst="rect">
+            <a:avLst/>
+          </a:prstGeom>
+          <a:noFill/>
+          <a:ln>
+            <a:noFill/>
+          </a:ln>
+        </p:spPr>
+        <p:txBody>
+          <a:bodyPr wrap="square" tIns="3600" bIns="3600" rtlCol="0">
+            <a:spAutoFit/>
+          </a:bodyPr>
+          <a:lstStyle/>
+          <a:p>
+            <a:r>
+              <a:rPr lang="en-LU" sz="1200" dirty="0"/>
+              <a:t> </a:t>
+            </a:r>
+          </a:p>
+        </p:txBody>
+      </p:sp>
+      <p:sp>
+        <p:nvSpPr>
+          <p:cNvPr id="41" name="TextBox 40">
+            <a:extLst>
+              <a:ext uri="{FF2B5EF4-FFF2-40B4-BE49-F238E27FC236}">
+                <a16:creationId xmlns:a16="http://schemas.microsoft.com/office/drawing/2014/main" id="{F4C0BFC7-6A70-7A41-B11C-BFAC88A20486}"/>
+              </a:ext>
+            </a:extLst>
+          </p:cNvPr>
+          <p:cNvSpPr txBox="1"/>
+          <p:nvPr/>
+        </p:nvSpPr>
+        <p:spPr>
+          <a:xfrm>
+            <a:off x="4694879" y="1878618"/>
+            <a:ext cx="2164301" cy="2976411"/>
+          </a:xfrm>
+          <a:prstGeom prst="rect">
+            <a:avLst/>
+          </a:prstGeom>
+          <a:noFill/>
+          <a:ln>
+            <a:solidFill>
+              <a:schemeClr val="accent1"/>
+            </a:solidFill>
+          </a:ln>
+        </p:spPr>
+        <p:txBody>
+          <a:bodyPr wrap="none" rtlCol="0">
+            <a:noAutofit/>
+          </a:bodyPr>
+          <a:lstStyle/>
+          <a:p>
+            <a:r>
+              <a:rPr lang="en-US" sz="1600" dirty="0" err="1"/>
+              <a:t>PepitoDisguise</a:t>
+            </a:r>
+            <a:endParaRPr lang="en-US" sz="1600" dirty="0"/>
+          </a:p>
+          <a:p>
+            <a:pPr marL="171450" indent="-171450">
+              <a:buFont typeface="Arial" panose="020B0604020202020204" pitchFamily="34" charset="0"/>
+              <a:buChar char="•"/>
+            </a:pPr>
+            <a:r>
+              <a:rPr lang="en-US" sz="1200" dirty="0" err="1"/>
+              <a:t>setTopType</a:t>
+            </a:r>
+            <a:endParaRPr lang="en-US" sz="1200" dirty="0"/>
+          </a:p>
+          <a:p>
+            <a:pPr marL="171450" indent="-171450">
+              <a:buFont typeface="Arial" panose="020B0604020202020204" pitchFamily="34" charset="0"/>
+              <a:buChar char="•"/>
+            </a:pPr>
+            <a:r>
+              <a:rPr lang="en-US" sz="1200" dirty="0" err="1"/>
+              <a:t>setHatColor</a:t>
+            </a:r>
+            <a:endParaRPr lang="en-US" sz="1200" dirty="0"/>
+          </a:p>
+          <a:p>
+            <a:pPr marL="171450" indent="-171450">
+              <a:buFont typeface="Arial" panose="020B0604020202020204" pitchFamily="34" charset="0"/>
+              <a:buChar char="•"/>
+            </a:pPr>
+            <a:r>
+              <a:rPr lang="en-US" sz="1200" dirty="0" err="1"/>
+              <a:t>setAccessoriesType</a:t>
+            </a:r>
+            <a:endParaRPr lang="en-US" sz="1200" dirty="0"/>
+          </a:p>
+          <a:p>
+            <a:pPr marL="171450" indent="-171450">
+              <a:buFont typeface="Arial" panose="020B0604020202020204" pitchFamily="34" charset="0"/>
+              <a:buChar char="•"/>
+            </a:pPr>
+            <a:r>
+              <a:rPr lang="en-US" sz="1200" dirty="0" err="1"/>
+              <a:t>setHairColor</a:t>
+            </a:r>
+            <a:endParaRPr lang="en-US" sz="1200" dirty="0"/>
+          </a:p>
+          <a:p>
+            <a:pPr marL="171450" indent="-171450">
+              <a:buFont typeface="Arial" panose="020B0604020202020204" pitchFamily="34" charset="0"/>
+              <a:buChar char="•"/>
+            </a:pPr>
+            <a:r>
+              <a:rPr lang="en-US" sz="1200" dirty="0" err="1"/>
+              <a:t>setFacialHairType</a:t>
+            </a:r>
+            <a:endParaRPr lang="en-US" sz="1200" dirty="0"/>
+          </a:p>
+          <a:p>
+            <a:pPr marL="171450" indent="-171450">
+              <a:buFont typeface="Arial" panose="020B0604020202020204" pitchFamily="34" charset="0"/>
+              <a:buChar char="•"/>
+            </a:pPr>
+            <a:r>
+              <a:rPr lang="en-US" sz="1200" dirty="0" err="1"/>
+              <a:t>setClotheType</a:t>
+            </a:r>
+            <a:endParaRPr lang="en-US" sz="1200" dirty="0"/>
+          </a:p>
+          <a:p>
+            <a:pPr marL="171450" indent="-171450">
+              <a:buFont typeface="Arial" panose="020B0604020202020204" pitchFamily="34" charset="0"/>
+              <a:buChar char="•"/>
+            </a:pPr>
+            <a:r>
+              <a:rPr lang="en-US" sz="1200" dirty="0" err="1"/>
+              <a:t>setClotheColor</a:t>
+            </a:r>
+            <a:endParaRPr lang="en-US" sz="1200" dirty="0"/>
+          </a:p>
+          <a:p>
+            <a:pPr marL="171450" indent="-171450">
+              <a:buFont typeface="Arial" panose="020B0604020202020204" pitchFamily="34" charset="0"/>
+              <a:buChar char="•"/>
+            </a:pPr>
+            <a:r>
+              <a:rPr lang="en-US" sz="1200" dirty="0" err="1"/>
+              <a:t>setEyeType</a:t>
+            </a:r>
+            <a:endParaRPr lang="en-US" sz="1200" dirty="0"/>
+          </a:p>
+          <a:p>
+            <a:pPr marL="171450" indent="-171450">
+              <a:buFont typeface="Arial" panose="020B0604020202020204" pitchFamily="34" charset="0"/>
+              <a:buChar char="•"/>
+            </a:pPr>
+            <a:r>
+              <a:rPr lang="en-US" sz="1200" dirty="0" err="1"/>
+              <a:t>setEyebrowType</a:t>
+            </a:r>
+            <a:endParaRPr lang="en-US" sz="1200" dirty="0"/>
+          </a:p>
+          <a:p>
+            <a:pPr marL="171450" indent="-171450">
+              <a:buFont typeface="Arial" panose="020B0604020202020204" pitchFamily="34" charset="0"/>
+              <a:buChar char="•"/>
+            </a:pPr>
+            <a:r>
+              <a:rPr lang="en-US" sz="1200" dirty="0" err="1"/>
+              <a:t>setMouthType</a:t>
+            </a:r>
+            <a:endParaRPr lang="en-US" sz="1200" dirty="0"/>
+          </a:p>
+          <a:p>
+            <a:pPr marL="171450" indent="-171450">
+              <a:buFont typeface="Arial" panose="020B0604020202020204" pitchFamily="34" charset="0"/>
+              <a:buChar char="•"/>
+            </a:pPr>
+            <a:r>
+              <a:rPr lang="en-US" sz="1200" dirty="0" err="1"/>
+              <a:t>setSkinColor</a:t>
+            </a:r>
+            <a:endParaRPr lang="en-US" sz="1200" dirty="0"/>
+          </a:p>
+          <a:p>
+            <a:pPr marL="171450" indent="-171450">
+              <a:buFont typeface="Arial" panose="020B0604020202020204" pitchFamily="34" charset="0"/>
+              <a:buChar char="•"/>
+            </a:pPr>
+            <a:r>
+              <a:rPr lang="en-US" sz="1200" dirty="0" err="1"/>
+              <a:t>storeDisguise</a:t>
+            </a:r>
+            <a:endParaRPr lang="en-US" sz="1200" dirty="0"/>
+          </a:p>
+          <a:p>
+            <a:pPr marL="171450" indent="-171450">
+              <a:buFont typeface="Arial" panose="020B0604020202020204" pitchFamily="34" charset="0"/>
+              <a:buChar char="•"/>
+            </a:pPr>
+            <a:r>
+              <a:rPr lang="en-US" sz="1200" dirty="0" err="1"/>
+              <a:t>readDisguise</a:t>
+            </a:r>
+            <a:endParaRPr lang="en-US" sz="1200" dirty="0"/>
+          </a:p>
+          <a:p>
+            <a:pPr marL="171450" indent="-171450">
+              <a:buFont typeface="Arial" panose="020B0604020202020204" pitchFamily="34" charset="0"/>
+              <a:buChar char="•"/>
+            </a:pPr>
+            <a:r>
+              <a:rPr lang="en-US" sz="1200" dirty="0" err="1"/>
+              <a:t>updateDisguise</a:t>
+            </a:r>
+            <a:endParaRPr lang="en-US" sz="1200" dirty="0"/>
+          </a:p>
+          <a:p>
+            <a:pPr marL="171450" indent="-171450">
+              <a:buFont typeface="Arial" panose="020B0604020202020204" pitchFamily="34" charset="0"/>
+              <a:buChar char="•"/>
+            </a:pPr>
+            <a:endParaRPr lang="en-US" sz="1200" dirty="0"/>
+          </a:p>
+        </p:txBody>
+      </p:sp>
+    </p:spTree>
+    <p:extLst>
+      <p:ext uri="{BB962C8B-B14F-4D97-AF65-F5344CB8AC3E}">
+        <p14:creationId xmlns:p14="http://schemas.microsoft.com/office/powerpoint/2010/main" val="684225206"/>
       </p:ext>
     </p:extLst>
   </p:cSld>

</xml_diff>

<commit_message>
add EO Easter Egg
</commit_message>
<xml_diff>
--- a/Pepito/Final Project Design.pptx
+++ b/Pepito/Final Project Design.pptx
@@ -5,7 +5,7 @@
     <p:sldMasterId id="2147483648" r:id="rId1"/>
   </p:sldMasterIdLst>
   <p:notesMasterIdLst>
-    <p:notesMasterId r:id="rId10"/>
+    <p:notesMasterId r:id="rId11"/>
   </p:notesMasterIdLst>
   <p:sldIdLst>
     <p:sldId id="256" r:id="rId2"/>
@@ -16,6 +16,7 @@
     <p:sldId id="261" r:id="rId7"/>
     <p:sldId id="262" r:id="rId8"/>
     <p:sldId id="263" r:id="rId9"/>
+    <p:sldId id="264" r:id="rId10"/>
   </p:sldIdLst>
   <p:sldSz cx="12192000" cy="6858000"/>
   <p:notesSz cx="6858000" cy="9144000"/>
@@ -204,7 +205,7 @@
           <a:p>
             <a:fld id="{E3DEDAA8-261D-1A48-9864-3FC231515C43}" type="datetimeFigureOut">
               <a:rPr lang="en-LU" smtClean="0"/>
-              <a:t>30/12/2020</a:t>
+              <a:t>03/01/2021</a:t>
             </a:fld>
             <a:endParaRPr lang="en-LU"/>
           </a:p>
@@ -724,6 +725,90 @@
 </p:notes>
 </file>
 
+<file path=ppt/notesSlides/notesSlide4.xml><?xml version="1.0" encoding="utf-8"?>
+<p:notes xmlns:a="http://schemas.openxmlformats.org/drawingml/2006/main" xmlns:r="http://schemas.openxmlformats.org/officeDocument/2006/relationships" xmlns:p="http://schemas.openxmlformats.org/presentationml/2006/main">
+  <p:cSld>
+    <p:spTree>
+      <p:nvGrpSpPr>
+        <p:cNvPr id="1" name=""/>
+        <p:cNvGrpSpPr/>
+        <p:nvPr/>
+      </p:nvGrpSpPr>
+      <p:grpSpPr>
+        <a:xfrm>
+          <a:off x="0" y="0"/>
+          <a:ext cx="0" cy="0"/>
+          <a:chOff x="0" y="0"/>
+          <a:chExt cx="0" cy="0"/>
+        </a:xfrm>
+      </p:grpSpPr>
+      <p:sp>
+        <p:nvSpPr>
+          <p:cNvPr id="2" name="Slide Image Placeholder 1"/>
+          <p:cNvSpPr>
+            <a:spLocks noGrp="1" noRot="1" noChangeAspect="1"/>
+          </p:cNvSpPr>
+          <p:nvPr>
+            <p:ph type="sldImg"/>
+          </p:nvPr>
+        </p:nvSpPr>
+        <p:spPr/>
+      </p:sp>
+      <p:sp>
+        <p:nvSpPr>
+          <p:cNvPr id="3" name="Notes Placeholder 2"/>
+          <p:cNvSpPr>
+            <a:spLocks noGrp="1"/>
+          </p:cNvSpPr>
+          <p:nvPr>
+            <p:ph type="body" idx="1"/>
+          </p:nvPr>
+        </p:nvSpPr>
+        <p:spPr/>
+        <p:txBody>
+          <a:bodyPr/>
+          <a:lstStyle/>
+          <a:p>
+            <a:endParaRPr lang="en-LU" dirty="0"/>
+          </a:p>
+        </p:txBody>
+      </p:sp>
+      <p:sp>
+        <p:nvSpPr>
+          <p:cNvPr id="4" name="Slide Number Placeholder 3"/>
+          <p:cNvSpPr>
+            <a:spLocks noGrp="1"/>
+          </p:cNvSpPr>
+          <p:nvPr>
+            <p:ph type="sldNum" sz="quarter" idx="5"/>
+          </p:nvPr>
+        </p:nvSpPr>
+        <p:spPr/>
+        <p:txBody>
+          <a:bodyPr/>
+          <a:lstStyle/>
+          <a:p>
+            <a:fld id="{F4E383B0-44CE-084D-AB54-AAB397A3DF4F}" type="slidenum">
+              <a:rPr lang="en-LU" smtClean="0"/>
+              <a:t>9</a:t>
+            </a:fld>
+            <a:endParaRPr lang="en-LU"/>
+          </a:p>
+        </p:txBody>
+      </p:sp>
+    </p:spTree>
+    <p:extLst>
+      <p:ext uri="{BB962C8B-B14F-4D97-AF65-F5344CB8AC3E}">
+        <p14:creationId xmlns:p14="http://schemas.microsoft.com/office/powerpoint/2010/main" val="1323539459"/>
+      </p:ext>
+    </p:extLst>
+  </p:cSld>
+  <p:clrMapOvr>
+    <a:masterClrMapping/>
+  </p:clrMapOvr>
+</p:notes>
+</file>
+
 <file path=ppt/slideLayouts/slideLayout1.xml><?xml version="1.0" encoding="utf-8"?>
 <p:sldLayout xmlns:a="http://schemas.openxmlformats.org/drawingml/2006/main" xmlns:r="http://schemas.openxmlformats.org/officeDocument/2006/relationships" xmlns:p="http://schemas.openxmlformats.org/presentationml/2006/main" type="title" preserve="1">
   <p:cSld name="Title Slide">
@@ -873,7 +958,7 @@
           <a:p>
             <a:fld id="{9ECEDF27-B25B-0343-A39C-1905A44EF111}" type="datetimeFigureOut">
               <a:rPr lang="en-LU" smtClean="0"/>
-              <a:t>30/12/2020</a:t>
+              <a:t>03/01/2021</a:t>
             </a:fld>
             <a:endParaRPr lang="en-LU"/>
           </a:p>
@@ -1073,7 +1158,7 @@
           <a:p>
             <a:fld id="{9ECEDF27-B25B-0343-A39C-1905A44EF111}" type="datetimeFigureOut">
               <a:rPr lang="en-LU" smtClean="0"/>
-              <a:t>30/12/2020</a:t>
+              <a:t>03/01/2021</a:t>
             </a:fld>
             <a:endParaRPr lang="en-LU"/>
           </a:p>
@@ -1283,7 +1368,7 @@
           <a:p>
             <a:fld id="{9ECEDF27-B25B-0343-A39C-1905A44EF111}" type="datetimeFigureOut">
               <a:rPr lang="en-LU" smtClean="0"/>
-              <a:t>30/12/2020</a:t>
+              <a:t>03/01/2021</a:t>
             </a:fld>
             <a:endParaRPr lang="en-LU"/>
           </a:p>
@@ -1483,7 +1568,7 @@
           <a:p>
             <a:fld id="{9ECEDF27-B25B-0343-A39C-1905A44EF111}" type="datetimeFigureOut">
               <a:rPr lang="en-LU" smtClean="0"/>
-              <a:t>30/12/2020</a:t>
+              <a:t>03/01/2021</a:t>
             </a:fld>
             <a:endParaRPr lang="en-LU"/>
           </a:p>
@@ -1759,7 +1844,7 @@
           <a:p>
             <a:fld id="{9ECEDF27-B25B-0343-A39C-1905A44EF111}" type="datetimeFigureOut">
               <a:rPr lang="en-LU" smtClean="0"/>
-              <a:t>30/12/2020</a:t>
+              <a:t>03/01/2021</a:t>
             </a:fld>
             <a:endParaRPr lang="en-LU"/>
           </a:p>
@@ -2027,7 +2112,7 @@
           <a:p>
             <a:fld id="{9ECEDF27-B25B-0343-A39C-1905A44EF111}" type="datetimeFigureOut">
               <a:rPr lang="en-LU" smtClean="0"/>
-              <a:t>30/12/2020</a:t>
+              <a:t>03/01/2021</a:t>
             </a:fld>
             <a:endParaRPr lang="en-LU"/>
           </a:p>
@@ -2442,7 +2527,7 @@
           <a:p>
             <a:fld id="{9ECEDF27-B25B-0343-A39C-1905A44EF111}" type="datetimeFigureOut">
               <a:rPr lang="en-LU" smtClean="0"/>
-              <a:t>30/12/2020</a:t>
+              <a:t>03/01/2021</a:t>
             </a:fld>
             <a:endParaRPr lang="en-LU"/>
           </a:p>
@@ -2584,7 +2669,7 @@
           <a:p>
             <a:fld id="{9ECEDF27-B25B-0343-A39C-1905A44EF111}" type="datetimeFigureOut">
               <a:rPr lang="en-LU" smtClean="0"/>
-              <a:t>30/12/2020</a:t>
+              <a:t>03/01/2021</a:t>
             </a:fld>
             <a:endParaRPr lang="en-LU"/>
           </a:p>
@@ -2697,7 +2782,7 @@
           <a:p>
             <a:fld id="{9ECEDF27-B25B-0343-A39C-1905A44EF111}" type="datetimeFigureOut">
               <a:rPr lang="en-LU" smtClean="0"/>
-              <a:t>30/12/2020</a:t>
+              <a:t>03/01/2021</a:t>
             </a:fld>
             <a:endParaRPr lang="en-LU"/>
           </a:p>
@@ -3010,7 +3095,7 @@
           <a:p>
             <a:fld id="{9ECEDF27-B25B-0343-A39C-1905A44EF111}" type="datetimeFigureOut">
               <a:rPr lang="en-LU" smtClean="0"/>
-              <a:t>30/12/2020</a:t>
+              <a:t>03/01/2021</a:t>
             </a:fld>
             <a:endParaRPr lang="en-LU"/>
           </a:p>
@@ -3299,7 +3384,7 @@
           <a:p>
             <a:fld id="{9ECEDF27-B25B-0343-A39C-1905A44EF111}" type="datetimeFigureOut">
               <a:rPr lang="en-LU" smtClean="0"/>
-              <a:t>30/12/2020</a:t>
+              <a:t>03/01/2021</a:t>
             </a:fld>
             <a:endParaRPr lang="en-LU"/>
           </a:p>
@@ -3542,7 +3627,7 @@
           <a:p>
             <a:fld id="{9ECEDF27-B25B-0343-A39C-1905A44EF111}" type="datetimeFigureOut">
               <a:rPr lang="en-LU" smtClean="0"/>
-              <a:t>30/12/2020</a:t>
+              <a:t>03/01/2021</a:t>
             </a:fld>
             <a:endParaRPr lang="en-LU"/>
           </a:p>
@@ -14992,6 +15077,1492 @@
     <p:extLst>
       <p:ext uri="{BB962C8B-B14F-4D97-AF65-F5344CB8AC3E}">
         <p14:creationId xmlns:p14="http://schemas.microsoft.com/office/powerpoint/2010/main" val="684225206"/>
+      </p:ext>
+    </p:extLst>
+  </p:cSld>
+  <p:clrMapOvr>
+    <a:masterClrMapping/>
+  </p:clrMapOvr>
+</p:sld>
+</file>
+
+<file path=ppt/slides/slide9.xml><?xml version="1.0" encoding="utf-8"?>
+<p:sld xmlns:a="http://schemas.openxmlformats.org/drawingml/2006/main" xmlns:r="http://schemas.openxmlformats.org/officeDocument/2006/relationships" xmlns:p="http://schemas.openxmlformats.org/presentationml/2006/main">
+  <p:cSld>
+    <p:spTree>
+      <p:nvGrpSpPr>
+        <p:cNvPr id="1" name=""/>
+        <p:cNvGrpSpPr/>
+        <p:nvPr/>
+      </p:nvGrpSpPr>
+      <p:grpSpPr>
+        <a:xfrm>
+          <a:off x="0" y="0"/>
+          <a:ext cx="0" cy="0"/>
+          <a:chOff x="0" y="0"/>
+          <a:chExt cx="0" cy="0"/>
+        </a:xfrm>
+      </p:grpSpPr>
+      <p:sp>
+        <p:nvSpPr>
+          <p:cNvPr id="4" name="TextBox 3">
+            <a:extLst>
+              <a:ext uri="{FF2B5EF4-FFF2-40B4-BE49-F238E27FC236}">
+                <a16:creationId xmlns:a16="http://schemas.microsoft.com/office/drawing/2014/main" id="{7B91D8D0-F88B-784E-8FF8-D5F07BC08546}"/>
+              </a:ext>
+            </a:extLst>
+          </p:cNvPr>
+          <p:cNvSpPr txBox="1"/>
+          <p:nvPr/>
+        </p:nvSpPr>
+        <p:spPr>
+          <a:xfrm>
+            <a:off x="620486" y="413657"/>
+            <a:ext cx="4593771" cy="594250"/>
+          </a:xfrm>
+          <a:prstGeom prst="rect">
+            <a:avLst/>
+          </a:prstGeom>
+          <a:solidFill>
+            <a:srgbClr val="E1EFD8"/>
+          </a:solidFill>
+        </p:spPr>
+        <p:txBody>
+          <a:bodyPr wrap="none" rtlCol="0" anchor="ctr" anchorCtr="0">
+            <a:noAutofit/>
+          </a:bodyPr>
+          <a:lstStyle/>
+          <a:p>
+            <a:r>
+              <a:rPr lang="en-US" b="1" dirty="0">
+                <a:solidFill>
+                  <a:srgbClr val="980000"/>
+                </a:solidFill>
+              </a:rPr>
+              <a:t>Bug in render() calling sequence</a:t>
+            </a:r>
+          </a:p>
+        </p:txBody>
+      </p:sp>
+      <p:sp>
+        <p:nvSpPr>
+          <p:cNvPr id="9" name="TextBox 8">
+            <a:extLst>
+              <a:ext uri="{FF2B5EF4-FFF2-40B4-BE49-F238E27FC236}">
+                <a16:creationId xmlns:a16="http://schemas.microsoft.com/office/drawing/2014/main" id="{A648BA86-9C0C-0846-A8F7-877203CF605C}"/>
+              </a:ext>
+            </a:extLst>
+          </p:cNvPr>
+          <p:cNvSpPr txBox="1"/>
+          <p:nvPr/>
+        </p:nvSpPr>
+        <p:spPr>
+          <a:xfrm>
+            <a:off x="815417" y="2324933"/>
+            <a:ext cx="2069297" cy="883410"/>
+          </a:xfrm>
+          <a:prstGeom prst="rect">
+            <a:avLst/>
+          </a:prstGeom>
+          <a:noFill/>
+          <a:ln>
+            <a:solidFill>
+              <a:schemeClr val="accent1"/>
+            </a:solidFill>
+          </a:ln>
+        </p:spPr>
+        <p:txBody>
+          <a:bodyPr wrap="none" rtlCol="0">
+            <a:noAutofit/>
+          </a:bodyPr>
+          <a:lstStyle/>
+          <a:p>
+            <a:r>
+              <a:rPr lang="en-US" sz="1600" dirty="0" err="1"/>
+              <a:t>App.js</a:t>
+            </a:r>
+            <a:endParaRPr lang="en-US" sz="1600" dirty="0"/>
+          </a:p>
+          <a:p>
+            <a:pPr marL="171450" indent="-171450">
+              <a:buFont typeface="Arial" panose="020B0604020202020204" pitchFamily="34" charset="0"/>
+              <a:buChar char="•"/>
+            </a:pPr>
+            <a:r>
+              <a:rPr lang="en-US" sz="1200" dirty="0" err="1"/>
+              <a:t>componentDidMount</a:t>
+            </a:r>
+            <a:r>
+              <a:rPr lang="en-US" sz="1200" dirty="0"/>
+              <a:t>()</a:t>
+            </a:r>
+          </a:p>
+          <a:p>
+            <a:pPr marL="171450" indent="-171450">
+              <a:buFont typeface="Arial" panose="020B0604020202020204" pitchFamily="34" charset="0"/>
+              <a:buChar char="•"/>
+            </a:pPr>
+            <a:endParaRPr lang="en-US" sz="1200" dirty="0"/>
+          </a:p>
+          <a:p>
+            <a:pPr marL="171450" indent="-171450">
+              <a:buFont typeface="Arial" panose="020B0604020202020204" pitchFamily="34" charset="0"/>
+              <a:buChar char="•"/>
+            </a:pPr>
+            <a:r>
+              <a:rPr lang="en-US" sz="1200" dirty="0"/>
+              <a:t>Render {return(</a:t>
+            </a:r>
+            <a:r>
+              <a:rPr lang="en-US" sz="1200" dirty="0" err="1"/>
+              <a:t>onClick</a:t>
+            </a:r>
+            <a:r>
+              <a:rPr lang="en-US" sz="1200" dirty="0"/>
+              <a:t>)…}</a:t>
+            </a:r>
+          </a:p>
+        </p:txBody>
+      </p:sp>
+      <p:pic>
+        <p:nvPicPr>
+          <p:cNvPr id="25" name="Google Shape;117;p28">
+            <a:extLst>
+              <a:ext uri="{FF2B5EF4-FFF2-40B4-BE49-F238E27FC236}">
+                <a16:creationId xmlns:a16="http://schemas.microsoft.com/office/drawing/2014/main" id="{D559997F-2FAD-644C-BBAD-FBAB7FCCE89D}"/>
+              </a:ext>
+            </a:extLst>
+          </p:cNvPr>
+          <p:cNvPicPr preferRelativeResize="0"/>
+          <p:nvPr/>
+        </p:nvPicPr>
+        <p:blipFill>
+          <a:blip r:embed="rId3">
+            <a:alphaModFix/>
+          </a:blip>
+          <a:stretch>
+            <a:fillRect/>
+          </a:stretch>
+        </p:blipFill>
+        <p:spPr>
+          <a:xfrm>
+            <a:off x="10424687" y="146484"/>
+            <a:ext cx="1357940" cy="1357940"/>
+          </a:xfrm>
+          <a:prstGeom prst="rect">
+            <a:avLst/>
+          </a:prstGeom>
+          <a:noFill/>
+          <a:ln>
+            <a:noFill/>
+          </a:ln>
+        </p:spPr>
+      </p:pic>
+      <p:cxnSp>
+        <p:nvCxnSpPr>
+          <p:cNvPr id="42" name="Elbow Connector 41">
+            <a:extLst>
+              <a:ext uri="{FF2B5EF4-FFF2-40B4-BE49-F238E27FC236}">
+                <a16:creationId xmlns:a16="http://schemas.microsoft.com/office/drawing/2014/main" id="{78DE0365-6BBA-4F46-A337-02674D3E8C46}"/>
+              </a:ext>
+            </a:extLst>
+          </p:cNvPr>
+          <p:cNvCxnSpPr>
+            <a:cxnSpLocks/>
+            <a:stCxn id="36" idx="3"/>
+            <a:endCxn id="35" idx="1"/>
+          </p:cNvCxnSpPr>
+          <p:nvPr/>
+        </p:nvCxnSpPr>
+        <p:spPr>
+          <a:xfrm flipV="1">
+            <a:off x="2634873" y="2270947"/>
+            <a:ext cx="909617" cy="469128"/>
+          </a:xfrm>
+          <a:prstGeom prst="bentConnector3">
+            <a:avLst>
+              <a:gd name="adj1" fmla="val 50000"/>
+            </a:avLst>
+          </a:prstGeom>
+          <a:ln>
+            <a:tailEnd type="triangle"/>
+          </a:ln>
+        </p:spPr>
+        <p:style>
+          <a:lnRef idx="1">
+            <a:schemeClr val="accent1"/>
+          </a:lnRef>
+          <a:fillRef idx="0">
+            <a:schemeClr val="accent1"/>
+          </a:fillRef>
+          <a:effectRef idx="0">
+            <a:schemeClr val="accent1"/>
+          </a:effectRef>
+          <a:fontRef idx="minor">
+            <a:schemeClr val="tx1"/>
+          </a:fontRef>
+        </p:style>
+      </p:cxnSp>
+      <p:sp>
+        <p:nvSpPr>
+          <p:cNvPr id="36" name="TextBox 35">
+            <a:extLst>
+              <a:ext uri="{FF2B5EF4-FFF2-40B4-BE49-F238E27FC236}">
+                <a16:creationId xmlns:a16="http://schemas.microsoft.com/office/drawing/2014/main" id="{0ACDAF79-1CD3-5440-A93A-6F9322935EDE}"/>
+              </a:ext>
+            </a:extLst>
+          </p:cNvPr>
+          <p:cNvSpPr txBox="1"/>
+          <p:nvPr/>
+        </p:nvSpPr>
+        <p:spPr>
+          <a:xfrm>
+            <a:off x="2079702" y="2644675"/>
+            <a:ext cx="555171" cy="190800"/>
+          </a:xfrm>
+          <a:prstGeom prst="rect">
+            <a:avLst/>
+          </a:prstGeom>
+          <a:noFill/>
+          <a:ln>
+            <a:noFill/>
+          </a:ln>
+        </p:spPr>
+        <p:txBody>
+          <a:bodyPr wrap="square" tIns="3600" bIns="3600" rtlCol="0">
+            <a:spAutoFit/>
+          </a:bodyPr>
+          <a:lstStyle/>
+          <a:p>
+            <a:r>
+              <a:rPr lang="en-LU" sz="1200" dirty="0"/>
+              <a:t> </a:t>
+            </a:r>
+          </a:p>
+        </p:txBody>
+      </p:sp>
+      <p:sp>
+        <p:nvSpPr>
+          <p:cNvPr id="41" name="TextBox 40">
+            <a:extLst>
+              <a:ext uri="{FF2B5EF4-FFF2-40B4-BE49-F238E27FC236}">
+                <a16:creationId xmlns:a16="http://schemas.microsoft.com/office/drawing/2014/main" id="{F4C0BFC7-6A70-7A41-B11C-BFAC88A20486}"/>
+              </a:ext>
+            </a:extLst>
+          </p:cNvPr>
+          <p:cNvSpPr txBox="1"/>
+          <p:nvPr/>
+        </p:nvSpPr>
+        <p:spPr>
+          <a:xfrm>
+            <a:off x="6342009" y="2683824"/>
+            <a:ext cx="2164301" cy="684713"/>
+          </a:xfrm>
+          <a:prstGeom prst="rect">
+            <a:avLst/>
+          </a:prstGeom>
+          <a:noFill/>
+          <a:ln>
+            <a:solidFill>
+              <a:schemeClr val="accent1"/>
+            </a:solidFill>
+          </a:ln>
+        </p:spPr>
+        <p:txBody>
+          <a:bodyPr wrap="none" rtlCol="0">
+            <a:noAutofit/>
+          </a:bodyPr>
+          <a:lstStyle/>
+          <a:p>
+            <a:r>
+              <a:rPr lang="en-US" sz="1600" dirty="0" err="1"/>
+              <a:t>this.setRandomDisguise</a:t>
+            </a:r>
+            <a:endParaRPr lang="en-US" sz="1600" dirty="0"/>
+          </a:p>
+          <a:p>
+            <a:pPr marL="171450" indent="-171450">
+              <a:buFont typeface="Arial" panose="020B0604020202020204" pitchFamily="34" charset="0"/>
+              <a:buChar char="•"/>
+            </a:pPr>
+            <a:r>
+              <a:rPr lang="en-US" sz="1200" dirty="0"/>
+              <a:t>Assign Random Disguise</a:t>
+            </a:r>
+          </a:p>
+          <a:p>
+            <a:pPr marL="171450" indent="-171450">
+              <a:buFont typeface="Arial" panose="020B0604020202020204" pitchFamily="34" charset="0"/>
+              <a:buChar char="•"/>
+            </a:pPr>
+            <a:r>
+              <a:rPr lang="en-US" sz="1200" dirty="0" err="1"/>
+              <a:t>setState</a:t>
+            </a:r>
+            <a:endParaRPr lang="en-US" sz="1200" dirty="0"/>
+          </a:p>
+        </p:txBody>
+      </p:sp>
+      <p:sp>
+        <p:nvSpPr>
+          <p:cNvPr id="13" name="TextBox 12">
+            <a:extLst>
+              <a:ext uri="{FF2B5EF4-FFF2-40B4-BE49-F238E27FC236}">
+                <a16:creationId xmlns:a16="http://schemas.microsoft.com/office/drawing/2014/main" id="{2A828AC1-7CA0-B84B-A40C-CE89C5407777}"/>
+              </a:ext>
+            </a:extLst>
+          </p:cNvPr>
+          <p:cNvSpPr txBox="1"/>
+          <p:nvPr/>
+        </p:nvSpPr>
+        <p:spPr>
+          <a:xfrm>
+            <a:off x="9348826" y="4931372"/>
+            <a:ext cx="2164301" cy="684713"/>
+          </a:xfrm>
+          <a:prstGeom prst="rect">
+            <a:avLst/>
+          </a:prstGeom>
+          <a:noFill/>
+          <a:ln>
+            <a:solidFill>
+              <a:schemeClr val="accent1"/>
+            </a:solidFill>
+          </a:ln>
+        </p:spPr>
+        <p:txBody>
+          <a:bodyPr wrap="none" rtlCol="0">
+            <a:noAutofit/>
+          </a:bodyPr>
+          <a:lstStyle/>
+          <a:p>
+            <a:r>
+              <a:rPr lang="en-US" sz="1600" dirty="0" err="1"/>
+              <a:t>getRandomDisguise</a:t>
+            </a:r>
+            <a:endParaRPr lang="en-US" sz="1600" dirty="0"/>
+          </a:p>
+          <a:p>
+            <a:pPr marL="171450" indent="-171450">
+              <a:buFont typeface="Arial" panose="020B0604020202020204" pitchFamily="34" charset="0"/>
+              <a:buChar char="•"/>
+            </a:pPr>
+            <a:r>
+              <a:rPr lang="en-US" sz="1200" dirty="0"/>
+              <a:t>Assign Random Disguise</a:t>
+            </a:r>
+          </a:p>
+        </p:txBody>
+      </p:sp>
+      <p:sp>
+        <p:nvSpPr>
+          <p:cNvPr id="22" name="TextBox 21">
+            <a:extLst>
+              <a:ext uri="{FF2B5EF4-FFF2-40B4-BE49-F238E27FC236}">
+                <a16:creationId xmlns:a16="http://schemas.microsoft.com/office/drawing/2014/main" id="{F549962F-115E-1648-9637-7B6BADF704D2}"/>
+              </a:ext>
+            </a:extLst>
+          </p:cNvPr>
+          <p:cNvSpPr txBox="1"/>
+          <p:nvPr/>
+        </p:nvSpPr>
+        <p:spPr>
+          <a:xfrm>
+            <a:off x="2234753" y="2964358"/>
+            <a:ext cx="555171" cy="190800"/>
+          </a:xfrm>
+          <a:prstGeom prst="rect">
+            <a:avLst/>
+          </a:prstGeom>
+          <a:noFill/>
+          <a:ln>
+            <a:noFill/>
+          </a:ln>
+        </p:spPr>
+        <p:txBody>
+          <a:bodyPr wrap="square" tIns="3600" bIns="3600" rtlCol="0">
+            <a:spAutoFit/>
+          </a:bodyPr>
+          <a:lstStyle/>
+          <a:p>
+            <a:r>
+              <a:rPr lang="en-LU" sz="1200" dirty="0"/>
+              <a:t> </a:t>
+            </a:r>
+          </a:p>
+        </p:txBody>
+      </p:sp>
+      <p:cxnSp>
+        <p:nvCxnSpPr>
+          <p:cNvPr id="23" name="Elbow Connector 22">
+            <a:extLst>
+              <a:ext uri="{FF2B5EF4-FFF2-40B4-BE49-F238E27FC236}">
+                <a16:creationId xmlns:a16="http://schemas.microsoft.com/office/drawing/2014/main" id="{48296D99-D9F3-3F4D-9E3E-E3BDD6EB4E85}"/>
+              </a:ext>
+            </a:extLst>
+          </p:cNvPr>
+          <p:cNvCxnSpPr>
+            <a:cxnSpLocks/>
+            <a:stCxn id="22" idx="3"/>
+            <a:endCxn id="41" idx="1"/>
+          </p:cNvCxnSpPr>
+          <p:nvPr/>
+        </p:nvCxnSpPr>
+        <p:spPr>
+          <a:xfrm flipV="1">
+            <a:off x="2789924" y="3026181"/>
+            <a:ext cx="3552085" cy="33577"/>
+          </a:xfrm>
+          <a:prstGeom prst="bentConnector3">
+            <a:avLst>
+              <a:gd name="adj1" fmla="val 50000"/>
+            </a:avLst>
+          </a:prstGeom>
+          <a:ln>
+            <a:tailEnd type="triangle"/>
+          </a:ln>
+        </p:spPr>
+        <p:style>
+          <a:lnRef idx="1">
+            <a:schemeClr val="accent1"/>
+          </a:lnRef>
+          <a:fillRef idx="0">
+            <a:schemeClr val="accent1"/>
+          </a:fillRef>
+          <a:effectRef idx="0">
+            <a:schemeClr val="accent1"/>
+          </a:effectRef>
+          <a:fontRef idx="minor">
+            <a:schemeClr val="tx1"/>
+          </a:fontRef>
+        </p:style>
+      </p:cxnSp>
+      <p:sp>
+        <p:nvSpPr>
+          <p:cNvPr id="16" name="TextBox 15">
+            <a:extLst>
+              <a:ext uri="{FF2B5EF4-FFF2-40B4-BE49-F238E27FC236}">
+                <a16:creationId xmlns:a16="http://schemas.microsoft.com/office/drawing/2014/main" id="{E2268147-7B17-1249-B1EC-CC74BCD3ED4F}"/>
+              </a:ext>
+            </a:extLst>
+          </p:cNvPr>
+          <p:cNvSpPr txBox="1"/>
+          <p:nvPr/>
+        </p:nvSpPr>
+        <p:spPr>
+          <a:xfrm>
+            <a:off x="815417" y="4571352"/>
+            <a:ext cx="2069297" cy="883410"/>
+          </a:xfrm>
+          <a:prstGeom prst="rect">
+            <a:avLst/>
+          </a:prstGeom>
+          <a:noFill/>
+          <a:ln>
+            <a:solidFill>
+              <a:schemeClr val="accent1"/>
+            </a:solidFill>
+          </a:ln>
+        </p:spPr>
+        <p:txBody>
+          <a:bodyPr wrap="none" rtlCol="0">
+            <a:noAutofit/>
+          </a:bodyPr>
+          <a:lstStyle/>
+          <a:p>
+            <a:r>
+              <a:rPr lang="en-US" sz="1600" dirty="0" err="1"/>
+              <a:t>App.js</a:t>
+            </a:r>
+            <a:endParaRPr lang="en-US" sz="1600" dirty="0"/>
+          </a:p>
+          <a:p>
+            <a:pPr marL="171450" indent="-171450">
+              <a:buFont typeface="Arial" panose="020B0604020202020204" pitchFamily="34" charset="0"/>
+              <a:buChar char="•"/>
+            </a:pPr>
+            <a:r>
+              <a:rPr lang="en-US" sz="1200" dirty="0" err="1"/>
+              <a:t>componentDidMount</a:t>
+            </a:r>
+            <a:r>
+              <a:rPr lang="en-US" sz="1200" dirty="0"/>
+              <a:t>()</a:t>
+            </a:r>
+          </a:p>
+          <a:p>
+            <a:pPr marL="171450" indent="-171450">
+              <a:buFont typeface="Arial" panose="020B0604020202020204" pitchFamily="34" charset="0"/>
+              <a:buChar char="•"/>
+            </a:pPr>
+            <a:endParaRPr lang="en-US" sz="1200" dirty="0"/>
+          </a:p>
+          <a:p>
+            <a:pPr marL="171450" indent="-171450">
+              <a:buFont typeface="Arial" panose="020B0604020202020204" pitchFamily="34" charset="0"/>
+              <a:buChar char="•"/>
+            </a:pPr>
+            <a:r>
+              <a:rPr lang="en-US" sz="1200" dirty="0"/>
+              <a:t>Render {return(</a:t>
+            </a:r>
+            <a:r>
+              <a:rPr lang="en-US" sz="1200" dirty="0" err="1"/>
+              <a:t>onClick</a:t>
+            </a:r>
+            <a:r>
+              <a:rPr lang="en-US" sz="1200" dirty="0"/>
+              <a:t>)…}</a:t>
+            </a:r>
+          </a:p>
+        </p:txBody>
+      </p:sp>
+      <p:cxnSp>
+        <p:nvCxnSpPr>
+          <p:cNvPr id="20" name="Elbow Connector 19">
+            <a:extLst>
+              <a:ext uri="{FF2B5EF4-FFF2-40B4-BE49-F238E27FC236}">
+                <a16:creationId xmlns:a16="http://schemas.microsoft.com/office/drawing/2014/main" id="{FEACCD3A-9832-F346-906F-C368569F818B}"/>
+              </a:ext>
+            </a:extLst>
+          </p:cNvPr>
+          <p:cNvCxnSpPr>
+            <a:cxnSpLocks/>
+            <a:stCxn id="21" idx="3"/>
+            <a:endCxn id="46" idx="1"/>
+          </p:cNvCxnSpPr>
+          <p:nvPr/>
+        </p:nvCxnSpPr>
+        <p:spPr>
+          <a:xfrm flipV="1">
+            <a:off x="2634873" y="4545069"/>
+            <a:ext cx="911997" cy="441425"/>
+          </a:xfrm>
+          <a:prstGeom prst="bentConnector3">
+            <a:avLst>
+              <a:gd name="adj1" fmla="val 50000"/>
+            </a:avLst>
+          </a:prstGeom>
+          <a:ln w="12700">
+            <a:solidFill>
+              <a:srgbClr val="FF0000"/>
+            </a:solidFill>
+            <a:tailEnd type="triangle"/>
+          </a:ln>
+        </p:spPr>
+        <p:style>
+          <a:lnRef idx="1">
+            <a:schemeClr val="accent1"/>
+          </a:lnRef>
+          <a:fillRef idx="0">
+            <a:schemeClr val="accent1"/>
+          </a:fillRef>
+          <a:effectRef idx="0">
+            <a:schemeClr val="accent1"/>
+          </a:effectRef>
+          <a:fontRef idx="minor">
+            <a:schemeClr val="tx1"/>
+          </a:fontRef>
+        </p:style>
+      </p:cxnSp>
+      <p:sp>
+        <p:nvSpPr>
+          <p:cNvPr id="21" name="TextBox 20">
+            <a:extLst>
+              <a:ext uri="{FF2B5EF4-FFF2-40B4-BE49-F238E27FC236}">
+                <a16:creationId xmlns:a16="http://schemas.microsoft.com/office/drawing/2014/main" id="{EEB95DBB-F16B-1B42-B915-6DC926ACF7C5}"/>
+              </a:ext>
+            </a:extLst>
+          </p:cNvPr>
+          <p:cNvSpPr txBox="1"/>
+          <p:nvPr/>
+        </p:nvSpPr>
+        <p:spPr>
+          <a:xfrm>
+            <a:off x="2079702" y="4891094"/>
+            <a:ext cx="555171" cy="190800"/>
+          </a:xfrm>
+          <a:prstGeom prst="rect">
+            <a:avLst/>
+          </a:prstGeom>
+          <a:noFill/>
+          <a:ln>
+            <a:noFill/>
+          </a:ln>
+        </p:spPr>
+        <p:txBody>
+          <a:bodyPr wrap="square" tIns="3600" bIns="3600" rtlCol="0">
+            <a:spAutoFit/>
+          </a:bodyPr>
+          <a:lstStyle/>
+          <a:p>
+            <a:r>
+              <a:rPr lang="en-LU" sz="1200" dirty="0"/>
+              <a:t> </a:t>
+            </a:r>
+          </a:p>
+        </p:txBody>
+      </p:sp>
+      <p:sp>
+        <p:nvSpPr>
+          <p:cNvPr id="24" name="TextBox 23">
+            <a:extLst>
+              <a:ext uri="{FF2B5EF4-FFF2-40B4-BE49-F238E27FC236}">
+                <a16:creationId xmlns:a16="http://schemas.microsoft.com/office/drawing/2014/main" id="{388A1E4D-6FA6-C541-A24C-3A5EC8BD2C35}"/>
+              </a:ext>
+            </a:extLst>
+          </p:cNvPr>
+          <p:cNvSpPr txBox="1"/>
+          <p:nvPr/>
+        </p:nvSpPr>
+        <p:spPr>
+          <a:xfrm>
+            <a:off x="6342009" y="4931372"/>
+            <a:ext cx="2164301" cy="684713"/>
+          </a:xfrm>
+          <a:prstGeom prst="rect">
+            <a:avLst/>
+          </a:prstGeom>
+          <a:noFill/>
+          <a:ln>
+            <a:solidFill>
+              <a:schemeClr val="accent1"/>
+            </a:solidFill>
+          </a:ln>
+        </p:spPr>
+        <p:txBody>
+          <a:bodyPr wrap="none" rtlCol="0">
+            <a:noAutofit/>
+          </a:bodyPr>
+          <a:lstStyle/>
+          <a:p>
+            <a:r>
+              <a:rPr lang="en-US" sz="1600" dirty="0" err="1"/>
+              <a:t>this.setRandomDisguise</a:t>
+            </a:r>
+            <a:endParaRPr lang="en-US" sz="1600" dirty="0"/>
+          </a:p>
+          <a:p>
+            <a:pPr marL="171450" indent="-171450">
+              <a:buFont typeface="Arial" panose="020B0604020202020204" pitchFamily="34" charset="0"/>
+              <a:buChar char="•"/>
+            </a:pPr>
+            <a:r>
+              <a:rPr lang="en-US" sz="1200" dirty="0" err="1"/>
+              <a:t>getRandomDisguise</a:t>
+            </a:r>
+            <a:endParaRPr lang="en-US" sz="1200" dirty="0"/>
+          </a:p>
+          <a:p>
+            <a:pPr marL="171450" indent="-171450">
+              <a:buFont typeface="Arial" panose="020B0604020202020204" pitchFamily="34" charset="0"/>
+              <a:buChar char="•"/>
+            </a:pPr>
+            <a:r>
+              <a:rPr lang="en-US" sz="1200" dirty="0" err="1"/>
+              <a:t>setState</a:t>
+            </a:r>
+            <a:endParaRPr lang="en-US" sz="1200" dirty="0"/>
+          </a:p>
+        </p:txBody>
+      </p:sp>
+      <p:sp>
+        <p:nvSpPr>
+          <p:cNvPr id="26" name="TextBox 25">
+            <a:extLst>
+              <a:ext uri="{FF2B5EF4-FFF2-40B4-BE49-F238E27FC236}">
+                <a16:creationId xmlns:a16="http://schemas.microsoft.com/office/drawing/2014/main" id="{A0D07A9C-31D9-A44A-8F1A-2501977E22B1}"/>
+              </a:ext>
+            </a:extLst>
+          </p:cNvPr>
+          <p:cNvSpPr txBox="1"/>
+          <p:nvPr/>
+        </p:nvSpPr>
+        <p:spPr>
+          <a:xfrm>
+            <a:off x="2234753" y="5210777"/>
+            <a:ext cx="555171" cy="190800"/>
+          </a:xfrm>
+          <a:prstGeom prst="rect">
+            <a:avLst/>
+          </a:prstGeom>
+          <a:noFill/>
+          <a:ln>
+            <a:noFill/>
+          </a:ln>
+        </p:spPr>
+        <p:txBody>
+          <a:bodyPr wrap="square" tIns="3600" bIns="3600" rtlCol="0">
+            <a:spAutoFit/>
+          </a:bodyPr>
+          <a:lstStyle/>
+          <a:p>
+            <a:r>
+              <a:rPr lang="en-LU" sz="1200" dirty="0"/>
+              <a:t> </a:t>
+            </a:r>
+          </a:p>
+        </p:txBody>
+      </p:sp>
+      <p:cxnSp>
+        <p:nvCxnSpPr>
+          <p:cNvPr id="27" name="Elbow Connector 26">
+            <a:extLst>
+              <a:ext uri="{FF2B5EF4-FFF2-40B4-BE49-F238E27FC236}">
+                <a16:creationId xmlns:a16="http://schemas.microsoft.com/office/drawing/2014/main" id="{1D9692AD-3CE0-1C4E-89E2-60B3020A4B14}"/>
+              </a:ext>
+            </a:extLst>
+          </p:cNvPr>
+          <p:cNvCxnSpPr>
+            <a:cxnSpLocks/>
+            <a:stCxn id="26" idx="3"/>
+            <a:endCxn id="30" idx="1"/>
+          </p:cNvCxnSpPr>
+          <p:nvPr/>
+        </p:nvCxnSpPr>
+        <p:spPr>
+          <a:xfrm flipV="1">
+            <a:off x="2789924" y="5110551"/>
+            <a:ext cx="3552085" cy="195626"/>
+          </a:xfrm>
+          <a:prstGeom prst="bentConnector3">
+            <a:avLst>
+              <a:gd name="adj1" fmla="val 50000"/>
+            </a:avLst>
+          </a:prstGeom>
+          <a:ln>
+            <a:tailEnd type="triangle"/>
+          </a:ln>
+        </p:spPr>
+        <p:style>
+          <a:lnRef idx="1">
+            <a:schemeClr val="accent1"/>
+          </a:lnRef>
+          <a:fillRef idx="0">
+            <a:schemeClr val="accent1"/>
+          </a:fillRef>
+          <a:effectRef idx="0">
+            <a:schemeClr val="accent1"/>
+          </a:effectRef>
+          <a:fontRef idx="minor">
+            <a:schemeClr val="tx1"/>
+          </a:fontRef>
+        </p:style>
+      </p:cxnSp>
+      <p:cxnSp>
+        <p:nvCxnSpPr>
+          <p:cNvPr id="28" name="Elbow Connector 27">
+            <a:extLst>
+              <a:ext uri="{FF2B5EF4-FFF2-40B4-BE49-F238E27FC236}">
+                <a16:creationId xmlns:a16="http://schemas.microsoft.com/office/drawing/2014/main" id="{EBC94134-1F97-CC45-89A7-3869B4F7720D}"/>
+              </a:ext>
+            </a:extLst>
+          </p:cNvPr>
+          <p:cNvCxnSpPr>
+            <a:cxnSpLocks/>
+            <a:stCxn id="32" idx="3"/>
+            <a:endCxn id="13" idx="1"/>
+          </p:cNvCxnSpPr>
+          <p:nvPr/>
+        </p:nvCxnSpPr>
+        <p:spPr>
+          <a:xfrm flipV="1">
+            <a:off x="7939026" y="5273729"/>
+            <a:ext cx="1409800" cy="64392"/>
+          </a:xfrm>
+          <a:prstGeom prst="bentConnector3">
+            <a:avLst>
+              <a:gd name="adj1" fmla="val 50000"/>
+            </a:avLst>
+          </a:prstGeom>
+          <a:ln>
+            <a:tailEnd type="triangle"/>
+          </a:ln>
+        </p:spPr>
+        <p:style>
+          <a:lnRef idx="1">
+            <a:schemeClr val="accent1"/>
+          </a:lnRef>
+          <a:fillRef idx="0">
+            <a:schemeClr val="accent1"/>
+          </a:fillRef>
+          <a:effectRef idx="0">
+            <a:schemeClr val="accent1"/>
+          </a:effectRef>
+          <a:fontRef idx="minor">
+            <a:schemeClr val="tx1"/>
+          </a:fontRef>
+        </p:style>
+      </p:cxnSp>
+      <p:sp>
+        <p:nvSpPr>
+          <p:cNvPr id="32" name="TextBox 31">
+            <a:extLst>
+              <a:ext uri="{FF2B5EF4-FFF2-40B4-BE49-F238E27FC236}">
+                <a16:creationId xmlns:a16="http://schemas.microsoft.com/office/drawing/2014/main" id="{62EAC1FC-8303-C54A-B316-9BDA6F13CB13}"/>
+              </a:ext>
+            </a:extLst>
+          </p:cNvPr>
+          <p:cNvSpPr txBox="1"/>
+          <p:nvPr/>
+        </p:nvSpPr>
+        <p:spPr>
+          <a:xfrm>
+            <a:off x="7383855" y="5242153"/>
+            <a:ext cx="555171" cy="191936"/>
+          </a:xfrm>
+          <a:prstGeom prst="rect">
+            <a:avLst/>
+          </a:prstGeom>
+          <a:noFill/>
+        </p:spPr>
+        <p:txBody>
+          <a:bodyPr wrap="square" lIns="90000" tIns="3600" bIns="3600" rtlCol="0">
+            <a:spAutoFit/>
+          </a:bodyPr>
+          <a:lstStyle/>
+          <a:p>
+            <a:r>
+              <a:rPr lang="en-LU" sz="1200" dirty="0"/>
+              <a:t> </a:t>
+            </a:r>
+          </a:p>
+        </p:txBody>
+      </p:sp>
+      <p:sp>
+        <p:nvSpPr>
+          <p:cNvPr id="30" name="TextBox 29">
+            <a:extLst>
+              <a:ext uri="{FF2B5EF4-FFF2-40B4-BE49-F238E27FC236}">
+                <a16:creationId xmlns:a16="http://schemas.microsoft.com/office/drawing/2014/main" id="{D2B72D81-1FD7-AB46-8B80-0906B1B6E46A}"/>
+              </a:ext>
+            </a:extLst>
+          </p:cNvPr>
+          <p:cNvSpPr txBox="1"/>
+          <p:nvPr/>
+        </p:nvSpPr>
+        <p:spPr>
+          <a:xfrm>
+            <a:off x="6342009" y="5014583"/>
+            <a:ext cx="1749417" cy="191936"/>
+          </a:xfrm>
+          <a:prstGeom prst="rect">
+            <a:avLst/>
+          </a:prstGeom>
+          <a:noFill/>
+        </p:spPr>
+        <p:txBody>
+          <a:bodyPr wrap="square" lIns="90000" tIns="3600" bIns="3600" rtlCol="0">
+            <a:spAutoFit/>
+          </a:bodyPr>
+          <a:lstStyle/>
+          <a:p>
+            <a:r>
+              <a:rPr lang="en-LU" sz="1200" dirty="0"/>
+              <a:t> </a:t>
+            </a:r>
+          </a:p>
+        </p:txBody>
+      </p:sp>
+      <p:sp>
+        <p:nvSpPr>
+          <p:cNvPr id="33" name="TextBox 32">
+            <a:extLst>
+              <a:ext uri="{FF2B5EF4-FFF2-40B4-BE49-F238E27FC236}">
+                <a16:creationId xmlns:a16="http://schemas.microsoft.com/office/drawing/2014/main" id="{D4283ACC-B70B-9843-9BB4-CD63D0EA5B35}"/>
+              </a:ext>
+            </a:extLst>
+          </p:cNvPr>
+          <p:cNvSpPr txBox="1"/>
+          <p:nvPr/>
+        </p:nvSpPr>
+        <p:spPr>
+          <a:xfrm>
+            <a:off x="2725281" y="4697346"/>
+            <a:ext cx="940322" cy="276999"/>
+          </a:xfrm>
+          <a:prstGeom prst="rect">
+            <a:avLst/>
+          </a:prstGeom>
+          <a:noFill/>
+        </p:spPr>
+        <p:txBody>
+          <a:bodyPr wrap="none" rtlCol="0">
+            <a:spAutoFit/>
+          </a:bodyPr>
+          <a:lstStyle/>
+          <a:p>
+            <a:r>
+              <a:rPr lang="en-US" sz="1200" dirty="0">
+                <a:solidFill>
+                  <a:srgbClr val="FF0000"/>
+                </a:solidFill>
+              </a:rPr>
+              <a:t>Infinite loop</a:t>
+            </a:r>
+          </a:p>
+        </p:txBody>
+      </p:sp>
+      <p:sp>
+        <p:nvSpPr>
+          <p:cNvPr id="35" name="TextBox 34">
+            <a:extLst>
+              <a:ext uri="{FF2B5EF4-FFF2-40B4-BE49-F238E27FC236}">
+                <a16:creationId xmlns:a16="http://schemas.microsoft.com/office/drawing/2014/main" id="{A660BA33-E93C-8641-B622-DD3D8AA3C292}"/>
+              </a:ext>
+            </a:extLst>
+          </p:cNvPr>
+          <p:cNvSpPr txBox="1"/>
+          <p:nvPr/>
+        </p:nvSpPr>
+        <p:spPr>
+          <a:xfrm>
+            <a:off x="3544490" y="1928590"/>
+            <a:ext cx="2164301" cy="684713"/>
+          </a:xfrm>
+          <a:prstGeom prst="rect">
+            <a:avLst/>
+          </a:prstGeom>
+          <a:noFill/>
+          <a:ln>
+            <a:solidFill>
+              <a:schemeClr val="accent1"/>
+            </a:solidFill>
+          </a:ln>
+        </p:spPr>
+        <p:txBody>
+          <a:bodyPr wrap="none" rtlCol="0">
+            <a:noAutofit/>
+          </a:bodyPr>
+          <a:lstStyle/>
+          <a:p>
+            <a:r>
+              <a:rPr lang="en-US" sz="1600" dirty="0" err="1"/>
+              <a:t>componentDidMount</a:t>
+            </a:r>
+            <a:endParaRPr lang="en-US" sz="1600" dirty="0"/>
+          </a:p>
+          <a:p>
+            <a:pPr marL="171450" indent="-171450">
+              <a:buFont typeface="Arial" panose="020B0604020202020204" pitchFamily="34" charset="0"/>
+              <a:buChar char="•"/>
+            </a:pPr>
+            <a:r>
+              <a:rPr lang="en-US" sz="1200" dirty="0" err="1"/>
+              <a:t>this.setRandomDisguise</a:t>
+            </a:r>
+            <a:endParaRPr lang="en-US" sz="1200" dirty="0"/>
+          </a:p>
+        </p:txBody>
+      </p:sp>
+      <p:cxnSp>
+        <p:nvCxnSpPr>
+          <p:cNvPr id="38" name="Elbow Connector 37">
+            <a:extLst>
+              <a:ext uri="{FF2B5EF4-FFF2-40B4-BE49-F238E27FC236}">
+                <a16:creationId xmlns:a16="http://schemas.microsoft.com/office/drawing/2014/main" id="{7252860B-8242-154A-93EB-E27DE8EDA6A0}"/>
+              </a:ext>
+            </a:extLst>
+          </p:cNvPr>
+          <p:cNvCxnSpPr>
+            <a:cxnSpLocks/>
+            <a:stCxn id="43" idx="3"/>
+            <a:endCxn id="41" idx="1"/>
+          </p:cNvCxnSpPr>
+          <p:nvPr/>
+        </p:nvCxnSpPr>
+        <p:spPr>
+          <a:xfrm>
+            <a:off x="5329040" y="2314490"/>
+            <a:ext cx="1012969" cy="711691"/>
+          </a:xfrm>
+          <a:prstGeom prst="bentConnector3">
+            <a:avLst>
+              <a:gd name="adj1" fmla="val 50000"/>
+            </a:avLst>
+          </a:prstGeom>
+          <a:ln>
+            <a:tailEnd type="triangle"/>
+          </a:ln>
+        </p:spPr>
+        <p:style>
+          <a:lnRef idx="1">
+            <a:schemeClr val="accent1"/>
+          </a:lnRef>
+          <a:fillRef idx="0">
+            <a:schemeClr val="accent1"/>
+          </a:fillRef>
+          <a:effectRef idx="0">
+            <a:schemeClr val="accent1"/>
+          </a:effectRef>
+          <a:fontRef idx="minor">
+            <a:schemeClr val="tx1"/>
+          </a:fontRef>
+        </p:style>
+      </p:cxnSp>
+      <p:sp>
+        <p:nvSpPr>
+          <p:cNvPr id="43" name="TextBox 42">
+            <a:extLst>
+              <a:ext uri="{FF2B5EF4-FFF2-40B4-BE49-F238E27FC236}">
+                <a16:creationId xmlns:a16="http://schemas.microsoft.com/office/drawing/2014/main" id="{276D3B9C-6E7C-3B4A-9CDE-EB4C4CBBC25C}"/>
+              </a:ext>
+            </a:extLst>
+          </p:cNvPr>
+          <p:cNvSpPr txBox="1"/>
+          <p:nvPr/>
+        </p:nvSpPr>
+        <p:spPr>
+          <a:xfrm>
+            <a:off x="4773869" y="2219090"/>
+            <a:ext cx="555171" cy="190800"/>
+          </a:xfrm>
+          <a:prstGeom prst="rect">
+            <a:avLst/>
+          </a:prstGeom>
+          <a:noFill/>
+          <a:ln>
+            <a:noFill/>
+          </a:ln>
+        </p:spPr>
+        <p:txBody>
+          <a:bodyPr wrap="square" tIns="3600" bIns="3600" rtlCol="0">
+            <a:spAutoFit/>
+          </a:bodyPr>
+          <a:lstStyle/>
+          <a:p>
+            <a:r>
+              <a:rPr lang="en-LU" sz="1200" dirty="0"/>
+              <a:t> </a:t>
+            </a:r>
+          </a:p>
+        </p:txBody>
+      </p:sp>
+      <p:sp>
+        <p:nvSpPr>
+          <p:cNvPr id="46" name="TextBox 45">
+            <a:extLst>
+              <a:ext uri="{FF2B5EF4-FFF2-40B4-BE49-F238E27FC236}">
+                <a16:creationId xmlns:a16="http://schemas.microsoft.com/office/drawing/2014/main" id="{6EBFF5B9-4E6D-DB44-89D7-26FA49E92D83}"/>
+              </a:ext>
+            </a:extLst>
+          </p:cNvPr>
+          <p:cNvSpPr txBox="1"/>
+          <p:nvPr/>
+        </p:nvSpPr>
+        <p:spPr>
+          <a:xfrm>
+            <a:off x="3546870" y="4202712"/>
+            <a:ext cx="2164301" cy="684713"/>
+          </a:xfrm>
+          <a:prstGeom prst="rect">
+            <a:avLst/>
+          </a:prstGeom>
+          <a:noFill/>
+          <a:ln>
+            <a:solidFill>
+              <a:schemeClr val="accent1"/>
+            </a:solidFill>
+          </a:ln>
+        </p:spPr>
+        <p:txBody>
+          <a:bodyPr wrap="none" rtlCol="0">
+            <a:noAutofit/>
+          </a:bodyPr>
+          <a:lstStyle/>
+          <a:p>
+            <a:r>
+              <a:rPr lang="en-US" sz="1600" dirty="0" err="1"/>
+              <a:t>componentDidMount</a:t>
+            </a:r>
+            <a:endParaRPr lang="en-US" sz="1600" dirty="0"/>
+          </a:p>
+          <a:p>
+            <a:pPr marL="171450" indent="-171450">
+              <a:buFont typeface="Arial" panose="020B0604020202020204" pitchFamily="34" charset="0"/>
+              <a:buChar char="•"/>
+            </a:pPr>
+            <a:r>
+              <a:rPr lang="en-US" sz="1200" dirty="0" err="1"/>
+              <a:t>this.setRandomDisguise</a:t>
+            </a:r>
+            <a:endParaRPr lang="en-US" sz="1200" dirty="0"/>
+          </a:p>
+        </p:txBody>
+      </p:sp>
+      <p:sp>
+        <p:nvSpPr>
+          <p:cNvPr id="47" name="TextBox 46">
+            <a:extLst>
+              <a:ext uri="{FF2B5EF4-FFF2-40B4-BE49-F238E27FC236}">
+                <a16:creationId xmlns:a16="http://schemas.microsoft.com/office/drawing/2014/main" id="{EAD6749F-6131-DF42-A687-CE4EA7146EE4}"/>
+              </a:ext>
+            </a:extLst>
+          </p:cNvPr>
+          <p:cNvSpPr txBox="1"/>
+          <p:nvPr/>
+        </p:nvSpPr>
+        <p:spPr>
+          <a:xfrm>
+            <a:off x="4776249" y="4493212"/>
+            <a:ext cx="555171" cy="190800"/>
+          </a:xfrm>
+          <a:prstGeom prst="rect">
+            <a:avLst/>
+          </a:prstGeom>
+          <a:noFill/>
+          <a:ln>
+            <a:noFill/>
+          </a:ln>
+        </p:spPr>
+        <p:txBody>
+          <a:bodyPr wrap="square" tIns="3600" bIns="3600" rtlCol="0">
+            <a:spAutoFit/>
+          </a:bodyPr>
+          <a:lstStyle/>
+          <a:p>
+            <a:r>
+              <a:rPr lang="en-LU" sz="1200" dirty="0"/>
+              <a:t> </a:t>
+            </a:r>
+          </a:p>
+        </p:txBody>
+      </p:sp>
+      <p:cxnSp>
+        <p:nvCxnSpPr>
+          <p:cNvPr id="49" name="Elbow Connector 48">
+            <a:extLst>
+              <a:ext uri="{FF2B5EF4-FFF2-40B4-BE49-F238E27FC236}">
+                <a16:creationId xmlns:a16="http://schemas.microsoft.com/office/drawing/2014/main" id="{BE0C446C-C1A0-6C4B-B65D-3680593B06EB}"/>
+              </a:ext>
+            </a:extLst>
+          </p:cNvPr>
+          <p:cNvCxnSpPr>
+            <a:cxnSpLocks/>
+            <a:stCxn id="47" idx="3"/>
+            <a:endCxn id="30" idx="1"/>
+          </p:cNvCxnSpPr>
+          <p:nvPr/>
+        </p:nvCxnSpPr>
+        <p:spPr>
+          <a:xfrm>
+            <a:off x="5331420" y="4588612"/>
+            <a:ext cx="1010589" cy="521939"/>
+          </a:xfrm>
+          <a:prstGeom prst="bentConnector3">
+            <a:avLst>
+              <a:gd name="adj1" fmla="val 50000"/>
+            </a:avLst>
+          </a:prstGeom>
+          <a:ln>
+            <a:solidFill>
+              <a:srgbClr val="FF0000"/>
+            </a:solidFill>
+            <a:tailEnd type="triangle"/>
+          </a:ln>
+        </p:spPr>
+        <p:style>
+          <a:lnRef idx="1">
+            <a:schemeClr val="accent1"/>
+          </a:lnRef>
+          <a:fillRef idx="0">
+            <a:schemeClr val="accent1"/>
+          </a:fillRef>
+          <a:effectRef idx="0">
+            <a:schemeClr val="accent1"/>
+          </a:effectRef>
+          <a:fontRef idx="minor">
+            <a:schemeClr val="tx1"/>
+          </a:fontRef>
+        </p:style>
+      </p:cxnSp>
+      <p:sp>
+        <p:nvSpPr>
+          <p:cNvPr id="52" name="TextBox 51">
+            <a:extLst>
+              <a:ext uri="{FF2B5EF4-FFF2-40B4-BE49-F238E27FC236}">
+                <a16:creationId xmlns:a16="http://schemas.microsoft.com/office/drawing/2014/main" id="{AC78348E-EDEB-3148-9746-3EC301A64ADE}"/>
+              </a:ext>
+            </a:extLst>
+          </p:cNvPr>
+          <p:cNvSpPr txBox="1"/>
+          <p:nvPr/>
+        </p:nvSpPr>
+        <p:spPr>
+          <a:xfrm>
+            <a:off x="5625196" y="4697346"/>
+            <a:ext cx="940322" cy="276999"/>
+          </a:xfrm>
+          <a:prstGeom prst="rect">
+            <a:avLst/>
+          </a:prstGeom>
+          <a:noFill/>
+        </p:spPr>
+        <p:txBody>
+          <a:bodyPr wrap="none" rtlCol="0">
+            <a:spAutoFit/>
+          </a:bodyPr>
+          <a:lstStyle/>
+          <a:p>
+            <a:r>
+              <a:rPr lang="en-US" sz="1200" dirty="0">
+                <a:solidFill>
+                  <a:srgbClr val="FF0000"/>
+                </a:solidFill>
+              </a:rPr>
+              <a:t>Infinite loop</a:t>
+            </a:r>
+          </a:p>
+        </p:txBody>
+      </p:sp>
+      <p:sp>
+        <p:nvSpPr>
+          <p:cNvPr id="54" name="TextBox 53">
+            <a:extLst>
+              <a:ext uri="{FF2B5EF4-FFF2-40B4-BE49-F238E27FC236}">
+                <a16:creationId xmlns:a16="http://schemas.microsoft.com/office/drawing/2014/main" id="{3C7FA380-1B80-6749-B8A1-63FD4614ED25}"/>
+              </a:ext>
+            </a:extLst>
+          </p:cNvPr>
+          <p:cNvSpPr txBox="1"/>
+          <p:nvPr/>
+        </p:nvSpPr>
+        <p:spPr>
+          <a:xfrm>
+            <a:off x="925907" y="2968236"/>
+            <a:ext cx="555171" cy="190800"/>
+          </a:xfrm>
+          <a:prstGeom prst="rect">
+            <a:avLst/>
+          </a:prstGeom>
+          <a:noFill/>
+          <a:ln>
+            <a:noFill/>
+          </a:ln>
+        </p:spPr>
+        <p:txBody>
+          <a:bodyPr wrap="square" tIns="3600" bIns="3600" rtlCol="0">
+            <a:spAutoFit/>
+          </a:bodyPr>
+          <a:lstStyle/>
+          <a:p>
+            <a:r>
+              <a:rPr lang="en-LU" sz="1200" dirty="0"/>
+              <a:t> </a:t>
+            </a:r>
+          </a:p>
+        </p:txBody>
+      </p:sp>
+      <p:sp>
+        <p:nvSpPr>
+          <p:cNvPr id="55" name="TextBox 54">
+            <a:extLst>
+              <a:ext uri="{FF2B5EF4-FFF2-40B4-BE49-F238E27FC236}">
+                <a16:creationId xmlns:a16="http://schemas.microsoft.com/office/drawing/2014/main" id="{A11EE6EB-F5E4-3942-AEA9-5F9917ECB917}"/>
+              </a:ext>
+            </a:extLst>
+          </p:cNvPr>
+          <p:cNvSpPr txBox="1"/>
+          <p:nvPr/>
+        </p:nvSpPr>
+        <p:spPr>
+          <a:xfrm>
+            <a:off x="6576404" y="3143052"/>
+            <a:ext cx="555171" cy="190800"/>
+          </a:xfrm>
+          <a:prstGeom prst="rect">
+            <a:avLst/>
+          </a:prstGeom>
+          <a:noFill/>
+          <a:ln>
+            <a:noFill/>
+          </a:ln>
+        </p:spPr>
+        <p:txBody>
+          <a:bodyPr wrap="square" tIns="3600" bIns="3600" rtlCol="0">
+            <a:spAutoFit/>
+          </a:bodyPr>
+          <a:lstStyle/>
+          <a:p>
+            <a:r>
+              <a:rPr lang="en-LU" sz="1200" dirty="0"/>
+              <a:t> </a:t>
+            </a:r>
+          </a:p>
+        </p:txBody>
+      </p:sp>
+      <p:cxnSp>
+        <p:nvCxnSpPr>
+          <p:cNvPr id="56" name="Elbow Connector 55">
+            <a:extLst>
+              <a:ext uri="{FF2B5EF4-FFF2-40B4-BE49-F238E27FC236}">
+                <a16:creationId xmlns:a16="http://schemas.microsoft.com/office/drawing/2014/main" id="{37A722D5-4C92-7549-BCD0-7254731E2493}"/>
+              </a:ext>
+            </a:extLst>
+          </p:cNvPr>
+          <p:cNvCxnSpPr>
+            <a:cxnSpLocks/>
+            <a:stCxn id="55" idx="2"/>
+            <a:endCxn id="54" idx="1"/>
+          </p:cNvCxnSpPr>
+          <p:nvPr/>
+        </p:nvCxnSpPr>
+        <p:spPr>
+          <a:xfrm rot="5400000" flipH="1">
+            <a:off x="3754841" y="234703"/>
+            <a:ext cx="270216" cy="5928083"/>
+          </a:xfrm>
+          <a:prstGeom prst="bentConnector4">
+            <a:avLst>
+              <a:gd name="adj1" fmla="val -84599"/>
+              <a:gd name="adj2" fmla="val 103856"/>
+            </a:avLst>
+          </a:prstGeom>
+          <a:ln>
+            <a:tailEnd type="triangle"/>
+          </a:ln>
+        </p:spPr>
+        <p:style>
+          <a:lnRef idx="1">
+            <a:schemeClr val="accent1"/>
+          </a:lnRef>
+          <a:fillRef idx="0">
+            <a:schemeClr val="accent1"/>
+          </a:fillRef>
+          <a:effectRef idx="0">
+            <a:schemeClr val="accent1"/>
+          </a:effectRef>
+          <a:fontRef idx="minor">
+            <a:schemeClr val="tx1"/>
+          </a:fontRef>
+        </p:style>
+      </p:cxnSp>
+      <p:sp>
+        <p:nvSpPr>
+          <p:cNvPr id="62" name="TextBox 61">
+            <a:extLst>
+              <a:ext uri="{FF2B5EF4-FFF2-40B4-BE49-F238E27FC236}">
+                <a16:creationId xmlns:a16="http://schemas.microsoft.com/office/drawing/2014/main" id="{832685C2-8D99-9442-8745-0BDFF36D8D74}"/>
+              </a:ext>
+            </a:extLst>
+          </p:cNvPr>
+          <p:cNvSpPr txBox="1"/>
+          <p:nvPr/>
+        </p:nvSpPr>
+        <p:spPr>
+          <a:xfrm>
+            <a:off x="925908" y="5221579"/>
+            <a:ext cx="555171" cy="190800"/>
+          </a:xfrm>
+          <a:prstGeom prst="rect">
+            <a:avLst/>
+          </a:prstGeom>
+          <a:noFill/>
+          <a:ln>
+            <a:noFill/>
+          </a:ln>
+        </p:spPr>
+        <p:txBody>
+          <a:bodyPr wrap="square" tIns="3600" bIns="3600" rtlCol="0">
+            <a:spAutoFit/>
+          </a:bodyPr>
+          <a:lstStyle/>
+          <a:p>
+            <a:r>
+              <a:rPr lang="en-LU" sz="1200" dirty="0"/>
+              <a:t> </a:t>
+            </a:r>
+          </a:p>
+        </p:txBody>
+      </p:sp>
+      <p:sp>
+        <p:nvSpPr>
+          <p:cNvPr id="63" name="TextBox 62">
+            <a:extLst>
+              <a:ext uri="{FF2B5EF4-FFF2-40B4-BE49-F238E27FC236}">
+                <a16:creationId xmlns:a16="http://schemas.microsoft.com/office/drawing/2014/main" id="{671CD6EB-C053-9547-920B-025F9DDA982E}"/>
+              </a:ext>
+            </a:extLst>
+          </p:cNvPr>
+          <p:cNvSpPr txBox="1"/>
+          <p:nvPr/>
+        </p:nvSpPr>
+        <p:spPr>
+          <a:xfrm>
+            <a:off x="6576405" y="5396395"/>
+            <a:ext cx="555171" cy="190800"/>
+          </a:xfrm>
+          <a:prstGeom prst="rect">
+            <a:avLst/>
+          </a:prstGeom>
+          <a:noFill/>
+          <a:ln>
+            <a:noFill/>
+          </a:ln>
+        </p:spPr>
+        <p:txBody>
+          <a:bodyPr wrap="square" tIns="3600" bIns="3600" rtlCol="0">
+            <a:spAutoFit/>
+          </a:bodyPr>
+          <a:lstStyle/>
+          <a:p>
+            <a:r>
+              <a:rPr lang="en-LU" sz="1200" dirty="0"/>
+              <a:t> </a:t>
+            </a:r>
+          </a:p>
+        </p:txBody>
+      </p:sp>
+      <p:cxnSp>
+        <p:nvCxnSpPr>
+          <p:cNvPr id="64" name="Elbow Connector 63">
+            <a:extLst>
+              <a:ext uri="{FF2B5EF4-FFF2-40B4-BE49-F238E27FC236}">
+                <a16:creationId xmlns:a16="http://schemas.microsoft.com/office/drawing/2014/main" id="{5F09F5D9-44EB-3A41-B41A-E80B4CF86477}"/>
+              </a:ext>
+            </a:extLst>
+          </p:cNvPr>
+          <p:cNvCxnSpPr>
+            <a:cxnSpLocks/>
+            <a:stCxn id="63" idx="2"/>
+            <a:endCxn id="62" idx="1"/>
+          </p:cNvCxnSpPr>
+          <p:nvPr/>
+        </p:nvCxnSpPr>
+        <p:spPr>
+          <a:xfrm rot="5400000" flipH="1">
+            <a:off x="3754842" y="2488046"/>
+            <a:ext cx="270216" cy="5928083"/>
+          </a:xfrm>
+          <a:prstGeom prst="bentConnector4">
+            <a:avLst>
+              <a:gd name="adj1" fmla="val -84599"/>
+              <a:gd name="adj2" fmla="val 103856"/>
+            </a:avLst>
+          </a:prstGeom>
+          <a:ln>
+            <a:tailEnd type="triangle"/>
+          </a:ln>
+        </p:spPr>
+        <p:style>
+          <a:lnRef idx="1">
+            <a:schemeClr val="accent1"/>
+          </a:lnRef>
+          <a:fillRef idx="0">
+            <a:schemeClr val="accent1"/>
+          </a:fillRef>
+          <a:effectRef idx="0">
+            <a:schemeClr val="accent1"/>
+          </a:effectRef>
+          <a:fontRef idx="minor">
+            <a:schemeClr val="tx1"/>
+          </a:fontRef>
+        </p:style>
+      </p:cxnSp>
+    </p:spTree>
+    <p:extLst>
+      <p:ext uri="{BB962C8B-B14F-4D97-AF65-F5344CB8AC3E}">
+        <p14:creationId xmlns:p14="http://schemas.microsoft.com/office/powerpoint/2010/main" val="1748035909"/>
       </p:ext>
     </p:extLst>
   </p:cSld>

</xml_diff>

<commit_message>
add EO in App.js, add props in constructor of OptionsTable
</commit_message>
<xml_diff>
--- a/Pepito/Final Project Design.pptx
+++ b/Pepito/Final Project Design.pptx
@@ -16559,6 +16559,74 @@
           </a:fontRef>
         </p:style>
       </p:cxnSp>
+      <p:sp>
+        <p:nvSpPr>
+          <p:cNvPr id="34" name="TextBox 33">
+            <a:extLst>
+              <a:ext uri="{FF2B5EF4-FFF2-40B4-BE49-F238E27FC236}">
+                <a16:creationId xmlns:a16="http://schemas.microsoft.com/office/drawing/2014/main" id="{58565329-176D-A64D-AB04-930D94616D27}"/>
+              </a:ext>
+            </a:extLst>
+          </p:cNvPr>
+          <p:cNvSpPr txBox="1"/>
+          <p:nvPr/>
+        </p:nvSpPr>
+        <p:spPr>
+          <a:xfrm>
+            <a:off x="6964483" y="5576245"/>
+            <a:ext cx="2083263" cy="276999"/>
+          </a:xfrm>
+          <a:prstGeom prst="rect">
+            <a:avLst/>
+          </a:prstGeom>
+          <a:noFill/>
+        </p:spPr>
+        <p:txBody>
+          <a:bodyPr wrap="none" rtlCol="0">
+            <a:spAutoFit/>
+          </a:bodyPr>
+          <a:lstStyle/>
+          <a:p>
+            <a:r>
+              <a:rPr lang="en-US" sz="1200" dirty="0" err="1">
+                <a:solidFill>
+                  <a:srgbClr val="FF0000"/>
+                </a:solidFill>
+              </a:rPr>
+              <a:t>Ajouter</a:t>
+            </a:r>
+            <a:r>
+              <a:rPr lang="en-US" sz="1200" dirty="0">
+                <a:solidFill>
+                  <a:srgbClr val="FF0000"/>
+                </a:solidFill>
+              </a:rPr>
+              <a:t> </a:t>
+            </a:r>
+            <a:r>
+              <a:rPr lang="en-US" sz="1200" dirty="0" err="1">
+                <a:solidFill>
+                  <a:srgbClr val="FF0000"/>
+                </a:solidFill>
+              </a:rPr>
+              <a:t>event.preventDefault</a:t>
+            </a:r>
+            <a:r>
+              <a:rPr lang="en-US" sz="1200">
+                <a:solidFill>
+                  <a:srgbClr val="FF0000"/>
+                </a:solidFill>
+              </a:rPr>
+              <a:t>?</a:t>
+            </a:r>
+            <a:endParaRPr lang="en-US" sz="1200" dirty="0">
+              <a:solidFill>
+                <a:srgbClr val="FF0000"/>
+              </a:solidFill>
+            </a:endParaRPr>
+          </a:p>
+        </p:txBody>
+      </p:sp>
     </p:spTree>
     <p:extLst>
       <p:ext uri="{BB962C8B-B14F-4D97-AF65-F5344CB8AC3E}">

</xml_diff>

<commit_message>
refactor App.js moving out random disguise generation
</commit_message>
<xml_diff>
--- a/Pepito/Final Project Design.pptx
+++ b/Pepito/Final Project Design.pptx
@@ -5,7 +5,7 @@
     <p:sldMasterId id="2147483648" r:id="rId1"/>
   </p:sldMasterIdLst>
   <p:notesMasterIdLst>
-    <p:notesMasterId r:id="rId11"/>
+    <p:notesMasterId r:id="rId13"/>
   </p:notesMasterIdLst>
   <p:sldIdLst>
     <p:sldId id="256" r:id="rId2"/>
@@ -17,6 +17,8 @@
     <p:sldId id="262" r:id="rId8"/>
     <p:sldId id="263" r:id="rId9"/>
     <p:sldId id="264" r:id="rId10"/>
+    <p:sldId id="265" r:id="rId11"/>
+    <p:sldId id="266" r:id="rId12"/>
   </p:sldIdLst>
   <p:sldSz cx="12192000" cy="6858000"/>
   <p:notesSz cx="6858000" cy="9144000"/>
@@ -205,7 +207,7 @@
           <a:p>
             <a:fld id="{E3DEDAA8-261D-1A48-9864-3FC231515C43}" type="datetimeFigureOut">
               <a:rPr lang="en-LU" smtClean="0"/>
-              <a:t>03/01/2021</a:t>
+              <a:t>07/01/2021</a:t>
             </a:fld>
             <a:endParaRPr lang="en-LU"/>
           </a:p>
@@ -809,6 +811,174 @@
 </p:notes>
 </file>
 
+<file path=ppt/notesSlides/notesSlide5.xml><?xml version="1.0" encoding="utf-8"?>
+<p:notes xmlns:a="http://schemas.openxmlformats.org/drawingml/2006/main" xmlns:r="http://schemas.openxmlformats.org/officeDocument/2006/relationships" xmlns:p="http://schemas.openxmlformats.org/presentationml/2006/main">
+  <p:cSld>
+    <p:spTree>
+      <p:nvGrpSpPr>
+        <p:cNvPr id="1" name=""/>
+        <p:cNvGrpSpPr/>
+        <p:nvPr/>
+      </p:nvGrpSpPr>
+      <p:grpSpPr>
+        <a:xfrm>
+          <a:off x="0" y="0"/>
+          <a:ext cx="0" cy="0"/>
+          <a:chOff x="0" y="0"/>
+          <a:chExt cx="0" cy="0"/>
+        </a:xfrm>
+      </p:grpSpPr>
+      <p:sp>
+        <p:nvSpPr>
+          <p:cNvPr id="2" name="Slide Image Placeholder 1"/>
+          <p:cNvSpPr>
+            <a:spLocks noGrp="1" noRot="1" noChangeAspect="1"/>
+          </p:cNvSpPr>
+          <p:nvPr>
+            <p:ph type="sldImg"/>
+          </p:nvPr>
+        </p:nvSpPr>
+        <p:spPr/>
+      </p:sp>
+      <p:sp>
+        <p:nvSpPr>
+          <p:cNvPr id="3" name="Notes Placeholder 2"/>
+          <p:cNvSpPr>
+            <a:spLocks noGrp="1"/>
+          </p:cNvSpPr>
+          <p:nvPr>
+            <p:ph type="body" idx="1"/>
+          </p:nvPr>
+        </p:nvSpPr>
+        <p:spPr/>
+        <p:txBody>
+          <a:bodyPr/>
+          <a:lstStyle/>
+          <a:p>
+            <a:endParaRPr lang="en-LU" dirty="0"/>
+          </a:p>
+        </p:txBody>
+      </p:sp>
+      <p:sp>
+        <p:nvSpPr>
+          <p:cNvPr id="4" name="Slide Number Placeholder 3"/>
+          <p:cNvSpPr>
+            <a:spLocks noGrp="1"/>
+          </p:cNvSpPr>
+          <p:nvPr>
+            <p:ph type="sldNum" sz="quarter" idx="5"/>
+          </p:nvPr>
+        </p:nvSpPr>
+        <p:spPr/>
+        <p:txBody>
+          <a:bodyPr/>
+          <a:lstStyle/>
+          <a:p>
+            <a:fld id="{F4E383B0-44CE-084D-AB54-AAB397A3DF4F}" type="slidenum">
+              <a:rPr lang="en-LU" smtClean="0"/>
+              <a:t>10</a:t>
+            </a:fld>
+            <a:endParaRPr lang="en-LU"/>
+          </a:p>
+        </p:txBody>
+      </p:sp>
+    </p:spTree>
+    <p:extLst>
+      <p:ext uri="{BB962C8B-B14F-4D97-AF65-F5344CB8AC3E}">
+        <p14:creationId xmlns:p14="http://schemas.microsoft.com/office/powerpoint/2010/main" val="3145085472"/>
+      </p:ext>
+    </p:extLst>
+  </p:cSld>
+  <p:clrMapOvr>
+    <a:masterClrMapping/>
+  </p:clrMapOvr>
+</p:notes>
+</file>
+
+<file path=ppt/notesSlides/notesSlide6.xml><?xml version="1.0" encoding="utf-8"?>
+<p:notes xmlns:a="http://schemas.openxmlformats.org/drawingml/2006/main" xmlns:r="http://schemas.openxmlformats.org/officeDocument/2006/relationships" xmlns:p="http://schemas.openxmlformats.org/presentationml/2006/main">
+  <p:cSld>
+    <p:spTree>
+      <p:nvGrpSpPr>
+        <p:cNvPr id="1" name=""/>
+        <p:cNvGrpSpPr/>
+        <p:nvPr/>
+      </p:nvGrpSpPr>
+      <p:grpSpPr>
+        <a:xfrm>
+          <a:off x="0" y="0"/>
+          <a:ext cx="0" cy="0"/>
+          <a:chOff x="0" y="0"/>
+          <a:chExt cx="0" cy="0"/>
+        </a:xfrm>
+      </p:grpSpPr>
+      <p:sp>
+        <p:nvSpPr>
+          <p:cNvPr id="2" name="Slide Image Placeholder 1"/>
+          <p:cNvSpPr>
+            <a:spLocks noGrp="1" noRot="1" noChangeAspect="1"/>
+          </p:cNvSpPr>
+          <p:nvPr>
+            <p:ph type="sldImg"/>
+          </p:nvPr>
+        </p:nvSpPr>
+        <p:spPr/>
+      </p:sp>
+      <p:sp>
+        <p:nvSpPr>
+          <p:cNvPr id="3" name="Notes Placeholder 2"/>
+          <p:cNvSpPr>
+            <a:spLocks noGrp="1"/>
+          </p:cNvSpPr>
+          <p:nvPr>
+            <p:ph type="body" idx="1"/>
+          </p:nvPr>
+        </p:nvSpPr>
+        <p:spPr/>
+        <p:txBody>
+          <a:bodyPr/>
+          <a:lstStyle/>
+          <a:p>
+            <a:endParaRPr lang="en-LU" dirty="0"/>
+          </a:p>
+        </p:txBody>
+      </p:sp>
+      <p:sp>
+        <p:nvSpPr>
+          <p:cNvPr id="4" name="Slide Number Placeholder 3"/>
+          <p:cNvSpPr>
+            <a:spLocks noGrp="1"/>
+          </p:cNvSpPr>
+          <p:nvPr>
+            <p:ph type="sldNum" sz="quarter" idx="5"/>
+          </p:nvPr>
+        </p:nvSpPr>
+        <p:spPr/>
+        <p:txBody>
+          <a:bodyPr/>
+          <a:lstStyle/>
+          <a:p>
+            <a:fld id="{F4E383B0-44CE-084D-AB54-AAB397A3DF4F}" type="slidenum">
+              <a:rPr lang="en-LU" smtClean="0"/>
+              <a:t>11</a:t>
+            </a:fld>
+            <a:endParaRPr lang="en-LU"/>
+          </a:p>
+        </p:txBody>
+      </p:sp>
+    </p:spTree>
+    <p:extLst>
+      <p:ext uri="{BB962C8B-B14F-4D97-AF65-F5344CB8AC3E}">
+        <p14:creationId xmlns:p14="http://schemas.microsoft.com/office/powerpoint/2010/main" val="2177741280"/>
+      </p:ext>
+    </p:extLst>
+  </p:cSld>
+  <p:clrMapOvr>
+    <a:masterClrMapping/>
+  </p:clrMapOvr>
+</p:notes>
+</file>
+
 <file path=ppt/slideLayouts/slideLayout1.xml><?xml version="1.0" encoding="utf-8"?>
 <p:sldLayout xmlns:a="http://schemas.openxmlformats.org/drawingml/2006/main" xmlns:r="http://schemas.openxmlformats.org/officeDocument/2006/relationships" xmlns:p="http://schemas.openxmlformats.org/presentationml/2006/main" type="title" preserve="1">
   <p:cSld name="Title Slide">
@@ -958,7 +1128,7 @@
           <a:p>
             <a:fld id="{9ECEDF27-B25B-0343-A39C-1905A44EF111}" type="datetimeFigureOut">
               <a:rPr lang="en-LU" smtClean="0"/>
-              <a:t>03/01/2021</a:t>
+              <a:t>07/01/2021</a:t>
             </a:fld>
             <a:endParaRPr lang="en-LU"/>
           </a:p>
@@ -1158,7 +1328,7 @@
           <a:p>
             <a:fld id="{9ECEDF27-B25B-0343-A39C-1905A44EF111}" type="datetimeFigureOut">
               <a:rPr lang="en-LU" smtClean="0"/>
-              <a:t>03/01/2021</a:t>
+              <a:t>07/01/2021</a:t>
             </a:fld>
             <a:endParaRPr lang="en-LU"/>
           </a:p>
@@ -1368,7 +1538,7 @@
           <a:p>
             <a:fld id="{9ECEDF27-B25B-0343-A39C-1905A44EF111}" type="datetimeFigureOut">
               <a:rPr lang="en-LU" smtClean="0"/>
-              <a:t>03/01/2021</a:t>
+              <a:t>07/01/2021</a:t>
             </a:fld>
             <a:endParaRPr lang="en-LU"/>
           </a:p>
@@ -1568,7 +1738,7 @@
           <a:p>
             <a:fld id="{9ECEDF27-B25B-0343-A39C-1905A44EF111}" type="datetimeFigureOut">
               <a:rPr lang="en-LU" smtClean="0"/>
-              <a:t>03/01/2021</a:t>
+              <a:t>07/01/2021</a:t>
             </a:fld>
             <a:endParaRPr lang="en-LU"/>
           </a:p>
@@ -1844,7 +2014,7 @@
           <a:p>
             <a:fld id="{9ECEDF27-B25B-0343-A39C-1905A44EF111}" type="datetimeFigureOut">
               <a:rPr lang="en-LU" smtClean="0"/>
-              <a:t>03/01/2021</a:t>
+              <a:t>07/01/2021</a:t>
             </a:fld>
             <a:endParaRPr lang="en-LU"/>
           </a:p>
@@ -2112,7 +2282,7 @@
           <a:p>
             <a:fld id="{9ECEDF27-B25B-0343-A39C-1905A44EF111}" type="datetimeFigureOut">
               <a:rPr lang="en-LU" smtClean="0"/>
-              <a:t>03/01/2021</a:t>
+              <a:t>07/01/2021</a:t>
             </a:fld>
             <a:endParaRPr lang="en-LU"/>
           </a:p>
@@ -2527,7 +2697,7 @@
           <a:p>
             <a:fld id="{9ECEDF27-B25B-0343-A39C-1905A44EF111}" type="datetimeFigureOut">
               <a:rPr lang="en-LU" smtClean="0"/>
-              <a:t>03/01/2021</a:t>
+              <a:t>07/01/2021</a:t>
             </a:fld>
             <a:endParaRPr lang="en-LU"/>
           </a:p>
@@ -2669,7 +2839,7 @@
           <a:p>
             <a:fld id="{9ECEDF27-B25B-0343-A39C-1905A44EF111}" type="datetimeFigureOut">
               <a:rPr lang="en-LU" smtClean="0"/>
-              <a:t>03/01/2021</a:t>
+              <a:t>07/01/2021</a:t>
             </a:fld>
             <a:endParaRPr lang="en-LU"/>
           </a:p>
@@ -2782,7 +2952,7 @@
           <a:p>
             <a:fld id="{9ECEDF27-B25B-0343-A39C-1905A44EF111}" type="datetimeFigureOut">
               <a:rPr lang="en-LU" smtClean="0"/>
-              <a:t>03/01/2021</a:t>
+              <a:t>07/01/2021</a:t>
             </a:fld>
             <a:endParaRPr lang="en-LU"/>
           </a:p>
@@ -3095,7 +3265,7 @@
           <a:p>
             <a:fld id="{9ECEDF27-B25B-0343-A39C-1905A44EF111}" type="datetimeFigureOut">
               <a:rPr lang="en-LU" smtClean="0"/>
-              <a:t>03/01/2021</a:t>
+              <a:t>07/01/2021</a:t>
             </a:fld>
             <a:endParaRPr lang="en-LU"/>
           </a:p>
@@ -3384,7 +3554,7 @@
           <a:p>
             <a:fld id="{9ECEDF27-B25B-0343-A39C-1905A44EF111}" type="datetimeFigureOut">
               <a:rPr lang="en-LU" smtClean="0"/>
-              <a:t>03/01/2021</a:t>
+              <a:t>07/01/2021</a:t>
             </a:fld>
             <a:endParaRPr lang="en-LU"/>
           </a:p>
@@ -3551,38 +3721,38 @@
           <a:p>
             <a:pPr lvl="0"/>
             <a:r>
-              <a:rPr lang="en-GB"/>
+              <a:rPr lang="en-GB" dirty="0"/>
               <a:t>Click to edit Master text styles</a:t>
             </a:r>
           </a:p>
           <a:p>
             <a:pPr lvl="1"/>
             <a:r>
-              <a:rPr lang="en-GB"/>
+              <a:rPr lang="en-GB" dirty="0"/>
               <a:t>Second level</a:t>
             </a:r>
           </a:p>
           <a:p>
             <a:pPr lvl="2"/>
             <a:r>
-              <a:rPr lang="en-GB"/>
+              <a:rPr lang="en-GB" dirty="0"/>
               <a:t>Third level</a:t>
             </a:r>
           </a:p>
           <a:p>
             <a:pPr lvl="3"/>
             <a:r>
-              <a:rPr lang="en-GB"/>
+              <a:rPr lang="en-GB" dirty="0"/>
               <a:t>Fourth level</a:t>
             </a:r>
           </a:p>
           <a:p>
             <a:pPr lvl="4"/>
             <a:r>
-              <a:rPr lang="en-GB"/>
+              <a:rPr lang="en-GB" dirty="0"/>
               <a:t>Fifth level</a:t>
             </a:r>
-            <a:endParaRPr lang="en-LU"/>
+            <a:endParaRPr lang="en-LU" dirty="0"/>
           </a:p>
         </p:txBody>
       </p:sp>
@@ -3627,7 +3797,7 @@
           <a:p>
             <a:fld id="{9ECEDF27-B25B-0343-A39C-1905A44EF111}" type="datetimeFigureOut">
               <a:rPr lang="en-LU" smtClean="0"/>
-              <a:t>03/01/2021</a:t>
+              <a:t>07/01/2021</a:t>
             </a:fld>
             <a:endParaRPr lang="en-LU"/>
           </a:p>
@@ -3783,7 +3953,7 @@
           <a:cs typeface="+mn-cs"/>
         </a:defRPr>
       </a:lvl1pPr>
-      <a:lvl2pPr marL="685800" indent="-228600" algn="l" defTabSz="914400" rtl="0" eaLnBrk="1" latinLnBrk="0" hangingPunct="1">
+      <a:lvl2pPr marL="496888" indent="-254000" algn="l" defTabSz="914400" rtl="0" eaLnBrk="1" latinLnBrk="0" hangingPunct="1">
         <a:lnSpc>
           <a:spcPct val="90000"/>
         </a:lnSpc>
@@ -3792,6 +3962,7 @@
         </a:spcBef>
         <a:buFont typeface="Arial" panose="020B0604020202020204" pitchFamily="34" charset="0"/>
         <a:buChar char="•"/>
+        <a:tabLst/>
         <a:defRPr sz="2400" kern="1200">
           <a:solidFill>
             <a:schemeClr val="tx1"/>
@@ -3801,7 +3972,7 @@
           <a:cs typeface="+mn-cs"/>
         </a:defRPr>
       </a:lvl2pPr>
-      <a:lvl3pPr marL="1143000" indent="-228600" algn="l" defTabSz="914400" rtl="0" eaLnBrk="1" latinLnBrk="0" hangingPunct="1">
+      <a:lvl3pPr marL="720725" indent="-254000" algn="l" defTabSz="914400" rtl="0" eaLnBrk="1" latinLnBrk="0" hangingPunct="1">
         <a:lnSpc>
           <a:spcPct val="90000"/>
         </a:lnSpc>
@@ -3810,6 +3981,7 @@
         </a:spcBef>
         <a:buFont typeface="Arial" panose="020B0604020202020204" pitchFamily="34" charset="0"/>
         <a:buChar char="•"/>
+        <a:tabLst/>
         <a:defRPr sz="2000" kern="1200">
           <a:solidFill>
             <a:schemeClr val="tx1"/>
@@ -3819,7 +3991,7 @@
           <a:cs typeface="+mn-cs"/>
         </a:defRPr>
       </a:lvl3pPr>
-      <a:lvl4pPr marL="1600200" indent="-228600" algn="l" defTabSz="914400" rtl="0" eaLnBrk="1" latinLnBrk="0" hangingPunct="1">
+      <a:lvl4pPr marL="984250" indent="-254000" algn="l" defTabSz="914400" rtl="0" eaLnBrk="1" latinLnBrk="0" hangingPunct="1">
         <a:lnSpc>
           <a:spcPct val="90000"/>
         </a:lnSpc>
@@ -3828,6 +4000,7 @@
         </a:spcBef>
         <a:buFont typeface="Arial" panose="020B0604020202020204" pitchFamily="34" charset="0"/>
         <a:buChar char="•"/>
+        <a:tabLst/>
         <a:defRPr sz="1800" kern="1200">
           <a:solidFill>
             <a:schemeClr val="tx1"/>
@@ -3837,7 +4010,7 @@
           <a:cs typeface="+mn-cs"/>
         </a:defRPr>
       </a:lvl4pPr>
-      <a:lvl5pPr marL="2057400" indent="-228600" algn="l" defTabSz="914400" rtl="0" eaLnBrk="1" latinLnBrk="0" hangingPunct="1">
+      <a:lvl5pPr marL="1208088" indent="-233363" algn="l" defTabSz="914400" rtl="0" eaLnBrk="1" latinLnBrk="0" hangingPunct="1">
         <a:lnSpc>
           <a:spcPct val="90000"/>
         </a:lnSpc>
@@ -3846,6 +4019,7 @@
         </a:spcBef>
         <a:buFont typeface="Arial" panose="020B0604020202020204" pitchFamily="34" charset="0"/>
         <a:buChar char="•"/>
+        <a:tabLst/>
         <a:defRPr sz="1800" kern="1200">
           <a:solidFill>
             <a:schemeClr val="tx1"/>
@@ -6234,6 +6408,2389 @@
     <p:extLst>
       <p:ext uri="{BB962C8B-B14F-4D97-AF65-F5344CB8AC3E}">
         <p14:creationId xmlns:p14="http://schemas.microsoft.com/office/powerpoint/2010/main" val="1244079698"/>
+      </p:ext>
+    </p:extLst>
+  </p:cSld>
+  <p:clrMapOvr>
+    <a:masterClrMapping/>
+  </p:clrMapOvr>
+</p:sld>
+</file>
+
+<file path=ppt/slides/slide10.xml><?xml version="1.0" encoding="utf-8"?>
+<p:sld xmlns:a="http://schemas.openxmlformats.org/drawingml/2006/main" xmlns:r="http://schemas.openxmlformats.org/officeDocument/2006/relationships" xmlns:p="http://schemas.openxmlformats.org/presentationml/2006/main">
+  <p:cSld>
+    <p:spTree>
+      <p:nvGrpSpPr>
+        <p:cNvPr id="1" name=""/>
+        <p:cNvGrpSpPr/>
+        <p:nvPr/>
+      </p:nvGrpSpPr>
+      <p:grpSpPr>
+        <a:xfrm>
+          <a:off x="0" y="0"/>
+          <a:ext cx="0" cy="0"/>
+          <a:chOff x="0" y="0"/>
+          <a:chExt cx="0" cy="0"/>
+        </a:xfrm>
+      </p:grpSpPr>
+      <p:sp>
+        <p:nvSpPr>
+          <p:cNvPr id="4" name="TextBox 3">
+            <a:extLst>
+              <a:ext uri="{FF2B5EF4-FFF2-40B4-BE49-F238E27FC236}">
+                <a16:creationId xmlns:a16="http://schemas.microsoft.com/office/drawing/2014/main" id="{7B91D8D0-F88B-784E-8FF8-D5F07BC08546}"/>
+              </a:ext>
+            </a:extLst>
+          </p:cNvPr>
+          <p:cNvSpPr txBox="1"/>
+          <p:nvPr/>
+        </p:nvSpPr>
+        <p:spPr>
+          <a:xfrm>
+            <a:off x="620486" y="250372"/>
+            <a:ext cx="4593771" cy="594250"/>
+          </a:xfrm>
+          <a:prstGeom prst="rect">
+            <a:avLst/>
+          </a:prstGeom>
+          <a:solidFill>
+            <a:srgbClr val="E1EFD8"/>
+          </a:solidFill>
+        </p:spPr>
+        <p:txBody>
+          <a:bodyPr wrap="none" rtlCol="0" anchor="ctr" anchorCtr="0">
+            <a:noAutofit/>
+          </a:bodyPr>
+          <a:lstStyle/>
+          <a:p>
+            <a:r>
+              <a:rPr lang="en-US" b="1" dirty="0">
+                <a:solidFill>
+                  <a:srgbClr val="980000"/>
+                </a:solidFill>
+              </a:rPr>
+              <a:t>Another design </a:t>
+            </a:r>
+            <a:r>
+              <a:rPr lang="en-US" b="1">
+                <a:solidFill>
+                  <a:srgbClr val="980000"/>
+                </a:solidFill>
+              </a:rPr>
+              <a:t>to clean App</a:t>
+            </a:r>
+            <a:endParaRPr lang="en-US" b="1" dirty="0">
+              <a:solidFill>
+                <a:srgbClr val="980000"/>
+              </a:solidFill>
+            </a:endParaRPr>
+          </a:p>
+        </p:txBody>
+      </p:sp>
+      <p:sp>
+        <p:nvSpPr>
+          <p:cNvPr id="9" name="TextBox 8">
+            <a:extLst>
+              <a:ext uri="{FF2B5EF4-FFF2-40B4-BE49-F238E27FC236}">
+                <a16:creationId xmlns:a16="http://schemas.microsoft.com/office/drawing/2014/main" id="{A648BA86-9C0C-0846-A8F7-877203CF605C}"/>
+              </a:ext>
+            </a:extLst>
+          </p:cNvPr>
+          <p:cNvSpPr txBox="1"/>
+          <p:nvPr/>
+        </p:nvSpPr>
+        <p:spPr>
+          <a:xfrm>
+            <a:off x="815416" y="1029531"/>
+            <a:ext cx="3694509" cy="2170869"/>
+          </a:xfrm>
+          <a:prstGeom prst="rect">
+            <a:avLst/>
+          </a:prstGeom>
+          <a:noFill/>
+          <a:ln>
+            <a:solidFill>
+              <a:schemeClr val="accent1"/>
+            </a:solidFill>
+          </a:ln>
+        </p:spPr>
+        <p:txBody>
+          <a:bodyPr wrap="none" rtlCol="0">
+            <a:noAutofit/>
+          </a:bodyPr>
+          <a:lstStyle/>
+          <a:p>
+            <a:r>
+              <a:rPr lang="en-US" sz="1600" dirty="0" err="1"/>
+              <a:t>App.js</a:t>
+            </a:r>
+            <a:endParaRPr lang="en-US" sz="1600" dirty="0"/>
+          </a:p>
+          <a:p>
+            <a:pPr marL="171450" indent="-171450">
+              <a:buFont typeface="Arial" panose="020B0604020202020204" pitchFamily="34" charset="0"/>
+              <a:buChar char="•"/>
+            </a:pPr>
+            <a:r>
+              <a:rPr lang="en-US" sz="1200" dirty="0" err="1"/>
+              <a:t>setDisguise</a:t>
+            </a:r>
+            <a:r>
+              <a:rPr lang="en-US" sz="1200" dirty="0"/>
+              <a:t>(disguise)</a:t>
+            </a:r>
+          </a:p>
+          <a:p>
+            <a:pPr marL="314325" lvl="1" indent="-163513">
+              <a:buFont typeface="Arial" panose="020B0604020202020204" pitchFamily="34" charset="0"/>
+              <a:buChar char="•"/>
+            </a:pPr>
+            <a:r>
+              <a:rPr lang="en-US" sz="1200" dirty="0" err="1"/>
+              <a:t>this.setState</a:t>
+            </a:r>
+            <a:r>
+              <a:rPr lang="en-US" sz="1200" dirty="0"/>
+              <a:t>({</a:t>
+            </a:r>
+            <a:r>
+              <a:rPr lang="en-US" sz="1200" dirty="0" err="1"/>
+              <a:t>disguise:disguise</a:t>
+            </a:r>
+            <a:r>
+              <a:rPr lang="en-US" sz="1200" dirty="0"/>
+              <a:t>})</a:t>
+            </a:r>
+          </a:p>
+          <a:p>
+            <a:pPr marL="171450" indent="-171450">
+              <a:buFont typeface="Arial" panose="020B0604020202020204" pitchFamily="34" charset="0"/>
+              <a:buChar char="•"/>
+            </a:pPr>
+            <a:r>
+              <a:rPr lang="en-US" sz="1200" dirty="0" err="1"/>
+              <a:t>connectB</a:t>
+            </a:r>
+            <a:r>
+              <a:rPr lang="en-US" sz="1200" dirty="0"/>
+              <a:t>(web3, accounts, </a:t>
+            </a:r>
+            <a:r>
+              <a:rPr lang="en-US" sz="1200" dirty="0" err="1"/>
+              <a:t>pepitoContract</a:t>
+            </a:r>
+            <a:r>
+              <a:rPr lang="en-US" sz="1200" dirty="0"/>
+              <a:t>)</a:t>
+            </a:r>
+          </a:p>
+          <a:p>
+            <a:pPr marL="314325" lvl="1" indent="-163513">
+              <a:buFont typeface="Arial" panose="020B0604020202020204" pitchFamily="34" charset="0"/>
+              <a:buChar char="•"/>
+            </a:pPr>
+            <a:r>
+              <a:rPr lang="en-US" sz="1200" dirty="0" err="1"/>
+              <a:t>this.setState</a:t>
+            </a:r>
+            <a:r>
+              <a:rPr lang="en-US" sz="1200" dirty="0"/>
+              <a:t>({</a:t>
+            </a:r>
+            <a:r>
+              <a:rPr lang="en-US" sz="1200" dirty="0" err="1"/>
+              <a:t>pepitoContract</a:t>
+            </a:r>
+            <a:r>
+              <a:rPr lang="en-US" sz="1200" dirty="0"/>
+              <a:t> : </a:t>
+            </a:r>
+            <a:r>
+              <a:rPr lang="en-US" sz="1200" dirty="0" err="1"/>
+              <a:t>pepitoContract</a:t>
+            </a:r>
+            <a:br>
+              <a:rPr lang="en-US" sz="1200" dirty="0"/>
+            </a:br>
+            <a:r>
+              <a:rPr lang="en-US" sz="1200" dirty="0"/>
+              <a:t>	web3: web3,</a:t>
+            </a:r>
+            <a:br>
+              <a:rPr lang="en-US" sz="1200" dirty="0"/>
+            </a:br>
+            <a:r>
+              <a:rPr lang="en-US" sz="1200" dirty="0"/>
+              <a:t>	accounts: accounts})</a:t>
+            </a:r>
+          </a:p>
+          <a:p>
+            <a:pPr marL="171450" indent="-171450">
+              <a:buFont typeface="Arial" panose="020B0604020202020204" pitchFamily="34" charset="0"/>
+              <a:buChar char="•"/>
+            </a:pPr>
+            <a:r>
+              <a:rPr lang="en-US" sz="1200" dirty="0"/>
+              <a:t>Render() {return(…</a:t>
+            </a:r>
+          </a:p>
+          <a:p>
+            <a:pPr marL="314325" lvl="1" indent="-163513">
+              <a:buFont typeface="Arial" panose="020B0604020202020204" pitchFamily="34" charset="0"/>
+              <a:buChar char="•"/>
+            </a:pPr>
+            <a:r>
+              <a:rPr lang="en-US" sz="1200" dirty="0"/>
+              <a:t>&lt;</a:t>
+            </a:r>
+            <a:r>
+              <a:rPr lang="en-US" sz="1200" dirty="0" err="1"/>
+              <a:t>DisguiseControls</a:t>
+            </a:r>
+            <a:r>
+              <a:rPr lang="en-US" sz="1200" dirty="0"/>
+              <a:t> </a:t>
+            </a:r>
+            <a:r>
+              <a:rPr lang="en-US" sz="1200" dirty="0" err="1"/>
+              <a:t>setDisguise</a:t>
+            </a:r>
+            <a:r>
+              <a:rPr lang="en-US" sz="1200" dirty="0"/>
+              <a:t>={</a:t>
+            </a:r>
+            <a:r>
+              <a:rPr lang="en-US" sz="1200" dirty="0" err="1"/>
+              <a:t>this.setDisguise</a:t>
+            </a:r>
+            <a:r>
+              <a:rPr lang="en-US" sz="1200" dirty="0"/>
+              <a:t>} </a:t>
+            </a:r>
+            <a:br>
+              <a:rPr lang="en-US" sz="1200" dirty="0"/>
+            </a:br>
+            <a:r>
+              <a:rPr lang="en-US" sz="1200" dirty="0" err="1"/>
+              <a:t>connectB</a:t>
+            </a:r>
+            <a:r>
+              <a:rPr lang="en-US" sz="1200" dirty="0"/>
+              <a:t>={</a:t>
+            </a:r>
+            <a:r>
+              <a:rPr lang="en-US" sz="1200" dirty="0" err="1"/>
+              <a:t>this.connectB</a:t>
+            </a:r>
+            <a:r>
+              <a:rPr lang="en-US" sz="1200" dirty="0"/>
+              <a:t>} /&gt;</a:t>
+            </a:r>
+          </a:p>
+          <a:p>
+            <a:pPr marL="314325" lvl="1" indent="-163513">
+              <a:buFont typeface="Arial" panose="020B0604020202020204" pitchFamily="34" charset="0"/>
+              <a:buChar char="•"/>
+            </a:pPr>
+            <a:r>
+              <a:rPr lang="en-US" sz="1200" dirty="0"/>
+              <a:t>)}</a:t>
+            </a:r>
+          </a:p>
+        </p:txBody>
+      </p:sp>
+      <p:cxnSp>
+        <p:nvCxnSpPr>
+          <p:cNvPr id="42" name="Elbow Connector 41">
+            <a:extLst>
+              <a:ext uri="{FF2B5EF4-FFF2-40B4-BE49-F238E27FC236}">
+                <a16:creationId xmlns:a16="http://schemas.microsoft.com/office/drawing/2014/main" id="{78DE0365-6BBA-4F46-A337-02674D3E8C46}"/>
+              </a:ext>
+            </a:extLst>
+          </p:cNvPr>
+          <p:cNvCxnSpPr>
+            <a:cxnSpLocks/>
+            <a:stCxn id="22" idx="3"/>
+            <a:endCxn id="35" idx="1"/>
+          </p:cNvCxnSpPr>
+          <p:nvPr/>
+        </p:nvCxnSpPr>
+        <p:spPr>
+          <a:xfrm flipV="1">
+            <a:off x="4248610" y="1056823"/>
+            <a:ext cx="1418596" cy="1469537"/>
+          </a:xfrm>
+          <a:prstGeom prst="bentConnector3">
+            <a:avLst>
+              <a:gd name="adj1" fmla="val 50000"/>
+            </a:avLst>
+          </a:prstGeom>
+          <a:ln w="12700">
+            <a:tailEnd type="triangle"/>
+          </a:ln>
+        </p:spPr>
+        <p:style>
+          <a:lnRef idx="1">
+            <a:schemeClr val="accent1"/>
+          </a:lnRef>
+          <a:fillRef idx="0">
+            <a:schemeClr val="accent1"/>
+          </a:fillRef>
+          <a:effectRef idx="0">
+            <a:schemeClr val="accent1"/>
+          </a:effectRef>
+          <a:fontRef idx="minor">
+            <a:schemeClr val="tx1"/>
+          </a:fontRef>
+        </p:style>
+      </p:cxnSp>
+      <p:sp>
+        <p:nvSpPr>
+          <p:cNvPr id="41" name="TextBox 40">
+            <a:extLst>
+              <a:ext uri="{FF2B5EF4-FFF2-40B4-BE49-F238E27FC236}">
+                <a16:creationId xmlns:a16="http://schemas.microsoft.com/office/drawing/2014/main" id="{F4C0BFC7-6A70-7A41-B11C-BFAC88A20486}"/>
+              </a:ext>
+            </a:extLst>
+          </p:cNvPr>
+          <p:cNvSpPr txBox="1"/>
+          <p:nvPr/>
+        </p:nvSpPr>
+        <p:spPr>
+          <a:xfrm>
+            <a:off x="7023243" y="1819254"/>
+            <a:ext cx="3546786" cy="1479116"/>
+          </a:xfrm>
+          <a:prstGeom prst="rect">
+            <a:avLst/>
+          </a:prstGeom>
+          <a:noFill/>
+          <a:ln>
+            <a:solidFill>
+              <a:schemeClr val="accent1"/>
+            </a:solidFill>
+          </a:ln>
+        </p:spPr>
+        <p:txBody>
+          <a:bodyPr wrap="none" rtlCol="0">
+            <a:noAutofit/>
+          </a:bodyPr>
+          <a:lstStyle/>
+          <a:p>
+            <a:r>
+              <a:rPr lang="en-US" sz="1600" dirty="0"/>
+              <a:t>Disguise</a:t>
+            </a:r>
+          </a:p>
+          <a:p>
+            <a:pPr marL="171450" indent="-171450">
+              <a:buFont typeface="Arial" panose="020B0604020202020204" pitchFamily="34" charset="0"/>
+              <a:buChar char="•"/>
+            </a:pPr>
+            <a:r>
+              <a:rPr lang="en-US" sz="1200" dirty="0" err="1"/>
+              <a:t>fillDisguise</a:t>
+            </a:r>
+            <a:endParaRPr lang="en-US" sz="1200" dirty="0"/>
+          </a:p>
+          <a:p>
+            <a:pPr marL="628650" lvl="1" indent="-171450">
+              <a:buFont typeface="Arial" panose="020B0604020202020204" pitchFamily="34" charset="0"/>
+              <a:buChar char="•"/>
+            </a:pPr>
+            <a:r>
+              <a:rPr lang="en-US" sz="1200" dirty="0"/>
+              <a:t>Random disguise</a:t>
+            </a:r>
+          </a:p>
+          <a:p>
+            <a:pPr marL="628650" lvl="1" indent="-171450">
+              <a:buFont typeface="Arial" panose="020B0604020202020204" pitchFamily="34" charset="0"/>
+              <a:buChar char="•"/>
+            </a:pPr>
+            <a:r>
+              <a:rPr lang="en-US" sz="1200" dirty="0" err="1"/>
+              <a:t>this.props.setDisguise</a:t>
+            </a:r>
+            <a:r>
+              <a:rPr lang="en-US" sz="1200" dirty="0"/>
+              <a:t>(disguise) </a:t>
+            </a:r>
+          </a:p>
+          <a:p>
+            <a:pPr marL="171450" indent="-171450">
+              <a:buFont typeface="Arial" panose="020B0604020202020204" pitchFamily="34" charset="0"/>
+              <a:buChar char="•"/>
+            </a:pPr>
+            <a:r>
+              <a:rPr lang="en-US" sz="1200" dirty="0"/>
+              <a:t>Render() {return(…</a:t>
+            </a:r>
+          </a:p>
+          <a:p>
+            <a:pPr marL="314325" lvl="1" indent="-163513">
+              <a:buFont typeface="Arial" panose="020B0604020202020204" pitchFamily="34" charset="0"/>
+              <a:buChar char="•"/>
+            </a:pPr>
+            <a:r>
+              <a:rPr lang="en-US" sz="1200" dirty="0"/>
+              <a:t>&lt;Button onclick=</a:t>
+            </a:r>
+            <a:r>
+              <a:rPr lang="en-US" sz="1200" dirty="0" err="1"/>
+              <a:t>this.fillDisguise</a:t>
+            </a:r>
+            <a:r>
+              <a:rPr lang="en-US" sz="1200"/>
+              <a:t> /&gt;</a:t>
+            </a:r>
+            <a:endParaRPr lang="en-US" sz="1200" dirty="0"/>
+          </a:p>
+          <a:p>
+            <a:pPr marL="314325" lvl="1" indent="-163513">
+              <a:buFont typeface="Arial" panose="020B0604020202020204" pitchFamily="34" charset="0"/>
+              <a:buChar char="•"/>
+            </a:pPr>
+            <a:r>
+              <a:rPr lang="en-US" sz="1200" dirty="0"/>
+              <a:t>)}</a:t>
+            </a:r>
+          </a:p>
+        </p:txBody>
+      </p:sp>
+      <p:sp>
+        <p:nvSpPr>
+          <p:cNvPr id="22" name="TextBox 21">
+            <a:extLst>
+              <a:ext uri="{FF2B5EF4-FFF2-40B4-BE49-F238E27FC236}">
+                <a16:creationId xmlns:a16="http://schemas.microsoft.com/office/drawing/2014/main" id="{F549962F-115E-1648-9637-7B6BADF704D2}"/>
+              </a:ext>
+            </a:extLst>
+          </p:cNvPr>
+          <p:cNvSpPr txBox="1"/>
+          <p:nvPr/>
+        </p:nvSpPr>
+        <p:spPr>
+          <a:xfrm>
+            <a:off x="3693439" y="2430960"/>
+            <a:ext cx="555171" cy="190800"/>
+          </a:xfrm>
+          <a:prstGeom prst="rect">
+            <a:avLst/>
+          </a:prstGeom>
+          <a:noFill/>
+          <a:ln>
+            <a:noFill/>
+          </a:ln>
+        </p:spPr>
+        <p:txBody>
+          <a:bodyPr wrap="square" tIns="3600" bIns="3600" rtlCol="0">
+            <a:spAutoFit/>
+          </a:bodyPr>
+          <a:lstStyle/>
+          <a:p>
+            <a:r>
+              <a:rPr lang="en-LU" sz="1200" dirty="0"/>
+              <a:t> </a:t>
+            </a:r>
+          </a:p>
+        </p:txBody>
+      </p:sp>
+      <p:sp>
+        <p:nvSpPr>
+          <p:cNvPr id="35" name="TextBox 34">
+            <a:extLst>
+              <a:ext uri="{FF2B5EF4-FFF2-40B4-BE49-F238E27FC236}">
+                <a16:creationId xmlns:a16="http://schemas.microsoft.com/office/drawing/2014/main" id="{A660BA33-E93C-8641-B622-DD3D8AA3C292}"/>
+              </a:ext>
+            </a:extLst>
+          </p:cNvPr>
+          <p:cNvSpPr txBox="1"/>
+          <p:nvPr/>
+        </p:nvSpPr>
+        <p:spPr>
+          <a:xfrm>
+            <a:off x="5667206" y="524332"/>
+            <a:ext cx="4271451" cy="1064982"/>
+          </a:xfrm>
+          <a:prstGeom prst="rect">
+            <a:avLst/>
+          </a:prstGeom>
+          <a:noFill/>
+          <a:ln>
+            <a:solidFill>
+              <a:schemeClr val="accent1"/>
+            </a:solidFill>
+          </a:ln>
+        </p:spPr>
+        <p:txBody>
+          <a:bodyPr wrap="none" rtlCol="0">
+            <a:noAutofit/>
+          </a:bodyPr>
+          <a:lstStyle/>
+          <a:p>
+            <a:r>
+              <a:rPr lang="en-US" sz="1600" dirty="0" err="1"/>
+              <a:t>DisguiseControls</a:t>
+            </a:r>
+            <a:endParaRPr lang="en-US" sz="1600" dirty="0"/>
+          </a:p>
+          <a:p>
+            <a:pPr marL="171450" indent="-171450">
+              <a:buFont typeface="Arial" panose="020B0604020202020204" pitchFamily="34" charset="0"/>
+              <a:buChar char="•"/>
+            </a:pPr>
+            <a:r>
+              <a:rPr lang="en-US" sz="1200" dirty="0"/>
+              <a:t>Render() {return(…</a:t>
+            </a:r>
+          </a:p>
+          <a:p>
+            <a:pPr marL="314325" lvl="1" indent="-163513">
+              <a:buFont typeface="Arial" panose="020B0604020202020204" pitchFamily="34" charset="0"/>
+              <a:buChar char="•"/>
+            </a:pPr>
+            <a:r>
+              <a:rPr lang="en-US" sz="1200" dirty="0"/>
+              <a:t>&lt;Disguise </a:t>
+            </a:r>
+            <a:r>
+              <a:rPr lang="en-US" sz="1200" dirty="0" err="1"/>
+              <a:t>setDisguise</a:t>
+            </a:r>
+            <a:r>
+              <a:rPr lang="en-US" sz="1200" dirty="0"/>
+              <a:t>={</a:t>
+            </a:r>
+            <a:r>
+              <a:rPr lang="en-US" sz="1200" dirty="0" err="1"/>
+              <a:t>this.props.setDisguise</a:t>
+            </a:r>
+            <a:r>
+              <a:rPr lang="en-US" sz="1200" dirty="0"/>
+              <a:t>} /&gt;</a:t>
+            </a:r>
+          </a:p>
+          <a:p>
+            <a:pPr marL="314325" lvl="1" indent="-163513">
+              <a:buFont typeface="Arial" panose="020B0604020202020204" pitchFamily="34" charset="0"/>
+              <a:buChar char="•"/>
+            </a:pPr>
+            <a:r>
+              <a:rPr lang="en-US" sz="1200" dirty="0"/>
+              <a:t>&lt;</a:t>
+            </a:r>
+            <a:r>
+              <a:rPr lang="en-US" sz="1200" dirty="0" err="1"/>
+              <a:t>MakePepito</a:t>
+            </a:r>
+            <a:r>
+              <a:rPr lang="en-US" sz="1200" dirty="0"/>
+              <a:t> </a:t>
+            </a:r>
+            <a:r>
+              <a:rPr lang="en-US" sz="1200" dirty="0" err="1"/>
+              <a:t>connectB</a:t>
+            </a:r>
+            <a:r>
+              <a:rPr lang="en-US" sz="1200" dirty="0"/>
+              <a:t>={</a:t>
+            </a:r>
+            <a:r>
+              <a:rPr lang="en-US" sz="1200" dirty="0" err="1"/>
+              <a:t>this.props.connectB</a:t>
+            </a:r>
+            <a:r>
+              <a:rPr lang="en-US" sz="1200" dirty="0"/>
+              <a:t>} /&gt;</a:t>
+            </a:r>
+          </a:p>
+          <a:p>
+            <a:pPr marL="314325" lvl="1" indent="-163513">
+              <a:buFont typeface="Arial" panose="020B0604020202020204" pitchFamily="34" charset="0"/>
+              <a:buChar char="•"/>
+            </a:pPr>
+            <a:r>
+              <a:rPr lang="en-US" sz="1200" dirty="0"/>
+              <a:t>&lt;</a:t>
+            </a:r>
+            <a:r>
+              <a:rPr lang="en-US" sz="1200" dirty="0" err="1"/>
+              <a:t>DisguiseStore</a:t>
+            </a:r>
+            <a:r>
+              <a:rPr lang="en-US" sz="1200" dirty="0"/>
+              <a:t> /&gt;</a:t>
+            </a:r>
+          </a:p>
+          <a:p>
+            <a:pPr marL="314325" lvl="1" indent="-163513">
+              <a:buFont typeface="Arial" panose="020B0604020202020204" pitchFamily="34" charset="0"/>
+              <a:buChar char="•"/>
+            </a:pPr>
+            <a:r>
+              <a:rPr lang="en-US" sz="1200" dirty="0"/>
+              <a:t>)}</a:t>
+            </a:r>
+          </a:p>
+        </p:txBody>
+      </p:sp>
+      <p:cxnSp>
+        <p:nvCxnSpPr>
+          <p:cNvPr id="38" name="Elbow Connector 37">
+            <a:extLst>
+              <a:ext uri="{FF2B5EF4-FFF2-40B4-BE49-F238E27FC236}">
+                <a16:creationId xmlns:a16="http://schemas.microsoft.com/office/drawing/2014/main" id="{7252860B-8242-154A-93EB-E27DE8EDA6A0}"/>
+              </a:ext>
+            </a:extLst>
+          </p:cNvPr>
+          <p:cNvCxnSpPr>
+            <a:cxnSpLocks/>
+            <a:stCxn id="43" idx="2"/>
+            <a:endCxn id="41" idx="1"/>
+          </p:cNvCxnSpPr>
+          <p:nvPr/>
+        </p:nvCxnSpPr>
+        <p:spPr>
+          <a:xfrm rot="16200000" flipH="1">
+            <a:off x="6126175" y="1661743"/>
+            <a:ext cx="1379007" cy="415130"/>
+          </a:xfrm>
+          <a:prstGeom prst="bentConnector2">
+            <a:avLst/>
+          </a:prstGeom>
+          <a:ln w="12700">
+            <a:tailEnd type="triangle"/>
+          </a:ln>
+        </p:spPr>
+        <p:style>
+          <a:lnRef idx="1">
+            <a:schemeClr val="accent1"/>
+          </a:lnRef>
+          <a:fillRef idx="0">
+            <a:schemeClr val="accent1"/>
+          </a:fillRef>
+          <a:effectRef idx="0">
+            <a:schemeClr val="accent1"/>
+          </a:effectRef>
+          <a:fontRef idx="minor">
+            <a:schemeClr val="tx1"/>
+          </a:fontRef>
+        </p:style>
+      </p:cxnSp>
+      <p:sp>
+        <p:nvSpPr>
+          <p:cNvPr id="43" name="TextBox 42">
+            <a:extLst>
+              <a:ext uri="{FF2B5EF4-FFF2-40B4-BE49-F238E27FC236}">
+                <a16:creationId xmlns:a16="http://schemas.microsoft.com/office/drawing/2014/main" id="{276D3B9C-6E7C-3B4A-9CDE-EB4C4CBBC25C}"/>
+              </a:ext>
+            </a:extLst>
+          </p:cNvPr>
+          <p:cNvSpPr txBox="1"/>
+          <p:nvPr/>
+        </p:nvSpPr>
+        <p:spPr>
+          <a:xfrm>
+            <a:off x="6330527" y="989005"/>
+            <a:ext cx="555171" cy="190800"/>
+          </a:xfrm>
+          <a:prstGeom prst="rect">
+            <a:avLst/>
+          </a:prstGeom>
+          <a:noFill/>
+          <a:ln>
+            <a:noFill/>
+          </a:ln>
+        </p:spPr>
+        <p:txBody>
+          <a:bodyPr wrap="square" tIns="3600" bIns="3600" rtlCol="0">
+            <a:spAutoFit/>
+          </a:bodyPr>
+          <a:lstStyle/>
+          <a:p>
+            <a:r>
+              <a:rPr lang="en-LU" sz="1200" dirty="0"/>
+              <a:t> </a:t>
+            </a:r>
+          </a:p>
+        </p:txBody>
+      </p:sp>
+      <p:sp>
+        <p:nvSpPr>
+          <p:cNvPr id="54" name="TextBox 53">
+            <a:extLst>
+              <a:ext uri="{FF2B5EF4-FFF2-40B4-BE49-F238E27FC236}">
+                <a16:creationId xmlns:a16="http://schemas.microsoft.com/office/drawing/2014/main" id="{3C7FA380-1B80-6749-B8A1-63FD4614ED25}"/>
+              </a:ext>
+            </a:extLst>
+          </p:cNvPr>
+          <p:cNvSpPr txBox="1"/>
+          <p:nvPr/>
+        </p:nvSpPr>
+        <p:spPr>
+          <a:xfrm>
+            <a:off x="1012994" y="1335378"/>
+            <a:ext cx="555171" cy="190800"/>
+          </a:xfrm>
+          <a:prstGeom prst="rect">
+            <a:avLst/>
+          </a:prstGeom>
+          <a:noFill/>
+          <a:ln>
+            <a:noFill/>
+          </a:ln>
+        </p:spPr>
+        <p:txBody>
+          <a:bodyPr wrap="square" tIns="3600" bIns="3600" rtlCol="0">
+            <a:spAutoFit/>
+          </a:bodyPr>
+          <a:lstStyle/>
+          <a:p>
+            <a:r>
+              <a:rPr lang="en-LU" sz="1200" dirty="0"/>
+              <a:t> </a:t>
+            </a:r>
+          </a:p>
+        </p:txBody>
+      </p:sp>
+      <p:sp>
+        <p:nvSpPr>
+          <p:cNvPr id="55" name="TextBox 54">
+            <a:extLst>
+              <a:ext uri="{FF2B5EF4-FFF2-40B4-BE49-F238E27FC236}">
+                <a16:creationId xmlns:a16="http://schemas.microsoft.com/office/drawing/2014/main" id="{A11EE6EB-F5E4-3942-AEA9-5F9917ECB917}"/>
+              </a:ext>
+            </a:extLst>
+          </p:cNvPr>
+          <p:cNvSpPr txBox="1"/>
+          <p:nvPr/>
+        </p:nvSpPr>
+        <p:spPr>
+          <a:xfrm>
+            <a:off x="8629239" y="2479024"/>
+            <a:ext cx="555171" cy="190800"/>
+          </a:xfrm>
+          <a:prstGeom prst="rect">
+            <a:avLst/>
+          </a:prstGeom>
+          <a:noFill/>
+          <a:ln>
+            <a:noFill/>
+          </a:ln>
+        </p:spPr>
+        <p:txBody>
+          <a:bodyPr wrap="square" tIns="3600" bIns="3600" rtlCol="0">
+            <a:spAutoFit/>
+          </a:bodyPr>
+          <a:lstStyle/>
+          <a:p>
+            <a:r>
+              <a:rPr lang="en-LU" sz="1200" dirty="0"/>
+              <a:t> </a:t>
+            </a:r>
+          </a:p>
+        </p:txBody>
+      </p:sp>
+      <p:cxnSp>
+        <p:nvCxnSpPr>
+          <p:cNvPr id="56" name="Elbow Connector 55">
+            <a:extLst>
+              <a:ext uri="{FF2B5EF4-FFF2-40B4-BE49-F238E27FC236}">
+                <a16:creationId xmlns:a16="http://schemas.microsoft.com/office/drawing/2014/main" id="{37A722D5-4C92-7549-BCD0-7254731E2493}"/>
+              </a:ext>
+            </a:extLst>
+          </p:cNvPr>
+          <p:cNvCxnSpPr>
+            <a:cxnSpLocks/>
+            <a:stCxn id="55" idx="2"/>
+            <a:endCxn id="54" idx="1"/>
+          </p:cNvCxnSpPr>
+          <p:nvPr/>
+        </p:nvCxnSpPr>
+        <p:spPr>
+          <a:xfrm rot="5400000" flipH="1">
+            <a:off x="4340387" y="-1896614"/>
+            <a:ext cx="1239046" cy="7893831"/>
+          </a:xfrm>
+          <a:prstGeom prst="bentConnector4">
+            <a:avLst>
+              <a:gd name="adj1" fmla="val -58864"/>
+              <a:gd name="adj2" fmla="val 106068"/>
+            </a:avLst>
+          </a:prstGeom>
+          <a:ln w="12700">
+            <a:tailEnd type="triangle"/>
+          </a:ln>
+        </p:spPr>
+        <p:style>
+          <a:lnRef idx="1">
+            <a:schemeClr val="accent1"/>
+          </a:lnRef>
+          <a:fillRef idx="0">
+            <a:schemeClr val="accent1"/>
+          </a:fillRef>
+          <a:effectRef idx="0">
+            <a:schemeClr val="accent1"/>
+          </a:effectRef>
+          <a:fontRef idx="minor">
+            <a:schemeClr val="tx1"/>
+          </a:fontRef>
+        </p:style>
+      </p:cxnSp>
+      <p:sp>
+        <p:nvSpPr>
+          <p:cNvPr id="14" name="TextBox 13">
+            <a:extLst>
+              <a:ext uri="{FF2B5EF4-FFF2-40B4-BE49-F238E27FC236}">
+                <a16:creationId xmlns:a16="http://schemas.microsoft.com/office/drawing/2014/main" id="{67ADE74F-4347-424B-9603-802DDAF0B884}"/>
+              </a:ext>
+            </a:extLst>
+          </p:cNvPr>
+          <p:cNvSpPr txBox="1"/>
+          <p:nvPr/>
+        </p:nvSpPr>
+        <p:spPr>
+          <a:xfrm>
+            <a:off x="7023242" y="3637167"/>
+            <a:ext cx="4112843" cy="1479116"/>
+          </a:xfrm>
+          <a:prstGeom prst="rect">
+            <a:avLst/>
+          </a:prstGeom>
+          <a:noFill/>
+          <a:ln>
+            <a:solidFill>
+              <a:schemeClr val="accent1"/>
+            </a:solidFill>
+          </a:ln>
+        </p:spPr>
+        <p:txBody>
+          <a:bodyPr wrap="none" rtlCol="0">
+            <a:noAutofit/>
+          </a:bodyPr>
+          <a:lstStyle/>
+          <a:p>
+            <a:r>
+              <a:rPr lang="en-US" sz="1600" dirty="0" err="1"/>
+              <a:t>MakePepito</a:t>
+            </a:r>
+            <a:endParaRPr lang="en-US" sz="1600" dirty="0"/>
+          </a:p>
+          <a:p>
+            <a:pPr marL="171450" indent="-171450">
+              <a:buFont typeface="Arial" panose="020B0604020202020204" pitchFamily="34" charset="0"/>
+              <a:buChar char="•"/>
+            </a:pPr>
+            <a:r>
+              <a:rPr lang="en-US" sz="1200" dirty="0" err="1"/>
+              <a:t>makePepito</a:t>
+            </a:r>
+            <a:endParaRPr lang="en-US" sz="1200" dirty="0"/>
+          </a:p>
+          <a:p>
+            <a:pPr marL="628650" lvl="1" indent="-171450">
+              <a:buFont typeface="Arial" panose="020B0604020202020204" pitchFamily="34" charset="0"/>
+              <a:buChar char="•"/>
+            </a:pPr>
+            <a:r>
+              <a:rPr lang="en-US" sz="1200" dirty="0"/>
+              <a:t>getWeb3</a:t>
+            </a:r>
+          </a:p>
+          <a:p>
+            <a:pPr marL="628650" lvl="1" indent="-171450">
+              <a:buFont typeface="Arial" panose="020B0604020202020204" pitchFamily="34" charset="0"/>
+              <a:buChar char="•"/>
+            </a:pPr>
+            <a:r>
+              <a:rPr lang="en-US" sz="1200" dirty="0" err="1"/>
+              <a:t>this.props.connectB</a:t>
+            </a:r>
+            <a:r>
+              <a:rPr lang="en-US" sz="1200" dirty="0"/>
+              <a:t>(web3, accounts, </a:t>
+            </a:r>
+            <a:r>
+              <a:rPr lang="en-US" sz="1200" dirty="0" err="1"/>
+              <a:t>pepitoContract</a:t>
+            </a:r>
+            <a:r>
+              <a:rPr lang="en-US" sz="1200" dirty="0"/>
+              <a:t>) </a:t>
+            </a:r>
+          </a:p>
+          <a:p>
+            <a:pPr marL="171450" indent="-171450">
+              <a:buFont typeface="Arial" panose="020B0604020202020204" pitchFamily="34" charset="0"/>
+              <a:buChar char="•"/>
+            </a:pPr>
+            <a:r>
+              <a:rPr lang="en-US" sz="1200" dirty="0"/>
+              <a:t>Render() {return(…</a:t>
+            </a:r>
+          </a:p>
+          <a:p>
+            <a:pPr marL="314325" lvl="1" indent="-163513">
+              <a:buFont typeface="Arial" panose="020B0604020202020204" pitchFamily="34" charset="0"/>
+              <a:buChar char="•"/>
+            </a:pPr>
+            <a:r>
+              <a:rPr lang="en-US" sz="1200" dirty="0"/>
+              <a:t>&lt;Button onclick=</a:t>
+            </a:r>
+            <a:r>
+              <a:rPr lang="en-US" sz="1200" dirty="0" err="1"/>
+              <a:t>this</a:t>
+            </a:r>
+            <a:r>
+              <a:rPr lang="en-US" sz="1200" err="1"/>
+              <a:t>.</a:t>
+            </a:r>
+            <a:r>
+              <a:rPr lang="en-US" sz="1200"/>
+              <a:t>makePepito</a:t>
+            </a:r>
+            <a:r>
+              <a:rPr lang="en-US" sz="1200" dirty="0"/>
+              <a:t> /&gt;</a:t>
+            </a:r>
+          </a:p>
+          <a:p>
+            <a:pPr marL="314325" lvl="1" indent="-163513">
+              <a:buFont typeface="Arial" panose="020B0604020202020204" pitchFamily="34" charset="0"/>
+              <a:buChar char="•"/>
+            </a:pPr>
+            <a:r>
+              <a:rPr lang="en-US" sz="1200" dirty="0"/>
+              <a:t>)}</a:t>
+            </a:r>
+          </a:p>
+        </p:txBody>
+      </p:sp>
+      <p:sp>
+        <p:nvSpPr>
+          <p:cNvPr id="15" name="TextBox 14">
+            <a:extLst>
+              <a:ext uri="{FF2B5EF4-FFF2-40B4-BE49-F238E27FC236}">
+                <a16:creationId xmlns:a16="http://schemas.microsoft.com/office/drawing/2014/main" id="{B8BB7B62-0747-EB4B-9F49-9CB19DE7DB66}"/>
+              </a:ext>
+            </a:extLst>
+          </p:cNvPr>
+          <p:cNvSpPr txBox="1"/>
+          <p:nvPr/>
+        </p:nvSpPr>
+        <p:spPr>
+          <a:xfrm>
+            <a:off x="8444179" y="4296937"/>
+            <a:ext cx="555171" cy="190800"/>
+          </a:xfrm>
+          <a:prstGeom prst="rect">
+            <a:avLst/>
+          </a:prstGeom>
+          <a:noFill/>
+          <a:ln>
+            <a:noFill/>
+          </a:ln>
+        </p:spPr>
+        <p:txBody>
+          <a:bodyPr wrap="square" tIns="3600" bIns="3600" rtlCol="0">
+            <a:spAutoFit/>
+          </a:bodyPr>
+          <a:lstStyle/>
+          <a:p>
+            <a:r>
+              <a:rPr lang="en-LU" sz="1200" dirty="0"/>
+              <a:t> </a:t>
+            </a:r>
+          </a:p>
+        </p:txBody>
+      </p:sp>
+      <p:cxnSp>
+        <p:nvCxnSpPr>
+          <p:cNvPr id="19" name="Elbow Connector 18">
+            <a:extLst>
+              <a:ext uri="{FF2B5EF4-FFF2-40B4-BE49-F238E27FC236}">
+                <a16:creationId xmlns:a16="http://schemas.microsoft.com/office/drawing/2014/main" id="{BFC8572E-3B76-4941-8145-9A5CB5CE03A6}"/>
+              </a:ext>
+            </a:extLst>
+          </p:cNvPr>
+          <p:cNvCxnSpPr>
+            <a:cxnSpLocks/>
+            <a:stCxn id="20" idx="2"/>
+            <a:endCxn id="14" idx="1"/>
+          </p:cNvCxnSpPr>
+          <p:nvPr/>
+        </p:nvCxnSpPr>
+        <p:spPr>
+          <a:xfrm rot="16200000" flipH="1">
+            <a:off x="5249876" y="2603359"/>
+            <a:ext cx="3022748" cy="523984"/>
+          </a:xfrm>
+          <a:prstGeom prst="bentConnector2">
+            <a:avLst/>
+          </a:prstGeom>
+          <a:ln w="12700">
+            <a:tailEnd type="triangle"/>
+          </a:ln>
+        </p:spPr>
+        <p:style>
+          <a:lnRef idx="1">
+            <a:schemeClr val="accent1"/>
+          </a:lnRef>
+          <a:fillRef idx="0">
+            <a:schemeClr val="accent1"/>
+          </a:fillRef>
+          <a:effectRef idx="0">
+            <a:schemeClr val="accent1"/>
+          </a:effectRef>
+          <a:fontRef idx="minor">
+            <a:schemeClr val="tx1"/>
+          </a:fontRef>
+        </p:style>
+      </p:cxnSp>
+      <p:sp>
+        <p:nvSpPr>
+          <p:cNvPr id="20" name="TextBox 19">
+            <a:extLst>
+              <a:ext uri="{FF2B5EF4-FFF2-40B4-BE49-F238E27FC236}">
+                <a16:creationId xmlns:a16="http://schemas.microsoft.com/office/drawing/2014/main" id="{B98B7689-E3BB-3C46-925D-93AE93572D90}"/>
+              </a:ext>
+            </a:extLst>
+          </p:cNvPr>
+          <p:cNvSpPr txBox="1"/>
+          <p:nvPr/>
+        </p:nvSpPr>
+        <p:spPr>
+          <a:xfrm>
+            <a:off x="6221672" y="1163177"/>
+            <a:ext cx="555171" cy="190800"/>
+          </a:xfrm>
+          <a:prstGeom prst="rect">
+            <a:avLst/>
+          </a:prstGeom>
+          <a:noFill/>
+          <a:ln>
+            <a:noFill/>
+          </a:ln>
+        </p:spPr>
+        <p:txBody>
+          <a:bodyPr wrap="square" tIns="3600" bIns="3600" rtlCol="0">
+            <a:spAutoFit/>
+          </a:bodyPr>
+          <a:lstStyle/>
+          <a:p>
+            <a:r>
+              <a:rPr lang="en-LU" sz="1200" dirty="0"/>
+              <a:t> </a:t>
+            </a:r>
+          </a:p>
+        </p:txBody>
+      </p:sp>
+      <p:sp>
+        <p:nvSpPr>
+          <p:cNvPr id="21" name="TextBox 20">
+            <a:extLst>
+              <a:ext uri="{FF2B5EF4-FFF2-40B4-BE49-F238E27FC236}">
+                <a16:creationId xmlns:a16="http://schemas.microsoft.com/office/drawing/2014/main" id="{CC801F14-4C79-3248-A2D0-30151C9DC533}"/>
+              </a:ext>
+            </a:extLst>
+          </p:cNvPr>
+          <p:cNvSpPr txBox="1"/>
+          <p:nvPr/>
+        </p:nvSpPr>
+        <p:spPr>
+          <a:xfrm>
+            <a:off x="1024502" y="1714853"/>
+            <a:ext cx="555171" cy="190800"/>
+          </a:xfrm>
+          <a:prstGeom prst="rect">
+            <a:avLst/>
+          </a:prstGeom>
+          <a:noFill/>
+          <a:ln>
+            <a:noFill/>
+          </a:ln>
+        </p:spPr>
+        <p:txBody>
+          <a:bodyPr wrap="square" tIns="3600" bIns="3600" rtlCol="0">
+            <a:spAutoFit/>
+          </a:bodyPr>
+          <a:lstStyle/>
+          <a:p>
+            <a:r>
+              <a:rPr lang="en-LU" sz="1200" dirty="0"/>
+              <a:t> </a:t>
+            </a:r>
+          </a:p>
+        </p:txBody>
+      </p:sp>
+      <p:cxnSp>
+        <p:nvCxnSpPr>
+          <p:cNvPr id="23" name="Elbow Connector 22">
+            <a:extLst>
+              <a:ext uri="{FF2B5EF4-FFF2-40B4-BE49-F238E27FC236}">
+                <a16:creationId xmlns:a16="http://schemas.microsoft.com/office/drawing/2014/main" id="{01E5A134-A9B5-8F40-961B-30B71D345828}"/>
+              </a:ext>
+            </a:extLst>
+          </p:cNvPr>
+          <p:cNvCxnSpPr>
+            <a:cxnSpLocks/>
+            <a:stCxn id="15" idx="2"/>
+            <a:endCxn id="21" idx="1"/>
+          </p:cNvCxnSpPr>
+          <p:nvPr/>
+        </p:nvCxnSpPr>
+        <p:spPr>
+          <a:xfrm rot="5400000" flipH="1">
+            <a:off x="3534392" y="-699636"/>
+            <a:ext cx="2677484" cy="7697263"/>
+          </a:xfrm>
+          <a:prstGeom prst="bentConnector4">
+            <a:avLst>
+              <a:gd name="adj1" fmla="val -28866"/>
+              <a:gd name="adj2" fmla="val 108627"/>
+            </a:avLst>
+          </a:prstGeom>
+          <a:ln w="12700">
+            <a:tailEnd type="triangle"/>
+          </a:ln>
+        </p:spPr>
+        <p:style>
+          <a:lnRef idx="1">
+            <a:schemeClr val="accent1"/>
+          </a:lnRef>
+          <a:fillRef idx="0">
+            <a:schemeClr val="accent1"/>
+          </a:fillRef>
+          <a:effectRef idx="0">
+            <a:schemeClr val="accent1"/>
+          </a:effectRef>
+          <a:fontRef idx="minor">
+            <a:schemeClr val="tx1"/>
+          </a:fontRef>
+        </p:style>
+      </p:cxnSp>
+      <p:sp>
+        <p:nvSpPr>
+          <p:cNvPr id="30" name="TextBox 29">
+            <a:extLst>
+              <a:ext uri="{FF2B5EF4-FFF2-40B4-BE49-F238E27FC236}">
+                <a16:creationId xmlns:a16="http://schemas.microsoft.com/office/drawing/2014/main" id="{060EADA2-F643-1640-948A-DB33775F5755}"/>
+              </a:ext>
+            </a:extLst>
+          </p:cNvPr>
+          <p:cNvSpPr txBox="1"/>
+          <p:nvPr/>
+        </p:nvSpPr>
+        <p:spPr>
+          <a:xfrm>
+            <a:off x="7023242" y="5344067"/>
+            <a:ext cx="4112843" cy="1307104"/>
+          </a:xfrm>
+          <a:prstGeom prst="rect">
+            <a:avLst/>
+          </a:prstGeom>
+          <a:noFill/>
+          <a:ln>
+            <a:solidFill>
+              <a:schemeClr val="accent1"/>
+            </a:solidFill>
+          </a:ln>
+        </p:spPr>
+        <p:txBody>
+          <a:bodyPr wrap="none" rtlCol="0">
+            <a:noAutofit/>
+          </a:bodyPr>
+          <a:lstStyle/>
+          <a:p>
+            <a:r>
+              <a:rPr lang="en-US" sz="1600" dirty="0" err="1"/>
+              <a:t>DisguiseStore</a:t>
+            </a:r>
+            <a:endParaRPr lang="en-US" sz="1600" dirty="0"/>
+          </a:p>
+          <a:p>
+            <a:pPr marL="171450" indent="-171450">
+              <a:buFont typeface="Arial" panose="020B0604020202020204" pitchFamily="34" charset="0"/>
+              <a:buChar char="•"/>
+            </a:pPr>
+            <a:r>
+              <a:rPr lang="en-US" sz="1200" dirty="0" err="1"/>
+              <a:t>storeDisguise</a:t>
+            </a:r>
+            <a:endParaRPr lang="en-US" sz="1200" dirty="0"/>
+          </a:p>
+          <a:p>
+            <a:pPr marL="628650" lvl="1" indent="-171450">
+              <a:buFont typeface="Arial" panose="020B0604020202020204" pitchFamily="34" charset="0"/>
+              <a:buChar char="•"/>
+            </a:pPr>
+            <a:r>
+              <a:rPr lang="en-US" sz="1200" dirty="0"/>
+              <a:t>Create a </a:t>
+            </a:r>
+            <a:r>
+              <a:rPr lang="en-US" sz="1200"/>
+              <a:t>Disguise contract on-chain</a:t>
+            </a:r>
+            <a:endParaRPr lang="en-US" sz="1200" dirty="0"/>
+          </a:p>
+          <a:p>
+            <a:pPr marL="171450" indent="-171450">
+              <a:buFont typeface="Arial" panose="020B0604020202020204" pitchFamily="34" charset="0"/>
+              <a:buChar char="•"/>
+            </a:pPr>
+            <a:r>
+              <a:rPr lang="en-US" sz="1200" dirty="0"/>
+              <a:t>Render() {return(…</a:t>
+            </a:r>
+          </a:p>
+          <a:p>
+            <a:pPr marL="314325" lvl="1" indent="-163513">
+              <a:buFont typeface="Arial" panose="020B0604020202020204" pitchFamily="34" charset="0"/>
+              <a:buChar char="•"/>
+            </a:pPr>
+            <a:r>
+              <a:rPr lang="en-US" sz="1200" dirty="0"/>
+              <a:t>&lt;Button onclick=</a:t>
+            </a:r>
+            <a:r>
+              <a:rPr lang="en-US" sz="1200" dirty="0" err="1"/>
+              <a:t>this.storeDisguise</a:t>
+            </a:r>
+            <a:r>
+              <a:rPr lang="en-US" sz="1200" dirty="0"/>
+              <a:t> /&gt;</a:t>
+            </a:r>
+          </a:p>
+          <a:p>
+            <a:pPr marL="314325" lvl="1" indent="-163513">
+              <a:buFont typeface="Arial" panose="020B0604020202020204" pitchFamily="34" charset="0"/>
+              <a:buChar char="•"/>
+            </a:pPr>
+            <a:r>
+              <a:rPr lang="en-US" sz="1200" dirty="0"/>
+              <a:t>)}</a:t>
+            </a:r>
+          </a:p>
+        </p:txBody>
+      </p:sp>
+      <p:sp>
+        <p:nvSpPr>
+          <p:cNvPr id="24" name="TextBox 23">
+            <a:extLst>
+              <a:ext uri="{FF2B5EF4-FFF2-40B4-BE49-F238E27FC236}">
+                <a16:creationId xmlns:a16="http://schemas.microsoft.com/office/drawing/2014/main" id="{57F79BA3-6BBE-6444-A946-5A370B35813E}"/>
+              </a:ext>
+            </a:extLst>
+          </p:cNvPr>
+          <p:cNvSpPr txBox="1"/>
+          <p:nvPr/>
+        </p:nvSpPr>
+        <p:spPr>
+          <a:xfrm>
+            <a:off x="6112812" y="1348235"/>
+            <a:ext cx="555171" cy="190800"/>
+          </a:xfrm>
+          <a:prstGeom prst="rect">
+            <a:avLst/>
+          </a:prstGeom>
+          <a:noFill/>
+          <a:ln>
+            <a:noFill/>
+          </a:ln>
+        </p:spPr>
+        <p:txBody>
+          <a:bodyPr wrap="square" tIns="3600" bIns="3600" rtlCol="0">
+            <a:spAutoFit/>
+          </a:bodyPr>
+          <a:lstStyle/>
+          <a:p>
+            <a:r>
+              <a:rPr lang="en-LU" sz="1200" dirty="0"/>
+              <a:t> </a:t>
+            </a:r>
+          </a:p>
+        </p:txBody>
+      </p:sp>
+      <p:cxnSp>
+        <p:nvCxnSpPr>
+          <p:cNvPr id="25" name="Elbow Connector 24">
+            <a:extLst>
+              <a:ext uri="{FF2B5EF4-FFF2-40B4-BE49-F238E27FC236}">
+                <a16:creationId xmlns:a16="http://schemas.microsoft.com/office/drawing/2014/main" id="{062CC77A-743A-A243-8F45-B3D8690A0BBF}"/>
+              </a:ext>
+            </a:extLst>
+          </p:cNvPr>
+          <p:cNvCxnSpPr>
+            <a:cxnSpLocks/>
+            <a:stCxn id="24" idx="2"/>
+            <a:endCxn id="30" idx="1"/>
+          </p:cNvCxnSpPr>
+          <p:nvPr/>
+        </p:nvCxnSpPr>
+        <p:spPr>
+          <a:xfrm rot="16200000" flipH="1">
+            <a:off x="4477528" y="3451905"/>
+            <a:ext cx="4458584" cy="632844"/>
+          </a:xfrm>
+          <a:prstGeom prst="bentConnector2">
+            <a:avLst/>
+          </a:prstGeom>
+          <a:ln w="12700">
+            <a:tailEnd type="triangle"/>
+          </a:ln>
+        </p:spPr>
+        <p:style>
+          <a:lnRef idx="1">
+            <a:schemeClr val="accent1"/>
+          </a:lnRef>
+          <a:fillRef idx="0">
+            <a:schemeClr val="accent1"/>
+          </a:fillRef>
+          <a:effectRef idx="0">
+            <a:schemeClr val="accent1"/>
+          </a:effectRef>
+          <a:fontRef idx="minor">
+            <a:schemeClr val="tx1"/>
+          </a:fontRef>
+        </p:style>
+      </p:cxnSp>
+    </p:spTree>
+    <p:extLst>
+      <p:ext uri="{BB962C8B-B14F-4D97-AF65-F5344CB8AC3E}">
+        <p14:creationId xmlns:p14="http://schemas.microsoft.com/office/powerpoint/2010/main" val="3030141582"/>
+      </p:ext>
+    </p:extLst>
+  </p:cSld>
+  <p:clrMapOvr>
+    <a:masterClrMapping/>
+  </p:clrMapOvr>
+</p:sld>
+</file>
+
+<file path=ppt/slides/slide11.xml><?xml version="1.0" encoding="utf-8"?>
+<p:sld xmlns:a="http://schemas.openxmlformats.org/drawingml/2006/main" xmlns:r="http://schemas.openxmlformats.org/officeDocument/2006/relationships" xmlns:p="http://schemas.openxmlformats.org/presentationml/2006/main">
+  <p:cSld>
+    <p:spTree>
+      <p:nvGrpSpPr>
+        <p:cNvPr id="1" name=""/>
+        <p:cNvGrpSpPr/>
+        <p:nvPr/>
+      </p:nvGrpSpPr>
+      <p:grpSpPr>
+        <a:xfrm>
+          <a:off x="0" y="0"/>
+          <a:ext cx="0" cy="0"/>
+          <a:chOff x="0" y="0"/>
+          <a:chExt cx="0" cy="0"/>
+        </a:xfrm>
+      </p:grpSpPr>
+      <p:sp>
+        <p:nvSpPr>
+          <p:cNvPr id="4" name="TextBox 3">
+            <a:extLst>
+              <a:ext uri="{FF2B5EF4-FFF2-40B4-BE49-F238E27FC236}">
+                <a16:creationId xmlns:a16="http://schemas.microsoft.com/office/drawing/2014/main" id="{7B91D8D0-F88B-784E-8FF8-D5F07BC08546}"/>
+              </a:ext>
+            </a:extLst>
+          </p:cNvPr>
+          <p:cNvSpPr txBox="1"/>
+          <p:nvPr/>
+        </p:nvSpPr>
+        <p:spPr>
+          <a:xfrm>
+            <a:off x="620486" y="250372"/>
+            <a:ext cx="4593771" cy="594250"/>
+          </a:xfrm>
+          <a:prstGeom prst="rect">
+            <a:avLst/>
+          </a:prstGeom>
+          <a:solidFill>
+            <a:srgbClr val="E1EFD8"/>
+          </a:solidFill>
+        </p:spPr>
+        <p:txBody>
+          <a:bodyPr wrap="none" rtlCol="0" anchor="ctr" anchorCtr="0">
+            <a:noAutofit/>
+          </a:bodyPr>
+          <a:lstStyle/>
+          <a:p>
+            <a:r>
+              <a:rPr lang="en-US" b="1" dirty="0">
+                <a:solidFill>
+                  <a:srgbClr val="980000"/>
+                </a:solidFill>
+              </a:rPr>
+              <a:t>Another design to clean App (2)</a:t>
+            </a:r>
+          </a:p>
+        </p:txBody>
+      </p:sp>
+      <p:sp>
+        <p:nvSpPr>
+          <p:cNvPr id="9" name="TextBox 8">
+            <a:extLst>
+              <a:ext uri="{FF2B5EF4-FFF2-40B4-BE49-F238E27FC236}">
+                <a16:creationId xmlns:a16="http://schemas.microsoft.com/office/drawing/2014/main" id="{A648BA86-9C0C-0846-A8F7-877203CF605C}"/>
+              </a:ext>
+            </a:extLst>
+          </p:cNvPr>
+          <p:cNvSpPr txBox="1"/>
+          <p:nvPr/>
+        </p:nvSpPr>
+        <p:spPr>
+          <a:xfrm>
+            <a:off x="815416" y="1029531"/>
+            <a:ext cx="3694509" cy="2170869"/>
+          </a:xfrm>
+          <a:prstGeom prst="rect">
+            <a:avLst/>
+          </a:prstGeom>
+          <a:noFill/>
+          <a:ln>
+            <a:solidFill>
+              <a:schemeClr val="accent1"/>
+            </a:solidFill>
+          </a:ln>
+        </p:spPr>
+        <p:txBody>
+          <a:bodyPr wrap="none" rtlCol="0">
+            <a:noAutofit/>
+          </a:bodyPr>
+          <a:lstStyle/>
+          <a:p>
+            <a:r>
+              <a:rPr lang="en-US" sz="1600" dirty="0" err="1"/>
+              <a:t>App.js</a:t>
+            </a:r>
+            <a:endParaRPr lang="en-US" sz="1600" dirty="0"/>
+          </a:p>
+          <a:p>
+            <a:pPr marL="171450" indent="-171450">
+              <a:buFont typeface="Arial" panose="020B0604020202020204" pitchFamily="34" charset="0"/>
+              <a:buChar char="•"/>
+            </a:pPr>
+            <a:r>
+              <a:rPr lang="en-US" sz="1200" dirty="0" err="1"/>
+              <a:t>setDisguise</a:t>
+            </a:r>
+            <a:r>
+              <a:rPr lang="en-US" sz="1200" dirty="0"/>
+              <a:t>(disguise)</a:t>
+            </a:r>
+          </a:p>
+          <a:p>
+            <a:pPr marL="314325" lvl="1" indent="-163513">
+              <a:buFont typeface="Arial" panose="020B0604020202020204" pitchFamily="34" charset="0"/>
+              <a:buChar char="•"/>
+            </a:pPr>
+            <a:r>
+              <a:rPr lang="en-US" sz="1200" dirty="0" err="1"/>
+              <a:t>this.disguise</a:t>
+            </a:r>
+            <a:r>
+              <a:rPr lang="en-US" sz="1200" dirty="0"/>
+              <a:t> = disguise;</a:t>
+            </a:r>
+          </a:p>
+          <a:p>
+            <a:pPr marL="314325" lvl="1" indent="-163513">
+              <a:buFont typeface="Arial" panose="020B0604020202020204" pitchFamily="34" charset="0"/>
+              <a:buChar char="•"/>
+            </a:pPr>
+            <a:endParaRPr lang="en-US" sz="1200" dirty="0"/>
+          </a:p>
+          <a:p>
+            <a:pPr marL="171450" indent="-171450">
+              <a:buFont typeface="Arial" panose="020B0604020202020204" pitchFamily="34" charset="0"/>
+              <a:buChar char="•"/>
+            </a:pPr>
+            <a:r>
+              <a:rPr lang="en-US" sz="1200" dirty="0"/>
+              <a:t>Render() {return(…</a:t>
+            </a:r>
+          </a:p>
+          <a:p>
+            <a:pPr marL="314325" lvl="1" indent="-163513">
+              <a:buFont typeface="Arial" panose="020B0604020202020204" pitchFamily="34" charset="0"/>
+              <a:buChar char="•"/>
+            </a:pPr>
+            <a:r>
+              <a:rPr lang="en-US" sz="1200" dirty="0"/>
+              <a:t>&lt;</a:t>
+            </a:r>
+            <a:r>
+              <a:rPr lang="en-US" sz="1200" dirty="0" err="1"/>
+              <a:t>DisguiseControls</a:t>
+            </a:r>
+            <a:r>
+              <a:rPr lang="en-US" sz="1200" dirty="0"/>
+              <a:t> </a:t>
+            </a:r>
+            <a:r>
+              <a:rPr lang="en-US" sz="1200" dirty="0" err="1"/>
+              <a:t>setDisguise</a:t>
+            </a:r>
+            <a:r>
+              <a:rPr lang="en-US" sz="1200" dirty="0"/>
+              <a:t>={</a:t>
+            </a:r>
+            <a:r>
+              <a:rPr lang="en-US" sz="1200" dirty="0" err="1"/>
+              <a:t>this.setDisguise</a:t>
+            </a:r>
+            <a:r>
+              <a:rPr lang="en-US" sz="1200" dirty="0"/>
+              <a:t>}} /&gt;</a:t>
+            </a:r>
+          </a:p>
+          <a:p>
+            <a:pPr marL="314325" lvl="1" indent="-163513">
+              <a:buFont typeface="Arial" panose="020B0604020202020204" pitchFamily="34" charset="0"/>
+              <a:buChar char="•"/>
+            </a:pPr>
+            <a:r>
+              <a:rPr lang="en-US" sz="1200" dirty="0"/>
+              <a:t>&lt;</a:t>
+            </a:r>
+            <a:r>
+              <a:rPr lang="en-US" sz="1200" dirty="0" err="1"/>
+              <a:t>DrawAvataar</a:t>
+            </a:r>
+            <a:r>
+              <a:rPr lang="en-US" sz="1200" dirty="0"/>
+              <a:t> disguise={</a:t>
+            </a:r>
+            <a:r>
+              <a:rPr lang="en-US" sz="1200" dirty="0" err="1"/>
+              <a:t>this.disguise</a:t>
+            </a:r>
+            <a:r>
+              <a:rPr lang="en-US" sz="1200" dirty="0"/>
+              <a:t>}} /&gt;</a:t>
+            </a:r>
+          </a:p>
+          <a:p>
+            <a:pPr marL="314325" lvl="1" indent="-163513">
+              <a:buFont typeface="Arial" panose="020B0604020202020204" pitchFamily="34" charset="0"/>
+              <a:buChar char="•"/>
+            </a:pPr>
+            <a:r>
+              <a:rPr lang="en-US" sz="1200" dirty="0"/>
+              <a:t>)}</a:t>
+            </a:r>
+          </a:p>
+        </p:txBody>
+      </p:sp>
+      <p:cxnSp>
+        <p:nvCxnSpPr>
+          <p:cNvPr id="42" name="Elbow Connector 41">
+            <a:extLst>
+              <a:ext uri="{FF2B5EF4-FFF2-40B4-BE49-F238E27FC236}">
+                <a16:creationId xmlns:a16="http://schemas.microsoft.com/office/drawing/2014/main" id="{78DE0365-6BBA-4F46-A337-02674D3E8C46}"/>
+              </a:ext>
+            </a:extLst>
+          </p:cNvPr>
+          <p:cNvCxnSpPr>
+            <a:cxnSpLocks/>
+            <a:stCxn id="22" idx="0"/>
+            <a:endCxn id="35" idx="1"/>
+          </p:cNvCxnSpPr>
+          <p:nvPr/>
+        </p:nvCxnSpPr>
+        <p:spPr>
+          <a:xfrm rot="5400000" flipH="1" flipV="1">
+            <a:off x="3800033" y="193672"/>
+            <a:ext cx="339996" cy="3394350"/>
+          </a:xfrm>
+          <a:prstGeom prst="bentConnector2">
+            <a:avLst/>
+          </a:prstGeom>
+          <a:ln w="12700">
+            <a:tailEnd type="triangle"/>
+          </a:ln>
+        </p:spPr>
+        <p:style>
+          <a:lnRef idx="1">
+            <a:schemeClr val="accent1"/>
+          </a:lnRef>
+          <a:fillRef idx="0">
+            <a:schemeClr val="accent1"/>
+          </a:fillRef>
+          <a:effectRef idx="0">
+            <a:schemeClr val="accent1"/>
+          </a:effectRef>
+          <a:fontRef idx="minor">
+            <a:schemeClr val="tx1"/>
+          </a:fontRef>
+        </p:style>
+      </p:cxnSp>
+      <p:sp>
+        <p:nvSpPr>
+          <p:cNvPr id="41" name="TextBox 40">
+            <a:extLst>
+              <a:ext uri="{FF2B5EF4-FFF2-40B4-BE49-F238E27FC236}">
+                <a16:creationId xmlns:a16="http://schemas.microsoft.com/office/drawing/2014/main" id="{F4C0BFC7-6A70-7A41-B11C-BFAC88A20486}"/>
+              </a:ext>
+            </a:extLst>
+          </p:cNvPr>
+          <p:cNvSpPr txBox="1"/>
+          <p:nvPr/>
+        </p:nvSpPr>
+        <p:spPr>
+          <a:xfrm>
+            <a:off x="7023243" y="2483280"/>
+            <a:ext cx="3546786" cy="1479116"/>
+          </a:xfrm>
+          <a:prstGeom prst="rect">
+            <a:avLst/>
+          </a:prstGeom>
+          <a:noFill/>
+          <a:ln>
+            <a:solidFill>
+              <a:schemeClr val="accent1"/>
+            </a:solidFill>
+          </a:ln>
+        </p:spPr>
+        <p:txBody>
+          <a:bodyPr wrap="none" rtlCol="0">
+            <a:noAutofit/>
+          </a:bodyPr>
+          <a:lstStyle/>
+          <a:p>
+            <a:r>
+              <a:rPr lang="en-US" sz="1600" dirty="0"/>
+              <a:t>Disguise</a:t>
+            </a:r>
+          </a:p>
+          <a:p>
+            <a:pPr marL="171450" indent="-171450">
+              <a:buFont typeface="Arial" panose="020B0604020202020204" pitchFamily="34" charset="0"/>
+              <a:buChar char="•"/>
+            </a:pPr>
+            <a:r>
+              <a:rPr lang="en-US" sz="1200" dirty="0" err="1"/>
+              <a:t>fillDisguise</a:t>
+            </a:r>
+            <a:endParaRPr lang="en-US" sz="1200" dirty="0"/>
+          </a:p>
+          <a:p>
+            <a:pPr marL="314325" lvl="1" indent="-163513">
+              <a:buFont typeface="Arial" panose="020B0604020202020204" pitchFamily="34" charset="0"/>
+              <a:buChar char="•"/>
+            </a:pPr>
+            <a:r>
+              <a:rPr lang="en-US" sz="1200" dirty="0"/>
+              <a:t>Random disguise</a:t>
+            </a:r>
+          </a:p>
+          <a:p>
+            <a:pPr marL="314325" lvl="1" indent="-163513">
+              <a:buFont typeface="Arial" panose="020B0604020202020204" pitchFamily="34" charset="0"/>
+              <a:buChar char="•"/>
+            </a:pPr>
+            <a:r>
+              <a:rPr lang="en-US" sz="1200" dirty="0" err="1"/>
+              <a:t>this.props.setDisguise</a:t>
+            </a:r>
+            <a:r>
+              <a:rPr lang="en-US" sz="1200" dirty="0"/>
+              <a:t>(disguise) </a:t>
+            </a:r>
+          </a:p>
+          <a:p>
+            <a:pPr marL="171450" indent="-171450">
+              <a:buFont typeface="Arial" panose="020B0604020202020204" pitchFamily="34" charset="0"/>
+              <a:buChar char="•"/>
+            </a:pPr>
+            <a:r>
+              <a:rPr lang="en-US" sz="1200" dirty="0"/>
+              <a:t>Render() {return(…</a:t>
+            </a:r>
+          </a:p>
+          <a:p>
+            <a:pPr marL="314325" lvl="1" indent="-163513">
+              <a:buFont typeface="Arial" panose="020B0604020202020204" pitchFamily="34" charset="0"/>
+              <a:buChar char="•"/>
+            </a:pPr>
+            <a:r>
+              <a:rPr lang="en-US" sz="1200" dirty="0"/>
+              <a:t>&lt;Button onclick=</a:t>
+            </a:r>
+            <a:r>
+              <a:rPr lang="en-US" sz="1200" dirty="0" err="1"/>
+              <a:t>this.fillDisguise</a:t>
+            </a:r>
+            <a:r>
+              <a:rPr lang="en-US" sz="1200" dirty="0"/>
+              <a:t> /&gt;</a:t>
+            </a:r>
+          </a:p>
+          <a:p>
+            <a:pPr marL="314325" lvl="1" indent="-163513">
+              <a:buFont typeface="Arial" panose="020B0604020202020204" pitchFamily="34" charset="0"/>
+              <a:buChar char="•"/>
+            </a:pPr>
+            <a:r>
+              <a:rPr lang="en-US" sz="1200" dirty="0"/>
+              <a:t>)}</a:t>
+            </a:r>
+          </a:p>
+        </p:txBody>
+      </p:sp>
+      <p:sp>
+        <p:nvSpPr>
+          <p:cNvPr id="22" name="TextBox 21">
+            <a:extLst>
+              <a:ext uri="{FF2B5EF4-FFF2-40B4-BE49-F238E27FC236}">
+                <a16:creationId xmlns:a16="http://schemas.microsoft.com/office/drawing/2014/main" id="{F549962F-115E-1648-9637-7B6BADF704D2}"/>
+              </a:ext>
+            </a:extLst>
+          </p:cNvPr>
+          <p:cNvSpPr txBox="1"/>
+          <p:nvPr/>
+        </p:nvSpPr>
+        <p:spPr>
+          <a:xfrm>
+            <a:off x="1995270" y="2060845"/>
+            <a:ext cx="555171" cy="190800"/>
+          </a:xfrm>
+          <a:prstGeom prst="rect">
+            <a:avLst/>
+          </a:prstGeom>
+          <a:noFill/>
+          <a:ln>
+            <a:noFill/>
+          </a:ln>
+        </p:spPr>
+        <p:txBody>
+          <a:bodyPr wrap="square" tIns="3600" bIns="3600" rtlCol="0">
+            <a:spAutoFit/>
+          </a:bodyPr>
+          <a:lstStyle/>
+          <a:p>
+            <a:r>
+              <a:rPr lang="en-LU" sz="1200" dirty="0"/>
+              <a:t> </a:t>
+            </a:r>
+          </a:p>
+        </p:txBody>
+      </p:sp>
+      <p:sp>
+        <p:nvSpPr>
+          <p:cNvPr id="35" name="TextBox 34">
+            <a:extLst>
+              <a:ext uri="{FF2B5EF4-FFF2-40B4-BE49-F238E27FC236}">
+                <a16:creationId xmlns:a16="http://schemas.microsoft.com/office/drawing/2014/main" id="{A660BA33-E93C-8641-B622-DD3D8AA3C292}"/>
+              </a:ext>
+            </a:extLst>
+          </p:cNvPr>
+          <p:cNvSpPr txBox="1"/>
+          <p:nvPr/>
+        </p:nvSpPr>
+        <p:spPr>
+          <a:xfrm>
+            <a:off x="5667206" y="1188358"/>
+            <a:ext cx="4271451" cy="1064982"/>
+          </a:xfrm>
+          <a:prstGeom prst="rect">
+            <a:avLst/>
+          </a:prstGeom>
+          <a:noFill/>
+          <a:ln>
+            <a:solidFill>
+              <a:schemeClr val="accent1"/>
+            </a:solidFill>
+          </a:ln>
+        </p:spPr>
+        <p:txBody>
+          <a:bodyPr wrap="none" rtlCol="0">
+            <a:noAutofit/>
+          </a:bodyPr>
+          <a:lstStyle/>
+          <a:p>
+            <a:r>
+              <a:rPr lang="en-US" sz="1600" dirty="0" err="1"/>
+              <a:t>DisguiseControls</a:t>
+            </a:r>
+            <a:endParaRPr lang="en-US" sz="1600" dirty="0"/>
+          </a:p>
+          <a:p>
+            <a:pPr marL="171450" indent="-171450">
+              <a:buFont typeface="Arial" panose="020B0604020202020204" pitchFamily="34" charset="0"/>
+              <a:buChar char="•"/>
+            </a:pPr>
+            <a:r>
+              <a:rPr lang="en-US" sz="1200" dirty="0"/>
+              <a:t>Render() {return(…</a:t>
+            </a:r>
+          </a:p>
+          <a:p>
+            <a:pPr marL="314325" lvl="1" indent="-163513">
+              <a:buFont typeface="Arial" panose="020B0604020202020204" pitchFamily="34" charset="0"/>
+              <a:buChar char="•"/>
+            </a:pPr>
+            <a:r>
+              <a:rPr lang="en-US" sz="1200" dirty="0"/>
+              <a:t>&lt;Disguise </a:t>
+            </a:r>
+            <a:r>
+              <a:rPr lang="en-US" sz="1200" dirty="0" err="1"/>
+              <a:t>setDisguise</a:t>
+            </a:r>
+            <a:r>
+              <a:rPr lang="en-US" sz="1200" dirty="0"/>
+              <a:t>={</a:t>
+            </a:r>
+            <a:r>
+              <a:rPr lang="en-US" sz="1200" dirty="0" err="1"/>
+              <a:t>this.props.setDisguise</a:t>
+            </a:r>
+            <a:r>
+              <a:rPr lang="en-US" sz="1200" dirty="0"/>
+              <a:t>} /&gt;</a:t>
+            </a:r>
+          </a:p>
+          <a:p>
+            <a:pPr marL="314325" lvl="1" indent="-163513">
+              <a:buFont typeface="Arial" panose="020B0604020202020204" pitchFamily="34" charset="0"/>
+              <a:buChar char="•"/>
+            </a:pPr>
+            <a:r>
+              <a:rPr lang="en-US" sz="1200" dirty="0"/>
+              <a:t>)}</a:t>
+            </a:r>
+          </a:p>
+        </p:txBody>
+      </p:sp>
+      <p:cxnSp>
+        <p:nvCxnSpPr>
+          <p:cNvPr id="38" name="Elbow Connector 37">
+            <a:extLst>
+              <a:ext uri="{FF2B5EF4-FFF2-40B4-BE49-F238E27FC236}">
+                <a16:creationId xmlns:a16="http://schemas.microsoft.com/office/drawing/2014/main" id="{7252860B-8242-154A-93EB-E27DE8EDA6A0}"/>
+              </a:ext>
+            </a:extLst>
+          </p:cNvPr>
+          <p:cNvCxnSpPr>
+            <a:cxnSpLocks/>
+            <a:stCxn id="43" idx="2"/>
+            <a:endCxn id="41" idx="1"/>
+          </p:cNvCxnSpPr>
+          <p:nvPr/>
+        </p:nvCxnSpPr>
+        <p:spPr>
+          <a:xfrm rot="16200000" flipH="1">
+            <a:off x="6126175" y="2325769"/>
+            <a:ext cx="1379007" cy="415130"/>
+          </a:xfrm>
+          <a:prstGeom prst="bentConnector2">
+            <a:avLst/>
+          </a:prstGeom>
+          <a:ln w="12700">
+            <a:tailEnd type="triangle"/>
+          </a:ln>
+        </p:spPr>
+        <p:style>
+          <a:lnRef idx="1">
+            <a:schemeClr val="accent1"/>
+          </a:lnRef>
+          <a:fillRef idx="0">
+            <a:schemeClr val="accent1"/>
+          </a:fillRef>
+          <a:effectRef idx="0">
+            <a:schemeClr val="accent1"/>
+          </a:effectRef>
+          <a:fontRef idx="minor">
+            <a:schemeClr val="tx1"/>
+          </a:fontRef>
+        </p:style>
+      </p:cxnSp>
+      <p:sp>
+        <p:nvSpPr>
+          <p:cNvPr id="43" name="TextBox 42">
+            <a:extLst>
+              <a:ext uri="{FF2B5EF4-FFF2-40B4-BE49-F238E27FC236}">
+                <a16:creationId xmlns:a16="http://schemas.microsoft.com/office/drawing/2014/main" id="{276D3B9C-6E7C-3B4A-9CDE-EB4C4CBBC25C}"/>
+              </a:ext>
+            </a:extLst>
+          </p:cNvPr>
+          <p:cNvSpPr txBox="1"/>
+          <p:nvPr/>
+        </p:nvSpPr>
+        <p:spPr>
+          <a:xfrm>
+            <a:off x="6330527" y="1653031"/>
+            <a:ext cx="555171" cy="190800"/>
+          </a:xfrm>
+          <a:prstGeom prst="rect">
+            <a:avLst/>
+          </a:prstGeom>
+          <a:noFill/>
+          <a:ln>
+            <a:noFill/>
+          </a:ln>
+        </p:spPr>
+        <p:txBody>
+          <a:bodyPr wrap="square" tIns="3600" bIns="3600" rtlCol="0">
+            <a:spAutoFit/>
+          </a:bodyPr>
+          <a:lstStyle/>
+          <a:p>
+            <a:r>
+              <a:rPr lang="en-LU" sz="1200" dirty="0"/>
+              <a:t> </a:t>
+            </a:r>
+          </a:p>
+        </p:txBody>
+      </p:sp>
+      <p:sp>
+        <p:nvSpPr>
+          <p:cNvPr id="54" name="TextBox 53">
+            <a:extLst>
+              <a:ext uri="{FF2B5EF4-FFF2-40B4-BE49-F238E27FC236}">
+                <a16:creationId xmlns:a16="http://schemas.microsoft.com/office/drawing/2014/main" id="{3C7FA380-1B80-6749-B8A1-63FD4614ED25}"/>
+              </a:ext>
+            </a:extLst>
+          </p:cNvPr>
+          <p:cNvSpPr txBox="1"/>
+          <p:nvPr/>
+        </p:nvSpPr>
+        <p:spPr>
+          <a:xfrm>
+            <a:off x="1012994" y="1335378"/>
+            <a:ext cx="555171" cy="190800"/>
+          </a:xfrm>
+          <a:prstGeom prst="rect">
+            <a:avLst/>
+          </a:prstGeom>
+          <a:noFill/>
+          <a:ln>
+            <a:noFill/>
+          </a:ln>
+        </p:spPr>
+        <p:txBody>
+          <a:bodyPr wrap="square" tIns="3600" bIns="3600" rtlCol="0">
+            <a:spAutoFit/>
+          </a:bodyPr>
+          <a:lstStyle/>
+          <a:p>
+            <a:r>
+              <a:rPr lang="en-LU" sz="1200" dirty="0"/>
+              <a:t> </a:t>
+            </a:r>
+          </a:p>
+        </p:txBody>
+      </p:sp>
+      <p:sp>
+        <p:nvSpPr>
+          <p:cNvPr id="55" name="TextBox 54">
+            <a:extLst>
+              <a:ext uri="{FF2B5EF4-FFF2-40B4-BE49-F238E27FC236}">
+                <a16:creationId xmlns:a16="http://schemas.microsoft.com/office/drawing/2014/main" id="{A11EE6EB-F5E4-3942-AEA9-5F9917ECB917}"/>
+              </a:ext>
+            </a:extLst>
+          </p:cNvPr>
+          <p:cNvSpPr txBox="1"/>
+          <p:nvPr/>
+        </p:nvSpPr>
+        <p:spPr>
+          <a:xfrm>
+            <a:off x="8629239" y="3143050"/>
+            <a:ext cx="555171" cy="190800"/>
+          </a:xfrm>
+          <a:prstGeom prst="rect">
+            <a:avLst/>
+          </a:prstGeom>
+          <a:noFill/>
+          <a:ln>
+            <a:noFill/>
+          </a:ln>
+        </p:spPr>
+        <p:txBody>
+          <a:bodyPr wrap="square" tIns="3600" bIns="3600" rtlCol="0">
+            <a:spAutoFit/>
+          </a:bodyPr>
+          <a:lstStyle/>
+          <a:p>
+            <a:r>
+              <a:rPr lang="en-LU" sz="1200" dirty="0"/>
+              <a:t> </a:t>
+            </a:r>
+          </a:p>
+        </p:txBody>
+      </p:sp>
+      <p:cxnSp>
+        <p:nvCxnSpPr>
+          <p:cNvPr id="56" name="Elbow Connector 55">
+            <a:extLst>
+              <a:ext uri="{FF2B5EF4-FFF2-40B4-BE49-F238E27FC236}">
+                <a16:creationId xmlns:a16="http://schemas.microsoft.com/office/drawing/2014/main" id="{37A722D5-4C92-7549-BCD0-7254731E2493}"/>
+              </a:ext>
+            </a:extLst>
+          </p:cNvPr>
+          <p:cNvCxnSpPr>
+            <a:cxnSpLocks/>
+            <a:stCxn id="55" idx="2"/>
+            <a:endCxn id="54" idx="1"/>
+          </p:cNvCxnSpPr>
+          <p:nvPr/>
+        </p:nvCxnSpPr>
+        <p:spPr>
+          <a:xfrm rot="5400000" flipH="1">
+            <a:off x="4008374" y="-1564601"/>
+            <a:ext cx="1903072" cy="7893831"/>
+          </a:xfrm>
+          <a:prstGeom prst="bentConnector4">
+            <a:avLst>
+              <a:gd name="adj1" fmla="val -39469"/>
+              <a:gd name="adj2" fmla="val 104689"/>
+            </a:avLst>
+          </a:prstGeom>
+          <a:ln w="12700">
+            <a:tailEnd type="triangle"/>
+          </a:ln>
+        </p:spPr>
+        <p:style>
+          <a:lnRef idx="1">
+            <a:schemeClr val="accent1"/>
+          </a:lnRef>
+          <a:fillRef idx="0">
+            <a:schemeClr val="accent1"/>
+          </a:fillRef>
+          <a:effectRef idx="0">
+            <a:schemeClr val="accent1"/>
+          </a:effectRef>
+          <a:fontRef idx="minor">
+            <a:schemeClr val="tx1"/>
+          </a:fontRef>
+        </p:style>
+      </p:cxnSp>
+      <p:sp>
+        <p:nvSpPr>
+          <p:cNvPr id="21" name="TextBox 20">
+            <a:extLst>
+              <a:ext uri="{FF2B5EF4-FFF2-40B4-BE49-F238E27FC236}">
+                <a16:creationId xmlns:a16="http://schemas.microsoft.com/office/drawing/2014/main" id="{CC801F14-4C79-3248-A2D0-30151C9DC533}"/>
+              </a:ext>
+            </a:extLst>
+          </p:cNvPr>
+          <p:cNvSpPr txBox="1"/>
+          <p:nvPr/>
+        </p:nvSpPr>
+        <p:spPr>
+          <a:xfrm>
+            <a:off x="1024502" y="1714853"/>
+            <a:ext cx="555171" cy="190800"/>
+          </a:xfrm>
+          <a:prstGeom prst="rect">
+            <a:avLst/>
+          </a:prstGeom>
+          <a:noFill/>
+          <a:ln>
+            <a:noFill/>
+          </a:ln>
+        </p:spPr>
+        <p:txBody>
+          <a:bodyPr wrap="square" tIns="3600" bIns="3600" rtlCol="0">
+            <a:spAutoFit/>
+          </a:bodyPr>
+          <a:lstStyle/>
+          <a:p>
+            <a:r>
+              <a:rPr lang="en-LU" sz="1200" dirty="0"/>
+              <a:t> </a:t>
+            </a:r>
+          </a:p>
+        </p:txBody>
+      </p:sp>
+      <p:sp>
+        <p:nvSpPr>
+          <p:cNvPr id="26" name="TextBox 25">
+            <a:extLst>
+              <a:ext uri="{FF2B5EF4-FFF2-40B4-BE49-F238E27FC236}">
+                <a16:creationId xmlns:a16="http://schemas.microsoft.com/office/drawing/2014/main" id="{C4F42C77-6006-D34B-9F71-0F7142B7DE0E}"/>
+              </a:ext>
+            </a:extLst>
+          </p:cNvPr>
+          <p:cNvSpPr txBox="1"/>
+          <p:nvPr/>
+        </p:nvSpPr>
+        <p:spPr>
+          <a:xfrm>
+            <a:off x="7023243" y="4190526"/>
+            <a:ext cx="3775386" cy="1479116"/>
+          </a:xfrm>
+          <a:prstGeom prst="rect">
+            <a:avLst/>
+          </a:prstGeom>
+          <a:noFill/>
+          <a:ln>
+            <a:solidFill>
+              <a:schemeClr val="accent1"/>
+            </a:solidFill>
+          </a:ln>
+        </p:spPr>
+        <p:txBody>
+          <a:bodyPr wrap="none" rtlCol="0">
+            <a:noAutofit/>
+          </a:bodyPr>
+          <a:lstStyle/>
+          <a:p>
+            <a:r>
+              <a:rPr lang="en-US" sz="1600" dirty="0" err="1"/>
+              <a:t>DrawAvataar</a:t>
+            </a:r>
+            <a:endParaRPr lang="en-US" sz="1600" dirty="0"/>
+          </a:p>
+          <a:p>
+            <a:pPr marL="171450" indent="-171450">
+              <a:buFont typeface="Arial" panose="020B0604020202020204" pitchFamily="34" charset="0"/>
+              <a:buChar char="•"/>
+            </a:pPr>
+            <a:r>
+              <a:rPr lang="en-US" sz="1200" dirty="0"/>
+              <a:t>Import Avatar from ‘</a:t>
+            </a:r>
+            <a:r>
+              <a:rPr lang="en-US" sz="1200" dirty="0" err="1"/>
+              <a:t>avataars</a:t>
+            </a:r>
+            <a:r>
+              <a:rPr lang="en-US" sz="1200" dirty="0"/>
+              <a:t>’</a:t>
+            </a:r>
+          </a:p>
+          <a:p>
+            <a:pPr marL="171450" indent="-171450">
+              <a:buFont typeface="Arial" panose="020B0604020202020204" pitchFamily="34" charset="0"/>
+              <a:buChar char="•"/>
+            </a:pPr>
+            <a:r>
+              <a:rPr lang="en-US" sz="1200" dirty="0"/>
+              <a:t>const {</a:t>
+            </a:r>
+            <a:r>
+              <a:rPr lang="en-US" sz="1200" dirty="0" err="1"/>
+              <a:t>topType</a:t>
+            </a:r>
+            <a:r>
+              <a:rPr lang="en-US" sz="1200" dirty="0"/>
+              <a:t>, </a:t>
+            </a:r>
+            <a:r>
+              <a:rPr lang="en-US" sz="1200" dirty="0" err="1"/>
+              <a:t>hairColor</a:t>
+            </a:r>
+            <a:r>
+              <a:rPr lang="en-US" sz="1200" dirty="0"/>
+              <a:t>} = </a:t>
+            </a:r>
+            <a:r>
+              <a:rPr lang="en-US" sz="1200" dirty="0" err="1"/>
+              <a:t>this.props.disguise</a:t>
+            </a:r>
+            <a:endParaRPr lang="en-US" sz="1200" dirty="0"/>
+          </a:p>
+          <a:p>
+            <a:pPr marL="628650" lvl="1" indent="-171450">
+              <a:buFont typeface="Arial" panose="020B0604020202020204" pitchFamily="34" charset="0"/>
+              <a:buChar char="•"/>
+            </a:pPr>
+            <a:endParaRPr lang="en-US" sz="1200" dirty="0"/>
+          </a:p>
+          <a:p>
+            <a:pPr marL="171450" indent="-171450">
+              <a:buFont typeface="Arial" panose="020B0604020202020204" pitchFamily="34" charset="0"/>
+              <a:buChar char="•"/>
+            </a:pPr>
+            <a:r>
+              <a:rPr lang="en-US" sz="1200" dirty="0"/>
+              <a:t>Render() {return(…</a:t>
+            </a:r>
+          </a:p>
+          <a:p>
+            <a:pPr marL="314325" lvl="1" indent="-163513">
+              <a:buFont typeface="Arial" panose="020B0604020202020204" pitchFamily="34" charset="0"/>
+              <a:buChar char="•"/>
+            </a:pPr>
+            <a:r>
+              <a:rPr lang="en-US" sz="1200" dirty="0"/>
+              <a:t>&lt;Avatar </a:t>
+            </a:r>
+            <a:r>
+              <a:rPr lang="en-US" sz="1200" dirty="0" err="1"/>
+              <a:t>topType</a:t>
+            </a:r>
+            <a:r>
+              <a:rPr lang="en-US" sz="1200" dirty="0"/>
+              <a:t>={</a:t>
+            </a:r>
+            <a:r>
+              <a:rPr lang="en-US" sz="1200" dirty="0" err="1"/>
+              <a:t>topType</a:t>
+            </a:r>
+            <a:r>
+              <a:rPr lang="en-US" sz="1200" dirty="0"/>
+              <a:t>} </a:t>
+            </a:r>
+            <a:r>
+              <a:rPr lang="en-US" sz="1200" dirty="0" err="1"/>
+              <a:t>hairColor</a:t>
+            </a:r>
+            <a:r>
+              <a:rPr lang="en-US" sz="1200" dirty="0"/>
+              <a:t>={</a:t>
+            </a:r>
+            <a:r>
+              <a:rPr lang="en-US" sz="1200" dirty="0" err="1"/>
+              <a:t>hairColor</a:t>
+            </a:r>
+            <a:r>
+              <a:rPr lang="en-US" sz="1200" dirty="0"/>
+              <a:t>} /&gt;</a:t>
+            </a:r>
+          </a:p>
+          <a:p>
+            <a:pPr marL="314325" lvl="1" indent="-163513">
+              <a:buFont typeface="Arial" panose="020B0604020202020204" pitchFamily="34" charset="0"/>
+              <a:buChar char="•"/>
+            </a:pPr>
+            <a:r>
+              <a:rPr lang="en-US" sz="1200" dirty="0"/>
+              <a:t>)}</a:t>
+            </a:r>
+          </a:p>
+        </p:txBody>
+      </p:sp>
+      <p:sp>
+        <p:nvSpPr>
+          <p:cNvPr id="27" name="TextBox 26">
+            <a:extLst>
+              <a:ext uri="{FF2B5EF4-FFF2-40B4-BE49-F238E27FC236}">
+                <a16:creationId xmlns:a16="http://schemas.microsoft.com/office/drawing/2014/main" id="{B0AE382C-E401-1B4D-8460-4D166DD5B517}"/>
+              </a:ext>
+            </a:extLst>
+          </p:cNvPr>
+          <p:cNvSpPr txBox="1"/>
+          <p:nvPr/>
+        </p:nvSpPr>
+        <p:spPr>
+          <a:xfrm>
+            <a:off x="8629239" y="4850296"/>
+            <a:ext cx="555171" cy="190800"/>
+          </a:xfrm>
+          <a:prstGeom prst="rect">
+            <a:avLst/>
+          </a:prstGeom>
+          <a:noFill/>
+          <a:ln>
+            <a:noFill/>
+          </a:ln>
+        </p:spPr>
+        <p:txBody>
+          <a:bodyPr wrap="square" tIns="3600" bIns="3600" rtlCol="0">
+            <a:spAutoFit/>
+          </a:bodyPr>
+          <a:lstStyle/>
+          <a:p>
+            <a:r>
+              <a:rPr lang="en-LU" sz="1200" dirty="0"/>
+              <a:t> </a:t>
+            </a:r>
+          </a:p>
+        </p:txBody>
+      </p:sp>
+      <p:sp>
+        <p:nvSpPr>
+          <p:cNvPr id="28" name="TextBox 27">
+            <a:extLst>
+              <a:ext uri="{FF2B5EF4-FFF2-40B4-BE49-F238E27FC236}">
+                <a16:creationId xmlns:a16="http://schemas.microsoft.com/office/drawing/2014/main" id="{67108B44-C2A7-AC46-9B04-D83B5141938F}"/>
+              </a:ext>
+            </a:extLst>
+          </p:cNvPr>
+          <p:cNvSpPr txBox="1"/>
+          <p:nvPr/>
+        </p:nvSpPr>
+        <p:spPr>
+          <a:xfrm>
+            <a:off x="3225357" y="2224131"/>
+            <a:ext cx="555171" cy="190800"/>
+          </a:xfrm>
+          <a:prstGeom prst="rect">
+            <a:avLst/>
+          </a:prstGeom>
+          <a:noFill/>
+          <a:ln>
+            <a:noFill/>
+          </a:ln>
+        </p:spPr>
+        <p:txBody>
+          <a:bodyPr wrap="square" tIns="3600" bIns="3600" rtlCol="0">
+            <a:spAutoFit/>
+          </a:bodyPr>
+          <a:lstStyle/>
+          <a:p>
+            <a:r>
+              <a:rPr lang="en-LU" sz="1200" dirty="0"/>
+              <a:t> </a:t>
+            </a:r>
+          </a:p>
+        </p:txBody>
+      </p:sp>
+      <p:cxnSp>
+        <p:nvCxnSpPr>
+          <p:cNvPr id="29" name="Elbow Connector 28">
+            <a:extLst>
+              <a:ext uri="{FF2B5EF4-FFF2-40B4-BE49-F238E27FC236}">
+                <a16:creationId xmlns:a16="http://schemas.microsoft.com/office/drawing/2014/main" id="{50988F5D-A581-C740-84D7-DD12C639F9E7}"/>
+              </a:ext>
+            </a:extLst>
+          </p:cNvPr>
+          <p:cNvCxnSpPr>
+            <a:cxnSpLocks/>
+            <a:stCxn id="28" idx="3"/>
+            <a:endCxn id="26" idx="1"/>
+          </p:cNvCxnSpPr>
+          <p:nvPr/>
+        </p:nvCxnSpPr>
+        <p:spPr>
+          <a:xfrm>
+            <a:off x="3780528" y="2319531"/>
+            <a:ext cx="3242715" cy="2610553"/>
+          </a:xfrm>
+          <a:prstGeom prst="bentConnector3">
+            <a:avLst>
+              <a:gd name="adj1" fmla="val 50000"/>
+            </a:avLst>
+          </a:prstGeom>
+          <a:ln w="12700">
+            <a:tailEnd type="triangle"/>
+          </a:ln>
+        </p:spPr>
+        <p:style>
+          <a:lnRef idx="1">
+            <a:schemeClr val="accent1"/>
+          </a:lnRef>
+          <a:fillRef idx="0">
+            <a:schemeClr val="accent1"/>
+          </a:fillRef>
+          <a:effectRef idx="0">
+            <a:schemeClr val="accent1"/>
+          </a:effectRef>
+          <a:fontRef idx="minor">
+            <a:schemeClr val="tx1"/>
+          </a:fontRef>
+        </p:style>
+      </p:cxnSp>
+    </p:spTree>
+    <p:extLst>
+      <p:ext uri="{BB962C8B-B14F-4D97-AF65-F5344CB8AC3E}">
+        <p14:creationId xmlns:p14="http://schemas.microsoft.com/office/powerpoint/2010/main" val="2657500018"/>
       </p:ext>
     </p:extLst>
   </p:cSld>

</xml_diff>

<commit_message>
clean up comments and PPTX
</commit_message>
<xml_diff>
--- a/Pepito/Final Project Design.pptx
+++ b/Pepito/Final Project Design.pptx
@@ -202,7 +202,7 @@
           <a:p>
             <a:fld id="{E3DEDAA8-261D-1A48-9864-3FC231515C43}" type="datetimeFigureOut">
               <a:rPr lang="en-LU" smtClean="0"/>
-              <a:t>13/01/2021</a:t>
+              <a:t>16/01/2021</a:t>
             </a:fld>
             <a:endParaRPr lang="en-LU"/>
           </a:p>
@@ -1039,7 +1039,7 @@
           <a:p>
             <a:fld id="{9ECEDF27-B25B-0343-A39C-1905A44EF111}" type="datetimeFigureOut">
               <a:rPr lang="en-LU" smtClean="0"/>
-              <a:t>13/01/2021</a:t>
+              <a:t>16/01/2021</a:t>
             </a:fld>
             <a:endParaRPr lang="en-LU"/>
           </a:p>
@@ -1239,7 +1239,7 @@
           <a:p>
             <a:fld id="{9ECEDF27-B25B-0343-A39C-1905A44EF111}" type="datetimeFigureOut">
               <a:rPr lang="en-LU" smtClean="0"/>
-              <a:t>13/01/2021</a:t>
+              <a:t>16/01/2021</a:t>
             </a:fld>
             <a:endParaRPr lang="en-LU"/>
           </a:p>
@@ -1449,7 +1449,7 @@
           <a:p>
             <a:fld id="{9ECEDF27-B25B-0343-A39C-1905A44EF111}" type="datetimeFigureOut">
               <a:rPr lang="en-LU" smtClean="0"/>
-              <a:t>13/01/2021</a:t>
+              <a:t>16/01/2021</a:t>
             </a:fld>
             <a:endParaRPr lang="en-LU"/>
           </a:p>
@@ -1649,7 +1649,7 @@
           <a:p>
             <a:fld id="{9ECEDF27-B25B-0343-A39C-1905A44EF111}" type="datetimeFigureOut">
               <a:rPr lang="en-LU" smtClean="0"/>
-              <a:t>13/01/2021</a:t>
+              <a:t>16/01/2021</a:t>
             </a:fld>
             <a:endParaRPr lang="en-LU"/>
           </a:p>
@@ -1925,7 +1925,7 @@
           <a:p>
             <a:fld id="{9ECEDF27-B25B-0343-A39C-1905A44EF111}" type="datetimeFigureOut">
               <a:rPr lang="en-LU" smtClean="0"/>
-              <a:t>13/01/2021</a:t>
+              <a:t>16/01/2021</a:t>
             </a:fld>
             <a:endParaRPr lang="en-LU"/>
           </a:p>
@@ -2193,7 +2193,7 @@
           <a:p>
             <a:fld id="{9ECEDF27-B25B-0343-A39C-1905A44EF111}" type="datetimeFigureOut">
               <a:rPr lang="en-LU" smtClean="0"/>
-              <a:t>13/01/2021</a:t>
+              <a:t>16/01/2021</a:t>
             </a:fld>
             <a:endParaRPr lang="en-LU"/>
           </a:p>
@@ -2608,7 +2608,7 @@
           <a:p>
             <a:fld id="{9ECEDF27-B25B-0343-A39C-1905A44EF111}" type="datetimeFigureOut">
               <a:rPr lang="en-LU" smtClean="0"/>
-              <a:t>13/01/2021</a:t>
+              <a:t>16/01/2021</a:t>
             </a:fld>
             <a:endParaRPr lang="en-LU"/>
           </a:p>
@@ -2750,7 +2750,7 @@
           <a:p>
             <a:fld id="{9ECEDF27-B25B-0343-A39C-1905A44EF111}" type="datetimeFigureOut">
               <a:rPr lang="en-LU" smtClean="0"/>
-              <a:t>13/01/2021</a:t>
+              <a:t>16/01/2021</a:t>
             </a:fld>
             <a:endParaRPr lang="en-LU"/>
           </a:p>
@@ -2863,7 +2863,7 @@
           <a:p>
             <a:fld id="{9ECEDF27-B25B-0343-A39C-1905A44EF111}" type="datetimeFigureOut">
               <a:rPr lang="en-LU" smtClean="0"/>
-              <a:t>13/01/2021</a:t>
+              <a:t>16/01/2021</a:t>
             </a:fld>
             <a:endParaRPr lang="en-LU"/>
           </a:p>
@@ -3176,7 +3176,7 @@
           <a:p>
             <a:fld id="{9ECEDF27-B25B-0343-A39C-1905A44EF111}" type="datetimeFigureOut">
               <a:rPr lang="en-LU" smtClean="0"/>
-              <a:t>13/01/2021</a:t>
+              <a:t>16/01/2021</a:t>
             </a:fld>
             <a:endParaRPr lang="en-LU"/>
           </a:p>
@@ -3465,7 +3465,7 @@
           <a:p>
             <a:fld id="{9ECEDF27-B25B-0343-A39C-1905A44EF111}" type="datetimeFigureOut">
               <a:rPr lang="en-LU" smtClean="0"/>
-              <a:t>13/01/2021</a:t>
+              <a:t>16/01/2021</a:t>
             </a:fld>
             <a:endParaRPr lang="en-LU"/>
           </a:p>
@@ -3708,7 +3708,7 @@
           <a:p>
             <a:fld id="{9ECEDF27-B25B-0343-A39C-1905A44EF111}" type="datetimeFigureOut">
               <a:rPr lang="en-LU" smtClean="0"/>
-              <a:t>13/01/2021</a:t>
+              <a:t>16/01/2021</a:t>
             </a:fld>
             <a:endParaRPr lang="en-LU"/>
           </a:p>
@@ -10147,8 +10147,8 @@
               <a:buChar char="•"/>
             </a:pPr>
             <a:r>
-              <a:rPr lang="en-US" sz="1200" dirty="0" err="1"/>
-              <a:t>pepitoAddess</a:t>
+              <a:rPr lang="en-US" sz="1200"/>
+              <a:t>pepitoAddress</a:t>
             </a:r>
             <a:endParaRPr lang="en-US" sz="1200" dirty="0"/>
           </a:p>

</xml_diff>

<commit_message>
Pepito creates new disguise contracts
</commit_message>
<xml_diff>
--- a/Pepito/Final Project Design.pptx
+++ b/Pepito/Final Project Design.pptx
@@ -10048,7 +10048,7 @@
         </p:nvSpPr>
         <p:spPr>
           <a:xfrm>
-            <a:off x="815416" y="1029531"/>
+            <a:off x="3623930" y="1029531"/>
             <a:ext cx="2265241" cy="3509812"/>
           </a:xfrm>
           <a:prstGeom prst="rect">
@@ -10069,8 +10069,13 @@
           <a:p>
             <a:r>
               <a:rPr lang="en-US" sz="1600" dirty="0"/>
-              <a:t>App</a:t>
-            </a:r>
+              <a:t>App after </a:t>
+            </a:r>
+            <a:r>
+              <a:rPr lang="en-US" sz="1600" dirty="0" err="1"/>
+              <a:t>setDisguise</a:t>
+            </a:r>
+            <a:endParaRPr lang="en-US" sz="1600" dirty="0"/>
           </a:p>
           <a:p>
             <a:pPr marL="171450" indent="-171450">
@@ -10137,29 +10142,8 @@
               <a:buChar char="•"/>
             </a:pPr>
             <a:r>
-              <a:rPr lang="en-US" sz="1200" dirty="0"/>
-              <a:t>accounts</a:t>
-            </a:r>
-          </a:p>
-          <a:p>
-            <a:pPr marL="314325" lvl="1" indent="-163513">
-              <a:buFont typeface="Arial" panose="020B0604020202020204" pitchFamily="34" charset="0"/>
-              <a:buChar char="•"/>
-            </a:pPr>
-            <a:r>
-              <a:rPr lang="en-US" sz="1200"/>
-              <a:t>pepitoAddress</a:t>
-            </a:r>
-            <a:endParaRPr lang="en-US" sz="1200" dirty="0"/>
-          </a:p>
-          <a:p>
-            <a:pPr marL="314325" lvl="1" indent="-163513">
-              <a:buFont typeface="Arial" panose="020B0604020202020204" pitchFamily="34" charset="0"/>
-              <a:buChar char="•"/>
-            </a:pPr>
-            <a:r>
               <a:rPr lang="en-US" sz="1200" dirty="0" err="1"/>
-              <a:t>ownerpepito</a:t>
+              <a:t>ownerPepito</a:t>
             </a:r>
             <a:endParaRPr lang="en-US" sz="1200" dirty="0"/>
           </a:p>
@@ -10179,7 +10163,10 @@
               <a:rPr lang="en-US" sz="1200" dirty="0" err="1"/>
               <a:t>DisguiseControls</a:t>
             </a:r>
-            <a:endParaRPr lang="en-US" sz="1200" dirty="0"/>
+            <a:r>
+              <a:rPr lang="en-US" sz="1200" dirty="0"/>
+              <a:t>’ props</a:t>
+            </a:r>
           </a:p>
           <a:p>
             <a:pPr marL="314325" lvl="1" indent="-184150">
@@ -10216,6 +10203,20 @@
             </a:pPr>
             <a:r>
               <a:rPr lang="en-US" sz="1200" dirty="0" err="1"/>
+              <a:t>deployedDisguise</a:t>
+            </a:r>
+            <a:r>
+              <a:rPr lang="en-US" sz="1200" dirty="0"/>
+              <a:t> – callback</a:t>
+            </a:r>
+          </a:p>
+          <a:p>
+            <a:pPr marL="314325" lvl="1" indent="-184150">
+              <a:buFont typeface="Arial" panose="020B0604020202020204" pitchFamily="34" charset="0"/>
+              <a:buChar char="•"/>
+            </a:pPr>
+            <a:r>
+              <a:rPr lang="en-US" sz="1200" dirty="0" err="1"/>
               <a:t>retrievedDisguise</a:t>
             </a:r>
             <a:r>
@@ -10251,7 +10252,29 @@
             </a:pPr>
             <a:r>
               <a:rPr lang="en-US" sz="1200" dirty="0" err="1"/>
-              <a:t>retrievedDisguise</a:t>
+              <a:t>pepitoInstance</a:t>
+            </a:r>
+            <a:endParaRPr lang="en-US" sz="1200" dirty="0"/>
+          </a:p>
+          <a:p>
+            <a:pPr marL="314325" lvl="1" indent="-184150">
+              <a:buFont typeface="Arial" panose="020B0604020202020204" pitchFamily="34" charset="0"/>
+              <a:buChar char="•"/>
+            </a:pPr>
+            <a:r>
+              <a:rPr lang="en-US" sz="1200" dirty="0" err="1"/>
+              <a:t>ownerPepito</a:t>
+            </a:r>
+            <a:endParaRPr lang="en-US" sz="1200" dirty="0"/>
+          </a:p>
+          <a:p>
+            <a:pPr marL="314325" lvl="1" indent="-184150">
+              <a:buFont typeface="Arial" panose="020B0604020202020204" pitchFamily="34" charset="0"/>
+              <a:buChar char="•"/>
+            </a:pPr>
+            <a:r>
+              <a:rPr lang="en-US" sz="1200" dirty="0" err="1"/>
+              <a:t>idxDisguise</a:t>
             </a:r>
             <a:endParaRPr lang="en-US" sz="1200" dirty="0"/>
           </a:p>
@@ -10271,8 +10294,8 @@
         </p:nvSpPr>
         <p:spPr>
           <a:xfrm>
-            <a:off x="3602159" y="1029532"/>
-            <a:ext cx="2101955" cy="2399468"/>
+            <a:off x="554171" y="1029531"/>
+            <a:ext cx="2439412" cy="2932869"/>
           </a:xfrm>
           <a:prstGeom prst="rect">
             <a:avLst/>
@@ -10294,7 +10317,10 @@
               <a:rPr lang="en-US" sz="1600" dirty="0" err="1"/>
               <a:t>DisguiseControls</a:t>
             </a:r>
-            <a:endParaRPr lang="en-US" sz="1600" dirty="0"/>
+            <a:r>
+              <a:rPr lang="en-US" sz="1600" dirty="0"/>
+              <a:t>’ props</a:t>
+            </a:r>
           </a:p>
           <a:p>
             <a:pPr marL="171450" indent="-171450">
@@ -10303,11 +10329,11 @@
             </a:pPr>
             <a:r>
               <a:rPr lang="en-US" sz="1200" dirty="0"/>
-              <a:t>Disguise</a:t>
-            </a:r>
-          </a:p>
-          <a:p>
-            <a:pPr marL="314325" lvl="1" indent="-163513">
+              <a:t>-&gt; Disguise</a:t>
+            </a:r>
+          </a:p>
+          <a:p>
+            <a:pPr marL="444500" lvl="1" indent="-163513">
               <a:buFont typeface="Arial" panose="020B0604020202020204" pitchFamily="34" charset="0"/>
               <a:buChar char="•"/>
             </a:pPr>
@@ -10323,13 +10349,17 @@
               <a:buChar char="•"/>
             </a:pPr>
             <a:r>
+              <a:rPr lang="en-US" sz="1200" dirty="0"/>
+              <a:t>-&gt; </a:t>
+            </a:r>
+            <a:r>
               <a:rPr lang="en-US" sz="1200" dirty="0" err="1"/>
               <a:t>MakePepito</a:t>
             </a:r>
             <a:endParaRPr lang="en-US" sz="1200" dirty="0"/>
           </a:p>
           <a:p>
-            <a:pPr marL="314325" indent="-163513">
+            <a:pPr marL="444500" indent="-163513">
               <a:buFont typeface="Arial" panose="020B0604020202020204" pitchFamily="34" charset="0"/>
               <a:buChar char="•"/>
             </a:pPr>
@@ -10339,7 +10369,7 @@
             </a:r>
           </a:p>
           <a:p>
-            <a:pPr marL="314325" indent="-163513">
+            <a:pPr marL="444500" indent="-163513">
               <a:buFont typeface="Arial" panose="020B0604020202020204" pitchFamily="34" charset="0"/>
               <a:buChar char="•"/>
             </a:pPr>
@@ -10355,13 +10385,17 @@
               <a:buChar char="•"/>
             </a:pPr>
             <a:r>
+              <a:rPr lang="en-US" sz="1200" dirty="0"/>
+              <a:t>-&gt; </a:t>
+            </a:r>
+            <a:r>
               <a:rPr lang="en-US" sz="1200" dirty="0" err="1"/>
               <a:t>DisguiseStore</a:t>
             </a:r>
             <a:endParaRPr lang="en-US" sz="1200" dirty="0"/>
           </a:p>
           <a:p>
-            <a:pPr marL="314325" lvl="1" indent="-163513">
+            <a:pPr marL="444500" lvl="1" indent="-163513">
               <a:buFont typeface="Arial" panose="020B0604020202020204" pitchFamily="34" charset="0"/>
               <a:buChar char="•"/>
             </a:pPr>
@@ -10371,7 +10405,7 @@
             </a:r>
           </a:p>
           <a:p>
-            <a:pPr marL="314325" lvl="1" indent="-163513">
+            <a:pPr marL="444500" lvl="1" indent="-163513">
               <a:buFont typeface="Arial" panose="020B0604020202020204" pitchFamily="34" charset="0"/>
               <a:buChar char="•"/>
             </a:pPr>
@@ -10382,10 +10416,47 @@
             <a:endParaRPr lang="en-US" sz="1200" dirty="0"/>
           </a:p>
           <a:p>
+            <a:pPr marL="444500" lvl="1" indent="-163513">
+              <a:buFont typeface="Arial" panose="020B0604020202020204" pitchFamily="34" charset="0"/>
+              <a:buChar char="•"/>
+            </a:pPr>
+            <a:r>
+              <a:rPr lang="en-US" sz="1200" dirty="0" err="1"/>
+              <a:t>ownerPepito</a:t>
+            </a:r>
+            <a:endParaRPr lang="en-US" sz="1200" dirty="0"/>
+          </a:p>
+          <a:p>
+            <a:pPr marL="444500" lvl="1" indent="-163513">
+              <a:buFont typeface="Arial" panose="020B0604020202020204" pitchFamily="34" charset="0"/>
+              <a:buChar char="•"/>
+            </a:pPr>
+            <a:r>
+              <a:rPr lang="en-US" sz="1200" dirty="0" err="1"/>
+              <a:t>idxDisguise</a:t>
+            </a:r>
+            <a:endParaRPr lang="en-US" sz="1200" dirty="0"/>
+          </a:p>
+          <a:p>
+            <a:pPr marL="444500" lvl="1" indent="-163513">
+              <a:buFont typeface="Arial" panose="020B0604020202020204" pitchFamily="34" charset="0"/>
+              <a:buChar char="•"/>
+            </a:pPr>
+            <a:r>
+              <a:rPr lang="en-US" sz="1200" dirty="0" err="1"/>
+              <a:t>deployedDisguise</a:t>
+            </a:r>
+            <a:endParaRPr lang="en-US" sz="1200" dirty="0"/>
+          </a:p>
+          <a:p>
             <a:pPr marL="171450" indent="-171450">
               <a:buFont typeface="Arial" panose="020B0604020202020204" pitchFamily="34" charset="0"/>
               <a:buChar char="•"/>
             </a:pPr>
+            <a:r>
+              <a:rPr lang="en-US" sz="1200" dirty="0"/>
+              <a:t>-&gt; </a:t>
+            </a:r>
             <a:r>
               <a:rPr lang="en-US" sz="1200" dirty="0" err="1"/>
               <a:t>DisguiseRetrieve</a:t>
@@ -10393,13 +10464,548 @@
             <a:endParaRPr lang="en-US" sz="1200" dirty="0"/>
           </a:p>
           <a:p>
-            <a:pPr marL="314325" lvl="1" indent="-163513">
+            <a:pPr marL="444500" lvl="1" indent="-163513">
               <a:buFont typeface="Arial" panose="020B0604020202020204" pitchFamily="34" charset="0"/>
               <a:buChar char="•"/>
             </a:pPr>
             <a:r>
               <a:rPr lang="en-US" sz="1200" dirty="0" err="1"/>
               <a:t>retrievedDisguise</a:t>
+            </a:r>
+            <a:endParaRPr lang="en-US" sz="1200" dirty="0"/>
+          </a:p>
+          <a:p>
+            <a:pPr marL="314325" lvl="1" indent="-163513">
+              <a:buFont typeface="Arial" panose="020B0604020202020204" pitchFamily="34" charset="0"/>
+              <a:buChar char="•"/>
+            </a:pPr>
+            <a:endParaRPr lang="en-US" sz="1200" dirty="0"/>
+          </a:p>
+        </p:txBody>
+      </p:sp>
+      <p:sp>
+        <p:nvSpPr>
+          <p:cNvPr id="5" name="TextBox 4">
+            <a:extLst>
+              <a:ext uri="{FF2B5EF4-FFF2-40B4-BE49-F238E27FC236}">
+                <a16:creationId xmlns:a16="http://schemas.microsoft.com/office/drawing/2014/main" id="{26CFA575-FB4A-D84F-B0F0-32A4817F251E}"/>
+              </a:ext>
+            </a:extLst>
+          </p:cNvPr>
+          <p:cNvSpPr txBox="1"/>
+          <p:nvPr/>
+        </p:nvSpPr>
+        <p:spPr>
+          <a:xfrm>
+            <a:off x="2987911" y="4724252"/>
+            <a:ext cx="3498073" cy="430887"/>
+          </a:xfrm>
+          <a:prstGeom prst="rect">
+            <a:avLst/>
+          </a:prstGeom>
+          <a:solidFill>
+            <a:schemeClr val="bg1"/>
+          </a:solidFill>
+        </p:spPr>
+        <p:txBody>
+          <a:bodyPr wrap="none" rtlCol="0">
+            <a:spAutoFit/>
+          </a:bodyPr>
+          <a:lstStyle/>
+          <a:p>
+            <a:r>
+              <a:rPr lang="en-US" sz="1100" dirty="0" err="1"/>
+              <a:t>ownerPepito</a:t>
+            </a:r>
+            <a:r>
+              <a:rPr lang="en-US" sz="1100" dirty="0"/>
+              <a:t> is the address that has ETH</a:t>
+            </a:r>
+          </a:p>
+          <a:p>
+            <a:r>
+              <a:rPr lang="en-US" sz="1100" dirty="0" err="1"/>
+              <a:t>pepitoAddress</a:t>
+            </a:r>
+            <a:r>
+              <a:rPr lang="en-US" sz="1100" dirty="0"/>
+              <a:t> is only the disguise Factory, used to display</a:t>
+            </a:r>
+            <a:endParaRPr lang="en-LU" sz="1100" dirty="0"/>
+          </a:p>
+        </p:txBody>
+      </p:sp>
+      <p:sp>
+        <p:nvSpPr>
+          <p:cNvPr id="6" name="TextBox 5">
+            <a:extLst>
+              <a:ext uri="{FF2B5EF4-FFF2-40B4-BE49-F238E27FC236}">
+                <a16:creationId xmlns:a16="http://schemas.microsoft.com/office/drawing/2014/main" id="{A04D4A73-A3AF-374B-988D-A2DF05B34A04}"/>
+              </a:ext>
+            </a:extLst>
+          </p:cNvPr>
+          <p:cNvSpPr txBox="1"/>
+          <p:nvPr/>
+        </p:nvSpPr>
+        <p:spPr>
+          <a:xfrm>
+            <a:off x="6225615" y="1029531"/>
+            <a:ext cx="2265241" cy="3509812"/>
+          </a:xfrm>
+          <a:prstGeom prst="rect">
+            <a:avLst/>
+          </a:prstGeom>
+          <a:noFill/>
+          <a:ln>
+            <a:solidFill>
+              <a:schemeClr val="accent1"/>
+            </a:solidFill>
+          </a:ln>
+        </p:spPr>
+        <p:txBody>
+          <a:bodyPr wrap="none" rtlCol="0">
+            <a:noAutofit/>
+          </a:bodyPr>
+          <a:lstStyle/>
+          <a:p>
+            <a:r>
+              <a:rPr lang="en-US" sz="1600" dirty="0"/>
+              <a:t>App after </a:t>
+            </a:r>
+            <a:r>
+              <a:rPr lang="en-US" sz="1600" dirty="0" err="1"/>
+              <a:t>makePepito</a:t>
+            </a:r>
+            <a:endParaRPr lang="en-US" sz="1600" dirty="0"/>
+          </a:p>
+          <a:p>
+            <a:pPr marL="171450" indent="-171450">
+              <a:buFont typeface="Arial" panose="020B0604020202020204" pitchFamily="34" charset="0"/>
+              <a:buChar char="•"/>
+            </a:pPr>
+            <a:r>
+              <a:rPr lang="en-US" sz="1200" dirty="0"/>
+              <a:t>state</a:t>
+            </a:r>
+          </a:p>
+          <a:p>
+            <a:pPr marL="314325" lvl="1" indent="-163513">
+              <a:buFont typeface="Arial" panose="020B0604020202020204" pitchFamily="34" charset="0"/>
+              <a:buChar char="•"/>
+            </a:pPr>
+            <a:r>
+              <a:rPr lang="en-US" sz="1200" dirty="0"/>
+              <a:t>web3connected</a:t>
+            </a:r>
+          </a:p>
+          <a:p>
+            <a:pPr marL="314325" lvl="1" indent="-163513">
+              <a:buFont typeface="Arial" panose="020B0604020202020204" pitchFamily="34" charset="0"/>
+              <a:buChar char="•"/>
+            </a:pPr>
+            <a:r>
+              <a:rPr lang="en-US" sz="1200" dirty="0" err="1"/>
+              <a:t>randomBigNumber</a:t>
+            </a:r>
+            <a:endParaRPr lang="en-US" sz="1200" dirty="0"/>
+          </a:p>
+          <a:p>
+            <a:pPr marL="314325" lvl="1" indent="-163513">
+              <a:buFont typeface="Arial" panose="020B0604020202020204" pitchFamily="34" charset="0"/>
+              <a:buChar char="•"/>
+            </a:pPr>
+            <a:r>
+              <a:rPr lang="en-US" sz="1200" dirty="0"/>
+              <a:t>{</a:t>
+            </a:r>
+            <a:r>
+              <a:rPr lang="en-US" sz="1200" dirty="0" err="1"/>
+              <a:t>idxDisguise</a:t>
+            </a:r>
+            <a:r>
+              <a:rPr lang="en-US" sz="1200" dirty="0"/>
+              <a:t>}</a:t>
+            </a:r>
+          </a:p>
+          <a:p>
+            <a:pPr marL="314325" lvl="1" indent="-163513">
+              <a:buFont typeface="Arial" panose="020B0604020202020204" pitchFamily="34" charset="0"/>
+              <a:buChar char="•"/>
+            </a:pPr>
+            <a:r>
+              <a:rPr lang="en-US" sz="1200" dirty="0"/>
+              <a:t>{disguise}</a:t>
+            </a:r>
+          </a:p>
+          <a:p>
+            <a:pPr marL="314325" lvl="1" indent="-163513">
+              <a:buFont typeface="Arial" panose="020B0604020202020204" pitchFamily="34" charset="0"/>
+              <a:buChar char="•"/>
+            </a:pPr>
+            <a:r>
+              <a:rPr lang="en-US" sz="1200" dirty="0"/>
+              <a:t>{web3}</a:t>
+            </a:r>
+          </a:p>
+          <a:p>
+            <a:pPr marL="314325" lvl="1" indent="-163513">
+              <a:buFont typeface="Arial" panose="020B0604020202020204" pitchFamily="34" charset="0"/>
+              <a:buChar char="•"/>
+            </a:pPr>
+            <a:r>
+              <a:rPr lang="en-US" sz="1200" dirty="0"/>
+              <a:t>accounts[]</a:t>
+            </a:r>
+          </a:p>
+          <a:p>
+            <a:pPr marL="314325" lvl="1" indent="-163513">
+              <a:buFont typeface="Arial" panose="020B0604020202020204" pitchFamily="34" charset="0"/>
+              <a:buChar char="•"/>
+            </a:pPr>
+            <a:r>
+              <a:rPr lang="en-US" sz="1200" dirty="0" err="1"/>
+              <a:t>pepitoAddress</a:t>
+            </a:r>
+            <a:endParaRPr lang="en-US" sz="1200" dirty="0"/>
+          </a:p>
+          <a:p>
+            <a:pPr marL="314325" lvl="1" indent="-163513">
+              <a:buFont typeface="Arial" panose="020B0604020202020204" pitchFamily="34" charset="0"/>
+              <a:buChar char="•"/>
+            </a:pPr>
+            <a:r>
+              <a:rPr lang="en-US" sz="1200" dirty="0" err="1"/>
+              <a:t>pepitoInstance</a:t>
+            </a:r>
+            <a:endParaRPr lang="en-US" sz="1200" dirty="0"/>
+          </a:p>
+          <a:p>
+            <a:pPr marL="314325" lvl="1" indent="-163513">
+              <a:buFont typeface="Arial" panose="020B0604020202020204" pitchFamily="34" charset="0"/>
+              <a:buChar char="•"/>
+            </a:pPr>
+            <a:r>
+              <a:rPr lang="en-US" sz="1200" dirty="0" err="1"/>
+              <a:t>ownerPepito</a:t>
+            </a:r>
+            <a:endParaRPr lang="en-US" sz="1200" dirty="0"/>
+          </a:p>
+          <a:p>
+            <a:pPr marL="314325" lvl="1" indent="-163513">
+              <a:buFont typeface="Arial" panose="020B0604020202020204" pitchFamily="34" charset="0"/>
+              <a:buChar char="•"/>
+            </a:pPr>
+            <a:endParaRPr lang="en-US" sz="1200" dirty="0"/>
+          </a:p>
+        </p:txBody>
+      </p:sp>
+      <p:sp>
+        <p:nvSpPr>
+          <p:cNvPr id="7" name="TextBox 6">
+            <a:extLst>
+              <a:ext uri="{FF2B5EF4-FFF2-40B4-BE49-F238E27FC236}">
+                <a16:creationId xmlns:a16="http://schemas.microsoft.com/office/drawing/2014/main" id="{A0A96897-3BD0-EA4E-A9CC-BA522C3FFF17}"/>
+              </a:ext>
+            </a:extLst>
+          </p:cNvPr>
+          <p:cNvSpPr txBox="1"/>
+          <p:nvPr/>
+        </p:nvSpPr>
+        <p:spPr>
+          <a:xfrm>
+            <a:off x="3824070" y="2616017"/>
+            <a:ext cx="555171" cy="190800"/>
+          </a:xfrm>
+          <a:prstGeom prst="rect">
+            <a:avLst/>
+          </a:prstGeom>
+          <a:noFill/>
+          <a:ln>
+            <a:noFill/>
+          </a:ln>
+        </p:spPr>
+        <p:txBody>
+          <a:bodyPr wrap="square" tIns="3600" bIns="3600" rtlCol="0">
+            <a:spAutoFit/>
+          </a:bodyPr>
+          <a:lstStyle/>
+          <a:p>
+            <a:r>
+              <a:rPr lang="en-LU" sz="1200" dirty="0"/>
+              <a:t> </a:t>
+            </a:r>
+          </a:p>
+        </p:txBody>
+      </p:sp>
+      <p:cxnSp>
+        <p:nvCxnSpPr>
+          <p:cNvPr id="8" name="Elbow Connector 7">
+            <a:extLst>
+              <a:ext uri="{FF2B5EF4-FFF2-40B4-BE49-F238E27FC236}">
+                <a16:creationId xmlns:a16="http://schemas.microsoft.com/office/drawing/2014/main" id="{DFE3039E-78C6-7342-BB62-BD63826662B2}"/>
+              </a:ext>
+            </a:extLst>
+          </p:cNvPr>
+          <p:cNvCxnSpPr>
+            <a:cxnSpLocks/>
+            <a:stCxn id="11" idx="3"/>
+            <a:endCxn id="7" idx="1"/>
+          </p:cNvCxnSpPr>
+          <p:nvPr/>
+        </p:nvCxnSpPr>
+        <p:spPr>
+          <a:xfrm>
+            <a:off x="2589801" y="1240970"/>
+            <a:ext cx="1234269" cy="1470447"/>
+          </a:xfrm>
+          <a:prstGeom prst="bentConnector3">
+            <a:avLst>
+              <a:gd name="adj1" fmla="val 50000"/>
+            </a:avLst>
+          </a:prstGeom>
+          <a:ln w="12700">
+            <a:headEnd type="triangle" w="med" len="med"/>
+            <a:tailEnd type="none" w="med" len="med"/>
+          </a:ln>
+        </p:spPr>
+        <p:style>
+          <a:lnRef idx="1">
+            <a:schemeClr val="accent1"/>
+          </a:lnRef>
+          <a:fillRef idx="0">
+            <a:schemeClr val="accent1"/>
+          </a:fillRef>
+          <a:effectRef idx="0">
+            <a:schemeClr val="accent1"/>
+          </a:effectRef>
+          <a:fontRef idx="minor">
+            <a:schemeClr val="tx1"/>
+          </a:fontRef>
+        </p:style>
+      </p:cxnSp>
+      <p:sp>
+        <p:nvSpPr>
+          <p:cNvPr id="11" name="TextBox 10">
+            <a:extLst>
+              <a:ext uri="{FF2B5EF4-FFF2-40B4-BE49-F238E27FC236}">
+                <a16:creationId xmlns:a16="http://schemas.microsoft.com/office/drawing/2014/main" id="{20EB25B0-0DA2-BF44-9389-1A5714412290}"/>
+              </a:ext>
+            </a:extLst>
+          </p:cNvPr>
+          <p:cNvSpPr txBox="1"/>
+          <p:nvPr/>
+        </p:nvSpPr>
+        <p:spPr>
+          <a:xfrm>
+            <a:off x="2034630" y="1145570"/>
+            <a:ext cx="555171" cy="190800"/>
+          </a:xfrm>
+          <a:prstGeom prst="rect">
+            <a:avLst/>
+          </a:prstGeom>
+          <a:noFill/>
+          <a:ln>
+            <a:noFill/>
+          </a:ln>
+        </p:spPr>
+        <p:txBody>
+          <a:bodyPr wrap="square" tIns="3600" bIns="3600" rtlCol="0">
+            <a:spAutoFit/>
+          </a:bodyPr>
+          <a:lstStyle/>
+          <a:p>
+            <a:r>
+              <a:rPr lang="en-LU" sz="1200" dirty="0"/>
+              <a:t> </a:t>
+            </a:r>
+          </a:p>
+        </p:txBody>
+      </p:sp>
+      <p:sp>
+        <p:nvSpPr>
+          <p:cNvPr id="16" name="TextBox 15">
+            <a:extLst>
+              <a:ext uri="{FF2B5EF4-FFF2-40B4-BE49-F238E27FC236}">
+                <a16:creationId xmlns:a16="http://schemas.microsoft.com/office/drawing/2014/main" id="{837E4FB1-6FEA-4542-8C2D-F7EF969DAFB4}"/>
+              </a:ext>
+            </a:extLst>
+          </p:cNvPr>
+          <p:cNvSpPr txBox="1"/>
+          <p:nvPr/>
+        </p:nvSpPr>
+        <p:spPr>
+          <a:xfrm>
+            <a:off x="8827300" y="1029531"/>
+            <a:ext cx="2265241" cy="3509812"/>
+          </a:xfrm>
+          <a:prstGeom prst="rect">
+            <a:avLst/>
+          </a:prstGeom>
+          <a:noFill/>
+          <a:ln>
+            <a:solidFill>
+              <a:schemeClr val="accent1"/>
+            </a:solidFill>
+          </a:ln>
+        </p:spPr>
+        <p:txBody>
+          <a:bodyPr wrap="none" rtlCol="0">
+            <a:noAutofit/>
+          </a:bodyPr>
+          <a:lstStyle/>
+          <a:p>
+            <a:r>
+              <a:rPr lang="en-US" sz="1600" dirty="0"/>
+              <a:t>App after </a:t>
+            </a:r>
+            <a:r>
+              <a:rPr lang="en-US" sz="1600" dirty="0" err="1"/>
+              <a:t>storeDisguise</a:t>
+            </a:r>
+            <a:endParaRPr lang="en-US" sz="1600" dirty="0"/>
+          </a:p>
+          <a:p>
+            <a:pPr marL="171450" indent="-171450">
+              <a:buFont typeface="Arial" panose="020B0604020202020204" pitchFamily="34" charset="0"/>
+              <a:buChar char="•"/>
+            </a:pPr>
+            <a:r>
+              <a:rPr lang="en-US" sz="1200" dirty="0"/>
+              <a:t>state</a:t>
+            </a:r>
+          </a:p>
+          <a:p>
+            <a:pPr marL="314325" lvl="1" indent="-163513">
+              <a:buFont typeface="Arial" panose="020B0604020202020204" pitchFamily="34" charset="0"/>
+              <a:buChar char="•"/>
+            </a:pPr>
+            <a:r>
+              <a:rPr lang="en-US" sz="1200" dirty="0"/>
+              <a:t>web3connected</a:t>
+            </a:r>
+          </a:p>
+          <a:p>
+            <a:pPr marL="314325" lvl="1" indent="-163513">
+              <a:buFont typeface="Arial" panose="020B0604020202020204" pitchFamily="34" charset="0"/>
+              <a:buChar char="•"/>
+            </a:pPr>
+            <a:r>
+              <a:rPr lang="en-US" sz="1200" dirty="0" err="1"/>
+              <a:t>randomBigNumber</a:t>
+            </a:r>
+            <a:endParaRPr lang="en-US" sz="1200" dirty="0"/>
+          </a:p>
+          <a:p>
+            <a:pPr marL="314325" lvl="1" indent="-163513">
+              <a:buFont typeface="Arial" panose="020B0604020202020204" pitchFamily="34" charset="0"/>
+              <a:buChar char="•"/>
+            </a:pPr>
+            <a:r>
+              <a:rPr lang="en-US" sz="1200" dirty="0"/>
+              <a:t>{</a:t>
+            </a:r>
+            <a:r>
+              <a:rPr lang="en-US" sz="1200" dirty="0" err="1"/>
+              <a:t>idxDisguise</a:t>
+            </a:r>
+            <a:r>
+              <a:rPr lang="en-US" sz="1200" dirty="0"/>
+              <a:t>}</a:t>
+            </a:r>
+          </a:p>
+          <a:p>
+            <a:pPr marL="314325" lvl="1" indent="-163513">
+              <a:buFont typeface="Arial" panose="020B0604020202020204" pitchFamily="34" charset="0"/>
+              <a:buChar char="•"/>
+            </a:pPr>
+            <a:r>
+              <a:rPr lang="en-US" sz="1200" dirty="0"/>
+              <a:t>{disguise}</a:t>
+            </a:r>
+          </a:p>
+          <a:p>
+            <a:pPr marL="314325" lvl="1" indent="-163513">
+              <a:buFont typeface="Arial" panose="020B0604020202020204" pitchFamily="34" charset="0"/>
+              <a:buChar char="•"/>
+            </a:pPr>
+            <a:r>
+              <a:rPr lang="en-US" sz="1200" dirty="0"/>
+              <a:t>{web3}</a:t>
+            </a:r>
+          </a:p>
+          <a:p>
+            <a:pPr marL="314325" lvl="1" indent="-163513">
+              <a:buFont typeface="Arial" panose="020B0604020202020204" pitchFamily="34" charset="0"/>
+              <a:buChar char="•"/>
+            </a:pPr>
+            <a:r>
+              <a:rPr lang="en-US" sz="1200" dirty="0"/>
+              <a:t>accounts[]</a:t>
+            </a:r>
+          </a:p>
+          <a:p>
+            <a:pPr marL="314325" lvl="1" indent="-163513">
+              <a:buFont typeface="Arial" panose="020B0604020202020204" pitchFamily="34" charset="0"/>
+              <a:buChar char="•"/>
+            </a:pPr>
+            <a:r>
+              <a:rPr lang="en-US" sz="1200" dirty="0" err="1"/>
+              <a:t>pepitoAddress</a:t>
+            </a:r>
+            <a:endParaRPr lang="en-US" sz="1200" dirty="0"/>
+          </a:p>
+          <a:p>
+            <a:pPr marL="314325" lvl="1" indent="-163513">
+              <a:buFont typeface="Arial" panose="020B0604020202020204" pitchFamily="34" charset="0"/>
+              <a:buChar char="•"/>
+            </a:pPr>
+            <a:r>
+              <a:rPr lang="en-US" sz="1200" dirty="0" err="1"/>
+              <a:t>pepitoInstance</a:t>
+            </a:r>
+            <a:endParaRPr lang="en-US" sz="1200" dirty="0"/>
+          </a:p>
+          <a:p>
+            <a:pPr marL="314325" lvl="1" indent="-163513">
+              <a:buFont typeface="Arial" panose="020B0604020202020204" pitchFamily="34" charset="0"/>
+              <a:buChar char="•"/>
+            </a:pPr>
+            <a:r>
+              <a:rPr lang="en-US" sz="1200" dirty="0" err="1"/>
+              <a:t>ownerPepito</a:t>
+            </a:r>
+            <a:endParaRPr lang="en-US" sz="1200" dirty="0"/>
+          </a:p>
+          <a:p>
+            <a:pPr marL="314325" lvl="1" indent="-163513">
+              <a:buFont typeface="Arial" panose="020B0604020202020204" pitchFamily="34" charset="0"/>
+              <a:buChar char="•"/>
+            </a:pPr>
+            <a:r>
+              <a:rPr lang="en-US" sz="1200" dirty="0" err="1"/>
+              <a:t>disguiseCount</a:t>
+            </a:r>
+            <a:endParaRPr lang="en-US" sz="1200" dirty="0"/>
+          </a:p>
+          <a:p>
+            <a:pPr marL="314325" lvl="1" indent="-163513">
+              <a:buFont typeface="Arial" panose="020B0604020202020204" pitchFamily="34" charset="0"/>
+              <a:buChar char="•"/>
+            </a:pPr>
+            <a:r>
+              <a:rPr lang="en-US" sz="1200"/>
+              <a:t>disguiseAddress[]</a:t>
+            </a:r>
+            <a:endParaRPr lang="en-US" sz="1200" dirty="0"/>
+          </a:p>
+          <a:p>
+            <a:pPr marL="314325" lvl="1" indent="-163513">
+              <a:buFont typeface="Arial" panose="020B0604020202020204" pitchFamily="34" charset="0"/>
+              <a:buChar char="•"/>
+            </a:pPr>
+            <a:r>
+              <a:rPr lang="en-US" sz="1200" dirty="0" err="1"/>
+              <a:t>disguiseStored</a:t>
             </a:r>
             <a:endParaRPr lang="en-US" sz="1200" dirty="0"/>
           </a:p>

</xml_diff>

<commit_message>
Clean code & comments of creation of new disguise contracts
</commit_message>
<xml_diff>
--- a/Pepito/Final Project Design.pptx
+++ b/Pepito/Final Project Design.pptx
@@ -202,7 +202,7 @@
           <a:p>
             <a:fld id="{E3DEDAA8-261D-1A48-9864-3FC231515C43}" type="datetimeFigureOut">
               <a:rPr lang="en-LU" smtClean="0"/>
-              <a:t>16/01/2021</a:t>
+              <a:t>17/01/2021</a:t>
             </a:fld>
             <a:endParaRPr lang="en-LU"/>
           </a:p>
@@ -1039,7 +1039,7 @@
           <a:p>
             <a:fld id="{9ECEDF27-B25B-0343-A39C-1905A44EF111}" type="datetimeFigureOut">
               <a:rPr lang="en-LU" smtClean="0"/>
-              <a:t>16/01/2021</a:t>
+              <a:t>17/01/2021</a:t>
             </a:fld>
             <a:endParaRPr lang="en-LU"/>
           </a:p>
@@ -1239,7 +1239,7 @@
           <a:p>
             <a:fld id="{9ECEDF27-B25B-0343-A39C-1905A44EF111}" type="datetimeFigureOut">
               <a:rPr lang="en-LU" smtClean="0"/>
-              <a:t>16/01/2021</a:t>
+              <a:t>17/01/2021</a:t>
             </a:fld>
             <a:endParaRPr lang="en-LU"/>
           </a:p>
@@ -1449,7 +1449,7 @@
           <a:p>
             <a:fld id="{9ECEDF27-B25B-0343-A39C-1905A44EF111}" type="datetimeFigureOut">
               <a:rPr lang="en-LU" smtClean="0"/>
-              <a:t>16/01/2021</a:t>
+              <a:t>17/01/2021</a:t>
             </a:fld>
             <a:endParaRPr lang="en-LU"/>
           </a:p>
@@ -1649,7 +1649,7 @@
           <a:p>
             <a:fld id="{9ECEDF27-B25B-0343-A39C-1905A44EF111}" type="datetimeFigureOut">
               <a:rPr lang="en-LU" smtClean="0"/>
-              <a:t>16/01/2021</a:t>
+              <a:t>17/01/2021</a:t>
             </a:fld>
             <a:endParaRPr lang="en-LU"/>
           </a:p>
@@ -1925,7 +1925,7 @@
           <a:p>
             <a:fld id="{9ECEDF27-B25B-0343-A39C-1905A44EF111}" type="datetimeFigureOut">
               <a:rPr lang="en-LU" smtClean="0"/>
-              <a:t>16/01/2021</a:t>
+              <a:t>17/01/2021</a:t>
             </a:fld>
             <a:endParaRPr lang="en-LU"/>
           </a:p>
@@ -2193,7 +2193,7 @@
           <a:p>
             <a:fld id="{9ECEDF27-B25B-0343-A39C-1905A44EF111}" type="datetimeFigureOut">
               <a:rPr lang="en-LU" smtClean="0"/>
-              <a:t>16/01/2021</a:t>
+              <a:t>17/01/2021</a:t>
             </a:fld>
             <a:endParaRPr lang="en-LU"/>
           </a:p>
@@ -2608,7 +2608,7 @@
           <a:p>
             <a:fld id="{9ECEDF27-B25B-0343-A39C-1905A44EF111}" type="datetimeFigureOut">
               <a:rPr lang="en-LU" smtClean="0"/>
-              <a:t>16/01/2021</a:t>
+              <a:t>17/01/2021</a:t>
             </a:fld>
             <a:endParaRPr lang="en-LU"/>
           </a:p>
@@ -2750,7 +2750,7 @@
           <a:p>
             <a:fld id="{9ECEDF27-B25B-0343-A39C-1905A44EF111}" type="datetimeFigureOut">
               <a:rPr lang="en-LU" smtClean="0"/>
-              <a:t>16/01/2021</a:t>
+              <a:t>17/01/2021</a:t>
             </a:fld>
             <a:endParaRPr lang="en-LU"/>
           </a:p>
@@ -2863,7 +2863,7 @@
           <a:p>
             <a:fld id="{9ECEDF27-B25B-0343-A39C-1905A44EF111}" type="datetimeFigureOut">
               <a:rPr lang="en-LU" smtClean="0"/>
-              <a:t>16/01/2021</a:t>
+              <a:t>17/01/2021</a:t>
             </a:fld>
             <a:endParaRPr lang="en-LU"/>
           </a:p>
@@ -3176,7 +3176,7 @@
           <a:p>
             <a:fld id="{9ECEDF27-B25B-0343-A39C-1905A44EF111}" type="datetimeFigureOut">
               <a:rPr lang="en-LU" smtClean="0"/>
-              <a:t>16/01/2021</a:t>
+              <a:t>17/01/2021</a:t>
             </a:fld>
             <a:endParaRPr lang="en-LU"/>
           </a:p>
@@ -3465,7 +3465,7 @@
           <a:p>
             <a:fld id="{9ECEDF27-B25B-0343-A39C-1905A44EF111}" type="datetimeFigureOut">
               <a:rPr lang="en-LU" smtClean="0"/>
-              <a:t>16/01/2021</a:t>
+              <a:t>17/01/2021</a:t>
             </a:fld>
             <a:endParaRPr lang="en-LU"/>
           </a:p>
@@ -3708,7 +3708,7 @@
           <a:p>
             <a:fld id="{9ECEDF27-B25B-0343-A39C-1905A44EF111}" type="datetimeFigureOut">
               <a:rPr lang="en-LU" smtClean="0"/>
-              <a:t>16/01/2021</a:t>
+              <a:t>17/01/2021</a:t>
             </a:fld>
             <a:endParaRPr lang="en-LU"/>
           </a:p>
@@ -5308,7 +5308,7 @@
         <p:spPr>
           <a:xfrm>
             <a:off x="6067646" y="5241555"/>
-            <a:ext cx="1341201" cy="307777"/>
+            <a:ext cx="1746504" cy="307777"/>
           </a:xfrm>
           <a:prstGeom prst="rect">
             <a:avLst/>
@@ -5334,7 +5334,7 @@
                   </a:schemeClr>
                 </a:solidFill>
               </a:rPr>
-              <a:t>PinNeedFactory</a:t>
+              <a:t>PersonInNeedFactory</a:t>
             </a:r>
           </a:p>
         </p:txBody>
@@ -5399,8 +5399,8 @@
         </p:nvCxnSpPr>
         <p:spPr>
           <a:xfrm flipV="1">
-            <a:off x="7408847" y="4935648"/>
-            <a:ext cx="2192808" cy="459796"/>
+            <a:off x="7814150" y="4935648"/>
+            <a:ext cx="1787505" cy="459796"/>
           </a:xfrm>
           <a:prstGeom prst="bentConnector3">
             <a:avLst/>
@@ -5442,8 +5442,8 @@
         </p:nvCxnSpPr>
         <p:spPr>
           <a:xfrm flipV="1">
-            <a:off x="7408847" y="5392926"/>
-            <a:ext cx="2192808" cy="2518"/>
+            <a:off x="7814150" y="5392926"/>
+            <a:ext cx="1787505" cy="2518"/>
           </a:xfrm>
           <a:prstGeom prst="bentConnector3">
             <a:avLst/>
@@ -5485,8 +5485,8 @@
         </p:nvCxnSpPr>
         <p:spPr>
           <a:xfrm>
-            <a:off x="7408847" y="5395444"/>
-            <a:ext cx="2192808" cy="434398"/>
+            <a:off x="7814150" y="5395444"/>
+            <a:ext cx="1787505" cy="434398"/>
           </a:xfrm>
           <a:prstGeom prst="bentConnector3">
             <a:avLst/>
@@ -6347,6 +6347,106 @@
       </p:grpSpPr>
       <p:sp>
         <p:nvSpPr>
+          <p:cNvPr id="10" name="TextBox 9">
+            <a:extLst>
+              <a:ext uri="{FF2B5EF4-FFF2-40B4-BE49-F238E27FC236}">
+                <a16:creationId xmlns:a16="http://schemas.microsoft.com/office/drawing/2014/main" id="{8287E3B1-E1AA-FA4D-A6EC-3EC47F87FAD3}"/>
+              </a:ext>
+            </a:extLst>
+          </p:cNvPr>
+          <p:cNvSpPr txBox="1"/>
+          <p:nvPr/>
+        </p:nvSpPr>
+        <p:spPr>
+          <a:xfrm>
+            <a:off x="595729" y="1421416"/>
+            <a:ext cx="2576360" cy="1550382"/>
+          </a:xfrm>
+          <a:prstGeom prst="rect">
+            <a:avLst/>
+          </a:prstGeom>
+          <a:noFill/>
+          <a:ln>
+            <a:solidFill>
+              <a:schemeClr val="accent1"/>
+            </a:solidFill>
+          </a:ln>
+        </p:spPr>
+        <p:txBody>
+          <a:bodyPr wrap="none" rtlCol="0">
+            <a:noAutofit/>
+          </a:bodyPr>
+          <a:lstStyle/>
+          <a:p>
+            <a:r>
+              <a:rPr lang="en-US" sz="1600" dirty="0"/>
+              <a:t>Frontend</a:t>
+            </a:r>
+          </a:p>
+          <a:p>
+            <a:pPr marL="171450" indent="-171450">
+              <a:buFont typeface="Arial" panose="020B0604020202020204" pitchFamily="34" charset="0"/>
+              <a:buChar char="•"/>
+            </a:pPr>
+            <a:r>
+              <a:rPr lang="en-US" sz="1200" dirty="0"/>
+              <a:t>Random disguise</a:t>
+            </a:r>
+          </a:p>
+          <a:p>
+            <a:pPr marL="184150" indent="-174625">
+              <a:buFont typeface="Arial" panose="020B0604020202020204" pitchFamily="34" charset="0"/>
+              <a:buChar char="•"/>
+            </a:pPr>
+            <a:r>
+              <a:rPr lang="en-US" sz="1200" dirty="0"/>
+              <a:t>Connect web3</a:t>
+            </a:r>
+          </a:p>
+          <a:p>
+            <a:pPr marL="184150" indent="-174625">
+              <a:buFont typeface="Arial" panose="020B0604020202020204" pitchFamily="34" charset="0"/>
+              <a:buChar char="•"/>
+            </a:pPr>
+            <a:r>
+              <a:rPr lang="en-US" sz="1200" dirty="0"/>
+              <a:t>Register the disguise</a:t>
+            </a:r>
+          </a:p>
+          <a:p>
+            <a:pPr marL="184150" indent="-174625">
+              <a:buFont typeface="Arial" panose="020B0604020202020204" pitchFamily="34" charset="0"/>
+              <a:buChar char="•"/>
+            </a:pPr>
+            <a:r>
+              <a:rPr lang="en-US" sz="1200" dirty="0"/>
+              <a:t>Retrieve a disguise</a:t>
+            </a:r>
+          </a:p>
+          <a:p>
+            <a:pPr marL="184150" indent="-174625">
+              <a:buFont typeface="Arial" panose="020B0604020202020204" pitchFamily="34" charset="0"/>
+              <a:buChar char="•"/>
+            </a:pPr>
+            <a:r>
+              <a:rPr lang="en-US" sz="1200" dirty="0"/>
+              <a:t>Display a disguise</a:t>
+            </a:r>
+          </a:p>
+          <a:p>
+            <a:pPr marL="171450" indent="-171450">
+              <a:buFont typeface="Arial" panose="020B0604020202020204" pitchFamily="34" charset="0"/>
+              <a:buChar char="•"/>
+            </a:pPr>
+            <a:r>
+              <a:rPr lang="en-US" sz="1200" dirty="0"/>
+              <a:t>Change one disguise option</a:t>
+            </a:r>
+          </a:p>
+        </p:txBody>
+      </p:sp>
+      <p:sp>
+        <p:nvSpPr>
           <p:cNvPr id="4" name="TextBox 3">
             <a:extLst>
               <a:ext uri="{FF2B5EF4-FFF2-40B4-BE49-F238E27FC236}">
@@ -6400,8 +6500,8 @@
         </p:nvSpPr>
         <p:spPr>
           <a:xfrm>
-            <a:off x="816901" y="1878618"/>
-            <a:ext cx="2576360" cy="1550382"/>
+            <a:off x="3810472" y="1987474"/>
+            <a:ext cx="2576360" cy="1746325"/>
           </a:xfrm>
           <a:prstGeom prst="rect">
             <a:avLst/>
@@ -6436,7 +6536,7 @@
             <a:endParaRPr lang="en-US" sz="1200" dirty="0"/>
           </a:p>
           <a:p>
-            <a:pPr marL="171450" indent="-171450">
+            <a:pPr marL="314325" lvl="1" indent="-163513">
               <a:buFont typeface="Arial" panose="020B0604020202020204" pitchFamily="34" charset="0"/>
               <a:buChar char="•"/>
             </a:pPr>
@@ -6460,6 +6560,16 @@
               <a:t>PepitoDisguiseCreated</a:t>
             </a:r>
             <a:endParaRPr lang="en-US" sz="1200" dirty="0"/>
+          </a:p>
+          <a:p>
+            <a:pPr marL="628650" lvl="1" indent="-171450">
+              <a:buFont typeface="Arial" panose="020B0604020202020204" pitchFamily="34" charset="0"/>
+              <a:buChar char="•"/>
+            </a:pPr>
+            <a:r>
+              <a:rPr lang="en-US" sz="1200" dirty="0"/>
+              <a:t>store the disguise</a:t>
+            </a:r>
           </a:p>
           <a:p>
             <a:pPr marL="171450" indent="-171450">
@@ -6543,7 +6653,7 @@
         </p:nvSpPr>
         <p:spPr>
           <a:xfrm>
-            <a:off x="3450769" y="2762028"/>
+            <a:off x="6444340" y="2870885"/>
             <a:ext cx="555171" cy="191936"/>
           </a:xfrm>
           <a:prstGeom prst="rect">
@@ -6576,13 +6686,14 @@
           <p:cNvCxnSpPr>
             <a:cxnSpLocks/>
             <a:stCxn id="36" idx="3"/>
+            <a:endCxn id="11" idx="1"/>
           </p:cNvCxnSpPr>
           <p:nvPr/>
         </p:nvCxnSpPr>
         <p:spPr>
-          <a:xfrm flipV="1">
-            <a:off x="2473070" y="2079321"/>
-            <a:ext cx="2164301" cy="388610"/>
+          <a:xfrm>
+            <a:off x="2204054" y="2187654"/>
+            <a:ext cx="1817120" cy="178250"/>
           </a:xfrm>
           <a:prstGeom prst="bentConnector3">
             <a:avLst>
@@ -6622,7 +6733,7 @@
         </p:nvSpPr>
         <p:spPr>
           <a:xfrm>
-            <a:off x="1917899" y="2372531"/>
+            <a:off x="1648883" y="2092254"/>
             <a:ext cx="555171" cy="190800"/>
           </a:xfrm>
           <a:prstGeom prst="rect">
@@ -6660,8 +6771,8 @@
         </p:nvSpPr>
         <p:spPr>
           <a:xfrm>
-            <a:off x="4694879" y="1878618"/>
-            <a:ext cx="2164301" cy="2976411"/>
+            <a:off x="7394536" y="1987475"/>
+            <a:ext cx="2164301" cy="3248554"/>
           </a:xfrm>
           <a:prstGeom prst="rect">
             <a:avLst/>
@@ -6747,6 +6858,17 @@
             </a:pPr>
             <a:r>
               <a:rPr lang="en-US" sz="1200" dirty="0" err="1"/>
+              <a:t>setFacialHairColor</a:t>
+            </a:r>
+            <a:endParaRPr lang="en-US" sz="1200" dirty="0"/>
+          </a:p>
+          <a:p>
+            <a:pPr marL="171450" indent="-171450">
+              <a:buFont typeface="Arial" panose="020B0604020202020204" pitchFamily="34" charset="0"/>
+              <a:buChar char="•"/>
+            </a:pPr>
+            <a:r>
+              <a:rPr lang="en-US" sz="1200" dirty="0" err="1"/>
               <a:t>setClotheType</a:t>
             </a:r>
             <a:endParaRPr lang="en-US" sz="1200" dirty="0"/>
@@ -6845,6 +6967,407 @@
               <a:buChar char="•"/>
             </a:pPr>
             <a:endParaRPr lang="en-US" sz="1200" dirty="0"/>
+          </a:p>
+        </p:txBody>
+      </p:sp>
+      <p:sp>
+        <p:nvSpPr>
+          <p:cNvPr id="11" name="TextBox 10">
+            <a:extLst>
+              <a:ext uri="{FF2B5EF4-FFF2-40B4-BE49-F238E27FC236}">
+                <a16:creationId xmlns:a16="http://schemas.microsoft.com/office/drawing/2014/main" id="{A15FEBCE-E31D-FF46-B8C5-98C821A1D48E}"/>
+              </a:ext>
+            </a:extLst>
+          </p:cNvPr>
+          <p:cNvSpPr txBox="1"/>
+          <p:nvPr/>
+        </p:nvSpPr>
+        <p:spPr>
+          <a:xfrm>
+            <a:off x="4021174" y="2270504"/>
+            <a:ext cx="555171" cy="190800"/>
+          </a:xfrm>
+          <a:prstGeom prst="rect">
+            <a:avLst/>
+          </a:prstGeom>
+          <a:noFill/>
+          <a:ln>
+            <a:noFill/>
+          </a:ln>
+        </p:spPr>
+        <p:txBody>
+          <a:bodyPr wrap="square" tIns="3600" bIns="3600" rtlCol="0">
+            <a:spAutoFit/>
+          </a:bodyPr>
+          <a:lstStyle/>
+          <a:p>
+            <a:r>
+              <a:rPr lang="en-LU" sz="1200" dirty="0"/>
+              <a:t> </a:t>
+            </a:r>
+          </a:p>
+        </p:txBody>
+      </p:sp>
+      <p:cxnSp>
+        <p:nvCxnSpPr>
+          <p:cNvPr id="12" name="Elbow Connector 11">
+            <a:extLst>
+              <a:ext uri="{FF2B5EF4-FFF2-40B4-BE49-F238E27FC236}">
+                <a16:creationId xmlns:a16="http://schemas.microsoft.com/office/drawing/2014/main" id="{22FDB98B-0B11-6F49-B71A-827B98D8CB91}"/>
+              </a:ext>
+            </a:extLst>
+          </p:cNvPr>
+          <p:cNvCxnSpPr>
+            <a:cxnSpLocks/>
+            <a:stCxn id="13" idx="3"/>
+            <a:endCxn id="14" idx="1"/>
+          </p:cNvCxnSpPr>
+          <p:nvPr/>
+        </p:nvCxnSpPr>
+        <p:spPr>
+          <a:xfrm>
+            <a:off x="2149626" y="2340054"/>
+            <a:ext cx="1817120" cy="591908"/>
+          </a:xfrm>
+          <a:prstGeom prst="bentConnector3">
+            <a:avLst>
+              <a:gd name="adj1" fmla="val 50000"/>
+            </a:avLst>
+          </a:prstGeom>
+          <a:ln>
+            <a:tailEnd type="triangle"/>
+          </a:ln>
+        </p:spPr>
+        <p:style>
+          <a:lnRef idx="1">
+            <a:schemeClr val="accent1"/>
+          </a:lnRef>
+          <a:fillRef idx="0">
+            <a:schemeClr val="accent1"/>
+          </a:fillRef>
+          <a:effectRef idx="0">
+            <a:schemeClr val="accent1"/>
+          </a:effectRef>
+          <a:fontRef idx="minor">
+            <a:schemeClr val="tx1"/>
+          </a:fontRef>
+        </p:style>
+      </p:cxnSp>
+      <p:sp>
+        <p:nvSpPr>
+          <p:cNvPr id="13" name="TextBox 12">
+            <a:extLst>
+              <a:ext uri="{FF2B5EF4-FFF2-40B4-BE49-F238E27FC236}">
+                <a16:creationId xmlns:a16="http://schemas.microsoft.com/office/drawing/2014/main" id="{7E4AA269-B755-A04C-8512-76B993CA2D5B}"/>
+              </a:ext>
+            </a:extLst>
+          </p:cNvPr>
+          <p:cNvSpPr txBox="1"/>
+          <p:nvPr/>
+        </p:nvSpPr>
+        <p:spPr>
+          <a:xfrm>
+            <a:off x="1594455" y="2244654"/>
+            <a:ext cx="555171" cy="190800"/>
+          </a:xfrm>
+          <a:prstGeom prst="rect">
+            <a:avLst/>
+          </a:prstGeom>
+          <a:noFill/>
+          <a:ln>
+            <a:noFill/>
+          </a:ln>
+        </p:spPr>
+        <p:txBody>
+          <a:bodyPr wrap="square" tIns="3600" bIns="3600" rtlCol="0">
+            <a:spAutoFit/>
+          </a:bodyPr>
+          <a:lstStyle/>
+          <a:p>
+            <a:r>
+              <a:rPr lang="en-LU" sz="1200" dirty="0"/>
+              <a:t> </a:t>
+            </a:r>
+          </a:p>
+        </p:txBody>
+      </p:sp>
+      <p:sp>
+        <p:nvSpPr>
+          <p:cNvPr id="14" name="TextBox 13">
+            <a:extLst>
+              <a:ext uri="{FF2B5EF4-FFF2-40B4-BE49-F238E27FC236}">
+                <a16:creationId xmlns:a16="http://schemas.microsoft.com/office/drawing/2014/main" id="{D6995526-ECF9-4E40-B3C1-BE653F0D00D2}"/>
+              </a:ext>
+            </a:extLst>
+          </p:cNvPr>
+          <p:cNvSpPr txBox="1"/>
+          <p:nvPr/>
+        </p:nvSpPr>
+        <p:spPr>
+          <a:xfrm>
+            <a:off x="3966746" y="2836562"/>
+            <a:ext cx="555171" cy="190800"/>
+          </a:xfrm>
+          <a:prstGeom prst="rect">
+            <a:avLst/>
+          </a:prstGeom>
+          <a:noFill/>
+          <a:ln>
+            <a:noFill/>
+          </a:ln>
+        </p:spPr>
+        <p:txBody>
+          <a:bodyPr wrap="square" tIns="3600" bIns="3600" rtlCol="0">
+            <a:spAutoFit/>
+          </a:bodyPr>
+          <a:lstStyle/>
+          <a:p>
+            <a:r>
+              <a:rPr lang="en-LU" sz="1200" dirty="0"/>
+              <a:t> </a:t>
+            </a:r>
+          </a:p>
+        </p:txBody>
+      </p:sp>
+      <p:cxnSp>
+        <p:nvCxnSpPr>
+          <p:cNvPr id="15" name="Elbow Connector 14">
+            <a:extLst>
+              <a:ext uri="{FF2B5EF4-FFF2-40B4-BE49-F238E27FC236}">
+                <a16:creationId xmlns:a16="http://schemas.microsoft.com/office/drawing/2014/main" id="{1546E230-A7F0-C146-B7D9-EF3B308431BE}"/>
+              </a:ext>
+            </a:extLst>
+          </p:cNvPr>
+          <p:cNvCxnSpPr>
+            <a:cxnSpLocks/>
+            <a:stCxn id="16" idx="3"/>
+            <a:endCxn id="17" idx="1"/>
+          </p:cNvCxnSpPr>
+          <p:nvPr/>
+        </p:nvCxnSpPr>
+        <p:spPr>
+          <a:xfrm>
+            <a:off x="5746984" y="2921463"/>
+            <a:ext cx="1871550" cy="1647818"/>
+          </a:xfrm>
+          <a:prstGeom prst="bentConnector3">
+            <a:avLst>
+              <a:gd name="adj1" fmla="val 50000"/>
+            </a:avLst>
+          </a:prstGeom>
+          <a:ln>
+            <a:tailEnd type="triangle"/>
+          </a:ln>
+        </p:spPr>
+        <p:style>
+          <a:lnRef idx="1">
+            <a:schemeClr val="accent1"/>
+          </a:lnRef>
+          <a:fillRef idx="0">
+            <a:schemeClr val="accent1"/>
+          </a:fillRef>
+          <a:effectRef idx="0">
+            <a:schemeClr val="accent1"/>
+          </a:effectRef>
+          <a:fontRef idx="minor">
+            <a:schemeClr val="tx1"/>
+          </a:fontRef>
+        </p:style>
+      </p:cxnSp>
+      <p:sp>
+        <p:nvSpPr>
+          <p:cNvPr id="16" name="TextBox 15">
+            <a:extLst>
+              <a:ext uri="{FF2B5EF4-FFF2-40B4-BE49-F238E27FC236}">
+                <a16:creationId xmlns:a16="http://schemas.microsoft.com/office/drawing/2014/main" id="{C939F01A-4342-064F-B817-D94A33B8A8B3}"/>
+              </a:ext>
+            </a:extLst>
+          </p:cNvPr>
+          <p:cNvSpPr txBox="1"/>
+          <p:nvPr/>
+        </p:nvSpPr>
+        <p:spPr>
+          <a:xfrm>
+            <a:off x="5191813" y="2826063"/>
+            <a:ext cx="555171" cy="190800"/>
+          </a:xfrm>
+          <a:prstGeom prst="rect">
+            <a:avLst/>
+          </a:prstGeom>
+          <a:noFill/>
+          <a:ln>
+            <a:noFill/>
+          </a:ln>
+        </p:spPr>
+        <p:txBody>
+          <a:bodyPr wrap="square" tIns="3600" bIns="3600" rtlCol="0">
+            <a:spAutoFit/>
+          </a:bodyPr>
+          <a:lstStyle/>
+          <a:p>
+            <a:r>
+              <a:rPr lang="en-LU" sz="1200" dirty="0"/>
+              <a:t> </a:t>
+            </a:r>
+          </a:p>
+        </p:txBody>
+      </p:sp>
+      <p:sp>
+        <p:nvSpPr>
+          <p:cNvPr id="17" name="TextBox 16">
+            <a:extLst>
+              <a:ext uri="{FF2B5EF4-FFF2-40B4-BE49-F238E27FC236}">
+                <a16:creationId xmlns:a16="http://schemas.microsoft.com/office/drawing/2014/main" id="{6A0F0AF8-6B93-A842-AF27-E632023B4B25}"/>
+              </a:ext>
+            </a:extLst>
+          </p:cNvPr>
+          <p:cNvSpPr txBox="1"/>
+          <p:nvPr/>
+        </p:nvSpPr>
+        <p:spPr>
+          <a:xfrm>
+            <a:off x="7618534" y="4473881"/>
+            <a:ext cx="555171" cy="190800"/>
+          </a:xfrm>
+          <a:prstGeom prst="rect">
+            <a:avLst/>
+          </a:prstGeom>
+          <a:noFill/>
+          <a:ln>
+            <a:noFill/>
+          </a:ln>
+        </p:spPr>
+        <p:txBody>
+          <a:bodyPr wrap="square" tIns="3600" bIns="3600" rtlCol="0">
+            <a:spAutoFit/>
+          </a:bodyPr>
+          <a:lstStyle/>
+          <a:p>
+            <a:r>
+              <a:rPr lang="en-LU" sz="1200" dirty="0"/>
+              <a:t> </a:t>
+            </a:r>
+          </a:p>
+        </p:txBody>
+      </p:sp>
+      <p:cxnSp>
+        <p:nvCxnSpPr>
+          <p:cNvPr id="18" name="Elbow Connector 17">
+            <a:extLst>
+              <a:ext uri="{FF2B5EF4-FFF2-40B4-BE49-F238E27FC236}">
+                <a16:creationId xmlns:a16="http://schemas.microsoft.com/office/drawing/2014/main" id="{5BB51DD2-54FB-164A-9A51-CDB32532D59F}"/>
+              </a:ext>
+            </a:extLst>
+          </p:cNvPr>
+          <p:cNvCxnSpPr>
+            <a:cxnSpLocks/>
+            <a:stCxn id="19" idx="3"/>
+            <a:endCxn id="20" idx="1"/>
+          </p:cNvCxnSpPr>
+          <p:nvPr/>
+        </p:nvCxnSpPr>
+        <p:spPr>
+          <a:xfrm>
+            <a:off x="5268012" y="3106521"/>
+            <a:ext cx="2361407" cy="1647818"/>
+          </a:xfrm>
+          <a:prstGeom prst="bentConnector3">
+            <a:avLst>
+              <a:gd name="adj1" fmla="val 50000"/>
+            </a:avLst>
+          </a:prstGeom>
+          <a:ln>
+            <a:tailEnd type="triangle"/>
+          </a:ln>
+        </p:spPr>
+        <p:style>
+          <a:lnRef idx="1">
+            <a:schemeClr val="accent1"/>
+          </a:lnRef>
+          <a:fillRef idx="0">
+            <a:schemeClr val="accent1"/>
+          </a:fillRef>
+          <a:effectRef idx="0">
+            <a:schemeClr val="accent1"/>
+          </a:effectRef>
+          <a:fontRef idx="minor">
+            <a:schemeClr val="tx1"/>
+          </a:fontRef>
+        </p:style>
+      </p:cxnSp>
+      <p:sp>
+        <p:nvSpPr>
+          <p:cNvPr id="19" name="TextBox 18">
+            <a:extLst>
+              <a:ext uri="{FF2B5EF4-FFF2-40B4-BE49-F238E27FC236}">
+                <a16:creationId xmlns:a16="http://schemas.microsoft.com/office/drawing/2014/main" id="{439A4BB9-E94D-7F4B-BD63-97B8769028A9}"/>
+              </a:ext>
+            </a:extLst>
+          </p:cNvPr>
+          <p:cNvSpPr txBox="1"/>
+          <p:nvPr/>
+        </p:nvSpPr>
+        <p:spPr>
+          <a:xfrm>
+            <a:off x="4712841" y="3011121"/>
+            <a:ext cx="555171" cy="190800"/>
+          </a:xfrm>
+          <a:prstGeom prst="rect">
+            <a:avLst/>
+          </a:prstGeom>
+          <a:noFill/>
+          <a:ln>
+            <a:noFill/>
+          </a:ln>
+        </p:spPr>
+        <p:txBody>
+          <a:bodyPr wrap="square" tIns="3600" bIns="3600" rtlCol="0">
+            <a:spAutoFit/>
+          </a:bodyPr>
+          <a:lstStyle/>
+          <a:p>
+            <a:r>
+              <a:rPr lang="en-LU" sz="1200" dirty="0"/>
+              <a:t> </a:t>
+            </a:r>
+          </a:p>
+        </p:txBody>
+      </p:sp>
+      <p:sp>
+        <p:nvSpPr>
+          <p:cNvPr id="20" name="TextBox 19">
+            <a:extLst>
+              <a:ext uri="{FF2B5EF4-FFF2-40B4-BE49-F238E27FC236}">
+                <a16:creationId xmlns:a16="http://schemas.microsoft.com/office/drawing/2014/main" id="{779F4CD5-DC65-654A-8E8E-2A85E5A5FF5D}"/>
+              </a:ext>
+            </a:extLst>
+          </p:cNvPr>
+          <p:cNvSpPr txBox="1"/>
+          <p:nvPr/>
+        </p:nvSpPr>
+        <p:spPr>
+          <a:xfrm>
+            <a:off x="7629419" y="4658939"/>
+            <a:ext cx="555171" cy="190800"/>
+          </a:xfrm>
+          <a:prstGeom prst="rect">
+            <a:avLst/>
+          </a:prstGeom>
+          <a:noFill/>
+          <a:ln>
+            <a:noFill/>
+          </a:ln>
+        </p:spPr>
+        <p:txBody>
+          <a:bodyPr wrap="square" tIns="3600" bIns="3600" rtlCol="0">
+            <a:spAutoFit/>
+          </a:bodyPr>
+          <a:lstStyle/>
+          <a:p>
+            <a:r>
+              <a:rPr lang="en-LU" sz="1200" dirty="0"/>
+              <a:t> </a:t>
+            </a:r>
           </a:p>
         </p:txBody>
       </p:sp>
@@ -7678,8 +8201,8 @@
         </p:nvSpPr>
         <p:spPr>
           <a:xfrm>
-            <a:off x="815416" y="1029531"/>
-            <a:ext cx="3694509" cy="2170869"/>
+            <a:off x="815416" y="953329"/>
+            <a:ext cx="3694509" cy="2399469"/>
           </a:xfrm>
           <a:prstGeom prst="rect">
             <a:avLst/>
@@ -7743,10 +8266,14 @@
             <a:pPr marL="171450" indent="-171450">
               <a:buFont typeface="Arial" panose="020B0604020202020204" pitchFamily="34" charset="0"/>
               <a:buChar char="•"/>
+              <a:tabLst>
+                <a:tab pos="531813" algn="l"/>
+                <a:tab pos="704850" algn="l"/>
+              </a:tabLst>
             </a:pPr>
             <a:r>
               <a:rPr lang="en-US" sz="1200" dirty="0" err="1"/>
-              <a:t>connectB</a:t>
+              <a:t>connectedB</a:t>
             </a:r>
             <a:r>
               <a:rPr lang="en-US" sz="1200" dirty="0"/>
@@ -7754,7 +8281,30 @@
             </a:r>
             <a:r>
               <a:rPr lang="en-US" sz="1200" dirty="0" err="1"/>
-              <a:t>pepitoContract</a:t>
+              <a:t>pepitoInstance</a:t>
+            </a:r>
+            <a:r>
+              <a:rPr lang="en-US" sz="1200" dirty="0"/>
+              <a:t>,</a:t>
+            </a:r>
+            <a:br>
+              <a:rPr lang="en-US" sz="1200" dirty="0"/>
+            </a:br>
+            <a:r>
+              <a:rPr lang="en-US" sz="1200" dirty="0"/>
+              <a:t>	</a:t>
+            </a:r>
+            <a:r>
+              <a:rPr lang="en-US" sz="1200" dirty="0" err="1"/>
+              <a:t>pepitoAddress</a:t>
+            </a:r>
+            <a:r>
+              <a:rPr lang="en-US" sz="1200" dirty="0"/>
+              <a:t>, web3connected, </a:t>
+            </a:r>
+            <a:r>
+              <a:rPr lang="en-US" sz="1200" dirty="0" err="1"/>
+              <a:t>ownerPepito</a:t>
             </a:r>
             <a:r>
               <a:rPr lang="en-US" sz="1200" dirty="0"/>
@@ -7765,6 +8315,9 @@
             <a:pPr marL="314325" lvl="1" indent="-163513">
               <a:buFont typeface="Arial" panose="020B0604020202020204" pitchFamily="34" charset="0"/>
               <a:buChar char="•"/>
+              <a:tabLst>
+                <a:tab pos="531813" algn="l"/>
+              </a:tabLst>
             </a:pPr>
             <a:r>
               <a:rPr lang="en-US" sz="1200" dirty="0" err="1"/>
@@ -7776,7 +8329,7 @@
             </a:r>
             <a:r>
               <a:rPr lang="en-US" sz="1200" dirty="0" err="1"/>
-              <a:t>pepitoContract</a:t>
+              <a:t>pepitoInstance</a:t>
             </a:r>
             <a:r>
               <a:rPr lang="en-US" sz="1200" dirty="0"/>
@@ -7784,21 +8337,21 @@
             </a:r>
             <a:r>
               <a:rPr lang="en-US" sz="1200" dirty="0" err="1"/>
-              <a:t>pepitoContract</a:t>
+              <a:t>pepitoInstance</a:t>
             </a:r>
             <a:br>
               <a:rPr lang="en-US" sz="1200" dirty="0"/>
             </a:br>
             <a:r>
               <a:rPr lang="en-US" sz="1200" dirty="0"/>
-              <a:t>	web3: web3,</a:t>
+              <a:t>	web3: web3, accounts: accounts,</a:t>
             </a:r>
             <a:br>
               <a:rPr lang="en-US" sz="1200" dirty="0"/>
             </a:br>
             <a:r>
               <a:rPr lang="en-US" sz="1200" dirty="0"/>
-              <a:t>	accounts: accounts})</a:t>
+              <a:t>	etc.})</a:t>
             </a:r>
           </a:p>
           <a:p>
@@ -7849,7 +8402,7 @@
             </a:br>
             <a:r>
               <a:rPr lang="en-US" sz="1200" dirty="0" err="1"/>
-              <a:t>connectB</a:t>
+              <a:t>connectedB</a:t>
             </a:r>
             <a:r>
               <a:rPr lang="en-US" sz="1200" dirty="0"/>
@@ -7857,7 +8410,7 @@
             </a:r>
             <a:r>
               <a:rPr lang="en-US" sz="1200" dirty="0" err="1"/>
-              <a:t>this.connectB</a:t>
+              <a:t>this.connectedB</a:t>
             </a:r>
             <a:r>
               <a:rPr lang="en-US" sz="1200" dirty="0"/>
@@ -7894,8 +8447,8 @@
         </p:nvCxnSpPr>
         <p:spPr>
           <a:xfrm flipV="1">
-            <a:off x="4248610" y="1056823"/>
-            <a:ext cx="1418596" cy="1632825"/>
+            <a:off x="4248610" y="1145208"/>
+            <a:ext cx="1418596" cy="1664185"/>
           </a:xfrm>
           <a:prstGeom prst="bentConnector3">
             <a:avLst>
@@ -7971,7 +8524,7 @@
             <a:endParaRPr lang="en-US" sz="1200" dirty="0"/>
           </a:p>
           <a:p>
-            <a:pPr marL="628650" lvl="1" indent="-171450">
+            <a:pPr marL="314325" lvl="1" indent="-163513">
               <a:buFont typeface="Arial" panose="020B0604020202020204" pitchFamily="34" charset="0"/>
               <a:buChar char="•"/>
             </a:pPr>
@@ -7981,7 +8534,7 @@
             </a:r>
           </a:p>
           <a:p>
-            <a:pPr marL="628650" lvl="1" indent="-171450">
+            <a:pPr marL="314325" lvl="1" indent="-163513">
               <a:buFont typeface="Arial" panose="020B0604020202020204" pitchFamily="34" charset="0"/>
               <a:buChar char="•"/>
             </a:pPr>
@@ -8018,10 +8571,9 @@
               <a:t>this.fillDisguise</a:t>
             </a:r>
             <a:r>
-              <a:rPr lang="en-US" sz="1200"/>
+              <a:rPr lang="en-US" sz="1200" dirty="0"/>
               <a:t> /&gt;</a:t>
             </a:r>
-            <a:endParaRPr lang="en-US" sz="1200" dirty="0"/>
           </a:p>
           <a:p>
             <a:pPr marL="314325" lvl="1" indent="-163513">
@@ -8049,7 +8601,7 @@
         </p:nvSpPr>
         <p:spPr>
           <a:xfrm>
-            <a:off x="3693439" y="2594248"/>
+            <a:off x="3693439" y="2713993"/>
             <a:ext cx="555171" cy="190800"/>
           </a:xfrm>
           <a:prstGeom prst="rect">
@@ -8087,8 +8639,8 @@
         </p:nvSpPr>
         <p:spPr>
           <a:xfrm>
-            <a:off x="5667206" y="524332"/>
-            <a:ext cx="4271451" cy="1064982"/>
+            <a:off x="5667206" y="524331"/>
+            <a:ext cx="4271451" cy="1241753"/>
           </a:xfrm>
           <a:prstGeom prst="rect">
             <a:avLst/>
@@ -8167,7 +8719,7 @@
             </a:r>
             <a:r>
               <a:rPr lang="en-US" sz="1200" dirty="0" err="1"/>
-              <a:t>connectB</a:t>
+              <a:t>connectedB</a:t>
             </a:r>
             <a:r>
               <a:rPr lang="en-US" sz="1200" dirty="0"/>
@@ -8175,7 +8727,7 @@
             </a:r>
             <a:r>
               <a:rPr lang="en-US" sz="1200" dirty="0" err="1"/>
-              <a:t>this.props.connectB</a:t>
+              <a:t>this.props.connectedB</a:t>
             </a:r>
             <a:r>
               <a:rPr lang="en-US" sz="1200" dirty="0"/>
@@ -8396,7 +8948,7 @@
               <a:gd name="adj2" fmla="val 106068"/>
             </a:avLst>
           </a:prstGeom>
-          <a:ln w="12700">
+          <a:ln w="19050">
             <a:tailEnd type="triangle"/>
           </a:ln>
         </p:spPr>
@@ -8430,7 +8982,7 @@
         <p:spPr>
           <a:xfrm>
             <a:off x="7023242" y="3637167"/>
-            <a:ext cx="4112843" cy="1479116"/>
+            <a:ext cx="4232587" cy="1479116"/>
           </a:xfrm>
           <a:prstGeom prst="rect">
             <a:avLst/>
@@ -8482,7 +9034,7 @@
             </a:pPr>
             <a:r>
               <a:rPr lang="en-US" sz="1200" dirty="0" err="1"/>
-              <a:t>this.props.connectB</a:t>
+              <a:t>this.props.connectedB</a:t>
             </a:r>
             <a:r>
               <a:rPr lang="en-US" sz="1200" dirty="0"/>
@@ -8490,12 +9042,9 @@
             </a:r>
             <a:r>
               <a:rPr lang="en-US" sz="1200" dirty="0" err="1"/>
-              <a:t>pepitoContract</a:t>
-            </a:r>
-            <a:r>
-              <a:rPr lang="en-US" sz="1200" dirty="0"/>
-              <a:t>) </a:t>
-            </a:r>
+              <a:t>pepitoInstance</a:t>
+            </a:r>
+            <a:endParaRPr lang="en-US" sz="1200" dirty="0"/>
           </a:p>
           <a:p>
             <a:pPr marL="171450" indent="-171450">
@@ -8518,15 +9067,7 @@
             </a:r>
             <a:r>
               <a:rPr lang="en-US" sz="1200" dirty="0" err="1"/>
-              <a:t>this</a:t>
-            </a:r>
-            <a:r>
-              <a:rPr lang="en-US" sz="1200" err="1"/>
-              <a:t>.</a:t>
-            </a:r>
-            <a:r>
-              <a:rPr lang="en-US" sz="1200"/>
-              <a:t>makePepito</a:t>
+              <a:t>this.makePepito</a:t>
             </a:r>
             <a:r>
               <a:rPr lang="en-US" sz="1200" dirty="0"/>
@@ -8730,6 +9271,7 @@
             </a:avLst>
           </a:prstGeom>
           <a:ln w="12700">
+            <a:prstDash val="lgDash"/>
             <a:tailEnd type="triangle"/>
           </a:ln>
         </p:spPr>
@@ -9000,7 +9542,7 @@
                   <a:srgbClr val="980000"/>
                 </a:solidFill>
               </a:rPr>
-              <a:t>Another design to clean App (2)</a:t>
+              <a:t>Same design to clean App (2)</a:t>
             </a:r>
           </a:p>
         </p:txBody>
@@ -9065,11 +9607,11 @@
             </a:pPr>
             <a:r>
               <a:rPr lang="en-US" sz="1200" dirty="0" err="1"/>
-              <a:t>this.disguise</a:t>
-            </a:r>
-            <a:r>
-              <a:rPr lang="en-US" sz="1200" dirty="0"/>
-              <a:t> = disguise;</a:t>
+              <a:t>this.setState</a:t>
+            </a:r>
+            <a:r>
+              <a:rPr lang="en-US" sz="1200" dirty="0"/>
+              <a:t>({disguise = disguise});</a:t>
             </a:r>
           </a:p>
           <a:p>
@@ -9142,7 +9684,7 @@
             </a:r>
             <a:r>
               <a:rPr lang="en-US" sz="1200" dirty="0" err="1"/>
-              <a:t>this.disguise</a:t>
+              <a:t>this.state.disguise</a:t>
             </a:r>
             <a:r>
               <a:rPr lang="en-US" sz="1200" dirty="0"/>
@@ -10498,7 +11040,7 @@
         <p:spPr>
           <a:xfrm>
             <a:off x="2987911" y="4724252"/>
-            <a:ext cx="3498073" cy="430887"/>
+            <a:ext cx="3924472" cy="430887"/>
           </a:xfrm>
           <a:prstGeom prst="rect">
             <a:avLst/>
@@ -10519,8 +11061,13 @@
             </a:r>
             <a:r>
               <a:rPr lang="en-US" sz="1100" dirty="0"/>
-              <a:t> is the address that has ETH</a:t>
-            </a:r>
+              <a:t> is the address that has ETH, sent to </a:t>
+            </a:r>
+            <a:r>
+              <a:rPr lang="en-US" sz="1100"/>
+              <a:t>pay transactions</a:t>
+            </a:r>
+            <a:endParaRPr lang="en-US" sz="1100" dirty="0"/>
           </a:p>
           <a:p>
             <a:r>
@@ -10529,7 +11076,7 @@
             </a:r>
             <a:r>
               <a:rPr lang="en-US" sz="1100" dirty="0"/>
-              <a:t> is only the disguise Factory, used to display</a:t>
+              <a:t> is only the disguise Factory, sent to display</a:t>
             </a:r>
             <a:endParaRPr lang="en-LU" sz="1100" dirty="0"/>
           </a:p>

</xml_diff>

<commit_message>
added retrieved 1st disguise
</commit_message>
<xml_diff>
--- a/Pepito/Final Project Design.pptx
+++ b/Pepito/Final Project Design.pptx
@@ -202,7 +202,7 @@
           <a:p>
             <a:fld id="{E3DEDAA8-261D-1A48-9864-3FC231515C43}" type="datetimeFigureOut">
               <a:rPr lang="en-LU" smtClean="0"/>
-              <a:t>17/01/2021</a:t>
+              <a:t>19/01/2021</a:t>
             </a:fld>
             <a:endParaRPr lang="en-LU"/>
           </a:p>
@@ -1039,7 +1039,7 @@
           <a:p>
             <a:fld id="{9ECEDF27-B25B-0343-A39C-1905A44EF111}" type="datetimeFigureOut">
               <a:rPr lang="en-LU" smtClean="0"/>
-              <a:t>17/01/2021</a:t>
+              <a:t>19/01/2021</a:t>
             </a:fld>
             <a:endParaRPr lang="en-LU"/>
           </a:p>
@@ -1239,7 +1239,7 @@
           <a:p>
             <a:fld id="{9ECEDF27-B25B-0343-A39C-1905A44EF111}" type="datetimeFigureOut">
               <a:rPr lang="en-LU" smtClean="0"/>
-              <a:t>17/01/2021</a:t>
+              <a:t>19/01/2021</a:t>
             </a:fld>
             <a:endParaRPr lang="en-LU"/>
           </a:p>
@@ -1449,7 +1449,7 @@
           <a:p>
             <a:fld id="{9ECEDF27-B25B-0343-A39C-1905A44EF111}" type="datetimeFigureOut">
               <a:rPr lang="en-LU" smtClean="0"/>
-              <a:t>17/01/2021</a:t>
+              <a:t>19/01/2021</a:t>
             </a:fld>
             <a:endParaRPr lang="en-LU"/>
           </a:p>
@@ -1649,7 +1649,7 @@
           <a:p>
             <a:fld id="{9ECEDF27-B25B-0343-A39C-1905A44EF111}" type="datetimeFigureOut">
               <a:rPr lang="en-LU" smtClean="0"/>
-              <a:t>17/01/2021</a:t>
+              <a:t>19/01/2021</a:t>
             </a:fld>
             <a:endParaRPr lang="en-LU"/>
           </a:p>
@@ -1925,7 +1925,7 @@
           <a:p>
             <a:fld id="{9ECEDF27-B25B-0343-A39C-1905A44EF111}" type="datetimeFigureOut">
               <a:rPr lang="en-LU" smtClean="0"/>
-              <a:t>17/01/2021</a:t>
+              <a:t>19/01/2021</a:t>
             </a:fld>
             <a:endParaRPr lang="en-LU"/>
           </a:p>
@@ -2193,7 +2193,7 @@
           <a:p>
             <a:fld id="{9ECEDF27-B25B-0343-A39C-1905A44EF111}" type="datetimeFigureOut">
               <a:rPr lang="en-LU" smtClean="0"/>
-              <a:t>17/01/2021</a:t>
+              <a:t>19/01/2021</a:t>
             </a:fld>
             <a:endParaRPr lang="en-LU"/>
           </a:p>
@@ -2608,7 +2608,7 @@
           <a:p>
             <a:fld id="{9ECEDF27-B25B-0343-A39C-1905A44EF111}" type="datetimeFigureOut">
               <a:rPr lang="en-LU" smtClean="0"/>
-              <a:t>17/01/2021</a:t>
+              <a:t>19/01/2021</a:t>
             </a:fld>
             <a:endParaRPr lang="en-LU"/>
           </a:p>
@@ -2750,7 +2750,7 @@
           <a:p>
             <a:fld id="{9ECEDF27-B25B-0343-A39C-1905A44EF111}" type="datetimeFigureOut">
               <a:rPr lang="en-LU" smtClean="0"/>
-              <a:t>17/01/2021</a:t>
+              <a:t>19/01/2021</a:t>
             </a:fld>
             <a:endParaRPr lang="en-LU"/>
           </a:p>
@@ -2863,7 +2863,7 @@
           <a:p>
             <a:fld id="{9ECEDF27-B25B-0343-A39C-1905A44EF111}" type="datetimeFigureOut">
               <a:rPr lang="en-LU" smtClean="0"/>
-              <a:t>17/01/2021</a:t>
+              <a:t>19/01/2021</a:t>
             </a:fld>
             <a:endParaRPr lang="en-LU"/>
           </a:p>
@@ -3176,7 +3176,7 @@
           <a:p>
             <a:fld id="{9ECEDF27-B25B-0343-A39C-1905A44EF111}" type="datetimeFigureOut">
               <a:rPr lang="en-LU" smtClean="0"/>
-              <a:t>17/01/2021</a:t>
+              <a:t>19/01/2021</a:t>
             </a:fld>
             <a:endParaRPr lang="en-LU"/>
           </a:p>
@@ -3465,7 +3465,7 @@
           <a:p>
             <a:fld id="{9ECEDF27-B25B-0343-A39C-1905A44EF111}" type="datetimeFigureOut">
               <a:rPr lang="en-LU" smtClean="0"/>
-              <a:t>17/01/2021</a:t>
+              <a:t>19/01/2021</a:t>
             </a:fld>
             <a:endParaRPr lang="en-LU"/>
           </a:p>
@@ -3708,7 +3708,7 @@
           <a:p>
             <a:fld id="{9ECEDF27-B25B-0343-A39C-1905A44EF111}" type="datetimeFigureOut">
               <a:rPr lang="en-LU" smtClean="0"/>
-              <a:t>17/01/2021</a:t>
+              <a:t>19/01/2021</a:t>
             </a:fld>
             <a:endParaRPr lang="en-LU"/>
           </a:p>
@@ -10837,7 +10837,7 @@
         <p:spPr>
           <a:xfrm>
             <a:off x="554171" y="1029531"/>
-            <a:ext cx="2439412" cy="2932869"/>
+            <a:ext cx="2439412" cy="3259440"/>
           </a:xfrm>
           <a:prstGeom prst="rect">
             <a:avLst/>
@@ -10952,6 +10952,16 @@
               <a:buChar char="•"/>
             </a:pPr>
             <a:r>
+              <a:rPr lang="en-US" sz="1200" dirty="0"/>
+              <a:t>web3</a:t>
+            </a:r>
+          </a:p>
+          <a:p>
+            <a:pPr marL="444500" lvl="1" indent="-163513">
+              <a:buFont typeface="Arial" panose="020B0604020202020204" pitchFamily="34" charset="0"/>
+              <a:buChar char="•"/>
+            </a:pPr>
+            <a:r>
               <a:rPr lang="en-US" sz="1200" dirty="0" err="1"/>
               <a:t>pepitoInstance</a:t>
             </a:r>
@@ -11004,6 +11014,27 @@
               <a:t>DisguiseRetrieve</a:t>
             </a:r>
             <a:endParaRPr lang="en-US" sz="1200" dirty="0"/>
+          </a:p>
+          <a:p>
+            <a:pPr marL="444500" lvl="1" indent="-163513">
+              <a:buFont typeface="Arial" panose="020B0604020202020204" pitchFamily="34" charset="0"/>
+              <a:buChar char="•"/>
+            </a:pPr>
+            <a:r>
+              <a:rPr lang="en-US" sz="1200" dirty="0" err="1"/>
+              <a:t>disguiseAddresses</a:t>
+            </a:r>
+            <a:endParaRPr lang="en-US" sz="1200" dirty="0"/>
+          </a:p>
+          <a:p>
+            <a:pPr marL="444500" lvl="1" indent="-163513">
+              <a:buFont typeface="Arial" panose="020B0604020202020204" pitchFamily="34" charset="0"/>
+              <a:buChar char="•"/>
+            </a:pPr>
+            <a:r>
+              <a:rPr lang="en-US" sz="1200" dirty="0"/>
+              <a:t>web3</a:t>
+            </a:r>
           </a:p>
           <a:p>
             <a:pPr marL="444500" lvl="1" indent="-163513">

</xml_diff>

<commit_message>
added test of tokenBalance after each readDisguise
</commit_message>
<xml_diff>
--- a/Pepito/Final Project Design.pptx
+++ b/Pepito/Final Project Design.pptx
@@ -5,15 +5,17 @@
     <p:sldMasterId id="2147483648" r:id="rId1"/>
   </p:sldMasterIdLst>
   <p:notesMasterIdLst>
-    <p:notesMasterId r:id="rId8"/>
+    <p:notesMasterId r:id="rId10"/>
   </p:notesMasterIdLst>
   <p:sldIdLst>
     <p:sldId id="256" r:id="rId2"/>
     <p:sldId id="263" r:id="rId3"/>
     <p:sldId id="265" r:id="rId4"/>
     <p:sldId id="267" r:id="rId5"/>
-    <p:sldId id="266" r:id="rId6"/>
-    <p:sldId id="268" r:id="rId7"/>
+    <p:sldId id="271" r:id="rId6"/>
+    <p:sldId id="266" r:id="rId7"/>
+    <p:sldId id="268" r:id="rId8"/>
+    <p:sldId id="269" r:id="rId9"/>
   </p:sldIdLst>
   <p:sldSz cx="12192000" cy="6858000"/>
   <p:notesSz cx="6858000" cy="9144000"/>
@@ -202,7 +204,7 @@
           <a:p>
             <a:fld id="{E3DEDAA8-261D-1A48-9864-3FC231515C43}" type="datetimeFigureOut">
               <a:rPr lang="en-LU" smtClean="0"/>
-              <a:t>19/01/2021</a:t>
+              <a:t>27/01/2021</a:t>
             </a:fld>
             <a:endParaRPr lang="en-LU"/>
           </a:p>
@@ -796,7 +798,7 @@
     </p:spTree>
     <p:extLst>
       <p:ext uri="{BB962C8B-B14F-4D97-AF65-F5344CB8AC3E}">
-        <p14:creationId xmlns:p14="http://schemas.microsoft.com/office/powerpoint/2010/main" val="2177741280"/>
+        <p14:creationId xmlns:p14="http://schemas.microsoft.com/office/powerpoint/2010/main" val="3763564367"/>
       </p:ext>
     </p:extLst>
   </p:cSld>
@@ -880,7 +882,175 @@
     </p:spTree>
     <p:extLst>
       <p:ext uri="{BB962C8B-B14F-4D97-AF65-F5344CB8AC3E}">
+        <p14:creationId xmlns:p14="http://schemas.microsoft.com/office/powerpoint/2010/main" val="2177741280"/>
+      </p:ext>
+    </p:extLst>
+  </p:cSld>
+  <p:clrMapOvr>
+    <a:masterClrMapping/>
+  </p:clrMapOvr>
+</p:notes>
+</file>
+
+<file path=ppt/notesSlides/notesSlide6.xml><?xml version="1.0" encoding="utf-8"?>
+<p:notes xmlns:a="http://schemas.openxmlformats.org/drawingml/2006/main" xmlns:r="http://schemas.openxmlformats.org/officeDocument/2006/relationships" xmlns:p="http://schemas.openxmlformats.org/presentationml/2006/main">
+  <p:cSld>
+    <p:spTree>
+      <p:nvGrpSpPr>
+        <p:cNvPr id="1" name=""/>
+        <p:cNvGrpSpPr/>
+        <p:nvPr/>
+      </p:nvGrpSpPr>
+      <p:grpSpPr>
+        <a:xfrm>
+          <a:off x="0" y="0"/>
+          <a:ext cx="0" cy="0"/>
+          <a:chOff x="0" y="0"/>
+          <a:chExt cx="0" cy="0"/>
+        </a:xfrm>
+      </p:grpSpPr>
+      <p:sp>
+        <p:nvSpPr>
+          <p:cNvPr id="2" name="Slide Image Placeholder 1"/>
+          <p:cNvSpPr>
+            <a:spLocks noGrp="1" noRot="1" noChangeAspect="1"/>
+          </p:cNvSpPr>
+          <p:nvPr>
+            <p:ph type="sldImg"/>
+          </p:nvPr>
+        </p:nvSpPr>
+        <p:spPr/>
+      </p:sp>
+      <p:sp>
+        <p:nvSpPr>
+          <p:cNvPr id="3" name="Notes Placeholder 2"/>
+          <p:cNvSpPr>
+            <a:spLocks noGrp="1"/>
+          </p:cNvSpPr>
+          <p:nvPr>
+            <p:ph type="body" idx="1"/>
+          </p:nvPr>
+        </p:nvSpPr>
+        <p:spPr/>
+        <p:txBody>
+          <a:bodyPr/>
+          <a:lstStyle/>
+          <a:p>
+            <a:endParaRPr lang="en-LU" dirty="0"/>
+          </a:p>
+        </p:txBody>
+      </p:sp>
+      <p:sp>
+        <p:nvSpPr>
+          <p:cNvPr id="4" name="Slide Number Placeholder 3"/>
+          <p:cNvSpPr>
+            <a:spLocks noGrp="1"/>
+          </p:cNvSpPr>
+          <p:nvPr>
+            <p:ph type="sldNum" sz="quarter" idx="5"/>
+          </p:nvPr>
+        </p:nvSpPr>
+        <p:spPr/>
+        <p:txBody>
+          <a:bodyPr/>
+          <a:lstStyle/>
+          <a:p>
+            <a:fld id="{F4E383B0-44CE-084D-AB54-AAB397A3DF4F}" type="slidenum">
+              <a:rPr lang="en-LU" smtClean="0"/>
+              <a:t>7</a:t>
+            </a:fld>
+            <a:endParaRPr lang="en-LU"/>
+          </a:p>
+        </p:txBody>
+      </p:sp>
+    </p:spTree>
+    <p:extLst>
+      <p:ext uri="{BB962C8B-B14F-4D97-AF65-F5344CB8AC3E}">
         <p14:creationId xmlns:p14="http://schemas.microsoft.com/office/powerpoint/2010/main" val="2319141580"/>
+      </p:ext>
+    </p:extLst>
+  </p:cSld>
+  <p:clrMapOvr>
+    <a:masterClrMapping/>
+  </p:clrMapOvr>
+</p:notes>
+</file>
+
+<file path=ppt/notesSlides/notesSlide7.xml><?xml version="1.0" encoding="utf-8"?>
+<p:notes xmlns:a="http://schemas.openxmlformats.org/drawingml/2006/main" xmlns:r="http://schemas.openxmlformats.org/officeDocument/2006/relationships" xmlns:p="http://schemas.openxmlformats.org/presentationml/2006/main">
+  <p:cSld>
+    <p:spTree>
+      <p:nvGrpSpPr>
+        <p:cNvPr id="1" name=""/>
+        <p:cNvGrpSpPr/>
+        <p:nvPr/>
+      </p:nvGrpSpPr>
+      <p:grpSpPr>
+        <a:xfrm>
+          <a:off x="0" y="0"/>
+          <a:ext cx="0" cy="0"/>
+          <a:chOff x="0" y="0"/>
+          <a:chExt cx="0" cy="0"/>
+        </a:xfrm>
+      </p:grpSpPr>
+      <p:sp>
+        <p:nvSpPr>
+          <p:cNvPr id="2" name="Slide Image Placeholder 1"/>
+          <p:cNvSpPr>
+            <a:spLocks noGrp="1" noRot="1" noChangeAspect="1"/>
+          </p:cNvSpPr>
+          <p:nvPr>
+            <p:ph type="sldImg"/>
+          </p:nvPr>
+        </p:nvSpPr>
+        <p:spPr/>
+      </p:sp>
+      <p:sp>
+        <p:nvSpPr>
+          <p:cNvPr id="3" name="Notes Placeholder 2"/>
+          <p:cNvSpPr>
+            <a:spLocks noGrp="1"/>
+          </p:cNvSpPr>
+          <p:nvPr>
+            <p:ph type="body" idx="1"/>
+          </p:nvPr>
+        </p:nvSpPr>
+        <p:spPr/>
+        <p:txBody>
+          <a:bodyPr/>
+          <a:lstStyle/>
+          <a:p>
+            <a:endParaRPr lang="en-LU" dirty="0"/>
+          </a:p>
+        </p:txBody>
+      </p:sp>
+      <p:sp>
+        <p:nvSpPr>
+          <p:cNvPr id="4" name="Slide Number Placeholder 3"/>
+          <p:cNvSpPr>
+            <a:spLocks noGrp="1"/>
+          </p:cNvSpPr>
+          <p:nvPr>
+            <p:ph type="sldNum" sz="quarter" idx="5"/>
+          </p:nvPr>
+        </p:nvSpPr>
+        <p:spPr/>
+        <p:txBody>
+          <a:bodyPr/>
+          <a:lstStyle/>
+          <a:p>
+            <a:fld id="{F4E383B0-44CE-084D-AB54-AAB397A3DF4F}" type="slidenum">
+              <a:rPr lang="en-LU" smtClean="0"/>
+              <a:t>8</a:t>
+            </a:fld>
+            <a:endParaRPr lang="en-LU"/>
+          </a:p>
+        </p:txBody>
+      </p:sp>
+    </p:spTree>
+    <p:extLst>
+      <p:ext uri="{BB962C8B-B14F-4D97-AF65-F5344CB8AC3E}">
+        <p14:creationId xmlns:p14="http://schemas.microsoft.com/office/powerpoint/2010/main" val="448282397"/>
       </p:ext>
     </p:extLst>
   </p:cSld>
@@ -1039,7 +1209,7 @@
           <a:p>
             <a:fld id="{9ECEDF27-B25B-0343-A39C-1905A44EF111}" type="datetimeFigureOut">
               <a:rPr lang="en-LU" smtClean="0"/>
-              <a:t>19/01/2021</a:t>
+              <a:t>27/01/2021</a:t>
             </a:fld>
             <a:endParaRPr lang="en-LU"/>
           </a:p>
@@ -1239,7 +1409,7 @@
           <a:p>
             <a:fld id="{9ECEDF27-B25B-0343-A39C-1905A44EF111}" type="datetimeFigureOut">
               <a:rPr lang="en-LU" smtClean="0"/>
-              <a:t>19/01/2021</a:t>
+              <a:t>27/01/2021</a:t>
             </a:fld>
             <a:endParaRPr lang="en-LU"/>
           </a:p>
@@ -1449,7 +1619,7 @@
           <a:p>
             <a:fld id="{9ECEDF27-B25B-0343-A39C-1905A44EF111}" type="datetimeFigureOut">
               <a:rPr lang="en-LU" smtClean="0"/>
-              <a:t>19/01/2021</a:t>
+              <a:t>27/01/2021</a:t>
             </a:fld>
             <a:endParaRPr lang="en-LU"/>
           </a:p>
@@ -1649,7 +1819,7 @@
           <a:p>
             <a:fld id="{9ECEDF27-B25B-0343-A39C-1905A44EF111}" type="datetimeFigureOut">
               <a:rPr lang="en-LU" smtClean="0"/>
-              <a:t>19/01/2021</a:t>
+              <a:t>27/01/2021</a:t>
             </a:fld>
             <a:endParaRPr lang="en-LU"/>
           </a:p>
@@ -1925,7 +2095,7 @@
           <a:p>
             <a:fld id="{9ECEDF27-B25B-0343-A39C-1905A44EF111}" type="datetimeFigureOut">
               <a:rPr lang="en-LU" smtClean="0"/>
-              <a:t>19/01/2021</a:t>
+              <a:t>27/01/2021</a:t>
             </a:fld>
             <a:endParaRPr lang="en-LU"/>
           </a:p>
@@ -2193,7 +2363,7 @@
           <a:p>
             <a:fld id="{9ECEDF27-B25B-0343-A39C-1905A44EF111}" type="datetimeFigureOut">
               <a:rPr lang="en-LU" smtClean="0"/>
-              <a:t>19/01/2021</a:t>
+              <a:t>27/01/2021</a:t>
             </a:fld>
             <a:endParaRPr lang="en-LU"/>
           </a:p>
@@ -2608,7 +2778,7 @@
           <a:p>
             <a:fld id="{9ECEDF27-B25B-0343-A39C-1905A44EF111}" type="datetimeFigureOut">
               <a:rPr lang="en-LU" smtClean="0"/>
-              <a:t>19/01/2021</a:t>
+              <a:t>27/01/2021</a:t>
             </a:fld>
             <a:endParaRPr lang="en-LU"/>
           </a:p>
@@ -2750,7 +2920,7 @@
           <a:p>
             <a:fld id="{9ECEDF27-B25B-0343-A39C-1905A44EF111}" type="datetimeFigureOut">
               <a:rPr lang="en-LU" smtClean="0"/>
-              <a:t>19/01/2021</a:t>
+              <a:t>27/01/2021</a:t>
             </a:fld>
             <a:endParaRPr lang="en-LU"/>
           </a:p>
@@ -2863,7 +3033,7 @@
           <a:p>
             <a:fld id="{9ECEDF27-B25B-0343-A39C-1905A44EF111}" type="datetimeFigureOut">
               <a:rPr lang="en-LU" smtClean="0"/>
-              <a:t>19/01/2021</a:t>
+              <a:t>27/01/2021</a:t>
             </a:fld>
             <a:endParaRPr lang="en-LU"/>
           </a:p>
@@ -3176,7 +3346,7 @@
           <a:p>
             <a:fld id="{9ECEDF27-B25B-0343-A39C-1905A44EF111}" type="datetimeFigureOut">
               <a:rPr lang="en-LU" smtClean="0"/>
-              <a:t>19/01/2021</a:t>
+              <a:t>27/01/2021</a:t>
             </a:fld>
             <a:endParaRPr lang="en-LU"/>
           </a:p>
@@ -3465,7 +3635,7 @@
           <a:p>
             <a:fld id="{9ECEDF27-B25B-0343-A39C-1905A44EF111}" type="datetimeFigureOut">
               <a:rPr lang="en-LU" smtClean="0"/>
-              <a:t>19/01/2021</a:t>
+              <a:t>27/01/2021</a:t>
             </a:fld>
             <a:endParaRPr lang="en-LU"/>
           </a:p>
@@ -3708,7 +3878,7 @@
           <a:p>
             <a:fld id="{9ECEDF27-B25B-0343-A39C-1905A44EF111}" type="datetimeFigureOut">
               <a:rPr lang="en-LU" smtClean="0"/>
-              <a:t>19/01/2021</a:t>
+              <a:t>27/01/2021</a:t>
             </a:fld>
             <a:endParaRPr lang="en-LU"/>
           </a:p>
@@ -9044,7 +9214,10 @@
               <a:rPr lang="en-US" sz="1200" dirty="0" err="1"/>
               <a:t>pepitoInstance</a:t>
             </a:r>
-            <a:endParaRPr lang="en-US" sz="1200" dirty="0"/>
+            <a:r>
+              <a:rPr lang="en-US" sz="1200" dirty="0"/>
+              <a:t>)</a:t>
+            </a:r>
           </a:p>
           <a:p>
             <a:pPr marL="171450" indent="-171450">
@@ -9521,6 +9694,1068 @@
         <p:spPr>
           <a:xfrm>
             <a:off x="620486" y="250372"/>
+            <a:ext cx="4767943" cy="594250"/>
+          </a:xfrm>
+          <a:prstGeom prst="rect">
+            <a:avLst/>
+          </a:prstGeom>
+          <a:solidFill>
+            <a:srgbClr val="E1EFD8"/>
+          </a:solidFill>
+        </p:spPr>
+        <p:txBody>
+          <a:bodyPr wrap="none" rtlCol="0" anchor="ctr" anchorCtr="0">
+            <a:noAutofit/>
+          </a:bodyPr>
+          <a:lstStyle/>
+          <a:p>
+            <a:r>
+              <a:rPr lang="en-US" b="1" dirty="0">
+                <a:solidFill>
+                  <a:srgbClr val="980000"/>
+                </a:solidFill>
+              </a:rPr>
+              <a:t>Deploying on testnet instead of ganache-truffle</a:t>
+            </a:r>
+          </a:p>
+        </p:txBody>
+      </p:sp>
+      <p:sp>
+        <p:nvSpPr>
+          <p:cNvPr id="9" name="TextBox 8">
+            <a:extLst>
+              <a:ext uri="{FF2B5EF4-FFF2-40B4-BE49-F238E27FC236}">
+                <a16:creationId xmlns:a16="http://schemas.microsoft.com/office/drawing/2014/main" id="{A648BA86-9C0C-0846-A8F7-877203CF605C}"/>
+              </a:ext>
+            </a:extLst>
+          </p:cNvPr>
+          <p:cNvSpPr txBox="1"/>
+          <p:nvPr/>
+        </p:nvSpPr>
+        <p:spPr>
+          <a:xfrm>
+            <a:off x="815416" y="1519388"/>
+            <a:ext cx="3694509" cy="1844300"/>
+          </a:xfrm>
+          <a:prstGeom prst="rect">
+            <a:avLst/>
+          </a:prstGeom>
+          <a:noFill/>
+          <a:ln>
+            <a:solidFill>
+              <a:schemeClr val="accent1"/>
+            </a:solidFill>
+          </a:ln>
+        </p:spPr>
+        <p:txBody>
+          <a:bodyPr wrap="none" rtlCol="0">
+            <a:noAutofit/>
+          </a:bodyPr>
+          <a:lstStyle/>
+          <a:p>
+            <a:r>
+              <a:rPr lang="en-US" sz="1600" dirty="0" err="1"/>
+              <a:t>App.js</a:t>
+            </a:r>
+            <a:endParaRPr lang="en-US" sz="1600" dirty="0"/>
+          </a:p>
+          <a:p>
+            <a:pPr marL="171450" indent="-171450">
+              <a:buFont typeface="Arial" panose="020B0604020202020204" pitchFamily="34" charset="0"/>
+              <a:buChar char="•"/>
+            </a:pPr>
+            <a:r>
+              <a:rPr lang="en-US" sz="1200" dirty="0"/>
+              <a:t>…</a:t>
+            </a:r>
+          </a:p>
+          <a:p>
+            <a:pPr marL="171450" indent="-171450">
+              <a:buFont typeface="Arial" panose="020B0604020202020204" pitchFamily="34" charset="0"/>
+              <a:buChar char="•"/>
+              <a:tabLst>
+                <a:tab pos="531813" algn="l"/>
+                <a:tab pos="704850" algn="l"/>
+              </a:tabLst>
+            </a:pPr>
+            <a:r>
+              <a:rPr lang="en-US" sz="1200" dirty="0" err="1"/>
+              <a:t>connectedB</a:t>
+            </a:r>
+            <a:r>
+              <a:rPr lang="en-US" sz="1200" dirty="0"/>
+              <a:t>)</a:t>
+            </a:r>
+          </a:p>
+          <a:p>
+            <a:pPr marL="171450" indent="-171450">
+              <a:buFont typeface="Arial" panose="020B0604020202020204" pitchFamily="34" charset="0"/>
+              <a:buChar char="•"/>
+            </a:pPr>
+            <a:r>
+              <a:rPr lang="en-US" sz="1200" dirty="0"/>
+              <a:t>Render() {return(…</a:t>
+            </a:r>
+          </a:p>
+          <a:p>
+            <a:pPr marL="314325" lvl="1" indent="-163513">
+              <a:buFont typeface="Arial" panose="020B0604020202020204" pitchFamily="34" charset="0"/>
+              <a:buChar char="•"/>
+            </a:pPr>
+            <a:r>
+              <a:rPr lang="en-US" sz="1200" dirty="0"/>
+              <a:t>&lt;</a:t>
+            </a:r>
+            <a:r>
+              <a:rPr lang="en-US" sz="1200" dirty="0" err="1"/>
+              <a:t>DisguiseControls</a:t>
+            </a:r>
+            <a:r>
+              <a:rPr lang="en-US" sz="1200" dirty="0"/>
+              <a:t> …  /&gt;</a:t>
+            </a:r>
+          </a:p>
+        </p:txBody>
+      </p:sp>
+      <p:cxnSp>
+        <p:nvCxnSpPr>
+          <p:cNvPr id="42" name="Elbow Connector 41">
+            <a:extLst>
+              <a:ext uri="{FF2B5EF4-FFF2-40B4-BE49-F238E27FC236}">
+                <a16:creationId xmlns:a16="http://schemas.microsoft.com/office/drawing/2014/main" id="{78DE0365-6BBA-4F46-A337-02674D3E8C46}"/>
+              </a:ext>
+            </a:extLst>
+          </p:cNvPr>
+          <p:cNvCxnSpPr>
+            <a:cxnSpLocks/>
+            <a:stCxn id="22" idx="3"/>
+            <a:endCxn id="29" idx="1"/>
+          </p:cNvCxnSpPr>
+          <p:nvPr/>
+        </p:nvCxnSpPr>
+        <p:spPr>
+          <a:xfrm flipV="1">
+            <a:off x="2652243" y="1451282"/>
+            <a:ext cx="2656116" cy="1045251"/>
+          </a:xfrm>
+          <a:prstGeom prst="bentConnector3">
+            <a:avLst>
+              <a:gd name="adj1" fmla="val 50000"/>
+            </a:avLst>
+          </a:prstGeom>
+          <a:ln w="12700">
+            <a:tailEnd type="triangle"/>
+          </a:ln>
+        </p:spPr>
+        <p:style>
+          <a:lnRef idx="1">
+            <a:schemeClr val="accent1"/>
+          </a:lnRef>
+          <a:fillRef idx="0">
+            <a:schemeClr val="accent1"/>
+          </a:fillRef>
+          <a:effectRef idx="0">
+            <a:schemeClr val="accent1"/>
+          </a:effectRef>
+          <a:fontRef idx="minor">
+            <a:schemeClr val="tx1"/>
+          </a:fontRef>
+        </p:style>
+      </p:cxnSp>
+      <p:sp>
+        <p:nvSpPr>
+          <p:cNvPr id="22" name="TextBox 21">
+            <a:extLst>
+              <a:ext uri="{FF2B5EF4-FFF2-40B4-BE49-F238E27FC236}">
+                <a16:creationId xmlns:a16="http://schemas.microsoft.com/office/drawing/2014/main" id="{F549962F-115E-1648-9637-7B6BADF704D2}"/>
+              </a:ext>
+            </a:extLst>
+          </p:cNvPr>
+          <p:cNvSpPr txBox="1"/>
+          <p:nvPr/>
+        </p:nvSpPr>
+        <p:spPr>
+          <a:xfrm>
+            <a:off x="2097072" y="2401133"/>
+            <a:ext cx="555171" cy="190800"/>
+          </a:xfrm>
+          <a:prstGeom prst="rect">
+            <a:avLst/>
+          </a:prstGeom>
+          <a:noFill/>
+          <a:ln>
+            <a:noFill/>
+          </a:ln>
+        </p:spPr>
+        <p:txBody>
+          <a:bodyPr wrap="square" tIns="3600" bIns="3600" rtlCol="0">
+            <a:spAutoFit/>
+          </a:bodyPr>
+          <a:lstStyle/>
+          <a:p>
+            <a:r>
+              <a:rPr lang="en-LU" sz="1200" dirty="0"/>
+              <a:t> </a:t>
+            </a:r>
+          </a:p>
+        </p:txBody>
+      </p:sp>
+      <p:sp>
+        <p:nvSpPr>
+          <p:cNvPr id="35" name="TextBox 34">
+            <a:extLst>
+              <a:ext uri="{FF2B5EF4-FFF2-40B4-BE49-F238E27FC236}">
+                <a16:creationId xmlns:a16="http://schemas.microsoft.com/office/drawing/2014/main" id="{A660BA33-E93C-8641-B622-DD3D8AA3C292}"/>
+              </a:ext>
+            </a:extLst>
+          </p:cNvPr>
+          <p:cNvSpPr txBox="1"/>
+          <p:nvPr/>
+        </p:nvSpPr>
+        <p:spPr>
+          <a:xfrm>
+            <a:off x="5275320" y="1308107"/>
+            <a:ext cx="2518851" cy="853064"/>
+          </a:xfrm>
+          <a:prstGeom prst="rect">
+            <a:avLst/>
+          </a:prstGeom>
+          <a:noFill/>
+          <a:ln>
+            <a:solidFill>
+              <a:schemeClr val="accent1"/>
+            </a:solidFill>
+          </a:ln>
+        </p:spPr>
+        <p:txBody>
+          <a:bodyPr wrap="none" rtlCol="0">
+            <a:noAutofit/>
+          </a:bodyPr>
+          <a:lstStyle/>
+          <a:p>
+            <a:r>
+              <a:rPr lang="en-US" sz="1600" dirty="0" err="1"/>
+              <a:t>DisguiseControls</a:t>
+            </a:r>
+            <a:endParaRPr lang="en-US" sz="1600" dirty="0"/>
+          </a:p>
+          <a:p>
+            <a:pPr marL="171450" indent="-171450">
+              <a:buFont typeface="Arial" panose="020B0604020202020204" pitchFamily="34" charset="0"/>
+              <a:buChar char="•"/>
+            </a:pPr>
+            <a:r>
+              <a:rPr lang="en-US" sz="1200" dirty="0"/>
+              <a:t>Render() {return(…</a:t>
+            </a:r>
+          </a:p>
+          <a:p>
+            <a:pPr marL="314325" lvl="1" indent="-163513">
+              <a:buFont typeface="Arial" panose="020B0604020202020204" pitchFamily="34" charset="0"/>
+              <a:buChar char="•"/>
+            </a:pPr>
+            <a:r>
+              <a:rPr lang="en-US" sz="1200" dirty="0"/>
+              <a:t>&lt;</a:t>
+            </a:r>
+            <a:r>
+              <a:rPr lang="en-US" sz="1200" dirty="0" err="1"/>
+              <a:t>MakePepito</a:t>
+            </a:r>
+            <a:r>
+              <a:rPr lang="en-US" sz="1200" dirty="0"/>
+              <a:t> </a:t>
+            </a:r>
+            <a:r>
+              <a:rPr lang="en-US" sz="1200" dirty="0" err="1"/>
+              <a:t>connectedB</a:t>
+            </a:r>
+            <a:r>
+              <a:rPr lang="en-US" sz="1200" dirty="0"/>
+              <a:t>=… /&gt;</a:t>
+            </a:r>
+          </a:p>
+          <a:p>
+            <a:pPr marL="314325" lvl="1" indent="-163513">
+              <a:buFont typeface="Arial" panose="020B0604020202020204" pitchFamily="34" charset="0"/>
+              <a:buChar char="•"/>
+            </a:pPr>
+            <a:r>
+              <a:rPr lang="en-US" sz="1200" dirty="0"/>
+              <a:t>&lt;</a:t>
+            </a:r>
+            <a:r>
+              <a:rPr lang="en-US" sz="1200" dirty="0" err="1"/>
+              <a:t>StoreDisguise</a:t>
+            </a:r>
+            <a:r>
+              <a:rPr lang="en-US" sz="1200" dirty="0"/>
+              <a:t> /&gt;</a:t>
+            </a:r>
+          </a:p>
+        </p:txBody>
+      </p:sp>
+      <p:sp>
+        <p:nvSpPr>
+          <p:cNvPr id="14" name="TextBox 13">
+            <a:extLst>
+              <a:ext uri="{FF2B5EF4-FFF2-40B4-BE49-F238E27FC236}">
+                <a16:creationId xmlns:a16="http://schemas.microsoft.com/office/drawing/2014/main" id="{67ADE74F-4347-424B-9603-802DDAF0B884}"/>
+              </a:ext>
+            </a:extLst>
+          </p:cNvPr>
+          <p:cNvSpPr txBox="1"/>
+          <p:nvPr/>
+        </p:nvSpPr>
+        <p:spPr>
+          <a:xfrm>
+            <a:off x="5275320" y="2767831"/>
+            <a:ext cx="2055444" cy="935087"/>
+          </a:xfrm>
+          <a:prstGeom prst="rect">
+            <a:avLst/>
+          </a:prstGeom>
+          <a:noFill/>
+          <a:ln>
+            <a:solidFill>
+              <a:schemeClr val="accent1"/>
+            </a:solidFill>
+          </a:ln>
+        </p:spPr>
+        <p:txBody>
+          <a:bodyPr wrap="none" rtlCol="0">
+            <a:noAutofit/>
+          </a:bodyPr>
+          <a:lstStyle/>
+          <a:p>
+            <a:r>
+              <a:rPr lang="en-US" sz="1600" dirty="0" err="1"/>
+              <a:t>MakePepito</a:t>
+            </a:r>
+            <a:endParaRPr lang="en-US" sz="1600" dirty="0"/>
+          </a:p>
+          <a:p>
+            <a:pPr marL="171450" indent="-171450">
+              <a:buFont typeface="Arial" panose="020B0604020202020204" pitchFamily="34" charset="0"/>
+              <a:buChar char="•"/>
+            </a:pPr>
+            <a:r>
+              <a:rPr lang="en-US" sz="1200" dirty="0"/>
+              <a:t>getWeb3</a:t>
+            </a:r>
+          </a:p>
+          <a:p>
+            <a:pPr marL="171450" indent="-171450">
+              <a:buFont typeface="Arial" panose="020B0604020202020204" pitchFamily="34" charset="0"/>
+              <a:buChar char="•"/>
+            </a:pPr>
+            <a:endParaRPr lang="en-US" sz="1200" dirty="0"/>
+          </a:p>
+          <a:p>
+            <a:pPr marL="171450" indent="-171450">
+              <a:buFont typeface="Arial" panose="020B0604020202020204" pitchFamily="34" charset="0"/>
+              <a:buChar char="•"/>
+            </a:pPr>
+            <a:r>
+              <a:rPr lang="en-US" sz="1200" dirty="0" err="1"/>
+              <a:t>this.props.connectedB</a:t>
+            </a:r>
+            <a:r>
+              <a:rPr lang="en-US" sz="1200" dirty="0"/>
+              <a:t>(…)</a:t>
+            </a:r>
+          </a:p>
+        </p:txBody>
+      </p:sp>
+      <p:sp>
+        <p:nvSpPr>
+          <p:cNvPr id="15" name="TextBox 14">
+            <a:extLst>
+              <a:ext uri="{FF2B5EF4-FFF2-40B4-BE49-F238E27FC236}">
+                <a16:creationId xmlns:a16="http://schemas.microsoft.com/office/drawing/2014/main" id="{B8BB7B62-0747-EB4B-9F49-9CB19DE7DB66}"/>
+              </a:ext>
+            </a:extLst>
+          </p:cNvPr>
+          <p:cNvSpPr txBox="1"/>
+          <p:nvPr/>
+        </p:nvSpPr>
+        <p:spPr>
+          <a:xfrm>
+            <a:off x="6696255" y="3416718"/>
+            <a:ext cx="555171" cy="190800"/>
+          </a:xfrm>
+          <a:prstGeom prst="rect">
+            <a:avLst/>
+          </a:prstGeom>
+          <a:noFill/>
+          <a:ln>
+            <a:noFill/>
+          </a:ln>
+        </p:spPr>
+        <p:txBody>
+          <a:bodyPr wrap="square" tIns="3600" bIns="3600" rtlCol="0">
+            <a:spAutoFit/>
+          </a:bodyPr>
+          <a:lstStyle/>
+          <a:p>
+            <a:r>
+              <a:rPr lang="en-LU" sz="1200" dirty="0"/>
+              <a:t> </a:t>
+            </a:r>
+          </a:p>
+        </p:txBody>
+      </p:sp>
+      <p:cxnSp>
+        <p:nvCxnSpPr>
+          <p:cNvPr id="19" name="Elbow Connector 18">
+            <a:extLst>
+              <a:ext uri="{FF2B5EF4-FFF2-40B4-BE49-F238E27FC236}">
+                <a16:creationId xmlns:a16="http://schemas.microsoft.com/office/drawing/2014/main" id="{BFC8572E-3B76-4941-8145-9A5CB5CE03A6}"/>
+              </a:ext>
+            </a:extLst>
+          </p:cNvPr>
+          <p:cNvCxnSpPr>
+            <a:cxnSpLocks/>
+            <a:stCxn id="20" idx="2"/>
+            <a:endCxn id="14" idx="1"/>
+          </p:cNvCxnSpPr>
+          <p:nvPr/>
+        </p:nvCxnSpPr>
+        <p:spPr>
+          <a:xfrm rot="5400000">
+            <a:off x="5066335" y="2194338"/>
+            <a:ext cx="1250022" cy="832052"/>
+          </a:xfrm>
+          <a:prstGeom prst="bentConnector4">
+            <a:avLst>
+              <a:gd name="adj1" fmla="val 31299"/>
+              <a:gd name="adj2" fmla="val 127474"/>
+            </a:avLst>
+          </a:prstGeom>
+          <a:ln w="12700">
+            <a:tailEnd type="triangle"/>
+          </a:ln>
+        </p:spPr>
+        <p:style>
+          <a:lnRef idx="1">
+            <a:schemeClr val="accent1"/>
+          </a:lnRef>
+          <a:fillRef idx="0">
+            <a:schemeClr val="accent1"/>
+          </a:fillRef>
+          <a:effectRef idx="0">
+            <a:schemeClr val="accent1"/>
+          </a:effectRef>
+          <a:fontRef idx="minor">
+            <a:schemeClr val="tx1"/>
+          </a:fontRef>
+        </p:style>
+      </p:cxnSp>
+      <p:sp>
+        <p:nvSpPr>
+          <p:cNvPr id="20" name="TextBox 19">
+            <a:extLst>
+              <a:ext uri="{FF2B5EF4-FFF2-40B4-BE49-F238E27FC236}">
+                <a16:creationId xmlns:a16="http://schemas.microsoft.com/office/drawing/2014/main" id="{B98B7689-E3BB-3C46-925D-93AE93572D90}"/>
+              </a:ext>
+            </a:extLst>
+          </p:cNvPr>
+          <p:cNvSpPr txBox="1"/>
+          <p:nvPr/>
+        </p:nvSpPr>
+        <p:spPr>
+          <a:xfrm>
+            <a:off x="5829786" y="1794553"/>
+            <a:ext cx="555171" cy="190800"/>
+          </a:xfrm>
+          <a:prstGeom prst="rect">
+            <a:avLst/>
+          </a:prstGeom>
+          <a:noFill/>
+          <a:ln>
+            <a:noFill/>
+          </a:ln>
+        </p:spPr>
+        <p:txBody>
+          <a:bodyPr wrap="square" tIns="3600" bIns="3600" rtlCol="0">
+            <a:spAutoFit/>
+          </a:bodyPr>
+          <a:lstStyle/>
+          <a:p>
+            <a:r>
+              <a:rPr lang="en-LU" sz="1200" dirty="0"/>
+              <a:t> </a:t>
+            </a:r>
+          </a:p>
+        </p:txBody>
+      </p:sp>
+      <p:sp>
+        <p:nvSpPr>
+          <p:cNvPr id="21" name="TextBox 20">
+            <a:extLst>
+              <a:ext uri="{FF2B5EF4-FFF2-40B4-BE49-F238E27FC236}">
+                <a16:creationId xmlns:a16="http://schemas.microsoft.com/office/drawing/2014/main" id="{CC801F14-4C79-3248-A2D0-30151C9DC533}"/>
+              </a:ext>
+            </a:extLst>
+          </p:cNvPr>
+          <p:cNvSpPr txBox="1"/>
+          <p:nvPr/>
+        </p:nvSpPr>
+        <p:spPr>
+          <a:xfrm>
+            <a:off x="1024502" y="2161170"/>
+            <a:ext cx="555171" cy="190800"/>
+          </a:xfrm>
+          <a:prstGeom prst="rect">
+            <a:avLst/>
+          </a:prstGeom>
+          <a:noFill/>
+          <a:ln>
+            <a:noFill/>
+          </a:ln>
+        </p:spPr>
+        <p:txBody>
+          <a:bodyPr wrap="square" tIns="3600" bIns="3600" rtlCol="0">
+            <a:spAutoFit/>
+          </a:bodyPr>
+          <a:lstStyle/>
+          <a:p>
+            <a:r>
+              <a:rPr lang="en-LU" sz="1200" dirty="0"/>
+              <a:t> </a:t>
+            </a:r>
+          </a:p>
+        </p:txBody>
+      </p:sp>
+      <p:cxnSp>
+        <p:nvCxnSpPr>
+          <p:cNvPr id="23" name="Elbow Connector 22">
+            <a:extLst>
+              <a:ext uri="{FF2B5EF4-FFF2-40B4-BE49-F238E27FC236}">
+                <a16:creationId xmlns:a16="http://schemas.microsoft.com/office/drawing/2014/main" id="{01E5A134-A9B5-8F40-961B-30B71D345828}"/>
+              </a:ext>
+            </a:extLst>
+          </p:cNvPr>
+          <p:cNvCxnSpPr>
+            <a:cxnSpLocks/>
+            <a:stCxn id="15" idx="2"/>
+            <a:endCxn id="21" idx="1"/>
+          </p:cNvCxnSpPr>
+          <p:nvPr/>
+        </p:nvCxnSpPr>
+        <p:spPr>
+          <a:xfrm rot="5400000" flipH="1">
+            <a:off x="3323698" y="-42625"/>
+            <a:ext cx="1350948" cy="5949339"/>
+          </a:xfrm>
+          <a:prstGeom prst="bentConnector4">
+            <a:avLst>
+              <a:gd name="adj1" fmla="val -16921"/>
+              <a:gd name="adj2" fmla="val 106404"/>
+            </a:avLst>
+          </a:prstGeom>
+          <a:ln w="12700">
+            <a:prstDash val="lgDash"/>
+            <a:tailEnd type="triangle"/>
+          </a:ln>
+        </p:spPr>
+        <p:style>
+          <a:lnRef idx="1">
+            <a:schemeClr val="accent1"/>
+          </a:lnRef>
+          <a:fillRef idx="0">
+            <a:schemeClr val="accent1"/>
+          </a:fillRef>
+          <a:effectRef idx="0">
+            <a:schemeClr val="accent1"/>
+          </a:effectRef>
+          <a:fontRef idx="minor">
+            <a:schemeClr val="tx1"/>
+          </a:fontRef>
+        </p:style>
+      </p:cxnSp>
+      <p:sp>
+        <p:nvSpPr>
+          <p:cNvPr id="26" name="TextBox 25">
+            <a:extLst>
+              <a:ext uri="{FF2B5EF4-FFF2-40B4-BE49-F238E27FC236}">
+                <a16:creationId xmlns:a16="http://schemas.microsoft.com/office/drawing/2014/main" id="{942D0A16-45A8-D04E-9A8D-7945BB4CD969}"/>
+              </a:ext>
+            </a:extLst>
+          </p:cNvPr>
+          <p:cNvSpPr txBox="1"/>
+          <p:nvPr/>
+        </p:nvSpPr>
+        <p:spPr>
+          <a:xfrm>
+            <a:off x="7913914" y="2730270"/>
+            <a:ext cx="3918039" cy="769441"/>
+          </a:xfrm>
+          <a:prstGeom prst="rect">
+            <a:avLst/>
+          </a:prstGeom>
+          <a:solidFill>
+            <a:schemeClr val="bg1"/>
+          </a:solidFill>
+        </p:spPr>
+        <p:txBody>
+          <a:bodyPr wrap="square" rtlCol="0">
+            <a:spAutoFit/>
+          </a:bodyPr>
+          <a:lstStyle/>
+          <a:p>
+            <a:pPr marL="171450" indent="-171450">
+              <a:buFont typeface="Arial" panose="020B0604020202020204" pitchFamily="34" charset="0"/>
+              <a:buChar char="•"/>
+            </a:pPr>
+            <a:r>
+              <a:rPr lang="en-US" sz="1100" dirty="0"/>
+              <a:t>getWeb3 generates a </a:t>
+            </a:r>
+            <a:r>
+              <a:rPr lang="en-US" sz="1100" dirty="0" err="1"/>
+              <a:t>HDWalletProvider</a:t>
+            </a:r>
+            <a:r>
+              <a:rPr lang="en-US" sz="1100" dirty="0"/>
+              <a:t> with the 12 words of Metamask</a:t>
+            </a:r>
+          </a:p>
+          <a:p>
+            <a:pPr marL="171450" indent="-171450">
+              <a:buFont typeface="Arial" panose="020B0604020202020204" pitchFamily="34" charset="0"/>
+              <a:buChar char="•"/>
+            </a:pPr>
+            <a:r>
+              <a:rPr lang="en-US" sz="1100" dirty="0"/>
+              <a:t>assign web3 to this </a:t>
+            </a:r>
+            <a:r>
+              <a:rPr lang="en-US" sz="1100" dirty="0" err="1"/>
+              <a:t>HDWalletProvider</a:t>
+            </a:r>
+            <a:r>
+              <a:rPr lang="en-US" sz="1100" dirty="0"/>
+              <a:t> of a testnet and return web3</a:t>
+            </a:r>
+            <a:endParaRPr lang="en-LU" sz="1100" dirty="0"/>
+          </a:p>
+        </p:txBody>
+      </p:sp>
+      <p:sp>
+        <p:nvSpPr>
+          <p:cNvPr id="29" name="TextBox 28">
+            <a:extLst>
+              <a:ext uri="{FF2B5EF4-FFF2-40B4-BE49-F238E27FC236}">
+                <a16:creationId xmlns:a16="http://schemas.microsoft.com/office/drawing/2014/main" id="{D0FFB94D-6A49-A143-A8D3-A9A49F79F78A}"/>
+              </a:ext>
+            </a:extLst>
+          </p:cNvPr>
+          <p:cNvSpPr txBox="1"/>
+          <p:nvPr/>
+        </p:nvSpPr>
+        <p:spPr>
+          <a:xfrm>
+            <a:off x="5308359" y="1355882"/>
+            <a:ext cx="555171" cy="190800"/>
+          </a:xfrm>
+          <a:prstGeom prst="rect">
+            <a:avLst/>
+          </a:prstGeom>
+          <a:noFill/>
+          <a:ln>
+            <a:noFill/>
+          </a:ln>
+        </p:spPr>
+        <p:txBody>
+          <a:bodyPr wrap="square" tIns="3600" bIns="3600" rtlCol="0">
+            <a:spAutoFit/>
+          </a:bodyPr>
+          <a:lstStyle/>
+          <a:p>
+            <a:r>
+              <a:rPr lang="en-LU" sz="1200" dirty="0"/>
+              <a:t> </a:t>
+            </a:r>
+          </a:p>
+        </p:txBody>
+      </p:sp>
+      <p:sp>
+        <p:nvSpPr>
+          <p:cNvPr id="39" name="TextBox 38">
+            <a:extLst>
+              <a:ext uri="{FF2B5EF4-FFF2-40B4-BE49-F238E27FC236}">
+                <a16:creationId xmlns:a16="http://schemas.microsoft.com/office/drawing/2014/main" id="{8446A4A6-1BAE-F841-B035-85F4B5791F64}"/>
+              </a:ext>
+            </a:extLst>
+          </p:cNvPr>
+          <p:cNvSpPr txBox="1"/>
+          <p:nvPr/>
+        </p:nvSpPr>
+        <p:spPr>
+          <a:xfrm>
+            <a:off x="7913914" y="3499711"/>
+            <a:ext cx="3918039" cy="938719"/>
+          </a:xfrm>
+          <a:prstGeom prst="rect">
+            <a:avLst/>
+          </a:prstGeom>
+          <a:solidFill>
+            <a:schemeClr val="bg1"/>
+          </a:solidFill>
+        </p:spPr>
+        <p:txBody>
+          <a:bodyPr wrap="square" rtlCol="0">
+            <a:spAutoFit/>
+          </a:bodyPr>
+          <a:lstStyle/>
+          <a:p>
+            <a:pPr marL="171450" indent="-171450">
+              <a:buFont typeface="Arial" panose="020B0604020202020204" pitchFamily="34" charset="0"/>
+              <a:buChar char="•"/>
+            </a:pPr>
+            <a:r>
+              <a:rPr lang="en-US" sz="1100" dirty="0" err="1"/>
+              <a:t>MakePepito</a:t>
+            </a:r>
+            <a:r>
+              <a:rPr lang="en-US" sz="1100" dirty="0"/>
+              <a:t> uses one of our Metamask accounts connected to this testnet</a:t>
+            </a:r>
+          </a:p>
+          <a:p>
+            <a:pPr marL="171450" indent="-171450">
+              <a:buFont typeface="Arial" panose="020B0604020202020204" pitchFamily="34" charset="0"/>
+              <a:buChar char="•"/>
+            </a:pPr>
+            <a:r>
+              <a:rPr lang="en-US" sz="1100" dirty="0" err="1"/>
+              <a:t>MakePepito</a:t>
+            </a:r>
+            <a:r>
+              <a:rPr lang="en-US" sz="1100" dirty="0"/>
+              <a:t> sends a Pepito creation transaction from this account</a:t>
+            </a:r>
+          </a:p>
+          <a:p>
+            <a:pPr marL="171450" indent="-171450">
+              <a:buFont typeface="Arial" panose="020B0604020202020204" pitchFamily="34" charset="0"/>
+              <a:buChar char="•"/>
+            </a:pPr>
+            <a:r>
+              <a:rPr lang="en-US" sz="1100" dirty="0" err="1"/>
+              <a:t>MakePepito</a:t>
+            </a:r>
+            <a:r>
+              <a:rPr lang="en-US" sz="1100" dirty="0"/>
+              <a:t> calls back </a:t>
+            </a:r>
+            <a:r>
+              <a:rPr lang="en-US" sz="1100" dirty="0" err="1"/>
+              <a:t>connectdB</a:t>
+            </a:r>
+            <a:r>
+              <a:rPr lang="en-US" sz="1100" dirty="0"/>
+              <a:t>()</a:t>
+            </a:r>
+            <a:endParaRPr lang="en-LU" sz="1100" dirty="0"/>
+          </a:p>
+        </p:txBody>
+      </p:sp>
+      <p:sp>
+        <p:nvSpPr>
+          <p:cNvPr id="40" name="TextBox 39">
+            <a:extLst>
+              <a:ext uri="{FF2B5EF4-FFF2-40B4-BE49-F238E27FC236}">
+                <a16:creationId xmlns:a16="http://schemas.microsoft.com/office/drawing/2014/main" id="{C9FB83A1-80C0-764A-B63B-A8499C9A3BD1}"/>
+              </a:ext>
+            </a:extLst>
+          </p:cNvPr>
+          <p:cNvSpPr txBox="1"/>
+          <p:nvPr/>
+        </p:nvSpPr>
+        <p:spPr>
+          <a:xfrm>
+            <a:off x="5275319" y="4554809"/>
+            <a:ext cx="2518851" cy="935087"/>
+          </a:xfrm>
+          <a:prstGeom prst="rect">
+            <a:avLst/>
+          </a:prstGeom>
+          <a:noFill/>
+          <a:ln>
+            <a:solidFill>
+              <a:schemeClr val="accent1"/>
+            </a:solidFill>
+          </a:ln>
+        </p:spPr>
+        <p:txBody>
+          <a:bodyPr wrap="square" rtlCol="0">
+            <a:noAutofit/>
+          </a:bodyPr>
+          <a:lstStyle/>
+          <a:p>
+            <a:r>
+              <a:rPr lang="en-US" sz="1600" dirty="0" err="1"/>
+              <a:t>StoreDisguise</a:t>
+            </a:r>
+            <a:endParaRPr lang="en-US" sz="1600" dirty="0"/>
+          </a:p>
+          <a:p>
+            <a:pPr marL="171450" indent="-171450">
+              <a:buFont typeface="Arial" panose="020B0604020202020204" pitchFamily="34" charset="0"/>
+              <a:buChar char="•"/>
+            </a:pPr>
+            <a:r>
+              <a:rPr lang="en-US" sz="1200" dirty="0"/>
+              <a:t>Ask Pepito to </a:t>
+            </a:r>
+            <a:r>
+              <a:rPr lang="en-US" sz="1200" dirty="0" err="1"/>
+              <a:t>createPepitoDisguise</a:t>
+            </a:r>
+            <a:endParaRPr lang="en-US" sz="1200" dirty="0"/>
+          </a:p>
+          <a:p>
+            <a:pPr marL="171450" indent="-171450">
+              <a:buFont typeface="Arial" panose="020B0604020202020204" pitchFamily="34" charset="0"/>
+              <a:buChar char="•"/>
+            </a:pPr>
+            <a:r>
+              <a:rPr lang="en-US" sz="1200" dirty="0"/>
+              <a:t>Ask </a:t>
+            </a:r>
+            <a:r>
+              <a:rPr lang="en-US" sz="1200" dirty="0" err="1"/>
+              <a:t>PepitoDisguise</a:t>
+            </a:r>
+            <a:r>
+              <a:rPr lang="en-US" sz="1200" dirty="0"/>
+              <a:t> to record on-chain its disguise</a:t>
+            </a:r>
+          </a:p>
+        </p:txBody>
+      </p:sp>
+      <p:sp>
+        <p:nvSpPr>
+          <p:cNvPr id="44" name="TextBox 43">
+            <a:extLst>
+              <a:ext uri="{FF2B5EF4-FFF2-40B4-BE49-F238E27FC236}">
+                <a16:creationId xmlns:a16="http://schemas.microsoft.com/office/drawing/2014/main" id="{ED3E2AB8-7304-3449-9076-8CFCA3933B44}"/>
+              </a:ext>
+            </a:extLst>
+          </p:cNvPr>
+          <p:cNvSpPr txBox="1"/>
+          <p:nvPr/>
+        </p:nvSpPr>
+        <p:spPr>
+          <a:xfrm>
+            <a:off x="6696255" y="5203696"/>
+            <a:ext cx="555171" cy="190800"/>
+          </a:xfrm>
+          <a:prstGeom prst="rect">
+            <a:avLst/>
+          </a:prstGeom>
+          <a:noFill/>
+          <a:ln>
+            <a:noFill/>
+          </a:ln>
+        </p:spPr>
+        <p:txBody>
+          <a:bodyPr wrap="square" tIns="3600" bIns="3600" rtlCol="0">
+            <a:spAutoFit/>
+          </a:bodyPr>
+          <a:lstStyle/>
+          <a:p>
+            <a:r>
+              <a:rPr lang="en-LU" sz="1200" dirty="0"/>
+              <a:t> </a:t>
+            </a:r>
+          </a:p>
+        </p:txBody>
+      </p:sp>
+      <p:sp>
+        <p:nvSpPr>
+          <p:cNvPr id="47" name="TextBox 46">
+            <a:extLst>
+              <a:ext uri="{FF2B5EF4-FFF2-40B4-BE49-F238E27FC236}">
+                <a16:creationId xmlns:a16="http://schemas.microsoft.com/office/drawing/2014/main" id="{5AB019B9-3DD2-A543-9666-83DCEC57B6F9}"/>
+              </a:ext>
+            </a:extLst>
+          </p:cNvPr>
+          <p:cNvSpPr txBox="1"/>
+          <p:nvPr/>
+        </p:nvSpPr>
+        <p:spPr>
+          <a:xfrm>
+            <a:off x="5590300" y="1946953"/>
+            <a:ext cx="555171" cy="190800"/>
+          </a:xfrm>
+          <a:prstGeom prst="rect">
+            <a:avLst/>
+          </a:prstGeom>
+          <a:noFill/>
+          <a:ln>
+            <a:noFill/>
+          </a:ln>
+        </p:spPr>
+        <p:txBody>
+          <a:bodyPr wrap="square" tIns="3600" bIns="3600" rtlCol="0">
+            <a:spAutoFit/>
+          </a:bodyPr>
+          <a:lstStyle/>
+          <a:p>
+            <a:r>
+              <a:rPr lang="en-LU" sz="1200" dirty="0"/>
+              <a:t> </a:t>
+            </a:r>
+          </a:p>
+        </p:txBody>
+      </p:sp>
+      <p:cxnSp>
+        <p:nvCxnSpPr>
+          <p:cNvPr id="48" name="Elbow Connector 47">
+            <a:extLst>
+              <a:ext uri="{FF2B5EF4-FFF2-40B4-BE49-F238E27FC236}">
+                <a16:creationId xmlns:a16="http://schemas.microsoft.com/office/drawing/2014/main" id="{CD648D5F-1873-E746-BF3B-586C9630B167}"/>
+              </a:ext>
+            </a:extLst>
+          </p:cNvPr>
+          <p:cNvCxnSpPr>
+            <a:cxnSpLocks/>
+            <a:stCxn id="47" idx="1"/>
+            <a:endCxn id="40" idx="1"/>
+          </p:cNvCxnSpPr>
+          <p:nvPr/>
+        </p:nvCxnSpPr>
+        <p:spPr>
+          <a:xfrm rot="10800000" flipV="1">
+            <a:off x="5275320" y="2042353"/>
+            <a:ext cx="314981" cy="2980000"/>
+          </a:xfrm>
+          <a:prstGeom prst="bentConnector3">
+            <a:avLst>
+              <a:gd name="adj1" fmla="val 252064"/>
+            </a:avLst>
+          </a:prstGeom>
+          <a:ln w="12700">
+            <a:tailEnd type="triangle"/>
+          </a:ln>
+        </p:spPr>
+        <p:style>
+          <a:lnRef idx="1">
+            <a:schemeClr val="accent1"/>
+          </a:lnRef>
+          <a:fillRef idx="0">
+            <a:schemeClr val="accent1"/>
+          </a:fillRef>
+          <a:effectRef idx="0">
+            <a:schemeClr val="accent1"/>
+          </a:effectRef>
+          <a:fontRef idx="minor">
+            <a:schemeClr val="tx1"/>
+          </a:fontRef>
+        </p:style>
+      </p:cxnSp>
+      <p:sp>
+        <p:nvSpPr>
+          <p:cNvPr id="51" name="TextBox 50">
+            <a:extLst>
+              <a:ext uri="{FF2B5EF4-FFF2-40B4-BE49-F238E27FC236}">
+                <a16:creationId xmlns:a16="http://schemas.microsoft.com/office/drawing/2014/main" id="{F2EA8457-5D16-534F-B342-38F9A262A2E8}"/>
+              </a:ext>
+            </a:extLst>
+          </p:cNvPr>
+          <p:cNvSpPr txBox="1"/>
+          <p:nvPr/>
+        </p:nvSpPr>
+        <p:spPr>
+          <a:xfrm>
+            <a:off x="7913913" y="4729296"/>
+            <a:ext cx="3918039" cy="430887"/>
+          </a:xfrm>
+          <a:prstGeom prst="rect">
+            <a:avLst/>
+          </a:prstGeom>
+          <a:solidFill>
+            <a:schemeClr val="bg1"/>
+          </a:solidFill>
+        </p:spPr>
+        <p:txBody>
+          <a:bodyPr wrap="square" rtlCol="0">
+            <a:spAutoFit/>
+          </a:bodyPr>
+          <a:lstStyle/>
+          <a:p>
+            <a:pPr marL="171450" indent="-171450">
+              <a:buFont typeface="Arial" panose="020B0604020202020204" pitchFamily="34" charset="0"/>
+              <a:buChar char="•"/>
+            </a:pPr>
+            <a:r>
+              <a:rPr lang="en-US" sz="1100" dirty="0" err="1"/>
+              <a:t>createPepitoDisguise</a:t>
+            </a:r>
+            <a:r>
+              <a:rPr lang="en-US" sz="1100" dirty="0"/>
+              <a:t> and </a:t>
+            </a:r>
+            <a:r>
+              <a:rPr lang="en-US" sz="1100" dirty="0" err="1"/>
+              <a:t>storeDisguise</a:t>
+            </a:r>
+            <a:r>
+              <a:rPr lang="en-US" sz="1100" dirty="0"/>
+              <a:t> are 2 transactions sent to the testnet referred to by web3</a:t>
+            </a:r>
+            <a:endParaRPr lang="en-LU" sz="1100" dirty="0"/>
+          </a:p>
+        </p:txBody>
+      </p:sp>
+    </p:spTree>
+    <p:extLst>
+      <p:ext uri="{BB962C8B-B14F-4D97-AF65-F5344CB8AC3E}">
+        <p14:creationId xmlns:p14="http://schemas.microsoft.com/office/powerpoint/2010/main" val="3099599105"/>
+      </p:ext>
+    </p:extLst>
+  </p:cSld>
+  <p:clrMapOvr>
+    <a:masterClrMapping/>
+  </p:clrMapOvr>
+</p:sld>
+</file>
+
+<file path=ppt/slides/slide6.xml><?xml version="1.0" encoding="utf-8"?>
+<p:sld xmlns:a="http://schemas.openxmlformats.org/drawingml/2006/main" xmlns:r="http://schemas.openxmlformats.org/officeDocument/2006/relationships" xmlns:p="http://schemas.openxmlformats.org/presentationml/2006/main">
+  <p:cSld>
+    <p:spTree>
+      <p:nvGrpSpPr>
+        <p:cNvPr id="1" name=""/>
+        <p:cNvGrpSpPr/>
+        <p:nvPr/>
+      </p:nvGrpSpPr>
+      <p:grpSpPr>
+        <a:xfrm>
+          <a:off x="0" y="0"/>
+          <a:ext cx="0" cy="0"/>
+          <a:chOff x="0" y="0"/>
+          <a:chExt cx="0" cy="0"/>
+        </a:xfrm>
+      </p:grpSpPr>
+      <p:sp>
+        <p:nvSpPr>
+          <p:cNvPr id="4" name="TextBox 3">
+            <a:extLst>
+              <a:ext uri="{FF2B5EF4-FFF2-40B4-BE49-F238E27FC236}">
+                <a16:creationId xmlns:a16="http://schemas.microsoft.com/office/drawing/2014/main" id="{7B91D8D0-F88B-784E-8FF8-D5F07BC08546}"/>
+              </a:ext>
+            </a:extLst>
+          </p:cNvPr>
+          <p:cNvSpPr txBox="1"/>
+          <p:nvPr/>
+        </p:nvSpPr>
+        <p:spPr>
+          <a:xfrm>
+            <a:off x="620486" y="250372"/>
             <a:ext cx="4593771" cy="594250"/>
           </a:xfrm>
           <a:prstGeom prst="rect">
@@ -10518,7 +11753,7 @@
 </p:sld>
 </file>
 
-<file path=ppt/slides/slide6.xml><?xml version="1.0" encoding="utf-8"?>
+<file path=ppt/slides/slide7.xml><?xml version="1.0" encoding="utf-8"?>
 <p:sld xmlns:a="http://schemas.openxmlformats.org/drawingml/2006/main" xmlns:r="http://schemas.openxmlformats.org/officeDocument/2006/relationships" xmlns:p="http://schemas.openxmlformats.org/presentationml/2006/main">
   <p:cSld>
     <p:spTree>
@@ -11681,6 +12916,912 @@
     <p:extLst>
       <p:ext uri="{BB962C8B-B14F-4D97-AF65-F5344CB8AC3E}">
         <p14:creationId xmlns:p14="http://schemas.microsoft.com/office/powerpoint/2010/main" val="3584987928"/>
+      </p:ext>
+    </p:extLst>
+  </p:cSld>
+  <p:clrMapOvr>
+    <a:masterClrMapping/>
+  </p:clrMapOvr>
+</p:sld>
+</file>
+
+<file path=ppt/slides/slide8.xml><?xml version="1.0" encoding="utf-8"?>
+<p:sld xmlns:a="http://schemas.openxmlformats.org/drawingml/2006/main" xmlns:r="http://schemas.openxmlformats.org/officeDocument/2006/relationships" xmlns:p="http://schemas.openxmlformats.org/presentationml/2006/main">
+  <p:cSld>
+    <p:spTree>
+      <p:nvGrpSpPr>
+        <p:cNvPr id="1" name=""/>
+        <p:cNvGrpSpPr/>
+        <p:nvPr/>
+      </p:nvGrpSpPr>
+      <p:grpSpPr>
+        <a:xfrm>
+          <a:off x="0" y="0"/>
+          <a:ext cx="0" cy="0"/>
+          <a:chOff x="0" y="0"/>
+          <a:chExt cx="0" cy="0"/>
+        </a:xfrm>
+      </p:grpSpPr>
+      <p:sp>
+        <p:nvSpPr>
+          <p:cNvPr id="4" name="TextBox 3">
+            <a:extLst>
+              <a:ext uri="{FF2B5EF4-FFF2-40B4-BE49-F238E27FC236}">
+                <a16:creationId xmlns:a16="http://schemas.microsoft.com/office/drawing/2014/main" id="{7B91D8D0-F88B-784E-8FF8-D5F07BC08546}"/>
+              </a:ext>
+            </a:extLst>
+          </p:cNvPr>
+          <p:cNvSpPr txBox="1"/>
+          <p:nvPr/>
+        </p:nvSpPr>
+        <p:spPr>
+          <a:xfrm>
+            <a:off x="620486" y="250372"/>
+            <a:ext cx="4593771" cy="594250"/>
+          </a:xfrm>
+          <a:prstGeom prst="rect">
+            <a:avLst/>
+          </a:prstGeom>
+          <a:solidFill>
+            <a:srgbClr val="E1EFD8"/>
+          </a:solidFill>
+        </p:spPr>
+        <p:txBody>
+          <a:bodyPr wrap="none" rtlCol="0" anchor="ctr" anchorCtr="0">
+            <a:noAutofit/>
+          </a:bodyPr>
+          <a:lstStyle/>
+          <a:p>
+            <a:r>
+              <a:rPr lang="en-US" b="1" dirty="0">
+                <a:solidFill>
+                  <a:srgbClr val="980000"/>
+                </a:solidFill>
+              </a:rPr>
+              <a:t>Test in JavaScript and in Solidity</a:t>
+            </a:r>
+          </a:p>
+        </p:txBody>
+      </p:sp>
+      <p:sp>
+        <p:nvSpPr>
+          <p:cNvPr id="9" name="TextBox 8">
+            <a:extLst>
+              <a:ext uri="{FF2B5EF4-FFF2-40B4-BE49-F238E27FC236}">
+                <a16:creationId xmlns:a16="http://schemas.microsoft.com/office/drawing/2014/main" id="{A648BA86-9C0C-0846-A8F7-877203CF605C}"/>
+              </a:ext>
+            </a:extLst>
+          </p:cNvPr>
+          <p:cNvSpPr txBox="1"/>
+          <p:nvPr/>
+        </p:nvSpPr>
+        <p:spPr>
+          <a:xfrm>
+            <a:off x="1579673" y="3163131"/>
+            <a:ext cx="2350069" cy="762193"/>
+          </a:xfrm>
+          <a:prstGeom prst="rect">
+            <a:avLst/>
+          </a:prstGeom>
+          <a:noFill/>
+          <a:ln>
+            <a:solidFill>
+              <a:schemeClr val="accent1"/>
+            </a:solidFill>
+          </a:ln>
+        </p:spPr>
+        <p:txBody>
+          <a:bodyPr wrap="none" rtlCol="0">
+            <a:noAutofit/>
+          </a:bodyPr>
+          <a:lstStyle/>
+          <a:p>
+            <a:r>
+              <a:rPr lang="en-US" sz="1600" dirty="0" err="1"/>
+              <a:t>Pepito.sol</a:t>
+            </a:r>
+            <a:endParaRPr lang="en-US" sz="1600" dirty="0"/>
+          </a:p>
+          <a:p>
+            <a:pPr marL="171450" indent="-171450">
+              <a:buFont typeface="Arial" panose="020B0604020202020204" pitchFamily="34" charset="0"/>
+              <a:buChar char="•"/>
+            </a:pPr>
+            <a:r>
+              <a:rPr lang="en-US" sz="1200" dirty="0"/>
+              <a:t> address public owner;</a:t>
+            </a:r>
+          </a:p>
+        </p:txBody>
+      </p:sp>
+      <p:sp>
+        <p:nvSpPr>
+          <p:cNvPr id="54" name="TextBox 53">
+            <a:extLst>
+              <a:ext uri="{FF2B5EF4-FFF2-40B4-BE49-F238E27FC236}">
+                <a16:creationId xmlns:a16="http://schemas.microsoft.com/office/drawing/2014/main" id="{3C7FA380-1B80-6749-B8A1-63FD4614ED25}"/>
+              </a:ext>
+            </a:extLst>
+          </p:cNvPr>
+          <p:cNvSpPr txBox="1"/>
+          <p:nvPr/>
+        </p:nvSpPr>
+        <p:spPr>
+          <a:xfrm>
+            <a:off x="2667622" y="3468977"/>
+            <a:ext cx="555171" cy="190800"/>
+          </a:xfrm>
+          <a:prstGeom prst="rect">
+            <a:avLst/>
+          </a:prstGeom>
+          <a:noFill/>
+          <a:ln>
+            <a:noFill/>
+          </a:ln>
+        </p:spPr>
+        <p:txBody>
+          <a:bodyPr wrap="square" tIns="3600" bIns="3600" rtlCol="0">
+            <a:spAutoFit/>
+          </a:bodyPr>
+          <a:lstStyle/>
+          <a:p>
+            <a:r>
+              <a:rPr lang="en-LU" sz="1200" dirty="0"/>
+              <a:t> </a:t>
+            </a:r>
+          </a:p>
+        </p:txBody>
+      </p:sp>
+      <p:cxnSp>
+        <p:nvCxnSpPr>
+          <p:cNvPr id="56" name="Elbow Connector 55">
+            <a:extLst>
+              <a:ext uri="{FF2B5EF4-FFF2-40B4-BE49-F238E27FC236}">
+                <a16:creationId xmlns:a16="http://schemas.microsoft.com/office/drawing/2014/main" id="{37A722D5-4C92-7549-BCD0-7254731E2493}"/>
+              </a:ext>
+            </a:extLst>
+          </p:cNvPr>
+          <p:cNvCxnSpPr>
+            <a:cxnSpLocks/>
+            <a:stCxn id="19" idx="2"/>
+            <a:endCxn id="54" idx="0"/>
+          </p:cNvCxnSpPr>
+          <p:nvPr/>
+        </p:nvCxnSpPr>
+        <p:spPr>
+          <a:xfrm rot="5400000">
+            <a:off x="2476911" y="2358421"/>
+            <a:ext cx="1578853" cy="642258"/>
+          </a:xfrm>
+          <a:prstGeom prst="bentConnector3">
+            <a:avLst>
+              <a:gd name="adj1" fmla="val 50000"/>
+            </a:avLst>
+          </a:prstGeom>
+          <a:ln w="12700">
+            <a:tailEnd type="triangle"/>
+          </a:ln>
+        </p:spPr>
+        <p:style>
+          <a:lnRef idx="1">
+            <a:schemeClr val="accent1"/>
+          </a:lnRef>
+          <a:fillRef idx="0">
+            <a:schemeClr val="accent1"/>
+          </a:fillRef>
+          <a:effectRef idx="0">
+            <a:schemeClr val="accent1"/>
+          </a:effectRef>
+          <a:fontRef idx="minor">
+            <a:schemeClr val="tx1"/>
+          </a:fontRef>
+        </p:style>
+      </p:cxnSp>
+      <p:sp>
+        <p:nvSpPr>
+          <p:cNvPr id="28" name="TextBox 27">
+            <a:extLst>
+              <a:ext uri="{FF2B5EF4-FFF2-40B4-BE49-F238E27FC236}">
+                <a16:creationId xmlns:a16="http://schemas.microsoft.com/office/drawing/2014/main" id="{67108B44-C2A7-AC46-9B04-D83B5141938F}"/>
+              </a:ext>
+            </a:extLst>
+          </p:cNvPr>
+          <p:cNvSpPr txBox="1"/>
+          <p:nvPr/>
+        </p:nvSpPr>
+        <p:spPr>
+          <a:xfrm>
+            <a:off x="2277678" y="4427612"/>
+            <a:ext cx="555171" cy="190800"/>
+          </a:xfrm>
+          <a:prstGeom prst="rect">
+            <a:avLst/>
+          </a:prstGeom>
+          <a:noFill/>
+          <a:ln>
+            <a:noFill/>
+          </a:ln>
+        </p:spPr>
+        <p:txBody>
+          <a:bodyPr wrap="square" tIns="3600" bIns="3600" rtlCol="0">
+            <a:spAutoFit/>
+          </a:bodyPr>
+          <a:lstStyle/>
+          <a:p>
+            <a:r>
+              <a:rPr lang="en-LU" sz="1200" dirty="0"/>
+              <a:t> </a:t>
+            </a:r>
+          </a:p>
+        </p:txBody>
+      </p:sp>
+      <p:sp>
+        <p:nvSpPr>
+          <p:cNvPr id="18" name="TextBox 17">
+            <a:extLst>
+              <a:ext uri="{FF2B5EF4-FFF2-40B4-BE49-F238E27FC236}">
+                <a16:creationId xmlns:a16="http://schemas.microsoft.com/office/drawing/2014/main" id="{149DD846-1BEC-C84C-BF1C-1227A7C0F683}"/>
+              </a:ext>
+            </a:extLst>
+          </p:cNvPr>
+          <p:cNvSpPr txBox="1"/>
+          <p:nvPr/>
+        </p:nvSpPr>
+        <p:spPr>
+          <a:xfrm>
+            <a:off x="620485" y="1240778"/>
+            <a:ext cx="3309257" cy="762193"/>
+          </a:xfrm>
+          <a:prstGeom prst="rect">
+            <a:avLst/>
+          </a:prstGeom>
+          <a:noFill/>
+          <a:ln>
+            <a:solidFill>
+              <a:schemeClr val="accent1"/>
+            </a:solidFill>
+          </a:ln>
+        </p:spPr>
+        <p:txBody>
+          <a:bodyPr wrap="none" rtlCol="0">
+            <a:noAutofit/>
+          </a:bodyPr>
+          <a:lstStyle/>
+          <a:p>
+            <a:r>
+              <a:rPr lang="en-US" sz="1600" dirty="0" err="1"/>
+              <a:t>PepitoTest.js</a:t>
+            </a:r>
+            <a:endParaRPr lang="en-US" sz="1600" dirty="0"/>
+          </a:p>
+          <a:p>
+            <a:r>
+              <a:rPr lang="en-US" sz="1200" dirty="0" err="1"/>
+              <a:t>pepitoInstance</a:t>
+            </a:r>
+            <a:r>
+              <a:rPr lang="en-US" sz="1200" dirty="0"/>
+              <a:t> = await </a:t>
+            </a:r>
+            <a:r>
+              <a:rPr lang="en-US" sz="1200" dirty="0" err="1"/>
+              <a:t>Pepito.deployed</a:t>
+            </a:r>
+            <a:r>
+              <a:rPr lang="en-US" sz="1200" dirty="0"/>
+              <a:t>();</a:t>
+            </a:r>
+          </a:p>
+          <a:p>
+            <a:r>
+              <a:rPr lang="en-US" sz="1200" dirty="0"/>
+              <a:t>const </a:t>
+            </a:r>
+            <a:r>
+              <a:rPr lang="en-US" sz="1200" dirty="0" err="1"/>
+              <a:t>ownerPepito</a:t>
+            </a:r>
+            <a:r>
+              <a:rPr lang="en-US" sz="1200" dirty="0"/>
+              <a:t> = await </a:t>
+            </a:r>
+            <a:r>
+              <a:rPr lang="en-US" sz="1200" dirty="0" err="1"/>
+              <a:t>pepitoInstance.owner</a:t>
+            </a:r>
+            <a:r>
+              <a:rPr lang="en-US" sz="1200" dirty="0"/>
+              <a:t>();</a:t>
+            </a:r>
+          </a:p>
+        </p:txBody>
+      </p:sp>
+      <p:sp>
+        <p:nvSpPr>
+          <p:cNvPr id="19" name="TextBox 18">
+            <a:extLst>
+              <a:ext uri="{FF2B5EF4-FFF2-40B4-BE49-F238E27FC236}">
+                <a16:creationId xmlns:a16="http://schemas.microsoft.com/office/drawing/2014/main" id="{145B5194-1E1B-CB4D-AAC8-93DA568050B4}"/>
+              </a:ext>
+            </a:extLst>
+          </p:cNvPr>
+          <p:cNvSpPr txBox="1"/>
+          <p:nvPr/>
+        </p:nvSpPr>
+        <p:spPr>
+          <a:xfrm>
+            <a:off x="3309880" y="1699324"/>
+            <a:ext cx="555171" cy="190800"/>
+          </a:xfrm>
+          <a:prstGeom prst="rect">
+            <a:avLst/>
+          </a:prstGeom>
+          <a:noFill/>
+          <a:ln>
+            <a:noFill/>
+          </a:ln>
+        </p:spPr>
+        <p:txBody>
+          <a:bodyPr wrap="square" tIns="3600" bIns="3600" rtlCol="0">
+            <a:spAutoFit/>
+          </a:bodyPr>
+          <a:lstStyle/>
+          <a:p>
+            <a:r>
+              <a:rPr lang="en-LU" sz="1200" dirty="0"/>
+              <a:t> </a:t>
+            </a:r>
+          </a:p>
+        </p:txBody>
+      </p:sp>
+      <p:sp>
+        <p:nvSpPr>
+          <p:cNvPr id="23" name="TextBox 22">
+            <a:extLst>
+              <a:ext uri="{FF2B5EF4-FFF2-40B4-BE49-F238E27FC236}">
+                <a16:creationId xmlns:a16="http://schemas.microsoft.com/office/drawing/2014/main" id="{BDAE58C0-460F-8C41-B4DD-2FD33CE67A94}"/>
+              </a:ext>
+            </a:extLst>
+          </p:cNvPr>
+          <p:cNvSpPr txBox="1"/>
+          <p:nvPr/>
+        </p:nvSpPr>
+        <p:spPr>
+          <a:xfrm>
+            <a:off x="5008673" y="3163131"/>
+            <a:ext cx="2350069" cy="762193"/>
+          </a:xfrm>
+          <a:prstGeom prst="rect">
+            <a:avLst/>
+          </a:prstGeom>
+          <a:noFill/>
+          <a:ln>
+            <a:solidFill>
+              <a:schemeClr val="accent1"/>
+            </a:solidFill>
+          </a:ln>
+        </p:spPr>
+        <p:txBody>
+          <a:bodyPr wrap="none" rtlCol="0">
+            <a:noAutofit/>
+          </a:bodyPr>
+          <a:lstStyle/>
+          <a:p>
+            <a:r>
+              <a:rPr lang="en-US" sz="1600" dirty="0" err="1"/>
+              <a:t>Pepito.sol</a:t>
+            </a:r>
+            <a:endParaRPr lang="en-US" sz="1600" dirty="0"/>
+          </a:p>
+          <a:p>
+            <a:pPr marL="171450" indent="-171450">
+              <a:buFont typeface="Arial" panose="020B0604020202020204" pitchFamily="34" charset="0"/>
+              <a:buChar char="•"/>
+            </a:pPr>
+            <a:r>
+              <a:rPr lang="en-US" sz="1200" dirty="0"/>
+              <a:t> </a:t>
+            </a:r>
+            <a:r>
+              <a:rPr lang="en-US" sz="1200" dirty="0" err="1"/>
+              <a:t>uint</a:t>
+            </a:r>
+            <a:r>
+              <a:rPr lang="en-US" sz="1200" dirty="0"/>
+              <a:t> public </a:t>
+            </a:r>
+            <a:r>
+              <a:rPr lang="en-US" sz="1200" dirty="0" err="1"/>
+              <a:t>tokenBalance</a:t>
+            </a:r>
+            <a:r>
+              <a:rPr lang="en-US" sz="1200" dirty="0"/>
+              <a:t>;</a:t>
+            </a:r>
+          </a:p>
+        </p:txBody>
+      </p:sp>
+      <p:sp>
+        <p:nvSpPr>
+          <p:cNvPr id="24" name="TextBox 23">
+            <a:extLst>
+              <a:ext uri="{FF2B5EF4-FFF2-40B4-BE49-F238E27FC236}">
+                <a16:creationId xmlns:a16="http://schemas.microsoft.com/office/drawing/2014/main" id="{1487B54F-F9AD-F049-AEF8-EC2A64E26DEE}"/>
+              </a:ext>
+            </a:extLst>
+          </p:cNvPr>
+          <p:cNvSpPr txBox="1"/>
+          <p:nvPr/>
+        </p:nvSpPr>
+        <p:spPr>
+          <a:xfrm>
+            <a:off x="6096622" y="3468977"/>
+            <a:ext cx="555171" cy="190800"/>
+          </a:xfrm>
+          <a:prstGeom prst="rect">
+            <a:avLst/>
+          </a:prstGeom>
+          <a:noFill/>
+          <a:ln>
+            <a:noFill/>
+          </a:ln>
+        </p:spPr>
+        <p:txBody>
+          <a:bodyPr wrap="square" tIns="3600" bIns="3600" rtlCol="0">
+            <a:spAutoFit/>
+          </a:bodyPr>
+          <a:lstStyle/>
+          <a:p>
+            <a:r>
+              <a:rPr lang="en-LU" sz="1200" dirty="0"/>
+              <a:t> </a:t>
+            </a:r>
+          </a:p>
+        </p:txBody>
+      </p:sp>
+      <p:cxnSp>
+        <p:nvCxnSpPr>
+          <p:cNvPr id="25" name="Elbow Connector 24">
+            <a:extLst>
+              <a:ext uri="{FF2B5EF4-FFF2-40B4-BE49-F238E27FC236}">
+                <a16:creationId xmlns:a16="http://schemas.microsoft.com/office/drawing/2014/main" id="{AF3DB3BA-A47D-1D45-BBDC-F0D3A3E41F1A}"/>
+              </a:ext>
+            </a:extLst>
+          </p:cNvPr>
+          <p:cNvCxnSpPr>
+            <a:cxnSpLocks/>
+            <a:stCxn id="31" idx="2"/>
+            <a:endCxn id="24" idx="0"/>
+          </p:cNvCxnSpPr>
+          <p:nvPr/>
+        </p:nvCxnSpPr>
+        <p:spPr>
+          <a:xfrm rot="5400000">
+            <a:off x="5905911" y="2358421"/>
+            <a:ext cx="1578853" cy="642258"/>
+          </a:xfrm>
+          <a:prstGeom prst="bentConnector3">
+            <a:avLst>
+              <a:gd name="adj1" fmla="val 50000"/>
+            </a:avLst>
+          </a:prstGeom>
+          <a:ln w="12700">
+            <a:tailEnd type="triangle"/>
+          </a:ln>
+        </p:spPr>
+        <p:style>
+          <a:lnRef idx="1">
+            <a:schemeClr val="accent1"/>
+          </a:lnRef>
+          <a:fillRef idx="0">
+            <a:schemeClr val="accent1"/>
+          </a:fillRef>
+          <a:effectRef idx="0">
+            <a:schemeClr val="accent1"/>
+          </a:effectRef>
+          <a:fontRef idx="minor">
+            <a:schemeClr val="tx1"/>
+          </a:fontRef>
+        </p:style>
+      </p:cxnSp>
+      <p:sp>
+        <p:nvSpPr>
+          <p:cNvPr id="30" name="TextBox 29">
+            <a:extLst>
+              <a:ext uri="{FF2B5EF4-FFF2-40B4-BE49-F238E27FC236}">
+                <a16:creationId xmlns:a16="http://schemas.microsoft.com/office/drawing/2014/main" id="{62851F09-D6EF-C541-AAC9-ECE8CEFDDFEE}"/>
+              </a:ext>
+            </a:extLst>
+          </p:cNvPr>
+          <p:cNvSpPr txBox="1"/>
+          <p:nvPr/>
+        </p:nvSpPr>
+        <p:spPr>
+          <a:xfrm>
+            <a:off x="4049484" y="1240778"/>
+            <a:ext cx="3962401" cy="762193"/>
+          </a:xfrm>
+          <a:prstGeom prst="rect">
+            <a:avLst/>
+          </a:prstGeom>
+          <a:noFill/>
+          <a:ln>
+            <a:solidFill>
+              <a:schemeClr val="accent1"/>
+            </a:solidFill>
+          </a:ln>
+        </p:spPr>
+        <p:txBody>
+          <a:bodyPr wrap="none" rtlCol="0">
+            <a:noAutofit/>
+          </a:bodyPr>
+          <a:lstStyle/>
+          <a:p>
+            <a:r>
+              <a:rPr lang="en-US" sz="1600" dirty="0" err="1"/>
+              <a:t>PepitoDisguiseTest.js</a:t>
+            </a:r>
+            <a:endParaRPr lang="en-US" sz="1600" dirty="0"/>
+          </a:p>
+          <a:p>
+            <a:r>
+              <a:rPr lang="en-US" sz="1200" dirty="0" err="1"/>
+              <a:t>disguiseInstance</a:t>
+            </a:r>
+            <a:r>
+              <a:rPr lang="en-US" sz="1200" dirty="0"/>
+              <a:t> = await </a:t>
+            </a:r>
+            <a:r>
+              <a:rPr lang="en-US" sz="1200" dirty="0" err="1"/>
+              <a:t>PepitoDisguise.deployed</a:t>
+            </a:r>
+            <a:r>
+              <a:rPr lang="en-US" sz="1200" dirty="0"/>
+              <a:t>();</a:t>
+            </a:r>
+          </a:p>
+          <a:p>
+            <a:r>
+              <a:rPr lang="en-US" sz="1200" dirty="0"/>
+              <a:t>const tokenBalance1 = await </a:t>
+            </a:r>
+            <a:r>
+              <a:rPr lang="en-US" sz="1200" dirty="0" err="1"/>
+              <a:t>disguiseInstance.tokenBalance</a:t>
+            </a:r>
+            <a:r>
+              <a:rPr lang="en-US" sz="1200" dirty="0"/>
+              <a:t>();</a:t>
+            </a:r>
+          </a:p>
+        </p:txBody>
+      </p:sp>
+      <p:sp>
+        <p:nvSpPr>
+          <p:cNvPr id="31" name="TextBox 30">
+            <a:extLst>
+              <a:ext uri="{FF2B5EF4-FFF2-40B4-BE49-F238E27FC236}">
+                <a16:creationId xmlns:a16="http://schemas.microsoft.com/office/drawing/2014/main" id="{85C567CF-AA03-FD4E-B38E-F17FD1620E3B}"/>
+              </a:ext>
+            </a:extLst>
+          </p:cNvPr>
+          <p:cNvSpPr txBox="1"/>
+          <p:nvPr/>
+        </p:nvSpPr>
+        <p:spPr>
+          <a:xfrm>
+            <a:off x="6738880" y="1699324"/>
+            <a:ext cx="555171" cy="190800"/>
+          </a:xfrm>
+          <a:prstGeom prst="rect">
+            <a:avLst/>
+          </a:prstGeom>
+          <a:noFill/>
+          <a:ln>
+            <a:noFill/>
+          </a:ln>
+        </p:spPr>
+        <p:txBody>
+          <a:bodyPr wrap="square" tIns="3600" bIns="3600" rtlCol="0">
+            <a:spAutoFit/>
+          </a:bodyPr>
+          <a:lstStyle/>
+          <a:p>
+            <a:r>
+              <a:rPr lang="en-LU" sz="1200" dirty="0"/>
+              <a:t> </a:t>
+            </a:r>
+          </a:p>
+        </p:txBody>
+      </p:sp>
+      <p:sp>
+        <p:nvSpPr>
+          <p:cNvPr id="32" name="TextBox 31">
+            <a:extLst>
+              <a:ext uri="{FF2B5EF4-FFF2-40B4-BE49-F238E27FC236}">
+                <a16:creationId xmlns:a16="http://schemas.microsoft.com/office/drawing/2014/main" id="{35477E44-3A40-4647-9509-101AD8B0F66C}"/>
+              </a:ext>
+            </a:extLst>
+          </p:cNvPr>
+          <p:cNvSpPr txBox="1"/>
+          <p:nvPr/>
+        </p:nvSpPr>
+        <p:spPr>
+          <a:xfrm>
+            <a:off x="2527352" y="5611713"/>
+            <a:ext cx="3144105" cy="762193"/>
+          </a:xfrm>
+          <a:prstGeom prst="rect">
+            <a:avLst/>
+          </a:prstGeom>
+          <a:noFill/>
+          <a:ln>
+            <a:solidFill>
+              <a:schemeClr val="accent1"/>
+            </a:solidFill>
+          </a:ln>
+        </p:spPr>
+        <p:txBody>
+          <a:bodyPr wrap="none" rtlCol="0">
+            <a:noAutofit/>
+          </a:bodyPr>
+          <a:lstStyle/>
+          <a:p>
+            <a:r>
+              <a:rPr lang="en-US" sz="1600" dirty="0" err="1"/>
+              <a:t>PepitoDisguise.sol</a:t>
+            </a:r>
+            <a:endParaRPr lang="en-US" sz="1600" dirty="0"/>
+          </a:p>
+          <a:p>
+            <a:pPr marL="171450" indent="-171450">
+              <a:buFont typeface="Arial" panose="020B0604020202020204" pitchFamily="34" charset="0"/>
+              <a:buChar char="•"/>
+            </a:pPr>
+            <a:r>
+              <a:rPr lang="en-US" sz="1200" dirty="0"/>
+              <a:t> </a:t>
+            </a:r>
+            <a:r>
+              <a:rPr lang="en-US" sz="1200" dirty="0" err="1"/>
+              <a:t>storeDisguise</a:t>
+            </a:r>
+            <a:r>
+              <a:rPr lang="en-US" sz="1200" dirty="0"/>
+              <a:t>(</a:t>
+            </a:r>
+            <a:r>
+              <a:rPr lang="en-US" sz="1200" dirty="0" err="1"/>
+              <a:t>uint</a:t>
+            </a:r>
+            <a:r>
+              <a:rPr lang="en-US" sz="1200" dirty="0"/>
+              <a:t>[12]memory _disguise) {};</a:t>
+            </a:r>
+          </a:p>
+        </p:txBody>
+      </p:sp>
+      <p:sp>
+        <p:nvSpPr>
+          <p:cNvPr id="33" name="TextBox 32">
+            <a:extLst>
+              <a:ext uri="{FF2B5EF4-FFF2-40B4-BE49-F238E27FC236}">
+                <a16:creationId xmlns:a16="http://schemas.microsoft.com/office/drawing/2014/main" id="{498EA60F-05E7-2644-8BF4-598F3DB06BDB}"/>
+              </a:ext>
+            </a:extLst>
+          </p:cNvPr>
+          <p:cNvSpPr txBox="1"/>
+          <p:nvPr/>
+        </p:nvSpPr>
+        <p:spPr>
+          <a:xfrm>
+            <a:off x="3615301" y="5917559"/>
+            <a:ext cx="555171" cy="190800"/>
+          </a:xfrm>
+          <a:prstGeom prst="rect">
+            <a:avLst/>
+          </a:prstGeom>
+          <a:noFill/>
+          <a:ln>
+            <a:noFill/>
+          </a:ln>
+        </p:spPr>
+        <p:txBody>
+          <a:bodyPr wrap="square" tIns="3600" bIns="3600" rtlCol="0">
+            <a:spAutoFit/>
+          </a:bodyPr>
+          <a:lstStyle/>
+          <a:p>
+            <a:r>
+              <a:rPr lang="en-LU" sz="1200" dirty="0"/>
+              <a:t> </a:t>
+            </a:r>
+          </a:p>
+        </p:txBody>
+      </p:sp>
+      <p:cxnSp>
+        <p:nvCxnSpPr>
+          <p:cNvPr id="34" name="Elbow Connector 33">
+            <a:extLst>
+              <a:ext uri="{FF2B5EF4-FFF2-40B4-BE49-F238E27FC236}">
+                <a16:creationId xmlns:a16="http://schemas.microsoft.com/office/drawing/2014/main" id="{9D21DBAD-EA46-DA41-943D-9DAB7E26AF1C}"/>
+              </a:ext>
+            </a:extLst>
+          </p:cNvPr>
+          <p:cNvCxnSpPr>
+            <a:cxnSpLocks/>
+            <a:stCxn id="37" idx="2"/>
+            <a:endCxn id="33" idx="0"/>
+          </p:cNvCxnSpPr>
+          <p:nvPr/>
+        </p:nvCxnSpPr>
+        <p:spPr>
+          <a:xfrm rot="16200000" flipH="1">
+            <a:off x="3208848" y="5233520"/>
+            <a:ext cx="1062656" cy="305421"/>
+          </a:xfrm>
+          <a:prstGeom prst="bentConnector3">
+            <a:avLst>
+              <a:gd name="adj1" fmla="val 50000"/>
+            </a:avLst>
+          </a:prstGeom>
+          <a:ln w="12700">
+            <a:tailEnd type="triangle"/>
+          </a:ln>
+        </p:spPr>
+        <p:style>
+          <a:lnRef idx="1">
+            <a:schemeClr val="accent1"/>
+          </a:lnRef>
+          <a:fillRef idx="0">
+            <a:schemeClr val="accent1"/>
+          </a:fillRef>
+          <a:effectRef idx="0">
+            <a:schemeClr val="accent1"/>
+          </a:effectRef>
+          <a:fontRef idx="minor">
+            <a:schemeClr val="tx1"/>
+          </a:fontRef>
+        </p:style>
+      </p:cxnSp>
+      <p:sp>
+        <p:nvSpPr>
+          <p:cNvPr id="36" name="TextBox 35">
+            <a:extLst>
+              <a:ext uri="{FF2B5EF4-FFF2-40B4-BE49-F238E27FC236}">
+                <a16:creationId xmlns:a16="http://schemas.microsoft.com/office/drawing/2014/main" id="{7A1D3A3F-98BD-E943-9D0D-B6A09D391DCC}"/>
+              </a:ext>
+            </a:extLst>
+          </p:cNvPr>
+          <p:cNvSpPr txBox="1"/>
+          <p:nvPr/>
+        </p:nvSpPr>
+        <p:spPr>
+          <a:xfrm>
+            <a:off x="620485" y="4205557"/>
+            <a:ext cx="3962401" cy="949809"/>
+          </a:xfrm>
+          <a:prstGeom prst="rect">
+            <a:avLst/>
+          </a:prstGeom>
+          <a:noFill/>
+          <a:ln>
+            <a:solidFill>
+              <a:schemeClr val="accent1"/>
+            </a:solidFill>
+          </a:ln>
+        </p:spPr>
+        <p:txBody>
+          <a:bodyPr wrap="none" rtlCol="0">
+            <a:noAutofit/>
+          </a:bodyPr>
+          <a:lstStyle/>
+          <a:p>
+            <a:r>
+              <a:rPr lang="en-US" sz="1600" dirty="0" err="1"/>
+              <a:t>TestMakeDisguise.sol</a:t>
+            </a:r>
+            <a:endParaRPr lang="en-US" sz="1600" dirty="0"/>
+          </a:p>
+          <a:p>
+            <a:r>
+              <a:rPr lang="en-US" sz="1200" dirty="0"/>
+              <a:t>disguise = [1, 2, 3, 4, 5, 6, 7, 8, 9, 10, 11]</a:t>
+            </a:r>
+          </a:p>
+          <a:p>
+            <a:r>
+              <a:rPr lang="en-US" sz="1200" dirty="0" err="1"/>
+              <a:t>PepitoDisguise</a:t>
+            </a:r>
+            <a:r>
+              <a:rPr lang="en-US" sz="1200" dirty="0"/>
+              <a:t> </a:t>
+            </a:r>
+            <a:r>
+              <a:rPr lang="en-US" sz="1200" dirty="0" err="1"/>
+              <a:t>pepitoDisguise</a:t>
+            </a:r>
+            <a:r>
+              <a:rPr lang="en-US" sz="1200" dirty="0"/>
+              <a:t> = new </a:t>
+            </a:r>
+            <a:r>
+              <a:rPr lang="en-US" sz="1200" dirty="0" err="1"/>
+              <a:t>PepitoDisguise</a:t>
+            </a:r>
+            <a:r>
+              <a:rPr lang="en-US" sz="1200" dirty="0"/>
+              <a:t>(owner);</a:t>
+            </a:r>
+          </a:p>
+          <a:p>
+            <a:r>
+              <a:rPr lang="en-US" sz="1200" dirty="0"/>
+              <a:t>const </a:t>
+            </a:r>
+            <a:r>
+              <a:rPr lang="en-US" sz="1200" dirty="0" err="1"/>
+              <a:t>ownerPepito</a:t>
+            </a:r>
+            <a:r>
+              <a:rPr lang="en-US" sz="1200" dirty="0"/>
+              <a:t> = </a:t>
+            </a:r>
+            <a:r>
+              <a:rPr lang="en-US" sz="1200" dirty="0" err="1"/>
+              <a:t>pepitoDisguise.storeDisguise</a:t>
+            </a:r>
+            <a:r>
+              <a:rPr lang="en-US" sz="1200" dirty="0"/>
+              <a:t>();</a:t>
+            </a:r>
+          </a:p>
+        </p:txBody>
+      </p:sp>
+      <p:sp>
+        <p:nvSpPr>
+          <p:cNvPr id="37" name="TextBox 36">
+            <a:extLst>
+              <a:ext uri="{FF2B5EF4-FFF2-40B4-BE49-F238E27FC236}">
+                <a16:creationId xmlns:a16="http://schemas.microsoft.com/office/drawing/2014/main" id="{62CF477C-5CF8-824E-8B1B-66ACD1E4714A}"/>
+              </a:ext>
+            </a:extLst>
+          </p:cNvPr>
+          <p:cNvSpPr txBox="1"/>
+          <p:nvPr/>
+        </p:nvSpPr>
+        <p:spPr>
+          <a:xfrm>
+            <a:off x="3309880" y="4664103"/>
+            <a:ext cx="555171" cy="190800"/>
+          </a:xfrm>
+          <a:prstGeom prst="rect">
+            <a:avLst/>
+          </a:prstGeom>
+          <a:noFill/>
+          <a:ln>
+            <a:noFill/>
+          </a:ln>
+        </p:spPr>
+        <p:txBody>
+          <a:bodyPr wrap="square" tIns="3600" bIns="3600" rtlCol="0">
+            <a:spAutoFit/>
+          </a:bodyPr>
+          <a:lstStyle/>
+          <a:p>
+            <a:r>
+              <a:rPr lang="en-LU" sz="1200" dirty="0"/>
+              <a:t> </a:t>
+            </a:r>
+          </a:p>
+        </p:txBody>
+      </p:sp>
+    </p:spTree>
+    <p:extLst>
+      <p:ext uri="{BB962C8B-B14F-4D97-AF65-F5344CB8AC3E}">
+        <p14:creationId xmlns:p14="http://schemas.microsoft.com/office/powerpoint/2010/main" val="733256099"/>
       </p:ext>
     </p:extLst>
   </p:cSld>

</xml_diff>

<commit_message>
update after ETH Denver
</commit_message>
<xml_diff>
--- a/Pepito/Final Project Design.pptx
+++ b/Pepito/Final Project Design.pptx
@@ -204,7 +204,7 @@
           <a:p>
             <a:fld id="{E3DEDAA8-261D-1A48-9864-3FC231515C43}" type="datetimeFigureOut">
               <a:rPr lang="en-LU" smtClean="0"/>
-              <a:t>27/01/2021</a:t>
+              <a:t>06/02/2021</a:t>
             </a:fld>
             <a:endParaRPr lang="en-LU"/>
           </a:p>
@@ -1209,7 +1209,7 @@
           <a:p>
             <a:fld id="{9ECEDF27-B25B-0343-A39C-1905A44EF111}" type="datetimeFigureOut">
               <a:rPr lang="en-LU" smtClean="0"/>
-              <a:t>27/01/2021</a:t>
+              <a:t>06/02/2021</a:t>
             </a:fld>
             <a:endParaRPr lang="en-LU"/>
           </a:p>
@@ -1409,7 +1409,7 @@
           <a:p>
             <a:fld id="{9ECEDF27-B25B-0343-A39C-1905A44EF111}" type="datetimeFigureOut">
               <a:rPr lang="en-LU" smtClean="0"/>
-              <a:t>27/01/2021</a:t>
+              <a:t>06/02/2021</a:t>
             </a:fld>
             <a:endParaRPr lang="en-LU"/>
           </a:p>
@@ -1619,7 +1619,7 @@
           <a:p>
             <a:fld id="{9ECEDF27-B25B-0343-A39C-1905A44EF111}" type="datetimeFigureOut">
               <a:rPr lang="en-LU" smtClean="0"/>
-              <a:t>27/01/2021</a:t>
+              <a:t>06/02/2021</a:t>
             </a:fld>
             <a:endParaRPr lang="en-LU"/>
           </a:p>
@@ -1819,7 +1819,7 @@
           <a:p>
             <a:fld id="{9ECEDF27-B25B-0343-A39C-1905A44EF111}" type="datetimeFigureOut">
               <a:rPr lang="en-LU" smtClean="0"/>
-              <a:t>27/01/2021</a:t>
+              <a:t>06/02/2021</a:t>
             </a:fld>
             <a:endParaRPr lang="en-LU"/>
           </a:p>
@@ -2095,7 +2095,7 @@
           <a:p>
             <a:fld id="{9ECEDF27-B25B-0343-A39C-1905A44EF111}" type="datetimeFigureOut">
               <a:rPr lang="en-LU" smtClean="0"/>
-              <a:t>27/01/2021</a:t>
+              <a:t>06/02/2021</a:t>
             </a:fld>
             <a:endParaRPr lang="en-LU"/>
           </a:p>
@@ -2363,7 +2363,7 @@
           <a:p>
             <a:fld id="{9ECEDF27-B25B-0343-A39C-1905A44EF111}" type="datetimeFigureOut">
               <a:rPr lang="en-LU" smtClean="0"/>
-              <a:t>27/01/2021</a:t>
+              <a:t>06/02/2021</a:t>
             </a:fld>
             <a:endParaRPr lang="en-LU"/>
           </a:p>
@@ -2778,7 +2778,7 @@
           <a:p>
             <a:fld id="{9ECEDF27-B25B-0343-A39C-1905A44EF111}" type="datetimeFigureOut">
               <a:rPr lang="en-LU" smtClean="0"/>
-              <a:t>27/01/2021</a:t>
+              <a:t>06/02/2021</a:t>
             </a:fld>
             <a:endParaRPr lang="en-LU"/>
           </a:p>
@@ -2920,7 +2920,7 @@
           <a:p>
             <a:fld id="{9ECEDF27-B25B-0343-A39C-1905A44EF111}" type="datetimeFigureOut">
               <a:rPr lang="en-LU" smtClean="0"/>
-              <a:t>27/01/2021</a:t>
+              <a:t>06/02/2021</a:t>
             </a:fld>
             <a:endParaRPr lang="en-LU"/>
           </a:p>
@@ -3033,7 +3033,7 @@
           <a:p>
             <a:fld id="{9ECEDF27-B25B-0343-A39C-1905A44EF111}" type="datetimeFigureOut">
               <a:rPr lang="en-LU" smtClean="0"/>
-              <a:t>27/01/2021</a:t>
+              <a:t>06/02/2021</a:t>
             </a:fld>
             <a:endParaRPr lang="en-LU"/>
           </a:p>
@@ -3346,7 +3346,7 @@
           <a:p>
             <a:fld id="{9ECEDF27-B25B-0343-A39C-1905A44EF111}" type="datetimeFigureOut">
               <a:rPr lang="en-LU" smtClean="0"/>
-              <a:t>27/01/2021</a:t>
+              <a:t>06/02/2021</a:t>
             </a:fld>
             <a:endParaRPr lang="en-LU"/>
           </a:p>
@@ -3635,7 +3635,7 @@
           <a:p>
             <a:fld id="{9ECEDF27-B25B-0343-A39C-1905A44EF111}" type="datetimeFigureOut">
               <a:rPr lang="en-LU" smtClean="0"/>
-              <a:t>27/01/2021</a:t>
+              <a:t>06/02/2021</a:t>
             </a:fld>
             <a:endParaRPr lang="en-LU"/>
           </a:p>
@@ -3878,7 +3878,7 @@
           <a:p>
             <a:fld id="{9ECEDF27-B25B-0343-A39C-1905A44EF111}" type="datetimeFigureOut">
               <a:rPr lang="en-LU" smtClean="0"/>
-              <a:t>27/01/2021</a:t>
+              <a:t>06/02/2021</a:t>
             </a:fld>
             <a:endParaRPr lang="en-LU"/>
           </a:p>
@@ -6485,6 +6485,180 @@
           </a:fontRef>
         </p:style>
       </p:cxnSp>
+      <p:sp>
+        <p:nvSpPr>
+          <p:cNvPr id="72" name="TextBox 71">
+            <a:extLst>
+              <a:ext uri="{FF2B5EF4-FFF2-40B4-BE49-F238E27FC236}">
+                <a16:creationId xmlns:a16="http://schemas.microsoft.com/office/drawing/2014/main" id="{2E059FB4-EBCC-4944-BA05-47140241A75C}"/>
+              </a:ext>
+            </a:extLst>
+          </p:cNvPr>
+          <p:cNvSpPr txBox="1"/>
+          <p:nvPr/>
+        </p:nvSpPr>
+        <p:spPr>
+          <a:xfrm>
+            <a:off x="8750575" y="4691647"/>
+            <a:ext cx="647934" cy="261610"/>
+          </a:xfrm>
+          <a:prstGeom prst="rect">
+            <a:avLst/>
+          </a:prstGeom>
+          <a:noFill/>
+        </p:spPr>
+        <p:txBody>
+          <a:bodyPr wrap="none" rtlCol="0">
+            <a:spAutoFit/>
+          </a:bodyPr>
+          <a:lstStyle/>
+          <a:p>
+            <a:r>
+              <a:rPr lang="fr-FR" sz="1100" dirty="0">
+                <a:solidFill>
+                  <a:schemeClr val="bg1">
+                    <a:lumMod val="65000"/>
+                  </a:schemeClr>
+                </a:solidFill>
+              </a:rPr>
+              <a:t>n</a:t>
+            </a:r>
+            <a:r>
+              <a:rPr lang="fr-FR" sz="1100" i="1" dirty="0">
+                <a:solidFill>
+                  <a:schemeClr val="bg1">
+                    <a:lumMod val="65000"/>
+                  </a:schemeClr>
+                </a:solidFill>
+              </a:rPr>
+              <a:t> copies</a:t>
+            </a:r>
+            <a:endParaRPr lang="en-LU" sz="1100" i="1" dirty="0">
+              <a:solidFill>
+                <a:schemeClr val="bg1">
+                  <a:lumMod val="65000"/>
+                </a:schemeClr>
+              </a:solidFill>
+            </a:endParaRPr>
+          </a:p>
+        </p:txBody>
+      </p:sp>
+      <p:sp>
+        <p:nvSpPr>
+          <p:cNvPr id="73" name="TextBox 72">
+            <a:extLst>
+              <a:ext uri="{FF2B5EF4-FFF2-40B4-BE49-F238E27FC236}">
+                <a16:creationId xmlns:a16="http://schemas.microsoft.com/office/drawing/2014/main" id="{574331DF-3F9B-D446-A6A6-3BF5462BEBCC}"/>
+              </a:ext>
+            </a:extLst>
+          </p:cNvPr>
+          <p:cNvSpPr txBox="1"/>
+          <p:nvPr/>
+        </p:nvSpPr>
+        <p:spPr>
+          <a:xfrm>
+            <a:off x="8750575" y="5148845"/>
+            <a:ext cx="647934" cy="261610"/>
+          </a:xfrm>
+          <a:prstGeom prst="rect">
+            <a:avLst/>
+          </a:prstGeom>
+          <a:noFill/>
+        </p:spPr>
+        <p:txBody>
+          <a:bodyPr wrap="none" rtlCol="0">
+            <a:spAutoFit/>
+          </a:bodyPr>
+          <a:lstStyle/>
+          <a:p>
+            <a:r>
+              <a:rPr lang="fr-FR" sz="1100" dirty="0">
+                <a:solidFill>
+                  <a:schemeClr val="bg1">
+                    <a:lumMod val="65000"/>
+                  </a:schemeClr>
+                </a:solidFill>
+              </a:rPr>
+              <a:t>n</a:t>
+            </a:r>
+            <a:r>
+              <a:rPr lang="fr-FR" sz="1100" i="1" dirty="0">
+                <a:solidFill>
+                  <a:schemeClr val="bg1">
+                    <a:lumMod val="65000"/>
+                  </a:schemeClr>
+                </a:solidFill>
+              </a:rPr>
+              <a:t> copies</a:t>
+            </a:r>
+            <a:endParaRPr lang="en-LU" sz="1100" i="1" dirty="0">
+              <a:solidFill>
+                <a:schemeClr val="bg1">
+                  <a:lumMod val="65000"/>
+                </a:schemeClr>
+              </a:solidFill>
+            </a:endParaRPr>
+          </a:p>
+        </p:txBody>
+      </p:sp>
+      <p:sp>
+        <p:nvSpPr>
+          <p:cNvPr id="74" name="TextBox 73">
+            <a:extLst>
+              <a:ext uri="{FF2B5EF4-FFF2-40B4-BE49-F238E27FC236}">
+                <a16:creationId xmlns:a16="http://schemas.microsoft.com/office/drawing/2014/main" id="{7000E252-63CC-DC4C-83DB-8B8F5FFE8D53}"/>
+              </a:ext>
+            </a:extLst>
+          </p:cNvPr>
+          <p:cNvSpPr txBox="1"/>
+          <p:nvPr/>
+        </p:nvSpPr>
+        <p:spPr>
+          <a:xfrm>
+            <a:off x="8750575" y="5595157"/>
+            <a:ext cx="647934" cy="261610"/>
+          </a:xfrm>
+          <a:prstGeom prst="rect">
+            <a:avLst/>
+          </a:prstGeom>
+          <a:noFill/>
+        </p:spPr>
+        <p:txBody>
+          <a:bodyPr wrap="none" rtlCol="0">
+            <a:spAutoFit/>
+          </a:bodyPr>
+          <a:lstStyle/>
+          <a:p>
+            <a:r>
+              <a:rPr lang="fr-FR" sz="1100" dirty="0">
+                <a:solidFill>
+                  <a:schemeClr val="bg1">
+                    <a:lumMod val="65000"/>
+                  </a:schemeClr>
+                </a:solidFill>
+              </a:rPr>
+              <a:t>n</a:t>
+            </a:r>
+            <a:r>
+              <a:rPr lang="fr-FR" sz="1100" i="1" dirty="0">
+                <a:solidFill>
+                  <a:schemeClr val="bg1">
+                    <a:lumMod val="65000"/>
+                  </a:schemeClr>
+                </a:solidFill>
+              </a:rPr>
+              <a:t> copies</a:t>
+            </a:r>
+            <a:endParaRPr lang="en-LU" sz="1100" i="1" dirty="0">
+              <a:solidFill>
+                <a:schemeClr val="bg1">
+                  <a:lumMod val="65000"/>
+                </a:schemeClr>
+              </a:solidFill>
+            </a:endParaRPr>
+          </a:p>
+        </p:txBody>
+      </p:sp>
     </p:spTree>
     <p:extLst>
       <p:ext uri="{BB962C8B-B14F-4D97-AF65-F5344CB8AC3E}">

</xml_diff>

<commit_message>
use Metamask account to pay disguise creation & storage
</commit_message>
<xml_diff>
--- a/Pepito/Final Project Design.pptx
+++ b/Pepito/Final Project Design.pptx
@@ -5,7 +5,7 @@
     <p:sldMasterId id="2147483648" r:id="rId1"/>
   </p:sldMasterIdLst>
   <p:notesMasterIdLst>
-    <p:notesMasterId r:id="rId11"/>
+    <p:notesMasterId r:id="rId12"/>
   </p:notesMasterIdLst>
   <p:sldIdLst>
     <p:sldId id="256" r:id="rId2"/>
@@ -17,6 +17,7 @@
     <p:sldId id="268" r:id="rId8"/>
     <p:sldId id="271" r:id="rId9"/>
     <p:sldId id="272" r:id="rId10"/>
+    <p:sldId id="273" r:id="rId11"/>
   </p:sldIdLst>
   <p:sldSz cx="12192000" cy="6858000"/>
   <p:notesSz cx="6858000" cy="9144000"/>
@@ -205,7 +206,7 @@
           <a:p>
             <a:fld id="{E3DEDAA8-261D-1A48-9864-3FC231515C43}" type="datetimeFigureOut">
               <a:rPr lang="en-LU" smtClean="0"/>
-              <a:t>13/03/2021</a:t>
+              <a:t>05/04/2021</a:t>
             </a:fld>
             <a:endParaRPr lang="en-LU"/>
           </a:p>
@@ -1145,6 +1146,90 @@
 </p:notes>
 </file>
 
+<file path=ppt/notesSlides/notesSlide9.xml><?xml version="1.0" encoding="utf-8"?>
+<p:notes xmlns:a="http://schemas.openxmlformats.org/drawingml/2006/main" xmlns:r="http://schemas.openxmlformats.org/officeDocument/2006/relationships" xmlns:p="http://schemas.openxmlformats.org/presentationml/2006/main">
+  <p:cSld>
+    <p:spTree>
+      <p:nvGrpSpPr>
+        <p:cNvPr id="1" name=""/>
+        <p:cNvGrpSpPr/>
+        <p:nvPr/>
+      </p:nvGrpSpPr>
+      <p:grpSpPr>
+        <a:xfrm>
+          <a:off x="0" y="0"/>
+          <a:ext cx="0" cy="0"/>
+          <a:chOff x="0" y="0"/>
+          <a:chExt cx="0" cy="0"/>
+        </a:xfrm>
+      </p:grpSpPr>
+      <p:sp>
+        <p:nvSpPr>
+          <p:cNvPr id="2" name="Slide Image Placeholder 1"/>
+          <p:cNvSpPr>
+            <a:spLocks noGrp="1" noRot="1" noChangeAspect="1"/>
+          </p:cNvSpPr>
+          <p:nvPr>
+            <p:ph type="sldImg"/>
+          </p:nvPr>
+        </p:nvSpPr>
+        <p:spPr/>
+      </p:sp>
+      <p:sp>
+        <p:nvSpPr>
+          <p:cNvPr id="3" name="Notes Placeholder 2"/>
+          <p:cNvSpPr>
+            <a:spLocks noGrp="1"/>
+          </p:cNvSpPr>
+          <p:nvPr>
+            <p:ph type="body" idx="1"/>
+          </p:nvPr>
+        </p:nvSpPr>
+        <p:spPr/>
+        <p:txBody>
+          <a:bodyPr/>
+          <a:lstStyle/>
+          <a:p>
+            <a:endParaRPr lang="en-LU" dirty="0"/>
+          </a:p>
+        </p:txBody>
+      </p:sp>
+      <p:sp>
+        <p:nvSpPr>
+          <p:cNvPr id="4" name="Slide Number Placeholder 3"/>
+          <p:cNvSpPr>
+            <a:spLocks noGrp="1"/>
+          </p:cNvSpPr>
+          <p:nvPr>
+            <p:ph type="sldNum" sz="quarter" idx="5"/>
+          </p:nvPr>
+        </p:nvSpPr>
+        <p:spPr/>
+        <p:txBody>
+          <a:bodyPr/>
+          <a:lstStyle/>
+          <a:p>
+            <a:fld id="{F4E383B0-44CE-084D-AB54-AAB397A3DF4F}" type="slidenum">
+              <a:rPr lang="en-LU" smtClean="0"/>
+              <a:t>10</a:t>
+            </a:fld>
+            <a:endParaRPr lang="en-LU"/>
+          </a:p>
+        </p:txBody>
+      </p:sp>
+    </p:spTree>
+    <p:extLst>
+      <p:ext uri="{BB962C8B-B14F-4D97-AF65-F5344CB8AC3E}">
+        <p14:creationId xmlns:p14="http://schemas.microsoft.com/office/powerpoint/2010/main" val="756753231"/>
+      </p:ext>
+    </p:extLst>
+  </p:cSld>
+  <p:clrMapOvr>
+    <a:masterClrMapping/>
+  </p:clrMapOvr>
+</p:notes>
+</file>
+
 <file path=ppt/slideLayouts/slideLayout1.xml><?xml version="1.0" encoding="utf-8"?>
 <p:sldLayout xmlns:a="http://schemas.openxmlformats.org/drawingml/2006/main" xmlns:r="http://schemas.openxmlformats.org/officeDocument/2006/relationships" xmlns:p="http://schemas.openxmlformats.org/presentationml/2006/main" type="title" preserve="1">
   <p:cSld name="Title Slide">
@@ -1294,7 +1379,7 @@
           <a:p>
             <a:fld id="{9ECEDF27-B25B-0343-A39C-1905A44EF111}" type="datetimeFigureOut">
               <a:rPr lang="en-LU" smtClean="0"/>
-              <a:t>13/03/2021</a:t>
+              <a:t>05/04/2021</a:t>
             </a:fld>
             <a:endParaRPr lang="en-LU"/>
           </a:p>
@@ -1494,7 +1579,7 @@
           <a:p>
             <a:fld id="{9ECEDF27-B25B-0343-A39C-1905A44EF111}" type="datetimeFigureOut">
               <a:rPr lang="en-LU" smtClean="0"/>
-              <a:t>13/03/2021</a:t>
+              <a:t>05/04/2021</a:t>
             </a:fld>
             <a:endParaRPr lang="en-LU"/>
           </a:p>
@@ -1704,7 +1789,7 @@
           <a:p>
             <a:fld id="{9ECEDF27-B25B-0343-A39C-1905A44EF111}" type="datetimeFigureOut">
               <a:rPr lang="en-LU" smtClean="0"/>
-              <a:t>13/03/2021</a:t>
+              <a:t>05/04/2021</a:t>
             </a:fld>
             <a:endParaRPr lang="en-LU"/>
           </a:p>
@@ -1904,7 +1989,7 @@
           <a:p>
             <a:fld id="{9ECEDF27-B25B-0343-A39C-1905A44EF111}" type="datetimeFigureOut">
               <a:rPr lang="en-LU" smtClean="0"/>
-              <a:t>13/03/2021</a:t>
+              <a:t>05/04/2021</a:t>
             </a:fld>
             <a:endParaRPr lang="en-LU"/>
           </a:p>
@@ -2180,7 +2265,7 @@
           <a:p>
             <a:fld id="{9ECEDF27-B25B-0343-A39C-1905A44EF111}" type="datetimeFigureOut">
               <a:rPr lang="en-LU" smtClean="0"/>
-              <a:t>13/03/2021</a:t>
+              <a:t>05/04/2021</a:t>
             </a:fld>
             <a:endParaRPr lang="en-LU"/>
           </a:p>
@@ -2448,7 +2533,7 @@
           <a:p>
             <a:fld id="{9ECEDF27-B25B-0343-A39C-1905A44EF111}" type="datetimeFigureOut">
               <a:rPr lang="en-LU" smtClean="0"/>
-              <a:t>13/03/2021</a:t>
+              <a:t>05/04/2021</a:t>
             </a:fld>
             <a:endParaRPr lang="en-LU"/>
           </a:p>
@@ -2863,7 +2948,7 @@
           <a:p>
             <a:fld id="{9ECEDF27-B25B-0343-A39C-1905A44EF111}" type="datetimeFigureOut">
               <a:rPr lang="en-LU" smtClean="0"/>
-              <a:t>13/03/2021</a:t>
+              <a:t>05/04/2021</a:t>
             </a:fld>
             <a:endParaRPr lang="en-LU"/>
           </a:p>
@@ -3005,7 +3090,7 @@
           <a:p>
             <a:fld id="{9ECEDF27-B25B-0343-A39C-1905A44EF111}" type="datetimeFigureOut">
               <a:rPr lang="en-LU" smtClean="0"/>
-              <a:t>13/03/2021</a:t>
+              <a:t>05/04/2021</a:t>
             </a:fld>
             <a:endParaRPr lang="en-LU"/>
           </a:p>
@@ -3118,7 +3203,7 @@
           <a:p>
             <a:fld id="{9ECEDF27-B25B-0343-A39C-1905A44EF111}" type="datetimeFigureOut">
               <a:rPr lang="en-LU" smtClean="0"/>
-              <a:t>13/03/2021</a:t>
+              <a:t>05/04/2021</a:t>
             </a:fld>
             <a:endParaRPr lang="en-LU"/>
           </a:p>
@@ -3431,7 +3516,7 @@
           <a:p>
             <a:fld id="{9ECEDF27-B25B-0343-A39C-1905A44EF111}" type="datetimeFigureOut">
               <a:rPr lang="en-LU" smtClean="0"/>
-              <a:t>13/03/2021</a:t>
+              <a:t>05/04/2021</a:t>
             </a:fld>
             <a:endParaRPr lang="en-LU"/>
           </a:p>
@@ -3720,7 +3805,7 @@
           <a:p>
             <a:fld id="{9ECEDF27-B25B-0343-A39C-1905A44EF111}" type="datetimeFigureOut">
               <a:rPr lang="en-LU" smtClean="0"/>
-              <a:t>13/03/2021</a:t>
+              <a:t>05/04/2021</a:t>
             </a:fld>
             <a:endParaRPr lang="en-LU"/>
           </a:p>
@@ -3963,7 +4048,7 @@
           <a:p>
             <a:fld id="{9ECEDF27-B25B-0343-A39C-1905A44EF111}" type="datetimeFigureOut">
               <a:rPr lang="en-LU" smtClean="0"/>
-              <a:t>13/03/2021</a:t>
+              <a:t>05/04/2021</a:t>
             </a:fld>
             <a:endParaRPr lang="en-LU"/>
           </a:p>
@@ -6849,6 +6934,900 @@
 </p:sld>
 </file>
 
+<file path=ppt/slides/slide10.xml><?xml version="1.0" encoding="utf-8"?>
+<p:sld xmlns:a="http://schemas.openxmlformats.org/drawingml/2006/main" xmlns:r="http://schemas.openxmlformats.org/officeDocument/2006/relationships" xmlns:p="http://schemas.openxmlformats.org/presentationml/2006/main">
+  <p:cSld>
+    <p:spTree>
+      <p:nvGrpSpPr>
+        <p:cNvPr id="1" name=""/>
+        <p:cNvGrpSpPr/>
+        <p:nvPr/>
+      </p:nvGrpSpPr>
+      <p:grpSpPr>
+        <a:xfrm>
+          <a:off x="0" y="0"/>
+          <a:ext cx="0" cy="0"/>
+          <a:chOff x="0" y="0"/>
+          <a:chExt cx="0" cy="0"/>
+        </a:xfrm>
+      </p:grpSpPr>
+      <p:sp>
+        <p:nvSpPr>
+          <p:cNvPr id="4" name="TextBox 3">
+            <a:extLst>
+              <a:ext uri="{FF2B5EF4-FFF2-40B4-BE49-F238E27FC236}">
+                <a16:creationId xmlns:a16="http://schemas.microsoft.com/office/drawing/2014/main" id="{7B91D8D0-F88B-784E-8FF8-D5F07BC08546}"/>
+              </a:ext>
+            </a:extLst>
+          </p:cNvPr>
+          <p:cNvSpPr txBox="1"/>
+          <p:nvPr/>
+        </p:nvSpPr>
+        <p:spPr>
+          <a:xfrm>
+            <a:off x="620486" y="250372"/>
+            <a:ext cx="4767943" cy="594250"/>
+          </a:xfrm>
+          <a:prstGeom prst="rect">
+            <a:avLst/>
+          </a:prstGeom>
+          <a:solidFill>
+            <a:srgbClr val="E1EFD8"/>
+          </a:solidFill>
+        </p:spPr>
+        <p:txBody>
+          <a:bodyPr wrap="none" rtlCol="0" anchor="ctr" anchorCtr="0">
+            <a:noAutofit/>
+          </a:bodyPr>
+          <a:lstStyle/>
+          <a:p>
+            <a:r>
+              <a:rPr lang="en-US" b="1" dirty="0">
+                <a:solidFill>
+                  <a:srgbClr val="980000"/>
+                </a:solidFill>
+              </a:rPr>
+              <a:t>Sources of transaction funding</a:t>
+            </a:r>
+          </a:p>
+        </p:txBody>
+      </p:sp>
+      <p:sp>
+        <p:nvSpPr>
+          <p:cNvPr id="9" name="TextBox 8">
+            <a:extLst>
+              <a:ext uri="{FF2B5EF4-FFF2-40B4-BE49-F238E27FC236}">
+                <a16:creationId xmlns:a16="http://schemas.microsoft.com/office/drawing/2014/main" id="{A648BA86-9C0C-0846-A8F7-877203CF605C}"/>
+              </a:ext>
+            </a:extLst>
+          </p:cNvPr>
+          <p:cNvSpPr txBox="1"/>
+          <p:nvPr/>
+        </p:nvSpPr>
+        <p:spPr>
+          <a:xfrm>
+            <a:off x="4886727" y="1478041"/>
+            <a:ext cx="3005416" cy="647522"/>
+          </a:xfrm>
+          <a:prstGeom prst="rect">
+            <a:avLst/>
+          </a:prstGeom>
+          <a:noFill/>
+          <a:ln>
+            <a:solidFill>
+              <a:schemeClr val="accent1"/>
+            </a:solidFill>
+          </a:ln>
+        </p:spPr>
+        <p:txBody>
+          <a:bodyPr wrap="none" rtlCol="0">
+            <a:noAutofit/>
+          </a:bodyPr>
+          <a:lstStyle/>
+          <a:p>
+            <a:r>
+              <a:rPr lang="en-US" sz="1600" dirty="0" err="1"/>
+              <a:t>Pepito.sol</a:t>
+            </a:r>
+            <a:endParaRPr lang="en-US" sz="1600" dirty="0"/>
+          </a:p>
+          <a:p>
+            <a:pPr marL="314325" lvl="1" indent="-163513">
+              <a:buFont typeface="Arial" panose="020B0604020202020204" pitchFamily="34" charset="0"/>
+              <a:buChar char="•"/>
+            </a:pPr>
+            <a:r>
+              <a:rPr lang="en-US" sz="1200" dirty="0"/>
+              <a:t>Pepito constructor: owner = </a:t>
+            </a:r>
+            <a:r>
+              <a:rPr lang="en-US" sz="1200" dirty="0" err="1"/>
+              <a:t>msg.sender</a:t>
+            </a:r>
+            <a:endParaRPr lang="en-US" sz="1200" dirty="0"/>
+          </a:p>
+        </p:txBody>
+      </p:sp>
+      <p:sp>
+        <p:nvSpPr>
+          <p:cNvPr id="26" name="TextBox 25">
+            <a:extLst>
+              <a:ext uri="{FF2B5EF4-FFF2-40B4-BE49-F238E27FC236}">
+                <a16:creationId xmlns:a16="http://schemas.microsoft.com/office/drawing/2014/main" id="{942D0A16-45A8-D04E-9A8D-7945BB4CD969}"/>
+              </a:ext>
+            </a:extLst>
+          </p:cNvPr>
+          <p:cNvSpPr txBox="1"/>
+          <p:nvPr/>
+        </p:nvSpPr>
+        <p:spPr>
+          <a:xfrm>
+            <a:off x="620485" y="1227901"/>
+            <a:ext cx="1698171" cy="430887"/>
+          </a:xfrm>
+          <a:prstGeom prst="rect">
+            <a:avLst/>
+          </a:prstGeom>
+          <a:noFill/>
+        </p:spPr>
+        <p:txBody>
+          <a:bodyPr wrap="square" rtlCol="0">
+            <a:spAutoFit/>
+          </a:bodyPr>
+          <a:lstStyle/>
+          <a:p>
+            <a:r>
+              <a:rPr lang="en-US" sz="1100" dirty="0"/>
+              <a:t>2_deploy_contracts.js</a:t>
+            </a:r>
+          </a:p>
+          <a:p>
+            <a:r>
+              <a:rPr lang="en-US" sz="1100" dirty="0" err="1"/>
+              <a:t>deployer.deploy</a:t>
+            </a:r>
+            <a:r>
+              <a:rPr lang="en-US" sz="1100" dirty="0"/>
+              <a:t>(Pepito);</a:t>
+            </a:r>
+          </a:p>
+        </p:txBody>
+      </p:sp>
+      <p:pic>
+        <p:nvPicPr>
+          <p:cNvPr id="24" name="Google Shape;117;p28">
+            <a:extLst>
+              <a:ext uri="{FF2B5EF4-FFF2-40B4-BE49-F238E27FC236}">
+                <a16:creationId xmlns:a16="http://schemas.microsoft.com/office/drawing/2014/main" id="{2EA4266C-D217-D343-8C4D-91A2E9F28720}"/>
+              </a:ext>
+            </a:extLst>
+          </p:cNvPr>
+          <p:cNvPicPr preferRelativeResize="0"/>
+          <p:nvPr/>
+        </p:nvPicPr>
+        <p:blipFill>
+          <a:blip r:embed="rId3">
+            <a:alphaModFix/>
+          </a:blip>
+          <a:stretch>
+            <a:fillRect/>
+          </a:stretch>
+        </p:blipFill>
+        <p:spPr>
+          <a:xfrm>
+            <a:off x="10424687" y="146484"/>
+            <a:ext cx="1357940" cy="1357940"/>
+          </a:xfrm>
+          <a:prstGeom prst="rect">
+            <a:avLst/>
+          </a:prstGeom>
+          <a:noFill/>
+          <a:ln>
+            <a:noFill/>
+          </a:ln>
+        </p:spPr>
+      </p:pic>
+      <p:sp>
+        <p:nvSpPr>
+          <p:cNvPr id="25" name="TextBox 8">
+            <a:extLst>
+              <a:ext uri="{FF2B5EF4-FFF2-40B4-BE49-F238E27FC236}">
+                <a16:creationId xmlns:a16="http://schemas.microsoft.com/office/drawing/2014/main" id="{8C86B02D-E6ED-D344-AC93-B813DC10527C}"/>
+              </a:ext>
+            </a:extLst>
+          </p:cNvPr>
+          <p:cNvSpPr txBox="1"/>
+          <p:nvPr/>
+        </p:nvSpPr>
+        <p:spPr>
+          <a:xfrm>
+            <a:off x="4886727" y="3089344"/>
+            <a:ext cx="4899530" cy="647522"/>
+          </a:xfrm>
+          <a:prstGeom prst="rect">
+            <a:avLst/>
+          </a:prstGeom>
+          <a:noFill/>
+          <a:ln>
+            <a:solidFill>
+              <a:schemeClr val="accent1"/>
+            </a:solidFill>
+          </a:ln>
+        </p:spPr>
+        <p:txBody>
+          <a:bodyPr wrap="none" rtlCol="0">
+            <a:noAutofit/>
+          </a:bodyPr>
+          <a:lstStyle/>
+          <a:p>
+            <a:r>
+              <a:rPr lang="en-US" sz="1600" dirty="0" err="1"/>
+              <a:t>Pepito.sol</a:t>
+            </a:r>
+            <a:endParaRPr lang="en-US" sz="1600" dirty="0"/>
+          </a:p>
+          <a:p>
+            <a:pPr marL="357188" lvl="1" indent="-161925">
+              <a:buFont typeface="Arial" panose="020B0604020202020204" pitchFamily="34" charset="0"/>
+              <a:buChar char="•"/>
+            </a:pPr>
+            <a:r>
+              <a:rPr lang="en-US" sz="1200" dirty="0"/>
+              <a:t>function </a:t>
+            </a:r>
+            <a:r>
+              <a:rPr lang="en-US" sz="1200" dirty="0" err="1"/>
+              <a:t>createPepitoDisguise</a:t>
+            </a:r>
+            <a:r>
+              <a:rPr lang="en-US" sz="1200" dirty="0"/>
+              <a:t>() public payable returns(</a:t>
+            </a:r>
+            <a:r>
+              <a:rPr lang="en-US" sz="1200" dirty="0" err="1"/>
+              <a:t>PepitoDisguise</a:t>
+            </a:r>
+            <a:r>
+              <a:rPr lang="en-US" sz="1200" dirty="0"/>
+              <a:t>)</a:t>
+            </a:r>
+          </a:p>
+        </p:txBody>
+      </p:sp>
+      <p:sp>
+        <p:nvSpPr>
+          <p:cNvPr id="27" name="TextBox 20">
+            <a:extLst>
+              <a:ext uri="{FF2B5EF4-FFF2-40B4-BE49-F238E27FC236}">
+                <a16:creationId xmlns:a16="http://schemas.microsoft.com/office/drawing/2014/main" id="{75CD1C35-2BD5-624F-B5C3-51F75BFA76CE}"/>
+              </a:ext>
+            </a:extLst>
+          </p:cNvPr>
+          <p:cNvSpPr txBox="1"/>
+          <p:nvPr/>
+        </p:nvSpPr>
+        <p:spPr>
+          <a:xfrm>
+            <a:off x="5097884" y="1751394"/>
+            <a:ext cx="555171" cy="190800"/>
+          </a:xfrm>
+          <a:prstGeom prst="rect">
+            <a:avLst/>
+          </a:prstGeom>
+          <a:noFill/>
+          <a:ln>
+            <a:noFill/>
+          </a:ln>
+        </p:spPr>
+        <p:txBody>
+          <a:bodyPr wrap="square" tIns="3600" bIns="3600" rtlCol="0">
+            <a:spAutoFit/>
+          </a:bodyPr>
+          <a:lstStyle/>
+          <a:p>
+            <a:r>
+              <a:rPr lang="en-LU" sz="1200" dirty="0"/>
+              <a:t> </a:t>
+            </a:r>
+          </a:p>
+        </p:txBody>
+      </p:sp>
+      <p:cxnSp>
+        <p:nvCxnSpPr>
+          <p:cNvPr id="28" name="Elbow Connector 41">
+            <a:extLst>
+              <a:ext uri="{FF2B5EF4-FFF2-40B4-BE49-F238E27FC236}">
+                <a16:creationId xmlns:a16="http://schemas.microsoft.com/office/drawing/2014/main" id="{59E492D1-7698-0C4F-9832-6D44DCE9B88E}"/>
+              </a:ext>
+            </a:extLst>
+          </p:cNvPr>
+          <p:cNvCxnSpPr>
+            <a:cxnSpLocks/>
+            <a:stCxn id="26" idx="2"/>
+            <a:endCxn id="27" idx="1"/>
+          </p:cNvCxnSpPr>
+          <p:nvPr/>
+        </p:nvCxnSpPr>
+        <p:spPr>
+          <a:xfrm rot="16200000" flipH="1">
+            <a:off x="3189724" y="-61366"/>
+            <a:ext cx="188006" cy="3628313"/>
+          </a:xfrm>
+          <a:prstGeom prst="bentConnector2">
+            <a:avLst/>
+          </a:prstGeom>
+          <a:ln w="12700">
+            <a:tailEnd type="triangle"/>
+          </a:ln>
+        </p:spPr>
+        <p:style>
+          <a:lnRef idx="1">
+            <a:schemeClr val="accent1"/>
+          </a:lnRef>
+          <a:fillRef idx="0">
+            <a:schemeClr val="accent1"/>
+          </a:fillRef>
+          <a:effectRef idx="0">
+            <a:schemeClr val="accent1"/>
+          </a:effectRef>
+          <a:fontRef idx="minor">
+            <a:schemeClr val="tx1"/>
+          </a:fontRef>
+        </p:style>
+      </p:cxnSp>
+      <p:sp>
+        <p:nvSpPr>
+          <p:cNvPr id="30" name="TextBox 25">
+            <a:extLst>
+              <a:ext uri="{FF2B5EF4-FFF2-40B4-BE49-F238E27FC236}">
+                <a16:creationId xmlns:a16="http://schemas.microsoft.com/office/drawing/2014/main" id="{558789AB-DB16-2540-8E14-7EF6434084FA}"/>
+              </a:ext>
+            </a:extLst>
+          </p:cNvPr>
+          <p:cNvSpPr txBox="1"/>
+          <p:nvPr/>
+        </p:nvSpPr>
+        <p:spPr>
+          <a:xfrm>
+            <a:off x="2434641" y="1880926"/>
+            <a:ext cx="1698171" cy="261610"/>
+          </a:xfrm>
+          <a:prstGeom prst="rect">
+            <a:avLst/>
+          </a:prstGeom>
+          <a:noFill/>
+        </p:spPr>
+        <p:txBody>
+          <a:bodyPr wrap="square" rtlCol="0">
+            <a:spAutoFit/>
+          </a:bodyPr>
+          <a:lstStyle/>
+          <a:p>
+            <a:r>
+              <a:rPr lang="en-US" sz="1100" i="1" dirty="0"/>
+              <a:t>Developer account funds</a:t>
+            </a:r>
+            <a:endParaRPr lang="en-LU" sz="1100" i="1" dirty="0"/>
+          </a:p>
+        </p:txBody>
+      </p:sp>
+      <p:sp>
+        <p:nvSpPr>
+          <p:cNvPr id="31" name="TextBox 25">
+            <a:extLst>
+              <a:ext uri="{FF2B5EF4-FFF2-40B4-BE49-F238E27FC236}">
+                <a16:creationId xmlns:a16="http://schemas.microsoft.com/office/drawing/2014/main" id="{0A2A3927-8CE9-B347-9943-1CD05CFACF6C}"/>
+              </a:ext>
+            </a:extLst>
+          </p:cNvPr>
+          <p:cNvSpPr txBox="1"/>
+          <p:nvPr/>
+        </p:nvSpPr>
+        <p:spPr>
+          <a:xfrm>
+            <a:off x="620484" y="2560413"/>
+            <a:ext cx="3512327" cy="600164"/>
+          </a:xfrm>
+          <a:prstGeom prst="rect">
+            <a:avLst/>
+          </a:prstGeom>
+          <a:noFill/>
+        </p:spPr>
+        <p:txBody>
+          <a:bodyPr wrap="square" rtlCol="0">
+            <a:spAutoFit/>
+          </a:bodyPr>
+          <a:lstStyle/>
+          <a:p>
+            <a:r>
+              <a:rPr lang="en-US" sz="1100" dirty="0" err="1"/>
+              <a:t>DisguiseStore.js</a:t>
+            </a:r>
+            <a:endParaRPr lang="en-US" sz="1100" dirty="0"/>
+          </a:p>
+          <a:p>
+            <a:r>
+              <a:rPr lang="en-US" sz="1100" dirty="0"/>
+              <a:t>await </a:t>
+            </a:r>
+            <a:r>
+              <a:rPr lang="en-US" sz="1100" dirty="0" err="1"/>
+              <a:t>pepitoInstance.methods.createPepitoDisguise</a:t>
+            </a:r>
+            <a:r>
+              <a:rPr lang="en-US" sz="1100" dirty="0"/>
+              <a:t>()</a:t>
+            </a:r>
+          </a:p>
+          <a:p>
+            <a:r>
+              <a:rPr lang="en-US" sz="1100" dirty="0"/>
+              <a:t>                .send({from: </a:t>
+            </a:r>
+            <a:r>
+              <a:rPr lang="en-US" sz="1100" dirty="0" err="1"/>
+              <a:t>this.props.ownerPepito</a:t>
+            </a:r>
+            <a:r>
+              <a:rPr lang="en-US" sz="1100" dirty="0"/>
+              <a:t>});</a:t>
+            </a:r>
+          </a:p>
+        </p:txBody>
+      </p:sp>
+      <p:sp>
+        <p:nvSpPr>
+          <p:cNvPr id="32" name="TextBox 20">
+            <a:extLst>
+              <a:ext uri="{FF2B5EF4-FFF2-40B4-BE49-F238E27FC236}">
+                <a16:creationId xmlns:a16="http://schemas.microsoft.com/office/drawing/2014/main" id="{628E102B-ACC5-F54F-AF72-126E62059C13}"/>
+              </a:ext>
+            </a:extLst>
+          </p:cNvPr>
+          <p:cNvSpPr txBox="1"/>
+          <p:nvPr/>
+        </p:nvSpPr>
+        <p:spPr>
+          <a:xfrm>
+            <a:off x="5097884" y="3317705"/>
+            <a:ext cx="555171" cy="190800"/>
+          </a:xfrm>
+          <a:prstGeom prst="rect">
+            <a:avLst/>
+          </a:prstGeom>
+          <a:noFill/>
+          <a:ln>
+            <a:noFill/>
+          </a:ln>
+        </p:spPr>
+        <p:txBody>
+          <a:bodyPr wrap="square" tIns="3600" bIns="3600" rtlCol="0">
+            <a:spAutoFit/>
+          </a:bodyPr>
+          <a:lstStyle/>
+          <a:p>
+            <a:r>
+              <a:rPr lang="en-LU" sz="1200" dirty="0"/>
+              <a:t> </a:t>
+            </a:r>
+          </a:p>
+        </p:txBody>
+      </p:sp>
+      <p:cxnSp>
+        <p:nvCxnSpPr>
+          <p:cNvPr id="33" name="Elbow Connector 41">
+            <a:extLst>
+              <a:ext uri="{FF2B5EF4-FFF2-40B4-BE49-F238E27FC236}">
+                <a16:creationId xmlns:a16="http://schemas.microsoft.com/office/drawing/2014/main" id="{78C630B3-A3CE-4A49-8187-DD45DCB8889A}"/>
+              </a:ext>
+            </a:extLst>
+          </p:cNvPr>
+          <p:cNvCxnSpPr>
+            <a:cxnSpLocks/>
+            <a:stCxn id="31" idx="2"/>
+          </p:cNvCxnSpPr>
+          <p:nvPr/>
+        </p:nvCxnSpPr>
+        <p:spPr>
+          <a:xfrm rot="16200000" flipH="1">
+            <a:off x="3578345" y="1958879"/>
+            <a:ext cx="317842" cy="2721237"/>
+          </a:xfrm>
+          <a:prstGeom prst="bentConnector2">
+            <a:avLst/>
+          </a:prstGeom>
+          <a:ln w="12700">
+            <a:tailEnd type="triangle"/>
+          </a:ln>
+        </p:spPr>
+        <p:style>
+          <a:lnRef idx="1">
+            <a:schemeClr val="accent1"/>
+          </a:lnRef>
+          <a:fillRef idx="0">
+            <a:schemeClr val="accent1"/>
+          </a:fillRef>
+          <a:effectRef idx="0">
+            <a:schemeClr val="accent1"/>
+          </a:effectRef>
+          <a:fontRef idx="minor">
+            <a:schemeClr val="tx1"/>
+          </a:fontRef>
+        </p:style>
+      </p:cxnSp>
+      <p:sp>
+        <p:nvSpPr>
+          <p:cNvPr id="36" name="TextBox 25">
+            <a:extLst>
+              <a:ext uri="{FF2B5EF4-FFF2-40B4-BE49-F238E27FC236}">
+                <a16:creationId xmlns:a16="http://schemas.microsoft.com/office/drawing/2014/main" id="{FD766E8C-3BFA-0143-89ED-4AF04C9EA2CD}"/>
+              </a:ext>
+            </a:extLst>
+          </p:cNvPr>
+          <p:cNvSpPr txBox="1"/>
+          <p:nvPr/>
+        </p:nvSpPr>
+        <p:spPr>
+          <a:xfrm>
+            <a:off x="1821477" y="3255831"/>
+            <a:ext cx="2721237" cy="769441"/>
+          </a:xfrm>
+          <a:prstGeom prst="rect">
+            <a:avLst/>
+          </a:prstGeom>
+          <a:noFill/>
+        </p:spPr>
+        <p:txBody>
+          <a:bodyPr wrap="square" rtlCol="0">
+            <a:spAutoFit/>
+          </a:bodyPr>
+          <a:lstStyle/>
+          <a:p>
+            <a:r>
+              <a:rPr lang="en-US" sz="1100" i="1" dirty="0"/>
+              <a:t>Developer account funds</a:t>
+            </a:r>
+          </a:p>
+          <a:p>
+            <a:r>
+              <a:rPr lang="en-US" sz="1100" dirty="0">
+                <a:solidFill>
+                  <a:srgbClr val="0070C0"/>
+                </a:solidFill>
+              </a:rPr>
+              <a:t>… should be</a:t>
+            </a:r>
+          </a:p>
+          <a:p>
+            <a:r>
+              <a:rPr lang="en-US" sz="1100" i="1" dirty="0">
+                <a:solidFill>
+                  <a:srgbClr val="0070C0"/>
+                </a:solidFill>
+              </a:rPr>
+              <a:t>User selected Metamask account</a:t>
+            </a:r>
+          </a:p>
+          <a:p>
+            <a:r>
+              <a:rPr lang="fr-LU" sz="1100" i="1" dirty="0" err="1">
+                <a:solidFill>
+                  <a:srgbClr val="0070C0"/>
+                </a:solidFill>
+              </a:rPr>
+              <a:t>from</a:t>
+            </a:r>
+            <a:r>
+              <a:rPr lang="fr-LU" sz="1100" i="1" dirty="0">
+                <a:solidFill>
+                  <a:srgbClr val="0070C0"/>
+                </a:solidFill>
+              </a:rPr>
+              <a:t>: web3js.givenProvider.selectedAddress</a:t>
+            </a:r>
+            <a:endParaRPr lang="en-LU" sz="1100" i="1" dirty="0">
+              <a:solidFill>
+                <a:srgbClr val="0070C0"/>
+              </a:solidFill>
+            </a:endParaRPr>
+          </a:p>
+        </p:txBody>
+      </p:sp>
+      <p:sp>
+        <p:nvSpPr>
+          <p:cNvPr id="37" name="TextBox 8">
+            <a:extLst>
+              <a:ext uri="{FF2B5EF4-FFF2-40B4-BE49-F238E27FC236}">
+                <a16:creationId xmlns:a16="http://schemas.microsoft.com/office/drawing/2014/main" id="{FF546F6A-E15F-504D-B8BD-7C9088F48A48}"/>
+              </a:ext>
+            </a:extLst>
+          </p:cNvPr>
+          <p:cNvSpPr txBox="1"/>
+          <p:nvPr/>
+        </p:nvSpPr>
+        <p:spPr>
+          <a:xfrm>
+            <a:off x="4886727" y="4762943"/>
+            <a:ext cx="5302302" cy="647522"/>
+          </a:xfrm>
+          <a:prstGeom prst="rect">
+            <a:avLst/>
+          </a:prstGeom>
+          <a:noFill/>
+          <a:ln>
+            <a:solidFill>
+              <a:schemeClr val="accent1"/>
+            </a:solidFill>
+          </a:ln>
+        </p:spPr>
+        <p:txBody>
+          <a:bodyPr wrap="none" rtlCol="0">
+            <a:noAutofit/>
+          </a:bodyPr>
+          <a:lstStyle/>
+          <a:p>
+            <a:r>
+              <a:rPr lang="en-US" sz="1600" dirty="0" err="1"/>
+              <a:t>PepitoDisguise.sol</a:t>
+            </a:r>
+            <a:endParaRPr lang="en-US" sz="1600" dirty="0"/>
+          </a:p>
+          <a:p>
+            <a:pPr marL="357188" lvl="1" indent="-161925">
+              <a:buFont typeface="Arial" panose="020B0604020202020204" pitchFamily="34" charset="0"/>
+              <a:buChar char="•"/>
+            </a:pPr>
+            <a:r>
+              <a:rPr lang="en-US" sz="1200" dirty="0"/>
+              <a:t>function </a:t>
+            </a:r>
+            <a:r>
+              <a:rPr lang="en-US" sz="1200" dirty="0" err="1"/>
+              <a:t>storeDisguise</a:t>
+            </a:r>
+            <a:r>
+              <a:rPr lang="en-US" sz="1200" dirty="0"/>
+              <a:t>(uint256[12] memory _disguise2store) public payable</a:t>
+            </a:r>
+          </a:p>
+        </p:txBody>
+      </p:sp>
+      <p:sp>
+        <p:nvSpPr>
+          <p:cNvPr id="38" name="TextBox 20">
+            <a:extLst>
+              <a:ext uri="{FF2B5EF4-FFF2-40B4-BE49-F238E27FC236}">
+                <a16:creationId xmlns:a16="http://schemas.microsoft.com/office/drawing/2014/main" id="{44484C37-4E8F-9E4C-BB31-5B5DE439F7E7}"/>
+              </a:ext>
+            </a:extLst>
+          </p:cNvPr>
+          <p:cNvSpPr txBox="1"/>
+          <p:nvPr/>
+        </p:nvSpPr>
+        <p:spPr>
+          <a:xfrm>
+            <a:off x="5097884" y="5037697"/>
+            <a:ext cx="555171" cy="190800"/>
+          </a:xfrm>
+          <a:prstGeom prst="rect">
+            <a:avLst/>
+          </a:prstGeom>
+          <a:noFill/>
+          <a:ln>
+            <a:noFill/>
+          </a:ln>
+        </p:spPr>
+        <p:txBody>
+          <a:bodyPr wrap="square" tIns="3600" bIns="3600" rtlCol="0">
+            <a:spAutoFit/>
+          </a:bodyPr>
+          <a:lstStyle/>
+          <a:p>
+            <a:r>
+              <a:rPr lang="en-LU" sz="1200" dirty="0"/>
+              <a:t> </a:t>
+            </a:r>
+          </a:p>
+        </p:txBody>
+      </p:sp>
+      <p:sp>
+        <p:nvSpPr>
+          <p:cNvPr id="41" name="TextBox 25">
+            <a:extLst>
+              <a:ext uri="{FF2B5EF4-FFF2-40B4-BE49-F238E27FC236}">
+                <a16:creationId xmlns:a16="http://schemas.microsoft.com/office/drawing/2014/main" id="{8FED0948-731E-5745-A12F-2FEF1194B93C}"/>
+              </a:ext>
+            </a:extLst>
+          </p:cNvPr>
+          <p:cNvSpPr txBox="1"/>
+          <p:nvPr/>
+        </p:nvSpPr>
+        <p:spPr>
+          <a:xfrm>
+            <a:off x="620484" y="4209001"/>
+            <a:ext cx="3624945" cy="600164"/>
+          </a:xfrm>
+          <a:prstGeom prst="rect">
+            <a:avLst/>
+          </a:prstGeom>
+          <a:noFill/>
+        </p:spPr>
+        <p:txBody>
+          <a:bodyPr wrap="square" rtlCol="0">
+            <a:spAutoFit/>
+          </a:bodyPr>
+          <a:lstStyle/>
+          <a:p>
+            <a:r>
+              <a:rPr lang="en-US" sz="1100" dirty="0" err="1"/>
+              <a:t>DisguiseStore.js</a:t>
+            </a:r>
+            <a:endParaRPr lang="en-US" sz="1100" dirty="0"/>
+          </a:p>
+          <a:p>
+            <a:r>
+              <a:rPr lang="en-US" sz="1100" dirty="0"/>
+              <a:t>await </a:t>
+            </a:r>
+            <a:r>
+              <a:rPr lang="en-US" sz="1100" dirty="0" err="1"/>
+              <a:t>pepitoDisguise.methods.storeDisguise</a:t>
+            </a:r>
+            <a:r>
+              <a:rPr lang="en-US" sz="1100" dirty="0"/>
+              <a:t>(disguise2store)</a:t>
+            </a:r>
+          </a:p>
+          <a:p>
+            <a:r>
+              <a:rPr lang="en-US" sz="1100" dirty="0"/>
+              <a:t>                .send({from: </a:t>
+            </a:r>
+            <a:r>
+              <a:rPr lang="en-US" sz="1100" dirty="0" err="1"/>
+              <a:t>this.props.ownerPepito</a:t>
+            </a:r>
+            <a:r>
+              <a:rPr lang="en-US" sz="1100" dirty="0"/>
+              <a:t> });</a:t>
+            </a:r>
+          </a:p>
+        </p:txBody>
+      </p:sp>
+      <p:cxnSp>
+        <p:nvCxnSpPr>
+          <p:cNvPr id="43" name="Elbow Connector 41">
+            <a:extLst>
+              <a:ext uri="{FF2B5EF4-FFF2-40B4-BE49-F238E27FC236}">
+                <a16:creationId xmlns:a16="http://schemas.microsoft.com/office/drawing/2014/main" id="{1D333DD4-BAAF-4B42-9E8D-DC1ADE449AF1}"/>
+              </a:ext>
+            </a:extLst>
+          </p:cNvPr>
+          <p:cNvCxnSpPr>
+            <a:cxnSpLocks/>
+            <a:stCxn id="41" idx="2"/>
+            <a:endCxn id="38" idx="1"/>
+          </p:cNvCxnSpPr>
+          <p:nvPr/>
+        </p:nvCxnSpPr>
+        <p:spPr>
+          <a:xfrm rot="16200000" flipH="1">
+            <a:off x="3603454" y="3638667"/>
+            <a:ext cx="323932" cy="2664927"/>
+          </a:xfrm>
+          <a:prstGeom prst="bentConnector2">
+            <a:avLst/>
+          </a:prstGeom>
+          <a:ln w="12700">
+            <a:tailEnd type="triangle"/>
+          </a:ln>
+        </p:spPr>
+        <p:style>
+          <a:lnRef idx="1">
+            <a:schemeClr val="accent1"/>
+          </a:lnRef>
+          <a:fillRef idx="0">
+            <a:schemeClr val="accent1"/>
+          </a:fillRef>
+          <a:effectRef idx="0">
+            <a:schemeClr val="accent1"/>
+          </a:effectRef>
+          <a:fontRef idx="minor">
+            <a:schemeClr val="tx1"/>
+          </a:fontRef>
+        </p:style>
+      </p:cxnSp>
+      <p:sp>
+        <p:nvSpPr>
+          <p:cNvPr id="45" name="TextBox 25">
+            <a:extLst>
+              <a:ext uri="{FF2B5EF4-FFF2-40B4-BE49-F238E27FC236}">
+                <a16:creationId xmlns:a16="http://schemas.microsoft.com/office/drawing/2014/main" id="{CF0FBBB2-919E-A342-8480-88A4B4F766B9}"/>
+              </a:ext>
+            </a:extLst>
+          </p:cNvPr>
+          <p:cNvSpPr txBox="1"/>
+          <p:nvPr/>
+        </p:nvSpPr>
+        <p:spPr>
+          <a:xfrm>
+            <a:off x="1821477" y="4904419"/>
+            <a:ext cx="2721237" cy="769441"/>
+          </a:xfrm>
+          <a:prstGeom prst="rect">
+            <a:avLst/>
+          </a:prstGeom>
+          <a:noFill/>
+        </p:spPr>
+        <p:txBody>
+          <a:bodyPr wrap="square" rtlCol="0">
+            <a:spAutoFit/>
+          </a:bodyPr>
+          <a:lstStyle/>
+          <a:p>
+            <a:r>
+              <a:rPr lang="en-US" sz="1100" i="1" dirty="0"/>
+              <a:t>Developer account funds</a:t>
+            </a:r>
+          </a:p>
+          <a:p>
+            <a:r>
+              <a:rPr lang="en-US" sz="1100" dirty="0">
+                <a:solidFill>
+                  <a:srgbClr val="0070C0"/>
+                </a:solidFill>
+              </a:rPr>
+              <a:t>… should be</a:t>
+            </a:r>
+          </a:p>
+          <a:p>
+            <a:r>
+              <a:rPr lang="en-US" sz="1100" i="1" dirty="0">
+                <a:solidFill>
+                  <a:srgbClr val="0070C0"/>
+                </a:solidFill>
+              </a:rPr>
+              <a:t>User selected Metamask account</a:t>
+            </a:r>
+          </a:p>
+          <a:p>
+            <a:r>
+              <a:rPr lang="fr-LU" sz="1100" i="1" dirty="0" err="1">
+                <a:solidFill>
+                  <a:srgbClr val="0070C0"/>
+                </a:solidFill>
+              </a:rPr>
+              <a:t>from</a:t>
+            </a:r>
+            <a:r>
+              <a:rPr lang="fr-LU" sz="1100" i="1" dirty="0">
+                <a:solidFill>
+                  <a:srgbClr val="0070C0"/>
+                </a:solidFill>
+              </a:rPr>
+              <a:t>: web3js.givenProvider.selectedAddress</a:t>
+            </a:r>
+            <a:endParaRPr lang="en-LU" sz="1100" i="1" dirty="0">
+              <a:solidFill>
+                <a:srgbClr val="0070C0"/>
+              </a:solidFill>
+            </a:endParaRPr>
+          </a:p>
+        </p:txBody>
+      </p:sp>
+    </p:spTree>
+    <p:extLst>
+      <p:ext uri="{BB962C8B-B14F-4D97-AF65-F5344CB8AC3E}">
+        <p14:creationId xmlns:p14="http://schemas.microsoft.com/office/powerpoint/2010/main" val="2536955078"/>
+      </p:ext>
+    </p:extLst>
+  </p:cSld>
+  <p:clrMapOvr>
+    <a:masterClrMapping/>
+  </p:clrMapOvr>
+</p:sld>
+</file>
+
 <file path=ppt/slides/slide2.xml><?xml version="1.0" encoding="utf-8"?>
 <p:sld xmlns:a="http://schemas.openxmlformats.org/drawingml/2006/main" xmlns:r="http://schemas.openxmlformats.org/officeDocument/2006/relationships" xmlns:p="http://schemas.openxmlformats.org/presentationml/2006/main">
   <p:cSld>
@@ -8099,44 +9078,6 @@
       </p:cxnSp>
       <p:sp>
         <p:nvSpPr>
-          <p:cNvPr id="28" name="TextBox 27">
-            <a:extLst>
-              <a:ext uri="{FF2B5EF4-FFF2-40B4-BE49-F238E27FC236}">
-                <a16:creationId xmlns:a16="http://schemas.microsoft.com/office/drawing/2014/main" id="{67108B44-C2A7-AC46-9B04-D83B5141938F}"/>
-              </a:ext>
-            </a:extLst>
-          </p:cNvPr>
-          <p:cNvSpPr txBox="1"/>
-          <p:nvPr/>
-        </p:nvSpPr>
-        <p:spPr>
-          <a:xfrm>
-            <a:off x="2277678" y="4427612"/>
-            <a:ext cx="555171" cy="190800"/>
-          </a:xfrm>
-          <a:prstGeom prst="rect">
-            <a:avLst/>
-          </a:prstGeom>
-          <a:noFill/>
-          <a:ln>
-            <a:noFill/>
-          </a:ln>
-        </p:spPr>
-        <p:txBody>
-          <a:bodyPr wrap="square" tIns="3600" bIns="3600" rtlCol="0">
-            <a:spAutoFit/>
-          </a:bodyPr>
-          <a:lstStyle/>
-          <a:p>
-            <a:r>
-              <a:rPr lang="en-LU" sz="1200" dirty="0"/>
-              <a:t> </a:t>
-            </a:r>
-          </a:p>
-        </p:txBody>
-      </p:sp>
-      <p:sp>
-        <p:nvSpPr>
           <p:cNvPr id="18" name="TextBox 17">
             <a:extLst>
               <a:ext uri="{FF2B5EF4-FFF2-40B4-BE49-F238E27FC236}">
@@ -8268,8 +9209,8 @@
         </p:nvSpPr>
         <p:spPr>
           <a:xfrm>
-            <a:off x="5008673" y="3163131"/>
-            <a:ext cx="2350069" cy="762193"/>
+            <a:off x="5008673" y="4545617"/>
+            <a:ext cx="3144105" cy="1149258"/>
           </a:xfrm>
           <a:prstGeom prst="rect">
             <a:avLst/>
@@ -8289,7 +9230,7 @@
           <a:p>
             <a:r>
               <a:rPr lang="en-US" sz="1600" dirty="0" err="1"/>
-              <a:t>Pepito.sol</a:t>
+              <a:t>PepitoDisguise.sol</a:t>
             </a:r>
             <a:endParaRPr lang="en-US" sz="1600" dirty="0"/>
           </a:p>
@@ -8319,6 +9260,52 @@
               <a:t>;</a:t>
             </a:r>
           </a:p>
+          <a:p>
+            <a:pPr marL="171450" indent="-171450">
+              <a:buFont typeface="Arial" panose="020B0604020202020204" pitchFamily="34" charset="0"/>
+              <a:buChar char="•"/>
+            </a:pPr>
+            <a:endParaRPr lang="en-US" sz="1200" dirty="0"/>
+          </a:p>
+          <a:p>
+            <a:pPr marL="171450" indent="-171450">
+              <a:buFont typeface="Arial" panose="020B0604020202020204" pitchFamily="34" charset="0"/>
+              <a:buChar char="•"/>
+            </a:pPr>
+            <a:r>
+              <a:rPr lang="en-US" sz="1200" dirty="0" err="1"/>
+              <a:t>storeDisguise</a:t>
+            </a:r>
+            <a:r>
+              <a:rPr lang="en-US" sz="1200" dirty="0"/>
+              <a:t>(</a:t>
+            </a:r>
+            <a:r>
+              <a:rPr lang="en-US" sz="1200" dirty="0" err="1"/>
+              <a:t>uint</a:t>
+            </a:r>
+            <a:r>
+              <a:rPr lang="en-US" sz="1200" dirty="0"/>
+              <a:t>[12]memory _disguise) {};</a:t>
+            </a:r>
+          </a:p>
+          <a:p>
+            <a:pPr marL="171450" indent="-171450">
+              <a:buFont typeface="Arial" panose="020B0604020202020204" pitchFamily="34" charset="0"/>
+              <a:buChar char="•"/>
+            </a:pPr>
+            <a:r>
+              <a:rPr lang="en-US" sz="1200" dirty="0" err="1"/>
+              <a:t>readDisguise</a:t>
+            </a:r>
+            <a:r>
+              <a:rPr lang="en-US" sz="1200" dirty="0"/>
+              <a:t>() returns(uint256[12] memory)</a:t>
+            </a:r>
+          </a:p>
+          <a:p>
+            <a:endParaRPr lang="en-US" sz="1200" dirty="0"/>
+          </a:p>
         </p:txBody>
       </p:sp>
       <p:sp>
@@ -8335,7 +9322,7 @@
         </p:nvSpPr>
         <p:spPr>
           <a:xfrm>
-            <a:off x="6096622" y="3468977"/>
+            <a:off x="6096622" y="4851463"/>
             <a:ext cx="555171" cy="190800"/>
           </a:xfrm>
           <a:prstGeom prst="rect">
@@ -8377,8 +9364,8 @@
         </p:nvCxnSpPr>
         <p:spPr>
           <a:xfrm rot="5400000">
-            <a:off x="5905911" y="2358421"/>
-            <a:ext cx="1578853" cy="642258"/>
+            <a:off x="5214668" y="3049664"/>
+            <a:ext cx="2961339" cy="642258"/>
           </a:xfrm>
           <a:prstGeom prst="bentConnector3">
             <a:avLst>
@@ -8418,8 +9405,8 @@
         </p:nvSpPr>
         <p:spPr>
           <a:xfrm>
-            <a:off x="4049484" y="1240778"/>
-            <a:ext cx="3962401" cy="762193"/>
+            <a:off x="4049484" y="1240777"/>
+            <a:ext cx="4212776" cy="1874471"/>
           </a:xfrm>
           <a:prstGeom prst="rect">
             <a:avLst/>
@@ -8475,6 +9462,82 @@
               <a:t>();</a:t>
             </a:r>
           </a:p>
+          <a:p>
+            <a:r>
+              <a:rPr lang="en-US" sz="1200" dirty="0"/>
+              <a:t>disguise = [1, 2, 3, 4, 5, 6, 7, 8, 9, 10, 11]</a:t>
+            </a:r>
+          </a:p>
+          <a:p>
+            <a:r>
+              <a:rPr lang="en-US" sz="1200" dirty="0"/>
+              <a:t>receipt= await </a:t>
+            </a:r>
+            <a:r>
+              <a:rPr lang="en-US" sz="1200" dirty="0" err="1"/>
+              <a:t>disguiseInstance.storeDisguise</a:t>
+            </a:r>
+            <a:r>
+              <a:rPr lang="en-US" sz="1200" dirty="0"/>
+              <a:t>(disguise, {from: …});</a:t>
+            </a:r>
+          </a:p>
+          <a:p>
+            <a:r>
+              <a:rPr lang="en-US" sz="1200" dirty="0" err="1"/>
+              <a:t>storedDisguise</a:t>
+            </a:r>
+            <a:r>
+              <a:rPr lang="en-US" sz="1200" dirty="0"/>
+              <a:t> = </a:t>
+            </a:r>
+            <a:r>
+              <a:rPr lang="en-US" sz="1200" dirty="0" err="1"/>
+              <a:t>lastEvent.disguise</a:t>
+            </a:r>
+            <a:endParaRPr lang="en-US" sz="1200" dirty="0"/>
+          </a:p>
+          <a:p>
+            <a:endParaRPr lang="en-US" sz="1200" dirty="0"/>
+          </a:p>
+          <a:p>
+            <a:r>
+              <a:rPr lang="en-US" sz="1200" dirty="0"/>
+              <a:t>receipt= await </a:t>
+            </a:r>
+            <a:r>
+              <a:rPr lang="en-US" sz="1200" dirty="0" err="1"/>
+              <a:t>disguiseInstance.readDisguise</a:t>
+            </a:r>
+            <a:r>
+              <a:rPr lang="en-US" sz="1200" dirty="0"/>
+              <a:t>(disguise, {from: …});</a:t>
+            </a:r>
+          </a:p>
+          <a:p>
+            <a:r>
+              <a:rPr lang="en-US" sz="1200" dirty="0" err="1"/>
+              <a:t>returnedDisguise</a:t>
+            </a:r>
+            <a:r>
+              <a:rPr lang="en-US" sz="1200" dirty="0"/>
+              <a:t> = </a:t>
+            </a:r>
+            <a:r>
+              <a:rPr lang="en-US" sz="1200" dirty="0" err="1"/>
+              <a:t>lastEvent.disguise</a:t>
+            </a:r>
+            <a:endParaRPr lang="en-US" sz="1200" dirty="0"/>
+          </a:p>
+          <a:p>
+            <a:endParaRPr lang="en-US" sz="1200" dirty="0"/>
+          </a:p>
+          <a:p>
+            <a:endParaRPr lang="en-US" sz="1200" dirty="0"/>
+          </a:p>
+          <a:p>
+            <a:endParaRPr lang="en-US" sz="1200" dirty="0"/>
+          </a:p>
         </p:txBody>
       </p:sp>
       <p:sp>
@@ -8517,10 +9580,10 @@
       </p:sp>
       <p:sp>
         <p:nvSpPr>
-          <p:cNvPr id="32" name="TextBox 31">
-            <a:extLst>
-              <a:ext uri="{FF2B5EF4-FFF2-40B4-BE49-F238E27FC236}">
-                <a16:creationId xmlns:a16="http://schemas.microsoft.com/office/drawing/2014/main" id="{35477E44-3A40-4647-9509-101AD8B0F66C}"/>
+          <p:cNvPr id="33" name="TextBox 32">
+            <a:extLst>
+              <a:ext uri="{FF2B5EF4-FFF2-40B4-BE49-F238E27FC236}">
+                <a16:creationId xmlns:a16="http://schemas.microsoft.com/office/drawing/2014/main" id="{498EA60F-05E7-2644-8BF4-598F3DB06BDB}"/>
               </a:ext>
             </a:extLst>
           </p:cNvPr>
@@ -8529,74 +9592,7 @@
         </p:nvSpPr>
         <p:spPr>
           <a:xfrm>
-            <a:off x="2527352" y="5611713"/>
-            <a:ext cx="3144105" cy="762193"/>
-          </a:xfrm>
-          <a:prstGeom prst="rect">
-            <a:avLst/>
-          </a:prstGeom>
-          <a:noFill/>
-          <a:ln>
-            <a:solidFill>
-              <a:schemeClr val="accent1"/>
-            </a:solidFill>
-          </a:ln>
-        </p:spPr>
-        <p:txBody>
-          <a:bodyPr wrap="none" rtlCol="0">
-            <a:noAutofit/>
-          </a:bodyPr>
-          <a:lstStyle/>
-          <a:p>
-            <a:r>
-              <a:rPr lang="en-US" sz="1600" dirty="0" err="1"/>
-              <a:t>PepitoDisguise.sol</a:t>
-            </a:r>
-            <a:endParaRPr lang="en-US" sz="1600" dirty="0"/>
-          </a:p>
-          <a:p>
-            <a:pPr marL="171450" indent="-171450">
-              <a:buFont typeface="Arial" panose="020B0604020202020204" pitchFamily="34" charset="0"/>
-              <a:buChar char="•"/>
-            </a:pPr>
-            <a:r>
-              <a:rPr lang="en-US" sz="1200" dirty="0"/>
-              <a:t> </a:t>
-            </a:r>
-            <a:r>
-              <a:rPr lang="en-US" sz="1200" dirty="0" err="1"/>
-              <a:t>storeDisguise</a:t>
-            </a:r>
-            <a:r>
-              <a:rPr lang="en-US" sz="1200" dirty="0"/>
-              <a:t>(</a:t>
-            </a:r>
-            <a:r>
-              <a:rPr lang="en-US" sz="1200" dirty="0" err="1"/>
-              <a:t>uint</a:t>
-            </a:r>
-            <a:r>
-              <a:rPr lang="en-US" sz="1200" dirty="0"/>
-              <a:t>[12]memory _disguise) {};</a:t>
-            </a:r>
-          </a:p>
-        </p:txBody>
-      </p:sp>
-      <p:sp>
-        <p:nvSpPr>
-          <p:cNvPr id="33" name="TextBox 32">
-            <a:extLst>
-              <a:ext uri="{FF2B5EF4-FFF2-40B4-BE49-F238E27FC236}">
-                <a16:creationId xmlns:a16="http://schemas.microsoft.com/office/drawing/2014/main" id="{498EA60F-05E7-2644-8BF4-598F3DB06BDB}"/>
-              </a:ext>
-            </a:extLst>
-          </p:cNvPr>
-          <p:cNvSpPr txBox="1"/>
-          <p:nvPr/>
-        </p:nvSpPr>
-        <p:spPr>
-          <a:xfrm>
-            <a:off x="3615301" y="5917559"/>
+            <a:off x="6870128" y="5188219"/>
             <a:ext cx="555171" cy="190800"/>
           </a:xfrm>
           <a:prstGeom prst="rect">
@@ -8637,9 +9633,9 @@
           <p:nvPr/>
         </p:nvCxnSpPr>
         <p:spPr>
-          <a:xfrm rot="16200000" flipH="1">
-            <a:off x="3208848" y="5233520"/>
-            <a:ext cx="1062656" cy="305421"/>
+          <a:xfrm rot="5400000">
+            <a:off x="5924833" y="3497872"/>
+            <a:ext cx="2913229" cy="467465"/>
           </a:xfrm>
           <a:prstGeom prst="bentConnector3">
             <a:avLst>
@@ -8667,10 +9663,10 @@
       </p:cxnSp>
       <p:sp>
         <p:nvSpPr>
-          <p:cNvPr id="36" name="TextBox 35">
-            <a:extLst>
-              <a:ext uri="{FF2B5EF4-FFF2-40B4-BE49-F238E27FC236}">
-                <a16:creationId xmlns:a16="http://schemas.microsoft.com/office/drawing/2014/main" id="{7A1D3A3F-98BD-E943-9D0D-B6A09D391DCC}"/>
+          <p:cNvPr id="37" name="TextBox 36">
+            <a:extLst>
+              <a:ext uri="{FF2B5EF4-FFF2-40B4-BE49-F238E27FC236}">
+                <a16:creationId xmlns:a16="http://schemas.microsoft.com/office/drawing/2014/main" id="{62CF477C-5CF8-824E-8B1B-66ACD1E4714A}"/>
               </a:ext>
             </a:extLst>
           </p:cNvPr>
@@ -8679,102 +9675,7 @@
         </p:nvSpPr>
         <p:spPr>
           <a:xfrm>
-            <a:off x="620485" y="4205557"/>
-            <a:ext cx="3962401" cy="949809"/>
-          </a:xfrm>
-          <a:prstGeom prst="rect">
-            <a:avLst/>
-          </a:prstGeom>
-          <a:noFill/>
-          <a:ln>
-            <a:solidFill>
-              <a:schemeClr val="accent1"/>
-            </a:solidFill>
-          </a:ln>
-        </p:spPr>
-        <p:txBody>
-          <a:bodyPr wrap="none" rtlCol="0">
-            <a:noAutofit/>
-          </a:bodyPr>
-          <a:lstStyle/>
-          <a:p>
-            <a:r>
-              <a:rPr lang="en-US" sz="1600" dirty="0" err="1"/>
-              <a:t>TestMakeDisguise.sol</a:t>
-            </a:r>
-            <a:endParaRPr lang="en-US" sz="1600" dirty="0"/>
-          </a:p>
-          <a:p>
-            <a:r>
-              <a:rPr lang="en-US" sz="1200" dirty="0"/>
-              <a:t>disguise = [1, 2, 3, 4, 5, 6, 7, 8, 9, 10, 11]</a:t>
-            </a:r>
-          </a:p>
-          <a:p>
-            <a:r>
-              <a:rPr lang="en-US" sz="1200" dirty="0" err="1"/>
-              <a:t>PepitoDisguise</a:t>
-            </a:r>
-            <a:r>
-              <a:rPr lang="en-US" sz="1200" dirty="0"/>
-              <a:t> </a:t>
-            </a:r>
-            <a:r>
-              <a:rPr lang="en-US" sz="1200" dirty="0" err="1"/>
-              <a:t>pepitoDisguise</a:t>
-            </a:r>
-            <a:r>
-              <a:rPr lang="en-US" sz="1200" dirty="0"/>
-              <a:t> = new </a:t>
-            </a:r>
-            <a:r>
-              <a:rPr lang="en-US" sz="1200" dirty="0" err="1"/>
-              <a:t>PepitoDisguise</a:t>
-            </a:r>
-            <a:r>
-              <a:rPr lang="en-US" sz="1200" dirty="0"/>
-              <a:t>(owner);</a:t>
-            </a:r>
-          </a:p>
-          <a:p>
-            <a:r>
-              <a:rPr lang="en-US" sz="1200" dirty="0"/>
-              <a:t>const </a:t>
-            </a:r>
-            <a:r>
-              <a:rPr lang="en-US" sz="1200" dirty="0" err="1"/>
-              <a:t>ownerPepito</a:t>
-            </a:r>
-            <a:r>
-              <a:rPr lang="en-US" sz="1200" dirty="0"/>
-              <a:t> = </a:t>
-            </a:r>
-            <a:r>
-              <a:rPr lang="en-US" sz="1200" dirty="0" err="1"/>
-              <a:t>pepitoDisguise.storeDisguise</a:t>
-            </a:r>
-            <a:r>
-              <a:rPr lang="en-US" sz="1200" dirty="0"/>
-              <a:t>();</a:t>
-            </a:r>
-          </a:p>
-        </p:txBody>
-      </p:sp>
-      <p:sp>
-        <p:nvSpPr>
-          <p:cNvPr id="37" name="TextBox 36">
-            <a:extLst>
-              <a:ext uri="{FF2B5EF4-FFF2-40B4-BE49-F238E27FC236}">
-                <a16:creationId xmlns:a16="http://schemas.microsoft.com/office/drawing/2014/main" id="{62CF477C-5CF8-824E-8B1B-66ACD1E4714A}"/>
-              </a:ext>
-            </a:extLst>
-          </p:cNvPr>
-          <p:cNvSpPr txBox="1"/>
-          <p:nvPr/>
-        </p:nvSpPr>
-        <p:spPr>
-          <a:xfrm>
-            <a:off x="3309880" y="4664103"/>
+            <a:off x="7337593" y="2084190"/>
             <a:ext cx="555171" cy="190800"/>
           </a:xfrm>
           <a:prstGeom prst="rect">
@@ -8832,6 +9733,304 @@
           </a:ln>
         </p:spPr>
       </p:pic>
+      <p:sp>
+        <p:nvSpPr>
+          <p:cNvPr id="21" name="TextBox 28">
+            <a:extLst>
+              <a:ext uri="{FF2B5EF4-FFF2-40B4-BE49-F238E27FC236}">
+                <a16:creationId xmlns:a16="http://schemas.microsoft.com/office/drawing/2014/main" id="{962FDDE7-067C-2D48-9829-5939072BB91A}"/>
+              </a:ext>
+            </a:extLst>
+          </p:cNvPr>
+          <p:cNvSpPr txBox="1"/>
+          <p:nvPr/>
+        </p:nvSpPr>
+        <p:spPr>
+          <a:xfrm>
+            <a:off x="8364994" y="1641001"/>
+            <a:ext cx="1438214" cy="276999"/>
+          </a:xfrm>
+          <a:prstGeom prst="rect">
+            <a:avLst/>
+          </a:prstGeom>
+          <a:noFill/>
+        </p:spPr>
+        <p:txBody>
+          <a:bodyPr wrap="none" rtlCol="0">
+            <a:spAutoFit/>
+          </a:bodyPr>
+          <a:lstStyle/>
+          <a:p>
+            <a:r>
+              <a:rPr lang="fr-FR" sz="1200" i="1" dirty="0">
+                <a:solidFill>
+                  <a:srgbClr val="00B050"/>
+                </a:solidFill>
+              </a:rPr>
+              <a:t>check </a:t>
+            </a:r>
+            <a:r>
+              <a:rPr lang="fr-FR" sz="1200" i="1" dirty="0" err="1">
+                <a:solidFill>
+                  <a:srgbClr val="00B050"/>
+                </a:solidFill>
+              </a:rPr>
+              <a:t>tokenBalance</a:t>
+            </a:r>
+            <a:endParaRPr lang="en-LU" sz="1200" i="1" dirty="0">
+              <a:solidFill>
+                <a:srgbClr val="00B050"/>
+              </a:solidFill>
+              <a:latin typeface="Courier" pitchFamily="2" charset="0"/>
+            </a:endParaRPr>
+          </a:p>
+        </p:txBody>
+      </p:sp>
+      <p:sp>
+        <p:nvSpPr>
+          <p:cNvPr id="22" name="TextBox 28">
+            <a:extLst>
+              <a:ext uri="{FF2B5EF4-FFF2-40B4-BE49-F238E27FC236}">
+                <a16:creationId xmlns:a16="http://schemas.microsoft.com/office/drawing/2014/main" id="{2992C809-58B9-8D4A-AFAC-F6836F5778F9}"/>
+              </a:ext>
+            </a:extLst>
+          </p:cNvPr>
+          <p:cNvSpPr txBox="1"/>
+          <p:nvPr/>
+        </p:nvSpPr>
+        <p:spPr>
+          <a:xfrm>
+            <a:off x="8364994" y="2002971"/>
+            <a:ext cx="2594749" cy="461665"/>
+          </a:xfrm>
+          <a:prstGeom prst="rect">
+            <a:avLst/>
+          </a:prstGeom>
+          <a:noFill/>
+        </p:spPr>
+        <p:txBody>
+          <a:bodyPr wrap="none" rtlCol="0">
+            <a:spAutoFit/>
+          </a:bodyPr>
+          <a:lstStyle/>
+          <a:p>
+            <a:r>
+              <a:rPr lang="fr-FR" sz="1200" i="1" dirty="0">
+                <a:solidFill>
+                  <a:srgbClr val="00B050"/>
+                </a:solidFill>
+              </a:rPr>
+              <a:t>store a </a:t>
+            </a:r>
+            <a:r>
+              <a:rPr lang="fr-FR" sz="1200" i="1" dirty="0" err="1">
+                <a:solidFill>
+                  <a:srgbClr val="00B050"/>
+                </a:solidFill>
+              </a:rPr>
+              <a:t>disguise</a:t>
+            </a:r>
+            <a:endParaRPr lang="fr-FR" sz="1200" i="1" dirty="0">
+              <a:solidFill>
+                <a:srgbClr val="00B050"/>
+              </a:solidFill>
+            </a:endParaRPr>
+          </a:p>
+          <a:p>
+            <a:r>
+              <a:rPr lang="en-US" sz="1200" i="1" dirty="0">
+                <a:solidFill>
+                  <a:srgbClr val="00B050"/>
+                </a:solidFill>
+              </a:rPr>
+              <a:t>check that event reports same disguise</a:t>
+            </a:r>
+            <a:endParaRPr lang="en-US" sz="1200" i="1" dirty="0">
+              <a:solidFill>
+                <a:srgbClr val="00B050"/>
+              </a:solidFill>
+              <a:latin typeface="Courier" pitchFamily="2" charset="0"/>
+            </a:endParaRPr>
+          </a:p>
+        </p:txBody>
+      </p:sp>
+      <p:sp>
+        <p:nvSpPr>
+          <p:cNvPr id="26" name="TextBox 28">
+            <a:extLst>
+              <a:ext uri="{FF2B5EF4-FFF2-40B4-BE49-F238E27FC236}">
+                <a16:creationId xmlns:a16="http://schemas.microsoft.com/office/drawing/2014/main" id="{8C0E6C34-B401-D841-90ED-2B787A9BD801}"/>
+              </a:ext>
+            </a:extLst>
+          </p:cNvPr>
+          <p:cNvSpPr txBox="1"/>
+          <p:nvPr/>
+        </p:nvSpPr>
+        <p:spPr>
+          <a:xfrm>
+            <a:off x="8364994" y="2520352"/>
+            <a:ext cx="2594749" cy="461665"/>
+          </a:xfrm>
+          <a:prstGeom prst="rect">
+            <a:avLst/>
+          </a:prstGeom>
+          <a:noFill/>
+        </p:spPr>
+        <p:txBody>
+          <a:bodyPr wrap="none" rtlCol="0">
+            <a:spAutoFit/>
+          </a:bodyPr>
+          <a:lstStyle/>
+          <a:p>
+            <a:r>
+              <a:rPr lang="en-US" sz="1200" i="1" dirty="0">
+                <a:solidFill>
+                  <a:srgbClr val="00B050"/>
+                </a:solidFill>
+              </a:rPr>
+              <a:t>read a disguise</a:t>
+            </a:r>
+          </a:p>
+          <a:p>
+            <a:r>
+              <a:rPr lang="en-US" sz="1200" i="1" dirty="0">
+                <a:solidFill>
+                  <a:srgbClr val="00B050"/>
+                </a:solidFill>
+              </a:rPr>
+              <a:t>check that event reports same disguise</a:t>
+            </a:r>
+            <a:endParaRPr lang="en-US" sz="1200" i="1" dirty="0">
+              <a:solidFill>
+                <a:srgbClr val="00B050"/>
+              </a:solidFill>
+              <a:latin typeface="Courier" pitchFamily="2" charset="0"/>
+            </a:endParaRPr>
+          </a:p>
+        </p:txBody>
+      </p:sp>
+      <p:sp>
+        <p:nvSpPr>
+          <p:cNvPr id="27" name="TextBox 32">
+            <a:extLst>
+              <a:ext uri="{FF2B5EF4-FFF2-40B4-BE49-F238E27FC236}">
+                <a16:creationId xmlns:a16="http://schemas.microsoft.com/office/drawing/2014/main" id="{31B88895-9ABD-B54E-8D8E-0345DC1652C0}"/>
+              </a:ext>
+            </a:extLst>
+          </p:cNvPr>
+          <p:cNvSpPr txBox="1"/>
+          <p:nvPr/>
+        </p:nvSpPr>
+        <p:spPr>
+          <a:xfrm>
+            <a:off x="5248159" y="5373277"/>
+            <a:ext cx="555171" cy="190800"/>
+          </a:xfrm>
+          <a:prstGeom prst="rect">
+            <a:avLst/>
+          </a:prstGeom>
+          <a:noFill/>
+          <a:ln>
+            <a:noFill/>
+          </a:ln>
+        </p:spPr>
+        <p:txBody>
+          <a:bodyPr wrap="square" tIns="3600" bIns="3600" rtlCol="0">
+            <a:spAutoFit/>
+          </a:bodyPr>
+          <a:lstStyle/>
+          <a:p>
+            <a:r>
+              <a:rPr lang="en-LU" sz="1200" dirty="0"/>
+              <a:t> </a:t>
+            </a:r>
+          </a:p>
+        </p:txBody>
+      </p:sp>
+      <p:cxnSp>
+        <p:nvCxnSpPr>
+          <p:cNvPr id="29" name="Elbow Connector 33">
+            <a:extLst>
+              <a:ext uri="{FF2B5EF4-FFF2-40B4-BE49-F238E27FC236}">
+                <a16:creationId xmlns:a16="http://schemas.microsoft.com/office/drawing/2014/main" id="{B19DE63B-3A50-D744-84D5-5EA8F7F02335}"/>
+              </a:ext>
+            </a:extLst>
+          </p:cNvPr>
+          <p:cNvCxnSpPr>
+            <a:cxnSpLocks/>
+            <a:stCxn id="35" idx="2"/>
+            <a:endCxn id="27" idx="1"/>
+          </p:cNvCxnSpPr>
+          <p:nvPr/>
+        </p:nvCxnSpPr>
+        <p:spPr>
+          <a:xfrm rot="5400000">
+            <a:off x="4448381" y="3793223"/>
+            <a:ext cx="2475232" cy="875676"/>
+          </a:xfrm>
+          <a:prstGeom prst="bentConnector4">
+            <a:avLst>
+              <a:gd name="adj1" fmla="val 48073"/>
+              <a:gd name="adj2" fmla="val 160913"/>
+            </a:avLst>
+          </a:prstGeom>
+          <a:ln w="12700">
+            <a:tailEnd type="triangle"/>
+          </a:ln>
+        </p:spPr>
+        <p:style>
+          <a:lnRef idx="1">
+            <a:schemeClr val="accent1"/>
+          </a:lnRef>
+          <a:fillRef idx="0">
+            <a:schemeClr val="accent1"/>
+          </a:fillRef>
+          <a:effectRef idx="0">
+            <a:schemeClr val="accent1"/>
+          </a:effectRef>
+          <a:fontRef idx="minor">
+            <a:schemeClr val="tx1"/>
+          </a:fontRef>
+        </p:style>
+      </p:cxnSp>
+      <p:sp>
+        <p:nvSpPr>
+          <p:cNvPr id="35" name="TextBox 36">
+            <a:extLst>
+              <a:ext uri="{FF2B5EF4-FFF2-40B4-BE49-F238E27FC236}">
+                <a16:creationId xmlns:a16="http://schemas.microsoft.com/office/drawing/2014/main" id="{F22E39FE-340A-8544-ACE6-CEB8B8CD9FF1}"/>
+              </a:ext>
+            </a:extLst>
+          </p:cNvPr>
+          <p:cNvSpPr txBox="1"/>
+          <p:nvPr/>
+        </p:nvSpPr>
+        <p:spPr>
+          <a:xfrm>
+            <a:off x="5846249" y="2802645"/>
+            <a:ext cx="555171" cy="190800"/>
+          </a:xfrm>
+          <a:prstGeom prst="rect">
+            <a:avLst/>
+          </a:prstGeom>
+          <a:noFill/>
+          <a:ln>
+            <a:noFill/>
+          </a:ln>
+        </p:spPr>
+        <p:txBody>
+          <a:bodyPr wrap="square" tIns="3600" bIns="3600" rtlCol="0">
+            <a:spAutoFit/>
+          </a:bodyPr>
+          <a:lstStyle/>
+          <a:p>
+            <a:r>
+              <a:rPr lang="en-LU" sz="1200" dirty="0"/>
+              <a:t> </a:t>
+            </a:r>
+          </a:p>
+        </p:txBody>
+      </p:sp>
     </p:spTree>
     <p:extLst>
       <p:ext uri="{BB962C8B-B14F-4D97-AF65-F5344CB8AC3E}">
@@ -15152,7 +16351,7 @@
                   <a:srgbClr val="980000"/>
                 </a:solidFill>
               </a:rPr>
-              <a:t>Deploying on testnet instead of ganache-truffle</a:t>
+              <a:t>Deploying on testnet instead of on truffle-develop</a:t>
             </a:r>
           </a:p>
         </p:txBody>

</xml_diff>

<commit_message>
adapt .env to React build
</commit_message>
<xml_diff>
--- a/Pepito/Final Project Design.pptx
+++ b/Pepito/Final Project Design.pptx
@@ -5,7 +5,7 @@
     <p:sldMasterId id="2147483648" r:id="rId1"/>
   </p:sldMasterIdLst>
   <p:notesMasterIdLst>
-    <p:notesMasterId r:id="rId12"/>
+    <p:notesMasterId r:id="rId13"/>
   </p:notesMasterIdLst>
   <p:sldIdLst>
     <p:sldId id="256" r:id="rId2"/>
@@ -18,6 +18,7 @@
     <p:sldId id="271" r:id="rId9"/>
     <p:sldId id="272" r:id="rId10"/>
     <p:sldId id="273" r:id="rId11"/>
+    <p:sldId id="274" r:id="rId12"/>
   </p:sldIdLst>
   <p:sldSz cx="12192000" cy="6858000"/>
   <p:notesSz cx="6858000" cy="9144000"/>
@@ -206,7 +207,7 @@
           <a:p>
             <a:fld id="{E3DEDAA8-261D-1A48-9864-3FC231515C43}" type="datetimeFigureOut">
               <a:rPr lang="en-LU" smtClean="0"/>
-              <a:t>05/04/2021</a:t>
+              <a:t>10/04/2021</a:t>
             </a:fld>
             <a:endParaRPr lang="en-LU"/>
           </a:p>
@@ -558,6 +559,90 @@
 </p:notes>
 </file>
 
+<file path=ppt/notesSlides/notesSlide10.xml><?xml version="1.0" encoding="utf-8"?>
+<p:notes xmlns:a="http://schemas.openxmlformats.org/drawingml/2006/main" xmlns:r="http://schemas.openxmlformats.org/officeDocument/2006/relationships" xmlns:p="http://schemas.openxmlformats.org/presentationml/2006/main">
+  <p:cSld>
+    <p:spTree>
+      <p:nvGrpSpPr>
+        <p:cNvPr id="1" name=""/>
+        <p:cNvGrpSpPr/>
+        <p:nvPr/>
+      </p:nvGrpSpPr>
+      <p:grpSpPr>
+        <a:xfrm>
+          <a:off x="0" y="0"/>
+          <a:ext cx="0" cy="0"/>
+          <a:chOff x="0" y="0"/>
+          <a:chExt cx="0" cy="0"/>
+        </a:xfrm>
+      </p:grpSpPr>
+      <p:sp>
+        <p:nvSpPr>
+          <p:cNvPr id="2" name="Slide Image Placeholder 1"/>
+          <p:cNvSpPr>
+            <a:spLocks noGrp="1" noRot="1" noChangeAspect="1"/>
+          </p:cNvSpPr>
+          <p:nvPr>
+            <p:ph type="sldImg"/>
+          </p:nvPr>
+        </p:nvSpPr>
+        <p:spPr/>
+      </p:sp>
+      <p:sp>
+        <p:nvSpPr>
+          <p:cNvPr id="3" name="Notes Placeholder 2"/>
+          <p:cNvSpPr>
+            <a:spLocks noGrp="1"/>
+          </p:cNvSpPr>
+          <p:nvPr>
+            <p:ph type="body" idx="1"/>
+          </p:nvPr>
+        </p:nvSpPr>
+        <p:spPr/>
+        <p:txBody>
+          <a:bodyPr/>
+          <a:lstStyle/>
+          <a:p>
+            <a:endParaRPr lang="en-LU" dirty="0"/>
+          </a:p>
+        </p:txBody>
+      </p:sp>
+      <p:sp>
+        <p:nvSpPr>
+          <p:cNvPr id="4" name="Slide Number Placeholder 3"/>
+          <p:cNvSpPr>
+            <a:spLocks noGrp="1"/>
+          </p:cNvSpPr>
+          <p:nvPr>
+            <p:ph type="sldNum" sz="quarter" idx="5"/>
+          </p:nvPr>
+        </p:nvSpPr>
+        <p:spPr/>
+        <p:txBody>
+          <a:bodyPr/>
+          <a:lstStyle/>
+          <a:p>
+            <a:fld id="{F4E383B0-44CE-084D-AB54-AAB397A3DF4F}" type="slidenum">
+              <a:rPr lang="en-LU" smtClean="0"/>
+              <a:t>11</a:t>
+            </a:fld>
+            <a:endParaRPr lang="en-LU"/>
+          </a:p>
+        </p:txBody>
+      </p:sp>
+    </p:spTree>
+    <p:extLst>
+      <p:ext uri="{BB962C8B-B14F-4D97-AF65-F5344CB8AC3E}">
+        <p14:creationId xmlns:p14="http://schemas.microsoft.com/office/powerpoint/2010/main" val="2916054568"/>
+      </p:ext>
+    </p:extLst>
+  </p:cSld>
+  <p:clrMapOvr>
+    <a:masterClrMapping/>
+  </p:clrMapOvr>
+</p:notes>
+</file>
+
 <file path=ppt/notesSlides/notesSlide2.xml><?xml version="1.0" encoding="utf-8"?>
 <p:notes xmlns:a="http://schemas.openxmlformats.org/drawingml/2006/main" xmlns:r="http://schemas.openxmlformats.org/officeDocument/2006/relationships" xmlns:p="http://schemas.openxmlformats.org/presentationml/2006/main">
   <p:cSld>
@@ -1379,7 +1464,7 @@
           <a:p>
             <a:fld id="{9ECEDF27-B25B-0343-A39C-1905A44EF111}" type="datetimeFigureOut">
               <a:rPr lang="en-LU" smtClean="0"/>
-              <a:t>05/04/2021</a:t>
+              <a:t>10/04/2021</a:t>
             </a:fld>
             <a:endParaRPr lang="en-LU"/>
           </a:p>
@@ -1579,7 +1664,7 @@
           <a:p>
             <a:fld id="{9ECEDF27-B25B-0343-A39C-1905A44EF111}" type="datetimeFigureOut">
               <a:rPr lang="en-LU" smtClean="0"/>
-              <a:t>05/04/2021</a:t>
+              <a:t>10/04/2021</a:t>
             </a:fld>
             <a:endParaRPr lang="en-LU"/>
           </a:p>
@@ -1789,7 +1874,7 @@
           <a:p>
             <a:fld id="{9ECEDF27-B25B-0343-A39C-1905A44EF111}" type="datetimeFigureOut">
               <a:rPr lang="en-LU" smtClean="0"/>
-              <a:t>05/04/2021</a:t>
+              <a:t>10/04/2021</a:t>
             </a:fld>
             <a:endParaRPr lang="en-LU"/>
           </a:p>
@@ -1989,7 +2074,7 @@
           <a:p>
             <a:fld id="{9ECEDF27-B25B-0343-A39C-1905A44EF111}" type="datetimeFigureOut">
               <a:rPr lang="en-LU" smtClean="0"/>
-              <a:t>05/04/2021</a:t>
+              <a:t>10/04/2021</a:t>
             </a:fld>
             <a:endParaRPr lang="en-LU"/>
           </a:p>
@@ -2265,7 +2350,7 @@
           <a:p>
             <a:fld id="{9ECEDF27-B25B-0343-A39C-1905A44EF111}" type="datetimeFigureOut">
               <a:rPr lang="en-LU" smtClean="0"/>
-              <a:t>05/04/2021</a:t>
+              <a:t>10/04/2021</a:t>
             </a:fld>
             <a:endParaRPr lang="en-LU"/>
           </a:p>
@@ -2533,7 +2618,7 @@
           <a:p>
             <a:fld id="{9ECEDF27-B25B-0343-A39C-1905A44EF111}" type="datetimeFigureOut">
               <a:rPr lang="en-LU" smtClean="0"/>
-              <a:t>05/04/2021</a:t>
+              <a:t>10/04/2021</a:t>
             </a:fld>
             <a:endParaRPr lang="en-LU"/>
           </a:p>
@@ -2948,7 +3033,7 @@
           <a:p>
             <a:fld id="{9ECEDF27-B25B-0343-A39C-1905A44EF111}" type="datetimeFigureOut">
               <a:rPr lang="en-LU" smtClean="0"/>
-              <a:t>05/04/2021</a:t>
+              <a:t>10/04/2021</a:t>
             </a:fld>
             <a:endParaRPr lang="en-LU"/>
           </a:p>
@@ -3090,7 +3175,7 @@
           <a:p>
             <a:fld id="{9ECEDF27-B25B-0343-A39C-1905A44EF111}" type="datetimeFigureOut">
               <a:rPr lang="en-LU" smtClean="0"/>
-              <a:t>05/04/2021</a:t>
+              <a:t>10/04/2021</a:t>
             </a:fld>
             <a:endParaRPr lang="en-LU"/>
           </a:p>
@@ -3203,7 +3288,7 @@
           <a:p>
             <a:fld id="{9ECEDF27-B25B-0343-A39C-1905A44EF111}" type="datetimeFigureOut">
               <a:rPr lang="en-LU" smtClean="0"/>
-              <a:t>05/04/2021</a:t>
+              <a:t>10/04/2021</a:t>
             </a:fld>
             <a:endParaRPr lang="en-LU"/>
           </a:p>
@@ -3516,7 +3601,7 @@
           <a:p>
             <a:fld id="{9ECEDF27-B25B-0343-A39C-1905A44EF111}" type="datetimeFigureOut">
               <a:rPr lang="en-LU" smtClean="0"/>
-              <a:t>05/04/2021</a:t>
+              <a:t>10/04/2021</a:t>
             </a:fld>
             <a:endParaRPr lang="en-LU"/>
           </a:p>
@@ -3805,7 +3890,7 @@
           <a:p>
             <a:fld id="{9ECEDF27-B25B-0343-A39C-1905A44EF111}" type="datetimeFigureOut">
               <a:rPr lang="en-LU" smtClean="0"/>
-              <a:t>05/04/2021</a:t>
+              <a:t>10/04/2021</a:t>
             </a:fld>
             <a:endParaRPr lang="en-LU"/>
           </a:p>
@@ -4048,7 +4133,7 @@
           <a:p>
             <a:fld id="{9ECEDF27-B25B-0343-A39C-1905A44EF111}" type="datetimeFigureOut">
               <a:rPr lang="en-LU" smtClean="0"/>
-              <a:t>05/04/2021</a:t>
+              <a:t>10/04/2021</a:t>
             </a:fld>
             <a:endParaRPr lang="en-LU"/>
           </a:p>
@@ -7828,6 +7913,1219 @@
 </p:sld>
 </file>
 
+<file path=ppt/slides/slide11.xml><?xml version="1.0" encoding="utf-8"?>
+<p:sld xmlns:a="http://schemas.openxmlformats.org/drawingml/2006/main" xmlns:r="http://schemas.openxmlformats.org/officeDocument/2006/relationships" xmlns:p="http://schemas.openxmlformats.org/presentationml/2006/main">
+  <p:cSld>
+    <p:spTree>
+      <p:nvGrpSpPr>
+        <p:cNvPr id="1" name=""/>
+        <p:cNvGrpSpPr/>
+        <p:nvPr/>
+      </p:nvGrpSpPr>
+      <p:grpSpPr>
+        <a:xfrm>
+          <a:off x="0" y="0"/>
+          <a:ext cx="0" cy="0"/>
+          <a:chOff x="0" y="0"/>
+          <a:chExt cx="0" cy="0"/>
+        </a:xfrm>
+      </p:grpSpPr>
+      <p:sp>
+        <p:nvSpPr>
+          <p:cNvPr id="4" name="TextBox 3">
+            <a:extLst>
+              <a:ext uri="{FF2B5EF4-FFF2-40B4-BE49-F238E27FC236}">
+                <a16:creationId xmlns:a16="http://schemas.microsoft.com/office/drawing/2014/main" id="{7B91D8D0-F88B-784E-8FF8-D5F07BC08546}"/>
+              </a:ext>
+            </a:extLst>
+          </p:cNvPr>
+          <p:cNvSpPr txBox="1"/>
+          <p:nvPr/>
+        </p:nvSpPr>
+        <p:spPr>
+          <a:xfrm>
+            <a:off x="620486" y="250372"/>
+            <a:ext cx="4969814" cy="594250"/>
+          </a:xfrm>
+          <a:prstGeom prst="rect">
+            <a:avLst/>
+          </a:prstGeom>
+          <a:solidFill>
+            <a:srgbClr val="E1EFD8"/>
+          </a:solidFill>
+        </p:spPr>
+        <p:txBody>
+          <a:bodyPr wrap="none" rtlCol="0" anchor="ctr" anchorCtr="0">
+            <a:noAutofit/>
+          </a:bodyPr>
+          <a:lstStyle/>
+          <a:p>
+            <a:r>
+              <a:rPr lang="en-US" b="1" dirty="0">
+                <a:solidFill>
+                  <a:srgbClr val="980000"/>
+                </a:solidFill>
+              </a:rPr>
+              <a:t>Deploying on testnet</a:t>
+            </a:r>
+          </a:p>
+        </p:txBody>
+      </p:sp>
+      <p:sp>
+        <p:nvSpPr>
+          <p:cNvPr id="9" name="TextBox 8">
+            <a:extLst>
+              <a:ext uri="{FF2B5EF4-FFF2-40B4-BE49-F238E27FC236}">
+                <a16:creationId xmlns:a16="http://schemas.microsoft.com/office/drawing/2014/main" id="{A648BA86-9C0C-0846-A8F7-877203CF605C}"/>
+              </a:ext>
+            </a:extLst>
+          </p:cNvPr>
+          <p:cNvSpPr txBox="1"/>
+          <p:nvPr/>
+        </p:nvSpPr>
+        <p:spPr>
+          <a:xfrm>
+            <a:off x="1207302" y="2401133"/>
+            <a:ext cx="4562127" cy="1844300"/>
+          </a:xfrm>
+          <a:prstGeom prst="rect">
+            <a:avLst/>
+          </a:prstGeom>
+          <a:noFill/>
+          <a:ln>
+            <a:solidFill>
+              <a:schemeClr val="accent1"/>
+            </a:solidFill>
+          </a:ln>
+        </p:spPr>
+        <p:txBody>
+          <a:bodyPr wrap="none" rtlCol="0">
+            <a:noAutofit/>
+          </a:bodyPr>
+          <a:lstStyle/>
+          <a:p>
+            <a:r>
+              <a:rPr lang="en-US" sz="1600" dirty="0"/>
+              <a:t>truffle-</a:t>
+            </a:r>
+            <a:r>
+              <a:rPr lang="en-US" sz="1600" dirty="0" err="1"/>
+              <a:t>config.js</a:t>
+            </a:r>
+            <a:endParaRPr lang="en-US" sz="1600" dirty="0"/>
+          </a:p>
+          <a:p>
+            <a:pPr marL="171450" indent="-171450">
+              <a:buFont typeface="Arial" panose="020B0604020202020204" pitchFamily="34" charset="0"/>
+              <a:buChar char="•"/>
+            </a:pPr>
+            <a:r>
+              <a:rPr lang="en-US" sz="1200" dirty="0"/>
+              <a:t>require('</a:t>
+            </a:r>
+            <a:r>
+              <a:rPr lang="en-US" sz="1200" dirty="0" err="1"/>
+              <a:t>dotenv</a:t>
+            </a:r>
+            <a:r>
+              <a:rPr lang="en-US" sz="1200" dirty="0"/>
+              <a:t>').config();</a:t>
+            </a:r>
+          </a:p>
+          <a:p>
+            <a:pPr marL="171450" indent="-171450">
+              <a:buFont typeface="Arial" panose="020B0604020202020204" pitchFamily="34" charset="0"/>
+              <a:buChar char="•"/>
+              <a:tabLst>
+                <a:tab pos="531813" algn="l"/>
+                <a:tab pos="704850" algn="l"/>
+              </a:tabLst>
+            </a:pPr>
+            <a:r>
+              <a:rPr lang="en-US" sz="1200" dirty="0"/>
+              <a:t>networks: {"</a:t>
+            </a:r>
+            <a:r>
+              <a:rPr lang="en-US" sz="1200" dirty="0" err="1"/>
+              <a:t>rinkeby-infura</a:t>
+            </a:r>
+            <a:r>
+              <a:rPr lang="en-US" sz="1200" dirty="0"/>
+              <a:t>": {</a:t>
+            </a:r>
+          </a:p>
+          <a:p>
+            <a:pPr marL="171450" indent="-171450">
+              <a:buFont typeface="Arial" panose="020B0604020202020204" pitchFamily="34" charset="0"/>
+              <a:buChar char="•"/>
+              <a:tabLst>
+                <a:tab pos="531813" algn="l"/>
+                <a:tab pos="704850" algn="l"/>
+              </a:tabLst>
+            </a:pPr>
+            <a:r>
+              <a:rPr lang="en-US" sz="1200" dirty="0"/>
+              <a:t>        provider: () =&gt; new </a:t>
+            </a:r>
+            <a:r>
+              <a:rPr lang="en-US" sz="1200" dirty="0" err="1"/>
+              <a:t>HDWalletProvider</a:t>
+            </a:r>
+            <a:r>
+              <a:rPr lang="en-US" sz="1200" dirty="0"/>
+              <a:t>(</a:t>
+            </a:r>
+          </a:p>
+          <a:p>
+            <a:pPr marL="171450" indent="-171450">
+              <a:buFont typeface="Arial" panose="020B0604020202020204" pitchFamily="34" charset="0"/>
+              <a:buChar char="•"/>
+              <a:tabLst>
+                <a:tab pos="531813" algn="l"/>
+                <a:tab pos="704850" algn="l"/>
+              </a:tabLst>
+            </a:pPr>
+            <a:r>
+              <a:rPr lang="en-US" sz="1200" dirty="0"/>
+              <a:t>            </a:t>
+            </a:r>
+            <a:r>
+              <a:rPr lang="en-US" sz="1200" dirty="0" err="1"/>
+              <a:t>process.env</a:t>
+            </a:r>
+            <a:r>
+              <a:rPr lang="en-US" sz="1200" dirty="0"/>
+              <a:t>. TEST_MNEMONIC,</a:t>
+            </a:r>
+          </a:p>
+          <a:p>
+            <a:pPr marL="171450" indent="-171450">
+              <a:buFont typeface="Arial" panose="020B0604020202020204" pitchFamily="34" charset="0"/>
+              <a:buChar char="•"/>
+              <a:tabLst>
+                <a:tab pos="531813" algn="l"/>
+                <a:tab pos="704850" algn="l"/>
+              </a:tabLst>
+            </a:pPr>
+            <a:r>
+              <a:rPr lang="en-US" sz="1200" dirty="0"/>
+              <a:t>            `https://</a:t>
+            </a:r>
+            <a:r>
+              <a:rPr lang="en-US" sz="1200" dirty="0" err="1"/>
+              <a:t>rinkeby.infura.io</a:t>
+            </a:r>
+            <a:r>
+              <a:rPr lang="en-US" sz="1200" dirty="0"/>
+              <a:t>/v3/${</a:t>
+            </a:r>
+            <a:r>
+              <a:rPr lang="en-US" sz="1200" dirty="0" err="1"/>
+              <a:t>process.env</a:t>
+            </a:r>
+            <a:r>
+              <a:rPr lang="en-US" sz="1200" dirty="0"/>
+              <a:t>. INFURA_KEY}`</a:t>
+            </a:r>
+          </a:p>
+          <a:p>
+            <a:pPr marL="171450" indent="-171450">
+              <a:buFont typeface="Arial" panose="020B0604020202020204" pitchFamily="34" charset="0"/>
+              <a:buChar char="•"/>
+              <a:tabLst>
+                <a:tab pos="531813" algn="l"/>
+                <a:tab pos="704850" algn="l"/>
+              </a:tabLst>
+            </a:pPr>
+            <a:r>
+              <a:rPr lang="en-US" sz="1200" dirty="0"/>
+              <a:t>        ),</a:t>
+            </a:r>
+          </a:p>
+          <a:p>
+            <a:pPr marL="171450" indent="-171450">
+              <a:buFont typeface="Arial" panose="020B0604020202020204" pitchFamily="34" charset="0"/>
+              <a:buChar char="•"/>
+              <a:tabLst>
+                <a:tab pos="531813" algn="l"/>
+                <a:tab pos="704850" algn="l"/>
+              </a:tabLst>
+            </a:pPr>
+            <a:r>
+              <a:rPr lang="en-US" sz="1200" dirty="0"/>
+              <a:t>        </a:t>
+            </a:r>
+            <a:r>
+              <a:rPr lang="en-US" sz="1200" dirty="0" err="1"/>
+              <a:t>network_id</a:t>
+            </a:r>
+            <a:r>
+              <a:rPr lang="en-US" sz="1200" dirty="0"/>
+              <a:t>: 4,       // </a:t>
+            </a:r>
+            <a:r>
+              <a:rPr lang="en-US" sz="1200" dirty="0" err="1"/>
+              <a:t>Rinkeby's</a:t>
+            </a:r>
+            <a:r>
+              <a:rPr lang="en-US" sz="1200" dirty="0"/>
+              <a:t> network ID</a:t>
+            </a:r>
+          </a:p>
+          <a:p>
+            <a:pPr marL="171450" indent="-171450">
+              <a:buFont typeface="Arial" panose="020B0604020202020204" pitchFamily="34" charset="0"/>
+              <a:buChar char="•"/>
+              <a:tabLst>
+                <a:tab pos="531813" algn="l"/>
+                <a:tab pos="704850" algn="l"/>
+              </a:tabLst>
+            </a:pPr>
+            <a:r>
+              <a:rPr lang="en-US" sz="1200" dirty="0"/>
+              <a:t>        gas: 8500000,</a:t>
+            </a:r>
+          </a:p>
+        </p:txBody>
+      </p:sp>
+      <p:sp>
+        <p:nvSpPr>
+          <p:cNvPr id="22" name="TextBox 21">
+            <a:extLst>
+              <a:ext uri="{FF2B5EF4-FFF2-40B4-BE49-F238E27FC236}">
+                <a16:creationId xmlns:a16="http://schemas.microsoft.com/office/drawing/2014/main" id="{F549962F-115E-1648-9637-7B6BADF704D2}"/>
+              </a:ext>
+            </a:extLst>
+          </p:cNvPr>
+          <p:cNvSpPr txBox="1"/>
+          <p:nvPr/>
+        </p:nvSpPr>
+        <p:spPr>
+          <a:xfrm>
+            <a:off x="2488958" y="2401133"/>
+            <a:ext cx="555171" cy="190800"/>
+          </a:xfrm>
+          <a:prstGeom prst="rect">
+            <a:avLst/>
+          </a:prstGeom>
+          <a:noFill/>
+          <a:ln>
+            <a:noFill/>
+          </a:ln>
+        </p:spPr>
+        <p:txBody>
+          <a:bodyPr wrap="square" tIns="3600" bIns="3600" rtlCol="0">
+            <a:spAutoFit/>
+          </a:bodyPr>
+          <a:lstStyle/>
+          <a:p>
+            <a:r>
+              <a:rPr lang="en-LU" sz="1200" dirty="0"/>
+              <a:t> </a:t>
+            </a:r>
+          </a:p>
+        </p:txBody>
+      </p:sp>
+      <p:sp>
+        <p:nvSpPr>
+          <p:cNvPr id="21" name="TextBox 20">
+            <a:extLst>
+              <a:ext uri="{FF2B5EF4-FFF2-40B4-BE49-F238E27FC236}">
+                <a16:creationId xmlns:a16="http://schemas.microsoft.com/office/drawing/2014/main" id="{CC801F14-4C79-3248-A2D0-30151C9DC533}"/>
+              </a:ext>
+            </a:extLst>
+          </p:cNvPr>
+          <p:cNvSpPr txBox="1"/>
+          <p:nvPr/>
+        </p:nvSpPr>
+        <p:spPr>
+          <a:xfrm>
+            <a:off x="1416388" y="2161170"/>
+            <a:ext cx="555171" cy="190800"/>
+          </a:xfrm>
+          <a:prstGeom prst="rect">
+            <a:avLst/>
+          </a:prstGeom>
+          <a:noFill/>
+          <a:ln>
+            <a:noFill/>
+          </a:ln>
+        </p:spPr>
+        <p:txBody>
+          <a:bodyPr wrap="square" tIns="3600" bIns="3600" rtlCol="0">
+            <a:spAutoFit/>
+          </a:bodyPr>
+          <a:lstStyle/>
+          <a:p>
+            <a:r>
+              <a:rPr lang="en-LU" sz="1200" dirty="0"/>
+              <a:t> </a:t>
+            </a:r>
+          </a:p>
+        </p:txBody>
+      </p:sp>
+      <p:pic>
+        <p:nvPicPr>
+          <p:cNvPr id="24" name="Google Shape;117;p28">
+            <a:extLst>
+              <a:ext uri="{FF2B5EF4-FFF2-40B4-BE49-F238E27FC236}">
+                <a16:creationId xmlns:a16="http://schemas.microsoft.com/office/drawing/2014/main" id="{2EA4266C-D217-D343-8C4D-91A2E9F28720}"/>
+              </a:ext>
+            </a:extLst>
+          </p:cNvPr>
+          <p:cNvPicPr preferRelativeResize="0"/>
+          <p:nvPr/>
+        </p:nvPicPr>
+        <p:blipFill>
+          <a:blip r:embed="rId3">
+            <a:alphaModFix/>
+          </a:blip>
+          <a:stretch>
+            <a:fillRect/>
+          </a:stretch>
+        </p:blipFill>
+        <p:spPr>
+          <a:xfrm>
+            <a:off x="10424687" y="146484"/>
+            <a:ext cx="1357940" cy="1357940"/>
+          </a:xfrm>
+          <a:prstGeom prst="rect">
+            <a:avLst/>
+          </a:prstGeom>
+          <a:noFill/>
+          <a:ln>
+            <a:noFill/>
+          </a:ln>
+        </p:spPr>
+      </p:pic>
+      <p:sp>
+        <p:nvSpPr>
+          <p:cNvPr id="25" name="TextBox 24">
+            <a:extLst>
+              <a:ext uri="{FF2B5EF4-FFF2-40B4-BE49-F238E27FC236}">
+                <a16:creationId xmlns:a16="http://schemas.microsoft.com/office/drawing/2014/main" id="{5C8B49F7-ACCE-8745-A8F0-1B7B7DFE84F2}"/>
+              </a:ext>
+            </a:extLst>
+          </p:cNvPr>
+          <p:cNvSpPr txBox="1"/>
+          <p:nvPr/>
+        </p:nvSpPr>
+        <p:spPr>
+          <a:xfrm>
+            <a:off x="1207302" y="1105733"/>
+            <a:ext cx="3694509" cy="788381"/>
+          </a:xfrm>
+          <a:prstGeom prst="rect">
+            <a:avLst/>
+          </a:prstGeom>
+          <a:noFill/>
+          <a:ln>
+            <a:solidFill>
+              <a:schemeClr val="accent1"/>
+            </a:solidFill>
+          </a:ln>
+        </p:spPr>
+        <p:txBody>
+          <a:bodyPr wrap="none" rtlCol="0">
+            <a:noAutofit/>
+          </a:bodyPr>
+          <a:lstStyle/>
+          <a:p>
+            <a:r>
+              <a:rPr lang="en-US" sz="1600" dirty="0"/>
+              <a:t>.env</a:t>
+            </a:r>
+          </a:p>
+          <a:p>
+            <a:pPr marL="171450" indent="-171450">
+              <a:buFont typeface="Arial" panose="020B0604020202020204" pitchFamily="34" charset="0"/>
+              <a:buChar char="•"/>
+            </a:pPr>
+            <a:r>
+              <a:rPr lang="en-US" sz="1200" dirty="0"/>
+              <a:t>Seed phrase of developer’s Metamask</a:t>
+            </a:r>
+          </a:p>
+          <a:p>
+            <a:pPr marL="171450" indent="-171450">
+              <a:buFont typeface="Arial" panose="020B0604020202020204" pitchFamily="34" charset="0"/>
+              <a:buChar char="•"/>
+              <a:tabLst>
+                <a:tab pos="531813" algn="l"/>
+                <a:tab pos="704850" algn="l"/>
+              </a:tabLst>
+            </a:pPr>
+            <a:r>
+              <a:rPr lang="en-US" sz="1200" dirty="0"/>
+              <a:t>Infura Project key of developer </a:t>
+            </a:r>
+          </a:p>
+        </p:txBody>
+      </p:sp>
+      <p:sp>
+        <p:nvSpPr>
+          <p:cNvPr id="27" name="TextBox 26">
+            <a:extLst>
+              <a:ext uri="{FF2B5EF4-FFF2-40B4-BE49-F238E27FC236}">
+                <a16:creationId xmlns:a16="http://schemas.microsoft.com/office/drawing/2014/main" id="{061D9E6F-707F-EA42-BF9D-A4F6A5E2270F}"/>
+              </a:ext>
+            </a:extLst>
+          </p:cNvPr>
+          <p:cNvSpPr txBox="1"/>
+          <p:nvPr/>
+        </p:nvSpPr>
+        <p:spPr>
+          <a:xfrm>
+            <a:off x="1862701" y="3238200"/>
+            <a:ext cx="555171" cy="190800"/>
+          </a:xfrm>
+          <a:prstGeom prst="rect">
+            <a:avLst/>
+          </a:prstGeom>
+          <a:noFill/>
+          <a:ln>
+            <a:noFill/>
+          </a:ln>
+        </p:spPr>
+        <p:txBody>
+          <a:bodyPr wrap="square" tIns="3600" bIns="3600" rtlCol="0">
+            <a:spAutoFit/>
+          </a:bodyPr>
+          <a:lstStyle/>
+          <a:p>
+            <a:r>
+              <a:rPr lang="en-LU" sz="1200" dirty="0"/>
+              <a:t> </a:t>
+            </a:r>
+          </a:p>
+        </p:txBody>
+      </p:sp>
+      <p:cxnSp>
+        <p:nvCxnSpPr>
+          <p:cNvPr id="28" name="Elbow Connector 27">
+            <a:extLst>
+              <a:ext uri="{FF2B5EF4-FFF2-40B4-BE49-F238E27FC236}">
+                <a16:creationId xmlns:a16="http://schemas.microsoft.com/office/drawing/2014/main" id="{362BAECA-BB4F-1145-B07A-E1D6B7A90592}"/>
+              </a:ext>
+            </a:extLst>
+          </p:cNvPr>
+          <p:cNvCxnSpPr>
+            <a:cxnSpLocks/>
+            <a:stCxn id="44" idx="1"/>
+            <a:endCxn id="27" idx="1"/>
+          </p:cNvCxnSpPr>
+          <p:nvPr/>
+        </p:nvCxnSpPr>
+        <p:spPr>
+          <a:xfrm rot="10800000" flipH="1" flipV="1">
+            <a:off x="1416387" y="1480888"/>
+            <a:ext cx="446313" cy="1852711"/>
+          </a:xfrm>
+          <a:prstGeom prst="bentConnector3">
+            <a:avLst>
+              <a:gd name="adj1" fmla="val -143903"/>
+            </a:avLst>
+          </a:prstGeom>
+          <a:ln w="12700">
+            <a:tailEnd type="triangle"/>
+          </a:ln>
+        </p:spPr>
+        <p:style>
+          <a:lnRef idx="1">
+            <a:schemeClr val="accent1"/>
+          </a:lnRef>
+          <a:fillRef idx="0">
+            <a:schemeClr val="accent1"/>
+          </a:fillRef>
+          <a:effectRef idx="0">
+            <a:schemeClr val="accent1"/>
+          </a:effectRef>
+          <a:fontRef idx="minor">
+            <a:schemeClr val="tx1"/>
+          </a:fontRef>
+        </p:style>
+      </p:cxnSp>
+      <p:sp>
+        <p:nvSpPr>
+          <p:cNvPr id="44" name="TextBox 43">
+            <a:extLst>
+              <a:ext uri="{FF2B5EF4-FFF2-40B4-BE49-F238E27FC236}">
+                <a16:creationId xmlns:a16="http://schemas.microsoft.com/office/drawing/2014/main" id="{ED3E2AB8-7304-3449-9076-8CFCA3933B44}"/>
+              </a:ext>
+            </a:extLst>
+          </p:cNvPr>
+          <p:cNvSpPr txBox="1"/>
+          <p:nvPr/>
+        </p:nvSpPr>
+        <p:spPr>
+          <a:xfrm>
+            <a:off x="1416388" y="1385489"/>
+            <a:ext cx="555171" cy="190800"/>
+          </a:xfrm>
+          <a:prstGeom prst="rect">
+            <a:avLst/>
+          </a:prstGeom>
+          <a:noFill/>
+          <a:ln>
+            <a:noFill/>
+          </a:ln>
+        </p:spPr>
+        <p:txBody>
+          <a:bodyPr wrap="square" tIns="3600" bIns="3600" rtlCol="0">
+            <a:spAutoFit/>
+          </a:bodyPr>
+          <a:lstStyle/>
+          <a:p>
+            <a:r>
+              <a:rPr lang="en-LU" sz="1200" dirty="0"/>
+              <a:t> </a:t>
+            </a:r>
+          </a:p>
+        </p:txBody>
+      </p:sp>
+      <p:sp>
+        <p:nvSpPr>
+          <p:cNvPr id="30" name="TextBox 29">
+            <a:extLst>
+              <a:ext uri="{FF2B5EF4-FFF2-40B4-BE49-F238E27FC236}">
+                <a16:creationId xmlns:a16="http://schemas.microsoft.com/office/drawing/2014/main" id="{AE58256E-C6F9-2841-BE46-5832B08E2D3B}"/>
+              </a:ext>
+            </a:extLst>
+          </p:cNvPr>
+          <p:cNvSpPr txBox="1"/>
+          <p:nvPr/>
+        </p:nvSpPr>
+        <p:spPr>
+          <a:xfrm>
+            <a:off x="5035129" y="3429000"/>
+            <a:ext cx="555171" cy="190800"/>
+          </a:xfrm>
+          <a:prstGeom prst="rect">
+            <a:avLst/>
+          </a:prstGeom>
+          <a:noFill/>
+          <a:ln>
+            <a:noFill/>
+          </a:ln>
+        </p:spPr>
+        <p:txBody>
+          <a:bodyPr wrap="square" tIns="3600" bIns="3600" rtlCol="0">
+            <a:spAutoFit/>
+          </a:bodyPr>
+          <a:lstStyle/>
+          <a:p>
+            <a:r>
+              <a:rPr lang="en-LU" sz="1200" dirty="0"/>
+              <a:t> </a:t>
+            </a:r>
+          </a:p>
+        </p:txBody>
+      </p:sp>
+      <p:sp>
+        <p:nvSpPr>
+          <p:cNvPr id="31" name="TextBox 30">
+            <a:extLst>
+              <a:ext uri="{FF2B5EF4-FFF2-40B4-BE49-F238E27FC236}">
+                <a16:creationId xmlns:a16="http://schemas.microsoft.com/office/drawing/2014/main" id="{FD67EC89-CE18-3645-B17B-131E35E59BC4}"/>
+              </a:ext>
+            </a:extLst>
+          </p:cNvPr>
+          <p:cNvSpPr txBox="1"/>
+          <p:nvPr/>
+        </p:nvSpPr>
+        <p:spPr>
+          <a:xfrm>
+            <a:off x="2798877" y="1570547"/>
+            <a:ext cx="555171" cy="190800"/>
+          </a:xfrm>
+          <a:prstGeom prst="rect">
+            <a:avLst/>
+          </a:prstGeom>
+          <a:noFill/>
+          <a:ln>
+            <a:noFill/>
+          </a:ln>
+        </p:spPr>
+        <p:txBody>
+          <a:bodyPr wrap="square" tIns="3600" bIns="3600" rtlCol="0">
+            <a:spAutoFit/>
+          </a:bodyPr>
+          <a:lstStyle/>
+          <a:p>
+            <a:r>
+              <a:rPr lang="en-LU" sz="1200" dirty="0"/>
+              <a:t> </a:t>
+            </a:r>
+          </a:p>
+        </p:txBody>
+      </p:sp>
+      <p:cxnSp>
+        <p:nvCxnSpPr>
+          <p:cNvPr id="32" name="Elbow Connector 31">
+            <a:extLst>
+              <a:ext uri="{FF2B5EF4-FFF2-40B4-BE49-F238E27FC236}">
+                <a16:creationId xmlns:a16="http://schemas.microsoft.com/office/drawing/2014/main" id="{9B9E9A87-0DAF-FB42-A23F-DB882CCF9D8F}"/>
+              </a:ext>
+            </a:extLst>
+          </p:cNvPr>
+          <p:cNvCxnSpPr>
+            <a:cxnSpLocks/>
+            <a:stCxn id="31" idx="2"/>
+            <a:endCxn id="30" idx="0"/>
+          </p:cNvCxnSpPr>
+          <p:nvPr/>
+        </p:nvCxnSpPr>
+        <p:spPr>
+          <a:xfrm rot="16200000" flipH="1">
+            <a:off x="3360763" y="1477047"/>
+            <a:ext cx="1667653" cy="2236252"/>
+          </a:xfrm>
+          <a:prstGeom prst="bentConnector3">
+            <a:avLst>
+              <a:gd name="adj1" fmla="val 50000"/>
+            </a:avLst>
+          </a:prstGeom>
+          <a:ln w="12700">
+            <a:tailEnd type="triangle"/>
+          </a:ln>
+        </p:spPr>
+        <p:style>
+          <a:lnRef idx="1">
+            <a:schemeClr val="accent1"/>
+          </a:lnRef>
+          <a:fillRef idx="0">
+            <a:schemeClr val="accent1"/>
+          </a:fillRef>
+          <a:effectRef idx="0">
+            <a:schemeClr val="accent1"/>
+          </a:effectRef>
+          <a:fontRef idx="minor">
+            <a:schemeClr val="tx1"/>
+          </a:fontRef>
+        </p:style>
+      </p:cxnSp>
+      <p:sp>
+        <p:nvSpPr>
+          <p:cNvPr id="36" name="TextBox 35">
+            <a:extLst>
+              <a:ext uri="{FF2B5EF4-FFF2-40B4-BE49-F238E27FC236}">
+                <a16:creationId xmlns:a16="http://schemas.microsoft.com/office/drawing/2014/main" id="{10587801-5DC8-F649-B894-C0AA5B82F1E0}"/>
+              </a:ext>
+            </a:extLst>
+          </p:cNvPr>
+          <p:cNvSpPr txBox="1"/>
+          <p:nvPr/>
+        </p:nvSpPr>
+        <p:spPr>
+          <a:xfrm>
+            <a:off x="551300" y="1968046"/>
+            <a:ext cx="1937658" cy="261610"/>
+          </a:xfrm>
+          <a:prstGeom prst="rect">
+            <a:avLst/>
+          </a:prstGeom>
+          <a:solidFill>
+            <a:schemeClr val="bg1"/>
+          </a:solidFill>
+        </p:spPr>
+        <p:txBody>
+          <a:bodyPr wrap="square" rtlCol="0">
+            <a:spAutoFit/>
+          </a:bodyPr>
+          <a:lstStyle/>
+          <a:p>
+            <a:r>
+              <a:rPr lang="en-US" sz="1100" dirty="0"/>
+              <a:t>Fund deployment transactions</a:t>
+            </a:r>
+            <a:endParaRPr lang="en-LU" sz="1100" dirty="0"/>
+          </a:p>
+        </p:txBody>
+      </p:sp>
+      <p:sp>
+        <p:nvSpPr>
+          <p:cNvPr id="37" name="TextBox 36">
+            <a:extLst>
+              <a:ext uri="{FF2B5EF4-FFF2-40B4-BE49-F238E27FC236}">
+                <a16:creationId xmlns:a16="http://schemas.microsoft.com/office/drawing/2014/main" id="{C964B047-A541-F846-82C2-986B82D79635}"/>
+              </a:ext>
+            </a:extLst>
+          </p:cNvPr>
+          <p:cNvSpPr txBox="1"/>
+          <p:nvPr/>
+        </p:nvSpPr>
+        <p:spPr>
+          <a:xfrm>
+            <a:off x="3147549" y="2040720"/>
+            <a:ext cx="1937658" cy="261610"/>
+          </a:xfrm>
+          <a:prstGeom prst="rect">
+            <a:avLst/>
+          </a:prstGeom>
+          <a:solidFill>
+            <a:schemeClr val="bg1"/>
+          </a:solidFill>
+        </p:spPr>
+        <p:txBody>
+          <a:bodyPr wrap="square" rtlCol="0">
+            <a:spAutoFit/>
+          </a:bodyPr>
+          <a:lstStyle/>
+          <a:p>
+            <a:r>
+              <a:rPr lang="en-US" sz="1100" dirty="0"/>
+              <a:t>Open access to testnet</a:t>
+            </a:r>
+            <a:endParaRPr lang="en-LU" sz="1100" dirty="0"/>
+          </a:p>
+        </p:txBody>
+      </p:sp>
+      <p:sp>
+        <p:nvSpPr>
+          <p:cNvPr id="38" name="TextBox 37">
+            <a:extLst>
+              <a:ext uri="{FF2B5EF4-FFF2-40B4-BE49-F238E27FC236}">
+                <a16:creationId xmlns:a16="http://schemas.microsoft.com/office/drawing/2014/main" id="{DB21F378-A70A-1047-9B7D-CFCDBD1106A0}"/>
+              </a:ext>
+            </a:extLst>
+          </p:cNvPr>
+          <p:cNvSpPr txBox="1"/>
+          <p:nvPr/>
+        </p:nvSpPr>
+        <p:spPr>
+          <a:xfrm>
+            <a:off x="1207302" y="4817768"/>
+            <a:ext cx="3310269" cy="418262"/>
+          </a:xfrm>
+          <a:prstGeom prst="rect">
+            <a:avLst/>
+          </a:prstGeom>
+          <a:noFill/>
+          <a:ln>
+            <a:solidFill>
+              <a:schemeClr val="accent1"/>
+            </a:solidFill>
+          </a:ln>
+        </p:spPr>
+        <p:txBody>
+          <a:bodyPr wrap="none" rtlCol="0">
+            <a:noAutofit/>
+          </a:bodyPr>
+          <a:lstStyle/>
+          <a:p>
+            <a:r>
+              <a:rPr lang="en-US" sz="1600" dirty="0"/>
+              <a:t>Smart contracts on testnet: backend</a:t>
+            </a:r>
+          </a:p>
+        </p:txBody>
+      </p:sp>
+      <p:cxnSp>
+        <p:nvCxnSpPr>
+          <p:cNvPr id="41" name="Elbow Connector 40">
+            <a:extLst>
+              <a:ext uri="{FF2B5EF4-FFF2-40B4-BE49-F238E27FC236}">
+                <a16:creationId xmlns:a16="http://schemas.microsoft.com/office/drawing/2014/main" id="{3A4386B6-03C8-164A-9C33-8A3A03D608C9}"/>
+              </a:ext>
+            </a:extLst>
+          </p:cNvPr>
+          <p:cNvCxnSpPr>
+            <a:cxnSpLocks/>
+            <a:stCxn id="9" idx="2"/>
+            <a:endCxn id="38" idx="0"/>
+          </p:cNvCxnSpPr>
+          <p:nvPr/>
+        </p:nvCxnSpPr>
+        <p:spPr>
+          <a:xfrm rot="5400000">
+            <a:off x="2889235" y="4218636"/>
+            <a:ext cx="572335" cy="625929"/>
+          </a:xfrm>
+          <a:prstGeom prst="bentConnector3">
+            <a:avLst>
+              <a:gd name="adj1" fmla="val 50000"/>
+            </a:avLst>
+          </a:prstGeom>
+          <a:ln w="12700">
+            <a:tailEnd type="triangle"/>
+          </a:ln>
+        </p:spPr>
+        <p:style>
+          <a:lnRef idx="1">
+            <a:schemeClr val="accent1"/>
+          </a:lnRef>
+          <a:fillRef idx="0">
+            <a:schemeClr val="accent1"/>
+          </a:fillRef>
+          <a:effectRef idx="0">
+            <a:schemeClr val="accent1"/>
+          </a:effectRef>
+          <a:fontRef idx="minor">
+            <a:schemeClr val="tx1"/>
+          </a:fontRef>
+        </p:style>
+      </p:cxnSp>
+      <p:sp>
+        <p:nvSpPr>
+          <p:cNvPr id="43" name="TextBox 42">
+            <a:extLst>
+              <a:ext uri="{FF2B5EF4-FFF2-40B4-BE49-F238E27FC236}">
+                <a16:creationId xmlns:a16="http://schemas.microsoft.com/office/drawing/2014/main" id="{940192EF-3F0B-714F-94B8-2FCFE5D34BFC}"/>
+              </a:ext>
+            </a:extLst>
+          </p:cNvPr>
+          <p:cNvSpPr txBox="1"/>
+          <p:nvPr/>
+        </p:nvSpPr>
+        <p:spPr>
+          <a:xfrm>
+            <a:off x="7840573" y="1894114"/>
+            <a:ext cx="2130741" cy="1153882"/>
+          </a:xfrm>
+          <a:prstGeom prst="rect">
+            <a:avLst/>
+          </a:prstGeom>
+          <a:noFill/>
+          <a:ln>
+            <a:solidFill>
+              <a:schemeClr val="accent1"/>
+            </a:solidFill>
+          </a:ln>
+        </p:spPr>
+        <p:txBody>
+          <a:bodyPr wrap="none" rtlCol="0">
+            <a:noAutofit/>
+          </a:bodyPr>
+          <a:lstStyle/>
+          <a:p>
+            <a:r>
+              <a:rPr lang="en-US" sz="1600" dirty="0"/>
+              <a:t>Pepito</a:t>
+            </a:r>
+          </a:p>
+          <a:p>
+            <a:pPr marL="171450" indent="-171450">
+              <a:buFont typeface="Arial" panose="020B0604020202020204" pitchFamily="34" charset="0"/>
+              <a:buChar char="•"/>
+            </a:pPr>
+            <a:r>
+              <a:rPr lang="en-US" sz="1200" dirty="0" err="1"/>
+              <a:t>package.json</a:t>
+            </a:r>
+            <a:endParaRPr lang="en-US" sz="1200" dirty="0"/>
+          </a:p>
+          <a:p>
+            <a:pPr marL="171450" indent="-171450">
+              <a:buFont typeface="Arial" panose="020B0604020202020204" pitchFamily="34" charset="0"/>
+              <a:buChar char="•"/>
+            </a:pPr>
+            <a:r>
+              <a:rPr lang="en-US" sz="1200" dirty="0" err="1"/>
+              <a:t>node_modules</a:t>
+            </a:r>
+            <a:endParaRPr lang="en-US" sz="1200" dirty="0"/>
+          </a:p>
+          <a:p>
+            <a:pPr marL="171450" indent="-171450">
+              <a:buFont typeface="Arial" panose="020B0604020202020204" pitchFamily="34" charset="0"/>
+              <a:buChar char="•"/>
+            </a:pPr>
+            <a:r>
+              <a:rPr lang="en-US" sz="1200" dirty="0"/>
+              <a:t>public</a:t>
+            </a:r>
+          </a:p>
+          <a:p>
+            <a:pPr marL="171450" indent="-171450">
+              <a:buFont typeface="Arial" panose="020B0604020202020204" pitchFamily="34" charset="0"/>
+              <a:buChar char="•"/>
+            </a:pPr>
+            <a:r>
+              <a:rPr lang="en-US" sz="1200" dirty="0" err="1"/>
+              <a:t>src</a:t>
+            </a:r>
+            <a:endParaRPr lang="en-US" sz="1200" dirty="0"/>
+          </a:p>
+        </p:txBody>
+      </p:sp>
+      <p:sp>
+        <p:nvSpPr>
+          <p:cNvPr id="45" name="TextBox 44">
+            <a:extLst>
+              <a:ext uri="{FF2B5EF4-FFF2-40B4-BE49-F238E27FC236}">
+                <a16:creationId xmlns:a16="http://schemas.microsoft.com/office/drawing/2014/main" id="{D7ACF83A-0604-A74F-87A8-2F03EBEF32D1}"/>
+              </a:ext>
+            </a:extLst>
+          </p:cNvPr>
+          <p:cNvSpPr txBox="1"/>
+          <p:nvPr/>
+        </p:nvSpPr>
+        <p:spPr>
+          <a:xfrm>
+            <a:off x="7840572" y="3636966"/>
+            <a:ext cx="2130741" cy="418262"/>
+          </a:xfrm>
+          <a:prstGeom prst="rect">
+            <a:avLst/>
+          </a:prstGeom>
+          <a:noFill/>
+          <a:ln>
+            <a:solidFill>
+              <a:schemeClr val="accent1"/>
+            </a:solidFill>
+          </a:ln>
+        </p:spPr>
+        <p:txBody>
+          <a:bodyPr wrap="none" rtlCol="0">
+            <a:noAutofit/>
+          </a:bodyPr>
+          <a:lstStyle/>
+          <a:p>
+            <a:r>
+              <a:rPr lang="en-US" sz="1600" dirty="0" err="1"/>
+              <a:t>Webpack_build</a:t>
+            </a:r>
+            <a:endParaRPr lang="en-US" sz="1600" dirty="0"/>
+          </a:p>
+        </p:txBody>
+      </p:sp>
+      <p:sp>
+        <p:nvSpPr>
+          <p:cNvPr id="46" name="TextBox 45">
+            <a:extLst>
+              <a:ext uri="{FF2B5EF4-FFF2-40B4-BE49-F238E27FC236}">
+                <a16:creationId xmlns:a16="http://schemas.microsoft.com/office/drawing/2014/main" id="{270B3BF5-DF47-1144-8810-D89DB4DA9BCE}"/>
+              </a:ext>
+            </a:extLst>
+          </p:cNvPr>
+          <p:cNvSpPr txBox="1"/>
+          <p:nvPr/>
+        </p:nvSpPr>
+        <p:spPr>
+          <a:xfrm>
+            <a:off x="7840572" y="4817768"/>
+            <a:ext cx="3310269" cy="418262"/>
+          </a:xfrm>
+          <a:prstGeom prst="rect">
+            <a:avLst/>
+          </a:prstGeom>
+          <a:noFill/>
+          <a:ln>
+            <a:solidFill>
+              <a:schemeClr val="accent1"/>
+            </a:solidFill>
+          </a:ln>
+        </p:spPr>
+        <p:txBody>
+          <a:bodyPr wrap="none" rtlCol="0">
+            <a:noAutofit/>
+          </a:bodyPr>
+          <a:lstStyle/>
+          <a:p>
+            <a:r>
+              <a:rPr lang="en-US" sz="1600" dirty="0"/>
+              <a:t>Static webapp on server: frontend</a:t>
+            </a:r>
+          </a:p>
+        </p:txBody>
+      </p:sp>
+      <p:cxnSp>
+        <p:nvCxnSpPr>
+          <p:cNvPr id="49" name="Elbow Connector 48">
+            <a:extLst>
+              <a:ext uri="{FF2B5EF4-FFF2-40B4-BE49-F238E27FC236}">
+                <a16:creationId xmlns:a16="http://schemas.microsoft.com/office/drawing/2014/main" id="{0DCF1D83-06FA-2F43-9E8E-C0AA4F08DC22}"/>
+              </a:ext>
+            </a:extLst>
+          </p:cNvPr>
+          <p:cNvCxnSpPr>
+            <a:cxnSpLocks/>
+            <a:stCxn id="43" idx="2"/>
+            <a:endCxn id="45" idx="0"/>
+          </p:cNvCxnSpPr>
+          <p:nvPr/>
+        </p:nvCxnSpPr>
+        <p:spPr>
+          <a:xfrm rot="5400000">
+            <a:off x="8611459" y="3342481"/>
+            <a:ext cx="588970" cy="1"/>
+          </a:xfrm>
+          <a:prstGeom prst="bentConnector3">
+            <a:avLst>
+              <a:gd name="adj1" fmla="val 50000"/>
+            </a:avLst>
+          </a:prstGeom>
+          <a:ln w="12700">
+            <a:tailEnd type="triangle"/>
+          </a:ln>
+        </p:spPr>
+        <p:style>
+          <a:lnRef idx="1">
+            <a:schemeClr val="accent1"/>
+          </a:lnRef>
+          <a:fillRef idx="0">
+            <a:schemeClr val="accent1"/>
+          </a:fillRef>
+          <a:effectRef idx="0">
+            <a:schemeClr val="accent1"/>
+          </a:effectRef>
+          <a:fontRef idx="minor">
+            <a:schemeClr val="tx1"/>
+          </a:fontRef>
+        </p:style>
+      </p:cxnSp>
+      <p:sp>
+        <p:nvSpPr>
+          <p:cNvPr id="50" name="TextBox 49">
+            <a:extLst>
+              <a:ext uri="{FF2B5EF4-FFF2-40B4-BE49-F238E27FC236}">
+                <a16:creationId xmlns:a16="http://schemas.microsoft.com/office/drawing/2014/main" id="{B19A2B20-769F-DC41-8497-1C6B14156B22}"/>
+              </a:ext>
+            </a:extLst>
+          </p:cNvPr>
+          <p:cNvSpPr txBox="1"/>
+          <p:nvPr/>
+        </p:nvSpPr>
+        <p:spPr>
+          <a:xfrm>
+            <a:off x="8628427" y="3192478"/>
+            <a:ext cx="1342874" cy="261610"/>
+          </a:xfrm>
+          <a:prstGeom prst="rect">
+            <a:avLst/>
+          </a:prstGeom>
+          <a:solidFill>
+            <a:schemeClr val="bg1"/>
+          </a:solidFill>
+        </p:spPr>
+        <p:txBody>
+          <a:bodyPr wrap="square" rtlCol="0">
+            <a:spAutoFit/>
+          </a:bodyPr>
+          <a:lstStyle/>
+          <a:p>
+            <a:r>
+              <a:rPr lang="en-US" sz="1100" dirty="0" err="1"/>
+              <a:t>npm</a:t>
+            </a:r>
+            <a:r>
+              <a:rPr lang="en-US" sz="1100" dirty="0"/>
+              <a:t> run build</a:t>
+            </a:r>
+            <a:endParaRPr lang="en-LU" sz="1100" dirty="0"/>
+          </a:p>
+        </p:txBody>
+      </p:sp>
+      <p:cxnSp>
+        <p:nvCxnSpPr>
+          <p:cNvPr id="52" name="Elbow Connector 51">
+            <a:extLst>
+              <a:ext uri="{FF2B5EF4-FFF2-40B4-BE49-F238E27FC236}">
+                <a16:creationId xmlns:a16="http://schemas.microsoft.com/office/drawing/2014/main" id="{099CE159-3E3D-0446-B423-C6C0B8E3FE1C}"/>
+              </a:ext>
+            </a:extLst>
+          </p:cNvPr>
+          <p:cNvCxnSpPr>
+            <a:cxnSpLocks/>
+            <a:stCxn id="45" idx="2"/>
+            <a:endCxn id="46" idx="0"/>
+          </p:cNvCxnSpPr>
+          <p:nvPr/>
+        </p:nvCxnSpPr>
+        <p:spPr>
+          <a:xfrm rot="16200000" flipH="1">
+            <a:off x="8819555" y="4141616"/>
+            <a:ext cx="762540" cy="589764"/>
+          </a:xfrm>
+          <a:prstGeom prst="bentConnector3">
+            <a:avLst>
+              <a:gd name="adj1" fmla="val 50000"/>
+            </a:avLst>
+          </a:prstGeom>
+          <a:ln w="12700">
+            <a:tailEnd type="triangle"/>
+          </a:ln>
+        </p:spPr>
+        <p:style>
+          <a:lnRef idx="1">
+            <a:schemeClr val="accent1"/>
+          </a:lnRef>
+          <a:fillRef idx="0">
+            <a:schemeClr val="accent1"/>
+          </a:fillRef>
+          <a:effectRef idx="0">
+            <a:schemeClr val="accent1"/>
+          </a:effectRef>
+          <a:fontRef idx="minor">
+            <a:schemeClr val="tx1"/>
+          </a:fontRef>
+        </p:style>
+      </p:cxnSp>
+      <p:sp>
+        <p:nvSpPr>
+          <p:cNvPr id="34" name="Left-right Arrow 33">
+            <a:extLst>
+              <a:ext uri="{FF2B5EF4-FFF2-40B4-BE49-F238E27FC236}">
+                <a16:creationId xmlns:a16="http://schemas.microsoft.com/office/drawing/2014/main" id="{3AC93297-3C12-F14E-8734-DA621E5EA563}"/>
+              </a:ext>
+            </a:extLst>
+          </p:cNvPr>
+          <p:cNvSpPr/>
+          <p:nvPr/>
+        </p:nvSpPr>
+        <p:spPr>
+          <a:xfrm>
+            <a:off x="5035129" y="4817768"/>
+            <a:ext cx="2329837" cy="418262"/>
+          </a:xfrm>
+          <a:prstGeom prst="leftRightArrow">
+            <a:avLst/>
+          </a:prstGeom>
+          <a:solidFill>
+            <a:schemeClr val="accent6">
+              <a:lumMod val="20000"/>
+              <a:lumOff val="80000"/>
+            </a:schemeClr>
+          </a:solidFill>
+        </p:spPr>
+        <p:style>
+          <a:lnRef idx="2">
+            <a:schemeClr val="accent1">
+              <a:shade val="50000"/>
+            </a:schemeClr>
+          </a:lnRef>
+          <a:fillRef idx="1">
+            <a:schemeClr val="accent1"/>
+          </a:fillRef>
+          <a:effectRef idx="0">
+            <a:schemeClr val="accent1"/>
+          </a:effectRef>
+          <a:fontRef idx="minor">
+            <a:schemeClr val="lt1"/>
+          </a:fontRef>
+        </p:style>
+        <p:txBody>
+          <a:bodyPr rtlCol="0" anchor="ctr"/>
+          <a:lstStyle/>
+          <a:p>
+            <a:pPr algn="ctr"/>
+            <a:endParaRPr lang="en-LU"/>
+          </a:p>
+        </p:txBody>
+      </p:sp>
+    </p:spTree>
+    <p:extLst>
+      <p:ext uri="{BB962C8B-B14F-4D97-AF65-F5344CB8AC3E}">
+        <p14:creationId xmlns:p14="http://schemas.microsoft.com/office/powerpoint/2010/main" val="3418532690"/>
+      </p:ext>
+    </p:extLst>
+  </p:cSld>
+  <p:clrMapOvr>
+    <a:masterClrMapping/>
+  </p:clrMapOvr>
+</p:sld>
+</file>
+
 <file path=ppt/slides/slide2.xml><?xml version="1.0" encoding="utf-8"?>
 <p:sld xmlns:a="http://schemas.openxmlformats.org/drawingml/2006/main" xmlns:r="http://schemas.openxmlformats.org/officeDocument/2006/relationships" xmlns:p="http://schemas.openxmlformats.org/presentationml/2006/main">
   <p:cSld>
@@ -16330,7 +17628,7 @@
         <p:spPr>
           <a:xfrm>
             <a:off x="620486" y="250372"/>
-            <a:ext cx="4767943" cy="594250"/>
+            <a:ext cx="4969814" cy="594250"/>
           </a:xfrm>
           <a:prstGeom prst="rect">
             <a:avLst/>
@@ -16925,7 +18223,7 @@
         <p:spPr>
           <a:xfrm>
             <a:off x="7913914" y="2730270"/>
-            <a:ext cx="3918039" cy="769441"/>
+            <a:ext cx="3918039" cy="261610"/>
           </a:xfrm>
           <a:prstGeom prst="rect">
             <a:avLst/>
@@ -16946,33 +18244,7 @@
             </a:pPr>
             <a:r>
               <a:rPr lang="en-US" sz="1100" dirty="0"/>
-              <a:t>getWeb3 generates a </a:t>
-            </a:r>
-            <a:r>
-              <a:rPr lang="en-US" sz="1100" dirty="0" err="1"/>
-              <a:t>HDWalletProvider</a:t>
-            </a:r>
-            <a:r>
-              <a:rPr lang="en-US" sz="1100" dirty="0"/>
-              <a:t> with the 12 words of Metamask</a:t>
-            </a:r>
-          </a:p>
-          <a:p>
-            <a:pPr marL="171450" indent="-171450">
-              <a:buFont typeface="Arial" panose="020B0604020202020204" pitchFamily="34" charset="0"/>
-              <a:buChar char="•"/>
-            </a:pPr>
-            <a:r>
-              <a:rPr lang="en-US" sz="1100" dirty="0"/>
-              <a:t>assign web3 to this </a:t>
-            </a:r>
-            <a:r>
-              <a:rPr lang="en-US" sz="1100" dirty="0" err="1"/>
-              <a:t>HDWalletProvider</a:t>
-            </a:r>
-            <a:r>
-              <a:rPr lang="en-US" sz="1100" dirty="0"/>
-              <a:t> of a testnet and return web3</a:t>
+              <a:t>getWeb3 instantiates web3 to a Provider from Metamask</a:t>
             </a:r>
             <a:endParaRPr lang="en-LU" sz="1100" dirty="0"/>
           </a:p>
@@ -17030,7 +18302,7 @@
         </p:nvSpPr>
         <p:spPr>
           <a:xfrm>
-            <a:off x="7913914" y="3499711"/>
+            <a:off x="7913914" y="3151367"/>
             <a:ext cx="3918039" cy="938719"/>
           </a:xfrm>
           <a:prstGeom prst="rect">
@@ -17056,7 +18328,7 @@
             </a:r>
             <a:r>
               <a:rPr lang="en-US" sz="1100" dirty="0"/>
-              <a:t> uses one of our Metamask accounts connected to this testnet</a:t>
+              <a:t> uses the Metamask account selected and connected by the user to a testnet of this Provider</a:t>
             </a:r>
           </a:p>
           <a:p>
@@ -17308,7 +18580,7 @@
         <p:spPr>
           <a:xfrm>
             <a:off x="7913913" y="4729296"/>
-            <a:ext cx="3918039" cy="430887"/>
+            <a:ext cx="3918039" cy="600164"/>
           </a:xfrm>
           <a:prstGeom prst="rect">
             <a:avLst/>
@@ -17342,6 +18614,16 @@
             <a:r>
               <a:rPr lang="en-US" sz="1100" dirty="0"/>
               <a:t> are 2 transactions sent to the testnet referred to by web3</a:t>
+            </a:r>
+          </a:p>
+          <a:p>
+            <a:pPr marL="171450" indent="-171450">
+              <a:buFont typeface="Arial" panose="020B0604020202020204" pitchFamily="34" charset="0"/>
+              <a:buChar char="•"/>
+            </a:pPr>
+            <a:r>
+              <a:rPr lang="en-US" sz="1100" dirty="0"/>
+              <a:t>The account selected by the user is paying for the fees</a:t>
             </a:r>
             <a:endParaRPr lang="en-LU" sz="1100" dirty="0"/>
           </a:p>

</xml_diff>